<commit_message>
Adding example code of previous iterations
</commit_message>
<xml_diff>
--- a/GopherLife.pptx
+++ b/GopherLife.pptx
@@ -6945,7 +6945,12 @@
             <p:ph idx="1"/>
           </p:nvPr>
         </p:nvSpPr>
-        <p:spPr/>
+        <p:spPr>
+          <a:xfrm>
+            <a:off x="375179" y="2052917"/>
+            <a:ext cx="9226021" cy="4195481"/>
+          </a:xfrm>
+        </p:spPr>
         <p:txBody>
           <a:bodyPr/>
           <a:lstStyle/>
@@ -6981,14 +6986,52 @@
           </a:p>
           <a:p>
             <a:r>
+              <a:rPr lang="en-GB"/>
+              <a:t>Re-learnt </a:t>
+            </a:r>
+            <a:r>
               <a:rPr lang="en-GB" dirty="0"/>
-              <a:t>Basic Practice with Structs, Methods and Goroutines. </a:t>
+              <a:t>the fundamentals the Concurrency  </a:t>
             </a:r>
             <a:r>
               <a:rPr lang="en-GB" dirty="0">
                 <a:latin typeface="Segoe MDL2 Assets" panose="050A0102010101010101" pitchFamily="18" charset="0"/>
               </a:rPr>
               <a:t></a:t>
+            </a:r>
+            <a:endParaRPr lang="en-GB" dirty="0"/>
+          </a:p>
+          <a:p>
+            <a:r>
+              <a:rPr lang="en-GB" dirty="0"/>
+              <a:t>Practice with Structs, Methods, Goroutines and Syncing </a:t>
+            </a:r>
+            <a:r>
+              <a:rPr lang="en-GB" dirty="0">
+                <a:latin typeface="Segoe MDL2 Assets" panose="050A0102010101010101" pitchFamily="18" charset="0"/>
+              </a:rPr>
+              <a:t></a:t>
+            </a:r>
+            <a:endParaRPr lang="en-GB" dirty="0"/>
+          </a:p>
+          <a:p>
+            <a:r>
+              <a:rPr lang="en-GB" dirty="0"/>
+              <a:t>Imports beyond ‘</a:t>
+            </a:r>
+            <a:r>
+              <a:rPr lang="en-GB" dirty="0" err="1"/>
+              <a:t>fmt</a:t>
+            </a:r>
+            <a:r>
+              <a:rPr lang="en-GB" dirty="0"/>
+              <a:t>’</a:t>
+            </a:r>
+            <a:r>
+              <a:rPr lang="en-GB" dirty="0">
+                <a:latin typeface="Segoe MDL2 Assets" panose="050A0102010101010101" pitchFamily="18" charset="0"/>
+              </a:rPr>
+              <a:t> </a:t>
             </a:r>
             <a:endParaRPr lang="en-GB" dirty="0"/>
           </a:p>

</xml_diff>

<commit_message>
Created two example programs for parts in the presentation
</commit_message>
<xml_diff>
--- a/GopherLife.pptx
+++ b/GopherLife.pptx
@@ -5,7 +5,7 @@
     <p:sldMasterId id="2147483678" r:id="rId1"/>
   </p:sldMasterIdLst>
   <p:notesMasterIdLst>
-    <p:notesMasterId r:id="rId24"/>
+    <p:notesMasterId r:id="rId28"/>
   </p:notesMasterIdLst>
   <p:sldIdLst>
     <p:sldId id="256" r:id="rId2"/>
@@ -19,17 +19,21 @@
     <p:sldId id="273" r:id="rId10"/>
     <p:sldId id="276" r:id="rId11"/>
     <p:sldId id="277" r:id="rId12"/>
-    <p:sldId id="274" r:id="rId13"/>
-    <p:sldId id="265" r:id="rId14"/>
-    <p:sldId id="275" r:id="rId15"/>
-    <p:sldId id="266" r:id="rId16"/>
-    <p:sldId id="257" r:id="rId17"/>
-    <p:sldId id="258" r:id="rId18"/>
-    <p:sldId id="259" r:id="rId19"/>
-    <p:sldId id="261" r:id="rId20"/>
-    <p:sldId id="263" r:id="rId21"/>
-    <p:sldId id="262" r:id="rId22"/>
-    <p:sldId id="264" r:id="rId23"/>
+    <p:sldId id="278" r:id="rId13"/>
+    <p:sldId id="281" r:id="rId14"/>
+    <p:sldId id="280" r:id="rId15"/>
+    <p:sldId id="274" r:id="rId16"/>
+    <p:sldId id="275" r:id="rId17"/>
+    <p:sldId id="282" r:id="rId18"/>
+    <p:sldId id="266" r:id="rId19"/>
+    <p:sldId id="257" r:id="rId20"/>
+    <p:sldId id="258" r:id="rId21"/>
+    <p:sldId id="259" r:id="rId22"/>
+    <p:sldId id="261" r:id="rId23"/>
+    <p:sldId id="263" r:id="rId24"/>
+    <p:sldId id="262" r:id="rId25"/>
+    <p:sldId id="264" r:id="rId26"/>
+    <p:sldId id="279" r:id="rId27"/>
   </p:sldIdLst>
   <p:sldSz cx="12192000" cy="6858000"/>
   <p:notesSz cx="6858000" cy="9144000"/>
@@ -554,7 +558,7 @@
           <a:p>
             <a:fld id="{D37E09BB-0EE2-4AA1-9043-B532D0F5CCDE}" type="slidenum">
               <a:rPr lang="en-GB" smtClean="0"/>
-              <a:t>19</a:t>
+              <a:t>22</a:t>
             </a:fld>
             <a:endParaRPr lang="en-GB"/>
           </a:p>
@@ -6839,6 +6843,15 @@
               <a:t>Not all Gophers Come to life at the same time. Why?</a:t>
             </a:r>
           </a:p>
+          <a:p>
+            <a:endParaRPr lang="en-GB" dirty="0"/>
+          </a:p>
+          <a:p>
+            <a:r>
+              <a:rPr lang="en-GB" dirty="0"/>
+              <a:t>In short, I messed up the basics of concurrency. </a:t>
+            </a:r>
+          </a:p>
         </p:txBody>
       </p:sp>
       <p:pic>
@@ -6906,7 +6919,7 @@
           <p:cNvPr id="2" name="Title 1">
             <a:extLst>
               <a:ext uri="{FF2B5EF4-FFF2-40B4-BE49-F238E27FC236}">
-                <a16:creationId xmlns:a16="http://schemas.microsoft.com/office/drawing/2014/main" id="{8EE80C47-6831-4E7C-A6B6-B5AF25EEA403}"/>
+                <a16:creationId xmlns:a16="http://schemas.microsoft.com/office/drawing/2014/main" id="{31C511DA-B2D2-4BCE-AA1E-6583C640F3B3}"/>
               </a:ext>
             </a:extLst>
           </p:cNvPr>
@@ -6917,14 +6930,19 @@
             <p:ph type="title"/>
           </p:nvPr>
         </p:nvSpPr>
-        <p:spPr/>
+        <p:spPr>
+          <a:xfrm>
+            <a:off x="646112" y="452718"/>
+            <a:ext cx="3587222" cy="1400530"/>
+          </a:xfrm>
+        </p:spPr>
         <p:txBody>
           <a:bodyPr/>
           <a:lstStyle/>
           <a:p>
             <a:r>
               <a:rPr lang="en-GB" dirty="0"/>
-              <a:t>Progress Checklist - 2</a:t>
+              <a:t>Solution B</a:t>
             </a:r>
           </a:p>
         </p:txBody>
@@ -6934,7 +6952,7 @@
           <p:cNvPr id="3" name="Content Placeholder 2">
             <a:extLst>
               <a:ext uri="{FF2B5EF4-FFF2-40B4-BE49-F238E27FC236}">
-                <a16:creationId xmlns:a16="http://schemas.microsoft.com/office/drawing/2014/main" id="{EFA3091F-FE6C-4CAD-95A8-1617E2A8E6C3}"/>
+                <a16:creationId xmlns:a16="http://schemas.microsoft.com/office/drawing/2014/main" id="{C447BD9B-DB47-49AE-A835-D77320F8949D}"/>
               </a:ext>
             </a:extLst>
           </p:cNvPr>
@@ -6947,8 +6965,8 @@
         </p:nvSpPr>
         <p:spPr>
           <a:xfrm>
-            <a:off x="375179" y="2052917"/>
-            <a:ext cx="9226021" cy="4195481"/>
+            <a:off x="1103312" y="2052918"/>
+            <a:ext cx="4366155" cy="4195481"/>
           </a:xfrm>
         </p:spPr>
         <p:txBody>
@@ -6957,96 +6975,84 @@
           <a:p>
             <a:r>
               <a:rPr lang="en-GB" dirty="0"/>
-              <a:t>Watched Rob Pike’s ‘Concurrency is Not Parallelism’ </a:t>
-            </a:r>
-            <a:r>
-              <a:rPr lang="en-GB" dirty="0">
-                <a:latin typeface="Segoe MDL2 Assets" panose="050A0102010101010101" pitchFamily="18" charset="0"/>
-              </a:rPr>
-              <a:t></a:t>
-            </a:r>
-          </a:p>
-          <a:p>
-            <a:pPr lvl="1"/>
-            <a:r>
-              <a:rPr lang="en-GB" dirty="0">
-                <a:hlinkClick r:id="rId2"/>
-              </a:rPr>
-              <a:t>https://www.youtube.com/watch?v=cN_DpYBzKso&amp;feature=youtu.be</a:t>
-            </a:r>
+              <a:t>Slight tweaks to the Gopher struct and ‘Live’ method</a:t>
+            </a:r>
+          </a:p>
+          <a:p>
             <a:endParaRPr lang="en-GB" dirty="0"/>
           </a:p>
           <a:p>
-            <a:pPr marL="0" indent="0">
-              <a:buNone/>
-            </a:pPr>
-            <a:endParaRPr lang="en-GB" dirty="0">
-              <a:latin typeface="Segoe MDL2 Assets" panose="050A0102010101010101" pitchFamily="18" charset="0"/>
-            </a:endParaRPr>
-          </a:p>
-          <a:p>
-            <a:r>
-              <a:rPr lang="en-GB"/>
-              <a:t>Re-learnt </a:t>
-            </a:r>
             <a:r>
               <a:rPr lang="en-GB" dirty="0"/>
-              <a:t>the fundamentals the Concurrency  </a:t>
-            </a:r>
-            <a:r>
-              <a:rPr lang="en-GB" dirty="0">
-                <a:latin typeface="Segoe MDL2 Assets" panose="050A0102010101010101" pitchFamily="18" charset="0"/>
-              </a:rPr>
-              <a:t></a:t>
-            </a:r>
-            <a:endParaRPr lang="en-GB" dirty="0"/>
-          </a:p>
-          <a:p>
-            <a:r>
-              <a:rPr lang="en-GB" dirty="0"/>
-              <a:t>Practice with Structs, Methods, Goroutines and Syncing </a:t>
-            </a:r>
-            <a:r>
-              <a:rPr lang="en-GB" dirty="0">
-                <a:latin typeface="Segoe MDL2 Assets" panose="050A0102010101010101" pitchFamily="18" charset="0"/>
-              </a:rPr>
-              <a:t></a:t>
-            </a:r>
-            <a:endParaRPr lang="en-GB" dirty="0"/>
-          </a:p>
-          <a:p>
-            <a:r>
-              <a:rPr lang="en-GB" dirty="0"/>
-              <a:t>Imports beyond ‘</a:t>
-            </a:r>
-            <a:r>
-              <a:rPr lang="en-GB" dirty="0" err="1"/>
-              <a:t>fmt</a:t>
-            </a:r>
-            <a:r>
-              <a:rPr lang="en-GB" dirty="0"/>
-              <a:t>’</a:t>
-            </a:r>
-            <a:r>
-              <a:rPr lang="en-GB" dirty="0">
-                <a:latin typeface="Segoe MDL2 Assets" panose="050A0102010101010101" pitchFamily="18" charset="0"/>
-              </a:rPr>
-              <a:t> </a:t>
-            </a:r>
-            <a:endParaRPr lang="en-GB" dirty="0"/>
-          </a:p>
-          <a:p>
-            <a:endParaRPr lang="en-GB" dirty="0"/>
-          </a:p>
-          <a:p>
-            <a:endParaRPr lang="en-GB" dirty="0"/>
-          </a:p>
-        </p:txBody>
-      </p:sp>
+              <a:t>No longer hog the CPU</a:t>
+            </a:r>
+          </a:p>
+        </p:txBody>
+      </p:sp>
+      <p:pic>
+        <p:nvPicPr>
+          <p:cNvPr id="4" name="Picture 3">
+            <a:extLst>
+              <a:ext uri="{FF2B5EF4-FFF2-40B4-BE49-F238E27FC236}">
+                <a16:creationId xmlns:a16="http://schemas.microsoft.com/office/drawing/2014/main" id="{92221AF9-9064-4883-B5E6-A9D9CEBFAF7B}"/>
+              </a:ext>
+            </a:extLst>
+          </p:cNvPr>
+          <p:cNvPicPr>
+            <a:picLocks noChangeAspect="1"/>
+          </p:cNvPicPr>
+          <p:nvPr/>
+        </p:nvPicPr>
+        <p:blipFill>
+          <a:blip r:embed="rId2"/>
+          <a:stretch>
+            <a:fillRect/>
+          </a:stretch>
+        </p:blipFill>
+        <p:spPr>
+          <a:xfrm>
+            <a:off x="5917560" y="2052918"/>
+            <a:ext cx="1609950" cy="771633"/>
+          </a:xfrm>
+          <a:prstGeom prst="rect">
+            <a:avLst/>
+          </a:prstGeom>
+        </p:spPr>
+      </p:pic>
+      <p:pic>
+        <p:nvPicPr>
+          <p:cNvPr id="5" name="Picture 4">
+            <a:extLst>
+              <a:ext uri="{FF2B5EF4-FFF2-40B4-BE49-F238E27FC236}">
+                <a16:creationId xmlns:a16="http://schemas.microsoft.com/office/drawing/2014/main" id="{9435BD84-047D-40F6-AB56-24DD89A13A35}"/>
+              </a:ext>
+            </a:extLst>
+          </p:cNvPr>
+          <p:cNvPicPr>
+            <a:picLocks noChangeAspect="1"/>
+          </p:cNvPicPr>
+          <p:nvPr/>
+        </p:nvPicPr>
+        <p:blipFill>
+          <a:blip r:embed="rId3"/>
+          <a:stretch>
+            <a:fillRect/>
+          </a:stretch>
+        </p:blipFill>
+        <p:spPr>
+          <a:xfrm>
+            <a:off x="5917560" y="3429000"/>
+            <a:ext cx="5439534" cy="2257740"/>
+          </a:xfrm>
+          <a:prstGeom prst="rect">
+            <a:avLst/>
+          </a:prstGeom>
+        </p:spPr>
+      </p:pic>
     </p:spTree>
     <p:extLst>
       <p:ext uri="{BB962C8B-B14F-4D97-AF65-F5344CB8AC3E}">
-        <p14:creationId xmlns:p14="http://schemas.microsoft.com/office/powerpoint/2010/main" val="1921334918"/>
+        <p14:creationId xmlns:p14="http://schemas.microsoft.com/office/powerpoint/2010/main" val="378164135"/>
       </p:ext>
     </p:extLst>
   </p:cSld>
@@ -7078,7 +7084,7 @@
           <p:cNvPr id="2" name="Title 1">
             <a:extLst>
               <a:ext uri="{FF2B5EF4-FFF2-40B4-BE49-F238E27FC236}">
-                <a16:creationId xmlns:a16="http://schemas.microsoft.com/office/drawing/2014/main" id="{58AF1BCF-EEEF-47D6-B3E0-B3D470698569}"/>
+                <a16:creationId xmlns:a16="http://schemas.microsoft.com/office/drawing/2014/main" id="{73631926-6CFB-4BF6-A370-7D7060E3F0F9}"/>
               </a:ext>
             </a:extLst>
           </p:cNvPr>
@@ -7096,7 +7102,7 @@
           <a:p>
             <a:r>
               <a:rPr lang="en-GB" dirty="0"/>
-              <a:t>Preparation</a:t>
+              <a:t>Solution - B</a:t>
             </a:r>
           </a:p>
         </p:txBody>
@@ -7106,7 +7112,7 @@
           <p:cNvPr id="3" name="Content Placeholder 2">
             <a:extLst>
               <a:ext uri="{FF2B5EF4-FFF2-40B4-BE49-F238E27FC236}">
-                <a16:creationId xmlns:a16="http://schemas.microsoft.com/office/drawing/2014/main" id="{6254212B-74FE-4411-971A-3818F029DF7A}"/>
+                <a16:creationId xmlns:a16="http://schemas.microsoft.com/office/drawing/2014/main" id="{46F284AE-A8EA-428D-8EF9-DF31DB5ECF34}"/>
               </a:ext>
             </a:extLst>
           </p:cNvPr>
@@ -7117,22 +7123,57 @@
             <p:ph idx="1"/>
           </p:nvPr>
         </p:nvSpPr>
-        <p:spPr/>
+        <p:spPr>
+          <a:xfrm>
+            <a:off x="646112" y="1768144"/>
+            <a:ext cx="3739622" cy="4195481"/>
+          </a:xfrm>
+        </p:spPr>
         <p:txBody>
           <a:bodyPr/>
           <a:lstStyle/>
           <a:p>
             <a:r>
               <a:rPr lang="en-GB" dirty="0"/>
-              <a:t>I had an idea. To practice concurrency what if I modelled the lives of 1 million gophers within go. </a:t>
-            </a:r>
-          </a:p>
-        </p:txBody>
-      </p:sp>
+              <a:t>Usage of syncing and channels </a:t>
+            </a:r>
+          </a:p>
+        </p:txBody>
+      </p:sp>
+      <p:pic>
+        <p:nvPicPr>
+          <p:cNvPr id="5" name="Picture 4">
+            <a:extLst>
+              <a:ext uri="{FF2B5EF4-FFF2-40B4-BE49-F238E27FC236}">
+                <a16:creationId xmlns:a16="http://schemas.microsoft.com/office/drawing/2014/main" id="{A01D4CB4-9F4F-416F-9514-872820342457}"/>
+              </a:ext>
+            </a:extLst>
+          </p:cNvPr>
+          <p:cNvPicPr>
+            <a:picLocks noChangeAspect="1"/>
+          </p:cNvPicPr>
+          <p:nvPr/>
+        </p:nvPicPr>
+        <p:blipFill>
+          <a:blip r:embed="rId2"/>
+          <a:stretch>
+            <a:fillRect/>
+          </a:stretch>
+        </p:blipFill>
+        <p:spPr>
+          <a:xfrm>
+            <a:off x="5147733" y="580233"/>
+            <a:ext cx="6398156" cy="5517251"/>
+          </a:xfrm>
+          <a:prstGeom prst="rect">
+            <a:avLst/>
+          </a:prstGeom>
+        </p:spPr>
+      </p:pic>
     </p:spTree>
     <p:extLst>
       <p:ext uri="{BB962C8B-B14F-4D97-AF65-F5344CB8AC3E}">
-        <p14:creationId xmlns:p14="http://schemas.microsoft.com/office/powerpoint/2010/main" val="2699988259"/>
+        <p14:creationId xmlns:p14="http://schemas.microsoft.com/office/powerpoint/2010/main" val="4211187708"/>
       </p:ext>
     </p:extLst>
   </p:cSld>
@@ -7164,7 +7205,7 @@
           <p:cNvPr id="2" name="Title 1">
             <a:extLst>
               <a:ext uri="{FF2B5EF4-FFF2-40B4-BE49-F238E27FC236}">
-                <a16:creationId xmlns:a16="http://schemas.microsoft.com/office/drawing/2014/main" id="{BF87F792-881D-45E8-AE31-8DF9ADAEFECE}"/>
+                <a16:creationId xmlns:a16="http://schemas.microsoft.com/office/drawing/2014/main" id="{C92A157F-4A2E-491A-8D9E-6ACFDE1C5839}"/>
               </a:ext>
             </a:extLst>
           </p:cNvPr>
@@ -7182,7 +7223,7 @@
           <a:p>
             <a:r>
               <a:rPr lang="en-GB" dirty="0"/>
-              <a:t>Problem 3 – Life is a bit Empty isn’t it?</a:t>
+              <a:t>Solution B - Output</a:t>
             </a:r>
           </a:p>
         </p:txBody>
@@ -7192,7 +7233,7 @@
           <p:cNvPr id="3" name="Content Placeholder 2">
             <a:extLst>
               <a:ext uri="{FF2B5EF4-FFF2-40B4-BE49-F238E27FC236}">
-                <a16:creationId xmlns:a16="http://schemas.microsoft.com/office/drawing/2014/main" id="{817514AC-09C2-45A7-9888-12674F0EB104}"/>
+                <a16:creationId xmlns:a16="http://schemas.microsoft.com/office/drawing/2014/main" id="{736AB5A2-463E-4FE0-A54C-412373F92B3E}"/>
               </a:ext>
             </a:extLst>
           </p:cNvPr>
@@ -7203,19 +7244,66 @@
             <p:ph idx="1"/>
           </p:nvPr>
         </p:nvSpPr>
-        <p:spPr/>
-        <p:txBody>
-          <a:bodyPr/>
-          <a:lstStyle/>
+        <p:spPr>
+          <a:xfrm>
+            <a:off x="644368" y="1812697"/>
+            <a:ext cx="5280555" cy="4195481"/>
+          </a:xfrm>
+        </p:spPr>
+        <p:txBody>
+          <a:bodyPr/>
+          <a:lstStyle/>
+          <a:p>
+            <a:r>
+              <a:rPr lang="en-GB" dirty="0"/>
+              <a:t>Better! </a:t>
+            </a:r>
+          </a:p>
           <a:p>
             <a:endParaRPr lang="en-GB" dirty="0"/>
           </a:p>
-        </p:txBody>
-      </p:sp>
+          <a:p>
+            <a:r>
+              <a:rPr lang="en-GB" dirty="0"/>
+              <a:t>Gophers come to life and reach the afterlife ‘simultaneously’.</a:t>
+            </a:r>
+          </a:p>
+        </p:txBody>
+      </p:sp>
+      <p:pic>
+        <p:nvPicPr>
+          <p:cNvPr id="5" name="Picture 4">
+            <a:extLst>
+              <a:ext uri="{FF2B5EF4-FFF2-40B4-BE49-F238E27FC236}">
+                <a16:creationId xmlns:a16="http://schemas.microsoft.com/office/drawing/2014/main" id="{5055CD7B-89BF-49DF-AB18-22FBD9B2289C}"/>
+              </a:ext>
+            </a:extLst>
+          </p:cNvPr>
+          <p:cNvPicPr>
+            <a:picLocks noChangeAspect="1"/>
+          </p:cNvPicPr>
+          <p:nvPr/>
+        </p:nvPicPr>
+        <p:blipFill>
+          <a:blip r:embed="rId2"/>
+          <a:stretch>
+            <a:fillRect/>
+          </a:stretch>
+        </p:blipFill>
+        <p:spPr>
+          <a:xfrm>
+            <a:off x="6525976" y="849821"/>
+            <a:ext cx="3523877" cy="5158357"/>
+          </a:xfrm>
+          <a:prstGeom prst="rect">
+            <a:avLst/>
+          </a:prstGeom>
+        </p:spPr>
+      </p:pic>
     </p:spTree>
     <p:extLst>
       <p:ext uri="{BB962C8B-B14F-4D97-AF65-F5344CB8AC3E}">
-        <p14:creationId xmlns:p14="http://schemas.microsoft.com/office/powerpoint/2010/main" val="1176287068"/>
+        <p14:creationId xmlns:p14="http://schemas.microsoft.com/office/powerpoint/2010/main" val="3475395733"/>
       </p:ext>
     </p:extLst>
   </p:cSld>
@@ -7247,7 +7335,7 @@
           <p:cNvPr id="2" name="Title 1">
             <a:extLst>
               <a:ext uri="{FF2B5EF4-FFF2-40B4-BE49-F238E27FC236}">
-                <a16:creationId xmlns:a16="http://schemas.microsoft.com/office/drawing/2014/main" id="{DDA23A98-14C6-40E0-A90C-6468725EFA2C}"/>
+                <a16:creationId xmlns:a16="http://schemas.microsoft.com/office/drawing/2014/main" id="{8EE80C47-6831-4E7C-A6B6-B5AF25EEA403}"/>
               </a:ext>
             </a:extLst>
           </p:cNvPr>
@@ -7265,7 +7353,7 @@
           <a:p>
             <a:r>
               <a:rPr lang="en-GB" dirty="0"/>
-              <a:t>Perseverance</a:t>
+              <a:t>Progress Checklist - 2</a:t>
             </a:r>
           </a:p>
         </p:txBody>
@@ -7275,7 +7363,7 @@
           <p:cNvPr id="3" name="Content Placeholder 2">
             <a:extLst>
               <a:ext uri="{FF2B5EF4-FFF2-40B4-BE49-F238E27FC236}">
-                <a16:creationId xmlns:a16="http://schemas.microsoft.com/office/drawing/2014/main" id="{B7866C6F-7AB4-4FF2-AC93-597F73926565}"/>
+                <a16:creationId xmlns:a16="http://schemas.microsoft.com/office/drawing/2014/main" id="{EFA3091F-FE6C-4CAD-95A8-1617E2A8E6C3}"/>
               </a:ext>
             </a:extLst>
           </p:cNvPr>
@@ -7286,28 +7374,104 @@
             <p:ph idx="1"/>
           </p:nvPr>
         </p:nvSpPr>
-        <p:spPr/>
+        <p:spPr>
+          <a:xfrm>
+            <a:off x="375179" y="2052917"/>
+            <a:ext cx="9226021" cy="4195481"/>
+          </a:xfrm>
+        </p:spPr>
         <p:txBody>
           <a:bodyPr/>
           <a:lstStyle/>
           <a:p>
             <a:r>
               <a:rPr lang="en-GB" dirty="0"/>
-              <a:t>Talking about your project with other developers </a:t>
-            </a:r>
+              <a:t>Watched Rob Pike’s ‘Concurrency is Not Parallelism’ </a:t>
+            </a:r>
+            <a:r>
+              <a:rPr lang="en-GB" dirty="0">
+                <a:latin typeface="Segoe MDL2 Assets" panose="050A0102010101010101" pitchFamily="18" charset="0"/>
+              </a:rPr>
+              <a:t></a:t>
+            </a:r>
+          </a:p>
+          <a:p>
+            <a:pPr lvl="1"/>
+            <a:r>
+              <a:rPr lang="en-GB" dirty="0">
+                <a:hlinkClick r:id="rId2"/>
+              </a:rPr>
+              <a:t>https://www.youtube.com/watch?v=cN_DpYBzKso&amp;feature=youtu.be</a:t>
+            </a:r>
+            <a:endParaRPr lang="en-GB" dirty="0"/>
+          </a:p>
+          <a:p>
+            <a:pPr marL="0" indent="0">
+              <a:buNone/>
+            </a:pPr>
+            <a:endParaRPr lang="en-GB" dirty="0">
+              <a:latin typeface="Segoe MDL2 Assets" panose="050A0102010101010101" pitchFamily="18" charset="0"/>
+            </a:endParaRPr>
           </a:p>
           <a:p>
             <a:r>
               <a:rPr lang="en-GB" dirty="0"/>
-              <a:t>Getting help</a:t>
-            </a:r>
+              <a:t>Re-learnt the fundamentals of Concurrency  </a:t>
+            </a:r>
+            <a:r>
+              <a:rPr lang="en-GB" dirty="0">
+                <a:latin typeface="Segoe MDL2 Assets" panose="050A0102010101010101" pitchFamily="18" charset="0"/>
+              </a:rPr>
+              <a:t></a:t>
+            </a:r>
+            <a:endParaRPr lang="en-GB" dirty="0"/>
+          </a:p>
+          <a:p>
+            <a:r>
+              <a:rPr lang="en-GB" dirty="0"/>
+              <a:t>Practiced with Structs, Methods, Goroutines, Channels and Syncing </a:t>
+            </a:r>
+            <a:r>
+              <a:rPr lang="en-GB" dirty="0">
+                <a:latin typeface="Segoe MDL2 Assets" panose="050A0102010101010101" pitchFamily="18" charset="0"/>
+              </a:rPr>
+              <a:t></a:t>
+            </a:r>
+            <a:endParaRPr lang="en-GB" dirty="0"/>
+          </a:p>
+          <a:p>
+            <a:r>
+              <a:rPr lang="en-GB" dirty="0"/>
+              <a:t>Usage of Packages beyond ‘</a:t>
+            </a:r>
+            <a:r>
+              <a:rPr lang="en-GB" dirty="0" err="1"/>
+              <a:t>fmt</a:t>
+            </a:r>
+            <a:r>
+              <a:rPr lang="en-GB" dirty="0"/>
+              <a:t>’</a:t>
+            </a:r>
+            <a:r>
+              <a:rPr lang="en-GB" dirty="0">
+                <a:latin typeface="Segoe MDL2 Assets" panose="050A0102010101010101" pitchFamily="18" charset="0"/>
+              </a:rPr>
+              <a:t> </a:t>
+            </a:r>
+            <a:endParaRPr lang="en-GB" dirty="0"/>
+          </a:p>
+          <a:p>
+            <a:endParaRPr lang="en-GB" dirty="0"/>
+          </a:p>
+          <a:p>
+            <a:endParaRPr lang="en-GB" dirty="0"/>
           </a:p>
         </p:txBody>
       </p:sp>
     </p:spTree>
     <p:extLst>
       <p:ext uri="{BB962C8B-B14F-4D97-AF65-F5344CB8AC3E}">
-        <p14:creationId xmlns:p14="http://schemas.microsoft.com/office/powerpoint/2010/main" val="847199732"/>
+        <p14:creationId xmlns:p14="http://schemas.microsoft.com/office/powerpoint/2010/main" val="1921334918"/>
       </p:ext>
     </p:extLst>
   </p:cSld>
@@ -7339,7 +7503,7 @@
           <p:cNvPr id="2" name="Title 1">
             <a:extLst>
               <a:ext uri="{FF2B5EF4-FFF2-40B4-BE49-F238E27FC236}">
-                <a16:creationId xmlns:a16="http://schemas.microsoft.com/office/drawing/2014/main" id="{CFF32C6C-3D00-4977-9425-46509C1A3129}"/>
+                <a16:creationId xmlns:a16="http://schemas.microsoft.com/office/drawing/2014/main" id="{BF87F792-881D-45E8-AE31-8DF9ADAEFECE}"/>
               </a:ext>
             </a:extLst>
           </p:cNvPr>
@@ -7357,7 +7521,7 @@
           <a:p>
             <a:r>
               <a:rPr lang="en-GB" dirty="0"/>
-              <a:t>Go – Starter Pack</a:t>
+              <a:t>Problem 3 – Life is a bit Empty isn’t it?</a:t>
             </a:r>
           </a:p>
         </p:txBody>
@@ -7367,7 +7531,7 @@
           <p:cNvPr id="3" name="Content Placeholder 2">
             <a:extLst>
               <a:ext uri="{FF2B5EF4-FFF2-40B4-BE49-F238E27FC236}">
-                <a16:creationId xmlns:a16="http://schemas.microsoft.com/office/drawing/2014/main" id="{3B81F4FB-26EB-4DA4-9507-E147BFC741B8}"/>
+                <a16:creationId xmlns:a16="http://schemas.microsoft.com/office/drawing/2014/main" id="{817514AC-09C2-45A7-9888-12674F0EB104}"/>
               </a:ext>
             </a:extLst>
           </p:cNvPr>
@@ -7385,24 +7549,42 @@
           <a:p>
             <a:r>
               <a:rPr lang="en-GB" dirty="0"/>
-              <a:t>Installing GO. </a:t>
-            </a:r>
+              <a:t>Gophers needed things to do. </a:t>
+            </a:r>
+          </a:p>
+          <a:p>
+            <a:endParaRPr lang="en-GB" dirty="0"/>
           </a:p>
           <a:p>
             <a:r>
               <a:rPr lang="en-GB" dirty="0"/>
-              <a:t>Learning the syntax</a:t>
+              <a:t>They need space to wonder around and frolic freely!</a:t>
             </a:r>
           </a:p>
           <a:p>
             <a:endParaRPr lang="en-GB" dirty="0"/>
+          </a:p>
+          <a:p>
+            <a:r>
+              <a:rPr lang="en-GB" dirty="0"/>
+              <a:t>They need food to stop from going hungry. </a:t>
+            </a:r>
+          </a:p>
+          <a:p>
+            <a:endParaRPr lang="en-GB" dirty="0"/>
+          </a:p>
+          <a:p>
+            <a:r>
+              <a:rPr lang="en-GB" dirty="0"/>
+              <a:t>They need companionship?</a:t>
+            </a:r>
           </a:p>
         </p:txBody>
       </p:sp>
     </p:spTree>
     <p:extLst>
       <p:ext uri="{BB962C8B-B14F-4D97-AF65-F5344CB8AC3E}">
-        <p14:creationId xmlns:p14="http://schemas.microsoft.com/office/powerpoint/2010/main" val="1566399315"/>
+        <p14:creationId xmlns:p14="http://schemas.microsoft.com/office/powerpoint/2010/main" val="1176287068"/>
       </p:ext>
     </p:extLst>
   </p:cSld>
@@ -7434,7 +7616,7 @@
           <p:cNvPr id="2" name="Title 1">
             <a:extLst>
               <a:ext uri="{FF2B5EF4-FFF2-40B4-BE49-F238E27FC236}">
-                <a16:creationId xmlns:a16="http://schemas.microsoft.com/office/drawing/2014/main" id="{F791C732-68FC-4DBF-A925-B9A44335C54F}"/>
+                <a16:creationId xmlns:a16="http://schemas.microsoft.com/office/drawing/2014/main" id="{03C8D16E-7E18-4405-A51A-FB0FEAC886AF}"/>
               </a:ext>
             </a:extLst>
           </p:cNvPr>
@@ -7450,10 +7632,7 @@
           <a:bodyPr/>
           <a:lstStyle/>
           <a:p>
-            <a:r>
-              <a:rPr lang="en-GB" dirty="0"/>
-              <a:t>Finding A Catalyst</a:t>
-            </a:r>
+            <a:endParaRPr lang="en-GB" dirty="0"/>
           </a:p>
         </p:txBody>
       </p:sp>
@@ -7462,7 +7641,7 @@
           <p:cNvPr id="3" name="Content Placeholder 2">
             <a:extLst>
               <a:ext uri="{FF2B5EF4-FFF2-40B4-BE49-F238E27FC236}">
-                <a16:creationId xmlns:a16="http://schemas.microsoft.com/office/drawing/2014/main" id="{C206744A-0D9B-4231-BD87-CF25D90A8004}"/>
+                <a16:creationId xmlns:a16="http://schemas.microsoft.com/office/drawing/2014/main" id="{AFADAECE-6040-4858-8EA5-603B2078386D}"/>
               </a:ext>
             </a:extLst>
           </p:cNvPr>
@@ -7485,7 +7664,7 @@
     </p:spTree>
     <p:extLst>
       <p:ext uri="{BB962C8B-B14F-4D97-AF65-F5344CB8AC3E}">
-        <p14:creationId xmlns:p14="http://schemas.microsoft.com/office/powerpoint/2010/main" val="4016827040"/>
+        <p14:creationId xmlns:p14="http://schemas.microsoft.com/office/powerpoint/2010/main" val="3807005577"/>
       </p:ext>
     </p:extLst>
   </p:cSld>
@@ -7517,7 +7696,7 @@
           <p:cNvPr id="2" name="Title 1">
             <a:extLst>
               <a:ext uri="{FF2B5EF4-FFF2-40B4-BE49-F238E27FC236}">
-                <a16:creationId xmlns:a16="http://schemas.microsoft.com/office/drawing/2014/main" id="{32F06B3C-EA2D-46B1-AB79-08EFA8CCC0C1}"/>
+                <a16:creationId xmlns:a16="http://schemas.microsoft.com/office/drawing/2014/main" id="{DDA23A98-14C6-40E0-A90C-6468725EFA2C}"/>
               </a:ext>
             </a:extLst>
           </p:cNvPr>
@@ -7535,7 +7714,7 @@
           <a:p>
             <a:r>
               <a:rPr lang="en-GB" dirty="0"/>
-              <a:t>Managing Scope and Completing Projects</a:t>
+              <a:t>Perseverance</a:t>
             </a:r>
           </a:p>
         </p:txBody>
@@ -7545,7 +7724,7 @@
           <p:cNvPr id="3" name="Content Placeholder 2">
             <a:extLst>
               <a:ext uri="{FF2B5EF4-FFF2-40B4-BE49-F238E27FC236}">
-                <a16:creationId xmlns:a16="http://schemas.microsoft.com/office/drawing/2014/main" id="{D2524174-1A6E-43AD-AFB4-E3F8B9B5D53A}"/>
+                <a16:creationId xmlns:a16="http://schemas.microsoft.com/office/drawing/2014/main" id="{B7866C6F-7AB4-4FF2-AC93-597F73926565}"/>
               </a:ext>
             </a:extLst>
           </p:cNvPr>
@@ -7561,14 +7740,23 @@
           <a:bodyPr/>
           <a:lstStyle/>
           <a:p>
-            <a:endParaRPr lang="en-GB"/>
+            <a:r>
+              <a:rPr lang="en-GB" dirty="0"/>
+              <a:t>Talking about your project with other developers </a:t>
+            </a:r>
+          </a:p>
+          <a:p>
+            <a:r>
+              <a:rPr lang="en-GB" dirty="0"/>
+              <a:t>Getting help</a:t>
+            </a:r>
           </a:p>
         </p:txBody>
       </p:sp>
     </p:spTree>
     <p:extLst>
       <p:ext uri="{BB962C8B-B14F-4D97-AF65-F5344CB8AC3E}">
-        <p14:creationId xmlns:p14="http://schemas.microsoft.com/office/powerpoint/2010/main" val="1162966501"/>
+        <p14:creationId xmlns:p14="http://schemas.microsoft.com/office/powerpoint/2010/main" val="847199732"/>
       </p:ext>
     </p:extLst>
   </p:cSld>
@@ -7600,7 +7788,7 @@
           <p:cNvPr id="2" name="Title 1">
             <a:extLst>
               <a:ext uri="{FF2B5EF4-FFF2-40B4-BE49-F238E27FC236}">
-                <a16:creationId xmlns:a16="http://schemas.microsoft.com/office/drawing/2014/main" id="{F106CE47-2D88-4386-9645-6FF2058FA701}"/>
+                <a16:creationId xmlns:a16="http://schemas.microsoft.com/office/drawing/2014/main" id="{CFF32C6C-3D00-4977-9425-46509C1A3129}"/>
               </a:ext>
             </a:extLst>
           </p:cNvPr>
@@ -7618,7 +7806,7 @@
           <a:p>
             <a:r>
               <a:rPr lang="en-GB" dirty="0"/>
-              <a:t>Getting past the feeling of pointlessness</a:t>
+              <a:t>Go – Starter Pack</a:t>
             </a:r>
           </a:p>
         </p:txBody>
@@ -7628,7 +7816,7 @@
           <p:cNvPr id="3" name="Content Placeholder 2">
             <a:extLst>
               <a:ext uri="{FF2B5EF4-FFF2-40B4-BE49-F238E27FC236}">
-                <a16:creationId xmlns:a16="http://schemas.microsoft.com/office/drawing/2014/main" id="{3E7E5D08-3BD9-4083-ABF9-3C1E46633F36}"/>
+                <a16:creationId xmlns:a16="http://schemas.microsoft.com/office/drawing/2014/main" id="{3B81F4FB-26EB-4DA4-9507-E147BFC741B8}"/>
               </a:ext>
             </a:extLst>
           </p:cNvPr>
@@ -7646,25 +7834,16 @@
           <a:p>
             <a:r>
               <a:rPr lang="en-GB" dirty="0"/>
-              <a:t>Finding a Catalyst, to improve motivation</a:t>
-            </a:r>
-          </a:p>
-          <a:p>
-            <a:pPr lvl="1"/>
+              <a:t>Installing GO. </a:t>
+            </a:r>
+          </a:p>
+          <a:p>
             <a:r>
               <a:rPr lang="en-GB" dirty="0"/>
-              <a:t>Discussing your project with peers</a:t>
-            </a:r>
-          </a:p>
-          <a:p>
-            <a:pPr lvl="1"/>
-            <a:r>
-              <a:rPr lang="en-GB" dirty="0"/>
-              <a:t>Creating an actual deadline</a:t>
-            </a:r>
-          </a:p>
-          <a:p>
-            <a:pPr lvl="1"/>
+              <a:t>Learning the syntax</a:t>
+            </a:r>
+          </a:p>
+          <a:p>
             <a:endParaRPr lang="en-GB" dirty="0"/>
           </a:p>
         </p:txBody>
@@ -7672,7 +7851,7 @@
     </p:spTree>
     <p:extLst>
       <p:ext uri="{BB962C8B-B14F-4D97-AF65-F5344CB8AC3E}">
-        <p14:creationId xmlns:p14="http://schemas.microsoft.com/office/powerpoint/2010/main" val="1961839492"/>
+        <p14:creationId xmlns:p14="http://schemas.microsoft.com/office/powerpoint/2010/main" val="1566399315"/>
       </p:ext>
     </p:extLst>
   </p:cSld>
@@ -7787,7 +7966,7 @@
           <p:cNvPr id="2" name="Title 1">
             <a:extLst>
               <a:ext uri="{FF2B5EF4-FFF2-40B4-BE49-F238E27FC236}">
-                <a16:creationId xmlns:a16="http://schemas.microsoft.com/office/drawing/2014/main" id="{8665D156-403C-4612-AA65-B49BA41EDF64}"/>
+                <a16:creationId xmlns:a16="http://schemas.microsoft.com/office/drawing/2014/main" id="{F791C732-68FC-4DBF-A925-B9A44335C54F}"/>
               </a:ext>
             </a:extLst>
           </p:cNvPr>
@@ -7805,7 +7984,7 @@
           <a:p>
             <a:r>
               <a:rPr lang="en-GB" dirty="0"/>
-              <a:t>Insert Here, Example of 5 gophers one alive, 4 dead </a:t>
+              <a:t>Finding A Catalyst</a:t>
             </a:r>
           </a:p>
         </p:txBody>
@@ -7815,7 +7994,7 @@
           <p:cNvPr id="3" name="Content Placeholder 2">
             <a:extLst>
               <a:ext uri="{FF2B5EF4-FFF2-40B4-BE49-F238E27FC236}">
-                <a16:creationId xmlns:a16="http://schemas.microsoft.com/office/drawing/2014/main" id="{8716B298-CF10-4866-85F6-D856E1963894}"/>
+                <a16:creationId xmlns:a16="http://schemas.microsoft.com/office/drawing/2014/main" id="{C206744A-0D9B-4231-BD87-CF25D90A8004}"/>
               </a:ext>
             </a:extLst>
           </p:cNvPr>
@@ -7838,7 +8017,7 @@
     </p:spTree>
     <p:extLst>
       <p:ext uri="{BB962C8B-B14F-4D97-AF65-F5344CB8AC3E}">
-        <p14:creationId xmlns:p14="http://schemas.microsoft.com/office/powerpoint/2010/main" val="3790213746"/>
+        <p14:creationId xmlns:p14="http://schemas.microsoft.com/office/powerpoint/2010/main" val="4016827040"/>
       </p:ext>
     </p:extLst>
   </p:cSld>
@@ -7870,7 +8049,7 @@
           <p:cNvPr id="2" name="Title 1">
             <a:extLst>
               <a:ext uri="{FF2B5EF4-FFF2-40B4-BE49-F238E27FC236}">
-                <a16:creationId xmlns:a16="http://schemas.microsoft.com/office/drawing/2014/main" id="{B88F905B-DC9A-4E15-887A-0D816B2DA849}"/>
+                <a16:creationId xmlns:a16="http://schemas.microsoft.com/office/drawing/2014/main" id="{32F06B3C-EA2D-46B1-AB79-08EFA8CCC0C1}"/>
               </a:ext>
             </a:extLst>
           </p:cNvPr>
@@ -7888,7 +8067,7 @@
           <a:p>
             <a:r>
               <a:rPr lang="en-GB" dirty="0"/>
-              <a:t>Checklist</a:t>
+              <a:t>Managing Scope and Completing Projects</a:t>
             </a:r>
           </a:p>
         </p:txBody>
@@ -7898,7 +8077,7 @@
           <p:cNvPr id="3" name="Content Placeholder 2">
             <a:extLst>
               <a:ext uri="{FF2B5EF4-FFF2-40B4-BE49-F238E27FC236}">
-                <a16:creationId xmlns:a16="http://schemas.microsoft.com/office/drawing/2014/main" id="{14229407-2ED8-43A8-819B-30DDEB3D38EC}"/>
+                <a16:creationId xmlns:a16="http://schemas.microsoft.com/office/drawing/2014/main" id="{D2524174-1A6E-43AD-AFB4-E3F8B9B5D53A}"/>
               </a:ext>
             </a:extLst>
           </p:cNvPr>
@@ -7914,26 +8093,14 @@
           <a:bodyPr/>
           <a:lstStyle/>
           <a:p>
-            <a:r>
-              <a:rPr lang="en-GB" dirty="0"/>
-              <a:t>Concurrency is not parallelism </a:t>
-            </a:r>
-            <a:r>
-              <a:rPr lang="en-GB" dirty="0">
-                <a:latin typeface="Segoe MDL2 Assets" panose="050A0102010101010101" pitchFamily="18" charset="0"/>
-              </a:rPr>
-              <a:t> </a:t>
-            </a:r>
-          </a:p>
-          <a:p>
-            <a:endParaRPr lang="en-GB" dirty="0"/>
+            <a:endParaRPr lang="en-GB"/>
           </a:p>
         </p:txBody>
       </p:sp>
     </p:spTree>
     <p:extLst>
       <p:ext uri="{BB962C8B-B14F-4D97-AF65-F5344CB8AC3E}">
-        <p14:creationId xmlns:p14="http://schemas.microsoft.com/office/powerpoint/2010/main" val="3193971414"/>
+        <p14:creationId xmlns:p14="http://schemas.microsoft.com/office/powerpoint/2010/main" val="1162966501"/>
       </p:ext>
     </p:extLst>
   </p:cSld>
@@ -7965,6 +8132,193 @@
           <p:cNvPr id="2" name="Title 1">
             <a:extLst>
               <a:ext uri="{FF2B5EF4-FFF2-40B4-BE49-F238E27FC236}">
+                <a16:creationId xmlns:a16="http://schemas.microsoft.com/office/drawing/2014/main" id="{F106CE47-2D88-4386-9645-6FF2058FA701}"/>
+              </a:ext>
+            </a:extLst>
+          </p:cNvPr>
+          <p:cNvSpPr>
+            <a:spLocks noGrp="1"/>
+          </p:cNvSpPr>
+          <p:nvPr>
+            <p:ph type="title"/>
+          </p:nvPr>
+        </p:nvSpPr>
+        <p:spPr/>
+        <p:txBody>
+          <a:bodyPr/>
+          <a:lstStyle/>
+          <a:p>
+            <a:r>
+              <a:rPr lang="en-GB" dirty="0"/>
+              <a:t>Getting past the feeling of pointlessness</a:t>
+            </a:r>
+          </a:p>
+        </p:txBody>
+      </p:sp>
+      <p:sp>
+        <p:nvSpPr>
+          <p:cNvPr id="3" name="Content Placeholder 2">
+            <a:extLst>
+              <a:ext uri="{FF2B5EF4-FFF2-40B4-BE49-F238E27FC236}">
+                <a16:creationId xmlns:a16="http://schemas.microsoft.com/office/drawing/2014/main" id="{3E7E5D08-3BD9-4083-ABF9-3C1E46633F36}"/>
+              </a:ext>
+            </a:extLst>
+          </p:cNvPr>
+          <p:cNvSpPr>
+            <a:spLocks noGrp="1"/>
+          </p:cNvSpPr>
+          <p:nvPr>
+            <p:ph idx="1"/>
+          </p:nvPr>
+        </p:nvSpPr>
+        <p:spPr/>
+        <p:txBody>
+          <a:bodyPr/>
+          <a:lstStyle/>
+          <a:p>
+            <a:r>
+              <a:rPr lang="en-GB" dirty="0"/>
+              <a:t>Finding a Catalyst, to improve motivation</a:t>
+            </a:r>
+          </a:p>
+          <a:p>
+            <a:pPr lvl="1"/>
+            <a:r>
+              <a:rPr lang="en-GB" dirty="0"/>
+              <a:t>Discussing your project with peers</a:t>
+            </a:r>
+          </a:p>
+          <a:p>
+            <a:pPr lvl="1"/>
+            <a:r>
+              <a:rPr lang="en-GB" dirty="0"/>
+              <a:t>Creating an actual deadline</a:t>
+            </a:r>
+          </a:p>
+          <a:p>
+            <a:pPr lvl="1"/>
+            <a:endParaRPr lang="en-GB" dirty="0"/>
+          </a:p>
+        </p:txBody>
+      </p:sp>
+    </p:spTree>
+    <p:extLst>
+      <p:ext uri="{BB962C8B-B14F-4D97-AF65-F5344CB8AC3E}">
+        <p14:creationId xmlns:p14="http://schemas.microsoft.com/office/powerpoint/2010/main" val="1961839492"/>
+      </p:ext>
+    </p:extLst>
+  </p:cSld>
+  <p:clrMapOvr>
+    <a:masterClrMapping/>
+  </p:clrMapOvr>
+</p:sld>
+</file>
+
+<file path=ppt/slides/slide23.xml><?xml version="1.0" encoding="utf-8"?>
+<p:sld xmlns:a="http://schemas.openxmlformats.org/drawingml/2006/main" xmlns:r="http://schemas.openxmlformats.org/officeDocument/2006/relationships" xmlns:p="http://schemas.openxmlformats.org/presentationml/2006/main">
+  <p:cSld>
+    <p:spTree>
+      <p:nvGrpSpPr>
+        <p:cNvPr id="1" name=""/>
+        <p:cNvGrpSpPr/>
+        <p:nvPr/>
+      </p:nvGrpSpPr>
+      <p:grpSpPr>
+        <a:xfrm>
+          <a:off x="0" y="0"/>
+          <a:ext cx="0" cy="0"/>
+          <a:chOff x="0" y="0"/>
+          <a:chExt cx="0" cy="0"/>
+        </a:xfrm>
+      </p:grpSpPr>
+      <p:sp>
+        <p:nvSpPr>
+          <p:cNvPr id="2" name="Title 1">
+            <a:extLst>
+              <a:ext uri="{FF2B5EF4-FFF2-40B4-BE49-F238E27FC236}">
+                <a16:creationId xmlns:a16="http://schemas.microsoft.com/office/drawing/2014/main" id="{8665D156-403C-4612-AA65-B49BA41EDF64}"/>
+              </a:ext>
+            </a:extLst>
+          </p:cNvPr>
+          <p:cNvSpPr>
+            <a:spLocks noGrp="1"/>
+          </p:cNvSpPr>
+          <p:nvPr>
+            <p:ph type="title"/>
+          </p:nvPr>
+        </p:nvSpPr>
+        <p:spPr/>
+        <p:txBody>
+          <a:bodyPr/>
+          <a:lstStyle/>
+          <a:p>
+            <a:r>
+              <a:rPr lang="en-GB" dirty="0"/>
+              <a:t>Insert Here, Example of 5 gophers one alive, 4 dead </a:t>
+            </a:r>
+          </a:p>
+        </p:txBody>
+      </p:sp>
+      <p:sp>
+        <p:nvSpPr>
+          <p:cNvPr id="3" name="Content Placeholder 2">
+            <a:extLst>
+              <a:ext uri="{FF2B5EF4-FFF2-40B4-BE49-F238E27FC236}">
+                <a16:creationId xmlns:a16="http://schemas.microsoft.com/office/drawing/2014/main" id="{8716B298-CF10-4866-85F6-D856E1963894}"/>
+              </a:ext>
+            </a:extLst>
+          </p:cNvPr>
+          <p:cNvSpPr>
+            <a:spLocks noGrp="1"/>
+          </p:cNvSpPr>
+          <p:nvPr>
+            <p:ph idx="1"/>
+          </p:nvPr>
+        </p:nvSpPr>
+        <p:spPr/>
+        <p:txBody>
+          <a:bodyPr/>
+          <a:lstStyle/>
+          <a:p>
+            <a:endParaRPr lang="en-GB"/>
+          </a:p>
+        </p:txBody>
+      </p:sp>
+    </p:spTree>
+    <p:extLst>
+      <p:ext uri="{BB962C8B-B14F-4D97-AF65-F5344CB8AC3E}">
+        <p14:creationId xmlns:p14="http://schemas.microsoft.com/office/powerpoint/2010/main" val="3790213746"/>
+      </p:ext>
+    </p:extLst>
+  </p:cSld>
+  <p:clrMapOvr>
+    <a:masterClrMapping/>
+  </p:clrMapOvr>
+</p:sld>
+</file>
+
+<file path=ppt/slides/slide24.xml><?xml version="1.0" encoding="utf-8"?>
+<p:sld xmlns:a="http://schemas.openxmlformats.org/drawingml/2006/main" xmlns:r="http://schemas.openxmlformats.org/officeDocument/2006/relationships" xmlns:p="http://schemas.openxmlformats.org/presentationml/2006/main">
+  <p:cSld>
+    <p:spTree>
+      <p:nvGrpSpPr>
+        <p:cNvPr id="1" name=""/>
+        <p:cNvGrpSpPr/>
+        <p:nvPr/>
+      </p:nvGrpSpPr>
+      <p:grpSpPr>
+        <a:xfrm>
+          <a:off x="0" y="0"/>
+          <a:ext cx="0" cy="0"/>
+          <a:chOff x="0" y="0"/>
+          <a:chExt cx="0" cy="0"/>
+        </a:xfrm>
+      </p:grpSpPr>
+      <p:sp>
+        <p:nvSpPr>
+          <p:cNvPr id="2" name="Title 1">
+            <a:extLst>
+              <a:ext uri="{FF2B5EF4-FFF2-40B4-BE49-F238E27FC236}">
                 <a16:creationId xmlns:a16="http://schemas.microsoft.com/office/drawing/2014/main" id="{B88F905B-DC9A-4E15-887A-0D816B2DA849}"/>
               </a:ext>
             </a:extLst>
@@ -7983,7 +8337,7 @@
           <a:p>
             <a:r>
               <a:rPr lang="en-GB" dirty="0"/>
-              <a:t>Checklist of Mistakes</a:t>
+              <a:t>Checklist</a:t>
             </a:r>
           </a:p>
         </p:txBody>
@@ -8021,6 +8375,101 @@
             </a:r>
           </a:p>
           <a:p>
+            <a:endParaRPr lang="en-GB" dirty="0"/>
+          </a:p>
+        </p:txBody>
+      </p:sp>
+    </p:spTree>
+    <p:extLst>
+      <p:ext uri="{BB962C8B-B14F-4D97-AF65-F5344CB8AC3E}">
+        <p14:creationId xmlns:p14="http://schemas.microsoft.com/office/powerpoint/2010/main" val="3193971414"/>
+      </p:ext>
+    </p:extLst>
+  </p:cSld>
+  <p:clrMapOvr>
+    <a:masterClrMapping/>
+  </p:clrMapOvr>
+</p:sld>
+</file>
+
+<file path=ppt/slides/slide25.xml><?xml version="1.0" encoding="utf-8"?>
+<p:sld xmlns:a="http://schemas.openxmlformats.org/drawingml/2006/main" xmlns:r="http://schemas.openxmlformats.org/officeDocument/2006/relationships" xmlns:p="http://schemas.openxmlformats.org/presentationml/2006/main">
+  <p:cSld>
+    <p:spTree>
+      <p:nvGrpSpPr>
+        <p:cNvPr id="1" name=""/>
+        <p:cNvGrpSpPr/>
+        <p:nvPr/>
+      </p:nvGrpSpPr>
+      <p:grpSpPr>
+        <a:xfrm>
+          <a:off x="0" y="0"/>
+          <a:ext cx="0" cy="0"/>
+          <a:chOff x="0" y="0"/>
+          <a:chExt cx="0" cy="0"/>
+        </a:xfrm>
+      </p:grpSpPr>
+      <p:sp>
+        <p:nvSpPr>
+          <p:cNvPr id="2" name="Title 1">
+            <a:extLst>
+              <a:ext uri="{FF2B5EF4-FFF2-40B4-BE49-F238E27FC236}">
+                <a16:creationId xmlns:a16="http://schemas.microsoft.com/office/drawing/2014/main" id="{B88F905B-DC9A-4E15-887A-0D816B2DA849}"/>
+              </a:ext>
+            </a:extLst>
+          </p:cNvPr>
+          <p:cNvSpPr>
+            <a:spLocks noGrp="1"/>
+          </p:cNvSpPr>
+          <p:nvPr>
+            <p:ph type="title"/>
+          </p:nvPr>
+        </p:nvSpPr>
+        <p:spPr/>
+        <p:txBody>
+          <a:bodyPr/>
+          <a:lstStyle/>
+          <a:p>
+            <a:r>
+              <a:rPr lang="en-GB" dirty="0"/>
+              <a:t>Checklist of Mistakes</a:t>
+            </a:r>
+          </a:p>
+        </p:txBody>
+      </p:sp>
+      <p:sp>
+        <p:nvSpPr>
+          <p:cNvPr id="3" name="Content Placeholder 2">
+            <a:extLst>
+              <a:ext uri="{FF2B5EF4-FFF2-40B4-BE49-F238E27FC236}">
+                <a16:creationId xmlns:a16="http://schemas.microsoft.com/office/drawing/2014/main" id="{14229407-2ED8-43A8-819B-30DDEB3D38EC}"/>
+              </a:ext>
+            </a:extLst>
+          </p:cNvPr>
+          <p:cNvSpPr>
+            <a:spLocks noGrp="1"/>
+          </p:cNvSpPr>
+          <p:nvPr>
+            <p:ph idx="1"/>
+          </p:nvPr>
+        </p:nvSpPr>
+        <p:spPr/>
+        <p:txBody>
+          <a:bodyPr/>
+          <a:lstStyle/>
+          <a:p>
+            <a:r>
+              <a:rPr lang="en-GB" dirty="0"/>
+              <a:t>Concurrency is not parallelism </a:t>
+            </a:r>
+            <a:r>
+              <a:rPr lang="en-GB" dirty="0">
+                <a:latin typeface="Segoe MDL2 Assets" panose="050A0102010101010101" pitchFamily="18" charset="0"/>
+              </a:rPr>
+              <a:t> </a:t>
+            </a:r>
+          </a:p>
+          <a:p>
             <a:r>
               <a:rPr lang="en-GB" dirty="0"/>
               <a:t>You can read from maps concurrently, but you can not write to maps.</a:t>
@@ -8060,6 +8509,122 @@
     <p:extLst>
       <p:ext uri="{BB962C8B-B14F-4D97-AF65-F5344CB8AC3E}">
         <p14:creationId xmlns:p14="http://schemas.microsoft.com/office/powerpoint/2010/main" val="1348224757"/>
+      </p:ext>
+    </p:extLst>
+  </p:cSld>
+  <p:clrMapOvr>
+    <a:masterClrMapping/>
+  </p:clrMapOvr>
+</p:sld>
+</file>
+
+<file path=ppt/slides/slide26.xml><?xml version="1.0" encoding="utf-8"?>
+<p:sld xmlns:a="http://schemas.openxmlformats.org/drawingml/2006/main" xmlns:r="http://schemas.openxmlformats.org/officeDocument/2006/relationships" xmlns:p="http://schemas.openxmlformats.org/presentationml/2006/main">
+  <p:cSld>
+    <p:spTree>
+      <p:nvGrpSpPr>
+        <p:cNvPr id="1" name=""/>
+        <p:cNvGrpSpPr/>
+        <p:nvPr/>
+      </p:nvGrpSpPr>
+      <p:grpSpPr>
+        <a:xfrm>
+          <a:off x="0" y="0"/>
+          <a:ext cx="0" cy="0"/>
+          <a:chOff x="0" y="0"/>
+          <a:chExt cx="0" cy="0"/>
+        </a:xfrm>
+      </p:grpSpPr>
+      <p:sp>
+        <p:nvSpPr>
+          <p:cNvPr id="2" name="Title 1">
+            <a:extLst>
+              <a:ext uri="{FF2B5EF4-FFF2-40B4-BE49-F238E27FC236}">
+                <a16:creationId xmlns:a16="http://schemas.microsoft.com/office/drawing/2014/main" id="{8CEAC96E-108C-4D0F-8090-857DB6659B57}"/>
+              </a:ext>
+            </a:extLst>
+          </p:cNvPr>
+          <p:cNvSpPr>
+            <a:spLocks noGrp="1"/>
+          </p:cNvSpPr>
+          <p:nvPr>
+            <p:ph type="title"/>
+          </p:nvPr>
+        </p:nvSpPr>
+        <p:spPr/>
+        <p:txBody>
+          <a:bodyPr/>
+          <a:lstStyle/>
+          <a:p>
+            <a:r>
+              <a:rPr lang="en-GB" dirty="0"/>
+              <a:t>Solution: Modelling the lives of </a:t>
+            </a:r>
+            <a:br>
+              <a:rPr lang="en-GB" dirty="0"/>
+            </a:br>
+            <a:r>
+              <a:rPr lang="en-GB" dirty="0"/>
+              <a:t>1 million Gophers</a:t>
+            </a:r>
+          </a:p>
+        </p:txBody>
+      </p:sp>
+      <p:sp>
+        <p:nvSpPr>
+          <p:cNvPr id="3" name="Content Placeholder 2">
+            <a:extLst>
+              <a:ext uri="{FF2B5EF4-FFF2-40B4-BE49-F238E27FC236}">
+                <a16:creationId xmlns:a16="http://schemas.microsoft.com/office/drawing/2014/main" id="{8AE99B8D-47E8-4045-8955-7E893F2A54A8}"/>
+              </a:ext>
+            </a:extLst>
+          </p:cNvPr>
+          <p:cNvSpPr>
+            <a:spLocks noGrp="1"/>
+          </p:cNvSpPr>
+          <p:nvPr>
+            <p:ph idx="1"/>
+          </p:nvPr>
+        </p:nvSpPr>
+        <p:spPr/>
+        <p:txBody>
+          <a:bodyPr/>
+          <a:lstStyle/>
+          <a:p>
+            <a:r>
+              <a:rPr lang="en-GB" dirty="0"/>
+              <a:t>Create a PowerPoint presentation talking about the cyclical nature of Learning how to Program. </a:t>
+            </a:r>
+          </a:p>
+          <a:p>
+            <a:endParaRPr lang="en-GB" dirty="0"/>
+          </a:p>
+          <a:p>
+            <a:r>
+              <a:rPr lang="en-GB" dirty="0"/>
+              <a:t>For Newcomers</a:t>
+            </a:r>
+          </a:p>
+          <a:p>
+            <a:endParaRPr lang="en-GB" dirty="0"/>
+          </a:p>
+          <a:p>
+            <a:r>
+              <a:rPr lang="en-GB" dirty="0"/>
+              <a:t>Talk about how by making a presentation those who aren’t Gopher or are new </a:t>
+            </a:r>
+            <a:r>
+              <a:rPr lang="en-GB"/>
+              <a:t>Gophers might see the first steps </a:t>
+            </a:r>
+            <a:endParaRPr lang="en-GB" dirty="0"/>
+          </a:p>
+        </p:txBody>
+      </p:sp>
+    </p:spTree>
+    <p:extLst>
+      <p:ext uri="{BB962C8B-B14F-4D97-AF65-F5344CB8AC3E}">
+        <p14:creationId xmlns:p14="http://schemas.microsoft.com/office/powerpoint/2010/main" val="18358553"/>
       </p:ext>
     </p:extLst>
   </p:cSld>
@@ -8686,8 +9251,17 @@
           <a:p>
             <a:r>
               <a:rPr lang="en-GB" dirty="0"/>
-              <a:t>Gained a basic understanding of the structure of a .go file</a:t>
-            </a:r>
+              <a:t>Gained a basic understanding of the structure of a .go file </a:t>
+            </a:r>
+            <a:r>
+              <a:rPr lang="en-GB" dirty="0">
+                <a:latin typeface="Segoe MDL2 Assets" panose="050A0102010101010101" pitchFamily="18" charset="0"/>
+              </a:rPr>
+              <a:t></a:t>
+            </a:r>
+          </a:p>
+          <a:p>
+            <a:endParaRPr lang="en-GB" dirty="0"/>
           </a:p>
         </p:txBody>
       </p:sp>
@@ -8809,38 +9383,57 @@
           </a:p>
         </p:txBody>
       </p:sp>
-      <p:pic>
-        <p:nvPicPr>
-          <p:cNvPr id="4" name="Content Placeholder 3">
+      <p:sp>
+        <p:nvSpPr>
+          <p:cNvPr id="6" name="Content Placeholder 5">
             <a:extLst>
               <a:ext uri="{FF2B5EF4-FFF2-40B4-BE49-F238E27FC236}">
-                <a16:creationId xmlns:a16="http://schemas.microsoft.com/office/drawing/2014/main" id="{4B629667-798F-47A1-933D-3FC909E53B13}"/>
+                <a16:creationId xmlns:a16="http://schemas.microsoft.com/office/drawing/2014/main" id="{6C6DAA7A-7DBC-429A-8D23-BF4DB635F138}"/>
               </a:ext>
             </a:extLst>
           </p:cNvPr>
-          <p:cNvPicPr>
-            <a:picLocks noGrp="1" noChangeAspect="1"/>
-          </p:cNvPicPr>
+          <p:cNvSpPr>
+            <a:spLocks noGrp="1"/>
+          </p:cNvSpPr>
           <p:nvPr>
             <p:ph idx="1"/>
           </p:nvPr>
-        </p:nvPicPr>
-        <p:blipFill>
-          <a:blip r:embed="rId2"/>
-          <a:stretch>
-            <a:fillRect/>
-          </a:stretch>
-        </p:blipFill>
+        </p:nvSpPr>
         <p:spPr>
           <a:xfrm>
-            <a:off x="3075918" y="2032000"/>
-            <a:ext cx="4977576" cy="4216400"/>
+            <a:off x="1104293" y="2797985"/>
+            <a:ext cx="8946541" cy="2739215"/>
           </a:xfrm>
-          <a:prstGeom prst="rect">
-            <a:avLst/>
-          </a:prstGeom>
         </p:spPr>
-      </p:pic>
+        <p:txBody>
+          <a:bodyPr/>
+          <a:lstStyle/>
+          <a:p>
+            <a:r>
+              <a:rPr lang="en-GB" dirty="0"/>
+              <a:t>How do I define what a Gopher is? </a:t>
+            </a:r>
+          </a:p>
+          <a:p>
+            <a:endParaRPr lang="en-GB" dirty="0"/>
+          </a:p>
+          <a:p>
+            <a:r>
+              <a:rPr lang="en-GB" dirty="0"/>
+              <a:t>How do I model what life is? </a:t>
+            </a:r>
+          </a:p>
+          <a:p>
+            <a:endParaRPr lang="en-GB" dirty="0"/>
+          </a:p>
+          <a:p>
+            <a:r>
+              <a:rPr lang="en-GB" dirty="0"/>
+              <a:t>Why 10? </a:t>
+            </a:r>
+          </a:p>
+        </p:txBody>
+      </p:sp>
     </p:spTree>
     <p:extLst>
       <p:ext uri="{BB962C8B-B14F-4D97-AF65-F5344CB8AC3E}">

</xml_diff>

<commit_message>
You can now properly Select a Gopher and the screen updates to the position
</commit_message>
<xml_diff>
--- a/GopherLife.pptx
+++ b/GopherLife.pptx
@@ -5,7 +5,7 @@
     <p:sldMasterId id="2147483678" r:id="rId1"/>
   </p:sldMasterIdLst>
   <p:notesMasterIdLst>
-    <p:notesMasterId r:id="rId28"/>
+    <p:notesMasterId r:id="rId34"/>
   </p:notesMasterIdLst>
   <p:sldIdLst>
     <p:sldId id="256" r:id="rId2"/>
@@ -25,15 +25,21 @@
     <p:sldId id="274" r:id="rId16"/>
     <p:sldId id="275" r:id="rId17"/>
     <p:sldId id="282" r:id="rId18"/>
-    <p:sldId id="266" r:id="rId19"/>
-    <p:sldId id="257" r:id="rId20"/>
-    <p:sldId id="258" r:id="rId21"/>
-    <p:sldId id="259" r:id="rId22"/>
-    <p:sldId id="261" r:id="rId23"/>
-    <p:sldId id="263" r:id="rId24"/>
-    <p:sldId id="262" r:id="rId25"/>
-    <p:sldId id="264" r:id="rId26"/>
-    <p:sldId id="279" r:id="rId27"/>
+    <p:sldId id="288" r:id="rId19"/>
+    <p:sldId id="283" r:id="rId20"/>
+    <p:sldId id="284" r:id="rId21"/>
+    <p:sldId id="285" r:id="rId22"/>
+    <p:sldId id="287" r:id="rId23"/>
+    <p:sldId id="286" r:id="rId24"/>
+    <p:sldId id="266" r:id="rId25"/>
+    <p:sldId id="257" r:id="rId26"/>
+    <p:sldId id="258" r:id="rId27"/>
+    <p:sldId id="259" r:id="rId28"/>
+    <p:sldId id="261" r:id="rId29"/>
+    <p:sldId id="263" r:id="rId30"/>
+    <p:sldId id="262" r:id="rId31"/>
+    <p:sldId id="264" r:id="rId32"/>
+    <p:sldId id="279" r:id="rId33"/>
   </p:sldIdLst>
   <p:sldSz cx="12192000" cy="6858000"/>
   <p:notesSz cx="6858000" cy="9144000"/>
@@ -558,7 +564,7 @@
           <a:p>
             <a:fld id="{D37E09BB-0EE2-4AA1-9043-B532D0F5CCDE}" type="slidenum">
               <a:rPr lang="en-GB" smtClean="0"/>
-              <a:t>22</a:t>
+              <a:t>28</a:t>
             </a:fld>
             <a:endParaRPr lang="en-GB"/>
           </a:p>
@@ -7521,7 +7527,14 @@
           <a:p>
             <a:r>
               <a:rPr lang="en-GB" dirty="0"/>
-              <a:t>Problem 3 – Life is a bit Empty isn’t it?</a:t>
+              <a:t>Problems 3 – 10</a:t>
+            </a:r>
+            <a:br>
+              <a:rPr lang="en-GB" dirty="0"/>
+            </a:br>
+            <a:r>
+              <a:rPr lang="en-GB" dirty="0"/>
+              <a:t>Life is a bit Empty isn’t it?</a:t>
             </a:r>
           </a:p>
         </p:txBody>
@@ -7549,7 +7562,7 @@
           <a:p>
             <a:r>
               <a:rPr lang="en-GB" dirty="0"/>
-              <a:t>Gophers needed things to do. </a:t>
+              <a:t>Gophers need things to do. </a:t>
             </a:r>
           </a:p>
           <a:p>
@@ -7632,7 +7645,10 @@
           <a:bodyPr/>
           <a:lstStyle/>
           <a:p>
-            <a:endParaRPr lang="en-GB" dirty="0"/>
+            <a:r>
+              <a:rPr lang="en-GB" dirty="0"/>
+              <a:t>Solutions</a:t>
+            </a:r>
           </a:p>
         </p:txBody>
       </p:sp>
@@ -7652,15 +7668,89 @@
             <p:ph idx="1"/>
           </p:nvPr>
         </p:nvSpPr>
-        <p:spPr/>
-        <p:txBody>
-          <a:bodyPr/>
-          <a:lstStyle/>
-          <a:p>
-            <a:endParaRPr lang="en-GB"/>
-          </a:p>
-        </p:txBody>
-      </p:sp>
+        <p:spPr>
+          <a:xfrm>
+            <a:off x="646111" y="1853248"/>
+            <a:ext cx="5195887" cy="4195481"/>
+          </a:xfrm>
+        </p:spPr>
+        <p:txBody>
+          <a:bodyPr/>
+          <a:lstStyle/>
+          <a:p>
+            <a:r>
+              <a:rPr lang="en-GB" dirty="0"/>
+              <a:t>Creating a World and giving gophers a position in it. </a:t>
+            </a:r>
+          </a:p>
+          <a:p>
+            <a:endParaRPr lang="en-GB" dirty="0"/>
+          </a:p>
+          <a:p>
+            <a:endParaRPr lang="en-GB" dirty="0"/>
+          </a:p>
+        </p:txBody>
+      </p:sp>
+      <p:pic>
+        <p:nvPicPr>
+          <p:cNvPr id="4" name="Picture 3">
+            <a:extLst>
+              <a:ext uri="{FF2B5EF4-FFF2-40B4-BE49-F238E27FC236}">
+                <a16:creationId xmlns:a16="http://schemas.microsoft.com/office/drawing/2014/main" id="{30053788-80FF-4215-907E-5BB1331D61D1}"/>
+              </a:ext>
+            </a:extLst>
+          </p:cNvPr>
+          <p:cNvPicPr>
+            <a:picLocks noChangeAspect="1"/>
+          </p:cNvPicPr>
+          <p:nvPr/>
+        </p:nvPicPr>
+        <p:blipFill>
+          <a:blip r:embed="rId2"/>
+          <a:stretch>
+            <a:fillRect/>
+          </a:stretch>
+        </p:blipFill>
+        <p:spPr>
+          <a:xfrm>
+            <a:off x="6096000" y="1152983"/>
+            <a:ext cx="2726267" cy="2717026"/>
+          </a:xfrm>
+          <a:prstGeom prst="rect">
+            <a:avLst/>
+          </a:prstGeom>
+        </p:spPr>
+      </p:pic>
+      <p:pic>
+        <p:nvPicPr>
+          <p:cNvPr id="5" name="Picture 4">
+            <a:extLst>
+              <a:ext uri="{FF2B5EF4-FFF2-40B4-BE49-F238E27FC236}">
+                <a16:creationId xmlns:a16="http://schemas.microsoft.com/office/drawing/2014/main" id="{6E30225E-5CE2-4F89-9DA2-E0A7A0F2AB4D}"/>
+              </a:ext>
+            </a:extLst>
+          </p:cNvPr>
+          <p:cNvPicPr>
+            <a:picLocks noChangeAspect="1"/>
+          </p:cNvPicPr>
+          <p:nvPr/>
+        </p:nvPicPr>
+        <p:blipFill>
+          <a:blip r:embed="rId3"/>
+          <a:stretch>
+            <a:fillRect/>
+          </a:stretch>
+        </p:blipFill>
+        <p:spPr>
+          <a:xfrm>
+            <a:off x="6096000" y="4570274"/>
+            <a:ext cx="3496163" cy="1724266"/>
+          </a:xfrm>
+          <a:prstGeom prst="rect">
+            <a:avLst/>
+          </a:prstGeom>
+        </p:spPr>
+      </p:pic>
     </p:spTree>
     <p:extLst>
       <p:ext uri="{BB962C8B-B14F-4D97-AF65-F5344CB8AC3E}">
@@ -7696,7 +7786,7 @@
           <p:cNvPr id="2" name="Title 1">
             <a:extLst>
               <a:ext uri="{FF2B5EF4-FFF2-40B4-BE49-F238E27FC236}">
-                <a16:creationId xmlns:a16="http://schemas.microsoft.com/office/drawing/2014/main" id="{DDA23A98-14C6-40E0-A90C-6468725EFA2C}"/>
+                <a16:creationId xmlns:a16="http://schemas.microsoft.com/office/drawing/2014/main" id="{AA01FFF3-EC99-4485-B32E-E2E568D47B5F}"/>
               </a:ext>
             </a:extLst>
           </p:cNvPr>
@@ -7714,7 +7804,7 @@
           <a:p>
             <a:r>
               <a:rPr lang="en-GB" dirty="0"/>
-              <a:t>Perseverance</a:t>
+              <a:t>Progress Checklist 3 - 10</a:t>
             </a:r>
           </a:p>
         </p:txBody>
@@ -7724,7 +7814,7 @@
           <p:cNvPr id="3" name="Content Placeholder 2">
             <a:extLst>
               <a:ext uri="{FF2B5EF4-FFF2-40B4-BE49-F238E27FC236}">
-                <a16:creationId xmlns:a16="http://schemas.microsoft.com/office/drawing/2014/main" id="{B7866C6F-7AB4-4FF2-AC93-597F73926565}"/>
+                <a16:creationId xmlns:a16="http://schemas.microsoft.com/office/drawing/2014/main" id="{A2755EB5-1D4C-4DDE-A6D0-AFBE7C6CD484}"/>
               </a:ext>
             </a:extLst>
           </p:cNvPr>
@@ -7742,21 +7832,58 @@
           <a:p>
             <a:r>
               <a:rPr lang="en-GB" dirty="0"/>
-              <a:t>Talking about your project with other developers </a:t>
-            </a:r>
+              <a:t>Project Structure and avoiding Circular Dependencies </a:t>
+            </a:r>
+            <a:r>
+              <a:rPr lang="en-GB" dirty="0">
+                <a:latin typeface="Segoe MDL2 Assets" panose="050A0102010101010101" pitchFamily="18" charset="0"/>
+              </a:rPr>
+              <a:t></a:t>
+            </a:r>
+          </a:p>
+          <a:p>
+            <a:endParaRPr lang="en-GB" dirty="0"/>
           </a:p>
           <a:p>
             <a:r>
               <a:rPr lang="en-GB" dirty="0"/>
-              <a:t>Getting help</a:t>
-            </a:r>
+              <a:t>GOPATH and where to place your projects </a:t>
+            </a:r>
+            <a:r>
+              <a:rPr lang="en-GB" dirty="0">
+                <a:latin typeface="Segoe MDL2 Assets" panose="050A0102010101010101" pitchFamily="18" charset="0"/>
+              </a:rPr>
+              <a:t></a:t>
+            </a:r>
+          </a:p>
+          <a:p>
+            <a:endParaRPr lang="en-GB" dirty="0"/>
+          </a:p>
+          <a:p>
+            <a:r>
+              <a:rPr lang="en-GB" dirty="0"/>
+              <a:t>Implementing Basic Pathing Using </a:t>
+            </a:r>
+            <a:r>
+              <a:rPr lang="en-GB"/>
+              <a:t>Coordinates </a:t>
+            </a:r>
+            <a:r>
+              <a:rPr lang="en-GB">
+                <a:latin typeface="Segoe MDL2 Assets" panose="050A0102010101010101" pitchFamily="18" charset="0"/>
+              </a:rPr>
+              <a:t></a:t>
+            </a:r>
+          </a:p>
+          <a:p>
+            <a:endParaRPr lang="en-GB" dirty="0"/>
           </a:p>
         </p:txBody>
       </p:sp>
     </p:spTree>
     <p:extLst>
       <p:ext uri="{BB962C8B-B14F-4D97-AF65-F5344CB8AC3E}">
-        <p14:creationId xmlns:p14="http://schemas.microsoft.com/office/powerpoint/2010/main" val="847199732"/>
+        <p14:creationId xmlns:p14="http://schemas.microsoft.com/office/powerpoint/2010/main" val="3768594580"/>
       </p:ext>
     </p:extLst>
   </p:cSld>
@@ -7788,7 +7915,7 @@
           <p:cNvPr id="2" name="Title 1">
             <a:extLst>
               <a:ext uri="{FF2B5EF4-FFF2-40B4-BE49-F238E27FC236}">
-                <a16:creationId xmlns:a16="http://schemas.microsoft.com/office/drawing/2014/main" id="{CFF32C6C-3D00-4977-9425-46509C1A3129}"/>
+                <a16:creationId xmlns:a16="http://schemas.microsoft.com/office/drawing/2014/main" id="{D2EE31CB-2F81-4A36-8A60-7DA0689FF389}"/>
               </a:ext>
             </a:extLst>
           </p:cNvPr>
@@ -7806,7 +7933,7 @@
           <a:p>
             <a:r>
               <a:rPr lang="en-GB" dirty="0"/>
-              <a:t>Go – Starter Pack</a:t>
+              <a:t>Problem 4 – Visual Representation</a:t>
             </a:r>
           </a:p>
         </p:txBody>
@@ -7816,7 +7943,7 @@
           <p:cNvPr id="3" name="Content Placeholder 2">
             <a:extLst>
               <a:ext uri="{FF2B5EF4-FFF2-40B4-BE49-F238E27FC236}">
-                <a16:creationId xmlns:a16="http://schemas.microsoft.com/office/drawing/2014/main" id="{3B81F4FB-26EB-4DA4-9507-E147BFC741B8}"/>
+                <a16:creationId xmlns:a16="http://schemas.microsoft.com/office/drawing/2014/main" id="{A8B919FE-5B99-442A-897F-39F7A3FBA3BF}"/>
               </a:ext>
             </a:extLst>
           </p:cNvPr>
@@ -7832,18 +7959,6 @@
           <a:bodyPr/>
           <a:lstStyle/>
           <a:p>
-            <a:r>
-              <a:rPr lang="en-GB" dirty="0"/>
-              <a:t>Installing GO. </a:t>
-            </a:r>
-          </a:p>
-          <a:p>
-            <a:r>
-              <a:rPr lang="en-GB" dirty="0"/>
-              <a:t>Learning the syntax</a:t>
-            </a:r>
-          </a:p>
-          <a:p>
             <a:endParaRPr lang="en-GB" dirty="0"/>
           </a:p>
         </p:txBody>
@@ -7851,7 +7966,7 @@
     </p:spTree>
     <p:extLst>
       <p:ext uri="{BB962C8B-B14F-4D97-AF65-F5344CB8AC3E}">
-        <p14:creationId xmlns:p14="http://schemas.microsoft.com/office/powerpoint/2010/main" val="1566399315"/>
+        <p14:creationId xmlns:p14="http://schemas.microsoft.com/office/powerpoint/2010/main" val="52941393"/>
       </p:ext>
     </p:extLst>
   </p:cSld>
@@ -7966,7 +8081,7 @@
           <p:cNvPr id="2" name="Title 1">
             <a:extLst>
               <a:ext uri="{FF2B5EF4-FFF2-40B4-BE49-F238E27FC236}">
-                <a16:creationId xmlns:a16="http://schemas.microsoft.com/office/drawing/2014/main" id="{F791C732-68FC-4DBF-A925-B9A44335C54F}"/>
+                <a16:creationId xmlns:a16="http://schemas.microsoft.com/office/drawing/2014/main" id="{E2D24B9C-4460-4D79-AE21-23356AF1FB37}"/>
               </a:ext>
             </a:extLst>
           </p:cNvPr>
@@ -7984,7 +8099,7 @@
           <a:p>
             <a:r>
               <a:rPr lang="en-GB" dirty="0"/>
-              <a:t>Finding A Catalyst</a:t>
+              <a:t>Solutions</a:t>
             </a:r>
           </a:p>
         </p:txBody>
@@ -7994,7 +8109,7 @@
           <p:cNvPr id="3" name="Content Placeholder 2">
             <a:extLst>
               <a:ext uri="{FF2B5EF4-FFF2-40B4-BE49-F238E27FC236}">
-                <a16:creationId xmlns:a16="http://schemas.microsoft.com/office/drawing/2014/main" id="{C206744A-0D9B-4231-BD87-CF25D90A8004}"/>
+                <a16:creationId xmlns:a16="http://schemas.microsoft.com/office/drawing/2014/main" id="{DBA319FF-5EEE-4C2D-B80B-5DF0D120CF5E}"/>
               </a:ext>
             </a:extLst>
           </p:cNvPr>
@@ -8017,7 +8132,7 @@
     </p:spTree>
     <p:extLst>
       <p:ext uri="{BB962C8B-B14F-4D97-AF65-F5344CB8AC3E}">
-        <p14:creationId xmlns:p14="http://schemas.microsoft.com/office/powerpoint/2010/main" val="4016827040"/>
+        <p14:creationId xmlns:p14="http://schemas.microsoft.com/office/powerpoint/2010/main" val="1519006128"/>
       </p:ext>
     </p:extLst>
   </p:cSld>
@@ -8049,7 +8164,7 @@
           <p:cNvPr id="2" name="Title 1">
             <a:extLst>
               <a:ext uri="{FF2B5EF4-FFF2-40B4-BE49-F238E27FC236}">
-                <a16:creationId xmlns:a16="http://schemas.microsoft.com/office/drawing/2014/main" id="{32F06B3C-EA2D-46B1-AB79-08EFA8CCC0C1}"/>
+                <a16:creationId xmlns:a16="http://schemas.microsoft.com/office/drawing/2014/main" id="{5F649051-170D-4D88-A1EB-CD53B67517C2}"/>
               </a:ext>
             </a:extLst>
           </p:cNvPr>
@@ -8067,7 +8182,7 @@
           <a:p>
             <a:r>
               <a:rPr lang="en-GB" dirty="0"/>
-              <a:t>Managing Scope and Completing Projects</a:t>
+              <a:t>Final Showcase</a:t>
             </a:r>
           </a:p>
         </p:txBody>
@@ -8077,7 +8192,7 @@
           <p:cNvPr id="3" name="Content Placeholder 2">
             <a:extLst>
               <a:ext uri="{FF2B5EF4-FFF2-40B4-BE49-F238E27FC236}">
-                <a16:creationId xmlns:a16="http://schemas.microsoft.com/office/drawing/2014/main" id="{D2524174-1A6E-43AD-AFB4-E3F8B9B5D53A}"/>
+                <a16:creationId xmlns:a16="http://schemas.microsoft.com/office/drawing/2014/main" id="{E28FB5CC-2E35-4352-B03D-454660443443}"/>
               </a:ext>
             </a:extLst>
           </p:cNvPr>
@@ -8100,7 +8215,7 @@
     </p:spTree>
     <p:extLst>
       <p:ext uri="{BB962C8B-B14F-4D97-AF65-F5344CB8AC3E}">
-        <p14:creationId xmlns:p14="http://schemas.microsoft.com/office/powerpoint/2010/main" val="1162966501"/>
+        <p14:creationId xmlns:p14="http://schemas.microsoft.com/office/powerpoint/2010/main" val="2232509740"/>
       </p:ext>
     </p:extLst>
   </p:cSld>
@@ -8132,7 +8247,7 @@
           <p:cNvPr id="2" name="Title 1">
             <a:extLst>
               <a:ext uri="{FF2B5EF4-FFF2-40B4-BE49-F238E27FC236}">
-                <a16:creationId xmlns:a16="http://schemas.microsoft.com/office/drawing/2014/main" id="{F106CE47-2D88-4386-9645-6FF2058FA701}"/>
+                <a16:creationId xmlns:a16="http://schemas.microsoft.com/office/drawing/2014/main" id="{6CDC4756-BE7A-4B78-81FE-29031289A2AD}"/>
               </a:ext>
             </a:extLst>
           </p:cNvPr>
@@ -8150,7 +8265,7 @@
           <a:p>
             <a:r>
               <a:rPr lang="en-GB" dirty="0"/>
-              <a:t>Getting past the feeling of pointlessness</a:t>
+              <a:t>Final Checklist </a:t>
             </a:r>
           </a:p>
         </p:txBody>
@@ -8160,7 +8275,7 @@
           <p:cNvPr id="3" name="Content Placeholder 2">
             <a:extLst>
               <a:ext uri="{FF2B5EF4-FFF2-40B4-BE49-F238E27FC236}">
-                <a16:creationId xmlns:a16="http://schemas.microsoft.com/office/drawing/2014/main" id="{3E7E5D08-3BD9-4083-ABF9-3C1E46633F36}"/>
+                <a16:creationId xmlns:a16="http://schemas.microsoft.com/office/drawing/2014/main" id="{07D7EF34-638C-4C71-99D1-10742B4D9377}"/>
               </a:ext>
             </a:extLst>
           </p:cNvPr>
@@ -8176,35 +8291,14 @@
           <a:bodyPr/>
           <a:lstStyle/>
           <a:p>
-            <a:r>
-              <a:rPr lang="en-GB" dirty="0"/>
-              <a:t>Finding a Catalyst, to improve motivation</a:t>
-            </a:r>
-          </a:p>
-          <a:p>
-            <a:pPr lvl="1"/>
-            <a:r>
-              <a:rPr lang="en-GB" dirty="0"/>
-              <a:t>Discussing your project with peers</a:t>
-            </a:r>
-          </a:p>
-          <a:p>
-            <a:pPr lvl="1"/>
-            <a:r>
-              <a:rPr lang="en-GB" dirty="0"/>
-              <a:t>Creating an actual deadline</a:t>
-            </a:r>
-          </a:p>
-          <a:p>
-            <a:pPr lvl="1"/>
-            <a:endParaRPr lang="en-GB" dirty="0"/>
+            <a:endParaRPr lang="en-GB"/>
           </a:p>
         </p:txBody>
       </p:sp>
     </p:spTree>
     <p:extLst>
       <p:ext uri="{BB962C8B-B14F-4D97-AF65-F5344CB8AC3E}">
-        <p14:creationId xmlns:p14="http://schemas.microsoft.com/office/powerpoint/2010/main" val="1961839492"/>
+        <p14:creationId xmlns:p14="http://schemas.microsoft.com/office/powerpoint/2010/main" val="2595392705"/>
       </p:ext>
     </p:extLst>
   </p:cSld>
@@ -8236,7 +8330,7 @@
           <p:cNvPr id="2" name="Title 1">
             <a:extLst>
               <a:ext uri="{FF2B5EF4-FFF2-40B4-BE49-F238E27FC236}">
-                <a16:creationId xmlns:a16="http://schemas.microsoft.com/office/drawing/2014/main" id="{8665D156-403C-4612-AA65-B49BA41EDF64}"/>
+                <a16:creationId xmlns:a16="http://schemas.microsoft.com/office/drawing/2014/main" id="{C6A1F8BE-8B71-4987-BE2C-B485EE46CDB8}"/>
               </a:ext>
             </a:extLst>
           </p:cNvPr>
@@ -8254,7 +8348,7 @@
           <a:p>
             <a:r>
               <a:rPr lang="en-GB" dirty="0"/>
-              <a:t>Insert Here, Example of 5 gophers one alive, 4 dead </a:t>
+              <a:t>Conclusion</a:t>
             </a:r>
           </a:p>
         </p:txBody>
@@ -8264,7 +8358,7 @@
           <p:cNvPr id="3" name="Content Placeholder 2">
             <a:extLst>
               <a:ext uri="{FF2B5EF4-FFF2-40B4-BE49-F238E27FC236}">
-                <a16:creationId xmlns:a16="http://schemas.microsoft.com/office/drawing/2014/main" id="{8716B298-CF10-4866-85F6-D856E1963894}"/>
+                <a16:creationId xmlns:a16="http://schemas.microsoft.com/office/drawing/2014/main" id="{C6489CD9-246E-4EF9-8A1F-DF0D212B8A29}"/>
               </a:ext>
             </a:extLst>
           </p:cNvPr>
@@ -8287,7 +8381,7 @@
     </p:spTree>
     <p:extLst>
       <p:ext uri="{BB962C8B-B14F-4D97-AF65-F5344CB8AC3E}">
-        <p14:creationId xmlns:p14="http://schemas.microsoft.com/office/powerpoint/2010/main" val="3790213746"/>
+        <p14:creationId xmlns:p14="http://schemas.microsoft.com/office/powerpoint/2010/main" val="2651521754"/>
       </p:ext>
     </p:extLst>
   </p:cSld>
@@ -8319,7 +8413,7 @@
           <p:cNvPr id="2" name="Title 1">
             <a:extLst>
               <a:ext uri="{FF2B5EF4-FFF2-40B4-BE49-F238E27FC236}">
-                <a16:creationId xmlns:a16="http://schemas.microsoft.com/office/drawing/2014/main" id="{B88F905B-DC9A-4E15-887A-0D816B2DA849}"/>
+                <a16:creationId xmlns:a16="http://schemas.microsoft.com/office/drawing/2014/main" id="{DDA23A98-14C6-40E0-A90C-6468725EFA2C}"/>
               </a:ext>
             </a:extLst>
           </p:cNvPr>
@@ -8337,7 +8431,7 @@
           <a:p>
             <a:r>
               <a:rPr lang="en-GB" dirty="0"/>
-              <a:t>Checklist</a:t>
+              <a:t>Perseverance</a:t>
             </a:r>
           </a:p>
         </p:txBody>
@@ -8347,7 +8441,7 @@
           <p:cNvPr id="3" name="Content Placeholder 2">
             <a:extLst>
               <a:ext uri="{FF2B5EF4-FFF2-40B4-BE49-F238E27FC236}">
-                <a16:creationId xmlns:a16="http://schemas.microsoft.com/office/drawing/2014/main" id="{14229407-2ED8-43A8-819B-30DDEB3D38EC}"/>
+                <a16:creationId xmlns:a16="http://schemas.microsoft.com/office/drawing/2014/main" id="{B7866C6F-7AB4-4FF2-AC93-597F73926565}"/>
               </a:ext>
             </a:extLst>
           </p:cNvPr>
@@ -8365,24 +8459,21 @@
           <a:p>
             <a:r>
               <a:rPr lang="en-GB" dirty="0"/>
-              <a:t>Concurrency is not parallelism </a:t>
-            </a:r>
-            <a:r>
-              <a:rPr lang="en-GB" dirty="0">
-                <a:latin typeface="Segoe MDL2 Assets" panose="050A0102010101010101" pitchFamily="18" charset="0"/>
-              </a:rPr>
-              <a:t> </a:t>
-            </a:r>
-          </a:p>
-          <a:p>
-            <a:endParaRPr lang="en-GB" dirty="0"/>
+              <a:t>Talking about your project with other developers </a:t>
+            </a:r>
+          </a:p>
+          <a:p>
+            <a:r>
+              <a:rPr lang="en-GB" dirty="0"/>
+              <a:t>Getting help</a:t>
+            </a:r>
           </a:p>
         </p:txBody>
       </p:sp>
     </p:spTree>
     <p:extLst>
       <p:ext uri="{BB962C8B-B14F-4D97-AF65-F5344CB8AC3E}">
-        <p14:creationId xmlns:p14="http://schemas.microsoft.com/office/powerpoint/2010/main" val="3193971414"/>
+        <p14:creationId xmlns:p14="http://schemas.microsoft.com/office/powerpoint/2010/main" val="847199732"/>
       </p:ext>
     </p:extLst>
   </p:cSld>
@@ -8414,7 +8505,7 @@
           <p:cNvPr id="2" name="Title 1">
             <a:extLst>
               <a:ext uri="{FF2B5EF4-FFF2-40B4-BE49-F238E27FC236}">
-                <a16:creationId xmlns:a16="http://schemas.microsoft.com/office/drawing/2014/main" id="{B88F905B-DC9A-4E15-887A-0D816B2DA849}"/>
+                <a16:creationId xmlns:a16="http://schemas.microsoft.com/office/drawing/2014/main" id="{CFF32C6C-3D00-4977-9425-46509C1A3129}"/>
               </a:ext>
             </a:extLst>
           </p:cNvPr>
@@ -8432,7 +8523,7 @@
           <a:p>
             <a:r>
               <a:rPr lang="en-GB" dirty="0"/>
-              <a:t>Checklist of Mistakes</a:t>
+              <a:t>Go – Starter Pack</a:t>
             </a:r>
           </a:p>
         </p:txBody>
@@ -8442,7 +8533,7 @@
           <p:cNvPr id="3" name="Content Placeholder 2">
             <a:extLst>
               <a:ext uri="{FF2B5EF4-FFF2-40B4-BE49-F238E27FC236}">
-                <a16:creationId xmlns:a16="http://schemas.microsoft.com/office/drawing/2014/main" id="{14229407-2ED8-43A8-819B-30DDEB3D38EC}"/>
+                <a16:creationId xmlns:a16="http://schemas.microsoft.com/office/drawing/2014/main" id="{3B81F4FB-26EB-4DA4-9507-E147BFC741B8}"/>
               </a:ext>
             </a:extLst>
           </p:cNvPr>
@@ -8460,45 +8551,14 @@
           <a:p>
             <a:r>
               <a:rPr lang="en-GB" dirty="0"/>
-              <a:t>Concurrency is not parallelism </a:t>
-            </a:r>
-            <a:r>
-              <a:rPr lang="en-GB" dirty="0">
-                <a:latin typeface="Segoe MDL2 Assets" panose="050A0102010101010101" pitchFamily="18" charset="0"/>
-              </a:rPr>
-              <a:t> </a:t>
+              <a:t>Installing GO. </a:t>
             </a:r>
           </a:p>
           <a:p>
             <a:r>
               <a:rPr lang="en-GB" dirty="0"/>
-              <a:t>You can read from maps concurrently, but you can not write to maps.</a:t>
-            </a:r>
-          </a:p>
-          <a:p>
-            <a:r>
-              <a:rPr lang="en-GB"/>
-              <a:t>Importance </a:t>
-            </a:r>
-            <a:r>
-              <a:rPr lang="en-GB" dirty="0"/>
-              <a:t>of structure to avoid circular dependencies and for ease of readability </a:t>
-            </a:r>
-            <a:r>
-              <a:rPr lang="en-GB" dirty="0">
-                <a:latin typeface="Segoe MDL2 Assets" panose="050A0102010101010101" pitchFamily="18" charset="0"/>
-              </a:rPr>
-              <a:t></a:t>
-            </a:r>
-          </a:p>
-          <a:p>
-            <a:r>
-              <a:rPr lang="en-GB" dirty="0"/>
-              <a:t>By saving your files where the GOPATH is you can access local packages without using relative paths. </a:t>
-            </a:r>
-            <a:endParaRPr lang="en-GB" dirty="0">
-              <a:latin typeface="Segoe MDL2 Assets" panose="050A0102010101010101" pitchFamily="18" charset="0"/>
-            </a:endParaRPr>
+              <a:t>Learning the syntax</a:t>
+            </a:r>
           </a:p>
           <a:p>
             <a:endParaRPr lang="en-GB" dirty="0"/>
@@ -8508,7 +8568,7 @@
     </p:spTree>
     <p:extLst>
       <p:ext uri="{BB962C8B-B14F-4D97-AF65-F5344CB8AC3E}">
-        <p14:creationId xmlns:p14="http://schemas.microsoft.com/office/powerpoint/2010/main" val="1348224757"/>
+        <p14:creationId xmlns:p14="http://schemas.microsoft.com/office/powerpoint/2010/main" val="1566399315"/>
       </p:ext>
     </p:extLst>
   </p:cSld>
@@ -8540,7 +8600,7 @@
           <p:cNvPr id="2" name="Title 1">
             <a:extLst>
               <a:ext uri="{FF2B5EF4-FFF2-40B4-BE49-F238E27FC236}">
-                <a16:creationId xmlns:a16="http://schemas.microsoft.com/office/drawing/2014/main" id="{8CEAC96E-108C-4D0F-8090-857DB6659B57}"/>
+                <a16:creationId xmlns:a16="http://schemas.microsoft.com/office/drawing/2014/main" id="{F791C732-68FC-4DBF-A925-B9A44335C54F}"/>
               </a:ext>
             </a:extLst>
           </p:cNvPr>
@@ -8558,14 +8618,7 @@
           <a:p>
             <a:r>
               <a:rPr lang="en-GB" dirty="0"/>
-              <a:t>Solution: Modelling the lives of </a:t>
-            </a:r>
-            <a:br>
-              <a:rPr lang="en-GB" dirty="0"/>
-            </a:br>
-            <a:r>
-              <a:rPr lang="en-GB" dirty="0"/>
-              <a:t>1 million Gophers</a:t>
+              <a:t>Finding A Catalyst</a:t>
             </a:r>
           </a:p>
         </p:txBody>
@@ -8575,7 +8628,7 @@
           <p:cNvPr id="3" name="Content Placeholder 2">
             <a:extLst>
               <a:ext uri="{FF2B5EF4-FFF2-40B4-BE49-F238E27FC236}">
-                <a16:creationId xmlns:a16="http://schemas.microsoft.com/office/drawing/2014/main" id="{8AE99B8D-47E8-4045-8955-7E893F2A54A8}"/>
+                <a16:creationId xmlns:a16="http://schemas.microsoft.com/office/drawing/2014/main" id="{C206744A-0D9B-4231-BD87-CF25D90A8004}"/>
               </a:ext>
             </a:extLst>
           </p:cNvPr>
@@ -8591,40 +8644,284 @@
           <a:bodyPr/>
           <a:lstStyle/>
           <a:p>
-            <a:r>
-              <a:rPr lang="en-GB" dirty="0"/>
-              <a:t>Create a PowerPoint presentation talking about the cyclical nature of Learning how to Program. </a:t>
-            </a:r>
-          </a:p>
-          <a:p>
-            <a:endParaRPr lang="en-GB" dirty="0"/>
-          </a:p>
-          <a:p>
-            <a:r>
-              <a:rPr lang="en-GB" dirty="0"/>
-              <a:t>For Newcomers</a:t>
-            </a:r>
-          </a:p>
-          <a:p>
-            <a:endParaRPr lang="en-GB" dirty="0"/>
-          </a:p>
-          <a:p>
-            <a:r>
-              <a:rPr lang="en-GB" dirty="0"/>
-              <a:t>Talk about how by making a presentation those who aren’t Gopher or are new </a:t>
-            </a:r>
-            <a:r>
-              <a:rPr lang="en-GB"/>
-              <a:t>Gophers might see the first steps </a:t>
-            </a:r>
-            <a:endParaRPr lang="en-GB" dirty="0"/>
+            <a:endParaRPr lang="en-GB"/>
           </a:p>
         </p:txBody>
       </p:sp>
     </p:spTree>
     <p:extLst>
       <p:ext uri="{BB962C8B-B14F-4D97-AF65-F5344CB8AC3E}">
-        <p14:creationId xmlns:p14="http://schemas.microsoft.com/office/powerpoint/2010/main" val="18358553"/>
+        <p14:creationId xmlns:p14="http://schemas.microsoft.com/office/powerpoint/2010/main" val="4016827040"/>
+      </p:ext>
+    </p:extLst>
+  </p:cSld>
+  <p:clrMapOvr>
+    <a:masterClrMapping/>
+  </p:clrMapOvr>
+</p:sld>
+</file>
+
+<file path=ppt/slides/slide27.xml><?xml version="1.0" encoding="utf-8"?>
+<p:sld xmlns:a="http://schemas.openxmlformats.org/drawingml/2006/main" xmlns:r="http://schemas.openxmlformats.org/officeDocument/2006/relationships" xmlns:p="http://schemas.openxmlformats.org/presentationml/2006/main">
+  <p:cSld>
+    <p:spTree>
+      <p:nvGrpSpPr>
+        <p:cNvPr id="1" name=""/>
+        <p:cNvGrpSpPr/>
+        <p:nvPr/>
+      </p:nvGrpSpPr>
+      <p:grpSpPr>
+        <a:xfrm>
+          <a:off x="0" y="0"/>
+          <a:ext cx="0" cy="0"/>
+          <a:chOff x="0" y="0"/>
+          <a:chExt cx="0" cy="0"/>
+        </a:xfrm>
+      </p:grpSpPr>
+      <p:sp>
+        <p:nvSpPr>
+          <p:cNvPr id="2" name="Title 1">
+            <a:extLst>
+              <a:ext uri="{FF2B5EF4-FFF2-40B4-BE49-F238E27FC236}">
+                <a16:creationId xmlns:a16="http://schemas.microsoft.com/office/drawing/2014/main" id="{32F06B3C-EA2D-46B1-AB79-08EFA8CCC0C1}"/>
+              </a:ext>
+            </a:extLst>
+          </p:cNvPr>
+          <p:cNvSpPr>
+            <a:spLocks noGrp="1"/>
+          </p:cNvSpPr>
+          <p:nvPr>
+            <p:ph type="title"/>
+          </p:nvPr>
+        </p:nvSpPr>
+        <p:spPr/>
+        <p:txBody>
+          <a:bodyPr/>
+          <a:lstStyle/>
+          <a:p>
+            <a:r>
+              <a:rPr lang="en-GB" dirty="0"/>
+              <a:t>Managing Scope and Completing Projects</a:t>
+            </a:r>
+          </a:p>
+        </p:txBody>
+      </p:sp>
+      <p:sp>
+        <p:nvSpPr>
+          <p:cNvPr id="3" name="Content Placeholder 2">
+            <a:extLst>
+              <a:ext uri="{FF2B5EF4-FFF2-40B4-BE49-F238E27FC236}">
+                <a16:creationId xmlns:a16="http://schemas.microsoft.com/office/drawing/2014/main" id="{D2524174-1A6E-43AD-AFB4-E3F8B9B5D53A}"/>
+              </a:ext>
+            </a:extLst>
+          </p:cNvPr>
+          <p:cNvSpPr>
+            <a:spLocks noGrp="1"/>
+          </p:cNvSpPr>
+          <p:nvPr>
+            <p:ph idx="1"/>
+          </p:nvPr>
+        </p:nvSpPr>
+        <p:spPr/>
+        <p:txBody>
+          <a:bodyPr/>
+          <a:lstStyle/>
+          <a:p>
+            <a:endParaRPr lang="en-GB"/>
+          </a:p>
+        </p:txBody>
+      </p:sp>
+    </p:spTree>
+    <p:extLst>
+      <p:ext uri="{BB962C8B-B14F-4D97-AF65-F5344CB8AC3E}">
+        <p14:creationId xmlns:p14="http://schemas.microsoft.com/office/powerpoint/2010/main" val="1162966501"/>
+      </p:ext>
+    </p:extLst>
+  </p:cSld>
+  <p:clrMapOvr>
+    <a:masterClrMapping/>
+  </p:clrMapOvr>
+</p:sld>
+</file>
+
+<file path=ppt/slides/slide28.xml><?xml version="1.0" encoding="utf-8"?>
+<p:sld xmlns:a="http://schemas.openxmlformats.org/drawingml/2006/main" xmlns:r="http://schemas.openxmlformats.org/officeDocument/2006/relationships" xmlns:p="http://schemas.openxmlformats.org/presentationml/2006/main">
+  <p:cSld>
+    <p:spTree>
+      <p:nvGrpSpPr>
+        <p:cNvPr id="1" name=""/>
+        <p:cNvGrpSpPr/>
+        <p:nvPr/>
+      </p:nvGrpSpPr>
+      <p:grpSpPr>
+        <a:xfrm>
+          <a:off x="0" y="0"/>
+          <a:ext cx="0" cy="0"/>
+          <a:chOff x="0" y="0"/>
+          <a:chExt cx="0" cy="0"/>
+        </a:xfrm>
+      </p:grpSpPr>
+      <p:sp>
+        <p:nvSpPr>
+          <p:cNvPr id="2" name="Title 1">
+            <a:extLst>
+              <a:ext uri="{FF2B5EF4-FFF2-40B4-BE49-F238E27FC236}">
+                <a16:creationId xmlns:a16="http://schemas.microsoft.com/office/drawing/2014/main" id="{F106CE47-2D88-4386-9645-6FF2058FA701}"/>
+              </a:ext>
+            </a:extLst>
+          </p:cNvPr>
+          <p:cNvSpPr>
+            <a:spLocks noGrp="1"/>
+          </p:cNvSpPr>
+          <p:nvPr>
+            <p:ph type="title"/>
+          </p:nvPr>
+        </p:nvSpPr>
+        <p:spPr/>
+        <p:txBody>
+          <a:bodyPr/>
+          <a:lstStyle/>
+          <a:p>
+            <a:r>
+              <a:rPr lang="en-GB" dirty="0"/>
+              <a:t>Getting past the feeling of pointlessness</a:t>
+            </a:r>
+          </a:p>
+        </p:txBody>
+      </p:sp>
+      <p:sp>
+        <p:nvSpPr>
+          <p:cNvPr id="3" name="Content Placeholder 2">
+            <a:extLst>
+              <a:ext uri="{FF2B5EF4-FFF2-40B4-BE49-F238E27FC236}">
+                <a16:creationId xmlns:a16="http://schemas.microsoft.com/office/drawing/2014/main" id="{3E7E5D08-3BD9-4083-ABF9-3C1E46633F36}"/>
+              </a:ext>
+            </a:extLst>
+          </p:cNvPr>
+          <p:cNvSpPr>
+            <a:spLocks noGrp="1"/>
+          </p:cNvSpPr>
+          <p:nvPr>
+            <p:ph idx="1"/>
+          </p:nvPr>
+        </p:nvSpPr>
+        <p:spPr/>
+        <p:txBody>
+          <a:bodyPr/>
+          <a:lstStyle/>
+          <a:p>
+            <a:r>
+              <a:rPr lang="en-GB" dirty="0"/>
+              <a:t>Finding a Catalyst, to improve motivation</a:t>
+            </a:r>
+          </a:p>
+          <a:p>
+            <a:pPr lvl="1"/>
+            <a:r>
+              <a:rPr lang="en-GB" dirty="0"/>
+              <a:t>Discussing your project with peers</a:t>
+            </a:r>
+          </a:p>
+          <a:p>
+            <a:pPr lvl="1"/>
+            <a:r>
+              <a:rPr lang="en-GB" dirty="0"/>
+              <a:t>Creating an actual deadline</a:t>
+            </a:r>
+          </a:p>
+          <a:p>
+            <a:pPr lvl="1"/>
+            <a:endParaRPr lang="en-GB" dirty="0"/>
+          </a:p>
+        </p:txBody>
+      </p:sp>
+    </p:spTree>
+    <p:extLst>
+      <p:ext uri="{BB962C8B-B14F-4D97-AF65-F5344CB8AC3E}">
+        <p14:creationId xmlns:p14="http://schemas.microsoft.com/office/powerpoint/2010/main" val="1961839492"/>
+      </p:ext>
+    </p:extLst>
+  </p:cSld>
+  <p:clrMapOvr>
+    <a:masterClrMapping/>
+  </p:clrMapOvr>
+</p:sld>
+</file>
+
+<file path=ppt/slides/slide29.xml><?xml version="1.0" encoding="utf-8"?>
+<p:sld xmlns:a="http://schemas.openxmlformats.org/drawingml/2006/main" xmlns:r="http://schemas.openxmlformats.org/officeDocument/2006/relationships" xmlns:p="http://schemas.openxmlformats.org/presentationml/2006/main">
+  <p:cSld>
+    <p:spTree>
+      <p:nvGrpSpPr>
+        <p:cNvPr id="1" name=""/>
+        <p:cNvGrpSpPr/>
+        <p:nvPr/>
+      </p:nvGrpSpPr>
+      <p:grpSpPr>
+        <a:xfrm>
+          <a:off x="0" y="0"/>
+          <a:ext cx="0" cy="0"/>
+          <a:chOff x="0" y="0"/>
+          <a:chExt cx="0" cy="0"/>
+        </a:xfrm>
+      </p:grpSpPr>
+      <p:sp>
+        <p:nvSpPr>
+          <p:cNvPr id="2" name="Title 1">
+            <a:extLst>
+              <a:ext uri="{FF2B5EF4-FFF2-40B4-BE49-F238E27FC236}">
+                <a16:creationId xmlns:a16="http://schemas.microsoft.com/office/drawing/2014/main" id="{8665D156-403C-4612-AA65-B49BA41EDF64}"/>
+              </a:ext>
+            </a:extLst>
+          </p:cNvPr>
+          <p:cNvSpPr>
+            <a:spLocks noGrp="1"/>
+          </p:cNvSpPr>
+          <p:nvPr>
+            <p:ph type="title"/>
+          </p:nvPr>
+        </p:nvSpPr>
+        <p:spPr/>
+        <p:txBody>
+          <a:bodyPr/>
+          <a:lstStyle/>
+          <a:p>
+            <a:r>
+              <a:rPr lang="en-GB" dirty="0"/>
+              <a:t>Insert Here, Example of 5 gophers one alive, 4 dead </a:t>
+            </a:r>
+          </a:p>
+        </p:txBody>
+      </p:sp>
+      <p:sp>
+        <p:nvSpPr>
+          <p:cNvPr id="3" name="Content Placeholder 2">
+            <a:extLst>
+              <a:ext uri="{FF2B5EF4-FFF2-40B4-BE49-F238E27FC236}">
+                <a16:creationId xmlns:a16="http://schemas.microsoft.com/office/drawing/2014/main" id="{8716B298-CF10-4866-85F6-D856E1963894}"/>
+              </a:ext>
+            </a:extLst>
+          </p:cNvPr>
+          <p:cNvSpPr>
+            <a:spLocks noGrp="1"/>
+          </p:cNvSpPr>
+          <p:nvPr>
+            <p:ph idx="1"/>
+          </p:nvPr>
+        </p:nvSpPr>
+        <p:spPr/>
+        <p:txBody>
+          <a:bodyPr/>
+          <a:lstStyle/>
+          <a:p>
+            <a:endParaRPr lang="en-GB"/>
+          </a:p>
+        </p:txBody>
+      </p:sp>
+    </p:spTree>
+    <p:extLst>
+      <p:ext uri="{BB962C8B-B14F-4D97-AF65-F5344CB8AC3E}">
+        <p14:creationId xmlns:p14="http://schemas.microsoft.com/office/powerpoint/2010/main" val="3790213746"/>
       </p:ext>
     </p:extLst>
   </p:cSld>
@@ -8739,6 +9036,338 @@
     <p:extLst>
       <p:ext uri="{BB962C8B-B14F-4D97-AF65-F5344CB8AC3E}">
         <p14:creationId xmlns:p14="http://schemas.microsoft.com/office/powerpoint/2010/main" val="3147919256"/>
+      </p:ext>
+    </p:extLst>
+  </p:cSld>
+  <p:clrMapOvr>
+    <a:masterClrMapping/>
+  </p:clrMapOvr>
+</p:sld>
+</file>
+
+<file path=ppt/slides/slide30.xml><?xml version="1.0" encoding="utf-8"?>
+<p:sld xmlns:a="http://schemas.openxmlformats.org/drawingml/2006/main" xmlns:r="http://schemas.openxmlformats.org/officeDocument/2006/relationships" xmlns:p="http://schemas.openxmlformats.org/presentationml/2006/main">
+  <p:cSld>
+    <p:spTree>
+      <p:nvGrpSpPr>
+        <p:cNvPr id="1" name=""/>
+        <p:cNvGrpSpPr/>
+        <p:nvPr/>
+      </p:nvGrpSpPr>
+      <p:grpSpPr>
+        <a:xfrm>
+          <a:off x="0" y="0"/>
+          <a:ext cx="0" cy="0"/>
+          <a:chOff x="0" y="0"/>
+          <a:chExt cx="0" cy="0"/>
+        </a:xfrm>
+      </p:grpSpPr>
+      <p:sp>
+        <p:nvSpPr>
+          <p:cNvPr id="2" name="Title 1">
+            <a:extLst>
+              <a:ext uri="{FF2B5EF4-FFF2-40B4-BE49-F238E27FC236}">
+                <a16:creationId xmlns:a16="http://schemas.microsoft.com/office/drawing/2014/main" id="{B88F905B-DC9A-4E15-887A-0D816B2DA849}"/>
+              </a:ext>
+            </a:extLst>
+          </p:cNvPr>
+          <p:cNvSpPr>
+            <a:spLocks noGrp="1"/>
+          </p:cNvSpPr>
+          <p:nvPr>
+            <p:ph type="title"/>
+          </p:nvPr>
+        </p:nvSpPr>
+        <p:spPr/>
+        <p:txBody>
+          <a:bodyPr/>
+          <a:lstStyle/>
+          <a:p>
+            <a:r>
+              <a:rPr lang="en-GB" dirty="0"/>
+              <a:t>Checklist</a:t>
+            </a:r>
+          </a:p>
+        </p:txBody>
+      </p:sp>
+      <p:sp>
+        <p:nvSpPr>
+          <p:cNvPr id="3" name="Content Placeholder 2">
+            <a:extLst>
+              <a:ext uri="{FF2B5EF4-FFF2-40B4-BE49-F238E27FC236}">
+                <a16:creationId xmlns:a16="http://schemas.microsoft.com/office/drawing/2014/main" id="{14229407-2ED8-43A8-819B-30DDEB3D38EC}"/>
+              </a:ext>
+            </a:extLst>
+          </p:cNvPr>
+          <p:cNvSpPr>
+            <a:spLocks noGrp="1"/>
+          </p:cNvSpPr>
+          <p:nvPr>
+            <p:ph idx="1"/>
+          </p:nvPr>
+        </p:nvSpPr>
+        <p:spPr/>
+        <p:txBody>
+          <a:bodyPr/>
+          <a:lstStyle/>
+          <a:p>
+            <a:r>
+              <a:rPr lang="en-GB" dirty="0"/>
+              <a:t>Concurrency is not parallelism </a:t>
+            </a:r>
+            <a:r>
+              <a:rPr lang="en-GB" dirty="0">
+                <a:latin typeface="Segoe MDL2 Assets" panose="050A0102010101010101" pitchFamily="18" charset="0"/>
+              </a:rPr>
+              <a:t> </a:t>
+            </a:r>
+          </a:p>
+          <a:p>
+            <a:endParaRPr lang="en-GB" dirty="0"/>
+          </a:p>
+        </p:txBody>
+      </p:sp>
+    </p:spTree>
+    <p:extLst>
+      <p:ext uri="{BB962C8B-B14F-4D97-AF65-F5344CB8AC3E}">
+        <p14:creationId xmlns:p14="http://schemas.microsoft.com/office/powerpoint/2010/main" val="3193971414"/>
+      </p:ext>
+    </p:extLst>
+  </p:cSld>
+  <p:clrMapOvr>
+    <a:masterClrMapping/>
+  </p:clrMapOvr>
+</p:sld>
+</file>
+
+<file path=ppt/slides/slide31.xml><?xml version="1.0" encoding="utf-8"?>
+<p:sld xmlns:a="http://schemas.openxmlformats.org/drawingml/2006/main" xmlns:r="http://schemas.openxmlformats.org/officeDocument/2006/relationships" xmlns:p="http://schemas.openxmlformats.org/presentationml/2006/main">
+  <p:cSld>
+    <p:spTree>
+      <p:nvGrpSpPr>
+        <p:cNvPr id="1" name=""/>
+        <p:cNvGrpSpPr/>
+        <p:nvPr/>
+      </p:nvGrpSpPr>
+      <p:grpSpPr>
+        <a:xfrm>
+          <a:off x="0" y="0"/>
+          <a:ext cx="0" cy="0"/>
+          <a:chOff x="0" y="0"/>
+          <a:chExt cx="0" cy="0"/>
+        </a:xfrm>
+      </p:grpSpPr>
+      <p:sp>
+        <p:nvSpPr>
+          <p:cNvPr id="2" name="Title 1">
+            <a:extLst>
+              <a:ext uri="{FF2B5EF4-FFF2-40B4-BE49-F238E27FC236}">
+                <a16:creationId xmlns:a16="http://schemas.microsoft.com/office/drawing/2014/main" id="{B88F905B-DC9A-4E15-887A-0D816B2DA849}"/>
+              </a:ext>
+            </a:extLst>
+          </p:cNvPr>
+          <p:cNvSpPr>
+            <a:spLocks noGrp="1"/>
+          </p:cNvSpPr>
+          <p:nvPr>
+            <p:ph type="title"/>
+          </p:nvPr>
+        </p:nvSpPr>
+        <p:spPr/>
+        <p:txBody>
+          <a:bodyPr/>
+          <a:lstStyle/>
+          <a:p>
+            <a:r>
+              <a:rPr lang="en-GB" dirty="0"/>
+              <a:t>Checklist of Mistakes</a:t>
+            </a:r>
+          </a:p>
+        </p:txBody>
+      </p:sp>
+      <p:sp>
+        <p:nvSpPr>
+          <p:cNvPr id="3" name="Content Placeholder 2">
+            <a:extLst>
+              <a:ext uri="{FF2B5EF4-FFF2-40B4-BE49-F238E27FC236}">
+                <a16:creationId xmlns:a16="http://schemas.microsoft.com/office/drawing/2014/main" id="{14229407-2ED8-43A8-819B-30DDEB3D38EC}"/>
+              </a:ext>
+            </a:extLst>
+          </p:cNvPr>
+          <p:cNvSpPr>
+            <a:spLocks noGrp="1"/>
+          </p:cNvSpPr>
+          <p:nvPr>
+            <p:ph idx="1"/>
+          </p:nvPr>
+        </p:nvSpPr>
+        <p:spPr/>
+        <p:txBody>
+          <a:bodyPr/>
+          <a:lstStyle/>
+          <a:p>
+            <a:r>
+              <a:rPr lang="en-GB" dirty="0"/>
+              <a:t>Concurrency is not parallelism </a:t>
+            </a:r>
+            <a:r>
+              <a:rPr lang="en-GB" dirty="0">
+                <a:latin typeface="Segoe MDL2 Assets" panose="050A0102010101010101" pitchFamily="18" charset="0"/>
+              </a:rPr>
+              <a:t> </a:t>
+            </a:r>
+          </a:p>
+          <a:p>
+            <a:r>
+              <a:rPr lang="en-GB" dirty="0"/>
+              <a:t>You can read from maps concurrently, but you can not write to maps.</a:t>
+            </a:r>
+          </a:p>
+          <a:p>
+            <a:r>
+              <a:rPr lang="en-GB"/>
+              <a:t>Importance </a:t>
+            </a:r>
+            <a:r>
+              <a:rPr lang="en-GB" dirty="0"/>
+              <a:t>of structure to avoid circular dependencies and for ease of readability </a:t>
+            </a:r>
+            <a:r>
+              <a:rPr lang="en-GB" dirty="0">
+                <a:latin typeface="Segoe MDL2 Assets" panose="050A0102010101010101" pitchFamily="18" charset="0"/>
+              </a:rPr>
+              <a:t></a:t>
+            </a:r>
+          </a:p>
+          <a:p>
+            <a:r>
+              <a:rPr lang="en-GB" dirty="0"/>
+              <a:t>By saving your files where the GOPATH is you can access local packages without using relative paths. </a:t>
+            </a:r>
+            <a:endParaRPr lang="en-GB" dirty="0">
+              <a:latin typeface="Segoe MDL2 Assets" panose="050A0102010101010101" pitchFamily="18" charset="0"/>
+            </a:endParaRPr>
+          </a:p>
+          <a:p>
+            <a:endParaRPr lang="en-GB" dirty="0"/>
+          </a:p>
+        </p:txBody>
+      </p:sp>
+    </p:spTree>
+    <p:extLst>
+      <p:ext uri="{BB962C8B-B14F-4D97-AF65-F5344CB8AC3E}">
+        <p14:creationId xmlns:p14="http://schemas.microsoft.com/office/powerpoint/2010/main" val="1348224757"/>
+      </p:ext>
+    </p:extLst>
+  </p:cSld>
+  <p:clrMapOvr>
+    <a:masterClrMapping/>
+  </p:clrMapOvr>
+</p:sld>
+</file>
+
+<file path=ppt/slides/slide32.xml><?xml version="1.0" encoding="utf-8"?>
+<p:sld xmlns:a="http://schemas.openxmlformats.org/drawingml/2006/main" xmlns:r="http://schemas.openxmlformats.org/officeDocument/2006/relationships" xmlns:p="http://schemas.openxmlformats.org/presentationml/2006/main">
+  <p:cSld>
+    <p:spTree>
+      <p:nvGrpSpPr>
+        <p:cNvPr id="1" name=""/>
+        <p:cNvGrpSpPr/>
+        <p:nvPr/>
+      </p:nvGrpSpPr>
+      <p:grpSpPr>
+        <a:xfrm>
+          <a:off x="0" y="0"/>
+          <a:ext cx="0" cy="0"/>
+          <a:chOff x="0" y="0"/>
+          <a:chExt cx="0" cy="0"/>
+        </a:xfrm>
+      </p:grpSpPr>
+      <p:sp>
+        <p:nvSpPr>
+          <p:cNvPr id="2" name="Title 1">
+            <a:extLst>
+              <a:ext uri="{FF2B5EF4-FFF2-40B4-BE49-F238E27FC236}">
+                <a16:creationId xmlns:a16="http://schemas.microsoft.com/office/drawing/2014/main" id="{8CEAC96E-108C-4D0F-8090-857DB6659B57}"/>
+              </a:ext>
+            </a:extLst>
+          </p:cNvPr>
+          <p:cNvSpPr>
+            <a:spLocks noGrp="1"/>
+          </p:cNvSpPr>
+          <p:nvPr>
+            <p:ph type="title"/>
+          </p:nvPr>
+        </p:nvSpPr>
+        <p:spPr/>
+        <p:txBody>
+          <a:bodyPr/>
+          <a:lstStyle/>
+          <a:p>
+            <a:r>
+              <a:rPr lang="en-GB" dirty="0"/>
+              <a:t>Solution: Modelling the lives of </a:t>
+            </a:r>
+            <a:br>
+              <a:rPr lang="en-GB" dirty="0"/>
+            </a:br>
+            <a:r>
+              <a:rPr lang="en-GB" dirty="0"/>
+              <a:t>1 million Gophers</a:t>
+            </a:r>
+          </a:p>
+        </p:txBody>
+      </p:sp>
+      <p:sp>
+        <p:nvSpPr>
+          <p:cNvPr id="3" name="Content Placeholder 2">
+            <a:extLst>
+              <a:ext uri="{FF2B5EF4-FFF2-40B4-BE49-F238E27FC236}">
+                <a16:creationId xmlns:a16="http://schemas.microsoft.com/office/drawing/2014/main" id="{8AE99B8D-47E8-4045-8955-7E893F2A54A8}"/>
+              </a:ext>
+            </a:extLst>
+          </p:cNvPr>
+          <p:cNvSpPr>
+            <a:spLocks noGrp="1"/>
+          </p:cNvSpPr>
+          <p:nvPr>
+            <p:ph idx="1"/>
+          </p:nvPr>
+        </p:nvSpPr>
+        <p:spPr/>
+        <p:txBody>
+          <a:bodyPr/>
+          <a:lstStyle/>
+          <a:p>
+            <a:r>
+              <a:rPr lang="en-GB" dirty="0"/>
+              <a:t>Create a PowerPoint presentation talking about the cyclical nature of Learning how to Program. </a:t>
+            </a:r>
+          </a:p>
+          <a:p>
+            <a:endParaRPr lang="en-GB" dirty="0"/>
+          </a:p>
+          <a:p>
+            <a:r>
+              <a:rPr lang="en-GB" dirty="0"/>
+              <a:t>For Newcomers</a:t>
+            </a:r>
+          </a:p>
+          <a:p>
+            <a:endParaRPr lang="en-GB" dirty="0"/>
+          </a:p>
+          <a:p>
+            <a:r>
+              <a:rPr lang="en-GB" dirty="0"/>
+              <a:t>Talk about how by making a presentation those who aren’t Gopher or are new Gophers might see the first steps </a:t>
+            </a:r>
+          </a:p>
+        </p:txBody>
+      </p:sp>
+    </p:spTree>
+    <p:extLst>
+      <p:ext uri="{BB962C8B-B14F-4D97-AF65-F5344CB8AC3E}">
+        <p14:creationId xmlns:p14="http://schemas.microsoft.com/office/powerpoint/2010/main" val="18358553"/>
       </p:ext>
     </p:extLst>
   </p:cSld>
@@ -8895,7 +9524,12 @@
             <p:ph idx="1"/>
           </p:nvPr>
         </p:nvSpPr>
-        <p:spPr/>
+        <p:spPr>
+          <a:xfrm>
+            <a:off x="1103312" y="2052918"/>
+            <a:ext cx="6194955" cy="4195481"/>
+          </a:xfrm>
+        </p:spPr>
         <p:txBody>
           <a:bodyPr/>
           <a:lstStyle/>
@@ -8906,6 +9540,9 @@
             </a:r>
           </a:p>
           <a:p>
+            <a:endParaRPr lang="en-GB" dirty="0"/>
+          </a:p>
+          <a:p>
             <a:r>
               <a:rPr lang="en-GB" dirty="0"/>
               <a:t>Or At least build the framework for it. </a:t>
@@ -8913,6 +9550,42 @@
           </a:p>
         </p:txBody>
       </p:sp>
+      <p:pic>
+        <p:nvPicPr>
+          <p:cNvPr id="6" name="Picture 5">
+            <a:extLst>
+              <a:ext uri="{FF2B5EF4-FFF2-40B4-BE49-F238E27FC236}">
+                <a16:creationId xmlns:a16="http://schemas.microsoft.com/office/drawing/2014/main" id="{9378717A-1D2F-4DA1-A508-A543F6288D06}"/>
+              </a:ext>
+            </a:extLst>
+          </p:cNvPr>
+          <p:cNvPicPr>
+            <a:picLocks noChangeAspect="1"/>
+          </p:cNvPicPr>
+          <p:nvPr/>
+        </p:nvPicPr>
+        <p:blipFill>
+          <a:blip r:embed="rId2">
+            <a:extLst>
+              <a:ext uri="{28A0092B-C50C-407E-A947-70E740481C1C}">
+                <a14:useLocalDpi xmlns:a14="http://schemas.microsoft.com/office/drawing/2010/main" val="0"/>
+              </a:ext>
+            </a:extLst>
+          </a:blip>
+          <a:stretch>
+            <a:fillRect/>
+          </a:stretch>
+        </p:blipFill>
+        <p:spPr>
+          <a:xfrm>
+            <a:off x="7829531" y="2347258"/>
+            <a:ext cx="3259157" cy="3606800"/>
+          </a:xfrm>
+          <a:prstGeom prst="rect">
+            <a:avLst/>
+          </a:prstGeom>
+        </p:spPr>
+      </p:pic>
     </p:spTree>
     <p:extLst>
       <p:ext uri="{BB962C8B-B14F-4D97-AF65-F5344CB8AC3E}">

</xml_diff>

<commit_message>
Added Benchmark tests tweaked world size
</commit_message>
<xml_diff>
--- a/GopherLife.pptx
+++ b/GopherLife.pptx
@@ -5,7 +5,7 @@
     <p:sldMasterId id="2147483678" r:id="rId1"/>
   </p:sldMasterIdLst>
   <p:notesMasterIdLst>
-    <p:notesMasterId r:id="rId34"/>
+    <p:notesMasterId r:id="rId35"/>
   </p:notesMasterIdLst>
   <p:sldIdLst>
     <p:sldId id="256" r:id="rId2"/>
@@ -28,18 +28,19 @@
     <p:sldId id="288" r:id="rId19"/>
     <p:sldId id="283" r:id="rId20"/>
     <p:sldId id="284" r:id="rId21"/>
-    <p:sldId id="285" r:id="rId22"/>
-    <p:sldId id="287" r:id="rId23"/>
-    <p:sldId id="286" r:id="rId24"/>
-    <p:sldId id="266" r:id="rId25"/>
-    <p:sldId id="257" r:id="rId26"/>
-    <p:sldId id="258" r:id="rId27"/>
-    <p:sldId id="259" r:id="rId28"/>
-    <p:sldId id="261" r:id="rId29"/>
-    <p:sldId id="263" r:id="rId30"/>
-    <p:sldId id="262" r:id="rId31"/>
-    <p:sldId id="264" r:id="rId32"/>
-    <p:sldId id="279" r:id="rId33"/>
+    <p:sldId id="289" r:id="rId22"/>
+    <p:sldId id="285" r:id="rId23"/>
+    <p:sldId id="287" r:id="rId24"/>
+    <p:sldId id="286" r:id="rId25"/>
+    <p:sldId id="266" r:id="rId26"/>
+    <p:sldId id="257" r:id="rId27"/>
+    <p:sldId id="258" r:id="rId28"/>
+    <p:sldId id="259" r:id="rId29"/>
+    <p:sldId id="261" r:id="rId30"/>
+    <p:sldId id="263" r:id="rId31"/>
+    <p:sldId id="262" r:id="rId32"/>
+    <p:sldId id="264" r:id="rId33"/>
+    <p:sldId id="279" r:id="rId34"/>
   </p:sldIdLst>
   <p:sldSz cx="12192000" cy="6858000"/>
   <p:notesSz cx="6858000" cy="9144000"/>
@@ -228,7 +229,7 @@
           <a:p>
             <a:fld id="{4F997A0C-E4B2-467D-ABDF-C6BB0AD1437F}" type="datetimeFigureOut">
               <a:rPr lang="en-GB" smtClean="0"/>
-              <a:t>03/10/2018</a:t>
+              <a:t>18/11/2018</a:t>
             </a:fld>
             <a:endParaRPr lang="en-GB"/>
           </a:p>
@@ -564,7 +565,7 @@
           <a:p>
             <a:fld id="{D37E09BB-0EE2-4AA1-9043-B532D0F5CCDE}" type="slidenum">
               <a:rPr lang="en-GB" smtClean="0"/>
-              <a:t>28</a:t>
+              <a:t>29</a:t>
             </a:fld>
             <a:endParaRPr lang="en-GB"/>
           </a:p>
@@ -769,7 +770,7 @@
           <a:p>
             <a:fld id="{55E4148D-2AA3-4A29-8641-0082B7E18494}" type="datetimeFigureOut">
               <a:rPr lang="en-GB" smtClean="0"/>
-              <a:t>03/10/2018</a:t>
+              <a:t>18/11/2018</a:t>
             </a:fld>
             <a:endParaRPr lang="en-GB"/>
           </a:p>
@@ -1044,7 +1045,7 @@
           <a:p>
             <a:fld id="{55E4148D-2AA3-4A29-8641-0082B7E18494}" type="datetimeFigureOut">
               <a:rPr lang="en-GB" smtClean="0"/>
-              <a:t>03/10/2018</a:t>
+              <a:t>18/11/2018</a:t>
             </a:fld>
             <a:endParaRPr lang="en-GB"/>
           </a:p>
@@ -1238,7 +1239,7 @@
           <a:p>
             <a:fld id="{55E4148D-2AA3-4A29-8641-0082B7E18494}" type="datetimeFigureOut">
               <a:rPr lang="en-GB" smtClean="0"/>
-              <a:t>03/10/2018</a:t>
+              <a:t>18/11/2018</a:t>
             </a:fld>
             <a:endParaRPr lang="en-GB"/>
           </a:p>
@@ -1511,7 +1512,7 @@
           <a:p>
             <a:fld id="{55E4148D-2AA3-4A29-8641-0082B7E18494}" type="datetimeFigureOut">
               <a:rPr lang="en-GB" smtClean="0"/>
-              <a:t>03/10/2018</a:t>
+              <a:t>18/11/2018</a:t>
             </a:fld>
             <a:endParaRPr lang="en-GB"/>
           </a:p>
@@ -1852,7 +1853,7 @@
           <a:p>
             <a:fld id="{55E4148D-2AA3-4A29-8641-0082B7E18494}" type="datetimeFigureOut">
               <a:rPr lang="en-GB" smtClean="0"/>
-              <a:t>03/10/2018</a:t>
+              <a:t>18/11/2018</a:t>
             </a:fld>
             <a:endParaRPr lang="en-GB"/>
           </a:p>
@@ -2475,7 +2476,7 @@
           <a:p>
             <a:fld id="{55E4148D-2AA3-4A29-8641-0082B7E18494}" type="datetimeFigureOut">
               <a:rPr lang="en-GB" smtClean="0"/>
-              <a:t>03/10/2018</a:t>
+              <a:t>18/11/2018</a:t>
             </a:fld>
             <a:endParaRPr lang="en-GB"/>
           </a:p>
@@ -3335,7 +3336,7 @@
           <a:p>
             <a:fld id="{55E4148D-2AA3-4A29-8641-0082B7E18494}" type="datetimeFigureOut">
               <a:rPr lang="en-GB" smtClean="0"/>
-              <a:t>03/10/2018</a:t>
+              <a:t>18/11/2018</a:t>
             </a:fld>
             <a:endParaRPr lang="en-GB"/>
           </a:p>
@@ -3505,7 +3506,7 @@
           <a:p>
             <a:fld id="{55E4148D-2AA3-4A29-8641-0082B7E18494}" type="datetimeFigureOut">
               <a:rPr lang="en-GB" smtClean="0"/>
-              <a:t>03/10/2018</a:t>
+              <a:t>18/11/2018</a:t>
             </a:fld>
             <a:endParaRPr lang="en-GB"/>
           </a:p>
@@ -3685,7 +3686,7 @@
           <a:p>
             <a:fld id="{55E4148D-2AA3-4A29-8641-0082B7E18494}" type="datetimeFigureOut">
               <a:rPr lang="en-GB" smtClean="0"/>
-              <a:t>03/10/2018</a:t>
+              <a:t>18/11/2018</a:t>
             </a:fld>
             <a:endParaRPr lang="en-GB"/>
           </a:p>
@@ -3855,7 +3856,7 @@
           <a:p>
             <a:fld id="{55E4148D-2AA3-4A29-8641-0082B7E18494}" type="datetimeFigureOut">
               <a:rPr lang="en-GB" smtClean="0"/>
-              <a:t>03/10/2018</a:t>
+              <a:t>18/11/2018</a:t>
             </a:fld>
             <a:endParaRPr lang="en-GB"/>
           </a:p>
@@ -4102,7 +4103,7 @@
           <a:p>
             <a:fld id="{55E4148D-2AA3-4A29-8641-0082B7E18494}" type="datetimeFigureOut">
               <a:rPr lang="en-GB" smtClean="0"/>
-              <a:t>03/10/2018</a:t>
+              <a:t>18/11/2018</a:t>
             </a:fld>
             <a:endParaRPr lang="en-GB"/>
           </a:p>
@@ -4394,7 +4395,7 @@
           <a:p>
             <a:fld id="{55E4148D-2AA3-4A29-8641-0082B7E18494}" type="datetimeFigureOut">
               <a:rPr lang="en-GB" smtClean="0"/>
-              <a:t>03/10/2018</a:t>
+              <a:t>18/11/2018</a:t>
             </a:fld>
             <a:endParaRPr lang="en-GB"/>
           </a:p>
@@ -4838,7 +4839,7 @@
           <a:p>
             <a:fld id="{55E4148D-2AA3-4A29-8641-0082B7E18494}" type="datetimeFigureOut">
               <a:rPr lang="en-GB" smtClean="0"/>
-              <a:t>03/10/2018</a:t>
+              <a:t>18/11/2018</a:t>
             </a:fld>
             <a:endParaRPr lang="en-GB"/>
           </a:p>
@@ -4956,7 +4957,7 @@
           <a:p>
             <a:fld id="{55E4148D-2AA3-4A29-8641-0082B7E18494}" type="datetimeFigureOut">
               <a:rPr lang="en-GB" smtClean="0"/>
-              <a:t>03/10/2018</a:t>
+              <a:t>18/11/2018</a:t>
             </a:fld>
             <a:endParaRPr lang="en-GB"/>
           </a:p>
@@ -5051,7 +5052,7 @@
           <a:p>
             <a:fld id="{55E4148D-2AA3-4A29-8641-0082B7E18494}" type="datetimeFigureOut">
               <a:rPr lang="en-GB" smtClean="0"/>
-              <a:t>03/10/2018</a:t>
+              <a:t>18/11/2018</a:t>
             </a:fld>
             <a:endParaRPr lang="en-GB"/>
           </a:p>
@@ -5330,7 +5331,7 @@
           <a:p>
             <a:fld id="{55E4148D-2AA3-4A29-8641-0082B7E18494}" type="datetimeFigureOut">
               <a:rPr lang="en-GB" smtClean="0"/>
-              <a:t>03/10/2018</a:t>
+              <a:t>18/11/2018</a:t>
             </a:fld>
             <a:endParaRPr lang="en-GB"/>
           </a:p>
@@ -5605,7 +5606,7 @@
           <a:p>
             <a:fld id="{55E4148D-2AA3-4A29-8641-0082B7E18494}" type="datetimeFigureOut">
               <a:rPr lang="en-GB" smtClean="0"/>
-              <a:t>03/10/2018</a:t>
+              <a:t>18/11/2018</a:t>
             </a:fld>
             <a:endParaRPr lang="en-GB"/>
           </a:p>
@@ -6034,7 +6035,7 @@
           <a:p>
             <a:fld id="{55E4148D-2AA3-4A29-8641-0082B7E18494}" type="datetimeFigureOut">
               <a:rPr lang="en-GB" smtClean="0"/>
-              <a:t>03/10/2018</a:t>
+              <a:t>18/11/2018</a:t>
             </a:fld>
             <a:endParaRPr lang="en-GB"/>
           </a:p>
@@ -8164,7 +8165,7 @@
           <p:cNvPr id="2" name="Title 1">
             <a:extLst>
               <a:ext uri="{FF2B5EF4-FFF2-40B4-BE49-F238E27FC236}">
-                <a16:creationId xmlns:a16="http://schemas.microsoft.com/office/drawing/2014/main" id="{5F649051-170D-4D88-A1EB-CD53B67517C2}"/>
+                <a16:creationId xmlns:a16="http://schemas.microsoft.com/office/drawing/2014/main" id="{75C50CEC-C87D-40B9-990D-303CFFD16359}"/>
               </a:ext>
             </a:extLst>
           </p:cNvPr>
@@ -8182,7 +8183,7 @@
           <a:p>
             <a:r>
               <a:rPr lang="en-GB" dirty="0"/>
-              <a:t>Final Showcase</a:t>
+              <a:t>Problem 5 - Speed</a:t>
             </a:r>
           </a:p>
         </p:txBody>
@@ -8192,7 +8193,7 @@
           <p:cNvPr id="3" name="Content Placeholder 2">
             <a:extLst>
               <a:ext uri="{FF2B5EF4-FFF2-40B4-BE49-F238E27FC236}">
-                <a16:creationId xmlns:a16="http://schemas.microsoft.com/office/drawing/2014/main" id="{E28FB5CC-2E35-4352-B03D-454660443443}"/>
+                <a16:creationId xmlns:a16="http://schemas.microsoft.com/office/drawing/2014/main" id="{6CE96895-52F6-414F-B7B4-DBAF2D31353D}"/>
               </a:ext>
             </a:extLst>
           </p:cNvPr>
@@ -8208,14 +8209,17 @@
           <a:bodyPr/>
           <a:lstStyle/>
           <a:p>
-            <a:endParaRPr lang="en-GB"/>
+            <a:r>
+              <a:rPr lang="en-GB"/>
+              <a:t>Mutexs</a:t>
+            </a:r>
           </a:p>
         </p:txBody>
       </p:sp>
     </p:spTree>
     <p:extLst>
       <p:ext uri="{BB962C8B-B14F-4D97-AF65-F5344CB8AC3E}">
-        <p14:creationId xmlns:p14="http://schemas.microsoft.com/office/powerpoint/2010/main" val="2232509740"/>
+        <p14:creationId xmlns:p14="http://schemas.microsoft.com/office/powerpoint/2010/main" val="1147479734"/>
       </p:ext>
     </p:extLst>
   </p:cSld>
@@ -8247,7 +8251,7 @@
           <p:cNvPr id="2" name="Title 1">
             <a:extLst>
               <a:ext uri="{FF2B5EF4-FFF2-40B4-BE49-F238E27FC236}">
-                <a16:creationId xmlns:a16="http://schemas.microsoft.com/office/drawing/2014/main" id="{6CDC4756-BE7A-4B78-81FE-29031289A2AD}"/>
+                <a16:creationId xmlns:a16="http://schemas.microsoft.com/office/drawing/2014/main" id="{5F649051-170D-4D88-A1EB-CD53B67517C2}"/>
               </a:ext>
             </a:extLst>
           </p:cNvPr>
@@ -8265,7 +8269,7 @@
           <a:p>
             <a:r>
               <a:rPr lang="en-GB" dirty="0"/>
-              <a:t>Final Checklist </a:t>
+              <a:t>Final Showcase</a:t>
             </a:r>
           </a:p>
         </p:txBody>
@@ -8275,7 +8279,7 @@
           <p:cNvPr id="3" name="Content Placeholder 2">
             <a:extLst>
               <a:ext uri="{FF2B5EF4-FFF2-40B4-BE49-F238E27FC236}">
-                <a16:creationId xmlns:a16="http://schemas.microsoft.com/office/drawing/2014/main" id="{07D7EF34-638C-4C71-99D1-10742B4D9377}"/>
+                <a16:creationId xmlns:a16="http://schemas.microsoft.com/office/drawing/2014/main" id="{E28FB5CC-2E35-4352-B03D-454660443443}"/>
               </a:ext>
             </a:extLst>
           </p:cNvPr>
@@ -8298,7 +8302,7 @@
     </p:spTree>
     <p:extLst>
       <p:ext uri="{BB962C8B-B14F-4D97-AF65-F5344CB8AC3E}">
-        <p14:creationId xmlns:p14="http://schemas.microsoft.com/office/powerpoint/2010/main" val="2595392705"/>
+        <p14:creationId xmlns:p14="http://schemas.microsoft.com/office/powerpoint/2010/main" val="2232509740"/>
       </p:ext>
     </p:extLst>
   </p:cSld>
@@ -8330,7 +8334,7 @@
           <p:cNvPr id="2" name="Title 1">
             <a:extLst>
               <a:ext uri="{FF2B5EF4-FFF2-40B4-BE49-F238E27FC236}">
-                <a16:creationId xmlns:a16="http://schemas.microsoft.com/office/drawing/2014/main" id="{C6A1F8BE-8B71-4987-BE2C-B485EE46CDB8}"/>
+                <a16:creationId xmlns:a16="http://schemas.microsoft.com/office/drawing/2014/main" id="{6CDC4756-BE7A-4B78-81FE-29031289A2AD}"/>
               </a:ext>
             </a:extLst>
           </p:cNvPr>
@@ -8348,7 +8352,7 @@
           <a:p>
             <a:r>
               <a:rPr lang="en-GB" dirty="0"/>
-              <a:t>Conclusion</a:t>
+              <a:t>Final Checklist </a:t>
             </a:r>
           </a:p>
         </p:txBody>
@@ -8358,7 +8362,7 @@
           <p:cNvPr id="3" name="Content Placeholder 2">
             <a:extLst>
               <a:ext uri="{FF2B5EF4-FFF2-40B4-BE49-F238E27FC236}">
-                <a16:creationId xmlns:a16="http://schemas.microsoft.com/office/drawing/2014/main" id="{C6489CD9-246E-4EF9-8A1F-DF0D212B8A29}"/>
+                <a16:creationId xmlns:a16="http://schemas.microsoft.com/office/drawing/2014/main" id="{07D7EF34-638C-4C71-99D1-10742B4D9377}"/>
               </a:ext>
             </a:extLst>
           </p:cNvPr>
@@ -8381,7 +8385,7 @@
     </p:spTree>
     <p:extLst>
       <p:ext uri="{BB962C8B-B14F-4D97-AF65-F5344CB8AC3E}">
-        <p14:creationId xmlns:p14="http://schemas.microsoft.com/office/powerpoint/2010/main" val="2651521754"/>
+        <p14:creationId xmlns:p14="http://schemas.microsoft.com/office/powerpoint/2010/main" val="2595392705"/>
       </p:ext>
     </p:extLst>
   </p:cSld>
@@ -8413,7 +8417,7 @@
           <p:cNvPr id="2" name="Title 1">
             <a:extLst>
               <a:ext uri="{FF2B5EF4-FFF2-40B4-BE49-F238E27FC236}">
-                <a16:creationId xmlns:a16="http://schemas.microsoft.com/office/drawing/2014/main" id="{DDA23A98-14C6-40E0-A90C-6468725EFA2C}"/>
+                <a16:creationId xmlns:a16="http://schemas.microsoft.com/office/drawing/2014/main" id="{C6A1F8BE-8B71-4987-BE2C-B485EE46CDB8}"/>
               </a:ext>
             </a:extLst>
           </p:cNvPr>
@@ -8431,7 +8435,7 @@
           <a:p>
             <a:r>
               <a:rPr lang="en-GB" dirty="0"/>
-              <a:t>Perseverance</a:t>
+              <a:t>Conclusion</a:t>
             </a:r>
           </a:p>
         </p:txBody>
@@ -8441,7 +8445,7 @@
           <p:cNvPr id="3" name="Content Placeholder 2">
             <a:extLst>
               <a:ext uri="{FF2B5EF4-FFF2-40B4-BE49-F238E27FC236}">
-                <a16:creationId xmlns:a16="http://schemas.microsoft.com/office/drawing/2014/main" id="{B7866C6F-7AB4-4FF2-AC93-597F73926565}"/>
+                <a16:creationId xmlns:a16="http://schemas.microsoft.com/office/drawing/2014/main" id="{C6489CD9-246E-4EF9-8A1F-DF0D212B8A29}"/>
               </a:ext>
             </a:extLst>
           </p:cNvPr>
@@ -8457,23 +8461,14 @@
           <a:bodyPr/>
           <a:lstStyle/>
           <a:p>
-            <a:r>
-              <a:rPr lang="en-GB" dirty="0"/>
-              <a:t>Talking about your project with other developers </a:t>
-            </a:r>
-          </a:p>
-          <a:p>
-            <a:r>
-              <a:rPr lang="en-GB" dirty="0"/>
-              <a:t>Getting help</a:t>
-            </a:r>
+            <a:endParaRPr lang="en-GB"/>
           </a:p>
         </p:txBody>
       </p:sp>
     </p:spTree>
     <p:extLst>
       <p:ext uri="{BB962C8B-B14F-4D97-AF65-F5344CB8AC3E}">
-        <p14:creationId xmlns:p14="http://schemas.microsoft.com/office/powerpoint/2010/main" val="847199732"/>
+        <p14:creationId xmlns:p14="http://schemas.microsoft.com/office/powerpoint/2010/main" val="2651521754"/>
       </p:ext>
     </p:extLst>
   </p:cSld>
@@ -8505,7 +8500,7 @@
           <p:cNvPr id="2" name="Title 1">
             <a:extLst>
               <a:ext uri="{FF2B5EF4-FFF2-40B4-BE49-F238E27FC236}">
-                <a16:creationId xmlns:a16="http://schemas.microsoft.com/office/drawing/2014/main" id="{CFF32C6C-3D00-4977-9425-46509C1A3129}"/>
+                <a16:creationId xmlns:a16="http://schemas.microsoft.com/office/drawing/2014/main" id="{DDA23A98-14C6-40E0-A90C-6468725EFA2C}"/>
               </a:ext>
             </a:extLst>
           </p:cNvPr>
@@ -8523,7 +8518,7 @@
           <a:p>
             <a:r>
               <a:rPr lang="en-GB" dirty="0"/>
-              <a:t>Go – Starter Pack</a:t>
+              <a:t>Perseverance</a:t>
             </a:r>
           </a:p>
         </p:txBody>
@@ -8533,7 +8528,7 @@
           <p:cNvPr id="3" name="Content Placeholder 2">
             <a:extLst>
               <a:ext uri="{FF2B5EF4-FFF2-40B4-BE49-F238E27FC236}">
-                <a16:creationId xmlns:a16="http://schemas.microsoft.com/office/drawing/2014/main" id="{3B81F4FB-26EB-4DA4-9507-E147BFC741B8}"/>
+                <a16:creationId xmlns:a16="http://schemas.microsoft.com/office/drawing/2014/main" id="{B7866C6F-7AB4-4FF2-AC93-597F73926565}"/>
               </a:ext>
             </a:extLst>
           </p:cNvPr>
@@ -8551,24 +8546,21 @@
           <a:p>
             <a:r>
               <a:rPr lang="en-GB" dirty="0"/>
-              <a:t>Installing GO. </a:t>
+              <a:t>Talking about your project with other developers </a:t>
             </a:r>
           </a:p>
           <a:p>
             <a:r>
               <a:rPr lang="en-GB" dirty="0"/>
-              <a:t>Learning the syntax</a:t>
-            </a:r>
-          </a:p>
-          <a:p>
-            <a:endParaRPr lang="en-GB" dirty="0"/>
+              <a:t>Getting help</a:t>
+            </a:r>
           </a:p>
         </p:txBody>
       </p:sp>
     </p:spTree>
     <p:extLst>
       <p:ext uri="{BB962C8B-B14F-4D97-AF65-F5344CB8AC3E}">
-        <p14:creationId xmlns:p14="http://schemas.microsoft.com/office/powerpoint/2010/main" val="1566399315"/>
+        <p14:creationId xmlns:p14="http://schemas.microsoft.com/office/powerpoint/2010/main" val="847199732"/>
       </p:ext>
     </p:extLst>
   </p:cSld>
@@ -8600,7 +8592,7 @@
           <p:cNvPr id="2" name="Title 1">
             <a:extLst>
               <a:ext uri="{FF2B5EF4-FFF2-40B4-BE49-F238E27FC236}">
-                <a16:creationId xmlns:a16="http://schemas.microsoft.com/office/drawing/2014/main" id="{F791C732-68FC-4DBF-A925-B9A44335C54F}"/>
+                <a16:creationId xmlns:a16="http://schemas.microsoft.com/office/drawing/2014/main" id="{CFF32C6C-3D00-4977-9425-46509C1A3129}"/>
               </a:ext>
             </a:extLst>
           </p:cNvPr>
@@ -8618,7 +8610,7 @@
           <a:p>
             <a:r>
               <a:rPr lang="en-GB" dirty="0"/>
-              <a:t>Finding A Catalyst</a:t>
+              <a:t>Go – Starter Pack</a:t>
             </a:r>
           </a:p>
         </p:txBody>
@@ -8628,7 +8620,7 @@
           <p:cNvPr id="3" name="Content Placeholder 2">
             <a:extLst>
               <a:ext uri="{FF2B5EF4-FFF2-40B4-BE49-F238E27FC236}">
-                <a16:creationId xmlns:a16="http://schemas.microsoft.com/office/drawing/2014/main" id="{C206744A-0D9B-4231-BD87-CF25D90A8004}"/>
+                <a16:creationId xmlns:a16="http://schemas.microsoft.com/office/drawing/2014/main" id="{3B81F4FB-26EB-4DA4-9507-E147BFC741B8}"/>
               </a:ext>
             </a:extLst>
           </p:cNvPr>
@@ -8644,14 +8636,26 @@
           <a:bodyPr/>
           <a:lstStyle/>
           <a:p>
-            <a:endParaRPr lang="en-GB"/>
+            <a:r>
+              <a:rPr lang="en-GB" dirty="0"/>
+              <a:t>Installing GO. </a:t>
+            </a:r>
+          </a:p>
+          <a:p>
+            <a:r>
+              <a:rPr lang="en-GB" dirty="0"/>
+              <a:t>Learning the syntax</a:t>
+            </a:r>
+          </a:p>
+          <a:p>
+            <a:endParaRPr lang="en-GB" dirty="0"/>
           </a:p>
         </p:txBody>
       </p:sp>
     </p:spTree>
     <p:extLst>
       <p:ext uri="{BB962C8B-B14F-4D97-AF65-F5344CB8AC3E}">
-        <p14:creationId xmlns:p14="http://schemas.microsoft.com/office/powerpoint/2010/main" val="4016827040"/>
+        <p14:creationId xmlns:p14="http://schemas.microsoft.com/office/powerpoint/2010/main" val="1566399315"/>
       </p:ext>
     </p:extLst>
   </p:cSld>
@@ -8683,7 +8687,7 @@
           <p:cNvPr id="2" name="Title 1">
             <a:extLst>
               <a:ext uri="{FF2B5EF4-FFF2-40B4-BE49-F238E27FC236}">
-                <a16:creationId xmlns:a16="http://schemas.microsoft.com/office/drawing/2014/main" id="{32F06B3C-EA2D-46B1-AB79-08EFA8CCC0C1}"/>
+                <a16:creationId xmlns:a16="http://schemas.microsoft.com/office/drawing/2014/main" id="{F791C732-68FC-4DBF-A925-B9A44335C54F}"/>
               </a:ext>
             </a:extLst>
           </p:cNvPr>
@@ -8701,7 +8705,7 @@
           <a:p>
             <a:r>
               <a:rPr lang="en-GB" dirty="0"/>
-              <a:t>Managing Scope and Completing Projects</a:t>
+              <a:t>Finding A Catalyst</a:t>
             </a:r>
           </a:p>
         </p:txBody>
@@ -8711,7 +8715,7 @@
           <p:cNvPr id="3" name="Content Placeholder 2">
             <a:extLst>
               <a:ext uri="{FF2B5EF4-FFF2-40B4-BE49-F238E27FC236}">
-                <a16:creationId xmlns:a16="http://schemas.microsoft.com/office/drawing/2014/main" id="{D2524174-1A6E-43AD-AFB4-E3F8B9B5D53A}"/>
+                <a16:creationId xmlns:a16="http://schemas.microsoft.com/office/drawing/2014/main" id="{C206744A-0D9B-4231-BD87-CF25D90A8004}"/>
               </a:ext>
             </a:extLst>
           </p:cNvPr>
@@ -8734,7 +8738,7 @@
     </p:spTree>
     <p:extLst>
       <p:ext uri="{BB962C8B-B14F-4D97-AF65-F5344CB8AC3E}">
-        <p14:creationId xmlns:p14="http://schemas.microsoft.com/office/powerpoint/2010/main" val="1162966501"/>
+        <p14:creationId xmlns:p14="http://schemas.microsoft.com/office/powerpoint/2010/main" val="4016827040"/>
       </p:ext>
     </p:extLst>
   </p:cSld>
@@ -8766,7 +8770,7 @@
           <p:cNvPr id="2" name="Title 1">
             <a:extLst>
               <a:ext uri="{FF2B5EF4-FFF2-40B4-BE49-F238E27FC236}">
-                <a16:creationId xmlns:a16="http://schemas.microsoft.com/office/drawing/2014/main" id="{F106CE47-2D88-4386-9645-6FF2058FA701}"/>
+                <a16:creationId xmlns:a16="http://schemas.microsoft.com/office/drawing/2014/main" id="{32F06B3C-EA2D-46B1-AB79-08EFA8CCC0C1}"/>
               </a:ext>
             </a:extLst>
           </p:cNvPr>
@@ -8784,7 +8788,7 @@
           <a:p>
             <a:r>
               <a:rPr lang="en-GB" dirty="0"/>
-              <a:t>Getting past the feeling of pointlessness</a:t>
+              <a:t>Managing Scope and Completing Projects</a:t>
             </a:r>
           </a:p>
         </p:txBody>
@@ -8794,7 +8798,7 @@
           <p:cNvPr id="3" name="Content Placeholder 2">
             <a:extLst>
               <a:ext uri="{FF2B5EF4-FFF2-40B4-BE49-F238E27FC236}">
-                <a16:creationId xmlns:a16="http://schemas.microsoft.com/office/drawing/2014/main" id="{3E7E5D08-3BD9-4083-ABF9-3C1E46633F36}"/>
+                <a16:creationId xmlns:a16="http://schemas.microsoft.com/office/drawing/2014/main" id="{D2524174-1A6E-43AD-AFB4-E3F8B9B5D53A}"/>
               </a:ext>
             </a:extLst>
           </p:cNvPr>
@@ -8810,35 +8814,14 @@
           <a:bodyPr/>
           <a:lstStyle/>
           <a:p>
-            <a:r>
-              <a:rPr lang="en-GB" dirty="0"/>
-              <a:t>Finding a Catalyst, to improve motivation</a:t>
-            </a:r>
-          </a:p>
-          <a:p>
-            <a:pPr lvl="1"/>
-            <a:r>
-              <a:rPr lang="en-GB" dirty="0"/>
-              <a:t>Discussing your project with peers</a:t>
-            </a:r>
-          </a:p>
-          <a:p>
-            <a:pPr lvl="1"/>
-            <a:r>
-              <a:rPr lang="en-GB" dirty="0"/>
-              <a:t>Creating an actual deadline</a:t>
-            </a:r>
-          </a:p>
-          <a:p>
-            <a:pPr lvl="1"/>
-            <a:endParaRPr lang="en-GB" dirty="0"/>
+            <a:endParaRPr lang="en-GB"/>
           </a:p>
         </p:txBody>
       </p:sp>
     </p:spTree>
     <p:extLst>
       <p:ext uri="{BB962C8B-B14F-4D97-AF65-F5344CB8AC3E}">
-        <p14:creationId xmlns:p14="http://schemas.microsoft.com/office/powerpoint/2010/main" val="1961839492"/>
+        <p14:creationId xmlns:p14="http://schemas.microsoft.com/office/powerpoint/2010/main" val="1162966501"/>
       </p:ext>
     </p:extLst>
   </p:cSld>
@@ -8870,7 +8853,7 @@
           <p:cNvPr id="2" name="Title 1">
             <a:extLst>
               <a:ext uri="{FF2B5EF4-FFF2-40B4-BE49-F238E27FC236}">
-                <a16:creationId xmlns:a16="http://schemas.microsoft.com/office/drawing/2014/main" id="{8665D156-403C-4612-AA65-B49BA41EDF64}"/>
+                <a16:creationId xmlns:a16="http://schemas.microsoft.com/office/drawing/2014/main" id="{F106CE47-2D88-4386-9645-6FF2058FA701}"/>
               </a:ext>
             </a:extLst>
           </p:cNvPr>
@@ -8888,7 +8871,7 @@
           <a:p>
             <a:r>
               <a:rPr lang="en-GB" dirty="0"/>
-              <a:t>Insert Here, Example of 5 gophers one alive, 4 dead </a:t>
+              <a:t>Getting past the feeling of pointlessness</a:t>
             </a:r>
           </a:p>
         </p:txBody>
@@ -8898,7 +8881,7 @@
           <p:cNvPr id="3" name="Content Placeholder 2">
             <a:extLst>
               <a:ext uri="{FF2B5EF4-FFF2-40B4-BE49-F238E27FC236}">
-                <a16:creationId xmlns:a16="http://schemas.microsoft.com/office/drawing/2014/main" id="{8716B298-CF10-4866-85F6-D856E1963894}"/>
+                <a16:creationId xmlns:a16="http://schemas.microsoft.com/office/drawing/2014/main" id="{3E7E5D08-3BD9-4083-ABF9-3C1E46633F36}"/>
               </a:ext>
             </a:extLst>
           </p:cNvPr>
@@ -8914,14 +8897,35 @@
           <a:bodyPr/>
           <a:lstStyle/>
           <a:p>
-            <a:endParaRPr lang="en-GB"/>
+            <a:r>
+              <a:rPr lang="en-GB" dirty="0"/>
+              <a:t>Finding a Catalyst, to improve motivation</a:t>
+            </a:r>
+          </a:p>
+          <a:p>
+            <a:pPr lvl="1"/>
+            <a:r>
+              <a:rPr lang="en-GB" dirty="0"/>
+              <a:t>Discussing your project with peers</a:t>
+            </a:r>
+          </a:p>
+          <a:p>
+            <a:pPr lvl="1"/>
+            <a:r>
+              <a:rPr lang="en-GB" dirty="0"/>
+              <a:t>Creating an actual deadline</a:t>
+            </a:r>
+          </a:p>
+          <a:p>
+            <a:pPr lvl="1"/>
+            <a:endParaRPr lang="en-GB" dirty="0"/>
           </a:p>
         </p:txBody>
       </p:sp>
     </p:spTree>
     <p:extLst>
       <p:ext uri="{BB962C8B-B14F-4D97-AF65-F5344CB8AC3E}">
-        <p14:creationId xmlns:p14="http://schemas.microsoft.com/office/powerpoint/2010/main" val="3790213746"/>
+        <p14:creationId xmlns:p14="http://schemas.microsoft.com/office/powerpoint/2010/main" val="1961839492"/>
       </p:ext>
     </p:extLst>
   </p:cSld>
@@ -9067,7 +9071,7 @@
           <p:cNvPr id="2" name="Title 1">
             <a:extLst>
               <a:ext uri="{FF2B5EF4-FFF2-40B4-BE49-F238E27FC236}">
-                <a16:creationId xmlns:a16="http://schemas.microsoft.com/office/drawing/2014/main" id="{B88F905B-DC9A-4E15-887A-0D816B2DA849}"/>
+                <a16:creationId xmlns:a16="http://schemas.microsoft.com/office/drawing/2014/main" id="{8665D156-403C-4612-AA65-B49BA41EDF64}"/>
               </a:ext>
             </a:extLst>
           </p:cNvPr>
@@ -9085,7 +9089,7 @@
           <a:p>
             <a:r>
               <a:rPr lang="en-GB" dirty="0"/>
-              <a:t>Checklist</a:t>
+              <a:t>Insert Here, Example of 5 gophers one alive, 4 dead </a:t>
             </a:r>
           </a:p>
         </p:txBody>
@@ -9095,7 +9099,7 @@
           <p:cNvPr id="3" name="Content Placeholder 2">
             <a:extLst>
               <a:ext uri="{FF2B5EF4-FFF2-40B4-BE49-F238E27FC236}">
-                <a16:creationId xmlns:a16="http://schemas.microsoft.com/office/drawing/2014/main" id="{14229407-2ED8-43A8-819B-30DDEB3D38EC}"/>
+                <a16:creationId xmlns:a16="http://schemas.microsoft.com/office/drawing/2014/main" id="{8716B298-CF10-4866-85F6-D856E1963894}"/>
               </a:ext>
             </a:extLst>
           </p:cNvPr>
@@ -9111,26 +9115,14 @@
           <a:bodyPr/>
           <a:lstStyle/>
           <a:p>
-            <a:r>
-              <a:rPr lang="en-GB" dirty="0"/>
-              <a:t>Concurrency is not parallelism </a:t>
-            </a:r>
-            <a:r>
-              <a:rPr lang="en-GB" dirty="0">
-                <a:latin typeface="Segoe MDL2 Assets" panose="050A0102010101010101" pitchFamily="18" charset="0"/>
-              </a:rPr>
-              <a:t> </a:t>
-            </a:r>
-          </a:p>
-          <a:p>
-            <a:endParaRPr lang="en-GB" dirty="0"/>
+            <a:endParaRPr lang="en-GB"/>
           </a:p>
         </p:txBody>
       </p:sp>
     </p:spTree>
     <p:extLst>
       <p:ext uri="{BB962C8B-B14F-4D97-AF65-F5344CB8AC3E}">
-        <p14:creationId xmlns:p14="http://schemas.microsoft.com/office/powerpoint/2010/main" val="3193971414"/>
+        <p14:creationId xmlns:p14="http://schemas.microsoft.com/office/powerpoint/2010/main" val="3790213746"/>
       </p:ext>
     </p:extLst>
   </p:cSld>
@@ -9180,6 +9172,101 @@
           <a:p>
             <a:r>
               <a:rPr lang="en-GB" dirty="0"/>
+              <a:t>Checklist</a:t>
+            </a:r>
+          </a:p>
+        </p:txBody>
+      </p:sp>
+      <p:sp>
+        <p:nvSpPr>
+          <p:cNvPr id="3" name="Content Placeholder 2">
+            <a:extLst>
+              <a:ext uri="{FF2B5EF4-FFF2-40B4-BE49-F238E27FC236}">
+                <a16:creationId xmlns:a16="http://schemas.microsoft.com/office/drawing/2014/main" id="{14229407-2ED8-43A8-819B-30DDEB3D38EC}"/>
+              </a:ext>
+            </a:extLst>
+          </p:cNvPr>
+          <p:cNvSpPr>
+            <a:spLocks noGrp="1"/>
+          </p:cNvSpPr>
+          <p:nvPr>
+            <p:ph idx="1"/>
+          </p:nvPr>
+        </p:nvSpPr>
+        <p:spPr/>
+        <p:txBody>
+          <a:bodyPr/>
+          <a:lstStyle/>
+          <a:p>
+            <a:r>
+              <a:rPr lang="en-GB" dirty="0"/>
+              <a:t>Concurrency is not parallelism </a:t>
+            </a:r>
+            <a:r>
+              <a:rPr lang="en-GB" dirty="0">
+                <a:latin typeface="Segoe MDL2 Assets" panose="050A0102010101010101" pitchFamily="18" charset="0"/>
+              </a:rPr>
+              <a:t> </a:t>
+            </a:r>
+          </a:p>
+          <a:p>
+            <a:endParaRPr lang="en-GB" dirty="0"/>
+          </a:p>
+        </p:txBody>
+      </p:sp>
+    </p:spTree>
+    <p:extLst>
+      <p:ext uri="{BB962C8B-B14F-4D97-AF65-F5344CB8AC3E}">
+        <p14:creationId xmlns:p14="http://schemas.microsoft.com/office/powerpoint/2010/main" val="3193971414"/>
+      </p:ext>
+    </p:extLst>
+  </p:cSld>
+  <p:clrMapOvr>
+    <a:masterClrMapping/>
+  </p:clrMapOvr>
+</p:sld>
+</file>
+
+<file path=ppt/slides/slide32.xml><?xml version="1.0" encoding="utf-8"?>
+<p:sld xmlns:a="http://schemas.openxmlformats.org/drawingml/2006/main" xmlns:r="http://schemas.openxmlformats.org/officeDocument/2006/relationships" xmlns:p="http://schemas.openxmlformats.org/presentationml/2006/main">
+  <p:cSld>
+    <p:spTree>
+      <p:nvGrpSpPr>
+        <p:cNvPr id="1" name=""/>
+        <p:cNvGrpSpPr/>
+        <p:nvPr/>
+      </p:nvGrpSpPr>
+      <p:grpSpPr>
+        <a:xfrm>
+          <a:off x="0" y="0"/>
+          <a:ext cx="0" cy="0"/>
+          <a:chOff x="0" y="0"/>
+          <a:chExt cx="0" cy="0"/>
+        </a:xfrm>
+      </p:grpSpPr>
+      <p:sp>
+        <p:nvSpPr>
+          <p:cNvPr id="2" name="Title 1">
+            <a:extLst>
+              <a:ext uri="{FF2B5EF4-FFF2-40B4-BE49-F238E27FC236}">
+                <a16:creationId xmlns:a16="http://schemas.microsoft.com/office/drawing/2014/main" id="{B88F905B-DC9A-4E15-887A-0D816B2DA849}"/>
+              </a:ext>
+            </a:extLst>
+          </p:cNvPr>
+          <p:cNvSpPr>
+            <a:spLocks noGrp="1"/>
+          </p:cNvSpPr>
+          <p:nvPr>
+            <p:ph type="title"/>
+          </p:nvPr>
+        </p:nvSpPr>
+        <p:spPr/>
+        <p:txBody>
+          <a:bodyPr/>
+          <a:lstStyle/>
+          <a:p>
+            <a:r>
+              <a:rPr lang="en-GB" dirty="0"/>
               <a:t>Checklist of Mistakes</a:t>
             </a:r>
           </a:p>
@@ -9266,7 +9353,7 @@
 </p:sld>
 </file>
 
-<file path=ppt/slides/slide32.xml><?xml version="1.0" encoding="utf-8"?>
+<file path=ppt/slides/slide33.xml><?xml version="1.0" encoding="utf-8"?>
 <p:sld xmlns:a="http://schemas.openxmlformats.org/drawingml/2006/main" xmlns:r="http://schemas.openxmlformats.org/officeDocument/2006/relationships" xmlns:p="http://schemas.openxmlformats.org/presentationml/2006/main">
   <p:cSld>
     <p:spTree>

</xml_diff>

<commit_message>
Added New text to the world render
</commit_message>
<xml_diff>
--- a/GopherLife.pptx
+++ b/GopherLife.pptx
@@ -5,7 +5,7 @@
     <p:sldMasterId id="2147483678" r:id="rId1"/>
   </p:sldMasterIdLst>
   <p:notesMasterIdLst>
-    <p:notesMasterId r:id="rId35"/>
+    <p:notesMasterId r:id="rId41"/>
   </p:notesMasterIdLst>
   <p:sldIdLst>
     <p:sldId id="256" r:id="rId2"/>
@@ -25,22 +25,28 @@
     <p:sldId id="274" r:id="rId16"/>
     <p:sldId id="275" r:id="rId17"/>
     <p:sldId id="282" r:id="rId18"/>
-    <p:sldId id="288" r:id="rId19"/>
-    <p:sldId id="283" r:id="rId20"/>
-    <p:sldId id="284" r:id="rId21"/>
-    <p:sldId id="289" r:id="rId22"/>
-    <p:sldId id="285" r:id="rId23"/>
-    <p:sldId id="287" r:id="rId24"/>
-    <p:sldId id="286" r:id="rId25"/>
-    <p:sldId id="266" r:id="rId26"/>
-    <p:sldId id="257" r:id="rId27"/>
-    <p:sldId id="258" r:id="rId28"/>
-    <p:sldId id="259" r:id="rId29"/>
-    <p:sldId id="261" r:id="rId30"/>
-    <p:sldId id="263" r:id="rId31"/>
-    <p:sldId id="262" r:id="rId32"/>
-    <p:sldId id="264" r:id="rId33"/>
-    <p:sldId id="279" r:id="rId34"/>
+    <p:sldId id="291" r:id="rId19"/>
+    <p:sldId id="288" r:id="rId20"/>
+    <p:sldId id="283" r:id="rId21"/>
+    <p:sldId id="284" r:id="rId22"/>
+    <p:sldId id="290" r:id="rId23"/>
+    <p:sldId id="292" r:id="rId24"/>
+    <p:sldId id="289" r:id="rId25"/>
+    <p:sldId id="293" r:id="rId26"/>
+    <p:sldId id="294" r:id="rId27"/>
+    <p:sldId id="295" r:id="rId28"/>
+    <p:sldId id="285" r:id="rId29"/>
+    <p:sldId id="287" r:id="rId30"/>
+    <p:sldId id="286" r:id="rId31"/>
+    <p:sldId id="266" r:id="rId32"/>
+    <p:sldId id="257" r:id="rId33"/>
+    <p:sldId id="258" r:id="rId34"/>
+    <p:sldId id="259" r:id="rId35"/>
+    <p:sldId id="261" r:id="rId36"/>
+    <p:sldId id="263" r:id="rId37"/>
+    <p:sldId id="262" r:id="rId38"/>
+    <p:sldId id="264" r:id="rId39"/>
+    <p:sldId id="279" r:id="rId40"/>
   </p:sldIdLst>
   <p:sldSz cx="12192000" cy="6858000"/>
   <p:notesSz cx="6858000" cy="9144000"/>
@@ -229,7 +235,7 @@
           <a:p>
             <a:fld id="{4F997A0C-E4B2-467D-ABDF-C6BB0AD1437F}" type="datetimeFigureOut">
               <a:rPr lang="en-GB" smtClean="0"/>
-              <a:t>18/11/2018</a:t>
+              <a:t>24/11/2018</a:t>
             </a:fld>
             <a:endParaRPr lang="en-GB"/>
           </a:p>
@@ -565,7 +571,7 @@
           <a:p>
             <a:fld id="{D37E09BB-0EE2-4AA1-9043-B532D0F5CCDE}" type="slidenum">
               <a:rPr lang="en-GB" smtClean="0"/>
-              <a:t>29</a:t>
+              <a:t>35</a:t>
             </a:fld>
             <a:endParaRPr lang="en-GB"/>
           </a:p>
@@ -770,7 +776,7 @@
           <a:p>
             <a:fld id="{55E4148D-2AA3-4A29-8641-0082B7E18494}" type="datetimeFigureOut">
               <a:rPr lang="en-GB" smtClean="0"/>
-              <a:t>18/11/2018</a:t>
+              <a:t>24/11/2018</a:t>
             </a:fld>
             <a:endParaRPr lang="en-GB"/>
           </a:p>
@@ -1045,7 +1051,7 @@
           <a:p>
             <a:fld id="{55E4148D-2AA3-4A29-8641-0082B7E18494}" type="datetimeFigureOut">
               <a:rPr lang="en-GB" smtClean="0"/>
-              <a:t>18/11/2018</a:t>
+              <a:t>24/11/2018</a:t>
             </a:fld>
             <a:endParaRPr lang="en-GB"/>
           </a:p>
@@ -1239,7 +1245,7 @@
           <a:p>
             <a:fld id="{55E4148D-2AA3-4A29-8641-0082B7E18494}" type="datetimeFigureOut">
               <a:rPr lang="en-GB" smtClean="0"/>
-              <a:t>18/11/2018</a:t>
+              <a:t>24/11/2018</a:t>
             </a:fld>
             <a:endParaRPr lang="en-GB"/>
           </a:p>
@@ -1512,7 +1518,7 @@
           <a:p>
             <a:fld id="{55E4148D-2AA3-4A29-8641-0082B7E18494}" type="datetimeFigureOut">
               <a:rPr lang="en-GB" smtClean="0"/>
-              <a:t>18/11/2018</a:t>
+              <a:t>24/11/2018</a:t>
             </a:fld>
             <a:endParaRPr lang="en-GB"/>
           </a:p>
@@ -1853,7 +1859,7 @@
           <a:p>
             <a:fld id="{55E4148D-2AA3-4A29-8641-0082B7E18494}" type="datetimeFigureOut">
               <a:rPr lang="en-GB" smtClean="0"/>
-              <a:t>18/11/2018</a:t>
+              <a:t>24/11/2018</a:t>
             </a:fld>
             <a:endParaRPr lang="en-GB"/>
           </a:p>
@@ -2476,7 +2482,7 @@
           <a:p>
             <a:fld id="{55E4148D-2AA3-4A29-8641-0082B7E18494}" type="datetimeFigureOut">
               <a:rPr lang="en-GB" smtClean="0"/>
-              <a:t>18/11/2018</a:t>
+              <a:t>24/11/2018</a:t>
             </a:fld>
             <a:endParaRPr lang="en-GB"/>
           </a:p>
@@ -3336,7 +3342,7 @@
           <a:p>
             <a:fld id="{55E4148D-2AA3-4A29-8641-0082B7E18494}" type="datetimeFigureOut">
               <a:rPr lang="en-GB" smtClean="0"/>
-              <a:t>18/11/2018</a:t>
+              <a:t>24/11/2018</a:t>
             </a:fld>
             <a:endParaRPr lang="en-GB"/>
           </a:p>
@@ -3506,7 +3512,7 @@
           <a:p>
             <a:fld id="{55E4148D-2AA3-4A29-8641-0082B7E18494}" type="datetimeFigureOut">
               <a:rPr lang="en-GB" smtClean="0"/>
-              <a:t>18/11/2018</a:t>
+              <a:t>24/11/2018</a:t>
             </a:fld>
             <a:endParaRPr lang="en-GB"/>
           </a:p>
@@ -3686,7 +3692,7 @@
           <a:p>
             <a:fld id="{55E4148D-2AA3-4A29-8641-0082B7E18494}" type="datetimeFigureOut">
               <a:rPr lang="en-GB" smtClean="0"/>
-              <a:t>18/11/2018</a:t>
+              <a:t>24/11/2018</a:t>
             </a:fld>
             <a:endParaRPr lang="en-GB"/>
           </a:p>
@@ -3856,7 +3862,7 @@
           <a:p>
             <a:fld id="{55E4148D-2AA3-4A29-8641-0082B7E18494}" type="datetimeFigureOut">
               <a:rPr lang="en-GB" smtClean="0"/>
-              <a:t>18/11/2018</a:t>
+              <a:t>24/11/2018</a:t>
             </a:fld>
             <a:endParaRPr lang="en-GB"/>
           </a:p>
@@ -4103,7 +4109,7 @@
           <a:p>
             <a:fld id="{55E4148D-2AA3-4A29-8641-0082B7E18494}" type="datetimeFigureOut">
               <a:rPr lang="en-GB" smtClean="0"/>
-              <a:t>18/11/2018</a:t>
+              <a:t>24/11/2018</a:t>
             </a:fld>
             <a:endParaRPr lang="en-GB"/>
           </a:p>
@@ -4395,7 +4401,7 @@
           <a:p>
             <a:fld id="{55E4148D-2AA3-4A29-8641-0082B7E18494}" type="datetimeFigureOut">
               <a:rPr lang="en-GB" smtClean="0"/>
-              <a:t>18/11/2018</a:t>
+              <a:t>24/11/2018</a:t>
             </a:fld>
             <a:endParaRPr lang="en-GB"/>
           </a:p>
@@ -4839,7 +4845,7 @@
           <a:p>
             <a:fld id="{55E4148D-2AA3-4A29-8641-0082B7E18494}" type="datetimeFigureOut">
               <a:rPr lang="en-GB" smtClean="0"/>
-              <a:t>18/11/2018</a:t>
+              <a:t>24/11/2018</a:t>
             </a:fld>
             <a:endParaRPr lang="en-GB"/>
           </a:p>
@@ -4957,7 +4963,7 @@
           <a:p>
             <a:fld id="{55E4148D-2AA3-4A29-8641-0082B7E18494}" type="datetimeFigureOut">
               <a:rPr lang="en-GB" smtClean="0"/>
-              <a:t>18/11/2018</a:t>
+              <a:t>24/11/2018</a:t>
             </a:fld>
             <a:endParaRPr lang="en-GB"/>
           </a:p>
@@ -5052,7 +5058,7 @@
           <a:p>
             <a:fld id="{55E4148D-2AA3-4A29-8641-0082B7E18494}" type="datetimeFigureOut">
               <a:rPr lang="en-GB" smtClean="0"/>
-              <a:t>18/11/2018</a:t>
+              <a:t>24/11/2018</a:t>
             </a:fld>
             <a:endParaRPr lang="en-GB"/>
           </a:p>
@@ -5331,7 +5337,7 @@
           <a:p>
             <a:fld id="{55E4148D-2AA3-4A29-8641-0082B7E18494}" type="datetimeFigureOut">
               <a:rPr lang="en-GB" smtClean="0"/>
-              <a:t>18/11/2018</a:t>
+              <a:t>24/11/2018</a:t>
             </a:fld>
             <a:endParaRPr lang="en-GB"/>
           </a:p>
@@ -5606,7 +5612,7 @@
           <a:p>
             <a:fld id="{55E4148D-2AA3-4A29-8641-0082B7E18494}" type="datetimeFigureOut">
               <a:rPr lang="en-GB" smtClean="0"/>
-              <a:t>18/11/2018</a:t>
+              <a:t>24/11/2018</a:t>
             </a:fld>
             <a:endParaRPr lang="en-GB"/>
           </a:p>
@@ -6035,7 +6041,7 @@
           <a:p>
             <a:fld id="{55E4148D-2AA3-4A29-8641-0082B7E18494}" type="datetimeFigureOut">
               <a:rPr lang="en-GB" smtClean="0"/>
-              <a:t>18/11/2018</a:t>
+              <a:t>24/11/2018</a:t>
             </a:fld>
             <a:endParaRPr lang="en-GB"/>
           </a:p>
@@ -7688,6 +7694,12 @@
             <a:endParaRPr lang="en-GB" dirty="0"/>
           </a:p>
           <a:p>
+            <a:r>
+              <a:rPr lang="en-GB" dirty="0"/>
+              <a:t>Creating objectives for gophers to do during their lives. </a:t>
+            </a:r>
+          </a:p>
+          <a:p>
             <a:endParaRPr lang="en-GB" dirty="0"/>
           </a:p>
         </p:txBody>
@@ -7787,7 +7799,7 @@
           <p:cNvPr id="2" name="Title 1">
             <a:extLst>
               <a:ext uri="{FF2B5EF4-FFF2-40B4-BE49-F238E27FC236}">
-                <a16:creationId xmlns:a16="http://schemas.microsoft.com/office/drawing/2014/main" id="{AA01FFF3-EC99-4485-B32E-E2E568D47B5F}"/>
+                <a16:creationId xmlns:a16="http://schemas.microsoft.com/office/drawing/2014/main" id="{B1B69005-AC4F-4731-BD4E-09D539987B55}"/>
               </a:ext>
             </a:extLst>
           </p:cNvPr>
@@ -7805,17 +7817,17 @@
           <a:p>
             <a:r>
               <a:rPr lang="en-GB" dirty="0"/>
-              <a:t>Progress Checklist 3 - 10</a:t>
-            </a:r>
-          </a:p>
-        </p:txBody>
-      </p:sp>
-      <p:sp>
-        <p:nvSpPr>
-          <p:cNvPr id="3" name="Content Placeholder 2">
+              <a:t>Solutions</a:t>
+            </a:r>
+          </a:p>
+        </p:txBody>
+      </p:sp>
+      <p:sp>
+        <p:nvSpPr>
+          <p:cNvPr id="5" name="Content Placeholder 4">
             <a:extLst>
               <a:ext uri="{FF2B5EF4-FFF2-40B4-BE49-F238E27FC236}">
-                <a16:creationId xmlns:a16="http://schemas.microsoft.com/office/drawing/2014/main" id="{A2755EB5-1D4C-4DDE-A6D0-AFBE7C6CD484}"/>
+                <a16:creationId xmlns:a16="http://schemas.microsoft.com/office/drawing/2014/main" id="{BBBF52A4-BB0E-45F5-8DD4-ECE7DE140C56}"/>
               </a:ext>
             </a:extLst>
           </p:cNvPr>
@@ -7831,60 +7843,14 @@
           <a:bodyPr/>
           <a:lstStyle/>
           <a:p>
-            <a:r>
-              <a:rPr lang="en-GB" dirty="0"/>
-              <a:t>Project Structure and avoiding Circular Dependencies </a:t>
-            </a:r>
-            <a:r>
-              <a:rPr lang="en-GB" dirty="0">
-                <a:latin typeface="Segoe MDL2 Assets" panose="050A0102010101010101" pitchFamily="18" charset="0"/>
-              </a:rPr>
-              <a:t></a:t>
-            </a:r>
-          </a:p>
-          <a:p>
-            <a:endParaRPr lang="en-GB" dirty="0"/>
-          </a:p>
-          <a:p>
-            <a:r>
-              <a:rPr lang="en-GB" dirty="0"/>
-              <a:t>GOPATH and where to place your projects </a:t>
-            </a:r>
-            <a:r>
-              <a:rPr lang="en-GB" dirty="0">
-                <a:latin typeface="Segoe MDL2 Assets" panose="050A0102010101010101" pitchFamily="18" charset="0"/>
-              </a:rPr>
-              <a:t></a:t>
-            </a:r>
-          </a:p>
-          <a:p>
-            <a:endParaRPr lang="en-GB" dirty="0"/>
-          </a:p>
-          <a:p>
-            <a:r>
-              <a:rPr lang="en-GB" dirty="0"/>
-              <a:t>Implementing Basic Pathing Using </a:t>
-            </a:r>
-            <a:r>
-              <a:rPr lang="en-GB"/>
-              <a:t>Coordinates </a:t>
-            </a:r>
-            <a:r>
-              <a:rPr lang="en-GB">
-                <a:latin typeface="Segoe MDL2 Assets" panose="050A0102010101010101" pitchFamily="18" charset="0"/>
-              </a:rPr>
-              <a:t></a:t>
-            </a:r>
-          </a:p>
-          <a:p>
-            <a:endParaRPr lang="en-GB" dirty="0"/>
+            <a:endParaRPr lang="en-GB"/>
           </a:p>
         </p:txBody>
       </p:sp>
     </p:spTree>
     <p:extLst>
       <p:ext uri="{BB962C8B-B14F-4D97-AF65-F5344CB8AC3E}">
-        <p14:creationId xmlns:p14="http://schemas.microsoft.com/office/powerpoint/2010/main" val="3768594580"/>
+        <p14:creationId xmlns:p14="http://schemas.microsoft.com/office/powerpoint/2010/main" val="3708281905"/>
       </p:ext>
     </p:extLst>
   </p:cSld>
@@ -7916,7 +7882,7 @@
           <p:cNvPr id="2" name="Title 1">
             <a:extLst>
               <a:ext uri="{FF2B5EF4-FFF2-40B4-BE49-F238E27FC236}">
-                <a16:creationId xmlns:a16="http://schemas.microsoft.com/office/drawing/2014/main" id="{D2EE31CB-2F81-4A36-8A60-7DA0689FF389}"/>
+                <a16:creationId xmlns:a16="http://schemas.microsoft.com/office/drawing/2014/main" id="{AA01FFF3-EC99-4485-B32E-E2E568D47B5F}"/>
               </a:ext>
             </a:extLst>
           </p:cNvPr>
@@ -7934,7 +7900,7 @@
           <a:p>
             <a:r>
               <a:rPr lang="en-GB" dirty="0"/>
-              <a:t>Problem 4 – Visual Representation</a:t>
+              <a:t>Progress Checklist 3 - 10</a:t>
             </a:r>
           </a:p>
         </p:txBody>
@@ -7944,7 +7910,7 @@
           <p:cNvPr id="3" name="Content Placeholder 2">
             <a:extLst>
               <a:ext uri="{FF2B5EF4-FFF2-40B4-BE49-F238E27FC236}">
-                <a16:creationId xmlns:a16="http://schemas.microsoft.com/office/drawing/2014/main" id="{A8B919FE-5B99-442A-897F-39F7A3FBA3BF}"/>
+                <a16:creationId xmlns:a16="http://schemas.microsoft.com/office/drawing/2014/main" id="{A2755EB5-1D4C-4DDE-A6D0-AFBE7C6CD484}"/>
               </a:ext>
             </a:extLst>
           </p:cNvPr>
@@ -7960,6 +7926,75 @@
           <a:bodyPr/>
           <a:lstStyle/>
           <a:p>
+            <a:r>
+              <a:rPr lang="en-GB" dirty="0"/>
+              <a:t>Project Structure and avoiding Circular Dependencies </a:t>
+            </a:r>
+            <a:r>
+              <a:rPr lang="en-GB" dirty="0">
+                <a:latin typeface="Segoe MDL2 Assets" panose="050A0102010101010101" pitchFamily="18" charset="0"/>
+              </a:rPr>
+              <a:t></a:t>
+            </a:r>
+          </a:p>
+          <a:p>
+            <a:endParaRPr lang="en-GB" dirty="0"/>
+          </a:p>
+          <a:p>
+            <a:r>
+              <a:rPr lang="en-GB" dirty="0"/>
+              <a:t>GOPATH and where to place your projects </a:t>
+            </a:r>
+            <a:r>
+              <a:rPr lang="en-GB" dirty="0">
+                <a:latin typeface="Segoe MDL2 Assets" panose="050A0102010101010101" pitchFamily="18" charset="0"/>
+              </a:rPr>
+              <a:t></a:t>
+            </a:r>
+          </a:p>
+          <a:p>
+            <a:endParaRPr lang="en-GB" dirty="0"/>
+          </a:p>
+          <a:p>
+            <a:r>
+              <a:rPr lang="en-GB" dirty="0"/>
+              <a:t>Implementing Basic Pathing Using Coordinates </a:t>
+            </a:r>
+            <a:r>
+              <a:rPr lang="en-GB" dirty="0">
+                <a:latin typeface="Segoe MDL2 Assets" panose="050A0102010101010101" pitchFamily="18" charset="0"/>
+              </a:rPr>
+              <a:t></a:t>
+            </a:r>
+          </a:p>
+          <a:p>
+            <a:endParaRPr lang="en-GB" dirty="0">
+              <a:latin typeface="Segoe MDL2 Assets" panose="050A0102010101010101" pitchFamily="18" charset="0"/>
+            </a:endParaRPr>
+          </a:p>
+          <a:p>
+            <a:r>
+              <a:rPr lang="en-GB" dirty="0"/>
+              <a:t>Improve understanding of how different structures interact concurrently </a:t>
+            </a:r>
+            <a:r>
+              <a:rPr lang="en-GB" dirty="0">
+                <a:latin typeface="Segoe MDL2 Assets" panose="050A0102010101010101" pitchFamily="18" charset="0"/>
+              </a:rPr>
+              <a:t></a:t>
+            </a:r>
+          </a:p>
+          <a:p>
+            <a:endParaRPr lang="en-GB" dirty="0">
+              <a:latin typeface="Segoe MDL2 Assets" panose="050A0102010101010101" pitchFamily="18" charset="0"/>
+            </a:endParaRPr>
+          </a:p>
+          <a:p>
+            <a:endParaRPr lang="en-GB" dirty="0">
+              <a:latin typeface="Segoe MDL2 Assets" panose="050A0102010101010101" pitchFamily="18" charset="0"/>
+            </a:endParaRPr>
+          </a:p>
+          <a:p>
             <a:endParaRPr lang="en-GB" dirty="0"/>
           </a:p>
         </p:txBody>
@@ -7967,7 +8002,7 @@
     </p:spTree>
     <p:extLst>
       <p:ext uri="{BB962C8B-B14F-4D97-AF65-F5344CB8AC3E}">
-        <p14:creationId xmlns:p14="http://schemas.microsoft.com/office/powerpoint/2010/main" val="52941393"/>
+        <p14:creationId xmlns:p14="http://schemas.microsoft.com/office/powerpoint/2010/main" val="3768594580"/>
       </p:ext>
     </p:extLst>
   </p:cSld>
@@ -8082,7 +8117,7 @@
           <p:cNvPr id="2" name="Title 1">
             <a:extLst>
               <a:ext uri="{FF2B5EF4-FFF2-40B4-BE49-F238E27FC236}">
-                <a16:creationId xmlns:a16="http://schemas.microsoft.com/office/drawing/2014/main" id="{E2D24B9C-4460-4D79-AE21-23356AF1FB37}"/>
+                <a16:creationId xmlns:a16="http://schemas.microsoft.com/office/drawing/2014/main" id="{D2EE31CB-2F81-4A36-8A60-7DA0689FF389}"/>
               </a:ext>
             </a:extLst>
           </p:cNvPr>
@@ -8100,7 +8135,7 @@
           <a:p>
             <a:r>
               <a:rPr lang="en-GB" dirty="0"/>
-              <a:t>Solutions</a:t>
+              <a:t>Problem 4 – Visual Representation</a:t>
             </a:r>
           </a:p>
         </p:txBody>
@@ -8110,7 +8145,7 @@
           <p:cNvPr id="3" name="Content Placeholder 2">
             <a:extLst>
               <a:ext uri="{FF2B5EF4-FFF2-40B4-BE49-F238E27FC236}">
-                <a16:creationId xmlns:a16="http://schemas.microsoft.com/office/drawing/2014/main" id="{DBA319FF-5EEE-4C2D-B80B-5DF0D120CF5E}"/>
+                <a16:creationId xmlns:a16="http://schemas.microsoft.com/office/drawing/2014/main" id="{A8B919FE-5B99-442A-897F-39F7A3FBA3BF}"/>
               </a:ext>
             </a:extLst>
           </p:cNvPr>
@@ -8126,14 +8161,38 @@
           <a:bodyPr/>
           <a:lstStyle/>
           <a:p>
-            <a:endParaRPr lang="en-GB"/>
+            <a:r>
+              <a:rPr lang="en-GB" dirty="0"/>
+              <a:t>I have no idea what I’m doing or if it works</a:t>
+            </a:r>
+          </a:p>
+          <a:p>
+            <a:endParaRPr lang="en-GB" dirty="0"/>
+          </a:p>
+          <a:p>
+            <a:endParaRPr lang="en-GB" dirty="0"/>
+          </a:p>
+          <a:p>
+            <a:endParaRPr lang="en-GB" dirty="0"/>
+          </a:p>
+          <a:p>
+            <a:endParaRPr lang="en-GB" dirty="0"/>
+          </a:p>
+          <a:p>
+            <a:endParaRPr lang="en-GB" dirty="0"/>
+          </a:p>
+          <a:p>
+            <a:endParaRPr lang="en-GB" dirty="0"/>
+          </a:p>
+          <a:p>
+            <a:endParaRPr lang="en-GB" dirty="0"/>
           </a:p>
         </p:txBody>
       </p:sp>
     </p:spTree>
     <p:extLst>
       <p:ext uri="{BB962C8B-B14F-4D97-AF65-F5344CB8AC3E}">
-        <p14:creationId xmlns:p14="http://schemas.microsoft.com/office/powerpoint/2010/main" val="1519006128"/>
+        <p14:creationId xmlns:p14="http://schemas.microsoft.com/office/powerpoint/2010/main" val="52941393"/>
       </p:ext>
     </p:extLst>
   </p:cSld>
@@ -8165,7 +8224,7 @@
           <p:cNvPr id="2" name="Title 1">
             <a:extLst>
               <a:ext uri="{FF2B5EF4-FFF2-40B4-BE49-F238E27FC236}">
-                <a16:creationId xmlns:a16="http://schemas.microsoft.com/office/drawing/2014/main" id="{75C50CEC-C87D-40B9-990D-303CFFD16359}"/>
+                <a16:creationId xmlns:a16="http://schemas.microsoft.com/office/drawing/2014/main" id="{E2D24B9C-4460-4D79-AE21-23356AF1FB37}"/>
               </a:ext>
             </a:extLst>
           </p:cNvPr>
@@ -8183,7 +8242,7 @@
           <a:p>
             <a:r>
               <a:rPr lang="en-GB" dirty="0"/>
-              <a:t>Problem 5 - Speed</a:t>
+              <a:t>Solutions</a:t>
             </a:r>
           </a:p>
         </p:txBody>
@@ -8193,7 +8252,7 @@
           <p:cNvPr id="3" name="Content Placeholder 2">
             <a:extLst>
               <a:ext uri="{FF2B5EF4-FFF2-40B4-BE49-F238E27FC236}">
-                <a16:creationId xmlns:a16="http://schemas.microsoft.com/office/drawing/2014/main" id="{6CE96895-52F6-414F-B7B4-DBAF2D31353D}"/>
+                <a16:creationId xmlns:a16="http://schemas.microsoft.com/office/drawing/2014/main" id="{DBA319FF-5EEE-4C2D-B80B-5DF0D120CF5E}"/>
               </a:ext>
             </a:extLst>
           </p:cNvPr>
@@ -8210,8 +8269,8 @@
           <a:lstStyle/>
           <a:p>
             <a:r>
-              <a:rPr lang="en-GB"/>
-              <a:t>Mutexs</a:t>
+              <a:rPr lang="en-GB" dirty="0"/>
+              <a:t>Render the world using </a:t>
             </a:r>
           </a:p>
         </p:txBody>
@@ -8219,7 +8278,7 @@
     </p:spTree>
     <p:extLst>
       <p:ext uri="{BB962C8B-B14F-4D97-AF65-F5344CB8AC3E}">
-        <p14:creationId xmlns:p14="http://schemas.microsoft.com/office/powerpoint/2010/main" val="1147479734"/>
+        <p14:creationId xmlns:p14="http://schemas.microsoft.com/office/powerpoint/2010/main" val="1519006128"/>
       </p:ext>
     </p:extLst>
   </p:cSld>
@@ -8251,7 +8310,7 @@
           <p:cNvPr id="2" name="Title 1">
             <a:extLst>
               <a:ext uri="{FF2B5EF4-FFF2-40B4-BE49-F238E27FC236}">
-                <a16:creationId xmlns:a16="http://schemas.microsoft.com/office/drawing/2014/main" id="{5F649051-170D-4D88-A1EB-CD53B67517C2}"/>
+                <a16:creationId xmlns:a16="http://schemas.microsoft.com/office/drawing/2014/main" id="{0BB2E70A-E100-4BA0-95EC-7B26B97549BA}"/>
               </a:ext>
             </a:extLst>
           </p:cNvPr>
@@ -8269,7 +8328,7 @@
           <a:p>
             <a:r>
               <a:rPr lang="en-GB" dirty="0"/>
-              <a:t>Final Showcase</a:t>
+              <a:t>Progress Checklist 11-14</a:t>
             </a:r>
           </a:p>
         </p:txBody>
@@ -8279,7 +8338,7 @@
           <p:cNvPr id="3" name="Content Placeholder 2">
             <a:extLst>
               <a:ext uri="{FF2B5EF4-FFF2-40B4-BE49-F238E27FC236}">
-                <a16:creationId xmlns:a16="http://schemas.microsoft.com/office/drawing/2014/main" id="{E28FB5CC-2E35-4352-B03D-454660443443}"/>
+                <a16:creationId xmlns:a16="http://schemas.microsoft.com/office/drawing/2014/main" id="{00B55E60-9E9B-4A07-AD19-88E525512438}"/>
               </a:ext>
             </a:extLst>
           </p:cNvPr>
@@ -8295,14 +8354,62 @@
           <a:bodyPr/>
           <a:lstStyle/>
           <a:p>
-            <a:endParaRPr lang="en-GB"/>
+            <a:r>
+              <a:rPr lang="en-GB" dirty="0"/>
+              <a:t>Learnt how to use http/html packages for rendering a webpage </a:t>
+            </a:r>
+            <a:r>
+              <a:rPr lang="en-GB" dirty="0">
+                <a:latin typeface="Segoe MDL2 Assets" panose="050A0102010101010101" pitchFamily="18" charset="0"/>
+              </a:rPr>
+              <a:t></a:t>
+            </a:r>
+          </a:p>
+          <a:p>
+            <a:endParaRPr lang="en-GB" dirty="0"/>
+          </a:p>
+          <a:p>
+            <a:r>
+              <a:rPr lang="en-GB" dirty="0"/>
+              <a:t>Learnt how to use http function handlers </a:t>
+            </a:r>
+            <a:r>
+              <a:rPr lang="en-GB" dirty="0">
+                <a:latin typeface="Segoe MDL2 Assets" panose="050A0102010101010101" pitchFamily="18" charset="0"/>
+              </a:rPr>
+              <a:t></a:t>
+            </a:r>
+          </a:p>
+          <a:p>
+            <a:endParaRPr lang="en-GB" dirty="0"/>
+          </a:p>
+          <a:p>
+            <a:r>
+              <a:rPr lang="en-GB" dirty="0"/>
+              <a:t>Learnt a bit about </a:t>
+            </a:r>
+            <a:r>
+              <a:rPr lang="en-GB" dirty="0" err="1"/>
+              <a:t>css</a:t>
+            </a:r>
+            <a:r>
+              <a:rPr lang="en-GB" dirty="0"/>
+              <a:t> grid </a:t>
+            </a:r>
+            <a:r>
+              <a:rPr lang="en-GB" dirty="0">
+                <a:latin typeface="Segoe MDL2 Assets" panose="050A0102010101010101" pitchFamily="18" charset="0"/>
+              </a:rPr>
+              <a:t></a:t>
+            </a:r>
+            <a:endParaRPr lang="en-GB" dirty="0"/>
           </a:p>
         </p:txBody>
       </p:sp>
     </p:spTree>
     <p:extLst>
       <p:ext uri="{BB962C8B-B14F-4D97-AF65-F5344CB8AC3E}">
-        <p14:creationId xmlns:p14="http://schemas.microsoft.com/office/powerpoint/2010/main" val="2232509740"/>
+        <p14:creationId xmlns:p14="http://schemas.microsoft.com/office/powerpoint/2010/main" val="3521459611"/>
       </p:ext>
     </p:extLst>
   </p:cSld>
@@ -8334,7 +8441,7 @@
           <p:cNvPr id="2" name="Title 1">
             <a:extLst>
               <a:ext uri="{FF2B5EF4-FFF2-40B4-BE49-F238E27FC236}">
-                <a16:creationId xmlns:a16="http://schemas.microsoft.com/office/drawing/2014/main" id="{6CDC4756-BE7A-4B78-81FE-29031289A2AD}"/>
+                <a16:creationId xmlns:a16="http://schemas.microsoft.com/office/drawing/2014/main" id="{0B70B174-F9FD-432F-9D87-8193A5BF99F5}"/>
               </a:ext>
             </a:extLst>
           </p:cNvPr>
@@ -8352,7 +8459,7 @@
           <a:p>
             <a:r>
               <a:rPr lang="en-GB" dirty="0"/>
-              <a:t>Final Checklist </a:t>
+              <a:t>Solutions – Early Demo</a:t>
             </a:r>
           </a:p>
         </p:txBody>
@@ -8362,7 +8469,7 @@
           <p:cNvPr id="3" name="Content Placeholder 2">
             <a:extLst>
               <a:ext uri="{FF2B5EF4-FFF2-40B4-BE49-F238E27FC236}">
-                <a16:creationId xmlns:a16="http://schemas.microsoft.com/office/drawing/2014/main" id="{07D7EF34-638C-4C71-99D1-10742B4D9377}"/>
+                <a16:creationId xmlns:a16="http://schemas.microsoft.com/office/drawing/2014/main" id="{9CCEF8BA-DD87-47C3-8861-0A56DB73CB4C}"/>
               </a:ext>
             </a:extLst>
           </p:cNvPr>
@@ -8378,14 +8485,14 @@
           <a:bodyPr/>
           <a:lstStyle/>
           <a:p>
-            <a:endParaRPr lang="en-GB"/>
+            <a:endParaRPr lang="en-GB" dirty="0"/>
           </a:p>
         </p:txBody>
       </p:sp>
     </p:spTree>
     <p:extLst>
       <p:ext uri="{BB962C8B-B14F-4D97-AF65-F5344CB8AC3E}">
-        <p14:creationId xmlns:p14="http://schemas.microsoft.com/office/powerpoint/2010/main" val="2595392705"/>
+        <p14:creationId xmlns:p14="http://schemas.microsoft.com/office/powerpoint/2010/main" val="1692078946"/>
       </p:ext>
     </p:extLst>
   </p:cSld>
@@ -8417,7 +8524,7 @@
           <p:cNvPr id="2" name="Title 1">
             <a:extLst>
               <a:ext uri="{FF2B5EF4-FFF2-40B4-BE49-F238E27FC236}">
-                <a16:creationId xmlns:a16="http://schemas.microsoft.com/office/drawing/2014/main" id="{C6A1F8BE-8B71-4987-BE2C-B485EE46CDB8}"/>
+                <a16:creationId xmlns:a16="http://schemas.microsoft.com/office/drawing/2014/main" id="{75C50CEC-C87D-40B9-990D-303CFFD16359}"/>
               </a:ext>
             </a:extLst>
           </p:cNvPr>
@@ -8435,7 +8542,7 @@
           <a:p>
             <a:r>
               <a:rPr lang="en-GB" dirty="0"/>
-              <a:t>Conclusion</a:t>
+              <a:t>Problem 5 - Optimization</a:t>
             </a:r>
           </a:p>
         </p:txBody>
@@ -8445,7 +8552,7 @@
           <p:cNvPr id="3" name="Content Placeholder 2">
             <a:extLst>
               <a:ext uri="{FF2B5EF4-FFF2-40B4-BE49-F238E27FC236}">
-                <a16:creationId xmlns:a16="http://schemas.microsoft.com/office/drawing/2014/main" id="{C6489CD9-246E-4EF9-8A1F-DF0D212B8A29}"/>
+                <a16:creationId xmlns:a16="http://schemas.microsoft.com/office/drawing/2014/main" id="{6CE96895-52F6-414F-B7B4-DBAF2D31353D}"/>
               </a:ext>
             </a:extLst>
           </p:cNvPr>
@@ -8461,14 +8568,17 @@
           <a:bodyPr/>
           <a:lstStyle/>
           <a:p>
-            <a:endParaRPr lang="en-GB"/>
+            <a:r>
+              <a:rPr lang="en-GB" dirty="0"/>
+              <a:t>As the number of gophers increased the time it takes to process each gopher also increases. </a:t>
+            </a:r>
           </a:p>
         </p:txBody>
       </p:sp>
     </p:spTree>
     <p:extLst>
       <p:ext uri="{BB962C8B-B14F-4D97-AF65-F5344CB8AC3E}">
-        <p14:creationId xmlns:p14="http://schemas.microsoft.com/office/powerpoint/2010/main" val="2651521754"/>
+        <p14:creationId xmlns:p14="http://schemas.microsoft.com/office/powerpoint/2010/main" val="1147479734"/>
       </p:ext>
     </p:extLst>
   </p:cSld>
@@ -8500,7 +8610,7 @@
           <p:cNvPr id="2" name="Title 1">
             <a:extLst>
               <a:ext uri="{FF2B5EF4-FFF2-40B4-BE49-F238E27FC236}">
-                <a16:creationId xmlns:a16="http://schemas.microsoft.com/office/drawing/2014/main" id="{DDA23A98-14C6-40E0-A90C-6468725EFA2C}"/>
+                <a16:creationId xmlns:a16="http://schemas.microsoft.com/office/drawing/2014/main" id="{96C67DBF-3E03-4AC3-8F08-C9A56B0C5933}"/>
               </a:ext>
             </a:extLst>
           </p:cNvPr>
@@ -8518,7 +8628,7 @@
           <a:p>
             <a:r>
               <a:rPr lang="en-GB" dirty="0"/>
-              <a:t>Perseverance</a:t>
+              <a:t>Solutions	</a:t>
             </a:r>
           </a:p>
         </p:txBody>
@@ -8528,7 +8638,7 @@
           <p:cNvPr id="3" name="Content Placeholder 2">
             <a:extLst>
               <a:ext uri="{FF2B5EF4-FFF2-40B4-BE49-F238E27FC236}">
-                <a16:creationId xmlns:a16="http://schemas.microsoft.com/office/drawing/2014/main" id="{B7866C6F-7AB4-4FF2-AC93-597F73926565}"/>
+                <a16:creationId xmlns:a16="http://schemas.microsoft.com/office/drawing/2014/main" id="{2E3CB77D-CB5F-495D-84F6-E0A5AB452645}"/>
               </a:ext>
             </a:extLst>
           </p:cNvPr>
@@ -8546,21 +8656,40 @@
           <a:p>
             <a:r>
               <a:rPr lang="en-GB" dirty="0"/>
-              <a:t>Talking about your project with other developers </a:t>
-            </a:r>
-          </a:p>
-          <a:p>
-            <a:r>
-              <a:rPr lang="en-GB" dirty="0"/>
-              <a:t>Getting help</a:t>
-            </a:r>
+              <a:t>Optimizing how long it takes Gophers to find food. </a:t>
+            </a:r>
+          </a:p>
+          <a:p>
+            <a:pPr lvl="1"/>
+            <a:r>
+              <a:rPr lang="en-GB" dirty="0"/>
+              <a:t>Spiral Searching, </a:t>
+            </a:r>
+          </a:p>
+          <a:p>
+            <a:pPr lvl="1"/>
+            <a:r>
+              <a:rPr lang="en-GB" dirty="0"/>
+              <a:t>Quadtree Queries</a:t>
+            </a:r>
+          </a:p>
+          <a:p>
+            <a:pPr lvl="1"/>
+            <a:r>
+              <a:rPr lang="en-GB" dirty="0"/>
+              <a:t>Spatial Partitioning</a:t>
+            </a:r>
+          </a:p>
+          <a:p>
+            <a:pPr lvl="1"/>
+            <a:endParaRPr lang="en-GB" dirty="0"/>
           </a:p>
         </p:txBody>
       </p:sp>
     </p:spTree>
     <p:extLst>
       <p:ext uri="{BB962C8B-B14F-4D97-AF65-F5344CB8AC3E}">
-        <p14:creationId xmlns:p14="http://schemas.microsoft.com/office/powerpoint/2010/main" val="847199732"/>
+        <p14:creationId xmlns:p14="http://schemas.microsoft.com/office/powerpoint/2010/main" val="2433235080"/>
       </p:ext>
     </p:extLst>
   </p:cSld>
@@ -8592,7 +8721,7 @@
           <p:cNvPr id="2" name="Title 1">
             <a:extLst>
               <a:ext uri="{FF2B5EF4-FFF2-40B4-BE49-F238E27FC236}">
-                <a16:creationId xmlns:a16="http://schemas.microsoft.com/office/drawing/2014/main" id="{CFF32C6C-3D00-4977-9425-46509C1A3129}"/>
+                <a16:creationId xmlns:a16="http://schemas.microsoft.com/office/drawing/2014/main" id="{B35498C6-960E-4458-8130-6765F4CA74F7}"/>
               </a:ext>
             </a:extLst>
           </p:cNvPr>
@@ -8610,7 +8739,7 @@
           <a:p>
             <a:r>
               <a:rPr lang="en-GB" dirty="0"/>
-              <a:t>Go – Starter Pack</a:t>
+              <a:t>	Progress Checklist	</a:t>
             </a:r>
           </a:p>
         </p:txBody>
@@ -8620,7 +8749,7 @@
           <p:cNvPr id="3" name="Content Placeholder 2">
             <a:extLst>
               <a:ext uri="{FF2B5EF4-FFF2-40B4-BE49-F238E27FC236}">
-                <a16:creationId xmlns:a16="http://schemas.microsoft.com/office/drawing/2014/main" id="{3B81F4FB-26EB-4DA4-9507-E147BFC741B8}"/>
+                <a16:creationId xmlns:a16="http://schemas.microsoft.com/office/drawing/2014/main" id="{03803CF5-7407-403C-AA75-7FD98A1144C0}"/>
               </a:ext>
             </a:extLst>
           </p:cNvPr>
@@ -8638,24 +8767,24 @@
           <a:p>
             <a:r>
               <a:rPr lang="en-GB" dirty="0"/>
-              <a:t>Installing GO. </a:t>
-            </a:r>
-          </a:p>
-          <a:p>
-            <a:r>
-              <a:rPr lang="en-GB" dirty="0"/>
-              <a:t>Learning the syntax</a:t>
+              <a:t>Introduction to using go benchmark and go race. </a:t>
             </a:r>
           </a:p>
           <a:p>
             <a:endParaRPr lang="en-GB" dirty="0"/>
+          </a:p>
+          <a:p>
+            <a:r>
+              <a:rPr lang="en-GB" dirty="0"/>
+              <a:t>Increased knowledge of different ways to optimize searching problems. </a:t>
+            </a:r>
           </a:p>
         </p:txBody>
       </p:sp>
     </p:spTree>
     <p:extLst>
       <p:ext uri="{BB962C8B-B14F-4D97-AF65-F5344CB8AC3E}">
-        <p14:creationId xmlns:p14="http://schemas.microsoft.com/office/powerpoint/2010/main" val="1566399315"/>
+        <p14:creationId xmlns:p14="http://schemas.microsoft.com/office/powerpoint/2010/main" val="3598754192"/>
       </p:ext>
     </p:extLst>
   </p:cSld>
@@ -8687,7 +8816,7 @@
           <p:cNvPr id="2" name="Title 1">
             <a:extLst>
               <a:ext uri="{FF2B5EF4-FFF2-40B4-BE49-F238E27FC236}">
-                <a16:creationId xmlns:a16="http://schemas.microsoft.com/office/drawing/2014/main" id="{F791C732-68FC-4DBF-A925-B9A44335C54F}"/>
+                <a16:creationId xmlns:a16="http://schemas.microsoft.com/office/drawing/2014/main" id="{13A895C3-4AA3-4DF4-9348-F010A665C356}"/>
               </a:ext>
             </a:extLst>
           </p:cNvPr>
@@ -8703,10 +8832,7 @@
           <a:bodyPr/>
           <a:lstStyle/>
           <a:p>
-            <a:r>
-              <a:rPr lang="en-GB" dirty="0"/>
-              <a:t>Finding A Catalyst</a:t>
-            </a:r>
+            <a:endParaRPr lang="en-GB" dirty="0"/>
           </a:p>
         </p:txBody>
       </p:sp>
@@ -8715,7 +8841,7 @@
           <p:cNvPr id="3" name="Content Placeholder 2">
             <a:extLst>
               <a:ext uri="{FF2B5EF4-FFF2-40B4-BE49-F238E27FC236}">
-                <a16:creationId xmlns:a16="http://schemas.microsoft.com/office/drawing/2014/main" id="{C206744A-0D9B-4231-BD87-CF25D90A8004}"/>
+                <a16:creationId xmlns:a16="http://schemas.microsoft.com/office/drawing/2014/main" id="{ABB9FD90-D046-487F-ACA7-C1C377ED3A6F}"/>
               </a:ext>
             </a:extLst>
           </p:cNvPr>
@@ -8738,7 +8864,7 @@
     </p:spTree>
     <p:extLst>
       <p:ext uri="{BB962C8B-B14F-4D97-AF65-F5344CB8AC3E}">
-        <p14:creationId xmlns:p14="http://schemas.microsoft.com/office/powerpoint/2010/main" val="4016827040"/>
+        <p14:creationId xmlns:p14="http://schemas.microsoft.com/office/powerpoint/2010/main" val="3172546742"/>
       </p:ext>
     </p:extLst>
   </p:cSld>
@@ -8770,7 +8896,7 @@
           <p:cNvPr id="2" name="Title 1">
             <a:extLst>
               <a:ext uri="{FF2B5EF4-FFF2-40B4-BE49-F238E27FC236}">
-                <a16:creationId xmlns:a16="http://schemas.microsoft.com/office/drawing/2014/main" id="{32F06B3C-EA2D-46B1-AB79-08EFA8CCC0C1}"/>
+                <a16:creationId xmlns:a16="http://schemas.microsoft.com/office/drawing/2014/main" id="{5F649051-170D-4D88-A1EB-CD53B67517C2}"/>
               </a:ext>
             </a:extLst>
           </p:cNvPr>
@@ -8788,7 +8914,7 @@
           <a:p>
             <a:r>
               <a:rPr lang="en-GB" dirty="0"/>
-              <a:t>Managing Scope and Completing Projects</a:t>
+              <a:t>Final Showcase</a:t>
             </a:r>
           </a:p>
         </p:txBody>
@@ -8798,7 +8924,7 @@
           <p:cNvPr id="3" name="Content Placeholder 2">
             <a:extLst>
               <a:ext uri="{FF2B5EF4-FFF2-40B4-BE49-F238E27FC236}">
-                <a16:creationId xmlns:a16="http://schemas.microsoft.com/office/drawing/2014/main" id="{D2524174-1A6E-43AD-AFB4-E3F8B9B5D53A}"/>
+                <a16:creationId xmlns:a16="http://schemas.microsoft.com/office/drawing/2014/main" id="{E28FB5CC-2E35-4352-B03D-454660443443}"/>
               </a:ext>
             </a:extLst>
           </p:cNvPr>
@@ -8821,7 +8947,7 @@
     </p:spTree>
     <p:extLst>
       <p:ext uri="{BB962C8B-B14F-4D97-AF65-F5344CB8AC3E}">
-        <p14:creationId xmlns:p14="http://schemas.microsoft.com/office/powerpoint/2010/main" val="1162966501"/>
+        <p14:creationId xmlns:p14="http://schemas.microsoft.com/office/powerpoint/2010/main" val="2232509740"/>
       </p:ext>
     </p:extLst>
   </p:cSld>
@@ -8853,7 +8979,7 @@
           <p:cNvPr id="2" name="Title 1">
             <a:extLst>
               <a:ext uri="{FF2B5EF4-FFF2-40B4-BE49-F238E27FC236}">
-                <a16:creationId xmlns:a16="http://schemas.microsoft.com/office/drawing/2014/main" id="{F106CE47-2D88-4386-9645-6FF2058FA701}"/>
+                <a16:creationId xmlns:a16="http://schemas.microsoft.com/office/drawing/2014/main" id="{6CDC4756-BE7A-4B78-81FE-29031289A2AD}"/>
               </a:ext>
             </a:extLst>
           </p:cNvPr>
@@ -8871,7 +8997,7 @@
           <a:p>
             <a:r>
               <a:rPr lang="en-GB" dirty="0"/>
-              <a:t>Getting past the feeling of pointlessness</a:t>
+              <a:t>Final Checklist </a:t>
             </a:r>
           </a:p>
         </p:txBody>
@@ -8881,7 +9007,7 @@
           <p:cNvPr id="3" name="Content Placeholder 2">
             <a:extLst>
               <a:ext uri="{FF2B5EF4-FFF2-40B4-BE49-F238E27FC236}">
-                <a16:creationId xmlns:a16="http://schemas.microsoft.com/office/drawing/2014/main" id="{3E7E5D08-3BD9-4083-ABF9-3C1E46633F36}"/>
+                <a16:creationId xmlns:a16="http://schemas.microsoft.com/office/drawing/2014/main" id="{07D7EF34-638C-4C71-99D1-10742B4D9377}"/>
               </a:ext>
             </a:extLst>
           </p:cNvPr>
@@ -8897,35 +9023,14 @@
           <a:bodyPr/>
           <a:lstStyle/>
           <a:p>
-            <a:r>
-              <a:rPr lang="en-GB" dirty="0"/>
-              <a:t>Finding a Catalyst, to improve motivation</a:t>
-            </a:r>
-          </a:p>
-          <a:p>
-            <a:pPr lvl="1"/>
-            <a:r>
-              <a:rPr lang="en-GB" dirty="0"/>
-              <a:t>Discussing your project with peers</a:t>
-            </a:r>
-          </a:p>
-          <a:p>
-            <a:pPr lvl="1"/>
-            <a:r>
-              <a:rPr lang="en-GB" dirty="0"/>
-              <a:t>Creating an actual deadline</a:t>
-            </a:r>
-          </a:p>
-          <a:p>
-            <a:pPr lvl="1"/>
-            <a:endParaRPr lang="en-GB" dirty="0"/>
+            <a:endParaRPr lang="en-GB"/>
           </a:p>
         </p:txBody>
       </p:sp>
     </p:spTree>
     <p:extLst>
       <p:ext uri="{BB962C8B-B14F-4D97-AF65-F5344CB8AC3E}">
-        <p14:creationId xmlns:p14="http://schemas.microsoft.com/office/powerpoint/2010/main" val="1961839492"/>
+        <p14:creationId xmlns:p14="http://schemas.microsoft.com/office/powerpoint/2010/main" val="2595392705"/>
       </p:ext>
     </p:extLst>
   </p:cSld>
@@ -9071,7 +9176,7 @@
           <p:cNvPr id="2" name="Title 1">
             <a:extLst>
               <a:ext uri="{FF2B5EF4-FFF2-40B4-BE49-F238E27FC236}">
-                <a16:creationId xmlns:a16="http://schemas.microsoft.com/office/drawing/2014/main" id="{8665D156-403C-4612-AA65-B49BA41EDF64}"/>
+                <a16:creationId xmlns:a16="http://schemas.microsoft.com/office/drawing/2014/main" id="{C6A1F8BE-8B71-4987-BE2C-B485EE46CDB8}"/>
               </a:ext>
             </a:extLst>
           </p:cNvPr>
@@ -9089,7 +9194,7 @@
           <a:p>
             <a:r>
               <a:rPr lang="en-GB" dirty="0"/>
-              <a:t>Insert Here, Example of 5 gophers one alive, 4 dead </a:t>
+              <a:t>Conclusion</a:t>
             </a:r>
           </a:p>
         </p:txBody>
@@ -9099,7 +9204,7 @@
           <p:cNvPr id="3" name="Content Placeholder 2">
             <a:extLst>
               <a:ext uri="{FF2B5EF4-FFF2-40B4-BE49-F238E27FC236}">
-                <a16:creationId xmlns:a16="http://schemas.microsoft.com/office/drawing/2014/main" id="{8716B298-CF10-4866-85F6-D856E1963894}"/>
+                <a16:creationId xmlns:a16="http://schemas.microsoft.com/office/drawing/2014/main" id="{C6489CD9-246E-4EF9-8A1F-DF0D212B8A29}"/>
               </a:ext>
             </a:extLst>
           </p:cNvPr>
@@ -9122,7 +9227,7 @@
     </p:spTree>
     <p:extLst>
       <p:ext uri="{BB962C8B-B14F-4D97-AF65-F5344CB8AC3E}">
-        <p14:creationId xmlns:p14="http://schemas.microsoft.com/office/powerpoint/2010/main" val="3790213746"/>
+        <p14:creationId xmlns:p14="http://schemas.microsoft.com/office/powerpoint/2010/main" val="2651521754"/>
       </p:ext>
     </p:extLst>
   </p:cSld>
@@ -9154,7 +9259,7 @@
           <p:cNvPr id="2" name="Title 1">
             <a:extLst>
               <a:ext uri="{FF2B5EF4-FFF2-40B4-BE49-F238E27FC236}">
-                <a16:creationId xmlns:a16="http://schemas.microsoft.com/office/drawing/2014/main" id="{B88F905B-DC9A-4E15-887A-0D816B2DA849}"/>
+                <a16:creationId xmlns:a16="http://schemas.microsoft.com/office/drawing/2014/main" id="{DDA23A98-14C6-40E0-A90C-6468725EFA2C}"/>
               </a:ext>
             </a:extLst>
           </p:cNvPr>
@@ -9172,7 +9277,7 @@
           <a:p>
             <a:r>
               <a:rPr lang="en-GB" dirty="0"/>
-              <a:t>Checklist</a:t>
+              <a:t>Perseverance</a:t>
             </a:r>
           </a:p>
         </p:txBody>
@@ -9182,7 +9287,7 @@
           <p:cNvPr id="3" name="Content Placeholder 2">
             <a:extLst>
               <a:ext uri="{FF2B5EF4-FFF2-40B4-BE49-F238E27FC236}">
-                <a16:creationId xmlns:a16="http://schemas.microsoft.com/office/drawing/2014/main" id="{14229407-2ED8-43A8-819B-30DDEB3D38EC}"/>
+                <a16:creationId xmlns:a16="http://schemas.microsoft.com/office/drawing/2014/main" id="{B7866C6F-7AB4-4FF2-AC93-597F73926565}"/>
               </a:ext>
             </a:extLst>
           </p:cNvPr>
@@ -9200,24 +9305,21 @@
           <a:p>
             <a:r>
               <a:rPr lang="en-GB" dirty="0"/>
-              <a:t>Concurrency is not parallelism </a:t>
-            </a:r>
-            <a:r>
-              <a:rPr lang="en-GB" dirty="0">
-                <a:latin typeface="Segoe MDL2 Assets" panose="050A0102010101010101" pitchFamily="18" charset="0"/>
-              </a:rPr>
-              <a:t> </a:t>
-            </a:r>
-          </a:p>
-          <a:p>
-            <a:endParaRPr lang="en-GB" dirty="0"/>
+              <a:t>Talking about your project with other developers </a:t>
+            </a:r>
+          </a:p>
+          <a:p>
+            <a:r>
+              <a:rPr lang="en-GB" dirty="0"/>
+              <a:t>Getting help</a:t>
+            </a:r>
           </a:p>
         </p:txBody>
       </p:sp>
     </p:spTree>
     <p:extLst>
       <p:ext uri="{BB962C8B-B14F-4D97-AF65-F5344CB8AC3E}">
-        <p14:creationId xmlns:p14="http://schemas.microsoft.com/office/powerpoint/2010/main" val="3193971414"/>
+        <p14:creationId xmlns:p14="http://schemas.microsoft.com/office/powerpoint/2010/main" val="847199732"/>
       </p:ext>
     </p:extLst>
   </p:cSld>
@@ -9249,6 +9351,549 @@
           <p:cNvPr id="2" name="Title 1">
             <a:extLst>
               <a:ext uri="{FF2B5EF4-FFF2-40B4-BE49-F238E27FC236}">
+                <a16:creationId xmlns:a16="http://schemas.microsoft.com/office/drawing/2014/main" id="{CFF32C6C-3D00-4977-9425-46509C1A3129}"/>
+              </a:ext>
+            </a:extLst>
+          </p:cNvPr>
+          <p:cNvSpPr>
+            <a:spLocks noGrp="1"/>
+          </p:cNvSpPr>
+          <p:nvPr>
+            <p:ph type="title"/>
+          </p:nvPr>
+        </p:nvSpPr>
+        <p:spPr/>
+        <p:txBody>
+          <a:bodyPr/>
+          <a:lstStyle/>
+          <a:p>
+            <a:r>
+              <a:rPr lang="en-GB" dirty="0"/>
+              <a:t>Go – Starter Pack</a:t>
+            </a:r>
+          </a:p>
+        </p:txBody>
+      </p:sp>
+      <p:sp>
+        <p:nvSpPr>
+          <p:cNvPr id="3" name="Content Placeholder 2">
+            <a:extLst>
+              <a:ext uri="{FF2B5EF4-FFF2-40B4-BE49-F238E27FC236}">
+                <a16:creationId xmlns:a16="http://schemas.microsoft.com/office/drawing/2014/main" id="{3B81F4FB-26EB-4DA4-9507-E147BFC741B8}"/>
+              </a:ext>
+            </a:extLst>
+          </p:cNvPr>
+          <p:cNvSpPr>
+            <a:spLocks noGrp="1"/>
+          </p:cNvSpPr>
+          <p:nvPr>
+            <p:ph idx="1"/>
+          </p:nvPr>
+        </p:nvSpPr>
+        <p:spPr/>
+        <p:txBody>
+          <a:bodyPr/>
+          <a:lstStyle/>
+          <a:p>
+            <a:r>
+              <a:rPr lang="en-GB" dirty="0"/>
+              <a:t>Installing GO. </a:t>
+            </a:r>
+          </a:p>
+          <a:p>
+            <a:r>
+              <a:rPr lang="en-GB" dirty="0"/>
+              <a:t>Learning the syntax</a:t>
+            </a:r>
+          </a:p>
+          <a:p>
+            <a:endParaRPr lang="en-GB" dirty="0"/>
+          </a:p>
+        </p:txBody>
+      </p:sp>
+    </p:spTree>
+    <p:extLst>
+      <p:ext uri="{BB962C8B-B14F-4D97-AF65-F5344CB8AC3E}">
+        <p14:creationId xmlns:p14="http://schemas.microsoft.com/office/powerpoint/2010/main" val="1566399315"/>
+      </p:ext>
+    </p:extLst>
+  </p:cSld>
+  <p:clrMapOvr>
+    <a:masterClrMapping/>
+  </p:clrMapOvr>
+</p:sld>
+</file>
+
+<file path=ppt/slides/slide33.xml><?xml version="1.0" encoding="utf-8"?>
+<p:sld xmlns:a="http://schemas.openxmlformats.org/drawingml/2006/main" xmlns:r="http://schemas.openxmlformats.org/officeDocument/2006/relationships" xmlns:p="http://schemas.openxmlformats.org/presentationml/2006/main">
+  <p:cSld>
+    <p:spTree>
+      <p:nvGrpSpPr>
+        <p:cNvPr id="1" name=""/>
+        <p:cNvGrpSpPr/>
+        <p:nvPr/>
+      </p:nvGrpSpPr>
+      <p:grpSpPr>
+        <a:xfrm>
+          <a:off x="0" y="0"/>
+          <a:ext cx="0" cy="0"/>
+          <a:chOff x="0" y="0"/>
+          <a:chExt cx="0" cy="0"/>
+        </a:xfrm>
+      </p:grpSpPr>
+      <p:sp>
+        <p:nvSpPr>
+          <p:cNvPr id="2" name="Title 1">
+            <a:extLst>
+              <a:ext uri="{FF2B5EF4-FFF2-40B4-BE49-F238E27FC236}">
+                <a16:creationId xmlns:a16="http://schemas.microsoft.com/office/drawing/2014/main" id="{F791C732-68FC-4DBF-A925-B9A44335C54F}"/>
+              </a:ext>
+            </a:extLst>
+          </p:cNvPr>
+          <p:cNvSpPr>
+            <a:spLocks noGrp="1"/>
+          </p:cNvSpPr>
+          <p:nvPr>
+            <p:ph type="title"/>
+          </p:nvPr>
+        </p:nvSpPr>
+        <p:spPr/>
+        <p:txBody>
+          <a:bodyPr/>
+          <a:lstStyle/>
+          <a:p>
+            <a:r>
+              <a:rPr lang="en-GB" dirty="0"/>
+              <a:t>Finding A Catalyst</a:t>
+            </a:r>
+          </a:p>
+        </p:txBody>
+      </p:sp>
+      <p:sp>
+        <p:nvSpPr>
+          <p:cNvPr id="3" name="Content Placeholder 2">
+            <a:extLst>
+              <a:ext uri="{FF2B5EF4-FFF2-40B4-BE49-F238E27FC236}">
+                <a16:creationId xmlns:a16="http://schemas.microsoft.com/office/drawing/2014/main" id="{C206744A-0D9B-4231-BD87-CF25D90A8004}"/>
+              </a:ext>
+            </a:extLst>
+          </p:cNvPr>
+          <p:cNvSpPr>
+            <a:spLocks noGrp="1"/>
+          </p:cNvSpPr>
+          <p:nvPr>
+            <p:ph idx="1"/>
+          </p:nvPr>
+        </p:nvSpPr>
+        <p:spPr/>
+        <p:txBody>
+          <a:bodyPr/>
+          <a:lstStyle/>
+          <a:p>
+            <a:endParaRPr lang="en-GB"/>
+          </a:p>
+        </p:txBody>
+      </p:sp>
+    </p:spTree>
+    <p:extLst>
+      <p:ext uri="{BB962C8B-B14F-4D97-AF65-F5344CB8AC3E}">
+        <p14:creationId xmlns:p14="http://schemas.microsoft.com/office/powerpoint/2010/main" val="4016827040"/>
+      </p:ext>
+    </p:extLst>
+  </p:cSld>
+  <p:clrMapOvr>
+    <a:masterClrMapping/>
+  </p:clrMapOvr>
+</p:sld>
+</file>
+
+<file path=ppt/slides/slide34.xml><?xml version="1.0" encoding="utf-8"?>
+<p:sld xmlns:a="http://schemas.openxmlformats.org/drawingml/2006/main" xmlns:r="http://schemas.openxmlformats.org/officeDocument/2006/relationships" xmlns:p="http://schemas.openxmlformats.org/presentationml/2006/main">
+  <p:cSld>
+    <p:spTree>
+      <p:nvGrpSpPr>
+        <p:cNvPr id="1" name=""/>
+        <p:cNvGrpSpPr/>
+        <p:nvPr/>
+      </p:nvGrpSpPr>
+      <p:grpSpPr>
+        <a:xfrm>
+          <a:off x="0" y="0"/>
+          <a:ext cx="0" cy="0"/>
+          <a:chOff x="0" y="0"/>
+          <a:chExt cx="0" cy="0"/>
+        </a:xfrm>
+      </p:grpSpPr>
+      <p:sp>
+        <p:nvSpPr>
+          <p:cNvPr id="2" name="Title 1">
+            <a:extLst>
+              <a:ext uri="{FF2B5EF4-FFF2-40B4-BE49-F238E27FC236}">
+                <a16:creationId xmlns:a16="http://schemas.microsoft.com/office/drawing/2014/main" id="{32F06B3C-EA2D-46B1-AB79-08EFA8CCC0C1}"/>
+              </a:ext>
+            </a:extLst>
+          </p:cNvPr>
+          <p:cNvSpPr>
+            <a:spLocks noGrp="1"/>
+          </p:cNvSpPr>
+          <p:nvPr>
+            <p:ph type="title"/>
+          </p:nvPr>
+        </p:nvSpPr>
+        <p:spPr/>
+        <p:txBody>
+          <a:bodyPr/>
+          <a:lstStyle/>
+          <a:p>
+            <a:r>
+              <a:rPr lang="en-GB" dirty="0"/>
+              <a:t>Managing Scope and Completing Projects</a:t>
+            </a:r>
+          </a:p>
+        </p:txBody>
+      </p:sp>
+      <p:sp>
+        <p:nvSpPr>
+          <p:cNvPr id="3" name="Content Placeholder 2">
+            <a:extLst>
+              <a:ext uri="{FF2B5EF4-FFF2-40B4-BE49-F238E27FC236}">
+                <a16:creationId xmlns:a16="http://schemas.microsoft.com/office/drawing/2014/main" id="{D2524174-1A6E-43AD-AFB4-E3F8B9B5D53A}"/>
+              </a:ext>
+            </a:extLst>
+          </p:cNvPr>
+          <p:cNvSpPr>
+            <a:spLocks noGrp="1"/>
+          </p:cNvSpPr>
+          <p:nvPr>
+            <p:ph idx="1"/>
+          </p:nvPr>
+        </p:nvSpPr>
+        <p:spPr/>
+        <p:txBody>
+          <a:bodyPr/>
+          <a:lstStyle/>
+          <a:p>
+            <a:endParaRPr lang="en-GB"/>
+          </a:p>
+        </p:txBody>
+      </p:sp>
+    </p:spTree>
+    <p:extLst>
+      <p:ext uri="{BB962C8B-B14F-4D97-AF65-F5344CB8AC3E}">
+        <p14:creationId xmlns:p14="http://schemas.microsoft.com/office/powerpoint/2010/main" val="1162966501"/>
+      </p:ext>
+    </p:extLst>
+  </p:cSld>
+  <p:clrMapOvr>
+    <a:masterClrMapping/>
+  </p:clrMapOvr>
+</p:sld>
+</file>
+
+<file path=ppt/slides/slide35.xml><?xml version="1.0" encoding="utf-8"?>
+<p:sld xmlns:a="http://schemas.openxmlformats.org/drawingml/2006/main" xmlns:r="http://schemas.openxmlformats.org/officeDocument/2006/relationships" xmlns:p="http://schemas.openxmlformats.org/presentationml/2006/main">
+  <p:cSld>
+    <p:spTree>
+      <p:nvGrpSpPr>
+        <p:cNvPr id="1" name=""/>
+        <p:cNvGrpSpPr/>
+        <p:nvPr/>
+      </p:nvGrpSpPr>
+      <p:grpSpPr>
+        <a:xfrm>
+          <a:off x="0" y="0"/>
+          <a:ext cx="0" cy="0"/>
+          <a:chOff x="0" y="0"/>
+          <a:chExt cx="0" cy="0"/>
+        </a:xfrm>
+      </p:grpSpPr>
+      <p:sp>
+        <p:nvSpPr>
+          <p:cNvPr id="2" name="Title 1">
+            <a:extLst>
+              <a:ext uri="{FF2B5EF4-FFF2-40B4-BE49-F238E27FC236}">
+                <a16:creationId xmlns:a16="http://schemas.microsoft.com/office/drawing/2014/main" id="{F106CE47-2D88-4386-9645-6FF2058FA701}"/>
+              </a:ext>
+            </a:extLst>
+          </p:cNvPr>
+          <p:cNvSpPr>
+            <a:spLocks noGrp="1"/>
+          </p:cNvSpPr>
+          <p:nvPr>
+            <p:ph type="title"/>
+          </p:nvPr>
+        </p:nvSpPr>
+        <p:spPr/>
+        <p:txBody>
+          <a:bodyPr/>
+          <a:lstStyle/>
+          <a:p>
+            <a:r>
+              <a:rPr lang="en-GB" dirty="0"/>
+              <a:t>Getting past the feeling of pointlessness</a:t>
+            </a:r>
+          </a:p>
+        </p:txBody>
+      </p:sp>
+      <p:sp>
+        <p:nvSpPr>
+          <p:cNvPr id="3" name="Content Placeholder 2">
+            <a:extLst>
+              <a:ext uri="{FF2B5EF4-FFF2-40B4-BE49-F238E27FC236}">
+                <a16:creationId xmlns:a16="http://schemas.microsoft.com/office/drawing/2014/main" id="{3E7E5D08-3BD9-4083-ABF9-3C1E46633F36}"/>
+              </a:ext>
+            </a:extLst>
+          </p:cNvPr>
+          <p:cNvSpPr>
+            <a:spLocks noGrp="1"/>
+          </p:cNvSpPr>
+          <p:nvPr>
+            <p:ph idx="1"/>
+          </p:nvPr>
+        </p:nvSpPr>
+        <p:spPr/>
+        <p:txBody>
+          <a:bodyPr/>
+          <a:lstStyle/>
+          <a:p>
+            <a:r>
+              <a:rPr lang="en-GB" dirty="0"/>
+              <a:t>Finding a Catalyst, to improve motivation</a:t>
+            </a:r>
+          </a:p>
+          <a:p>
+            <a:pPr lvl="1"/>
+            <a:r>
+              <a:rPr lang="en-GB" dirty="0"/>
+              <a:t>Discussing your project with peers</a:t>
+            </a:r>
+          </a:p>
+          <a:p>
+            <a:pPr lvl="1"/>
+            <a:r>
+              <a:rPr lang="en-GB" dirty="0"/>
+              <a:t>Creating an actual deadline</a:t>
+            </a:r>
+          </a:p>
+          <a:p>
+            <a:pPr lvl="1"/>
+            <a:endParaRPr lang="en-GB" dirty="0"/>
+          </a:p>
+        </p:txBody>
+      </p:sp>
+    </p:spTree>
+    <p:extLst>
+      <p:ext uri="{BB962C8B-B14F-4D97-AF65-F5344CB8AC3E}">
+        <p14:creationId xmlns:p14="http://schemas.microsoft.com/office/powerpoint/2010/main" val="1961839492"/>
+      </p:ext>
+    </p:extLst>
+  </p:cSld>
+  <p:clrMapOvr>
+    <a:masterClrMapping/>
+  </p:clrMapOvr>
+</p:sld>
+</file>
+
+<file path=ppt/slides/slide36.xml><?xml version="1.0" encoding="utf-8"?>
+<p:sld xmlns:a="http://schemas.openxmlformats.org/drawingml/2006/main" xmlns:r="http://schemas.openxmlformats.org/officeDocument/2006/relationships" xmlns:p="http://schemas.openxmlformats.org/presentationml/2006/main">
+  <p:cSld>
+    <p:spTree>
+      <p:nvGrpSpPr>
+        <p:cNvPr id="1" name=""/>
+        <p:cNvGrpSpPr/>
+        <p:nvPr/>
+      </p:nvGrpSpPr>
+      <p:grpSpPr>
+        <a:xfrm>
+          <a:off x="0" y="0"/>
+          <a:ext cx="0" cy="0"/>
+          <a:chOff x="0" y="0"/>
+          <a:chExt cx="0" cy="0"/>
+        </a:xfrm>
+      </p:grpSpPr>
+      <p:sp>
+        <p:nvSpPr>
+          <p:cNvPr id="2" name="Title 1">
+            <a:extLst>
+              <a:ext uri="{FF2B5EF4-FFF2-40B4-BE49-F238E27FC236}">
+                <a16:creationId xmlns:a16="http://schemas.microsoft.com/office/drawing/2014/main" id="{8665D156-403C-4612-AA65-B49BA41EDF64}"/>
+              </a:ext>
+            </a:extLst>
+          </p:cNvPr>
+          <p:cNvSpPr>
+            <a:spLocks noGrp="1"/>
+          </p:cNvSpPr>
+          <p:nvPr>
+            <p:ph type="title"/>
+          </p:nvPr>
+        </p:nvSpPr>
+        <p:spPr/>
+        <p:txBody>
+          <a:bodyPr/>
+          <a:lstStyle/>
+          <a:p>
+            <a:r>
+              <a:rPr lang="en-GB" dirty="0"/>
+              <a:t>Insert Here, Example of 5 gophers one alive, 4 dead </a:t>
+            </a:r>
+          </a:p>
+        </p:txBody>
+      </p:sp>
+      <p:sp>
+        <p:nvSpPr>
+          <p:cNvPr id="3" name="Content Placeholder 2">
+            <a:extLst>
+              <a:ext uri="{FF2B5EF4-FFF2-40B4-BE49-F238E27FC236}">
+                <a16:creationId xmlns:a16="http://schemas.microsoft.com/office/drawing/2014/main" id="{8716B298-CF10-4866-85F6-D856E1963894}"/>
+              </a:ext>
+            </a:extLst>
+          </p:cNvPr>
+          <p:cNvSpPr>
+            <a:spLocks noGrp="1"/>
+          </p:cNvSpPr>
+          <p:nvPr>
+            <p:ph idx="1"/>
+          </p:nvPr>
+        </p:nvSpPr>
+        <p:spPr/>
+        <p:txBody>
+          <a:bodyPr/>
+          <a:lstStyle/>
+          <a:p>
+            <a:endParaRPr lang="en-GB"/>
+          </a:p>
+        </p:txBody>
+      </p:sp>
+    </p:spTree>
+    <p:extLst>
+      <p:ext uri="{BB962C8B-B14F-4D97-AF65-F5344CB8AC3E}">
+        <p14:creationId xmlns:p14="http://schemas.microsoft.com/office/powerpoint/2010/main" val="3790213746"/>
+      </p:ext>
+    </p:extLst>
+  </p:cSld>
+  <p:clrMapOvr>
+    <a:masterClrMapping/>
+  </p:clrMapOvr>
+</p:sld>
+</file>
+
+<file path=ppt/slides/slide37.xml><?xml version="1.0" encoding="utf-8"?>
+<p:sld xmlns:a="http://schemas.openxmlformats.org/drawingml/2006/main" xmlns:r="http://schemas.openxmlformats.org/officeDocument/2006/relationships" xmlns:p="http://schemas.openxmlformats.org/presentationml/2006/main">
+  <p:cSld>
+    <p:spTree>
+      <p:nvGrpSpPr>
+        <p:cNvPr id="1" name=""/>
+        <p:cNvGrpSpPr/>
+        <p:nvPr/>
+      </p:nvGrpSpPr>
+      <p:grpSpPr>
+        <a:xfrm>
+          <a:off x="0" y="0"/>
+          <a:ext cx="0" cy="0"/>
+          <a:chOff x="0" y="0"/>
+          <a:chExt cx="0" cy="0"/>
+        </a:xfrm>
+      </p:grpSpPr>
+      <p:sp>
+        <p:nvSpPr>
+          <p:cNvPr id="2" name="Title 1">
+            <a:extLst>
+              <a:ext uri="{FF2B5EF4-FFF2-40B4-BE49-F238E27FC236}">
+                <a16:creationId xmlns:a16="http://schemas.microsoft.com/office/drawing/2014/main" id="{B88F905B-DC9A-4E15-887A-0D816B2DA849}"/>
+              </a:ext>
+            </a:extLst>
+          </p:cNvPr>
+          <p:cNvSpPr>
+            <a:spLocks noGrp="1"/>
+          </p:cNvSpPr>
+          <p:nvPr>
+            <p:ph type="title"/>
+          </p:nvPr>
+        </p:nvSpPr>
+        <p:spPr/>
+        <p:txBody>
+          <a:bodyPr/>
+          <a:lstStyle/>
+          <a:p>
+            <a:r>
+              <a:rPr lang="en-GB" dirty="0"/>
+              <a:t>Checklist</a:t>
+            </a:r>
+          </a:p>
+        </p:txBody>
+      </p:sp>
+      <p:sp>
+        <p:nvSpPr>
+          <p:cNvPr id="3" name="Content Placeholder 2">
+            <a:extLst>
+              <a:ext uri="{FF2B5EF4-FFF2-40B4-BE49-F238E27FC236}">
+                <a16:creationId xmlns:a16="http://schemas.microsoft.com/office/drawing/2014/main" id="{14229407-2ED8-43A8-819B-30DDEB3D38EC}"/>
+              </a:ext>
+            </a:extLst>
+          </p:cNvPr>
+          <p:cNvSpPr>
+            <a:spLocks noGrp="1"/>
+          </p:cNvSpPr>
+          <p:nvPr>
+            <p:ph idx="1"/>
+          </p:nvPr>
+        </p:nvSpPr>
+        <p:spPr/>
+        <p:txBody>
+          <a:bodyPr/>
+          <a:lstStyle/>
+          <a:p>
+            <a:r>
+              <a:rPr lang="en-GB" dirty="0"/>
+              <a:t>Concurrency is not parallelism </a:t>
+            </a:r>
+            <a:r>
+              <a:rPr lang="en-GB" dirty="0">
+                <a:latin typeface="Segoe MDL2 Assets" panose="050A0102010101010101" pitchFamily="18" charset="0"/>
+              </a:rPr>
+              <a:t> </a:t>
+            </a:r>
+          </a:p>
+          <a:p>
+            <a:endParaRPr lang="en-GB" dirty="0"/>
+          </a:p>
+        </p:txBody>
+      </p:sp>
+    </p:spTree>
+    <p:extLst>
+      <p:ext uri="{BB962C8B-B14F-4D97-AF65-F5344CB8AC3E}">
+        <p14:creationId xmlns:p14="http://schemas.microsoft.com/office/powerpoint/2010/main" val="3193971414"/>
+      </p:ext>
+    </p:extLst>
+  </p:cSld>
+  <p:clrMapOvr>
+    <a:masterClrMapping/>
+  </p:clrMapOvr>
+</p:sld>
+</file>
+
+<file path=ppt/slides/slide38.xml><?xml version="1.0" encoding="utf-8"?>
+<p:sld xmlns:a="http://schemas.openxmlformats.org/drawingml/2006/main" xmlns:r="http://schemas.openxmlformats.org/officeDocument/2006/relationships" xmlns:p="http://schemas.openxmlformats.org/presentationml/2006/main">
+  <p:cSld>
+    <p:spTree>
+      <p:nvGrpSpPr>
+        <p:cNvPr id="1" name=""/>
+        <p:cNvGrpSpPr/>
+        <p:nvPr/>
+      </p:nvGrpSpPr>
+      <p:grpSpPr>
+        <a:xfrm>
+          <a:off x="0" y="0"/>
+          <a:ext cx="0" cy="0"/>
+          <a:chOff x="0" y="0"/>
+          <a:chExt cx="0" cy="0"/>
+        </a:xfrm>
+      </p:grpSpPr>
+      <p:sp>
+        <p:nvSpPr>
+          <p:cNvPr id="2" name="Title 1">
+            <a:extLst>
+              <a:ext uri="{FF2B5EF4-FFF2-40B4-BE49-F238E27FC236}">
                 <a16:creationId xmlns:a16="http://schemas.microsoft.com/office/drawing/2014/main" id="{B88F905B-DC9A-4E15-887A-0D816B2DA849}"/>
               </a:ext>
             </a:extLst>
@@ -9353,7 +9998,7 @@
 </p:sld>
 </file>
 
-<file path=ppt/slides/slide33.xml><?xml version="1.0" encoding="utf-8"?>
+<file path=ppt/slides/slide39.xml><?xml version="1.0" encoding="utf-8"?>
 <p:sld xmlns:a="http://schemas.openxmlformats.org/drawingml/2006/main" xmlns:r="http://schemas.openxmlformats.org/officeDocument/2006/relationships" xmlns:p="http://schemas.openxmlformats.org/presentationml/2006/main">
   <p:cSld>
     <p:spTree>
@@ -9889,7 +10534,16 @@
           <a:p>
             <a:r>
               <a:rPr lang="en-GB" dirty="0"/>
-              <a:t>Learning syntax from basic tutorials. </a:t>
+              <a:t>Learning syntax from basic tutorials.</a:t>
+            </a:r>
+          </a:p>
+          <a:p>
+            <a:endParaRPr lang="en-GB" dirty="0"/>
+          </a:p>
+          <a:p>
+            <a:r>
+              <a:rPr lang="en-GB" dirty="0"/>
+              <a:t>Completing the Go tour </a:t>
             </a:r>
           </a:p>
         </p:txBody>

</xml_diff>

<commit_message>
Removed unused variables updated presentation
</commit_message>
<xml_diff>
--- a/GopherLife.pptx
+++ b/GopherLife.pptx
@@ -5,7 +5,7 @@
     <p:sldMasterId id="2147483678" r:id="rId1"/>
   </p:sldMasterIdLst>
   <p:notesMasterIdLst>
-    <p:notesMasterId r:id="rId42"/>
+    <p:notesMasterId r:id="rId49"/>
   </p:notesMasterIdLst>
   <p:sldIdLst>
     <p:sldId id="256" r:id="rId2"/>
@@ -33,21 +33,28 @@
     <p:sldId id="292" r:id="rId24"/>
     <p:sldId id="289" r:id="rId25"/>
     <p:sldId id="293" r:id="rId26"/>
-    <p:sldId id="296" r:id="rId27"/>
-    <p:sldId id="294" r:id="rId28"/>
-    <p:sldId id="295" r:id="rId29"/>
-    <p:sldId id="285" r:id="rId30"/>
-    <p:sldId id="287" r:id="rId31"/>
-    <p:sldId id="286" r:id="rId32"/>
-    <p:sldId id="266" r:id="rId33"/>
-    <p:sldId id="257" r:id="rId34"/>
-    <p:sldId id="258" r:id="rId35"/>
-    <p:sldId id="259" r:id="rId36"/>
-    <p:sldId id="261" r:id="rId37"/>
-    <p:sldId id="263" r:id="rId38"/>
-    <p:sldId id="262" r:id="rId39"/>
-    <p:sldId id="264" r:id="rId40"/>
-    <p:sldId id="279" r:id="rId41"/>
+    <p:sldId id="303" r:id="rId27"/>
+    <p:sldId id="296" r:id="rId28"/>
+    <p:sldId id="297" r:id="rId29"/>
+    <p:sldId id="298" r:id="rId30"/>
+    <p:sldId id="299" r:id="rId31"/>
+    <p:sldId id="302" r:id="rId32"/>
+    <p:sldId id="301" r:id="rId33"/>
+    <p:sldId id="300" r:id="rId34"/>
+    <p:sldId id="294" r:id="rId35"/>
+    <p:sldId id="295" r:id="rId36"/>
+    <p:sldId id="285" r:id="rId37"/>
+    <p:sldId id="287" r:id="rId38"/>
+    <p:sldId id="286" r:id="rId39"/>
+    <p:sldId id="266" r:id="rId40"/>
+    <p:sldId id="257" r:id="rId41"/>
+    <p:sldId id="258" r:id="rId42"/>
+    <p:sldId id="259" r:id="rId43"/>
+    <p:sldId id="261" r:id="rId44"/>
+    <p:sldId id="263" r:id="rId45"/>
+    <p:sldId id="262" r:id="rId46"/>
+    <p:sldId id="264" r:id="rId47"/>
+    <p:sldId id="279" r:id="rId48"/>
   </p:sldIdLst>
   <p:sldSz cx="12192000" cy="6858000"/>
   <p:notesSz cx="6858000" cy="9144000"/>
@@ -236,7 +243,7 @@
           <a:p>
             <a:fld id="{4F997A0C-E4B2-467D-ABDF-C6BB0AD1437F}" type="datetimeFigureOut">
               <a:rPr lang="en-GB" smtClean="0"/>
-              <a:t>25/11/2018</a:t>
+              <a:t>10/12/2018</a:t>
             </a:fld>
             <a:endParaRPr lang="en-GB"/>
           </a:p>
@@ -569,7 +576,7 @@
           <a:p>
             <a:fld id="{D37E09BB-0EE2-4AA1-9043-B532D0F5CCDE}" type="slidenum">
               <a:rPr lang="en-GB" smtClean="0"/>
-              <a:t>26</a:t>
+              <a:t>27</a:t>
             </a:fld>
             <a:endParaRPr lang="en-GB"/>
           </a:p>
@@ -656,7 +663,7 @@
           <a:p>
             <a:fld id="{D37E09BB-0EE2-4AA1-9043-B532D0F5CCDE}" type="slidenum">
               <a:rPr lang="en-GB" smtClean="0"/>
-              <a:t>36</a:t>
+              <a:t>43</a:t>
             </a:fld>
             <a:endParaRPr lang="en-GB"/>
           </a:p>
@@ -861,7 +868,7 @@
           <a:p>
             <a:fld id="{55E4148D-2AA3-4A29-8641-0082B7E18494}" type="datetimeFigureOut">
               <a:rPr lang="en-GB" smtClean="0"/>
-              <a:t>25/11/2018</a:t>
+              <a:t>10/12/2018</a:t>
             </a:fld>
             <a:endParaRPr lang="en-GB"/>
           </a:p>
@@ -1136,7 +1143,7 @@
           <a:p>
             <a:fld id="{55E4148D-2AA3-4A29-8641-0082B7E18494}" type="datetimeFigureOut">
               <a:rPr lang="en-GB" smtClean="0"/>
-              <a:t>25/11/2018</a:t>
+              <a:t>10/12/2018</a:t>
             </a:fld>
             <a:endParaRPr lang="en-GB"/>
           </a:p>
@@ -1330,7 +1337,7 @@
           <a:p>
             <a:fld id="{55E4148D-2AA3-4A29-8641-0082B7E18494}" type="datetimeFigureOut">
               <a:rPr lang="en-GB" smtClean="0"/>
-              <a:t>25/11/2018</a:t>
+              <a:t>10/12/2018</a:t>
             </a:fld>
             <a:endParaRPr lang="en-GB"/>
           </a:p>
@@ -1603,7 +1610,7 @@
           <a:p>
             <a:fld id="{55E4148D-2AA3-4A29-8641-0082B7E18494}" type="datetimeFigureOut">
               <a:rPr lang="en-GB" smtClean="0"/>
-              <a:t>25/11/2018</a:t>
+              <a:t>10/12/2018</a:t>
             </a:fld>
             <a:endParaRPr lang="en-GB"/>
           </a:p>
@@ -1944,7 +1951,7 @@
           <a:p>
             <a:fld id="{55E4148D-2AA3-4A29-8641-0082B7E18494}" type="datetimeFigureOut">
               <a:rPr lang="en-GB" smtClean="0"/>
-              <a:t>25/11/2018</a:t>
+              <a:t>10/12/2018</a:t>
             </a:fld>
             <a:endParaRPr lang="en-GB"/>
           </a:p>
@@ -2567,7 +2574,7 @@
           <a:p>
             <a:fld id="{55E4148D-2AA3-4A29-8641-0082B7E18494}" type="datetimeFigureOut">
               <a:rPr lang="en-GB" smtClean="0"/>
-              <a:t>25/11/2018</a:t>
+              <a:t>10/12/2018</a:t>
             </a:fld>
             <a:endParaRPr lang="en-GB"/>
           </a:p>
@@ -3427,7 +3434,7 @@
           <a:p>
             <a:fld id="{55E4148D-2AA3-4A29-8641-0082B7E18494}" type="datetimeFigureOut">
               <a:rPr lang="en-GB" smtClean="0"/>
-              <a:t>25/11/2018</a:t>
+              <a:t>10/12/2018</a:t>
             </a:fld>
             <a:endParaRPr lang="en-GB"/>
           </a:p>
@@ -3597,7 +3604,7 @@
           <a:p>
             <a:fld id="{55E4148D-2AA3-4A29-8641-0082B7E18494}" type="datetimeFigureOut">
               <a:rPr lang="en-GB" smtClean="0"/>
-              <a:t>25/11/2018</a:t>
+              <a:t>10/12/2018</a:t>
             </a:fld>
             <a:endParaRPr lang="en-GB"/>
           </a:p>
@@ -3777,7 +3784,7 @@
           <a:p>
             <a:fld id="{55E4148D-2AA3-4A29-8641-0082B7E18494}" type="datetimeFigureOut">
               <a:rPr lang="en-GB" smtClean="0"/>
-              <a:t>25/11/2018</a:t>
+              <a:t>10/12/2018</a:t>
             </a:fld>
             <a:endParaRPr lang="en-GB"/>
           </a:p>
@@ -3947,7 +3954,7 @@
           <a:p>
             <a:fld id="{55E4148D-2AA3-4A29-8641-0082B7E18494}" type="datetimeFigureOut">
               <a:rPr lang="en-GB" smtClean="0"/>
-              <a:t>25/11/2018</a:t>
+              <a:t>10/12/2018</a:t>
             </a:fld>
             <a:endParaRPr lang="en-GB"/>
           </a:p>
@@ -4194,7 +4201,7 @@
           <a:p>
             <a:fld id="{55E4148D-2AA3-4A29-8641-0082B7E18494}" type="datetimeFigureOut">
               <a:rPr lang="en-GB" smtClean="0"/>
-              <a:t>25/11/2018</a:t>
+              <a:t>10/12/2018</a:t>
             </a:fld>
             <a:endParaRPr lang="en-GB"/>
           </a:p>
@@ -4486,7 +4493,7 @@
           <a:p>
             <a:fld id="{55E4148D-2AA3-4A29-8641-0082B7E18494}" type="datetimeFigureOut">
               <a:rPr lang="en-GB" smtClean="0"/>
-              <a:t>25/11/2018</a:t>
+              <a:t>10/12/2018</a:t>
             </a:fld>
             <a:endParaRPr lang="en-GB"/>
           </a:p>
@@ -4930,7 +4937,7 @@
           <a:p>
             <a:fld id="{55E4148D-2AA3-4A29-8641-0082B7E18494}" type="datetimeFigureOut">
               <a:rPr lang="en-GB" smtClean="0"/>
-              <a:t>25/11/2018</a:t>
+              <a:t>10/12/2018</a:t>
             </a:fld>
             <a:endParaRPr lang="en-GB"/>
           </a:p>
@@ -5048,7 +5055,7 @@
           <a:p>
             <a:fld id="{55E4148D-2AA3-4A29-8641-0082B7E18494}" type="datetimeFigureOut">
               <a:rPr lang="en-GB" smtClean="0"/>
-              <a:t>25/11/2018</a:t>
+              <a:t>10/12/2018</a:t>
             </a:fld>
             <a:endParaRPr lang="en-GB"/>
           </a:p>
@@ -5143,7 +5150,7 @@
           <a:p>
             <a:fld id="{55E4148D-2AA3-4A29-8641-0082B7E18494}" type="datetimeFigureOut">
               <a:rPr lang="en-GB" smtClean="0"/>
-              <a:t>25/11/2018</a:t>
+              <a:t>10/12/2018</a:t>
             </a:fld>
             <a:endParaRPr lang="en-GB"/>
           </a:p>
@@ -5422,7 +5429,7 @@
           <a:p>
             <a:fld id="{55E4148D-2AA3-4A29-8641-0082B7E18494}" type="datetimeFigureOut">
               <a:rPr lang="en-GB" smtClean="0"/>
-              <a:t>25/11/2018</a:t>
+              <a:t>10/12/2018</a:t>
             </a:fld>
             <a:endParaRPr lang="en-GB"/>
           </a:p>
@@ -5697,7 +5704,7 @@
           <a:p>
             <a:fld id="{55E4148D-2AA3-4A29-8641-0082B7E18494}" type="datetimeFigureOut">
               <a:rPr lang="en-GB" smtClean="0"/>
-              <a:t>25/11/2018</a:t>
+              <a:t>10/12/2018</a:t>
             </a:fld>
             <a:endParaRPr lang="en-GB"/>
           </a:p>
@@ -6126,7 +6133,7 @@
           <a:p>
             <a:fld id="{55E4148D-2AA3-4A29-8641-0082B7E18494}" type="datetimeFigureOut">
               <a:rPr lang="en-GB" smtClean="0"/>
-              <a:t>25/11/2018</a:t>
+              <a:t>10/12/2018</a:t>
             </a:fld>
             <a:endParaRPr lang="en-GB"/>
           </a:p>
@@ -8809,6 +8816,137 @@
           <a:chExt cx="0" cy="0"/>
         </a:xfrm>
       </p:grpSpPr>
+      <p:sp>
+        <p:nvSpPr>
+          <p:cNvPr id="2" name="Title 1">
+            <a:extLst>
+              <a:ext uri="{FF2B5EF4-FFF2-40B4-BE49-F238E27FC236}">
+                <a16:creationId xmlns:a16="http://schemas.microsoft.com/office/drawing/2014/main" id="{D5AD34E6-B9F5-484D-8BC0-F61BE7177945}"/>
+              </a:ext>
+            </a:extLst>
+          </p:cNvPr>
+          <p:cNvSpPr>
+            <a:spLocks noGrp="1"/>
+          </p:cNvSpPr>
+          <p:nvPr>
+            <p:ph type="title"/>
+          </p:nvPr>
+        </p:nvSpPr>
+        <p:spPr/>
+        <p:txBody>
+          <a:bodyPr/>
+          <a:lstStyle/>
+          <a:p>
+            <a:r>
+              <a:rPr lang="en-GB" dirty="0"/>
+              <a:t>Variables</a:t>
+            </a:r>
+          </a:p>
+        </p:txBody>
+      </p:sp>
+      <p:sp>
+        <p:nvSpPr>
+          <p:cNvPr id="3" name="Content Placeholder 2">
+            <a:extLst>
+              <a:ext uri="{FF2B5EF4-FFF2-40B4-BE49-F238E27FC236}">
+                <a16:creationId xmlns:a16="http://schemas.microsoft.com/office/drawing/2014/main" id="{E3E7B6E3-350A-42E9-901D-4256E39894ED}"/>
+              </a:ext>
+            </a:extLst>
+          </p:cNvPr>
+          <p:cNvSpPr>
+            <a:spLocks noGrp="1"/>
+          </p:cNvSpPr>
+          <p:nvPr>
+            <p:ph idx="1"/>
+          </p:nvPr>
+        </p:nvSpPr>
+        <p:spPr/>
+        <p:txBody>
+          <a:bodyPr/>
+          <a:lstStyle/>
+          <a:p>
+            <a:r>
+              <a:rPr lang="en-GB" dirty="0"/>
+              <a:t>Starting Number Of Gophers is 5000</a:t>
+            </a:r>
+          </a:p>
+          <a:p>
+            <a:pPr lvl="1"/>
+            <a:r>
+              <a:rPr lang="en-GB" dirty="0"/>
+              <a:t>Gopher lifespans are around 500</a:t>
+            </a:r>
+          </a:p>
+          <a:p>
+            <a:endParaRPr lang="en-GB" dirty="0"/>
+          </a:p>
+          <a:p>
+            <a:r>
+              <a:rPr lang="en-GB" dirty="0"/>
+              <a:t>Number Of Food on the map is around 1 million, </a:t>
+            </a:r>
+          </a:p>
+          <a:p>
+            <a:endParaRPr lang="en-GB" dirty="0"/>
+          </a:p>
+          <a:p>
+            <a:r>
+              <a:rPr lang="en-GB" dirty="0"/>
+              <a:t>World Size is 3000 x 3000</a:t>
+            </a:r>
+          </a:p>
+          <a:p>
+            <a:endParaRPr lang="en-GB" dirty="0"/>
+          </a:p>
+          <a:p>
+            <a:r>
+              <a:rPr lang="en-GB" dirty="0"/>
+              <a:t>Hunger per </a:t>
+            </a:r>
+            <a:r>
+              <a:rPr lang="en-GB"/>
+              <a:t>moment is 5 </a:t>
+            </a:r>
+            <a:endParaRPr lang="en-GB" dirty="0"/>
+          </a:p>
+          <a:p>
+            <a:endParaRPr lang="en-GB" dirty="0"/>
+          </a:p>
+          <a:p>
+            <a:endParaRPr lang="en-GB" dirty="0"/>
+          </a:p>
+        </p:txBody>
+      </p:sp>
+    </p:spTree>
+    <p:extLst>
+      <p:ext uri="{BB962C8B-B14F-4D97-AF65-F5344CB8AC3E}">
+        <p14:creationId xmlns:p14="http://schemas.microsoft.com/office/powerpoint/2010/main" val="3390754349"/>
+      </p:ext>
+    </p:extLst>
+  </p:cSld>
+  <p:clrMapOvr>
+    <a:masterClrMapping/>
+  </p:clrMapOvr>
+</p:sld>
+</file>
+
+<file path=ppt/slides/slide27.xml><?xml version="1.0" encoding="utf-8"?>
+<p:sld xmlns:a="http://schemas.openxmlformats.org/drawingml/2006/main" xmlns:r="http://schemas.openxmlformats.org/officeDocument/2006/relationships" xmlns:p="http://schemas.openxmlformats.org/presentationml/2006/main">
+  <p:cSld>
+    <p:spTree>
+      <p:nvGrpSpPr>
+        <p:cNvPr id="1" name=""/>
+        <p:cNvGrpSpPr/>
+        <p:nvPr/>
+      </p:nvGrpSpPr>
+      <p:grpSpPr>
+        <a:xfrm>
+          <a:off x="0" y="0"/>
+          <a:ext cx="0" cy="0"/>
+          <a:chOff x="0" y="0"/>
+          <a:chExt cx="0" cy="0"/>
+        </a:xfrm>
+      </p:grpSpPr>
       <p:pic>
         <p:nvPicPr>
           <p:cNvPr id="5" name="Picture 4">
@@ -8852,101 +8990,6 @@
 </p:sld>
 </file>
 
-<file path=ppt/slides/slide27.xml><?xml version="1.0" encoding="utf-8"?>
-<p:sld xmlns:a="http://schemas.openxmlformats.org/drawingml/2006/main" xmlns:r="http://schemas.openxmlformats.org/officeDocument/2006/relationships" xmlns:p="http://schemas.openxmlformats.org/presentationml/2006/main">
-  <p:cSld>
-    <p:spTree>
-      <p:nvGrpSpPr>
-        <p:cNvPr id="1" name=""/>
-        <p:cNvGrpSpPr/>
-        <p:nvPr/>
-      </p:nvGrpSpPr>
-      <p:grpSpPr>
-        <a:xfrm>
-          <a:off x="0" y="0"/>
-          <a:ext cx="0" cy="0"/>
-          <a:chOff x="0" y="0"/>
-          <a:chExt cx="0" cy="0"/>
-        </a:xfrm>
-      </p:grpSpPr>
-      <p:sp>
-        <p:nvSpPr>
-          <p:cNvPr id="2" name="Title 1">
-            <a:extLst>
-              <a:ext uri="{FF2B5EF4-FFF2-40B4-BE49-F238E27FC236}">
-                <a16:creationId xmlns:a16="http://schemas.microsoft.com/office/drawing/2014/main" id="{B35498C6-960E-4458-8130-6765F4CA74F7}"/>
-              </a:ext>
-            </a:extLst>
-          </p:cNvPr>
-          <p:cNvSpPr>
-            <a:spLocks noGrp="1"/>
-          </p:cNvSpPr>
-          <p:nvPr>
-            <p:ph type="title"/>
-          </p:nvPr>
-        </p:nvSpPr>
-        <p:spPr/>
-        <p:txBody>
-          <a:bodyPr/>
-          <a:lstStyle/>
-          <a:p>
-            <a:r>
-              <a:rPr lang="en-GB" dirty="0"/>
-              <a:t>	Progress Checklist	</a:t>
-            </a:r>
-          </a:p>
-        </p:txBody>
-      </p:sp>
-      <p:sp>
-        <p:nvSpPr>
-          <p:cNvPr id="3" name="Content Placeholder 2">
-            <a:extLst>
-              <a:ext uri="{FF2B5EF4-FFF2-40B4-BE49-F238E27FC236}">
-                <a16:creationId xmlns:a16="http://schemas.microsoft.com/office/drawing/2014/main" id="{03803CF5-7407-403C-AA75-7FD98A1144C0}"/>
-              </a:ext>
-            </a:extLst>
-          </p:cNvPr>
-          <p:cNvSpPr>
-            <a:spLocks noGrp="1"/>
-          </p:cNvSpPr>
-          <p:nvPr>
-            <p:ph idx="1"/>
-          </p:nvPr>
-        </p:nvSpPr>
-        <p:spPr/>
-        <p:txBody>
-          <a:bodyPr/>
-          <a:lstStyle/>
-          <a:p>
-            <a:r>
-              <a:rPr lang="en-GB" dirty="0"/>
-              <a:t>Introduction to using go benchmark and go race. </a:t>
-            </a:r>
-          </a:p>
-          <a:p>
-            <a:endParaRPr lang="en-GB" dirty="0"/>
-          </a:p>
-          <a:p>
-            <a:r>
-              <a:rPr lang="en-GB" dirty="0"/>
-              <a:t>Increased knowledge of different ways to optimize searching problems. </a:t>
-            </a:r>
-          </a:p>
-        </p:txBody>
-      </p:sp>
-    </p:spTree>
-    <p:extLst>
-      <p:ext uri="{BB962C8B-B14F-4D97-AF65-F5344CB8AC3E}">
-        <p14:creationId xmlns:p14="http://schemas.microsoft.com/office/powerpoint/2010/main" val="3598754192"/>
-      </p:ext>
-    </p:extLst>
-  </p:cSld>
-  <p:clrMapOvr>
-    <a:masterClrMapping/>
-  </p:clrMapOvr>
-</p:sld>
-</file>
-
 <file path=ppt/slides/slide28.xml><?xml version="1.0" encoding="utf-8"?>
 <p:sld xmlns:a="http://schemas.openxmlformats.org/drawingml/2006/main" xmlns:r="http://schemas.openxmlformats.org/officeDocument/2006/relationships" xmlns:p="http://schemas.openxmlformats.org/presentationml/2006/main">
   <p:cSld>
@@ -8969,7 +9012,7 @@
           <p:cNvPr id="2" name="Title 1">
             <a:extLst>
               <a:ext uri="{FF2B5EF4-FFF2-40B4-BE49-F238E27FC236}">
-                <a16:creationId xmlns:a16="http://schemas.microsoft.com/office/drawing/2014/main" id="{13A895C3-4AA3-4DF4-9348-F010A665C356}"/>
+                <a16:creationId xmlns:a16="http://schemas.microsoft.com/office/drawing/2014/main" id="{E3255AB5-8EE3-4561-966C-E5695A26A235}"/>
               </a:ext>
             </a:extLst>
           </p:cNvPr>
@@ -8985,7 +9028,7 @@
           <a:bodyPr/>
           <a:lstStyle/>
           <a:p>
-            <a:endParaRPr lang="en-GB" dirty="0"/>
+            <a:endParaRPr lang="en-GB"/>
           </a:p>
         </p:txBody>
       </p:sp>
@@ -8994,7 +9037,7 @@
           <p:cNvPr id="3" name="Content Placeholder 2">
             <a:extLst>
               <a:ext uri="{FF2B5EF4-FFF2-40B4-BE49-F238E27FC236}">
-                <a16:creationId xmlns:a16="http://schemas.microsoft.com/office/drawing/2014/main" id="{ABB9FD90-D046-487F-ACA7-C1C377ED3A6F}"/>
+                <a16:creationId xmlns:a16="http://schemas.microsoft.com/office/drawing/2014/main" id="{BD58586D-10EC-4399-A15E-E18A52880BB5}"/>
               </a:ext>
             </a:extLst>
           </p:cNvPr>
@@ -9014,10 +9057,40 @@
           </a:p>
         </p:txBody>
       </p:sp>
+      <p:pic>
+        <p:nvPicPr>
+          <p:cNvPr id="4" name="Picture 3">
+            <a:extLst>
+              <a:ext uri="{FF2B5EF4-FFF2-40B4-BE49-F238E27FC236}">
+                <a16:creationId xmlns:a16="http://schemas.microsoft.com/office/drawing/2014/main" id="{AA7902B0-5491-4FBC-A47C-D5F2E0169216}"/>
+              </a:ext>
+            </a:extLst>
+          </p:cNvPr>
+          <p:cNvPicPr>
+            <a:picLocks noChangeAspect="1"/>
+          </p:cNvPicPr>
+          <p:nvPr/>
+        </p:nvPicPr>
+        <p:blipFill>
+          <a:blip r:embed="rId2"/>
+          <a:stretch>
+            <a:fillRect/>
+          </a:stretch>
+        </p:blipFill>
+        <p:spPr>
+          <a:xfrm>
+            <a:off x="781296" y="508484"/>
+            <a:ext cx="10126488" cy="5896798"/>
+          </a:xfrm>
+          <a:prstGeom prst="rect">
+            <a:avLst/>
+          </a:prstGeom>
+        </p:spPr>
+      </p:pic>
     </p:spTree>
     <p:extLst>
       <p:ext uri="{BB962C8B-B14F-4D97-AF65-F5344CB8AC3E}">
-        <p14:creationId xmlns:p14="http://schemas.microsoft.com/office/powerpoint/2010/main" val="3172546742"/>
+        <p14:creationId xmlns:p14="http://schemas.microsoft.com/office/powerpoint/2010/main" val="3670998062"/>
       </p:ext>
     </p:extLst>
   </p:cSld>
@@ -9049,7 +9122,7 @@
           <p:cNvPr id="2" name="Title 1">
             <a:extLst>
               <a:ext uri="{FF2B5EF4-FFF2-40B4-BE49-F238E27FC236}">
-                <a16:creationId xmlns:a16="http://schemas.microsoft.com/office/drawing/2014/main" id="{5F649051-170D-4D88-A1EB-CD53B67517C2}"/>
+                <a16:creationId xmlns:a16="http://schemas.microsoft.com/office/drawing/2014/main" id="{65F488D5-CF82-4293-8278-D0083D544E72}"/>
               </a:ext>
             </a:extLst>
           </p:cNvPr>
@@ -9065,10 +9138,7 @@
           <a:bodyPr/>
           <a:lstStyle/>
           <a:p>
-            <a:r>
-              <a:rPr lang="en-GB" dirty="0"/>
-              <a:t>Final Showcase</a:t>
-            </a:r>
+            <a:endParaRPr lang="en-GB"/>
           </a:p>
         </p:txBody>
       </p:sp>
@@ -9077,7 +9147,7 @@
           <p:cNvPr id="3" name="Content Placeholder 2">
             <a:extLst>
               <a:ext uri="{FF2B5EF4-FFF2-40B4-BE49-F238E27FC236}">
-                <a16:creationId xmlns:a16="http://schemas.microsoft.com/office/drawing/2014/main" id="{E28FB5CC-2E35-4352-B03D-454660443443}"/>
+                <a16:creationId xmlns:a16="http://schemas.microsoft.com/office/drawing/2014/main" id="{8AECA827-394C-444E-BE1A-907728F99506}"/>
               </a:ext>
             </a:extLst>
           </p:cNvPr>
@@ -9097,10 +9167,40 @@
           </a:p>
         </p:txBody>
       </p:sp>
+      <p:pic>
+        <p:nvPicPr>
+          <p:cNvPr id="4" name="Picture 3">
+            <a:extLst>
+              <a:ext uri="{FF2B5EF4-FFF2-40B4-BE49-F238E27FC236}">
+                <a16:creationId xmlns:a16="http://schemas.microsoft.com/office/drawing/2014/main" id="{5F3F7BEA-4C1A-486F-89AD-F3A324280B9F}"/>
+              </a:ext>
+            </a:extLst>
+          </p:cNvPr>
+          <p:cNvPicPr>
+            <a:picLocks noChangeAspect="1"/>
+          </p:cNvPicPr>
+          <p:nvPr/>
+        </p:nvPicPr>
+        <p:blipFill>
+          <a:blip r:embed="rId2"/>
+          <a:stretch>
+            <a:fillRect/>
+          </a:stretch>
+        </p:blipFill>
+        <p:spPr>
+          <a:xfrm>
+            <a:off x="1228045" y="437732"/>
+            <a:ext cx="9735909" cy="5982535"/>
+          </a:xfrm>
+          <a:prstGeom prst="rect">
+            <a:avLst/>
+          </a:prstGeom>
+        </p:spPr>
+      </p:pic>
     </p:spTree>
     <p:extLst>
       <p:ext uri="{BB962C8B-B14F-4D97-AF65-F5344CB8AC3E}">
-        <p14:creationId xmlns:p14="http://schemas.microsoft.com/office/powerpoint/2010/main" val="2232509740"/>
+        <p14:creationId xmlns:p14="http://schemas.microsoft.com/office/powerpoint/2010/main" val="2150777685"/>
       </p:ext>
     </p:extLst>
   </p:cSld>
@@ -9246,7 +9346,7 @@
           <p:cNvPr id="2" name="Title 1">
             <a:extLst>
               <a:ext uri="{FF2B5EF4-FFF2-40B4-BE49-F238E27FC236}">
-                <a16:creationId xmlns:a16="http://schemas.microsoft.com/office/drawing/2014/main" id="{6CDC4756-BE7A-4B78-81FE-29031289A2AD}"/>
+                <a16:creationId xmlns:a16="http://schemas.microsoft.com/office/drawing/2014/main" id="{C5BFB68C-7564-4E23-8DBD-22953A0313B7}"/>
               </a:ext>
             </a:extLst>
           </p:cNvPr>
@@ -9262,10 +9362,7 @@
           <a:bodyPr/>
           <a:lstStyle/>
           <a:p>
-            <a:r>
-              <a:rPr lang="en-GB" dirty="0"/>
-              <a:t>Final Checklist </a:t>
-            </a:r>
+            <a:endParaRPr lang="en-GB"/>
           </a:p>
         </p:txBody>
       </p:sp>
@@ -9274,7 +9371,7 @@
           <p:cNvPr id="3" name="Content Placeholder 2">
             <a:extLst>
               <a:ext uri="{FF2B5EF4-FFF2-40B4-BE49-F238E27FC236}">
-                <a16:creationId xmlns:a16="http://schemas.microsoft.com/office/drawing/2014/main" id="{07D7EF34-638C-4C71-99D1-10742B4D9377}"/>
+                <a16:creationId xmlns:a16="http://schemas.microsoft.com/office/drawing/2014/main" id="{5CD02D51-FB37-407C-99B2-5CD0F489A03C}"/>
               </a:ext>
             </a:extLst>
           </p:cNvPr>
@@ -9294,10 +9391,40 @@
           </a:p>
         </p:txBody>
       </p:sp>
+      <p:pic>
+        <p:nvPicPr>
+          <p:cNvPr id="4" name="Picture 3">
+            <a:extLst>
+              <a:ext uri="{FF2B5EF4-FFF2-40B4-BE49-F238E27FC236}">
+                <a16:creationId xmlns:a16="http://schemas.microsoft.com/office/drawing/2014/main" id="{A63CFE87-4439-42F6-8EEE-695421823513}"/>
+              </a:ext>
+            </a:extLst>
+          </p:cNvPr>
+          <p:cNvPicPr>
+            <a:picLocks noChangeAspect="1"/>
+          </p:cNvPicPr>
+          <p:nvPr/>
+        </p:nvPicPr>
+        <p:blipFill>
+          <a:blip r:embed="rId2"/>
+          <a:stretch>
+            <a:fillRect/>
+          </a:stretch>
+        </p:blipFill>
+        <p:spPr>
+          <a:xfrm>
+            <a:off x="1103312" y="452718"/>
+            <a:ext cx="9745435" cy="6077798"/>
+          </a:xfrm>
+          <a:prstGeom prst="rect">
+            <a:avLst/>
+          </a:prstGeom>
+        </p:spPr>
+      </p:pic>
     </p:spTree>
     <p:extLst>
       <p:ext uri="{BB962C8B-B14F-4D97-AF65-F5344CB8AC3E}">
-        <p14:creationId xmlns:p14="http://schemas.microsoft.com/office/powerpoint/2010/main" val="2595392705"/>
+        <p14:creationId xmlns:p14="http://schemas.microsoft.com/office/powerpoint/2010/main" val="156207586"/>
       </p:ext>
     </p:extLst>
   </p:cSld>
@@ -9329,7 +9456,7 @@
           <p:cNvPr id="2" name="Title 1">
             <a:extLst>
               <a:ext uri="{FF2B5EF4-FFF2-40B4-BE49-F238E27FC236}">
-                <a16:creationId xmlns:a16="http://schemas.microsoft.com/office/drawing/2014/main" id="{C6A1F8BE-8B71-4987-BE2C-B485EE46CDB8}"/>
+                <a16:creationId xmlns:a16="http://schemas.microsoft.com/office/drawing/2014/main" id="{C5BFB68C-7564-4E23-8DBD-22953A0313B7}"/>
               </a:ext>
             </a:extLst>
           </p:cNvPr>
@@ -9347,7 +9474,7 @@
           <a:p>
             <a:r>
               <a:rPr lang="en-GB" dirty="0"/>
-              <a:t>Conclusion</a:t>
+              <a:t>After a few optimisations</a:t>
             </a:r>
           </a:p>
         </p:txBody>
@@ -9357,7 +9484,7 @@
           <p:cNvPr id="3" name="Content Placeholder 2">
             <a:extLst>
               <a:ext uri="{FF2B5EF4-FFF2-40B4-BE49-F238E27FC236}">
-                <a16:creationId xmlns:a16="http://schemas.microsoft.com/office/drawing/2014/main" id="{C6489CD9-246E-4EF9-8A1F-DF0D212B8A29}"/>
+                <a16:creationId xmlns:a16="http://schemas.microsoft.com/office/drawing/2014/main" id="{5CD02D51-FB37-407C-99B2-5CD0F489A03C}"/>
               </a:ext>
             </a:extLst>
           </p:cNvPr>
@@ -9380,7 +9507,7 @@
     </p:spTree>
     <p:extLst>
       <p:ext uri="{BB962C8B-B14F-4D97-AF65-F5344CB8AC3E}">
-        <p14:creationId xmlns:p14="http://schemas.microsoft.com/office/powerpoint/2010/main" val="2651521754"/>
+        <p14:creationId xmlns:p14="http://schemas.microsoft.com/office/powerpoint/2010/main" val="178600232"/>
       </p:ext>
     </p:extLst>
   </p:cSld>
@@ -9412,7 +9539,7 @@
           <p:cNvPr id="2" name="Title 1">
             <a:extLst>
               <a:ext uri="{FF2B5EF4-FFF2-40B4-BE49-F238E27FC236}">
-                <a16:creationId xmlns:a16="http://schemas.microsoft.com/office/drawing/2014/main" id="{DDA23A98-14C6-40E0-A90C-6468725EFA2C}"/>
+                <a16:creationId xmlns:a16="http://schemas.microsoft.com/office/drawing/2014/main" id="{C5BFB68C-7564-4E23-8DBD-22953A0313B7}"/>
               </a:ext>
             </a:extLst>
           </p:cNvPr>
@@ -9428,10 +9555,7 @@
           <a:bodyPr/>
           <a:lstStyle/>
           <a:p>
-            <a:r>
-              <a:rPr lang="en-GB" dirty="0"/>
-              <a:t>Perseverance</a:t>
-            </a:r>
+            <a:endParaRPr lang="en-GB"/>
           </a:p>
         </p:txBody>
       </p:sp>
@@ -9440,7 +9564,7 @@
           <p:cNvPr id="3" name="Content Placeholder 2">
             <a:extLst>
               <a:ext uri="{FF2B5EF4-FFF2-40B4-BE49-F238E27FC236}">
-                <a16:creationId xmlns:a16="http://schemas.microsoft.com/office/drawing/2014/main" id="{B7866C6F-7AB4-4FF2-AC93-597F73926565}"/>
+                <a16:creationId xmlns:a16="http://schemas.microsoft.com/office/drawing/2014/main" id="{5CD02D51-FB37-407C-99B2-5CD0F489A03C}"/>
               </a:ext>
             </a:extLst>
           </p:cNvPr>
@@ -9456,23 +9580,44 @@
           <a:bodyPr/>
           <a:lstStyle/>
           <a:p>
-            <a:r>
-              <a:rPr lang="en-GB" dirty="0"/>
-              <a:t>Talking about your project with other developers </a:t>
-            </a:r>
-          </a:p>
-          <a:p>
-            <a:r>
-              <a:rPr lang="en-GB" dirty="0"/>
-              <a:t>Getting help</a:t>
-            </a:r>
-          </a:p>
-        </p:txBody>
-      </p:sp>
+            <a:endParaRPr lang="en-GB"/>
+          </a:p>
+        </p:txBody>
+      </p:sp>
+      <p:pic>
+        <p:nvPicPr>
+          <p:cNvPr id="4" name="Picture 3">
+            <a:extLst>
+              <a:ext uri="{FF2B5EF4-FFF2-40B4-BE49-F238E27FC236}">
+                <a16:creationId xmlns:a16="http://schemas.microsoft.com/office/drawing/2014/main" id="{7A4FA3CA-7EA8-40B9-8A71-58D96A45AF47}"/>
+              </a:ext>
+            </a:extLst>
+          </p:cNvPr>
+          <p:cNvPicPr>
+            <a:picLocks noChangeAspect="1"/>
+          </p:cNvPicPr>
+          <p:nvPr/>
+        </p:nvPicPr>
+        <p:blipFill>
+          <a:blip r:embed="rId2"/>
+          <a:stretch>
+            <a:fillRect/>
+          </a:stretch>
+        </p:blipFill>
+        <p:spPr>
+          <a:xfrm>
+            <a:off x="842229" y="571101"/>
+            <a:ext cx="10507541" cy="5715798"/>
+          </a:xfrm>
+          <a:prstGeom prst="rect">
+            <a:avLst/>
+          </a:prstGeom>
+        </p:spPr>
+      </p:pic>
     </p:spTree>
     <p:extLst>
       <p:ext uri="{BB962C8B-B14F-4D97-AF65-F5344CB8AC3E}">
-        <p14:creationId xmlns:p14="http://schemas.microsoft.com/office/powerpoint/2010/main" val="847199732"/>
+        <p14:creationId xmlns:p14="http://schemas.microsoft.com/office/powerpoint/2010/main" val="3886316111"/>
       </p:ext>
     </p:extLst>
   </p:cSld>
@@ -9504,7 +9649,7 @@
           <p:cNvPr id="2" name="Title 1">
             <a:extLst>
               <a:ext uri="{FF2B5EF4-FFF2-40B4-BE49-F238E27FC236}">
-                <a16:creationId xmlns:a16="http://schemas.microsoft.com/office/drawing/2014/main" id="{CFF32C6C-3D00-4977-9425-46509C1A3129}"/>
+                <a16:creationId xmlns:a16="http://schemas.microsoft.com/office/drawing/2014/main" id="{C5BFB68C-7564-4E23-8DBD-22953A0313B7}"/>
               </a:ext>
             </a:extLst>
           </p:cNvPr>
@@ -9520,10 +9665,7 @@
           <a:bodyPr/>
           <a:lstStyle/>
           <a:p>
-            <a:r>
-              <a:rPr lang="en-GB" dirty="0"/>
-              <a:t>Go – Starter Pack</a:t>
-            </a:r>
+            <a:endParaRPr lang="en-GB"/>
           </a:p>
         </p:txBody>
       </p:sp>
@@ -9532,7 +9674,7 @@
           <p:cNvPr id="3" name="Content Placeholder 2">
             <a:extLst>
               <a:ext uri="{FF2B5EF4-FFF2-40B4-BE49-F238E27FC236}">
-                <a16:creationId xmlns:a16="http://schemas.microsoft.com/office/drawing/2014/main" id="{3B81F4FB-26EB-4DA4-9507-E147BFC741B8}"/>
+                <a16:creationId xmlns:a16="http://schemas.microsoft.com/office/drawing/2014/main" id="{5CD02D51-FB37-407C-99B2-5CD0F489A03C}"/>
               </a:ext>
             </a:extLst>
           </p:cNvPr>
@@ -9548,26 +9690,14 @@
           <a:bodyPr/>
           <a:lstStyle/>
           <a:p>
-            <a:r>
-              <a:rPr lang="en-GB" dirty="0"/>
-              <a:t>Installing GO. </a:t>
-            </a:r>
-          </a:p>
-          <a:p>
-            <a:r>
-              <a:rPr lang="en-GB" dirty="0"/>
-              <a:t>Learning the syntax</a:t>
-            </a:r>
-          </a:p>
-          <a:p>
-            <a:endParaRPr lang="en-GB" dirty="0"/>
+            <a:endParaRPr lang="en-GB"/>
           </a:p>
         </p:txBody>
       </p:sp>
     </p:spTree>
     <p:extLst>
       <p:ext uri="{BB962C8B-B14F-4D97-AF65-F5344CB8AC3E}">
-        <p14:creationId xmlns:p14="http://schemas.microsoft.com/office/powerpoint/2010/main" val="1566399315"/>
+        <p14:creationId xmlns:p14="http://schemas.microsoft.com/office/powerpoint/2010/main" val="4076716880"/>
       </p:ext>
     </p:extLst>
   </p:cSld>
@@ -9599,7 +9729,7 @@
           <p:cNvPr id="2" name="Title 1">
             <a:extLst>
               <a:ext uri="{FF2B5EF4-FFF2-40B4-BE49-F238E27FC236}">
-                <a16:creationId xmlns:a16="http://schemas.microsoft.com/office/drawing/2014/main" id="{F791C732-68FC-4DBF-A925-B9A44335C54F}"/>
+                <a16:creationId xmlns:a16="http://schemas.microsoft.com/office/drawing/2014/main" id="{B35498C6-960E-4458-8130-6765F4CA74F7}"/>
               </a:ext>
             </a:extLst>
           </p:cNvPr>
@@ -9617,7 +9747,7 @@
           <a:p>
             <a:r>
               <a:rPr lang="en-GB" dirty="0"/>
-              <a:t>Finding A Catalyst</a:t>
+              <a:t>	Progress Checklist	</a:t>
             </a:r>
           </a:p>
         </p:txBody>
@@ -9627,7 +9757,7 @@
           <p:cNvPr id="3" name="Content Placeholder 2">
             <a:extLst>
               <a:ext uri="{FF2B5EF4-FFF2-40B4-BE49-F238E27FC236}">
-                <a16:creationId xmlns:a16="http://schemas.microsoft.com/office/drawing/2014/main" id="{C206744A-0D9B-4231-BD87-CF25D90A8004}"/>
+                <a16:creationId xmlns:a16="http://schemas.microsoft.com/office/drawing/2014/main" id="{03803CF5-7407-403C-AA75-7FD98A1144C0}"/>
               </a:ext>
             </a:extLst>
           </p:cNvPr>
@@ -9643,14 +9773,26 @@
           <a:bodyPr/>
           <a:lstStyle/>
           <a:p>
-            <a:endParaRPr lang="en-GB"/>
+            <a:r>
+              <a:rPr lang="en-GB" dirty="0"/>
+              <a:t>Introduction to using go benchmark and go race. </a:t>
+            </a:r>
+          </a:p>
+          <a:p>
+            <a:endParaRPr lang="en-GB" dirty="0"/>
+          </a:p>
+          <a:p>
+            <a:r>
+              <a:rPr lang="en-GB" dirty="0"/>
+              <a:t>Increased knowledge of different ways to optimize searching problems. </a:t>
+            </a:r>
           </a:p>
         </p:txBody>
       </p:sp>
     </p:spTree>
     <p:extLst>
       <p:ext uri="{BB962C8B-B14F-4D97-AF65-F5344CB8AC3E}">
-        <p14:creationId xmlns:p14="http://schemas.microsoft.com/office/powerpoint/2010/main" val="4016827040"/>
+        <p14:creationId xmlns:p14="http://schemas.microsoft.com/office/powerpoint/2010/main" val="3598754192"/>
       </p:ext>
     </p:extLst>
   </p:cSld>
@@ -9682,7 +9824,7 @@
           <p:cNvPr id="2" name="Title 1">
             <a:extLst>
               <a:ext uri="{FF2B5EF4-FFF2-40B4-BE49-F238E27FC236}">
-                <a16:creationId xmlns:a16="http://schemas.microsoft.com/office/drawing/2014/main" id="{32F06B3C-EA2D-46B1-AB79-08EFA8CCC0C1}"/>
+                <a16:creationId xmlns:a16="http://schemas.microsoft.com/office/drawing/2014/main" id="{13A895C3-4AA3-4DF4-9348-F010A665C356}"/>
               </a:ext>
             </a:extLst>
           </p:cNvPr>
@@ -9698,10 +9840,7 @@
           <a:bodyPr/>
           <a:lstStyle/>
           <a:p>
-            <a:r>
-              <a:rPr lang="en-GB" dirty="0"/>
-              <a:t>Managing Scope and Completing Projects</a:t>
-            </a:r>
+            <a:endParaRPr lang="en-GB" dirty="0"/>
           </a:p>
         </p:txBody>
       </p:sp>
@@ -9710,7 +9849,7 @@
           <p:cNvPr id="3" name="Content Placeholder 2">
             <a:extLst>
               <a:ext uri="{FF2B5EF4-FFF2-40B4-BE49-F238E27FC236}">
-                <a16:creationId xmlns:a16="http://schemas.microsoft.com/office/drawing/2014/main" id="{D2524174-1A6E-43AD-AFB4-E3F8B9B5D53A}"/>
+                <a16:creationId xmlns:a16="http://schemas.microsoft.com/office/drawing/2014/main" id="{ABB9FD90-D046-487F-ACA7-C1C377ED3A6F}"/>
               </a:ext>
             </a:extLst>
           </p:cNvPr>
@@ -9733,7 +9872,7 @@
     </p:spTree>
     <p:extLst>
       <p:ext uri="{BB962C8B-B14F-4D97-AF65-F5344CB8AC3E}">
-        <p14:creationId xmlns:p14="http://schemas.microsoft.com/office/powerpoint/2010/main" val="1162966501"/>
+        <p14:creationId xmlns:p14="http://schemas.microsoft.com/office/powerpoint/2010/main" val="3172546742"/>
       </p:ext>
     </p:extLst>
   </p:cSld>
@@ -9765,7 +9904,7 @@
           <p:cNvPr id="2" name="Title 1">
             <a:extLst>
               <a:ext uri="{FF2B5EF4-FFF2-40B4-BE49-F238E27FC236}">
-                <a16:creationId xmlns:a16="http://schemas.microsoft.com/office/drawing/2014/main" id="{F106CE47-2D88-4386-9645-6FF2058FA701}"/>
+                <a16:creationId xmlns:a16="http://schemas.microsoft.com/office/drawing/2014/main" id="{5F649051-170D-4D88-A1EB-CD53B67517C2}"/>
               </a:ext>
             </a:extLst>
           </p:cNvPr>
@@ -9783,7 +9922,7 @@
           <a:p>
             <a:r>
               <a:rPr lang="en-GB" dirty="0"/>
-              <a:t>Getting past the feeling of pointlessness</a:t>
+              <a:t>Final Showcase</a:t>
             </a:r>
           </a:p>
         </p:txBody>
@@ -9793,7 +9932,7 @@
           <p:cNvPr id="3" name="Content Placeholder 2">
             <a:extLst>
               <a:ext uri="{FF2B5EF4-FFF2-40B4-BE49-F238E27FC236}">
-                <a16:creationId xmlns:a16="http://schemas.microsoft.com/office/drawing/2014/main" id="{3E7E5D08-3BD9-4083-ABF9-3C1E46633F36}"/>
+                <a16:creationId xmlns:a16="http://schemas.microsoft.com/office/drawing/2014/main" id="{E28FB5CC-2E35-4352-B03D-454660443443}"/>
               </a:ext>
             </a:extLst>
           </p:cNvPr>
@@ -9809,35 +9948,14 @@
           <a:bodyPr/>
           <a:lstStyle/>
           <a:p>
-            <a:r>
-              <a:rPr lang="en-GB" dirty="0"/>
-              <a:t>Finding a Catalyst, to improve motivation</a:t>
-            </a:r>
-          </a:p>
-          <a:p>
-            <a:pPr lvl="1"/>
-            <a:r>
-              <a:rPr lang="en-GB" dirty="0"/>
-              <a:t>Discussing your project with peers</a:t>
-            </a:r>
-          </a:p>
-          <a:p>
-            <a:pPr lvl="1"/>
-            <a:r>
-              <a:rPr lang="en-GB" dirty="0"/>
-              <a:t>Creating an actual deadline</a:t>
-            </a:r>
-          </a:p>
-          <a:p>
-            <a:pPr lvl="1"/>
-            <a:endParaRPr lang="en-GB" dirty="0"/>
+            <a:endParaRPr lang="en-GB"/>
           </a:p>
         </p:txBody>
       </p:sp>
     </p:spTree>
     <p:extLst>
       <p:ext uri="{BB962C8B-B14F-4D97-AF65-F5344CB8AC3E}">
-        <p14:creationId xmlns:p14="http://schemas.microsoft.com/office/powerpoint/2010/main" val="1961839492"/>
+        <p14:creationId xmlns:p14="http://schemas.microsoft.com/office/powerpoint/2010/main" val="2232509740"/>
       </p:ext>
     </p:extLst>
   </p:cSld>
@@ -9869,7 +9987,7 @@
           <p:cNvPr id="2" name="Title 1">
             <a:extLst>
               <a:ext uri="{FF2B5EF4-FFF2-40B4-BE49-F238E27FC236}">
-                <a16:creationId xmlns:a16="http://schemas.microsoft.com/office/drawing/2014/main" id="{8665D156-403C-4612-AA65-B49BA41EDF64}"/>
+                <a16:creationId xmlns:a16="http://schemas.microsoft.com/office/drawing/2014/main" id="{6CDC4756-BE7A-4B78-81FE-29031289A2AD}"/>
               </a:ext>
             </a:extLst>
           </p:cNvPr>
@@ -9887,7 +10005,7 @@
           <a:p>
             <a:r>
               <a:rPr lang="en-GB" dirty="0"/>
-              <a:t>Insert Here, Example of 5 gophers one alive, 4 dead </a:t>
+              <a:t>Final Checklist </a:t>
             </a:r>
           </a:p>
         </p:txBody>
@@ -9897,7 +10015,7 @@
           <p:cNvPr id="3" name="Content Placeholder 2">
             <a:extLst>
               <a:ext uri="{FF2B5EF4-FFF2-40B4-BE49-F238E27FC236}">
-                <a16:creationId xmlns:a16="http://schemas.microsoft.com/office/drawing/2014/main" id="{8716B298-CF10-4866-85F6-D856E1963894}"/>
+                <a16:creationId xmlns:a16="http://schemas.microsoft.com/office/drawing/2014/main" id="{07D7EF34-638C-4C71-99D1-10742B4D9377}"/>
               </a:ext>
             </a:extLst>
           </p:cNvPr>
@@ -9920,7 +10038,7 @@
     </p:spTree>
     <p:extLst>
       <p:ext uri="{BB962C8B-B14F-4D97-AF65-F5344CB8AC3E}">
-        <p14:creationId xmlns:p14="http://schemas.microsoft.com/office/powerpoint/2010/main" val="3790213746"/>
+        <p14:creationId xmlns:p14="http://schemas.microsoft.com/office/powerpoint/2010/main" val="2595392705"/>
       </p:ext>
     </p:extLst>
   </p:cSld>
@@ -9952,7 +10070,7 @@
           <p:cNvPr id="2" name="Title 1">
             <a:extLst>
               <a:ext uri="{FF2B5EF4-FFF2-40B4-BE49-F238E27FC236}">
-                <a16:creationId xmlns:a16="http://schemas.microsoft.com/office/drawing/2014/main" id="{B88F905B-DC9A-4E15-887A-0D816B2DA849}"/>
+                <a16:creationId xmlns:a16="http://schemas.microsoft.com/office/drawing/2014/main" id="{C6A1F8BE-8B71-4987-BE2C-B485EE46CDB8}"/>
               </a:ext>
             </a:extLst>
           </p:cNvPr>
@@ -9970,7 +10088,7 @@
           <a:p>
             <a:r>
               <a:rPr lang="en-GB" dirty="0"/>
-              <a:t>Checklist</a:t>
+              <a:t>Conclusion</a:t>
             </a:r>
           </a:p>
         </p:txBody>
@@ -9980,7 +10098,7 @@
           <p:cNvPr id="3" name="Content Placeholder 2">
             <a:extLst>
               <a:ext uri="{FF2B5EF4-FFF2-40B4-BE49-F238E27FC236}">
-                <a16:creationId xmlns:a16="http://schemas.microsoft.com/office/drawing/2014/main" id="{14229407-2ED8-43A8-819B-30DDEB3D38EC}"/>
+                <a16:creationId xmlns:a16="http://schemas.microsoft.com/office/drawing/2014/main" id="{C6489CD9-246E-4EF9-8A1F-DF0D212B8A29}"/>
               </a:ext>
             </a:extLst>
           </p:cNvPr>
@@ -9996,26 +10114,14 @@
           <a:bodyPr/>
           <a:lstStyle/>
           <a:p>
-            <a:r>
-              <a:rPr lang="en-GB" dirty="0"/>
-              <a:t>Concurrency is not parallelism </a:t>
-            </a:r>
-            <a:r>
-              <a:rPr lang="en-GB" dirty="0">
-                <a:latin typeface="Segoe MDL2 Assets" panose="050A0102010101010101" pitchFamily="18" charset="0"/>
-              </a:rPr>
-              <a:t> </a:t>
-            </a:r>
-          </a:p>
-          <a:p>
-            <a:endParaRPr lang="en-GB" dirty="0"/>
+            <a:endParaRPr lang="en-GB"/>
           </a:p>
         </p:txBody>
       </p:sp>
     </p:spTree>
     <p:extLst>
       <p:ext uri="{BB962C8B-B14F-4D97-AF65-F5344CB8AC3E}">
-        <p14:creationId xmlns:p14="http://schemas.microsoft.com/office/powerpoint/2010/main" val="3193971414"/>
+        <p14:creationId xmlns:p14="http://schemas.microsoft.com/office/powerpoint/2010/main" val="2651521754"/>
       </p:ext>
     </p:extLst>
   </p:cSld>
@@ -10047,7 +10153,7 @@
           <p:cNvPr id="2" name="Title 1">
             <a:extLst>
               <a:ext uri="{FF2B5EF4-FFF2-40B4-BE49-F238E27FC236}">
-                <a16:creationId xmlns:a16="http://schemas.microsoft.com/office/drawing/2014/main" id="{B88F905B-DC9A-4E15-887A-0D816B2DA849}"/>
+                <a16:creationId xmlns:a16="http://schemas.microsoft.com/office/drawing/2014/main" id="{DDA23A98-14C6-40E0-A90C-6468725EFA2C}"/>
               </a:ext>
             </a:extLst>
           </p:cNvPr>
@@ -10065,7 +10171,7 @@
           <a:p>
             <a:r>
               <a:rPr lang="en-GB" dirty="0"/>
-              <a:t>Checklist of Mistakes</a:t>
+              <a:t>Perseverance</a:t>
             </a:r>
           </a:p>
         </p:txBody>
@@ -10075,7 +10181,7 @@
           <p:cNvPr id="3" name="Content Placeholder 2">
             <a:extLst>
               <a:ext uri="{FF2B5EF4-FFF2-40B4-BE49-F238E27FC236}">
-                <a16:creationId xmlns:a16="http://schemas.microsoft.com/office/drawing/2014/main" id="{14229407-2ED8-43A8-819B-30DDEB3D38EC}"/>
+                <a16:creationId xmlns:a16="http://schemas.microsoft.com/office/drawing/2014/main" id="{B7866C6F-7AB4-4FF2-AC93-597F73926565}"/>
               </a:ext>
             </a:extLst>
           </p:cNvPr>
@@ -10093,55 +10199,21 @@
           <a:p>
             <a:r>
               <a:rPr lang="en-GB" dirty="0"/>
-              <a:t>Concurrency is not parallelism </a:t>
-            </a:r>
-            <a:r>
-              <a:rPr lang="en-GB" dirty="0">
-                <a:latin typeface="Segoe MDL2 Assets" panose="050A0102010101010101" pitchFamily="18" charset="0"/>
-              </a:rPr>
-              <a:t> </a:t>
-            </a:r>
-          </a:p>
-          <a:p>
-            <a:r>
-              <a:rPr lang="en-GB" dirty="0"/>
-              <a:t>You can read from maps concurrently, but you can not write to maps.</a:t>
-            </a:r>
-          </a:p>
-          <a:p>
-            <a:r>
-              <a:rPr lang="en-GB"/>
-              <a:t>Importance </a:t>
-            </a:r>
-            <a:r>
-              <a:rPr lang="en-GB" dirty="0"/>
-              <a:t>of structure to avoid circular dependencies and for ease of readability </a:t>
-            </a:r>
-            <a:r>
-              <a:rPr lang="en-GB" dirty="0">
-                <a:latin typeface="Segoe MDL2 Assets" panose="050A0102010101010101" pitchFamily="18" charset="0"/>
-              </a:rPr>
-              <a:t></a:t>
-            </a:r>
-          </a:p>
-          <a:p>
-            <a:r>
-              <a:rPr lang="en-GB" dirty="0"/>
-              <a:t>By saving your files where the GOPATH is you can access local packages without using relative paths. </a:t>
-            </a:r>
-            <a:endParaRPr lang="en-GB" dirty="0">
-              <a:latin typeface="Segoe MDL2 Assets" panose="050A0102010101010101" pitchFamily="18" charset="0"/>
-            </a:endParaRPr>
-          </a:p>
-          <a:p>
-            <a:endParaRPr lang="en-GB" dirty="0"/>
+              <a:t>Talking about your project with other developers </a:t>
+            </a:r>
+          </a:p>
+          <a:p>
+            <a:r>
+              <a:rPr lang="en-GB" dirty="0"/>
+              <a:t>Getting help</a:t>
+            </a:r>
           </a:p>
         </p:txBody>
       </p:sp>
     </p:spTree>
     <p:extLst>
       <p:ext uri="{BB962C8B-B14F-4D97-AF65-F5344CB8AC3E}">
-        <p14:creationId xmlns:p14="http://schemas.microsoft.com/office/powerpoint/2010/main" val="1348224757"/>
+        <p14:creationId xmlns:p14="http://schemas.microsoft.com/office/powerpoint/2010/main" val="847199732"/>
       </p:ext>
     </p:extLst>
   </p:cSld>
@@ -10238,6 +10310,675 @@
 </file>
 
 <file path=ppt/slides/slide40.xml><?xml version="1.0" encoding="utf-8"?>
+<p:sld xmlns:a="http://schemas.openxmlformats.org/drawingml/2006/main" xmlns:r="http://schemas.openxmlformats.org/officeDocument/2006/relationships" xmlns:p="http://schemas.openxmlformats.org/presentationml/2006/main">
+  <p:cSld>
+    <p:spTree>
+      <p:nvGrpSpPr>
+        <p:cNvPr id="1" name=""/>
+        <p:cNvGrpSpPr/>
+        <p:nvPr/>
+      </p:nvGrpSpPr>
+      <p:grpSpPr>
+        <a:xfrm>
+          <a:off x="0" y="0"/>
+          <a:ext cx="0" cy="0"/>
+          <a:chOff x="0" y="0"/>
+          <a:chExt cx="0" cy="0"/>
+        </a:xfrm>
+      </p:grpSpPr>
+      <p:sp>
+        <p:nvSpPr>
+          <p:cNvPr id="2" name="Title 1">
+            <a:extLst>
+              <a:ext uri="{FF2B5EF4-FFF2-40B4-BE49-F238E27FC236}">
+                <a16:creationId xmlns:a16="http://schemas.microsoft.com/office/drawing/2014/main" id="{CFF32C6C-3D00-4977-9425-46509C1A3129}"/>
+              </a:ext>
+            </a:extLst>
+          </p:cNvPr>
+          <p:cNvSpPr>
+            <a:spLocks noGrp="1"/>
+          </p:cNvSpPr>
+          <p:nvPr>
+            <p:ph type="title"/>
+          </p:nvPr>
+        </p:nvSpPr>
+        <p:spPr/>
+        <p:txBody>
+          <a:bodyPr/>
+          <a:lstStyle/>
+          <a:p>
+            <a:r>
+              <a:rPr lang="en-GB" dirty="0"/>
+              <a:t>Go – Starter Pack</a:t>
+            </a:r>
+          </a:p>
+        </p:txBody>
+      </p:sp>
+      <p:sp>
+        <p:nvSpPr>
+          <p:cNvPr id="3" name="Content Placeholder 2">
+            <a:extLst>
+              <a:ext uri="{FF2B5EF4-FFF2-40B4-BE49-F238E27FC236}">
+                <a16:creationId xmlns:a16="http://schemas.microsoft.com/office/drawing/2014/main" id="{3B81F4FB-26EB-4DA4-9507-E147BFC741B8}"/>
+              </a:ext>
+            </a:extLst>
+          </p:cNvPr>
+          <p:cNvSpPr>
+            <a:spLocks noGrp="1"/>
+          </p:cNvSpPr>
+          <p:nvPr>
+            <p:ph idx="1"/>
+          </p:nvPr>
+        </p:nvSpPr>
+        <p:spPr/>
+        <p:txBody>
+          <a:bodyPr/>
+          <a:lstStyle/>
+          <a:p>
+            <a:r>
+              <a:rPr lang="en-GB" dirty="0"/>
+              <a:t>Installing GO. </a:t>
+            </a:r>
+          </a:p>
+          <a:p>
+            <a:r>
+              <a:rPr lang="en-GB" dirty="0"/>
+              <a:t>Learning the syntax</a:t>
+            </a:r>
+          </a:p>
+          <a:p>
+            <a:endParaRPr lang="en-GB" dirty="0"/>
+          </a:p>
+        </p:txBody>
+      </p:sp>
+    </p:spTree>
+    <p:extLst>
+      <p:ext uri="{BB962C8B-B14F-4D97-AF65-F5344CB8AC3E}">
+        <p14:creationId xmlns:p14="http://schemas.microsoft.com/office/powerpoint/2010/main" val="1566399315"/>
+      </p:ext>
+    </p:extLst>
+  </p:cSld>
+  <p:clrMapOvr>
+    <a:masterClrMapping/>
+  </p:clrMapOvr>
+</p:sld>
+</file>
+
+<file path=ppt/slides/slide41.xml><?xml version="1.0" encoding="utf-8"?>
+<p:sld xmlns:a="http://schemas.openxmlformats.org/drawingml/2006/main" xmlns:r="http://schemas.openxmlformats.org/officeDocument/2006/relationships" xmlns:p="http://schemas.openxmlformats.org/presentationml/2006/main">
+  <p:cSld>
+    <p:spTree>
+      <p:nvGrpSpPr>
+        <p:cNvPr id="1" name=""/>
+        <p:cNvGrpSpPr/>
+        <p:nvPr/>
+      </p:nvGrpSpPr>
+      <p:grpSpPr>
+        <a:xfrm>
+          <a:off x="0" y="0"/>
+          <a:ext cx="0" cy="0"/>
+          <a:chOff x="0" y="0"/>
+          <a:chExt cx="0" cy="0"/>
+        </a:xfrm>
+      </p:grpSpPr>
+      <p:sp>
+        <p:nvSpPr>
+          <p:cNvPr id="2" name="Title 1">
+            <a:extLst>
+              <a:ext uri="{FF2B5EF4-FFF2-40B4-BE49-F238E27FC236}">
+                <a16:creationId xmlns:a16="http://schemas.microsoft.com/office/drawing/2014/main" id="{F791C732-68FC-4DBF-A925-B9A44335C54F}"/>
+              </a:ext>
+            </a:extLst>
+          </p:cNvPr>
+          <p:cNvSpPr>
+            <a:spLocks noGrp="1"/>
+          </p:cNvSpPr>
+          <p:nvPr>
+            <p:ph type="title"/>
+          </p:nvPr>
+        </p:nvSpPr>
+        <p:spPr/>
+        <p:txBody>
+          <a:bodyPr/>
+          <a:lstStyle/>
+          <a:p>
+            <a:r>
+              <a:rPr lang="en-GB" dirty="0"/>
+              <a:t>Finding A Catalyst</a:t>
+            </a:r>
+          </a:p>
+        </p:txBody>
+      </p:sp>
+      <p:sp>
+        <p:nvSpPr>
+          <p:cNvPr id="3" name="Content Placeholder 2">
+            <a:extLst>
+              <a:ext uri="{FF2B5EF4-FFF2-40B4-BE49-F238E27FC236}">
+                <a16:creationId xmlns:a16="http://schemas.microsoft.com/office/drawing/2014/main" id="{C206744A-0D9B-4231-BD87-CF25D90A8004}"/>
+              </a:ext>
+            </a:extLst>
+          </p:cNvPr>
+          <p:cNvSpPr>
+            <a:spLocks noGrp="1"/>
+          </p:cNvSpPr>
+          <p:nvPr>
+            <p:ph idx="1"/>
+          </p:nvPr>
+        </p:nvSpPr>
+        <p:spPr/>
+        <p:txBody>
+          <a:bodyPr/>
+          <a:lstStyle/>
+          <a:p>
+            <a:endParaRPr lang="en-GB"/>
+          </a:p>
+        </p:txBody>
+      </p:sp>
+    </p:spTree>
+    <p:extLst>
+      <p:ext uri="{BB962C8B-B14F-4D97-AF65-F5344CB8AC3E}">
+        <p14:creationId xmlns:p14="http://schemas.microsoft.com/office/powerpoint/2010/main" val="4016827040"/>
+      </p:ext>
+    </p:extLst>
+  </p:cSld>
+  <p:clrMapOvr>
+    <a:masterClrMapping/>
+  </p:clrMapOvr>
+</p:sld>
+</file>
+
+<file path=ppt/slides/slide42.xml><?xml version="1.0" encoding="utf-8"?>
+<p:sld xmlns:a="http://schemas.openxmlformats.org/drawingml/2006/main" xmlns:r="http://schemas.openxmlformats.org/officeDocument/2006/relationships" xmlns:p="http://schemas.openxmlformats.org/presentationml/2006/main">
+  <p:cSld>
+    <p:spTree>
+      <p:nvGrpSpPr>
+        <p:cNvPr id="1" name=""/>
+        <p:cNvGrpSpPr/>
+        <p:nvPr/>
+      </p:nvGrpSpPr>
+      <p:grpSpPr>
+        <a:xfrm>
+          <a:off x="0" y="0"/>
+          <a:ext cx="0" cy="0"/>
+          <a:chOff x="0" y="0"/>
+          <a:chExt cx="0" cy="0"/>
+        </a:xfrm>
+      </p:grpSpPr>
+      <p:sp>
+        <p:nvSpPr>
+          <p:cNvPr id="2" name="Title 1">
+            <a:extLst>
+              <a:ext uri="{FF2B5EF4-FFF2-40B4-BE49-F238E27FC236}">
+                <a16:creationId xmlns:a16="http://schemas.microsoft.com/office/drawing/2014/main" id="{32F06B3C-EA2D-46B1-AB79-08EFA8CCC0C1}"/>
+              </a:ext>
+            </a:extLst>
+          </p:cNvPr>
+          <p:cNvSpPr>
+            <a:spLocks noGrp="1"/>
+          </p:cNvSpPr>
+          <p:nvPr>
+            <p:ph type="title"/>
+          </p:nvPr>
+        </p:nvSpPr>
+        <p:spPr/>
+        <p:txBody>
+          <a:bodyPr/>
+          <a:lstStyle/>
+          <a:p>
+            <a:r>
+              <a:rPr lang="en-GB" dirty="0"/>
+              <a:t>Managing Scope and Completing Projects</a:t>
+            </a:r>
+          </a:p>
+        </p:txBody>
+      </p:sp>
+      <p:sp>
+        <p:nvSpPr>
+          <p:cNvPr id="3" name="Content Placeholder 2">
+            <a:extLst>
+              <a:ext uri="{FF2B5EF4-FFF2-40B4-BE49-F238E27FC236}">
+                <a16:creationId xmlns:a16="http://schemas.microsoft.com/office/drawing/2014/main" id="{D2524174-1A6E-43AD-AFB4-E3F8B9B5D53A}"/>
+              </a:ext>
+            </a:extLst>
+          </p:cNvPr>
+          <p:cNvSpPr>
+            <a:spLocks noGrp="1"/>
+          </p:cNvSpPr>
+          <p:nvPr>
+            <p:ph idx="1"/>
+          </p:nvPr>
+        </p:nvSpPr>
+        <p:spPr/>
+        <p:txBody>
+          <a:bodyPr/>
+          <a:lstStyle/>
+          <a:p>
+            <a:endParaRPr lang="en-GB"/>
+          </a:p>
+        </p:txBody>
+      </p:sp>
+    </p:spTree>
+    <p:extLst>
+      <p:ext uri="{BB962C8B-B14F-4D97-AF65-F5344CB8AC3E}">
+        <p14:creationId xmlns:p14="http://schemas.microsoft.com/office/powerpoint/2010/main" val="1162966501"/>
+      </p:ext>
+    </p:extLst>
+  </p:cSld>
+  <p:clrMapOvr>
+    <a:masterClrMapping/>
+  </p:clrMapOvr>
+</p:sld>
+</file>
+
+<file path=ppt/slides/slide43.xml><?xml version="1.0" encoding="utf-8"?>
+<p:sld xmlns:a="http://schemas.openxmlformats.org/drawingml/2006/main" xmlns:r="http://schemas.openxmlformats.org/officeDocument/2006/relationships" xmlns:p="http://schemas.openxmlformats.org/presentationml/2006/main">
+  <p:cSld>
+    <p:spTree>
+      <p:nvGrpSpPr>
+        <p:cNvPr id="1" name=""/>
+        <p:cNvGrpSpPr/>
+        <p:nvPr/>
+      </p:nvGrpSpPr>
+      <p:grpSpPr>
+        <a:xfrm>
+          <a:off x="0" y="0"/>
+          <a:ext cx="0" cy="0"/>
+          <a:chOff x="0" y="0"/>
+          <a:chExt cx="0" cy="0"/>
+        </a:xfrm>
+      </p:grpSpPr>
+      <p:sp>
+        <p:nvSpPr>
+          <p:cNvPr id="2" name="Title 1">
+            <a:extLst>
+              <a:ext uri="{FF2B5EF4-FFF2-40B4-BE49-F238E27FC236}">
+                <a16:creationId xmlns:a16="http://schemas.microsoft.com/office/drawing/2014/main" id="{F106CE47-2D88-4386-9645-6FF2058FA701}"/>
+              </a:ext>
+            </a:extLst>
+          </p:cNvPr>
+          <p:cNvSpPr>
+            <a:spLocks noGrp="1"/>
+          </p:cNvSpPr>
+          <p:nvPr>
+            <p:ph type="title"/>
+          </p:nvPr>
+        </p:nvSpPr>
+        <p:spPr/>
+        <p:txBody>
+          <a:bodyPr/>
+          <a:lstStyle/>
+          <a:p>
+            <a:r>
+              <a:rPr lang="en-GB" dirty="0"/>
+              <a:t>Getting past the feeling of pointlessness</a:t>
+            </a:r>
+          </a:p>
+        </p:txBody>
+      </p:sp>
+      <p:sp>
+        <p:nvSpPr>
+          <p:cNvPr id="3" name="Content Placeholder 2">
+            <a:extLst>
+              <a:ext uri="{FF2B5EF4-FFF2-40B4-BE49-F238E27FC236}">
+                <a16:creationId xmlns:a16="http://schemas.microsoft.com/office/drawing/2014/main" id="{3E7E5D08-3BD9-4083-ABF9-3C1E46633F36}"/>
+              </a:ext>
+            </a:extLst>
+          </p:cNvPr>
+          <p:cNvSpPr>
+            <a:spLocks noGrp="1"/>
+          </p:cNvSpPr>
+          <p:nvPr>
+            <p:ph idx="1"/>
+          </p:nvPr>
+        </p:nvSpPr>
+        <p:spPr/>
+        <p:txBody>
+          <a:bodyPr/>
+          <a:lstStyle/>
+          <a:p>
+            <a:r>
+              <a:rPr lang="en-GB" dirty="0"/>
+              <a:t>Finding a Catalyst, to improve motivation</a:t>
+            </a:r>
+          </a:p>
+          <a:p>
+            <a:pPr lvl="1"/>
+            <a:r>
+              <a:rPr lang="en-GB" dirty="0"/>
+              <a:t>Discussing your project with peers</a:t>
+            </a:r>
+          </a:p>
+          <a:p>
+            <a:pPr lvl="1"/>
+            <a:r>
+              <a:rPr lang="en-GB" dirty="0"/>
+              <a:t>Creating an actual deadline</a:t>
+            </a:r>
+          </a:p>
+          <a:p>
+            <a:pPr lvl="1"/>
+            <a:endParaRPr lang="en-GB" dirty="0"/>
+          </a:p>
+        </p:txBody>
+      </p:sp>
+    </p:spTree>
+    <p:extLst>
+      <p:ext uri="{BB962C8B-B14F-4D97-AF65-F5344CB8AC3E}">
+        <p14:creationId xmlns:p14="http://schemas.microsoft.com/office/powerpoint/2010/main" val="1961839492"/>
+      </p:ext>
+    </p:extLst>
+  </p:cSld>
+  <p:clrMapOvr>
+    <a:masterClrMapping/>
+  </p:clrMapOvr>
+</p:sld>
+</file>
+
+<file path=ppt/slides/slide44.xml><?xml version="1.0" encoding="utf-8"?>
+<p:sld xmlns:a="http://schemas.openxmlformats.org/drawingml/2006/main" xmlns:r="http://schemas.openxmlformats.org/officeDocument/2006/relationships" xmlns:p="http://schemas.openxmlformats.org/presentationml/2006/main">
+  <p:cSld>
+    <p:spTree>
+      <p:nvGrpSpPr>
+        <p:cNvPr id="1" name=""/>
+        <p:cNvGrpSpPr/>
+        <p:nvPr/>
+      </p:nvGrpSpPr>
+      <p:grpSpPr>
+        <a:xfrm>
+          <a:off x="0" y="0"/>
+          <a:ext cx="0" cy="0"/>
+          <a:chOff x="0" y="0"/>
+          <a:chExt cx="0" cy="0"/>
+        </a:xfrm>
+      </p:grpSpPr>
+      <p:sp>
+        <p:nvSpPr>
+          <p:cNvPr id="2" name="Title 1">
+            <a:extLst>
+              <a:ext uri="{FF2B5EF4-FFF2-40B4-BE49-F238E27FC236}">
+                <a16:creationId xmlns:a16="http://schemas.microsoft.com/office/drawing/2014/main" id="{8665D156-403C-4612-AA65-B49BA41EDF64}"/>
+              </a:ext>
+            </a:extLst>
+          </p:cNvPr>
+          <p:cNvSpPr>
+            <a:spLocks noGrp="1"/>
+          </p:cNvSpPr>
+          <p:nvPr>
+            <p:ph type="title"/>
+          </p:nvPr>
+        </p:nvSpPr>
+        <p:spPr/>
+        <p:txBody>
+          <a:bodyPr/>
+          <a:lstStyle/>
+          <a:p>
+            <a:r>
+              <a:rPr lang="en-GB" dirty="0"/>
+              <a:t>Insert Here, Example of 5 gophers one alive, 4 dead </a:t>
+            </a:r>
+          </a:p>
+        </p:txBody>
+      </p:sp>
+      <p:sp>
+        <p:nvSpPr>
+          <p:cNvPr id="3" name="Content Placeholder 2">
+            <a:extLst>
+              <a:ext uri="{FF2B5EF4-FFF2-40B4-BE49-F238E27FC236}">
+                <a16:creationId xmlns:a16="http://schemas.microsoft.com/office/drawing/2014/main" id="{8716B298-CF10-4866-85F6-D856E1963894}"/>
+              </a:ext>
+            </a:extLst>
+          </p:cNvPr>
+          <p:cNvSpPr>
+            <a:spLocks noGrp="1"/>
+          </p:cNvSpPr>
+          <p:nvPr>
+            <p:ph idx="1"/>
+          </p:nvPr>
+        </p:nvSpPr>
+        <p:spPr/>
+        <p:txBody>
+          <a:bodyPr/>
+          <a:lstStyle/>
+          <a:p>
+            <a:endParaRPr lang="en-GB"/>
+          </a:p>
+        </p:txBody>
+      </p:sp>
+    </p:spTree>
+    <p:extLst>
+      <p:ext uri="{BB962C8B-B14F-4D97-AF65-F5344CB8AC3E}">
+        <p14:creationId xmlns:p14="http://schemas.microsoft.com/office/powerpoint/2010/main" val="3790213746"/>
+      </p:ext>
+    </p:extLst>
+  </p:cSld>
+  <p:clrMapOvr>
+    <a:masterClrMapping/>
+  </p:clrMapOvr>
+</p:sld>
+</file>
+
+<file path=ppt/slides/slide45.xml><?xml version="1.0" encoding="utf-8"?>
+<p:sld xmlns:a="http://schemas.openxmlformats.org/drawingml/2006/main" xmlns:r="http://schemas.openxmlformats.org/officeDocument/2006/relationships" xmlns:p="http://schemas.openxmlformats.org/presentationml/2006/main">
+  <p:cSld>
+    <p:spTree>
+      <p:nvGrpSpPr>
+        <p:cNvPr id="1" name=""/>
+        <p:cNvGrpSpPr/>
+        <p:nvPr/>
+      </p:nvGrpSpPr>
+      <p:grpSpPr>
+        <a:xfrm>
+          <a:off x="0" y="0"/>
+          <a:ext cx="0" cy="0"/>
+          <a:chOff x="0" y="0"/>
+          <a:chExt cx="0" cy="0"/>
+        </a:xfrm>
+      </p:grpSpPr>
+      <p:sp>
+        <p:nvSpPr>
+          <p:cNvPr id="2" name="Title 1">
+            <a:extLst>
+              <a:ext uri="{FF2B5EF4-FFF2-40B4-BE49-F238E27FC236}">
+                <a16:creationId xmlns:a16="http://schemas.microsoft.com/office/drawing/2014/main" id="{B88F905B-DC9A-4E15-887A-0D816B2DA849}"/>
+              </a:ext>
+            </a:extLst>
+          </p:cNvPr>
+          <p:cNvSpPr>
+            <a:spLocks noGrp="1"/>
+          </p:cNvSpPr>
+          <p:nvPr>
+            <p:ph type="title"/>
+          </p:nvPr>
+        </p:nvSpPr>
+        <p:spPr/>
+        <p:txBody>
+          <a:bodyPr/>
+          <a:lstStyle/>
+          <a:p>
+            <a:r>
+              <a:rPr lang="en-GB" dirty="0"/>
+              <a:t>Checklist</a:t>
+            </a:r>
+          </a:p>
+        </p:txBody>
+      </p:sp>
+      <p:sp>
+        <p:nvSpPr>
+          <p:cNvPr id="3" name="Content Placeholder 2">
+            <a:extLst>
+              <a:ext uri="{FF2B5EF4-FFF2-40B4-BE49-F238E27FC236}">
+                <a16:creationId xmlns:a16="http://schemas.microsoft.com/office/drawing/2014/main" id="{14229407-2ED8-43A8-819B-30DDEB3D38EC}"/>
+              </a:ext>
+            </a:extLst>
+          </p:cNvPr>
+          <p:cNvSpPr>
+            <a:spLocks noGrp="1"/>
+          </p:cNvSpPr>
+          <p:nvPr>
+            <p:ph idx="1"/>
+          </p:nvPr>
+        </p:nvSpPr>
+        <p:spPr/>
+        <p:txBody>
+          <a:bodyPr/>
+          <a:lstStyle/>
+          <a:p>
+            <a:r>
+              <a:rPr lang="en-GB" dirty="0"/>
+              <a:t>Concurrency is not parallelism </a:t>
+            </a:r>
+            <a:r>
+              <a:rPr lang="en-GB" dirty="0">
+                <a:latin typeface="Segoe MDL2 Assets" panose="050A0102010101010101" pitchFamily="18" charset="0"/>
+              </a:rPr>
+              <a:t> </a:t>
+            </a:r>
+          </a:p>
+          <a:p>
+            <a:endParaRPr lang="en-GB" dirty="0"/>
+          </a:p>
+        </p:txBody>
+      </p:sp>
+    </p:spTree>
+    <p:extLst>
+      <p:ext uri="{BB962C8B-B14F-4D97-AF65-F5344CB8AC3E}">
+        <p14:creationId xmlns:p14="http://schemas.microsoft.com/office/powerpoint/2010/main" val="3193971414"/>
+      </p:ext>
+    </p:extLst>
+  </p:cSld>
+  <p:clrMapOvr>
+    <a:masterClrMapping/>
+  </p:clrMapOvr>
+</p:sld>
+</file>
+
+<file path=ppt/slides/slide46.xml><?xml version="1.0" encoding="utf-8"?>
+<p:sld xmlns:a="http://schemas.openxmlformats.org/drawingml/2006/main" xmlns:r="http://schemas.openxmlformats.org/officeDocument/2006/relationships" xmlns:p="http://schemas.openxmlformats.org/presentationml/2006/main">
+  <p:cSld>
+    <p:spTree>
+      <p:nvGrpSpPr>
+        <p:cNvPr id="1" name=""/>
+        <p:cNvGrpSpPr/>
+        <p:nvPr/>
+      </p:nvGrpSpPr>
+      <p:grpSpPr>
+        <a:xfrm>
+          <a:off x="0" y="0"/>
+          <a:ext cx="0" cy="0"/>
+          <a:chOff x="0" y="0"/>
+          <a:chExt cx="0" cy="0"/>
+        </a:xfrm>
+      </p:grpSpPr>
+      <p:sp>
+        <p:nvSpPr>
+          <p:cNvPr id="2" name="Title 1">
+            <a:extLst>
+              <a:ext uri="{FF2B5EF4-FFF2-40B4-BE49-F238E27FC236}">
+                <a16:creationId xmlns:a16="http://schemas.microsoft.com/office/drawing/2014/main" id="{B88F905B-DC9A-4E15-887A-0D816B2DA849}"/>
+              </a:ext>
+            </a:extLst>
+          </p:cNvPr>
+          <p:cNvSpPr>
+            <a:spLocks noGrp="1"/>
+          </p:cNvSpPr>
+          <p:nvPr>
+            <p:ph type="title"/>
+          </p:nvPr>
+        </p:nvSpPr>
+        <p:spPr/>
+        <p:txBody>
+          <a:bodyPr/>
+          <a:lstStyle/>
+          <a:p>
+            <a:r>
+              <a:rPr lang="en-GB" dirty="0"/>
+              <a:t>Checklist of Mistakes</a:t>
+            </a:r>
+          </a:p>
+        </p:txBody>
+      </p:sp>
+      <p:sp>
+        <p:nvSpPr>
+          <p:cNvPr id="3" name="Content Placeholder 2">
+            <a:extLst>
+              <a:ext uri="{FF2B5EF4-FFF2-40B4-BE49-F238E27FC236}">
+                <a16:creationId xmlns:a16="http://schemas.microsoft.com/office/drawing/2014/main" id="{14229407-2ED8-43A8-819B-30DDEB3D38EC}"/>
+              </a:ext>
+            </a:extLst>
+          </p:cNvPr>
+          <p:cNvSpPr>
+            <a:spLocks noGrp="1"/>
+          </p:cNvSpPr>
+          <p:nvPr>
+            <p:ph idx="1"/>
+          </p:nvPr>
+        </p:nvSpPr>
+        <p:spPr/>
+        <p:txBody>
+          <a:bodyPr/>
+          <a:lstStyle/>
+          <a:p>
+            <a:r>
+              <a:rPr lang="en-GB" dirty="0"/>
+              <a:t>Concurrency is not parallelism </a:t>
+            </a:r>
+            <a:r>
+              <a:rPr lang="en-GB" dirty="0">
+                <a:latin typeface="Segoe MDL2 Assets" panose="050A0102010101010101" pitchFamily="18" charset="0"/>
+              </a:rPr>
+              <a:t> </a:t>
+            </a:r>
+          </a:p>
+          <a:p>
+            <a:r>
+              <a:rPr lang="en-GB" dirty="0"/>
+              <a:t>You can read from maps concurrently, but you can not write to maps.</a:t>
+            </a:r>
+          </a:p>
+          <a:p>
+            <a:r>
+              <a:rPr lang="en-GB"/>
+              <a:t>Importance </a:t>
+            </a:r>
+            <a:r>
+              <a:rPr lang="en-GB" dirty="0"/>
+              <a:t>of structure to avoid circular dependencies and for ease of readability </a:t>
+            </a:r>
+            <a:r>
+              <a:rPr lang="en-GB" dirty="0">
+                <a:latin typeface="Segoe MDL2 Assets" panose="050A0102010101010101" pitchFamily="18" charset="0"/>
+              </a:rPr>
+              <a:t></a:t>
+            </a:r>
+          </a:p>
+          <a:p>
+            <a:r>
+              <a:rPr lang="en-GB" dirty="0"/>
+              <a:t>By saving your files where the GOPATH is you can access local packages without using relative paths. </a:t>
+            </a:r>
+            <a:endParaRPr lang="en-GB" dirty="0">
+              <a:latin typeface="Segoe MDL2 Assets" panose="050A0102010101010101" pitchFamily="18" charset="0"/>
+            </a:endParaRPr>
+          </a:p>
+          <a:p>
+            <a:endParaRPr lang="en-GB" dirty="0"/>
+          </a:p>
+        </p:txBody>
+      </p:sp>
+    </p:spTree>
+    <p:extLst>
+      <p:ext uri="{BB962C8B-B14F-4D97-AF65-F5344CB8AC3E}">
+        <p14:creationId xmlns:p14="http://schemas.microsoft.com/office/powerpoint/2010/main" val="1348224757"/>
+      </p:ext>
+    </p:extLst>
+  </p:cSld>
+  <p:clrMapOvr>
+    <a:masterClrMapping/>
+  </p:clrMapOvr>
+</p:sld>
+</file>
+
+<file path=ppt/slides/slide47.xml><?xml version="1.0" encoding="utf-8"?>
 <p:sld xmlns:a="http://schemas.openxmlformats.org/drawingml/2006/main" xmlns:r="http://schemas.openxmlformats.org/officeDocument/2006/relationships" xmlns:p="http://schemas.openxmlformats.org/presentationml/2006/main">
   <p:cSld>
     <p:spTree>

</xml_diff>

<commit_message>
Started moving code into smaller methods
</commit_message>
<xml_diff>
--- a/GopherLife.pptx
+++ b/GopherLife.pptx
@@ -5,17 +5,17 @@
     <p:sldMasterId id="2147483678" r:id="rId1"/>
   </p:sldMasterIdLst>
   <p:notesMasterIdLst>
-    <p:notesMasterId r:id="rId49"/>
+    <p:notesMasterId r:id="rId48"/>
   </p:notesMasterIdLst>
   <p:sldIdLst>
     <p:sldId id="256" r:id="rId2"/>
-    <p:sldId id="267" r:id="rId3"/>
-    <p:sldId id="260" r:id="rId4"/>
-    <p:sldId id="268" r:id="rId5"/>
-    <p:sldId id="269" r:id="rId6"/>
-    <p:sldId id="270" r:id="rId7"/>
-    <p:sldId id="271" r:id="rId8"/>
-    <p:sldId id="272" r:id="rId9"/>
+    <p:sldId id="260" r:id="rId3"/>
+    <p:sldId id="268" r:id="rId4"/>
+    <p:sldId id="269" r:id="rId5"/>
+    <p:sldId id="270" r:id="rId6"/>
+    <p:sldId id="271" r:id="rId7"/>
+    <p:sldId id="272" r:id="rId8"/>
+    <p:sldId id="304" r:id="rId9"/>
     <p:sldId id="273" r:id="rId10"/>
     <p:sldId id="276" r:id="rId11"/>
     <p:sldId id="277" r:id="rId12"/>
@@ -23,38 +23,37 @@
     <p:sldId id="281" r:id="rId14"/>
     <p:sldId id="280" r:id="rId15"/>
     <p:sldId id="274" r:id="rId16"/>
-    <p:sldId id="275" r:id="rId17"/>
-    <p:sldId id="282" r:id="rId18"/>
-    <p:sldId id="291" r:id="rId19"/>
-    <p:sldId id="288" r:id="rId20"/>
-    <p:sldId id="283" r:id="rId21"/>
-    <p:sldId id="284" r:id="rId22"/>
-    <p:sldId id="290" r:id="rId23"/>
-    <p:sldId id="292" r:id="rId24"/>
-    <p:sldId id="289" r:id="rId25"/>
-    <p:sldId id="293" r:id="rId26"/>
-    <p:sldId id="303" r:id="rId27"/>
-    <p:sldId id="296" r:id="rId28"/>
-    <p:sldId id="297" r:id="rId29"/>
-    <p:sldId id="298" r:id="rId30"/>
-    <p:sldId id="299" r:id="rId31"/>
-    <p:sldId id="302" r:id="rId32"/>
-    <p:sldId id="301" r:id="rId33"/>
-    <p:sldId id="300" r:id="rId34"/>
-    <p:sldId id="294" r:id="rId35"/>
-    <p:sldId id="295" r:id="rId36"/>
-    <p:sldId id="285" r:id="rId37"/>
-    <p:sldId id="287" r:id="rId38"/>
-    <p:sldId id="286" r:id="rId39"/>
-    <p:sldId id="266" r:id="rId40"/>
-    <p:sldId id="257" r:id="rId41"/>
-    <p:sldId id="258" r:id="rId42"/>
-    <p:sldId id="259" r:id="rId43"/>
-    <p:sldId id="261" r:id="rId44"/>
-    <p:sldId id="263" r:id="rId45"/>
-    <p:sldId id="262" r:id="rId46"/>
-    <p:sldId id="264" r:id="rId47"/>
-    <p:sldId id="279" r:id="rId48"/>
+    <p:sldId id="305" r:id="rId17"/>
+    <p:sldId id="275" r:id="rId18"/>
+    <p:sldId id="282" r:id="rId19"/>
+    <p:sldId id="291" r:id="rId20"/>
+    <p:sldId id="288" r:id="rId21"/>
+    <p:sldId id="283" r:id="rId22"/>
+    <p:sldId id="284" r:id="rId23"/>
+    <p:sldId id="290" r:id="rId24"/>
+    <p:sldId id="292" r:id="rId25"/>
+    <p:sldId id="289" r:id="rId26"/>
+    <p:sldId id="293" r:id="rId27"/>
+    <p:sldId id="303" r:id="rId28"/>
+    <p:sldId id="298" r:id="rId29"/>
+    <p:sldId id="299" r:id="rId30"/>
+    <p:sldId id="302" r:id="rId31"/>
+    <p:sldId id="301" r:id="rId32"/>
+    <p:sldId id="300" r:id="rId33"/>
+    <p:sldId id="294" r:id="rId34"/>
+    <p:sldId id="295" r:id="rId35"/>
+    <p:sldId id="285" r:id="rId36"/>
+    <p:sldId id="287" r:id="rId37"/>
+    <p:sldId id="286" r:id="rId38"/>
+    <p:sldId id="266" r:id="rId39"/>
+    <p:sldId id="257" r:id="rId40"/>
+    <p:sldId id="258" r:id="rId41"/>
+    <p:sldId id="259" r:id="rId42"/>
+    <p:sldId id="261" r:id="rId43"/>
+    <p:sldId id="263" r:id="rId44"/>
+    <p:sldId id="262" r:id="rId45"/>
+    <p:sldId id="264" r:id="rId46"/>
+    <p:sldId id="279" r:id="rId47"/>
   </p:sldIdLst>
   <p:sldSz cx="12192000" cy="6858000"/>
   <p:notesSz cx="6858000" cy="9144000"/>
@@ -243,7 +242,7 @@
           <a:p>
             <a:fld id="{4F997A0C-E4B2-467D-ABDF-C6BB0AD1437F}" type="datetimeFigureOut">
               <a:rPr lang="en-GB" smtClean="0"/>
-              <a:t>10/12/2018</a:t>
+              <a:t>11/12/2018</a:t>
             </a:fld>
             <a:endParaRPr lang="en-GB"/>
           </a:p>
@@ -555,7 +554,10 @@
           <a:bodyPr/>
           <a:lstStyle/>
           <a:p>
-            <a:endParaRPr lang="en-GB" dirty="0"/>
+            <a:r>
+              <a:rPr lang="en-GB" dirty="0"/>
+              <a:t>It isn’t a good idea to do a project in isolation. </a:t>
+            </a:r>
           </a:p>
         </p:txBody>
       </p:sp>
@@ -576,94 +578,7 @@
           <a:p>
             <a:fld id="{D37E09BB-0EE2-4AA1-9043-B532D0F5CCDE}" type="slidenum">
               <a:rPr lang="en-GB" smtClean="0"/>
-              <a:t>27</a:t>
-            </a:fld>
-            <a:endParaRPr lang="en-GB"/>
-          </a:p>
-        </p:txBody>
-      </p:sp>
-    </p:spTree>
-    <p:extLst>
-      <p:ext uri="{BB962C8B-B14F-4D97-AF65-F5344CB8AC3E}">
-        <p14:creationId xmlns:p14="http://schemas.microsoft.com/office/powerpoint/2010/main" val="2771815336"/>
-      </p:ext>
-    </p:extLst>
-  </p:cSld>
-  <p:clrMapOvr>
-    <a:masterClrMapping/>
-  </p:clrMapOvr>
-</p:notes>
-</file>
-
-<file path=ppt/notesSlides/notesSlide2.xml><?xml version="1.0" encoding="utf-8"?>
-<p:notes xmlns:a="http://schemas.openxmlformats.org/drawingml/2006/main" xmlns:r="http://schemas.openxmlformats.org/officeDocument/2006/relationships" xmlns:p="http://schemas.openxmlformats.org/presentationml/2006/main">
-  <p:cSld>
-    <p:spTree>
-      <p:nvGrpSpPr>
-        <p:cNvPr id="1" name=""/>
-        <p:cNvGrpSpPr/>
-        <p:nvPr/>
-      </p:nvGrpSpPr>
-      <p:grpSpPr>
-        <a:xfrm>
-          <a:off x="0" y="0"/>
-          <a:ext cx="0" cy="0"/>
-          <a:chOff x="0" y="0"/>
-          <a:chExt cx="0" cy="0"/>
-        </a:xfrm>
-      </p:grpSpPr>
-      <p:sp>
-        <p:nvSpPr>
-          <p:cNvPr id="2" name="Slide Image Placeholder 1"/>
-          <p:cNvSpPr>
-            <a:spLocks noGrp="1" noRot="1" noChangeAspect="1"/>
-          </p:cNvSpPr>
-          <p:nvPr>
-            <p:ph type="sldImg"/>
-          </p:nvPr>
-        </p:nvSpPr>
-        <p:spPr/>
-      </p:sp>
-      <p:sp>
-        <p:nvSpPr>
-          <p:cNvPr id="3" name="Notes Placeholder 2"/>
-          <p:cNvSpPr>
-            <a:spLocks noGrp="1"/>
-          </p:cNvSpPr>
-          <p:nvPr>
-            <p:ph type="body" idx="1"/>
-          </p:nvPr>
-        </p:nvSpPr>
-        <p:spPr/>
-        <p:txBody>
-          <a:bodyPr/>
-          <a:lstStyle/>
-          <a:p>
-            <a:r>
-              <a:rPr lang="en-GB" dirty="0"/>
-              <a:t>It isn’t a good idea to do a project in isolation. </a:t>
-            </a:r>
-          </a:p>
-        </p:txBody>
-      </p:sp>
-      <p:sp>
-        <p:nvSpPr>
-          <p:cNvPr id="4" name="Slide Number Placeholder 3"/>
-          <p:cNvSpPr>
-            <a:spLocks noGrp="1"/>
-          </p:cNvSpPr>
-          <p:nvPr>
-            <p:ph type="sldNum" sz="quarter" idx="5"/>
-          </p:nvPr>
-        </p:nvSpPr>
-        <p:spPr/>
-        <p:txBody>
-          <a:bodyPr/>
-          <a:lstStyle/>
-          <a:p>
-            <a:fld id="{D37E09BB-0EE2-4AA1-9043-B532D0F5CCDE}" type="slidenum">
-              <a:rPr lang="en-GB" smtClean="0"/>
-              <a:t>43</a:t>
+              <a:t>42</a:t>
             </a:fld>
             <a:endParaRPr lang="en-GB"/>
           </a:p>
@@ -868,7 +783,7 @@
           <a:p>
             <a:fld id="{55E4148D-2AA3-4A29-8641-0082B7E18494}" type="datetimeFigureOut">
               <a:rPr lang="en-GB" smtClean="0"/>
-              <a:t>10/12/2018</a:t>
+              <a:t>11/12/2018</a:t>
             </a:fld>
             <a:endParaRPr lang="en-GB"/>
           </a:p>
@@ -1143,7 +1058,7 @@
           <a:p>
             <a:fld id="{55E4148D-2AA3-4A29-8641-0082B7E18494}" type="datetimeFigureOut">
               <a:rPr lang="en-GB" smtClean="0"/>
-              <a:t>10/12/2018</a:t>
+              <a:t>11/12/2018</a:t>
             </a:fld>
             <a:endParaRPr lang="en-GB"/>
           </a:p>
@@ -1337,7 +1252,7 @@
           <a:p>
             <a:fld id="{55E4148D-2AA3-4A29-8641-0082B7E18494}" type="datetimeFigureOut">
               <a:rPr lang="en-GB" smtClean="0"/>
-              <a:t>10/12/2018</a:t>
+              <a:t>11/12/2018</a:t>
             </a:fld>
             <a:endParaRPr lang="en-GB"/>
           </a:p>
@@ -1610,7 +1525,7 @@
           <a:p>
             <a:fld id="{55E4148D-2AA3-4A29-8641-0082B7E18494}" type="datetimeFigureOut">
               <a:rPr lang="en-GB" smtClean="0"/>
-              <a:t>10/12/2018</a:t>
+              <a:t>11/12/2018</a:t>
             </a:fld>
             <a:endParaRPr lang="en-GB"/>
           </a:p>
@@ -1951,7 +1866,7 @@
           <a:p>
             <a:fld id="{55E4148D-2AA3-4A29-8641-0082B7E18494}" type="datetimeFigureOut">
               <a:rPr lang="en-GB" smtClean="0"/>
-              <a:t>10/12/2018</a:t>
+              <a:t>11/12/2018</a:t>
             </a:fld>
             <a:endParaRPr lang="en-GB"/>
           </a:p>
@@ -2574,7 +2489,7 @@
           <a:p>
             <a:fld id="{55E4148D-2AA3-4A29-8641-0082B7E18494}" type="datetimeFigureOut">
               <a:rPr lang="en-GB" smtClean="0"/>
-              <a:t>10/12/2018</a:t>
+              <a:t>11/12/2018</a:t>
             </a:fld>
             <a:endParaRPr lang="en-GB"/>
           </a:p>
@@ -3434,7 +3349,7 @@
           <a:p>
             <a:fld id="{55E4148D-2AA3-4A29-8641-0082B7E18494}" type="datetimeFigureOut">
               <a:rPr lang="en-GB" smtClean="0"/>
-              <a:t>10/12/2018</a:t>
+              <a:t>11/12/2018</a:t>
             </a:fld>
             <a:endParaRPr lang="en-GB"/>
           </a:p>
@@ -3604,7 +3519,7 @@
           <a:p>
             <a:fld id="{55E4148D-2AA3-4A29-8641-0082B7E18494}" type="datetimeFigureOut">
               <a:rPr lang="en-GB" smtClean="0"/>
-              <a:t>10/12/2018</a:t>
+              <a:t>11/12/2018</a:t>
             </a:fld>
             <a:endParaRPr lang="en-GB"/>
           </a:p>
@@ -3784,7 +3699,7 @@
           <a:p>
             <a:fld id="{55E4148D-2AA3-4A29-8641-0082B7E18494}" type="datetimeFigureOut">
               <a:rPr lang="en-GB" smtClean="0"/>
-              <a:t>10/12/2018</a:t>
+              <a:t>11/12/2018</a:t>
             </a:fld>
             <a:endParaRPr lang="en-GB"/>
           </a:p>
@@ -3954,7 +3869,7 @@
           <a:p>
             <a:fld id="{55E4148D-2AA3-4A29-8641-0082B7E18494}" type="datetimeFigureOut">
               <a:rPr lang="en-GB" smtClean="0"/>
-              <a:t>10/12/2018</a:t>
+              <a:t>11/12/2018</a:t>
             </a:fld>
             <a:endParaRPr lang="en-GB"/>
           </a:p>
@@ -4201,7 +4116,7 @@
           <a:p>
             <a:fld id="{55E4148D-2AA3-4A29-8641-0082B7E18494}" type="datetimeFigureOut">
               <a:rPr lang="en-GB" smtClean="0"/>
-              <a:t>10/12/2018</a:t>
+              <a:t>11/12/2018</a:t>
             </a:fld>
             <a:endParaRPr lang="en-GB"/>
           </a:p>
@@ -4493,7 +4408,7 @@
           <a:p>
             <a:fld id="{55E4148D-2AA3-4A29-8641-0082B7E18494}" type="datetimeFigureOut">
               <a:rPr lang="en-GB" smtClean="0"/>
-              <a:t>10/12/2018</a:t>
+              <a:t>11/12/2018</a:t>
             </a:fld>
             <a:endParaRPr lang="en-GB"/>
           </a:p>
@@ -4937,7 +4852,7 @@
           <a:p>
             <a:fld id="{55E4148D-2AA3-4A29-8641-0082B7E18494}" type="datetimeFigureOut">
               <a:rPr lang="en-GB" smtClean="0"/>
-              <a:t>10/12/2018</a:t>
+              <a:t>11/12/2018</a:t>
             </a:fld>
             <a:endParaRPr lang="en-GB"/>
           </a:p>
@@ -5055,7 +4970,7 @@
           <a:p>
             <a:fld id="{55E4148D-2AA3-4A29-8641-0082B7E18494}" type="datetimeFigureOut">
               <a:rPr lang="en-GB" smtClean="0"/>
-              <a:t>10/12/2018</a:t>
+              <a:t>11/12/2018</a:t>
             </a:fld>
             <a:endParaRPr lang="en-GB"/>
           </a:p>
@@ -5150,7 +5065,7 @@
           <a:p>
             <a:fld id="{55E4148D-2AA3-4A29-8641-0082B7E18494}" type="datetimeFigureOut">
               <a:rPr lang="en-GB" smtClean="0"/>
-              <a:t>10/12/2018</a:t>
+              <a:t>11/12/2018</a:t>
             </a:fld>
             <a:endParaRPr lang="en-GB"/>
           </a:p>
@@ -5429,7 +5344,7 @@
           <a:p>
             <a:fld id="{55E4148D-2AA3-4A29-8641-0082B7E18494}" type="datetimeFigureOut">
               <a:rPr lang="en-GB" smtClean="0"/>
-              <a:t>10/12/2018</a:t>
+              <a:t>11/12/2018</a:t>
             </a:fld>
             <a:endParaRPr lang="en-GB"/>
           </a:p>
@@ -5704,7 +5619,7 @@
           <a:p>
             <a:fld id="{55E4148D-2AA3-4A29-8641-0082B7E18494}" type="datetimeFigureOut">
               <a:rPr lang="en-GB" smtClean="0"/>
-              <a:t>10/12/2018</a:t>
+              <a:t>11/12/2018</a:t>
             </a:fld>
             <a:endParaRPr lang="en-GB"/>
           </a:p>
@@ -6133,7 +6048,7 @@
           <a:p>
             <a:fld id="{55E4148D-2AA3-4A29-8641-0082B7E18494}" type="datetimeFigureOut">
               <a:rPr lang="en-GB" smtClean="0"/>
-              <a:t>10/12/2018</a:t>
+              <a:t>11/12/2018</a:t>
             </a:fld>
             <a:endParaRPr lang="en-GB"/>
           </a:p>
@@ -6692,9 +6607,10 @@
               <a:rPr lang="en-GB" dirty="0"/>
             </a:br>
             <a:r>
-              <a:rPr lang="en-GB" sz="5300" dirty="0"/>
-              <a:t>Getting Started After Getting Started</a:t>
-            </a:r>
+              <a:rPr lang="en-GB" dirty="0"/>
+              <a:t>3 Months In</a:t>
+            </a:r>
+            <a:endParaRPr lang="en-GB" sz="5300" dirty="0"/>
           </a:p>
         </p:txBody>
       </p:sp>
@@ -6721,7 +6637,7 @@
           <a:p>
             <a:r>
               <a:rPr lang="en-GB" dirty="0"/>
-              <a:t>Lightning Talk – Benjamin Bryant</a:t>
+              <a:t>Benjamin Bryant</a:t>
             </a:r>
           </a:p>
         </p:txBody>
@@ -7563,6 +7479,23 @@
               </a:rPr>
               <a:t> </a:t>
             </a:r>
+          </a:p>
+          <a:p>
+            <a:r>
+              <a:rPr lang="en-GB" dirty="0"/>
+              <a:t>$GOPATH is a thing. </a:t>
+            </a:r>
+            <a:r>
+              <a:rPr lang="en-GB" dirty="0">
+                <a:latin typeface="Segoe MDL2 Assets" panose="050A0102010101010101" pitchFamily="18" charset="0"/>
+              </a:rPr>
+              <a:t></a:t>
+            </a:r>
+          </a:p>
+          <a:p>
+            <a:endParaRPr lang="en-GB" dirty="0"/>
+          </a:p>
+          <a:p>
             <a:endParaRPr lang="en-GB" dirty="0"/>
           </a:p>
           <a:p>
@@ -7608,6 +7541,92 @@
           <p:cNvPr id="2" name="Title 1">
             <a:extLst>
               <a:ext uri="{FF2B5EF4-FFF2-40B4-BE49-F238E27FC236}">
+                <a16:creationId xmlns:a16="http://schemas.microsoft.com/office/drawing/2014/main" id="{54FB6E9E-F299-4AF5-80AC-C6B2D6BC8758}"/>
+              </a:ext>
+            </a:extLst>
+          </p:cNvPr>
+          <p:cNvSpPr>
+            <a:spLocks noGrp="1"/>
+          </p:cNvSpPr>
+          <p:nvPr>
+            <p:ph type="title"/>
+          </p:nvPr>
+        </p:nvSpPr>
+        <p:spPr/>
+        <p:txBody>
+          <a:bodyPr/>
+          <a:lstStyle/>
+          <a:p>
+            <a:r>
+              <a:rPr lang="en-GB" dirty="0"/>
+              <a:t>Mistakes 2 </a:t>
+            </a:r>
+          </a:p>
+        </p:txBody>
+      </p:sp>
+      <p:sp>
+        <p:nvSpPr>
+          <p:cNvPr id="3" name="Content Placeholder 2">
+            <a:extLst>
+              <a:ext uri="{FF2B5EF4-FFF2-40B4-BE49-F238E27FC236}">
+                <a16:creationId xmlns:a16="http://schemas.microsoft.com/office/drawing/2014/main" id="{2611C55B-64F9-4512-96E3-D96C582E3AA6}"/>
+              </a:ext>
+            </a:extLst>
+          </p:cNvPr>
+          <p:cNvSpPr>
+            <a:spLocks noGrp="1"/>
+          </p:cNvSpPr>
+          <p:nvPr>
+            <p:ph idx="1"/>
+          </p:nvPr>
+        </p:nvSpPr>
+        <p:spPr/>
+        <p:txBody>
+          <a:bodyPr/>
+          <a:lstStyle/>
+          <a:p>
+            <a:r>
+              <a:rPr lang="en-GB" dirty="0"/>
+              <a:t>$GOPATH is a thing. </a:t>
+            </a:r>
+          </a:p>
+        </p:txBody>
+      </p:sp>
+    </p:spTree>
+    <p:extLst>
+      <p:ext uri="{BB962C8B-B14F-4D97-AF65-F5344CB8AC3E}">
+        <p14:creationId xmlns:p14="http://schemas.microsoft.com/office/powerpoint/2010/main" val="934833991"/>
+      </p:ext>
+    </p:extLst>
+  </p:cSld>
+  <p:clrMapOvr>
+    <a:masterClrMapping/>
+  </p:clrMapOvr>
+</p:sld>
+</file>
+
+<file path=ppt/slides/slide17.xml><?xml version="1.0" encoding="utf-8"?>
+<p:sld xmlns:a="http://schemas.openxmlformats.org/drawingml/2006/main" xmlns:r="http://schemas.openxmlformats.org/officeDocument/2006/relationships" xmlns:p="http://schemas.openxmlformats.org/presentationml/2006/main">
+  <p:cSld>
+    <p:spTree>
+      <p:nvGrpSpPr>
+        <p:cNvPr id="1" name=""/>
+        <p:cNvGrpSpPr/>
+        <p:nvPr/>
+      </p:nvGrpSpPr>
+      <p:grpSpPr>
+        <a:xfrm>
+          <a:off x="0" y="0"/>
+          <a:ext cx="0" cy="0"/>
+          <a:chOff x="0" y="0"/>
+          <a:chExt cx="0" cy="0"/>
+        </a:xfrm>
+      </p:grpSpPr>
+      <p:sp>
+        <p:nvSpPr>
+          <p:cNvPr id="2" name="Title 1">
+            <a:extLst>
+              <a:ext uri="{FF2B5EF4-FFF2-40B4-BE49-F238E27FC236}">
                 <a16:creationId xmlns:a16="http://schemas.microsoft.com/office/drawing/2014/main" id="{BF87F792-881D-45E8-AE31-8DF9ADAEFECE}"/>
               </a:ext>
             </a:extLst>
@@ -7706,7 +7725,7 @@
 </p:sld>
 </file>
 
-<file path=ppt/slides/slide17.xml><?xml version="1.0" encoding="utf-8"?>
+<file path=ppt/slides/slide18.xml><?xml version="1.0" encoding="utf-8"?>
 <p:sld xmlns:a="http://schemas.openxmlformats.org/drawingml/2006/main" xmlns:r="http://schemas.openxmlformats.org/officeDocument/2006/relationships" xmlns:p="http://schemas.openxmlformats.org/presentationml/2006/main">
   <p:cSld>
     <p:spTree>
@@ -7869,89 +7888,6 @@
 </p:sld>
 </file>
 
-<file path=ppt/slides/slide18.xml><?xml version="1.0" encoding="utf-8"?>
-<p:sld xmlns:a="http://schemas.openxmlformats.org/drawingml/2006/main" xmlns:r="http://schemas.openxmlformats.org/officeDocument/2006/relationships" xmlns:p="http://schemas.openxmlformats.org/presentationml/2006/main">
-  <p:cSld>
-    <p:spTree>
-      <p:nvGrpSpPr>
-        <p:cNvPr id="1" name=""/>
-        <p:cNvGrpSpPr/>
-        <p:nvPr/>
-      </p:nvGrpSpPr>
-      <p:grpSpPr>
-        <a:xfrm>
-          <a:off x="0" y="0"/>
-          <a:ext cx="0" cy="0"/>
-          <a:chOff x="0" y="0"/>
-          <a:chExt cx="0" cy="0"/>
-        </a:xfrm>
-      </p:grpSpPr>
-      <p:sp>
-        <p:nvSpPr>
-          <p:cNvPr id="2" name="Title 1">
-            <a:extLst>
-              <a:ext uri="{FF2B5EF4-FFF2-40B4-BE49-F238E27FC236}">
-                <a16:creationId xmlns:a16="http://schemas.microsoft.com/office/drawing/2014/main" id="{B1B69005-AC4F-4731-BD4E-09D539987B55}"/>
-              </a:ext>
-            </a:extLst>
-          </p:cNvPr>
-          <p:cNvSpPr>
-            <a:spLocks noGrp="1"/>
-          </p:cNvSpPr>
-          <p:nvPr>
-            <p:ph type="title"/>
-          </p:nvPr>
-        </p:nvSpPr>
-        <p:spPr/>
-        <p:txBody>
-          <a:bodyPr/>
-          <a:lstStyle/>
-          <a:p>
-            <a:r>
-              <a:rPr lang="en-GB" dirty="0"/>
-              <a:t>Solutions</a:t>
-            </a:r>
-          </a:p>
-        </p:txBody>
-      </p:sp>
-      <p:sp>
-        <p:nvSpPr>
-          <p:cNvPr id="5" name="Content Placeholder 4">
-            <a:extLst>
-              <a:ext uri="{FF2B5EF4-FFF2-40B4-BE49-F238E27FC236}">
-                <a16:creationId xmlns:a16="http://schemas.microsoft.com/office/drawing/2014/main" id="{BBBF52A4-BB0E-45F5-8DD4-ECE7DE140C56}"/>
-              </a:ext>
-            </a:extLst>
-          </p:cNvPr>
-          <p:cNvSpPr>
-            <a:spLocks noGrp="1"/>
-          </p:cNvSpPr>
-          <p:nvPr>
-            <p:ph idx="1"/>
-          </p:nvPr>
-        </p:nvSpPr>
-        <p:spPr/>
-        <p:txBody>
-          <a:bodyPr/>
-          <a:lstStyle/>
-          <a:p>
-            <a:endParaRPr lang="en-GB"/>
-          </a:p>
-        </p:txBody>
-      </p:sp>
-    </p:spTree>
-    <p:extLst>
-      <p:ext uri="{BB962C8B-B14F-4D97-AF65-F5344CB8AC3E}">
-        <p14:creationId xmlns:p14="http://schemas.microsoft.com/office/powerpoint/2010/main" val="3708281905"/>
-      </p:ext>
-    </p:extLst>
-  </p:cSld>
-  <p:clrMapOvr>
-    <a:masterClrMapping/>
-  </p:clrMapOvr>
-</p:sld>
-</file>
-
 <file path=ppt/slides/slide19.xml><?xml version="1.0" encoding="utf-8"?>
 <p:sld xmlns:a="http://schemas.openxmlformats.org/drawingml/2006/main" xmlns:r="http://schemas.openxmlformats.org/officeDocument/2006/relationships" xmlns:p="http://schemas.openxmlformats.org/presentationml/2006/main">
   <p:cSld>
@@ -7974,7 +7910,7 @@
           <p:cNvPr id="2" name="Title 1">
             <a:extLst>
               <a:ext uri="{FF2B5EF4-FFF2-40B4-BE49-F238E27FC236}">
-                <a16:creationId xmlns:a16="http://schemas.microsoft.com/office/drawing/2014/main" id="{AA01FFF3-EC99-4485-B32E-E2E568D47B5F}"/>
+                <a16:creationId xmlns:a16="http://schemas.microsoft.com/office/drawing/2014/main" id="{B1B69005-AC4F-4731-BD4E-09D539987B55}"/>
               </a:ext>
             </a:extLst>
           </p:cNvPr>
@@ -7992,17 +7928,17 @@
           <a:p>
             <a:r>
               <a:rPr lang="en-GB" dirty="0"/>
-              <a:t>Progress Checklist 3 - 10</a:t>
-            </a:r>
-          </a:p>
-        </p:txBody>
-      </p:sp>
-      <p:sp>
-        <p:nvSpPr>
-          <p:cNvPr id="3" name="Content Placeholder 2">
+              <a:t>Solutions</a:t>
+            </a:r>
+          </a:p>
+        </p:txBody>
+      </p:sp>
+      <p:sp>
+        <p:nvSpPr>
+          <p:cNvPr id="5" name="Content Placeholder 4">
             <a:extLst>
               <a:ext uri="{FF2B5EF4-FFF2-40B4-BE49-F238E27FC236}">
-                <a16:creationId xmlns:a16="http://schemas.microsoft.com/office/drawing/2014/main" id="{A2755EB5-1D4C-4DDE-A6D0-AFBE7C6CD484}"/>
+                <a16:creationId xmlns:a16="http://schemas.microsoft.com/office/drawing/2014/main" id="{BBBF52A4-BB0E-45F5-8DD4-ECE7DE140C56}"/>
               </a:ext>
             </a:extLst>
           </p:cNvPr>
@@ -8018,83 +7954,14 @@
           <a:bodyPr/>
           <a:lstStyle/>
           <a:p>
-            <a:r>
-              <a:rPr lang="en-GB" dirty="0"/>
-              <a:t>Project Structure and avoiding Circular Dependencies </a:t>
-            </a:r>
-            <a:r>
-              <a:rPr lang="en-GB" dirty="0">
-                <a:latin typeface="Segoe MDL2 Assets" panose="050A0102010101010101" pitchFamily="18" charset="0"/>
-              </a:rPr>
-              <a:t></a:t>
-            </a:r>
-          </a:p>
-          <a:p>
-            <a:endParaRPr lang="en-GB" dirty="0"/>
-          </a:p>
-          <a:p>
-            <a:r>
-              <a:rPr lang="en-GB" dirty="0"/>
-              <a:t>GOPATH and where to place your projects </a:t>
-            </a:r>
-            <a:r>
-              <a:rPr lang="en-GB" dirty="0">
-                <a:latin typeface="Segoe MDL2 Assets" panose="050A0102010101010101" pitchFamily="18" charset="0"/>
-              </a:rPr>
-              <a:t></a:t>
-            </a:r>
-          </a:p>
-          <a:p>
-            <a:endParaRPr lang="en-GB" dirty="0"/>
-          </a:p>
-          <a:p>
-            <a:r>
-              <a:rPr lang="en-GB" dirty="0"/>
-              <a:t>Implementing Basic Pathing Using Coordinates </a:t>
-            </a:r>
-            <a:r>
-              <a:rPr lang="en-GB" dirty="0">
-                <a:latin typeface="Segoe MDL2 Assets" panose="050A0102010101010101" pitchFamily="18" charset="0"/>
-              </a:rPr>
-              <a:t></a:t>
-            </a:r>
-          </a:p>
-          <a:p>
-            <a:endParaRPr lang="en-GB" dirty="0">
-              <a:latin typeface="Segoe MDL2 Assets" panose="050A0102010101010101" pitchFamily="18" charset="0"/>
-            </a:endParaRPr>
-          </a:p>
-          <a:p>
-            <a:r>
-              <a:rPr lang="en-GB" dirty="0"/>
-              <a:t>Improve understanding of how different structures interact concurrently </a:t>
-            </a:r>
-            <a:r>
-              <a:rPr lang="en-GB" dirty="0">
-                <a:latin typeface="Segoe MDL2 Assets" panose="050A0102010101010101" pitchFamily="18" charset="0"/>
-              </a:rPr>
-              <a:t></a:t>
-            </a:r>
-          </a:p>
-          <a:p>
-            <a:endParaRPr lang="en-GB" dirty="0">
-              <a:latin typeface="Segoe MDL2 Assets" panose="050A0102010101010101" pitchFamily="18" charset="0"/>
-            </a:endParaRPr>
-          </a:p>
-          <a:p>
-            <a:endParaRPr lang="en-GB" dirty="0">
-              <a:latin typeface="Segoe MDL2 Assets" panose="050A0102010101010101" pitchFamily="18" charset="0"/>
-            </a:endParaRPr>
-          </a:p>
-          <a:p>
-            <a:endParaRPr lang="en-GB" dirty="0"/>
+            <a:endParaRPr lang="en-GB"/>
           </a:p>
         </p:txBody>
       </p:sp>
     </p:spTree>
     <p:extLst>
       <p:ext uri="{BB962C8B-B14F-4D97-AF65-F5344CB8AC3E}">
-        <p14:creationId xmlns:p14="http://schemas.microsoft.com/office/powerpoint/2010/main" val="3768594580"/>
+        <p14:creationId xmlns:p14="http://schemas.microsoft.com/office/powerpoint/2010/main" val="3708281905"/>
       </p:ext>
     </p:extLst>
   </p:cSld>
@@ -8126,7 +7993,7 @@
           <p:cNvPr id="2" name="Title 1">
             <a:extLst>
               <a:ext uri="{FF2B5EF4-FFF2-40B4-BE49-F238E27FC236}">
-                <a16:creationId xmlns:a16="http://schemas.microsoft.com/office/drawing/2014/main" id="{40FC4C2C-6C0F-4CEF-85C0-BEEFDDBF52A4}"/>
+                <a16:creationId xmlns:a16="http://schemas.microsoft.com/office/drawing/2014/main" id="{330D663D-0CCC-4FD2-BBF5-2A678F632B5A}"/>
               </a:ext>
             </a:extLst>
           </p:cNvPr>
@@ -8144,7 +8011,7 @@
           <a:p>
             <a:r>
               <a:rPr lang="en-GB" dirty="0"/>
-              <a:t>The Power of Potentially "Pointless” Personal Projects</a:t>
+              <a:t>Short Background</a:t>
             </a:r>
           </a:p>
         </p:txBody>
@@ -8154,7 +8021,7 @@
           <p:cNvPr id="3" name="Content Placeholder 2">
             <a:extLst>
               <a:ext uri="{FF2B5EF4-FFF2-40B4-BE49-F238E27FC236}">
-                <a16:creationId xmlns:a16="http://schemas.microsoft.com/office/drawing/2014/main" id="{C361BDB0-29B9-4CDA-B65E-7303632DA436}"/>
+                <a16:creationId xmlns:a16="http://schemas.microsoft.com/office/drawing/2014/main" id="{EC4E1DC8-B69C-4E53-96C2-E90EF0520051}"/>
               </a:ext>
             </a:extLst>
           </p:cNvPr>
@@ -8170,14 +8037,65 @@
           <a:bodyPr/>
           <a:lstStyle/>
           <a:p>
-            <a:endParaRPr lang="en-GB"/>
+            <a:r>
+              <a:rPr lang="en-GB" dirty="0"/>
+              <a:t>Recent-</a:t>
+            </a:r>
+            <a:r>
+              <a:rPr lang="en-GB" dirty="0" err="1"/>
+              <a:t>ish</a:t>
+            </a:r>
+            <a:r>
+              <a:rPr lang="en-GB" dirty="0"/>
+              <a:t> Graduate</a:t>
+            </a:r>
+          </a:p>
+          <a:p>
+            <a:endParaRPr lang="en-GB" dirty="0"/>
+          </a:p>
+          <a:p>
+            <a:r>
+              <a:rPr lang="en-GB" dirty="0"/>
+              <a:t>Discovered Go in September 2018 after being invited to the pre-drinks before </a:t>
+            </a:r>
+            <a:r>
+              <a:rPr lang="en-GB" dirty="0" err="1"/>
+              <a:t>GopherCon</a:t>
+            </a:r>
+            <a:r>
+              <a:rPr lang="en-GB" dirty="0"/>
+              <a:t> London. </a:t>
+            </a:r>
+          </a:p>
+          <a:p>
+            <a:r>
+              <a:rPr lang="en-GB" dirty="0"/>
+              <a:t>Been to most London Go </a:t>
+            </a:r>
+            <a:r>
+              <a:rPr lang="en-GB" dirty="0" err="1"/>
+              <a:t>MeetUps</a:t>
+            </a:r>
+            <a:r>
+              <a:rPr lang="en-GB" dirty="0"/>
+              <a:t> since.</a:t>
+            </a:r>
+          </a:p>
+          <a:p>
+            <a:endParaRPr lang="en-GB" dirty="0"/>
+          </a:p>
+          <a:p>
+            <a:r>
+              <a:rPr lang="en-GB" dirty="0"/>
+              <a:t>Have a Background in Java and C#.</a:t>
+            </a:r>
           </a:p>
         </p:txBody>
       </p:sp>
     </p:spTree>
     <p:extLst>
       <p:ext uri="{BB962C8B-B14F-4D97-AF65-F5344CB8AC3E}">
-        <p14:creationId xmlns:p14="http://schemas.microsoft.com/office/powerpoint/2010/main" val="3730308341"/>
+        <p14:creationId xmlns:p14="http://schemas.microsoft.com/office/powerpoint/2010/main" val="3147919256"/>
       </p:ext>
     </p:extLst>
   </p:cSld>
@@ -8209,7 +8127,7 @@
           <p:cNvPr id="2" name="Title 1">
             <a:extLst>
               <a:ext uri="{FF2B5EF4-FFF2-40B4-BE49-F238E27FC236}">
-                <a16:creationId xmlns:a16="http://schemas.microsoft.com/office/drawing/2014/main" id="{D2EE31CB-2F81-4A36-8A60-7DA0689FF389}"/>
+                <a16:creationId xmlns:a16="http://schemas.microsoft.com/office/drawing/2014/main" id="{AA01FFF3-EC99-4485-B32E-E2E568D47B5F}"/>
               </a:ext>
             </a:extLst>
           </p:cNvPr>
@@ -8227,7 +8145,7 @@
           <a:p>
             <a:r>
               <a:rPr lang="en-GB" dirty="0"/>
-              <a:t>Problem 4 – Visual Representation</a:t>
+              <a:t>Progress Checklist 3 - 10</a:t>
             </a:r>
           </a:p>
         </p:txBody>
@@ -8237,7 +8155,7 @@
           <p:cNvPr id="3" name="Content Placeholder 2">
             <a:extLst>
               <a:ext uri="{FF2B5EF4-FFF2-40B4-BE49-F238E27FC236}">
-                <a16:creationId xmlns:a16="http://schemas.microsoft.com/office/drawing/2014/main" id="{A8B919FE-5B99-442A-897F-39F7A3FBA3BF}"/>
+                <a16:creationId xmlns:a16="http://schemas.microsoft.com/office/drawing/2014/main" id="{A2755EB5-1D4C-4DDE-A6D0-AFBE7C6CD484}"/>
               </a:ext>
             </a:extLst>
           </p:cNvPr>
@@ -8255,26 +8173,71 @@
           <a:p>
             <a:r>
               <a:rPr lang="en-GB" dirty="0"/>
-              <a:t>I have no idea what I’m doing or if it works</a:t>
+              <a:t>Project Structure and avoiding Circular Dependencies </a:t>
+            </a:r>
+            <a:r>
+              <a:rPr lang="en-GB" dirty="0">
+                <a:latin typeface="Segoe MDL2 Assets" panose="050A0102010101010101" pitchFamily="18" charset="0"/>
+              </a:rPr>
+              <a:t></a:t>
             </a:r>
           </a:p>
           <a:p>
             <a:endParaRPr lang="en-GB" dirty="0"/>
           </a:p>
           <a:p>
+            <a:r>
+              <a:rPr lang="en-GB" dirty="0"/>
+              <a:t>GOPATH and where to place your projects </a:t>
+            </a:r>
+            <a:r>
+              <a:rPr lang="en-GB" dirty="0">
+                <a:latin typeface="Segoe MDL2 Assets" panose="050A0102010101010101" pitchFamily="18" charset="0"/>
+              </a:rPr>
+              <a:t></a:t>
+            </a:r>
+          </a:p>
+          <a:p>
             <a:endParaRPr lang="en-GB" dirty="0"/>
           </a:p>
           <a:p>
-            <a:endParaRPr lang="en-GB" dirty="0"/>
-          </a:p>
-          <a:p>
-            <a:endParaRPr lang="en-GB" dirty="0"/>
-          </a:p>
-          <a:p>
-            <a:endParaRPr lang="en-GB" dirty="0"/>
-          </a:p>
-          <a:p>
-            <a:endParaRPr lang="en-GB" dirty="0"/>
+            <a:r>
+              <a:rPr lang="en-GB" dirty="0"/>
+              <a:t>Implementing Basic Pathing Using Coordinates </a:t>
+            </a:r>
+            <a:r>
+              <a:rPr lang="en-GB" dirty="0">
+                <a:latin typeface="Segoe MDL2 Assets" panose="050A0102010101010101" pitchFamily="18" charset="0"/>
+              </a:rPr>
+              <a:t></a:t>
+            </a:r>
+          </a:p>
+          <a:p>
+            <a:endParaRPr lang="en-GB" dirty="0">
+              <a:latin typeface="Segoe MDL2 Assets" panose="050A0102010101010101" pitchFamily="18" charset="0"/>
+            </a:endParaRPr>
+          </a:p>
+          <a:p>
+            <a:r>
+              <a:rPr lang="en-GB" dirty="0"/>
+              <a:t>Improve understanding of how different structures interact concurrently </a:t>
+            </a:r>
+            <a:r>
+              <a:rPr lang="en-GB" dirty="0">
+                <a:latin typeface="Segoe MDL2 Assets" panose="050A0102010101010101" pitchFamily="18" charset="0"/>
+              </a:rPr>
+              <a:t></a:t>
+            </a:r>
+          </a:p>
+          <a:p>
+            <a:endParaRPr lang="en-GB" dirty="0">
+              <a:latin typeface="Segoe MDL2 Assets" panose="050A0102010101010101" pitchFamily="18" charset="0"/>
+            </a:endParaRPr>
+          </a:p>
+          <a:p>
+            <a:endParaRPr lang="en-GB" dirty="0">
+              <a:latin typeface="Segoe MDL2 Assets" panose="050A0102010101010101" pitchFamily="18" charset="0"/>
+            </a:endParaRPr>
           </a:p>
           <a:p>
             <a:endParaRPr lang="en-GB" dirty="0"/>
@@ -8284,7 +8247,7 @@
     </p:spTree>
     <p:extLst>
       <p:ext uri="{BB962C8B-B14F-4D97-AF65-F5344CB8AC3E}">
-        <p14:creationId xmlns:p14="http://schemas.microsoft.com/office/powerpoint/2010/main" val="52941393"/>
+        <p14:creationId xmlns:p14="http://schemas.microsoft.com/office/powerpoint/2010/main" val="3768594580"/>
       </p:ext>
     </p:extLst>
   </p:cSld>
@@ -8316,7 +8279,7 @@
           <p:cNvPr id="2" name="Title 1">
             <a:extLst>
               <a:ext uri="{FF2B5EF4-FFF2-40B4-BE49-F238E27FC236}">
-                <a16:creationId xmlns:a16="http://schemas.microsoft.com/office/drawing/2014/main" id="{E2D24B9C-4460-4D79-AE21-23356AF1FB37}"/>
+                <a16:creationId xmlns:a16="http://schemas.microsoft.com/office/drawing/2014/main" id="{D2EE31CB-2F81-4A36-8A60-7DA0689FF389}"/>
               </a:ext>
             </a:extLst>
           </p:cNvPr>
@@ -8334,7 +8297,7 @@
           <a:p>
             <a:r>
               <a:rPr lang="en-GB" dirty="0"/>
-              <a:t>Solutions</a:t>
+              <a:t>Problem 4 – Visual Representation</a:t>
             </a:r>
           </a:p>
         </p:txBody>
@@ -8344,7 +8307,7 @@
           <p:cNvPr id="3" name="Content Placeholder 2">
             <a:extLst>
               <a:ext uri="{FF2B5EF4-FFF2-40B4-BE49-F238E27FC236}">
-                <a16:creationId xmlns:a16="http://schemas.microsoft.com/office/drawing/2014/main" id="{DBA319FF-5EEE-4C2D-B80B-5DF0D120CF5E}"/>
+                <a16:creationId xmlns:a16="http://schemas.microsoft.com/office/drawing/2014/main" id="{A8B919FE-5B99-442A-897F-39F7A3FBA3BF}"/>
               </a:ext>
             </a:extLst>
           </p:cNvPr>
@@ -8362,15 +8325,36 @@
           <a:p>
             <a:r>
               <a:rPr lang="en-GB" dirty="0"/>
-              <a:t>Render the world using </a:t>
-            </a:r>
+              <a:t>I have no idea what I’m doing or if it works</a:t>
+            </a:r>
+          </a:p>
+          <a:p>
+            <a:endParaRPr lang="en-GB" dirty="0"/>
+          </a:p>
+          <a:p>
+            <a:endParaRPr lang="en-GB" dirty="0"/>
+          </a:p>
+          <a:p>
+            <a:endParaRPr lang="en-GB" dirty="0"/>
+          </a:p>
+          <a:p>
+            <a:endParaRPr lang="en-GB" dirty="0"/>
+          </a:p>
+          <a:p>
+            <a:endParaRPr lang="en-GB" dirty="0"/>
+          </a:p>
+          <a:p>
+            <a:endParaRPr lang="en-GB" dirty="0"/>
+          </a:p>
+          <a:p>
+            <a:endParaRPr lang="en-GB" dirty="0"/>
           </a:p>
         </p:txBody>
       </p:sp>
     </p:spTree>
     <p:extLst>
       <p:ext uri="{BB962C8B-B14F-4D97-AF65-F5344CB8AC3E}">
-        <p14:creationId xmlns:p14="http://schemas.microsoft.com/office/powerpoint/2010/main" val="1519006128"/>
+        <p14:creationId xmlns:p14="http://schemas.microsoft.com/office/powerpoint/2010/main" val="52941393"/>
       </p:ext>
     </p:extLst>
   </p:cSld>
@@ -8402,7 +8386,7 @@
           <p:cNvPr id="2" name="Title 1">
             <a:extLst>
               <a:ext uri="{FF2B5EF4-FFF2-40B4-BE49-F238E27FC236}">
-                <a16:creationId xmlns:a16="http://schemas.microsoft.com/office/drawing/2014/main" id="{0BB2E70A-E100-4BA0-95EC-7B26B97549BA}"/>
+                <a16:creationId xmlns:a16="http://schemas.microsoft.com/office/drawing/2014/main" id="{E2D24B9C-4460-4D79-AE21-23356AF1FB37}"/>
               </a:ext>
             </a:extLst>
           </p:cNvPr>
@@ -8420,7 +8404,7 @@
           <a:p>
             <a:r>
               <a:rPr lang="en-GB" dirty="0"/>
-              <a:t>Progress Checklist 11-14</a:t>
+              <a:t>Solutions</a:t>
             </a:r>
           </a:p>
         </p:txBody>
@@ -8430,7 +8414,7 @@
           <p:cNvPr id="3" name="Content Placeholder 2">
             <a:extLst>
               <a:ext uri="{FF2B5EF4-FFF2-40B4-BE49-F238E27FC236}">
-                <a16:creationId xmlns:a16="http://schemas.microsoft.com/office/drawing/2014/main" id="{00B55E60-9E9B-4A07-AD19-88E525512438}"/>
+                <a16:creationId xmlns:a16="http://schemas.microsoft.com/office/drawing/2014/main" id="{DBA319FF-5EEE-4C2D-B80B-5DF0D120CF5E}"/>
               </a:ext>
             </a:extLst>
           </p:cNvPr>
@@ -8448,60 +8432,15 @@
           <a:p>
             <a:r>
               <a:rPr lang="en-GB" dirty="0"/>
-              <a:t>Learnt how to use http/html packages for rendering a webpage </a:t>
-            </a:r>
-            <a:r>
-              <a:rPr lang="en-GB" dirty="0">
-                <a:latin typeface="Segoe MDL2 Assets" panose="050A0102010101010101" pitchFamily="18" charset="0"/>
-              </a:rPr>
-              <a:t></a:t>
-            </a:r>
-          </a:p>
-          <a:p>
-            <a:endParaRPr lang="en-GB" dirty="0"/>
-          </a:p>
-          <a:p>
-            <a:r>
-              <a:rPr lang="en-GB" dirty="0"/>
-              <a:t>Learnt how to use http function handlers </a:t>
-            </a:r>
-            <a:r>
-              <a:rPr lang="en-GB" dirty="0">
-                <a:latin typeface="Segoe MDL2 Assets" panose="050A0102010101010101" pitchFamily="18" charset="0"/>
-              </a:rPr>
-              <a:t></a:t>
-            </a:r>
-          </a:p>
-          <a:p>
-            <a:endParaRPr lang="en-GB" dirty="0"/>
-          </a:p>
-          <a:p>
-            <a:r>
-              <a:rPr lang="en-GB" dirty="0"/>
-              <a:t>Learnt a bit about </a:t>
-            </a:r>
-            <a:r>
-              <a:rPr lang="en-GB" dirty="0" err="1"/>
-              <a:t>css</a:t>
-            </a:r>
-            <a:r>
-              <a:rPr lang="en-GB" dirty="0"/>
-              <a:t> grid </a:t>
-            </a:r>
-            <a:r>
-              <a:rPr lang="en-GB" dirty="0">
-                <a:latin typeface="Segoe MDL2 Assets" panose="050A0102010101010101" pitchFamily="18" charset="0"/>
-              </a:rPr>
-              <a:t></a:t>
-            </a:r>
-            <a:endParaRPr lang="en-GB" dirty="0"/>
+              <a:t>Render the world using </a:t>
+            </a:r>
           </a:p>
         </p:txBody>
       </p:sp>
     </p:spTree>
     <p:extLst>
       <p:ext uri="{BB962C8B-B14F-4D97-AF65-F5344CB8AC3E}">
-        <p14:creationId xmlns:p14="http://schemas.microsoft.com/office/powerpoint/2010/main" val="3521459611"/>
+        <p14:creationId xmlns:p14="http://schemas.microsoft.com/office/powerpoint/2010/main" val="1519006128"/>
       </p:ext>
     </p:extLst>
   </p:cSld>
@@ -8533,7 +8472,7 @@
           <p:cNvPr id="2" name="Title 1">
             <a:extLst>
               <a:ext uri="{FF2B5EF4-FFF2-40B4-BE49-F238E27FC236}">
-                <a16:creationId xmlns:a16="http://schemas.microsoft.com/office/drawing/2014/main" id="{0B70B174-F9FD-432F-9D87-8193A5BF99F5}"/>
+                <a16:creationId xmlns:a16="http://schemas.microsoft.com/office/drawing/2014/main" id="{0BB2E70A-E100-4BA0-95EC-7B26B97549BA}"/>
               </a:ext>
             </a:extLst>
           </p:cNvPr>
@@ -8551,7 +8490,7 @@
           <a:p>
             <a:r>
               <a:rPr lang="en-GB" dirty="0"/>
-              <a:t>Solutions – Early Demo</a:t>
+              <a:t>Progress Checklist 11-14</a:t>
             </a:r>
           </a:p>
         </p:txBody>
@@ -8561,7 +8500,7 @@
           <p:cNvPr id="3" name="Content Placeholder 2">
             <a:extLst>
               <a:ext uri="{FF2B5EF4-FFF2-40B4-BE49-F238E27FC236}">
-                <a16:creationId xmlns:a16="http://schemas.microsoft.com/office/drawing/2014/main" id="{9CCEF8BA-DD87-47C3-8861-0A56DB73CB4C}"/>
+                <a16:creationId xmlns:a16="http://schemas.microsoft.com/office/drawing/2014/main" id="{00B55E60-9E9B-4A07-AD19-88E525512438}"/>
               </a:ext>
             </a:extLst>
           </p:cNvPr>
@@ -8577,6 +8516,54 @@
           <a:bodyPr/>
           <a:lstStyle/>
           <a:p>
+            <a:r>
+              <a:rPr lang="en-GB" dirty="0"/>
+              <a:t>Learnt how to use http/html packages for rendering a webpage </a:t>
+            </a:r>
+            <a:r>
+              <a:rPr lang="en-GB" dirty="0">
+                <a:latin typeface="Segoe MDL2 Assets" panose="050A0102010101010101" pitchFamily="18" charset="0"/>
+              </a:rPr>
+              <a:t></a:t>
+            </a:r>
+          </a:p>
+          <a:p>
+            <a:endParaRPr lang="en-GB" dirty="0"/>
+          </a:p>
+          <a:p>
+            <a:r>
+              <a:rPr lang="en-GB" dirty="0"/>
+              <a:t>Learnt how to use http function handlers </a:t>
+            </a:r>
+            <a:r>
+              <a:rPr lang="en-GB" dirty="0">
+                <a:latin typeface="Segoe MDL2 Assets" panose="050A0102010101010101" pitchFamily="18" charset="0"/>
+              </a:rPr>
+              <a:t></a:t>
+            </a:r>
+          </a:p>
+          <a:p>
+            <a:endParaRPr lang="en-GB" dirty="0"/>
+          </a:p>
+          <a:p>
+            <a:r>
+              <a:rPr lang="en-GB" dirty="0"/>
+              <a:t>Learnt a bit about </a:t>
+            </a:r>
+            <a:r>
+              <a:rPr lang="en-GB" dirty="0" err="1"/>
+              <a:t>css</a:t>
+            </a:r>
+            <a:r>
+              <a:rPr lang="en-GB" dirty="0"/>
+              <a:t> grid </a:t>
+            </a:r>
+            <a:r>
+              <a:rPr lang="en-GB" dirty="0">
+                <a:latin typeface="Segoe MDL2 Assets" panose="050A0102010101010101" pitchFamily="18" charset="0"/>
+              </a:rPr>
+              <a:t></a:t>
+            </a:r>
             <a:endParaRPr lang="en-GB" dirty="0"/>
           </a:p>
         </p:txBody>
@@ -8584,7 +8571,7 @@
     </p:spTree>
     <p:extLst>
       <p:ext uri="{BB962C8B-B14F-4D97-AF65-F5344CB8AC3E}">
-        <p14:creationId xmlns:p14="http://schemas.microsoft.com/office/powerpoint/2010/main" val="1692078946"/>
+        <p14:creationId xmlns:p14="http://schemas.microsoft.com/office/powerpoint/2010/main" val="3521459611"/>
       </p:ext>
     </p:extLst>
   </p:cSld>
@@ -8616,7 +8603,7 @@
           <p:cNvPr id="2" name="Title 1">
             <a:extLst>
               <a:ext uri="{FF2B5EF4-FFF2-40B4-BE49-F238E27FC236}">
-                <a16:creationId xmlns:a16="http://schemas.microsoft.com/office/drawing/2014/main" id="{75C50CEC-C87D-40B9-990D-303CFFD16359}"/>
+                <a16:creationId xmlns:a16="http://schemas.microsoft.com/office/drawing/2014/main" id="{0B70B174-F9FD-432F-9D87-8193A5BF99F5}"/>
               </a:ext>
             </a:extLst>
           </p:cNvPr>
@@ -8634,7 +8621,7 @@
           <a:p>
             <a:r>
               <a:rPr lang="en-GB" dirty="0"/>
-              <a:t>Problem 5 - Optimization</a:t>
+              <a:t>Solutions – Early Demo</a:t>
             </a:r>
           </a:p>
         </p:txBody>
@@ -8644,7 +8631,7 @@
           <p:cNvPr id="3" name="Content Placeholder 2">
             <a:extLst>
               <a:ext uri="{FF2B5EF4-FFF2-40B4-BE49-F238E27FC236}">
-                <a16:creationId xmlns:a16="http://schemas.microsoft.com/office/drawing/2014/main" id="{6CE96895-52F6-414F-B7B4-DBAF2D31353D}"/>
+                <a16:creationId xmlns:a16="http://schemas.microsoft.com/office/drawing/2014/main" id="{9CCEF8BA-DD87-47C3-8861-0A56DB73CB4C}"/>
               </a:ext>
             </a:extLst>
           </p:cNvPr>
@@ -8660,17 +8647,14 @@
           <a:bodyPr/>
           <a:lstStyle/>
           <a:p>
-            <a:r>
-              <a:rPr lang="en-GB" dirty="0"/>
-              <a:t>As the number of gophers increased the time it takes to process each gopher also increases. </a:t>
-            </a:r>
+            <a:endParaRPr lang="en-GB" dirty="0"/>
           </a:p>
         </p:txBody>
       </p:sp>
     </p:spTree>
     <p:extLst>
       <p:ext uri="{BB962C8B-B14F-4D97-AF65-F5344CB8AC3E}">
-        <p14:creationId xmlns:p14="http://schemas.microsoft.com/office/powerpoint/2010/main" val="1147479734"/>
+        <p14:creationId xmlns:p14="http://schemas.microsoft.com/office/powerpoint/2010/main" val="1692078946"/>
       </p:ext>
     </p:extLst>
   </p:cSld>
@@ -8702,7 +8686,7 @@
           <p:cNvPr id="2" name="Title 1">
             <a:extLst>
               <a:ext uri="{FF2B5EF4-FFF2-40B4-BE49-F238E27FC236}">
-                <a16:creationId xmlns:a16="http://schemas.microsoft.com/office/drawing/2014/main" id="{96C67DBF-3E03-4AC3-8F08-C9A56B0C5933}"/>
+                <a16:creationId xmlns:a16="http://schemas.microsoft.com/office/drawing/2014/main" id="{75C50CEC-C87D-40B9-990D-303CFFD16359}"/>
               </a:ext>
             </a:extLst>
           </p:cNvPr>
@@ -8720,7 +8704,7 @@
           <a:p>
             <a:r>
               <a:rPr lang="en-GB" dirty="0"/>
-              <a:t>Solutions	</a:t>
+              <a:t>Problem 5 - Optimization</a:t>
             </a:r>
           </a:p>
         </p:txBody>
@@ -8730,7 +8714,7 @@
           <p:cNvPr id="3" name="Content Placeholder 2">
             <a:extLst>
               <a:ext uri="{FF2B5EF4-FFF2-40B4-BE49-F238E27FC236}">
-                <a16:creationId xmlns:a16="http://schemas.microsoft.com/office/drawing/2014/main" id="{2E3CB77D-CB5F-495D-84F6-E0A5AB452645}"/>
+                <a16:creationId xmlns:a16="http://schemas.microsoft.com/office/drawing/2014/main" id="{6CE96895-52F6-414F-B7B4-DBAF2D31353D}"/>
               </a:ext>
             </a:extLst>
           </p:cNvPr>
@@ -8748,48 +8732,15 @@
           <a:p>
             <a:r>
               <a:rPr lang="en-GB" dirty="0"/>
-              <a:t>Optimizing how long it takes Gophers to find food. </a:t>
-            </a:r>
-          </a:p>
-          <a:p>
-            <a:pPr lvl="1"/>
-            <a:r>
-              <a:rPr lang="en-GB" dirty="0"/>
-              <a:t>Spiral Searching, </a:t>
-            </a:r>
-          </a:p>
-          <a:p>
-            <a:pPr lvl="1"/>
-            <a:r>
-              <a:rPr lang="en-GB" dirty="0"/>
-              <a:t>Quadtree Queries</a:t>
-            </a:r>
-          </a:p>
-          <a:p>
-            <a:pPr lvl="1"/>
-            <a:r>
-              <a:rPr lang="en-GB" dirty="0"/>
-              <a:t>Spatial Partitioning</a:t>
-            </a:r>
-          </a:p>
-          <a:p>
-            <a:pPr lvl="1"/>
-            <a:endParaRPr lang="en-GB" dirty="0"/>
-          </a:p>
-          <a:p>
-            <a:pPr lvl="1"/>
-            <a:endParaRPr lang="en-GB" dirty="0"/>
-          </a:p>
-          <a:p>
-            <a:pPr lvl="1"/>
-            <a:endParaRPr lang="en-GB" dirty="0"/>
+              <a:t>As the number of gophers increased the time it takes to process each gopher also increases. </a:t>
+            </a:r>
           </a:p>
         </p:txBody>
       </p:sp>
     </p:spTree>
     <p:extLst>
       <p:ext uri="{BB962C8B-B14F-4D97-AF65-F5344CB8AC3E}">
-        <p14:creationId xmlns:p14="http://schemas.microsoft.com/office/powerpoint/2010/main" val="2433235080"/>
+        <p14:creationId xmlns:p14="http://schemas.microsoft.com/office/powerpoint/2010/main" val="1147479734"/>
       </p:ext>
     </p:extLst>
   </p:cSld>
@@ -8821,7 +8772,7 @@
           <p:cNvPr id="2" name="Title 1">
             <a:extLst>
               <a:ext uri="{FF2B5EF4-FFF2-40B4-BE49-F238E27FC236}">
-                <a16:creationId xmlns:a16="http://schemas.microsoft.com/office/drawing/2014/main" id="{D5AD34E6-B9F5-484D-8BC0-F61BE7177945}"/>
+                <a16:creationId xmlns:a16="http://schemas.microsoft.com/office/drawing/2014/main" id="{96C67DBF-3E03-4AC3-8F08-C9A56B0C5933}"/>
               </a:ext>
             </a:extLst>
           </p:cNvPr>
@@ -8839,7 +8790,7 @@
           <a:p>
             <a:r>
               <a:rPr lang="en-GB" dirty="0"/>
-              <a:t>Variables</a:t>
+              <a:t>Solutions	</a:t>
             </a:r>
           </a:p>
         </p:txBody>
@@ -8849,7 +8800,7 @@
           <p:cNvPr id="3" name="Content Placeholder 2">
             <a:extLst>
               <a:ext uri="{FF2B5EF4-FFF2-40B4-BE49-F238E27FC236}">
-                <a16:creationId xmlns:a16="http://schemas.microsoft.com/office/drawing/2014/main" id="{E3E7B6E3-350A-42E9-901D-4256E39894ED}"/>
+                <a16:creationId xmlns:a16="http://schemas.microsoft.com/office/drawing/2014/main" id="{2E3CB77D-CB5F-495D-84F6-E0A5AB452645}"/>
               </a:ext>
             </a:extLst>
           </p:cNvPr>
@@ -8867,52 +8818,40 @@
           <a:p>
             <a:r>
               <a:rPr lang="en-GB" dirty="0"/>
-              <a:t>Starting Number Of Gophers is 5000</a:t>
+              <a:t>Optimizing how long it takes Gophers to find food. </a:t>
             </a:r>
           </a:p>
           <a:p>
             <a:pPr lvl="1"/>
             <a:r>
               <a:rPr lang="en-GB" dirty="0"/>
-              <a:t>Gopher lifespans are around 500</a:t>
-            </a:r>
-          </a:p>
-          <a:p>
+              <a:t>Spiral Searching, </a:t>
+            </a:r>
+          </a:p>
+          <a:p>
+            <a:pPr lvl="1"/>
+            <a:r>
+              <a:rPr lang="en-GB" dirty="0"/>
+              <a:t>Quadtree Queries</a:t>
+            </a:r>
+          </a:p>
+          <a:p>
+            <a:pPr lvl="1"/>
+            <a:r>
+              <a:rPr lang="en-GB" dirty="0"/>
+              <a:t>Spatial Partitioning</a:t>
+            </a:r>
+          </a:p>
+          <a:p>
+            <a:pPr lvl="1"/>
             <a:endParaRPr lang="en-GB" dirty="0"/>
           </a:p>
           <a:p>
-            <a:r>
-              <a:rPr lang="en-GB" dirty="0"/>
-              <a:t>Number Of Food on the map is around 1 million, </a:t>
-            </a:r>
-          </a:p>
-          <a:p>
+            <a:pPr lvl="1"/>
             <a:endParaRPr lang="en-GB" dirty="0"/>
           </a:p>
           <a:p>
-            <a:r>
-              <a:rPr lang="en-GB" dirty="0"/>
-              <a:t>World Size is 3000 x 3000</a:t>
-            </a:r>
-          </a:p>
-          <a:p>
-            <a:endParaRPr lang="en-GB" dirty="0"/>
-          </a:p>
-          <a:p>
-            <a:r>
-              <a:rPr lang="en-GB" dirty="0"/>
-              <a:t>Hunger per </a:t>
-            </a:r>
-            <a:r>
-              <a:rPr lang="en-GB"/>
-              <a:t>moment is 5 </a:t>
-            </a:r>
-            <a:endParaRPr lang="en-GB" dirty="0"/>
-          </a:p>
-          <a:p>
-            <a:endParaRPr lang="en-GB" dirty="0"/>
-          </a:p>
-          <a:p>
+            <a:pPr lvl="1"/>
             <a:endParaRPr lang="en-GB" dirty="0"/>
           </a:p>
         </p:txBody>
@@ -8920,7 +8859,7 @@
     </p:spTree>
     <p:extLst>
       <p:ext uri="{BB962C8B-B14F-4D97-AF65-F5344CB8AC3E}">
-        <p14:creationId xmlns:p14="http://schemas.microsoft.com/office/powerpoint/2010/main" val="3390754349"/>
+        <p14:creationId xmlns:p14="http://schemas.microsoft.com/office/powerpoint/2010/main" val="2433235080"/>
       </p:ext>
     </p:extLst>
   </p:cSld>
@@ -8947,40 +8886,111 @@
           <a:chExt cx="0" cy="0"/>
         </a:xfrm>
       </p:grpSpPr>
-      <p:pic>
-        <p:nvPicPr>
-          <p:cNvPr id="5" name="Picture 4">
+      <p:sp>
+        <p:nvSpPr>
+          <p:cNvPr id="2" name="Title 1">
             <a:extLst>
               <a:ext uri="{FF2B5EF4-FFF2-40B4-BE49-F238E27FC236}">
-                <a16:creationId xmlns:a16="http://schemas.microsoft.com/office/drawing/2014/main" id="{A2BFED8E-7C1B-46F7-AFD2-2F75B5CFAB15}"/>
+                <a16:creationId xmlns:a16="http://schemas.microsoft.com/office/drawing/2014/main" id="{D5AD34E6-B9F5-484D-8BC0-F61BE7177945}"/>
               </a:ext>
             </a:extLst>
           </p:cNvPr>
-          <p:cNvPicPr>
-            <a:picLocks noChangeAspect="1"/>
-          </p:cNvPicPr>
-          <p:nvPr/>
-        </p:nvPicPr>
-        <p:blipFill>
-          <a:blip r:embed="rId3"/>
-          <a:stretch>
-            <a:fillRect/>
-          </a:stretch>
-        </p:blipFill>
-        <p:spPr>
-          <a:xfrm>
-            <a:off x="1037519" y="628259"/>
-            <a:ext cx="10116962" cy="5601482"/>
-          </a:xfrm>
-          <a:prstGeom prst="rect">
-            <a:avLst/>
-          </a:prstGeom>
-        </p:spPr>
-      </p:pic>
+          <p:cNvSpPr>
+            <a:spLocks noGrp="1"/>
+          </p:cNvSpPr>
+          <p:nvPr>
+            <p:ph type="title"/>
+          </p:nvPr>
+        </p:nvSpPr>
+        <p:spPr/>
+        <p:txBody>
+          <a:bodyPr/>
+          <a:lstStyle/>
+          <a:p>
+            <a:r>
+              <a:rPr lang="en-GB" dirty="0"/>
+              <a:t>Variables</a:t>
+            </a:r>
+          </a:p>
+        </p:txBody>
+      </p:sp>
+      <p:sp>
+        <p:nvSpPr>
+          <p:cNvPr id="3" name="Content Placeholder 2">
+            <a:extLst>
+              <a:ext uri="{FF2B5EF4-FFF2-40B4-BE49-F238E27FC236}">
+                <a16:creationId xmlns:a16="http://schemas.microsoft.com/office/drawing/2014/main" id="{E3E7B6E3-350A-42E9-901D-4256E39894ED}"/>
+              </a:ext>
+            </a:extLst>
+          </p:cNvPr>
+          <p:cNvSpPr>
+            <a:spLocks noGrp="1"/>
+          </p:cNvSpPr>
+          <p:nvPr>
+            <p:ph idx="1"/>
+          </p:nvPr>
+        </p:nvSpPr>
+        <p:spPr/>
+        <p:txBody>
+          <a:bodyPr/>
+          <a:lstStyle/>
+          <a:p>
+            <a:r>
+              <a:rPr lang="en-GB" dirty="0"/>
+              <a:t>Starting Number Of Gophers is 5000</a:t>
+            </a:r>
+          </a:p>
+          <a:p>
+            <a:pPr lvl="1"/>
+            <a:r>
+              <a:rPr lang="en-GB" dirty="0"/>
+              <a:t>Gopher lifespans are around 500</a:t>
+            </a:r>
+          </a:p>
+          <a:p>
+            <a:endParaRPr lang="en-GB" dirty="0"/>
+          </a:p>
+          <a:p>
+            <a:r>
+              <a:rPr lang="en-GB" dirty="0"/>
+              <a:t>Number Of Food on the map is around 1 million, </a:t>
+            </a:r>
+          </a:p>
+          <a:p>
+            <a:endParaRPr lang="en-GB" dirty="0"/>
+          </a:p>
+          <a:p>
+            <a:r>
+              <a:rPr lang="en-GB" dirty="0"/>
+              <a:t>World Size is 3000 x 3000</a:t>
+            </a:r>
+          </a:p>
+          <a:p>
+            <a:endParaRPr lang="en-GB" dirty="0"/>
+          </a:p>
+          <a:p>
+            <a:r>
+              <a:rPr lang="en-GB" dirty="0"/>
+              <a:t>Hunger per </a:t>
+            </a:r>
+            <a:r>
+              <a:rPr lang="en-GB"/>
+              <a:t>moment is 5 </a:t>
+            </a:r>
+            <a:endParaRPr lang="en-GB" dirty="0"/>
+          </a:p>
+          <a:p>
+            <a:endParaRPr lang="en-GB" dirty="0"/>
+          </a:p>
+          <a:p>
+            <a:endParaRPr lang="en-GB" dirty="0"/>
+          </a:p>
+        </p:txBody>
+      </p:sp>
     </p:spTree>
     <p:extLst>
       <p:ext uri="{BB962C8B-B14F-4D97-AF65-F5344CB8AC3E}">
-        <p14:creationId xmlns:p14="http://schemas.microsoft.com/office/powerpoint/2010/main" val="2495389994"/>
+        <p14:creationId xmlns:p14="http://schemas.microsoft.com/office/powerpoint/2010/main" val="3390754349"/>
       </p:ext>
     </p:extLst>
   </p:cSld>
@@ -9012,7 +9022,7 @@
           <p:cNvPr id="2" name="Title 1">
             <a:extLst>
               <a:ext uri="{FF2B5EF4-FFF2-40B4-BE49-F238E27FC236}">
-                <a16:creationId xmlns:a16="http://schemas.microsoft.com/office/drawing/2014/main" id="{E3255AB5-8EE3-4561-966C-E5695A26A235}"/>
+                <a16:creationId xmlns:a16="http://schemas.microsoft.com/office/drawing/2014/main" id="{65F488D5-CF82-4293-8278-D0083D544E72}"/>
               </a:ext>
             </a:extLst>
           </p:cNvPr>
@@ -9028,7 +9038,10 @@
           <a:bodyPr/>
           <a:lstStyle/>
           <a:p>
-            <a:endParaRPr lang="en-GB"/>
+            <a:r>
+              <a:rPr lang="en-GB" dirty="0"/>
+              <a:t>How many gophers a minute?</a:t>
+            </a:r>
           </a:p>
         </p:txBody>
       </p:sp>
@@ -9037,7 +9050,7 @@
           <p:cNvPr id="3" name="Content Placeholder 2">
             <a:extLst>
               <a:ext uri="{FF2B5EF4-FFF2-40B4-BE49-F238E27FC236}">
-                <a16:creationId xmlns:a16="http://schemas.microsoft.com/office/drawing/2014/main" id="{BD58586D-10EC-4399-A15E-E18A52880BB5}"/>
+                <a16:creationId xmlns:a16="http://schemas.microsoft.com/office/drawing/2014/main" id="{8AECA827-394C-444E-BE1A-907728F99506}"/>
               </a:ext>
             </a:extLst>
           </p:cNvPr>
@@ -9062,7 +9075,7 @@
           <p:cNvPr id="4" name="Picture 3">
             <a:extLst>
               <a:ext uri="{FF2B5EF4-FFF2-40B4-BE49-F238E27FC236}">
-                <a16:creationId xmlns:a16="http://schemas.microsoft.com/office/drawing/2014/main" id="{AA7902B0-5491-4FBC-A47C-D5F2E0169216}"/>
+                <a16:creationId xmlns:a16="http://schemas.microsoft.com/office/drawing/2014/main" id="{5F3F7BEA-4C1A-486F-89AD-F3A324280B9F}"/>
               </a:ext>
             </a:extLst>
           </p:cNvPr>
@@ -9079,8 +9092,8 @@
         </p:blipFill>
         <p:spPr>
           <a:xfrm>
-            <a:off x="781296" y="508484"/>
-            <a:ext cx="10126488" cy="5896798"/>
+            <a:off x="1264291" y="1385976"/>
+            <a:ext cx="8168361" cy="5019306"/>
           </a:xfrm>
           <a:prstGeom prst="rect">
             <a:avLst/>
@@ -9090,7 +9103,7 @@
     </p:spTree>
     <p:extLst>
       <p:ext uri="{BB962C8B-B14F-4D97-AF65-F5344CB8AC3E}">
-        <p14:creationId xmlns:p14="http://schemas.microsoft.com/office/powerpoint/2010/main" val="3670998062"/>
+        <p14:creationId xmlns:p14="http://schemas.microsoft.com/office/powerpoint/2010/main" val="2150777685"/>
       </p:ext>
     </p:extLst>
   </p:cSld>
@@ -9122,7 +9135,7 @@
           <p:cNvPr id="2" name="Title 1">
             <a:extLst>
               <a:ext uri="{FF2B5EF4-FFF2-40B4-BE49-F238E27FC236}">
-                <a16:creationId xmlns:a16="http://schemas.microsoft.com/office/drawing/2014/main" id="{65F488D5-CF82-4293-8278-D0083D544E72}"/>
+                <a16:creationId xmlns:a16="http://schemas.microsoft.com/office/drawing/2014/main" id="{C5BFB68C-7564-4E23-8DBD-22953A0313B7}"/>
               </a:ext>
             </a:extLst>
           </p:cNvPr>
@@ -9138,7 +9151,10 @@
           <a:bodyPr/>
           <a:lstStyle/>
           <a:p>
-            <a:endParaRPr lang="en-GB"/>
+            <a:r>
+              <a:rPr lang="en-GB" dirty="0"/>
+              <a:t>Getting to 1 million Gophers</a:t>
+            </a:r>
           </a:p>
         </p:txBody>
       </p:sp>
@@ -9147,7 +9163,7 @@
           <p:cNvPr id="3" name="Content Placeholder 2">
             <a:extLst>
               <a:ext uri="{FF2B5EF4-FFF2-40B4-BE49-F238E27FC236}">
-                <a16:creationId xmlns:a16="http://schemas.microsoft.com/office/drawing/2014/main" id="{8AECA827-394C-444E-BE1A-907728F99506}"/>
+                <a16:creationId xmlns:a16="http://schemas.microsoft.com/office/drawing/2014/main" id="{5CD02D51-FB37-407C-99B2-5CD0F489A03C}"/>
               </a:ext>
             </a:extLst>
           </p:cNvPr>
@@ -9172,7 +9188,7 @@
           <p:cNvPr id="4" name="Picture 3">
             <a:extLst>
               <a:ext uri="{FF2B5EF4-FFF2-40B4-BE49-F238E27FC236}">
-                <a16:creationId xmlns:a16="http://schemas.microsoft.com/office/drawing/2014/main" id="{5F3F7BEA-4C1A-486F-89AD-F3A324280B9F}"/>
+                <a16:creationId xmlns:a16="http://schemas.microsoft.com/office/drawing/2014/main" id="{A63CFE87-4439-42F6-8EEE-695421823513}"/>
               </a:ext>
             </a:extLst>
           </p:cNvPr>
@@ -9189,8 +9205,8 @@
         </p:blipFill>
         <p:spPr>
           <a:xfrm>
-            <a:off x="1228045" y="437732"/>
-            <a:ext cx="9735909" cy="5982535"/>
+            <a:off x="1277794" y="1444723"/>
+            <a:ext cx="8141355" cy="5077404"/>
           </a:xfrm>
           <a:prstGeom prst="rect">
             <a:avLst/>
@@ -9200,7 +9216,7 @@
     </p:spTree>
     <p:extLst>
       <p:ext uri="{BB962C8B-B14F-4D97-AF65-F5344CB8AC3E}">
-        <p14:creationId xmlns:p14="http://schemas.microsoft.com/office/powerpoint/2010/main" val="2150777685"/>
+        <p14:creationId xmlns:p14="http://schemas.microsoft.com/office/powerpoint/2010/main" val="156207586"/>
       </p:ext>
     </p:extLst>
   </p:cSld>
@@ -9232,7 +9248,7 @@
           <p:cNvPr id="2" name="Title 1">
             <a:extLst>
               <a:ext uri="{FF2B5EF4-FFF2-40B4-BE49-F238E27FC236}">
-                <a16:creationId xmlns:a16="http://schemas.microsoft.com/office/drawing/2014/main" id="{330D663D-0CCC-4FD2-BBF5-2A678F632B5A}"/>
+                <a16:creationId xmlns:a16="http://schemas.microsoft.com/office/drawing/2014/main" id="{B28B1B21-C9ED-4BEB-9BF9-FCC6429558A2}"/>
               </a:ext>
             </a:extLst>
           </p:cNvPr>
@@ -9250,7 +9266,7 @@
           <a:p>
             <a:r>
               <a:rPr lang="en-GB" dirty="0"/>
-              <a:t>Short Background</a:t>
+              <a:t>Plan for the next ‘x’ minutes</a:t>
             </a:r>
           </a:p>
         </p:txBody>
@@ -9260,7 +9276,7 @@
           <p:cNvPr id="3" name="Content Placeholder 2">
             <a:extLst>
               <a:ext uri="{FF2B5EF4-FFF2-40B4-BE49-F238E27FC236}">
-                <a16:creationId xmlns:a16="http://schemas.microsoft.com/office/drawing/2014/main" id="{EC4E1DC8-B69C-4E53-96C2-E90EF0520051}"/>
+                <a16:creationId xmlns:a16="http://schemas.microsoft.com/office/drawing/2014/main" id="{BFEEA1E6-BC10-414E-A147-7431DFDA4A06}"/>
               </a:ext>
             </a:extLst>
           </p:cNvPr>
@@ -9278,35 +9294,25 @@
           <a:p>
             <a:r>
               <a:rPr lang="en-GB" dirty="0"/>
-              <a:t>Discovered Go in September 2018 at the pre-drinks before </a:t>
-            </a:r>
-            <a:r>
-              <a:rPr lang="en-GB" dirty="0" err="1"/>
-              <a:t>GopherCon</a:t>
-            </a:r>
-            <a:r>
-              <a:rPr lang="en-GB" dirty="0"/>
-              <a:t> London. </a:t>
-            </a:r>
-          </a:p>
-          <a:p>
-            <a:r>
-              <a:rPr lang="en-GB" dirty="0"/>
-              <a:t>Been to each London Go </a:t>
-            </a:r>
-            <a:r>
-              <a:rPr lang="en-GB" dirty="0" err="1"/>
-              <a:t>MeetUp</a:t>
-            </a:r>
-            <a:r>
-              <a:rPr lang="en-GB" dirty="0"/>
-              <a:t> since.</a:t>
-            </a:r>
-          </a:p>
-          <a:p>
-            <a:r>
-              <a:rPr lang="en-GB" dirty="0"/>
-              <a:t>Have a Background in Java and C#.</a:t>
+              <a:t>Talk about my experience with my first small go project. </a:t>
+            </a:r>
+          </a:p>
+          <a:p>
+            <a:endParaRPr lang="en-GB" dirty="0"/>
+          </a:p>
+          <a:p>
+            <a:r>
+              <a:rPr lang="en-GB" dirty="0"/>
+              <a:t>Create a list of things I’ve learnt and mistakes I encountered. </a:t>
+            </a:r>
+          </a:p>
+          <a:p>
+            <a:endParaRPr lang="en-GB" dirty="0"/>
+          </a:p>
+          <a:p>
+            <a:r>
+              <a:rPr lang="en-GB" dirty="0"/>
+              <a:t>Showcase the thoughts of a developer when starting to learn a new language. </a:t>
             </a:r>
           </a:p>
         </p:txBody>
@@ -9314,7 +9320,7 @@
     </p:spTree>
     <p:extLst>
       <p:ext uri="{BB962C8B-B14F-4D97-AF65-F5344CB8AC3E}">
-        <p14:creationId xmlns:p14="http://schemas.microsoft.com/office/powerpoint/2010/main" val="3147919256"/>
+        <p14:creationId xmlns:p14="http://schemas.microsoft.com/office/powerpoint/2010/main" val="340441809"/>
       </p:ext>
     </p:extLst>
   </p:cSld>
@@ -9362,116 +9368,6 @@
           <a:bodyPr/>
           <a:lstStyle/>
           <a:p>
-            <a:endParaRPr lang="en-GB"/>
-          </a:p>
-        </p:txBody>
-      </p:sp>
-      <p:sp>
-        <p:nvSpPr>
-          <p:cNvPr id="3" name="Content Placeholder 2">
-            <a:extLst>
-              <a:ext uri="{FF2B5EF4-FFF2-40B4-BE49-F238E27FC236}">
-                <a16:creationId xmlns:a16="http://schemas.microsoft.com/office/drawing/2014/main" id="{5CD02D51-FB37-407C-99B2-5CD0F489A03C}"/>
-              </a:ext>
-            </a:extLst>
-          </p:cNvPr>
-          <p:cNvSpPr>
-            <a:spLocks noGrp="1"/>
-          </p:cNvSpPr>
-          <p:nvPr>
-            <p:ph idx="1"/>
-          </p:nvPr>
-        </p:nvSpPr>
-        <p:spPr/>
-        <p:txBody>
-          <a:bodyPr/>
-          <a:lstStyle/>
-          <a:p>
-            <a:endParaRPr lang="en-GB"/>
-          </a:p>
-        </p:txBody>
-      </p:sp>
-      <p:pic>
-        <p:nvPicPr>
-          <p:cNvPr id="4" name="Picture 3">
-            <a:extLst>
-              <a:ext uri="{FF2B5EF4-FFF2-40B4-BE49-F238E27FC236}">
-                <a16:creationId xmlns:a16="http://schemas.microsoft.com/office/drawing/2014/main" id="{A63CFE87-4439-42F6-8EEE-695421823513}"/>
-              </a:ext>
-            </a:extLst>
-          </p:cNvPr>
-          <p:cNvPicPr>
-            <a:picLocks noChangeAspect="1"/>
-          </p:cNvPicPr>
-          <p:nvPr/>
-        </p:nvPicPr>
-        <p:blipFill>
-          <a:blip r:embed="rId2"/>
-          <a:stretch>
-            <a:fillRect/>
-          </a:stretch>
-        </p:blipFill>
-        <p:spPr>
-          <a:xfrm>
-            <a:off x="1103312" y="452718"/>
-            <a:ext cx="9745435" cy="6077798"/>
-          </a:xfrm>
-          <a:prstGeom prst="rect">
-            <a:avLst/>
-          </a:prstGeom>
-        </p:spPr>
-      </p:pic>
-    </p:spTree>
-    <p:extLst>
-      <p:ext uri="{BB962C8B-B14F-4D97-AF65-F5344CB8AC3E}">
-        <p14:creationId xmlns:p14="http://schemas.microsoft.com/office/powerpoint/2010/main" val="156207586"/>
-      </p:ext>
-    </p:extLst>
-  </p:cSld>
-  <p:clrMapOvr>
-    <a:masterClrMapping/>
-  </p:clrMapOvr>
-</p:sld>
-</file>
-
-<file path=ppt/slides/slide31.xml><?xml version="1.0" encoding="utf-8"?>
-<p:sld xmlns:a="http://schemas.openxmlformats.org/drawingml/2006/main" xmlns:r="http://schemas.openxmlformats.org/officeDocument/2006/relationships" xmlns:p="http://schemas.openxmlformats.org/presentationml/2006/main">
-  <p:cSld>
-    <p:spTree>
-      <p:nvGrpSpPr>
-        <p:cNvPr id="1" name=""/>
-        <p:cNvGrpSpPr/>
-        <p:nvPr/>
-      </p:nvGrpSpPr>
-      <p:grpSpPr>
-        <a:xfrm>
-          <a:off x="0" y="0"/>
-          <a:ext cx="0" cy="0"/>
-          <a:chOff x="0" y="0"/>
-          <a:chExt cx="0" cy="0"/>
-        </a:xfrm>
-      </p:grpSpPr>
-      <p:sp>
-        <p:nvSpPr>
-          <p:cNvPr id="2" name="Title 1">
-            <a:extLst>
-              <a:ext uri="{FF2B5EF4-FFF2-40B4-BE49-F238E27FC236}">
-                <a16:creationId xmlns:a16="http://schemas.microsoft.com/office/drawing/2014/main" id="{C5BFB68C-7564-4E23-8DBD-22953A0313B7}"/>
-              </a:ext>
-            </a:extLst>
-          </p:cNvPr>
-          <p:cNvSpPr>
-            <a:spLocks noGrp="1"/>
-          </p:cNvSpPr>
-          <p:nvPr>
-            <p:ph type="title"/>
-          </p:nvPr>
-        </p:nvSpPr>
-        <p:spPr/>
-        <p:txBody>
-          <a:bodyPr/>
-          <a:lstStyle/>
-          <a:p>
             <a:r>
               <a:rPr lang="en-GB" dirty="0"/>
               <a:t>After a few optimisations</a:t>
@@ -9517,7 +9413,7 @@
 </p:sld>
 </file>
 
-<file path=ppt/slides/slide32.xml><?xml version="1.0" encoding="utf-8"?>
+<file path=ppt/slides/slide31.xml><?xml version="1.0" encoding="utf-8"?>
 <p:sld xmlns:a="http://schemas.openxmlformats.org/drawingml/2006/main" xmlns:r="http://schemas.openxmlformats.org/officeDocument/2006/relationships" xmlns:p="http://schemas.openxmlformats.org/presentationml/2006/main">
   <p:cSld>
     <p:spTree>
@@ -9627,6 +9523,86 @@
 </p:sld>
 </file>
 
+<file path=ppt/slides/slide32.xml><?xml version="1.0" encoding="utf-8"?>
+<p:sld xmlns:a="http://schemas.openxmlformats.org/drawingml/2006/main" xmlns:r="http://schemas.openxmlformats.org/officeDocument/2006/relationships" xmlns:p="http://schemas.openxmlformats.org/presentationml/2006/main">
+  <p:cSld>
+    <p:spTree>
+      <p:nvGrpSpPr>
+        <p:cNvPr id="1" name=""/>
+        <p:cNvGrpSpPr/>
+        <p:nvPr/>
+      </p:nvGrpSpPr>
+      <p:grpSpPr>
+        <a:xfrm>
+          <a:off x="0" y="0"/>
+          <a:ext cx="0" cy="0"/>
+          <a:chOff x="0" y="0"/>
+          <a:chExt cx="0" cy="0"/>
+        </a:xfrm>
+      </p:grpSpPr>
+      <p:sp>
+        <p:nvSpPr>
+          <p:cNvPr id="2" name="Title 1">
+            <a:extLst>
+              <a:ext uri="{FF2B5EF4-FFF2-40B4-BE49-F238E27FC236}">
+                <a16:creationId xmlns:a16="http://schemas.microsoft.com/office/drawing/2014/main" id="{C5BFB68C-7564-4E23-8DBD-22953A0313B7}"/>
+              </a:ext>
+            </a:extLst>
+          </p:cNvPr>
+          <p:cNvSpPr>
+            <a:spLocks noGrp="1"/>
+          </p:cNvSpPr>
+          <p:nvPr>
+            <p:ph type="title"/>
+          </p:nvPr>
+        </p:nvSpPr>
+        <p:spPr/>
+        <p:txBody>
+          <a:bodyPr/>
+          <a:lstStyle/>
+          <a:p>
+            <a:endParaRPr lang="en-GB"/>
+          </a:p>
+        </p:txBody>
+      </p:sp>
+      <p:sp>
+        <p:nvSpPr>
+          <p:cNvPr id="3" name="Content Placeholder 2">
+            <a:extLst>
+              <a:ext uri="{FF2B5EF4-FFF2-40B4-BE49-F238E27FC236}">
+                <a16:creationId xmlns:a16="http://schemas.microsoft.com/office/drawing/2014/main" id="{5CD02D51-FB37-407C-99B2-5CD0F489A03C}"/>
+              </a:ext>
+            </a:extLst>
+          </p:cNvPr>
+          <p:cNvSpPr>
+            <a:spLocks noGrp="1"/>
+          </p:cNvSpPr>
+          <p:nvPr>
+            <p:ph idx="1"/>
+          </p:nvPr>
+        </p:nvSpPr>
+        <p:spPr/>
+        <p:txBody>
+          <a:bodyPr/>
+          <a:lstStyle/>
+          <a:p>
+            <a:endParaRPr lang="en-GB"/>
+          </a:p>
+        </p:txBody>
+      </p:sp>
+    </p:spTree>
+    <p:extLst>
+      <p:ext uri="{BB962C8B-B14F-4D97-AF65-F5344CB8AC3E}">
+        <p14:creationId xmlns:p14="http://schemas.microsoft.com/office/powerpoint/2010/main" val="4076716880"/>
+      </p:ext>
+    </p:extLst>
+  </p:cSld>
+  <p:clrMapOvr>
+    <a:masterClrMapping/>
+  </p:clrMapOvr>
+</p:sld>
+</file>
+
 <file path=ppt/slides/slide33.xml><?xml version="1.0" encoding="utf-8"?>
 <p:sld xmlns:a="http://schemas.openxmlformats.org/drawingml/2006/main" xmlns:r="http://schemas.openxmlformats.org/officeDocument/2006/relationships" xmlns:p="http://schemas.openxmlformats.org/presentationml/2006/main">
   <p:cSld>
@@ -9649,7 +9625,7 @@
           <p:cNvPr id="2" name="Title 1">
             <a:extLst>
               <a:ext uri="{FF2B5EF4-FFF2-40B4-BE49-F238E27FC236}">
-                <a16:creationId xmlns:a16="http://schemas.microsoft.com/office/drawing/2014/main" id="{C5BFB68C-7564-4E23-8DBD-22953A0313B7}"/>
+                <a16:creationId xmlns:a16="http://schemas.microsoft.com/office/drawing/2014/main" id="{B35498C6-960E-4458-8130-6765F4CA74F7}"/>
               </a:ext>
             </a:extLst>
           </p:cNvPr>
@@ -9665,7 +9641,10 @@
           <a:bodyPr/>
           <a:lstStyle/>
           <a:p>
-            <a:endParaRPr lang="en-GB"/>
+            <a:r>
+              <a:rPr lang="en-GB" dirty="0"/>
+              <a:t>	Progress Checklist	</a:t>
+            </a:r>
           </a:p>
         </p:txBody>
       </p:sp>
@@ -9674,7 +9653,7 @@
           <p:cNvPr id="3" name="Content Placeholder 2">
             <a:extLst>
               <a:ext uri="{FF2B5EF4-FFF2-40B4-BE49-F238E27FC236}">
-                <a16:creationId xmlns:a16="http://schemas.microsoft.com/office/drawing/2014/main" id="{5CD02D51-FB37-407C-99B2-5CD0F489A03C}"/>
+                <a16:creationId xmlns:a16="http://schemas.microsoft.com/office/drawing/2014/main" id="{03803CF5-7407-403C-AA75-7FD98A1144C0}"/>
               </a:ext>
             </a:extLst>
           </p:cNvPr>
@@ -9690,14 +9669,26 @@
           <a:bodyPr/>
           <a:lstStyle/>
           <a:p>
-            <a:endParaRPr lang="en-GB"/>
+            <a:r>
+              <a:rPr lang="en-GB" dirty="0"/>
+              <a:t>Introduction to using go benchmark and go race. </a:t>
+            </a:r>
+          </a:p>
+          <a:p>
+            <a:endParaRPr lang="en-GB" dirty="0"/>
+          </a:p>
+          <a:p>
+            <a:r>
+              <a:rPr lang="en-GB" dirty="0"/>
+              <a:t>Increased knowledge of different ways to optimize searching problems. </a:t>
+            </a:r>
           </a:p>
         </p:txBody>
       </p:sp>
     </p:spTree>
     <p:extLst>
       <p:ext uri="{BB962C8B-B14F-4D97-AF65-F5344CB8AC3E}">
-        <p14:creationId xmlns:p14="http://schemas.microsoft.com/office/powerpoint/2010/main" val="4076716880"/>
+        <p14:creationId xmlns:p14="http://schemas.microsoft.com/office/powerpoint/2010/main" val="3598754192"/>
       </p:ext>
     </p:extLst>
   </p:cSld>
@@ -9729,7 +9720,7 @@
           <p:cNvPr id="2" name="Title 1">
             <a:extLst>
               <a:ext uri="{FF2B5EF4-FFF2-40B4-BE49-F238E27FC236}">
-                <a16:creationId xmlns:a16="http://schemas.microsoft.com/office/drawing/2014/main" id="{B35498C6-960E-4458-8130-6765F4CA74F7}"/>
+                <a16:creationId xmlns:a16="http://schemas.microsoft.com/office/drawing/2014/main" id="{13A895C3-4AA3-4DF4-9348-F010A665C356}"/>
               </a:ext>
             </a:extLst>
           </p:cNvPr>
@@ -9745,10 +9736,7 @@
           <a:bodyPr/>
           <a:lstStyle/>
           <a:p>
-            <a:r>
-              <a:rPr lang="en-GB" dirty="0"/>
-              <a:t>	Progress Checklist	</a:t>
-            </a:r>
+            <a:endParaRPr lang="en-GB" dirty="0"/>
           </a:p>
         </p:txBody>
       </p:sp>
@@ -9757,7 +9745,7 @@
           <p:cNvPr id="3" name="Content Placeholder 2">
             <a:extLst>
               <a:ext uri="{FF2B5EF4-FFF2-40B4-BE49-F238E27FC236}">
-                <a16:creationId xmlns:a16="http://schemas.microsoft.com/office/drawing/2014/main" id="{03803CF5-7407-403C-AA75-7FD98A1144C0}"/>
+                <a16:creationId xmlns:a16="http://schemas.microsoft.com/office/drawing/2014/main" id="{ABB9FD90-D046-487F-ACA7-C1C377ED3A6F}"/>
               </a:ext>
             </a:extLst>
           </p:cNvPr>
@@ -9773,26 +9761,14 @@
           <a:bodyPr/>
           <a:lstStyle/>
           <a:p>
-            <a:r>
-              <a:rPr lang="en-GB" dirty="0"/>
-              <a:t>Introduction to using go benchmark and go race. </a:t>
-            </a:r>
-          </a:p>
-          <a:p>
-            <a:endParaRPr lang="en-GB" dirty="0"/>
-          </a:p>
-          <a:p>
-            <a:r>
-              <a:rPr lang="en-GB" dirty="0"/>
-              <a:t>Increased knowledge of different ways to optimize searching problems. </a:t>
-            </a:r>
+            <a:endParaRPr lang="en-GB"/>
           </a:p>
         </p:txBody>
       </p:sp>
     </p:spTree>
     <p:extLst>
       <p:ext uri="{BB962C8B-B14F-4D97-AF65-F5344CB8AC3E}">
-        <p14:creationId xmlns:p14="http://schemas.microsoft.com/office/powerpoint/2010/main" val="3598754192"/>
+        <p14:creationId xmlns:p14="http://schemas.microsoft.com/office/powerpoint/2010/main" val="3172546742"/>
       </p:ext>
     </p:extLst>
   </p:cSld>
@@ -9824,7 +9800,7 @@
           <p:cNvPr id="2" name="Title 1">
             <a:extLst>
               <a:ext uri="{FF2B5EF4-FFF2-40B4-BE49-F238E27FC236}">
-                <a16:creationId xmlns:a16="http://schemas.microsoft.com/office/drawing/2014/main" id="{13A895C3-4AA3-4DF4-9348-F010A665C356}"/>
+                <a16:creationId xmlns:a16="http://schemas.microsoft.com/office/drawing/2014/main" id="{5F649051-170D-4D88-A1EB-CD53B67517C2}"/>
               </a:ext>
             </a:extLst>
           </p:cNvPr>
@@ -9840,7 +9816,10 @@
           <a:bodyPr/>
           <a:lstStyle/>
           <a:p>
-            <a:endParaRPr lang="en-GB" dirty="0"/>
+            <a:r>
+              <a:rPr lang="en-GB" dirty="0"/>
+              <a:t>Final Showcase</a:t>
+            </a:r>
           </a:p>
         </p:txBody>
       </p:sp>
@@ -9849,7 +9828,7 @@
           <p:cNvPr id="3" name="Content Placeholder 2">
             <a:extLst>
               <a:ext uri="{FF2B5EF4-FFF2-40B4-BE49-F238E27FC236}">
-                <a16:creationId xmlns:a16="http://schemas.microsoft.com/office/drawing/2014/main" id="{ABB9FD90-D046-487F-ACA7-C1C377ED3A6F}"/>
+                <a16:creationId xmlns:a16="http://schemas.microsoft.com/office/drawing/2014/main" id="{E28FB5CC-2E35-4352-B03D-454660443443}"/>
               </a:ext>
             </a:extLst>
           </p:cNvPr>
@@ -9872,7 +9851,7 @@
     </p:spTree>
     <p:extLst>
       <p:ext uri="{BB962C8B-B14F-4D97-AF65-F5344CB8AC3E}">
-        <p14:creationId xmlns:p14="http://schemas.microsoft.com/office/powerpoint/2010/main" val="3172546742"/>
+        <p14:creationId xmlns:p14="http://schemas.microsoft.com/office/powerpoint/2010/main" val="2232509740"/>
       </p:ext>
     </p:extLst>
   </p:cSld>
@@ -9904,7 +9883,7 @@
           <p:cNvPr id="2" name="Title 1">
             <a:extLst>
               <a:ext uri="{FF2B5EF4-FFF2-40B4-BE49-F238E27FC236}">
-                <a16:creationId xmlns:a16="http://schemas.microsoft.com/office/drawing/2014/main" id="{5F649051-170D-4D88-A1EB-CD53B67517C2}"/>
+                <a16:creationId xmlns:a16="http://schemas.microsoft.com/office/drawing/2014/main" id="{6CDC4756-BE7A-4B78-81FE-29031289A2AD}"/>
               </a:ext>
             </a:extLst>
           </p:cNvPr>
@@ -9922,7 +9901,7 @@
           <a:p>
             <a:r>
               <a:rPr lang="en-GB" dirty="0"/>
-              <a:t>Final Showcase</a:t>
+              <a:t>Final Checklist </a:t>
             </a:r>
           </a:p>
         </p:txBody>
@@ -9932,7 +9911,7 @@
           <p:cNvPr id="3" name="Content Placeholder 2">
             <a:extLst>
               <a:ext uri="{FF2B5EF4-FFF2-40B4-BE49-F238E27FC236}">
-                <a16:creationId xmlns:a16="http://schemas.microsoft.com/office/drawing/2014/main" id="{E28FB5CC-2E35-4352-B03D-454660443443}"/>
+                <a16:creationId xmlns:a16="http://schemas.microsoft.com/office/drawing/2014/main" id="{07D7EF34-638C-4C71-99D1-10742B4D9377}"/>
               </a:ext>
             </a:extLst>
           </p:cNvPr>
@@ -9955,7 +9934,7 @@
     </p:spTree>
     <p:extLst>
       <p:ext uri="{BB962C8B-B14F-4D97-AF65-F5344CB8AC3E}">
-        <p14:creationId xmlns:p14="http://schemas.microsoft.com/office/powerpoint/2010/main" val="2232509740"/>
+        <p14:creationId xmlns:p14="http://schemas.microsoft.com/office/powerpoint/2010/main" val="2595392705"/>
       </p:ext>
     </p:extLst>
   </p:cSld>
@@ -9987,7 +9966,7 @@
           <p:cNvPr id="2" name="Title 1">
             <a:extLst>
               <a:ext uri="{FF2B5EF4-FFF2-40B4-BE49-F238E27FC236}">
-                <a16:creationId xmlns:a16="http://schemas.microsoft.com/office/drawing/2014/main" id="{6CDC4756-BE7A-4B78-81FE-29031289A2AD}"/>
+                <a16:creationId xmlns:a16="http://schemas.microsoft.com/office/drawing/2014/main" id="{C6A1F8BE-8B71-4987-BE2C-B485EE46CDB8}"/>
               </a:ext>
             </a:extLst>
           </p:cNvPr>
@@ -10005,7 +9984,7 @@
           <a:p>
             <a:r>
               <a:rPr lang="en-GB" dirty="0"/>
-              <a:t>Final Checklist </a:t>
+              <a:t>Conclusion</a:t>
             </a:r>
           </a:p>
         </p:txBody>
@@ -10015,7 +9994,7 @@
           <p:cNvPr id="3" name="Content Placeholder 2">
             <a:extLst>
               <a:ext uri="{FF2B5EF4-FFF2-40B4-BE49-F238E27FC236}">
-                <a16:creationId xmlns:a16="http://schemas.microsoft.com/office/drawing/2014/main" id="{07D7EF34-638C-4C71-99D1-10742B4D9377}"/>
+                <a16:creationId xmlns:a16="http://schemas.microsoft.com/office/drawing/2014/main" id="{C6489CD9-246E-4EF9-8A1F-DF0D212B8A29}"/>
               </a:ext>
             </a:extLst>
           </p:cNvPr>
@@ -10038,7 +10017,7 @@
     </p:spTree>
     <p:extLst>
       <p:ext uri="{BB962C8B-B14F-4D97-AF65-F5344CB8AC3E}">
-        <p14:creationId xmlns:p14="http://schemas.microsoft.com/office/powerpoint/2010/main" val="2595392705"/>
+        <p14:creationId xmlns:p14="http://schemas.microsoft.com/office/powerpoint/2010/main" val="2651521754"/>
       </p:ext>
     </p:extLst>
   </p:cSld>
@@ -10070,7 +10049,7 @@
           <p:cNvPr id="2" name="Title 1">
             <a:extLst>
               <a:ext uri="{FF2B5EF4-FFF2-40B4-BE49-F238E27FC236}">
-                <a16:creationId xmlns:a16="http://schemas.microsoft.com/office/drawing/2014/main" id="{C6A1F8BE-8B71-4987-BE2C-B485EE46CDB8}"/>
+                <a16:creationId xmlns:a16="http://schemas.microsoft.com/office/drawing/2014/main" id="{DDA23A98-14C6-40E0-A90C-6468725EFA2C}"/>
               </a:ext>
             </a:extLst>
           </p:cNvPr>
@@ -10088,7 +10067,7 @@
           <a:p>
             <a:r>
               <a:rPr lang="en-GB" dirty="0"/>
-              <a:t>Conclusion</a:t>
+              <a:t>Perseverance</a:t>
             </a:r>
           </a:p>
         </p:txBody>
@@ -10098,7 +10077,7 @@
           <p:cNvPr id="3" name="Content Placeholder 2">
             <a:extLst>
               <a:ext uri="{FF2B5EF4-FFF2-40B4-BE49-F238E27FC236}">
-                <a16:creationId xmlns:a16="http://schemas.microsoft.com/office/drawing/2014/main" id="{C6489CD9-246E-4EF9-8A1F-DF0D212B8A29}"/>
+                <a16:creationId xmlns:a16="http://schemas.microsoft.com/office/drawing/2014/main" id="{B7866C6F-7AB4-4FF2-AC93-597F73926565}"/>
               </a:ext>
             </a:extLst>
           </p:cNvPr>
@@ -10114,14 +10093,23 @@
           <a:bodyPr/>
           <a:lstStyle/>
           <a:p>
-            <a:endParaRPr lang="en-GB"/>
+            <a:r>
+              <a:rPr lang="en-GB" dirty="0"/>
+              <a:t>Talking about your project with other developers </a:t>
+            </a:r>
+          </a:p>
+          <a:p>
+            <a:r>
+              <a:rPr lang="en-GB" dirty="0"/>
+              <a:t>Getting help</a:t>
+            </a:r>
           </a:p>
         </p:txBody>
       </p:sp>
     </p:spTree>
     <p:extLst>
       <p:ext uri="{BB962C8B-B14F-4D97-AF65-F5344CB8AC3E}">
-        <p14:creationId xmlns:p14="http://schemas.microsoft.com/office/powerpoint/2010/main" val="2651521754"/>
+        <p14:creationId xmlns:p14="http://schemas.microsoft.com/office/powerpoint/2010/main" val="847199732"/>
       </p:ext>
     </p:extLst>
   </p:cSld>
@@ -10153,7 +10141,7 @@
           <p:cNvPr id="2" name="Title 1">
             <a:extLst>
               <a:ext uri="{FF2B5EF4-FFF2-40B4-BE49-F238E27FC236}">
-                <a16:creationId xmlns:a16="http://schemas.microsoft.com/office/drawing/2014/main" id="{DDA23A98-14C6-40E0-A90C-6468725EFA2C}"/>
+                <a16:creationId xmlns:a16="http://schemas.microsoft.com/office/drawing/2014/main" id="{CFF32C6C-3D00-4977-9425-46509C1A3129}"/>
               </a:ext>
             </a:extLst>
           </p:cNvPr>
@@ -10171,7 +10159,7 @@
           <a:p>
             <a:r>
               <a:rPr lang="en-GB" dirty="0"/>
-              <a:t>Perseverance</a:t>
+              <a:t>Go – Starter Pack</a:t>
             </a:r>
           </a:p>
         </p:txBody>
@@ -10181,7 +10169,7 @@
           <p:cNvPr id="3" name="Content Placeholder 2">
             <a:extLst>
               <a:ext uri="{FF2B5EF4-FFF2-40B4-BE49-F238E27FC236}">
-                <a16:creationId xmlns:a16="http://schemas.microsoft.com/office/drawing/2014/main" id="{B7866C6F-7AB4-4FF2-AC93-597F73926565}"/>
+                <a16:creationId xmlns:a16="http://schemas.microsoft.com/office/drawing/2014/main" id="{3B81F4FB-26EB-4DA4-9507-E147BFC741B8}"/>
               </a:ext>
             </a:extLst>
           </p:cNvPr>
@@ -10199,21 +10187,24 @@
           <a:p>
             <a:r>
               <a:rPr lang="en-GB" dirty="0"/>
-              <a:t>Talking about your project with other developers </a:t>
-            </a:r>
-          </a:p>
-          <a:p>
-            <a:r>
-              <a:rPr lang="en-GB" dirty="0"/>
-              <a:t>Getting help</a:t>
-            </a:r>
+              <a:t>Installing GO. </a:t>
+            </a:r>
+          </a:p>
+          <a:p>
+            <a:r>
+              <a:rPr lang="en-GB" dirty="0"/>
+              <a:t>Learning the syntax</a:t>
+            </a:r>
+          </a:p>
+          <a:p>
+            <a:endParaRPr lang="en-GB" dirty="0"/>
           </a:p>
         </p:txBody>
       </p:sp>
     </p:spTree>
     <p:extLst>
       <p:ext uri="{BB962C8B-B14F-4D97-AF65-F5344CB8AC3E}">
-        <p14:creationId xmlns:p14="http://schemas.microsoft.com/office/powerpoint/2010/main" val="847199732"/>
+        <p14:creationId xmlns:p14="http://schemas.microsoft.com/office/powerpoint/2010/main" val="1566399315"/>
       </p:ext>
     </p:extLst>
   </p:cSld>
@@ -10245,872 +10236,6 @@
           <p:cNvPr id="2" name="Title 1">
             <a:extLst>
               <a:ext uri="{FF2B5EF4-FFF2-40B4-BE49-F238E27FC236}">
-                <a16:creationId xmlns:a16="http://schemas.microsoft.com/office/drawing/2014/main" id="{B28B1B21-C9ED-4BEB-9BF9-FCC6429558A2}"/>
-              </a:ext>
-            </a:extLst>
-          </p:cNvPr>
-          <p:cNvSpPr>
-            <a:spLocks noGrp="1"/>
-          </p:cNvSpPr>
-          <p:nvPr>
-            <p:ph type="title"/>
-          </p:nvPr>
-        </p:nvSpPr>
-        <p:spPr/>
-        <p:txBody>
-          <a:bodyPr/>
-          <a:lstStyle/>
-          <a:p>
-            <a:r>
-              <a:rPr lang="en-GB" dirty="0"/>
-              <a:t>Plan for the next 9 minutes</a:t>
-            </a:r>
-          </a:p>
-        </p:txBody>
-      </p:sp>
-      <p:sp>
-        <p:nvSpPr>
-          <p:cNvPr id="3" name="Content Placeholder 2">
-            <a:extLst>
-              <a:ext uri="{FF2B5EF4-FFF2-40B4-BE49-F238E27FC236}">
-                <a16:creationId xmlns:a16="http://schemas.microsoft.com/office/drawing/2014/main" id="{BFEEA1E6-BC10-414E-A147-7431DFDA4A06}"/>
-              </a:ext>
-            </a:extLst>
-          </p:cNvPr>
-          <p:cNvSpPr>
-            <a:spLocks noGrp="1"/>
-          </p:cNvSpPr>
-          <p:nvPr>
-            <p:ph idx="1"/>
-          </p:nvPr>
-        </p:nvSpPr>
-        <p:spPr/>
-        <p:txBody>
-          <a:bodyPr/>
-          <a:lstStyle/>
-          <a:p>
-            <a:r>
-              <a:rPr lang="en-GB" dirty="0"/>
-              <a:t>Talk about a small starter project I’m working on and keep a checklist of different skills or ideas I bumped into along the way. </a:t>
-            </a:r>
-          </a:p>
-        </p:txBody>
-      </p:sp>
-    </p:spTree>
-    <p:extLst>
-      <p:ext uri="{BB962C8B-B14F-4D97-AF65-F5344CB8AC3E}">
-        <p14:creationId xmlns:p14="http://schemas.microsoft.com/office/powerpoint/2010/main" val="340441809"/>
-      </p:ext>
-    </p:extLst>
-  </p:cSld>
-  <p:clrMapOvr>
-    <a:masterClrMapping/>
-  </p:clrMapOvr>
-</p:sld>
-</file>
-
-<file path=ppt/slides/slide40.xml><?xml version="1.0" encoding="utf-8"?>
-<p:sld xmlns:a="http://schemas.openxmlformats.org/drawingml/2006/main" xmlns:r="http://schemas.openxmlformats.org/officeDocument/2006/relationships" xmlns:p="http://schemas.openxmlformats.org/presentationml/2006/main">
-  <p:cSld>
-    <p:spTree>
-      <p:nvGrpSpPr>
-        <p:cNvPr id="1" name=""/>
-        <p:cNvGrpSpPr/>
-        <p:nvPr/>
-      </p:nvGrpSpPr>
-      <p:grpSpPr>
-        <a:xfrm>
-          <a:off x="0" y="0"/>
-          <a:ext cx="0" cy="0"/>
-          <a:chOff x="0" y="0"/>
-          <a:chExt cx="0" cy="0"/>
-        </a:xfrm>
-      </p:grpSpPr>
-      <p:sp>
-        <p:nvSpPr>
-          <p:cNvPr id="2" name="Title 1">
-            <a:extLst>
-              <a:ext uri="{FF2B5EF4-FFF2-40B4-BE49-F238E27FC236}">
-                <a16:creationId xmlns:a16="http://schemas.microsoft.com/office/drawing/2014/main" id="{CFF32C6C-3D00-4977-9425-46509C1A3129}"/>
-              </a:ext>
-            </a:extLst>
-          </p:cNvPr>
-          <p:cNvSpPr>
-            <a:spLocks noGrp="1"/>
-          </p:cNvSpPr>
-          <p:nvPr>
-            <p:ph type="title"/>
-          </p:nvPr>
-        </p:nvSpPr>
-        <p:spPr/>
-        <p:txBody>
-          <a:bodyPr/>
-          <a:lstStyle/>
-          <a:p>
-            <a:r>
-              <a:rPr lang="en-GB" dirty="0"/>
-              <a:t>Go – Starter Pack</a:t>
-            </a:r>
-          </a:p>
-        </p:txBody>
-      </p:sp>
-      <p:sp>
-        <p:nvSpPr>
-          <p:cNvPr id="3" name="Content Placeholder 2">
-            <a:extLst>
-              <a:ext uri="{FF2B5EF4-FFF2-40B4-BE49-F238E27FC236}">
-                <a16:creationId xmlns:a16="http://schemas.microsoft.com/office/drawing/2014/main" id="{3B81F4FB-26EB-4DA4-9507-E147BFC741B8}"/>
-              </a:ext>
-            </a:extLst>
-          </p:cNvPr>
-          <p:cNvSpPr>
-            <a:spLocks noGrp="1"/>
-          </p:cNvSpPr>
-          <p:nvPr>
-            <p:ph idx="1"/>
-          </p:nvPr>
-        </p:nvSpPr>
-        <p:spPr/>
-        <p:txBody>
-          <a:bodyPr/>
-          <a:lstStyle/>
-          <a:p>
-            <a:r>
-              <a:rPr lang="en-GB" dirty="0"/>
-              <a:t>Installing GO. </a:t>
-            </a:r>
-          </a:p>
-          <a:p>
-            <a:r>
-              <a:rPr lang="en-GB" dirty="0"/>
-              <a:t>Learning the syntax</a:t>
-            </a:r>
-          </a:p>
-          <a:p>
-            <a:endParaRPr lang="en-GB" dirty="0"/>
-          </a:p>
-        </p:txBody>
-      </p:sp>
-    </p:spTree>
-    <p:extLst>
-      <p:ext uri="{BB962C8B-B14F-4D97-AF65-F5344CB8AC3E}">
-        <p14:creationId xmlns:p14="http://schemas.microsoft.com/office/powerpoint/2010/main" val="1566399315"/>
-      </p:ext>
-    </p:extLst>
-  </p:cSld>
-  <p:clrMapOvr>
-    <a:masterClrMapping/>
-  </p:clrMapOvr>
-</p:sld>
-</file>
-
-<file path=ppt/slides/slide41.xml><?xml version="1.0" encoding="utf-8"?>
-<p:sld xmlns:a="http://schemas.openxmlformats.org/drawingml/2006/main" xmlns:r="http://schemas.openxmlformats.org/officeDocument/2006/relationships" xmlns:p="http://schemas.openxmlformats.org/presentationml/2006/main">
-  <p:cSld>
-    <p:spTree>
-      <p:nvGrpSpPr>
-        <p:cNvPr id="1" name=""/>
-        <p:cNvGrpSpPr/>
-        <p:nvPr/>
-      </p:nvGrpSpPr>
-      <p:grpSpPr>
-        <a:xfrm>
-          <a:off x="0" y="0"/>
-          <a:ext cx="0" cy="0"/>
-          <a:chOff x="0" y="0"/>
-          <a:chExt cx="0" cy="0"/>
-        </a:xfrm>
-      </p:grpSpPr>
-      <p:sp>
-        <p:nvSpPr>
-          <p:cNvPr id="2" name="Title 1">
-            <a:extLst>
-              <a:ext uri="{FF2B5EF4-FFF2-40B4-BE49-F238E27FC236}">
-                <a16:creationId xmlns:a16="http://schemas.microsoft.com/office/drawing/2014/main" id="{F791C732-68FC-4DBF-A925-B9A44335C54F}"/>
-              </a:ext>
-            </a:extLst>
-          </p:cNvPr>
-          <p:cNvSpPr>
-            <a:spLocks noGrp="1"/>
-          </p:cNvSpPr>
-          <p:nvPr>
-            <p:ph type="title"/>
-          </p:nvPr>
-        </p:nvSpPr>
-        <p:spPr/>
-        <p:txBody>
-          <a:bodyPr/>
-          <a:lstStyle/>
-          <a:p>
-            <a:r>
-              <a:rPr lang="en-GB" dirty="0"/>
-              <a:t>Finding A Catalyst</a:t>
-            </a:r>
-          </a:p>
-        </p:txBody>
-      </p:sp>
-      <p:sp>
-        <p:nvSpPr>
-          <p:cNvPr id="3" name="Content Placeholder 2">
-            <a:extLst>
-              <a:ext uri="{FF2B5EF4-FFF2-40B4-BE49-F238E27FC236}">
-                <a16:creationId xmlns:a16="http://schemas.microsoft.com/office/drawing/2014/main" id="{C206744A-0D9B-4231-BD87-CF25D90A8004}"/>
-              </a:ext>
-            </a:extLst>
-          </p:cNvPr>
-          <p:cNvSpPr>
-            <a:spLocks noGrp="1"/>
-          </p:cNvSpPr>
-          <p:nvPr>
-            <p:ph idx="1"/>
-          </p:nvPr>
-        </p:nvSpPr>
-        <p:spPr/>
-        <p:txBody>
-          <a:bodyPr/>
-          <a:lstStyle/>
-          <a:p>
-            <a:endParaRPr lang="en-GB"/>
-          </a:p>
-        </p:txBody>
-      </p:sp>
-    </p:spTree>
-    <p:extLst>
-      <p:ext uri="{BB962C8B-B14F-4D97-AF65-F5344CB8AC3E}">
-        <p14:creationId xmlns:p14="http://schemas.microsoft.com/office/powerpoint/2010/main" val="4016827040"/>
-      </p:ext>
-    </p:extLst>
-  </p:cSld>
-  <p:clrMapOvr>
-    <a:masterClrMapping/>
-  </p:clrMapOvr>
-</p:sld>
-</file>
-
-<file path=ppt/slides/slide42.xml><?xml version="1.0" encoding="utf-8"?>
-<p:sld xmlns:a="http://schemas.openxmlformats.org/drawingml/2006/main" xmlns:r="http://schemas.openxmlformats.org/officeDocument/2006/relationships" xmlns:p="http://schemas.openxmlformats.org/presentationml/2006/main">
-  <p:cSld>
-    <p:spTree>
-      <p:nvGrpSpPr>
-        <p:cNvPr id="1" name=""/>
-        <p:cNvGrpSpPr/>
-        <p:nvPr/>
-      </p:nvGrpSpPr>
-      <p:grpSpPr>
-        <a:xfrm>
-          <a:off x="0" y="0"/>
-          <a:ext cx="0" cy="0"/>
-          <a:chOff x="0" y="0"/>
-          <a:chExt cx="0" cy="0"/>
-        </a:xfrm>
-      </p:grpSpPr>
-      <p:sp>
-        <p:nvSpPr>
-          <p:cNvPr id="2" name="Title 1">
-            <a:extLst>
-              <a:ext uri="{FF2B5EF4-FFF2-40B4-BE49-F238E27FC236}">
-                <a16:creationId xmlns:a16="http://schemas.microsoft.com/office/drawing/2014/main" id="{32F06B3C-EA2D-46B1-AB79-08EFA8CCC0C1}"/>
-              </a:ext>
-            </a:extLst>
-          </p:cNvPr>
-          <p:cNvSpPr>
-            <a:spLocks noGrp="1"/>
-          </p:cNvSpPr>
-          <p:nvPr>
-            <p:ph type="title"/>
-          </p:nvPr>
-        </p:nvSpPr>
-        <p:spPr/>
-        <p:txBody>
-          <a:bodyPr/>
-          <a:lstStyle/>
-          <a:p>
-            <a:r>
-              <a:rPr lang="en-GB" dirty="0"/>
-              <a:t>Managing Scope and Completing Projects</a:t>
-            </a:r>
-          </a:p>
-        </p:txBody>
-      </p:sp>
-      <p:sp>
-        <p:nvSpPr>
-          <p:cNvPr id="3" name="Content Placeholder 2">
-            <a:extLst>
-              <a:ext uri="{FF2B5EF4-FFF2-40B4-BE49-F238E27FC236}">
-                <a16:creationId xmlns:a16="http://schemas.microsoft.com/office/drawing/2014/main" id="{D2524174-1A6E-43AD-AFB4-E3F8B9B5D53A}"/>
-              </a:ext>
-            </a:extLst>
-          </p:cNvPr>
-          <p:cNvSpPr>
-            <a:spLocks noGrp="1"/>
-          </p:cNvSpPr>
-          <p:nvPr>
-            <p:ph idx="1"/>
-          </p:nvPr>
-        </p:nvSpPr>
-        <p:spPr/>
-        <p:txBody>
-          <a:bodyPr/>
-          <a:lstStyle/>
-          <a:p>
-            <a:endParaRPr lang="en-GB"/>
-          </a:p>
-        </p:txBody>
-      </p:sp>
-    </p:spTree>
-    <p:extLst>
-      <p:ext uri="{BB962C8B-B14F-4D97-AF65-F5344CB8AC3E}">
-        <p14:creationId xmlns:p14="http://schemas.microsoft.com/office/powerpoint/2010/main" val="1162966501"/>
-      </p:ext>
-    </p:extLst>
-  </p:cSld>
-  <p:clrMapOvr>
-    <a:masterClrMapping/>
-  </p:clrMapOvr>
-</p:sld>
-</file>
-
-<file path=ppt/slides/slide43.xml><?xml version="1.0" encoding="utf-8"?>
-<p:sld xmlns:a="http://schemas.openxmlformats.org/drawingml/2006/main" xmlns:r="http://schemas.openxmlformats.org/officeDocument/2006/relationships" xmlns:p="http://schemas.openxmlformats.org/presentationml/2006/main">
-  <p:cSld>
-    <p:spTree>
-      <p:nvGrpSpPr>
-        <p:cNvPr id="1" name=""/>
-        <p:cNvGrpSpPr/>
-        <p:nvPr/>
-      </p:nvGrpSpPr>
-      <p:grpSpPr>
-        <a:xfrm>
-          <a:off x="0" y="0"/>
-          <a:ext cx="0" cy="0"/>
-          <a:chOff x="0" y="0"/>
-          <a:chExt cx="0" cy="0"/>
-        </a:xfrm>
-      </p:grpSpPr>
-      <p:sp>
-        <p:nvSpPr>
-          <p:cNvPr id="2" name="Title 1">
-            <a:extLst>
-              <a:ext uri="{FF2B5EF4-FFF2-40B4-BE49-F238E27FC236}">
-                <a16:creationId xmlns:a16="http://schemas.microsoft.com/office/drawing/2014/main" id="{F106CE47-2D88-4386-9645-6FF2058FA701}"/>
-              </a:ext>
-            </a:extLst>
-          </p:cNvPr>
-          <p:cNvSpPr>
-            <a:spLocks noGrp="1"/>
-          </p:cNvSpPr>
-          <p:nvPr>
-            <p:ph type="title"/>
-          </p:nvPr>
-        </p:nvSpPr>
-        <p:spPr/>
-        <p:txBody>
-          <a:bodyPr/>
-          <a:lstStyle/>
-          <a:p>
-            <a:r>
-              <a:rPr lang="en-GB" dirty="0"/>
-              <a:t>Getting past the feeling of pointlessness</a:t>
-            </a:r>
-          </a:p>
-        </p:txBody>
-      </p:sp>
-      <p:sp>
-        <p:nvSpPr>
-          <p:cNvPr id="3" name="Content Placeholder 2">
-            <a:extLst>
-              <a:ext uri="{FF2B5EF4-FFF2-40B4-BE49-F238E27FC236}">
-                <a16:creationId xmlns:a16="http://schemas.microsoft.com/office/drawing/2014/main" id="{3E7E5D08-3BD9-4083-ABF9-3C1E46633F36}"/>
-              </a:ext>
-            </a:extLst>
-          </p:cNvPr>
-          <p:cNvSpPr>
-            <a:spLocks noGrp="1"/>
-          </p:cNvSpPr>
-          <p:nvPr>
-            <p:ph idx="1"/>
-          </p:nvPr>
-        </p:nvSpPr>
-        <p:spPr/>
-        <p:txBody>
-          <a:bodyPr/>
-          <a:lstStyle/>
-          <a:p>
-            <a:r>
-              <a:rPr lang="en-GB" dirty="0"/>
-              <a:t>Finding a Catalyst, to improve motivation</a:t>
-            </a:r>
-          </a:p>
-          <a:p>
-            <a:pPr lvl="1"/>
-            <a:r>
-              <a:rPr lang="en-GB" dirty="0"/>
-              <a:t>Discussing your project with peers</a:t>
-            </a:r>
-          </a:p>
-          <a:p>
-            <a:pPr lvl="1"/>
-            <a:r>
-              <a:rPr lang="en-GB" dirty="0"/>
-              <a:t>Creating an actual deadline</a:t>
-            </a:r>
-          </a:p>
-          <a:p>
-            <a:pPr lvl="1"/>
-            <a:endParaRPr lang="en-GB" dirty="0"/>
-          </a:p>
-        </p:txBody>
-      </p:sp>
-    </p:spTree>
-    <p:extLst>
-      <p:ext uri="{BB962C8B-B14F-4D97-AF65-F5344CB8AC3E}">
-        <p14:creationId xmlns:p14="http://schemas.microsoft.com/office/powerpoint/2010/main" val="1961839492"/>
-      </p:ext>
-    </p:extLst>
-  </p:cSld>
-  <p:clrMapOvr>
-    <a:masterClrMapping/>
-  </p:clrMapOvr>
-</p:sld>
-</file>
-
-<file path=ppt/slides/slide44.xml><?xml version="1.0" encoding="utf-8"?>
-<p:sld xmlns:a="http://schemas.openxmlformats.org/drawingml/2006/main" xmlns:r="http://schemas.openxmlformats.org/officeDocument/2006/relationships" xmlns:p="http://schemas.openxmlformats.org/presentationml/2006/main">
-  <p:cSld>
-    <p:spTree>
-      <p:nvGrpSpPr>
-        <p:cNvPr id="1" name=""/>
-        <p:cNvGrpSpPr/>
-        <p:nvPr/>
-      </p:nvGrpSpPr>
-      <p:grpSpPr>
-        <a:xfrm>
-          <a:off x="0" y="0"/>
-          <a:ext cx="0" cy="0"/>
-          <a:chOff x="0" y="0"/>
-          <a:chExt cx="0" cy="0"/>
-        </a:xfrm>
-      </p:grpSpPr>
-      <p:sp>
-        <p:nvSpPr>
-          <p:cNvPr id="2" name="Title 1">
-            <a:extLst>
-              <a:ext uri="{FF2B5EF4-FFF2-40B4-BE49-F238E27FC236}">
-                <a16:creationId xmlns:a16="http://schemas.microsoft.com/office/drawing/2014/main" id="{8665D156-403C-4612-AA65-B49BA41EDF64}"/>
-              </a:ext>
-            </a:extLst>
-          </p:cNvPr>
-          <p:cNvSpPr>
-            <a:spLocks noGrp="1"/>
-          </p:cNvSpPr>
-          <p:nvPr>
-            <p:ph type="title"/>
-          </p:nvPr>
-        </p:nvSpPr>
-        <p:spPr/>
-        <p:txBody>
-          <a:bodyPr/>
-          <a:lstStyle/>
-          <a:p>
-            <a:r>
-              <a:rPr lang="en-GB" dirty="0"/>
-              <a:t>Insert Here, Example of 5 gophers one alive, 4 dead </a:t>
-            </a:r>
-          </a:p>
-        </p:txBody>
-      </p:sp>
-      <p:sp>
-        <p:nvSpPr>
-          <p:cNvPr id="3" name="Content Placeholder 2">
-            <a:extLst>
-              <a:ext uri="{FF2B5EF4-FFF2-40B4-BE49-F238E27FC236}">
-                <a16:creationId xmlns:a16="http://schemas.microsoft.com/office/drawing/2014/main" id="{8716B298-CF10-4866-85F6-D856E1963894}"/>
-              </a:ext>
-            </a:extLst>
-          </p:cNvPr>
-          <p:cNvSpPr>
-            <a:spLocks noGrp="1"/>
-          </p:cNvSpPr>
-          <p:nvPr>
-            <p:ph idx="1"/>
-          </p:nvPr>
-        </p:nvSpPr>
-        <p:spPr/>
-        <p:txBody>
-          <a:bodyPr/>
-          <a:lstStyle/>
-          <a:p>
-            <a:endParaRPr lang="en-GB"/>
-          </a:p>
-        </p:txBody>
-      </p:sp>
-    </p:spTree>
-    <p:extLst>
-      <p:ext uri="{BB962C8B-B14F-4D97-AF65-F5344CB8AC3E}">
-        <p14:creationId xmlns:p14="http://schemas.microsoft.com/office/powerpoint/2010/main" val="3790213746"/>
-      </p:ext>
-    </p:extLst>
-  </p:cSld>
-  <p:clrMapOvr>
-    <a:masterClrMapping/>
-  </p:clrMapOvr>
-</p:sld>
-</file>
-
-<file path=ppt/slides/slide45.xml><?xml version="1.0" encoding="utf-8"?>
-<p:sld xmlns:a="http://schemas.openxmlformats.org/drawingml/2006/main" xmlns:r="http://schemas.openxmlformats.org/officeDocument/2006/relationships" xmlns:p="http://schemas.openxmlformats.org/presentationml/2006/main">
-  <p:cSld>
-    <p:spTree>
-      <p:nvGrpSpPr>
-        <p:cNvPr id="1" name=""/>
-        <p:cNvGrpSpPr/>
-        <p:nvPr/>
-      </p:nvGrpSpPr>
-      <p:grpSpPr>
-        <a:xfrm>
-          <a:off x="0" y="0"/>
-          <a:ext cx="0" cy="0"/>
-          <a:chOff x="0" y="0"/>
-          <a:chExt cx="0" cy="0"/>
-        </a:xfrm>
-      </p:grpSpPr>
-      <p:sp>
-        <p:nvSpPr>
-          <p:cNvPr id="2" name="Title 1">
-            <a:extLst>
-              <a:ext uri="{FF2B5EF4-FFF2-40B4-BE49-F238E27FC236}">
-                <a16:creationId xmlns:a16="http://schemas.microsoft.com/office/drawing/2014/main" id="{B88F905B-DC9A-4E15-887A-0D816B2DA849}"/>
-              </a:ext>
-            </a:extLst>
-          </p:cNvPr>
-          <p:cNvSpPr>
-            <a:spLocks noGrp="1"/>
-          </p:cNvSpPr>
-          <p:nvPr>
-            <p:ph type="title"/>
-          </p:nvPr>
-        </p:nvSpPr>
-        <p:spPr/>
-        <p:txBody>
-          <a:bodyPr/>
-          <a:lstStyle/>
-          <a:p>
-            <a:r>
-              <a:rPr lang="en-GB" dirty="0"/>
-              <a:t>Checklist</a:t>
-            </a:r>
-          </a:p>
-        </p:txBody>
-      </p:sp>
-      <p:sp>
-        <p:nvSpPr>
-          <p:cNvPr id="3" name="Content Placeholder 2">
-            <a:extLst>
-              <a:ext uri="{FF2B5EF4-FFF2-40B4-BE49-F238E27FC236}">
-                <a16:creationId xmlns:a16="http://schemas.microsoft.com/office/drawing/2014/main" id="{14229407-2ED8-43A8-819B-30DDEB3D38EC}"/>
-              </a:ext>
-            </a:extLst>
-          </p:cNvPr>
-          <p:cNvSpPr>
-            <a:spLocks noGrp="1"/>
-          </p:cNvSpPr>
-          <p:nvPr>
-            <p:ph idx="1"/>
-          </p:nvPr>
-        </p:nvSpPr>
-        <p:spPr/>
-        <p:txBody>
-          <a:bodyPr/>
-          <a:lstStyle/>
-          <a:p>
-            <a:r>
-              <a:rPr lang="en-GB" dirty="0"/>
-              <a:t>Concurrency is not parallelism </a:t>
-            </a:r>
-            <a:r>
-              <a:rPr lang="en-GB" dirty="0">
-                <a:latin typeface="Segoe MDL2 Assets" panose="050A0102010101010101" pitchFamily="18" charset="0"/>
-              </a:rPr>
-              <a:t> </a:t>
-            </a:r>
-          </a:p>
-          <a:p>
-            <a:endParaRPr lang="en-GB" dirty="0"/>
-          </a:p>
-        </p:txBody>
-      </p:sp>
-    </p:spTree>
-    <p:extLst>
-      <p:ext uri="{BB962C8B-B14F-4D97-AF65-F5344CB8AC3E}">
-        <p14:creationId xmlns:p14="http://schemas.microsoft.com/office/powerpoint/2010/main" val="3193971414"/>
-      </p:ext>
-    </p:extLst>
-  </p:cSld>
-  <p:clrMapOvr>
-    <a:masterClrMapping/>
-  </p:clrMapOvr>
-</p:sld>
-</file>
-
-<file path=ppt/slides/slide46.xml><?xml version="1.0" encoding="utf-8"?>
-<p:sld xmlns:a="http://schemas.openxmlformats.org/drawingml/2006/main" xmlns:r="http://schemas.openxmlformats.org/officeDocument/2006/relationships" xmlns:p="http://schemas.openxmlformats.org/presentationml/2006/main">
-  <p:cSld>
-    <p:spTree>
-      <p:nvGrpSpPr>
-        <p:cNvPr id="1" name=""/>
-        <p:cNvGrpSpPr/>
-        <p:nvPr/>
-      </p:nvGrpSpPr>
-      <p:grpSpPr>
-        <a:xfrm>
-          <a:off x="0" y="0"/>
-          <a:ext cx="0" cy="0"/>
-          <a:chOff x="0" y="0"/>
-          <a:chExt cx="0" cy="0"/>
-        </a:xfrm>
-      </p:grpSpPr>
-      <p:sp>
-        <p:nvSpPr>
-          <p:cNvPr id="2" name="Title 1">
-            <a:extLst>
-              <a:ext uri="{FF2B5EF4-FFF2-40B4-BE49-F238E27FC236}">
-                <a16:creationId xmlns:a16="http://schemas.microsoft.com/office/drawing/2014/main" id="{B88F905B-DC9A-4E15-887A-0D816B2DA849}"/>
-              </a:ext>
-            </a:extLst>
-          </p:cNvPr>
-          <p:cNvSpPr>
-            <a:spLocks noGrp="1"/>
-          </p:cNvSpPr>
-          <p:nvPr>
-            <p:ph type="title"/>
-          </p:nvPr>
-        </p:nvSpPr>
-        <p:spPr/>
-        <p:txBody>
-          <a:bodyPr/>
-          <a:lstStyle/>
-          <a:p>
-            <a:r>
-              <a:rPr lang="en-GB" dirty="0"/>
-              <a:t>Checklist of Mistakes</a:t>
-            </a:r>
-          </a:p>
-        </p:txBody>
-      </p:sp>
-      <p:sp>
-        <p:nvSpPr>
-          <p:cNvPr id="3" name="Content Placeholder 2">
-            <a:extLst>
-              <a:ext uri="{FF2B5EF4-FFF2-40B4-BE49-F238E27FC236}">
-                <a16:creationId xmlns:a16="http://schemas.microsoft.com/office/drawing/2014/main" id="{14229407-2ED8-43A8-819B-30DDEB3D38EC}"/>
-              </a:ext>
-            </a:extLst>
-          </p:cNvPr>
-          <p:cNvSpPr>
-            <a:spLocks noGrp="1"/>
-          </p:cNvSpPr>
-          <p:nvPr>
-            <p:ph idx="1"/>
-          </p:nvPr>
-        </p:nvSpPr>
-        <p:spPr/>
-        <p:txBody>
-          <a:bodyPr/>
-          <a:lstStyle/>
-          <a:p>
-            <a:r>
-              <a:rPr lang="en-GB" dirty="0"/>
-              <a:t>Concurrency is not parallelism </a:t>
-            </a:r>
-            <a:r>
-              <a:rPr lang="en-GB" dirty="0">
-                <a:latin typeface="Segoe MDL2 Assets" panose="050A0102010101010101" pitchFamily="18" charset="0"/>
-              </a:rPr>
-              <a:t> </a:t>
-            </a:r>
-          </a:p>
-          <a:p>
-            <a:r>
-              <a:rPr lang="en-GB" dirty="0"/>
-              <a:t>You can read from maps concurrently, but you can not write to maps.</a:t>
-            </a:r>
-          </a:p>
-          <a:p>
-            <a:r>
-              <a:rPr lang="en-GB"/>
-              <a:t>Importance </a:t>
-            </a:r>
-            <a:r>
-              <a:rPr lang="en-GB" dirty="0"/>
-              <a:t>of structure to avoid circular dependencies and for ease of readability </a:t>
-            </a:r>
-            <a:r>
-              <a:rPr lang="en-GB" dirty="0">
-                <a:latin typeface="Segoe MDL2 Assets" panose="050A0102010101010101" pitchFamily="18" charset="0"/>
-              </a:rPr>
-              <a:t></a:t>
-            </a:r>
-          </a:p>
-          <a:p>
-            <a:r>
-              <a:rPr lang="en-GB" dirty="0"/>
-              <a:t>By saving your files where the GOPATH is you can access local packages without using relative paths. </a:t>
-            </a:r>
-            <a:endParaRPr lang="en-GB" dirty="0">
-              <a:latin typeface="Segoe MDL2 Assets" panose="050A0102010101010101" pitchFamily="18" charset="0"/>
-            </a:endParaRPr>
-          </a:p>
-          <a:p>
-            <a:endParaRPr lang="en-GB" dirty="0"/>
-          </a:p>
-        </p:txBody>
-      </p:sp>
-    </p:spTree>
-    <p:extLst>
-      <p:ext uri="{BB962C8B-B14F-4D97-AF65-F5344CB8AC3E}">
-        <p14:creationId xmlns:p14="http://schemas.microsoft.com/office/powerpoint/2010/main" val="1348224757"/>
-      </p:ext>
-    </p:extLst>
-  </p:cSld>
-  <p:clrMapOvr>
-    <a:masterClrMapping/>
-  </p:clrMapOvr>
-</p:sld>
-</file>
-
-<file path=ppt/slides/slide47.xml><?xml version="1.0" encoding="utf-8"?>
-<p:sld xmlns:a="http://schemas.openxmlformats.org/drawingml/2006/main" xmlns:r="http://schemas.openxmlformats.org/officeDocument/2006/relationships" xmlns:p="http://schemas.openxmlformats.org/presentationml/2006/main">
-  <p:cSld>
-    <p:spTree>
-      <p:nvGrpSpPr>
-        <p:cNvPr id="1" name=""/>
-        <p:cNvGrpSpPr/>
-        <p:nvPr/>
-      </p:nvGrpSpPr>
-      <p:grpSpPr>
-        <a:xfrm>
-          <a:off x="0" y="0"/>
-          <a:ext cx="0" cy="0"/>
-          <a:chOff x="0" y="0"/>
-          <a:chExt cx="0" cy="0"/>
-        </a:xfrm>
-      </p:grpSpPr>
-      <p:sp>
-        <p:nvSpPr>
-          <p:cNvPr id="2" name="Title 1">
-            <a:extLst>
-              <a:ext uri="{FF2B5EF4-FFF2-40B4-BE49-F238E27FC236}">
-                <a16:creationId xmlns:a16="http://schemas.microsoft.com/office/drawing/2014/main" id="{8CEAC96E-108C-4D0F-8090-857DB6659B57}"/>
-              </a:ext>
-            </a:extLst>
-          </p:cNvPr>
-          <p:cNvSpPr>
-            <a:spLocks noGrp="1"/>
-          </p:cNvSpPr>
-          <p:nvPr>
-            <p:ph type="title"/>
-          </p:nvPr>
-        </p:nvSpPr>
-        <p:spPr/>
-        <p:txBody>
-          <a:bodyPr/>
-          <a:lstStyle/>
-          <a:p>
-            <a:r>
-              <a:rPr lang="en-GB" dirty="0"/>
-              <a:t>Solution: Modelling the lives of </a:t>
-            </a:r>
-            <a:br>
-              <a:rPr lang="en-GB" dirty="0"/>
-            </a:br>
-            <a:r>
-              <a:rPr lang="en-GB" dirty="0"/>
-              <a:t>1 million Gophers</a:t>
-            </a:r>
-          </a:p>
-        </p:txBody>
-      </p:sp>
-      <p:sp>
-        <p:nvSpPr>
-          <p:cNvPr id="3" name="Content Placeholder 2">
-            <a:extLst>
-              <a:ext uri="{FF2B5EF4-FFF2-40B4-BE49-F238E27FC236}">
-                <a16:creationId xmlns:a16="http://schemas.microsoft.com/office/drawing/2014/main" id="{8AE99B8D-47E8-4045-8955-7E893F2A54A8}"/>
-              </a:ext>
-            </a:extLst>
-          </p:cNvPr>
-          <p:cNvSpPr>
-            <a:spLocks noGrp="1"/>
-          </p:cNvSpPr>
-          <p:nvPr>
-            <p:ph idx="1"/>
-          </p:nvPr>
-        </p:nvSpPr>
-        <p:spPr/>
-        <p:txBody>
-          <a:bodyPr/>
-          <a:lstStyle/>
-          <a:p>
-            <a:r>
-              <a:rPr lang="en-GB" dirty="0"/>
-              <a:t>Create a PowerPoint presentation talking about the cyclical nature of Learning how to Program. </a:t>
-            </a:r>
-          </a:p>
-          <a:p>
-            <a:endParaRPr lang="en-GB" dirty="0"/>
-          </a:p>
-          <a:p>
-            <a:r>
-              <a:rPr lang="en-GB" dirty="0"/>
-              <a:t>For Newcomers</a:t>
-            </a:r>
-          </a:p>
-          <a:p>
-            <a:endParaRPr lang="en-GB" dirty="0"/>
-          </a:p>
-          <a:p>
-            <a:r>
-              <a:rPr lang="en-GB" dirty="0"/>
-              <a:t>Talk about how by making a presentation those who aren’t Gopher or are new Gophers might see the first steps </a:t>
-            </a:r>
-          </a:p>
-        </p:txBody>
-      </p:sp>
-    </p:spTree>
-    <p:extLst>
-      <p:ext uri="{BB962C8B-B14F-4D97-AF65-F5344CB8AC3E}">
-        <p14:creationId xmlns:p14="http://schemas.microsoft.com/office/powerpoint/2010/main" val="18358553"/>
-      </p:ext>
-    </p:extLst>
-  </p:cSld>
-  <p:clrMapOvr>
-    <a:masterClrMapping/>
-  </p:clrMapOvr>
-</p:sld>
-</file>
-
-<file path=ppt/slides/slide5.xml><?xml version="1.0" encoding="utf-8"?>
-<p:sld xmlns:a="http://schemas.openxmlformats.org/drawingml/2006/main" xmlns:r="http://schemas.openxmlformats.org/officeDocument/2006/relationships" xmlns:p="http://schemas.openxmlformats.org/presentationml/2006/main">
-  <p:cSld>
-    <p:spTree>
-      <p:nvGrpSpPr>
-        <p:cNvPr id="1" name=""/>
-        <p:cNvGrpSpPr/>
-        <p:nvPr/>
-      </p:nvGrpSpPr>
-      <p:grpSpPr>
-        <a:xfrm>
-          <a:off x="0" y="0"/>
-          <a:ext cx="0" cy="0"/>
-          <a:chOff x="0" y="0"/>
-          <a:chExt cx="0" cy="0"/>
-        </a:xfrm>
-      </p:grpSpPr>
-      <p:sp>
-        <p:nvSpPr>
-          <p:cNvPr id="2" name="Title 1">
-            <a:extLst>
-              <a:ext uri="{FF2B5EF4-FFF2-40B4-BE49-F238E27FC236}">
                 <a16:creationId xmlns:a16="http://schemas.microsoft.com/office/drawing/2014/main" id="{4F7D31D1-092D-4684-8FC3-0EA5272BA68F}"/>
               </a:ext>
             </a:extLst>
@@ -11129,7 +10254,7 @@
           <a:p>
             <a:r>
               <a:rPr lang="en-GB" dirty="0"/>
-              <a:t>The Idea</a:t>
+              <a:t>My First Project Idea</a:t>
             </a:r>
           </a:p>
         </p:txBody>
@@ -11162,7 +10287,7 @@
           <a:p>
             <a:r>
               <a:rPr lang="en-GB" dirty="0"/>
-              <a:t>Attempt to Model the life of 1 million Gophers (the animal) </a:t>
+              <a:t>Build a program that would model the life of 1 million gophers (the animal) using Go (obviously)</a:t>
             </a:r>
           </a:p>
           <a:p>
@@ -11171,8 +10296,24 @@
           <a:p>
             <a:r>
               <a:rPr lang="en-GB" dirty="0"/>
-              <a:t>Or At least build the framework for it. </a:t>
-            </a:r>
+              <a:t>Before beginning the program I looked online for some facts about gophers. </a:t>
+            </a:r>
+            <a:r>
+              <a:rPr lang="en-GB" dirty="0">
+                <a:hlinkClick r:id="rId2"/>
+              </a:rPr>
+              <a:t>https://www.livescience.com/57623-gopher-facts.html</a:t>
+            </a:r>
+            <a:endParaRPr lang="en-GB" dirty="0"/>
+          </a:p>
+          <a:p>
+            <a:pPr marL="457200" lvl="1" indent="0">
+              <a:buNone/>
+            </a:pPr>
+            <a:endParaRPr lang="en-GB" dirty="0"/>
+          </a:p>
+          <a:p>
+            <a:endParaRPr lang="en-GB" dirty="0"/>
           </a:p>
         </p:txBody>
       </p:sp>
@@ -11191,7 +10332,7 @@
           <p:nvPr/>
         </p:nvPicPr>
         <p:blipFill>
-          <a:blip r:embed="rId2">
+          <a:blip r:embed="rId3">
             <a:extLst>
               <a:ext uri="{28A0092B-C50C-407E-A947-70E740481C1C}">
                 <a14:useLocalDpi xmlns:a14="http://schemas.microsoft.com/office/drawing/2010/main" val="0"/>
@@ -11225,6 +10366,798 @@
 </p:sld>
 </file>
 
+<file path=ppt/slides/slide40.xml><?xml version="1.0" encoding="utf-8"?>
+<p:sld xmlns:a="http://schemas.openxmlformats.org/drawingml/2006/main" xmlns:r="http://schemas.openxmlformats.org/officeDocument/2006/relationships" xmlns:p="http://schemas.openxmlformats.org/presentationml/2006/main">
+  <p:cSld>
+    <p:spTree>
+      <p:nvGrpSpPr>
+        <p:cNvPr id="1" name=""/>
+        <p:cNvGrpSpPr/>
+        <p:nvPr/>
+      </p:nvGrpSpPr>
+      <p:grpSpPr>
+        <a:xfrm>
+          <a:off x="0" y="0"/>
+          <a:ext cx="0" cy="0"/>
+          <a:chOff x="0" y="0"/>
+          <a:chExt cx="0" cy="0"/>
+        </a:xfrm>
+      </p:grpSpPr>
+      <p:sp>
+        <p:nvSpPr>
+          <p:cNvPr id="2" name="Title 1">
+            <a:extLst>
+              <a:ext uri="{FF2B5EF4-FFF2-40B4-BE49-F238E27FC236}">
+                <a16:creationId xmlns:a16="http://schemas.microsoft.com/office/drawing/2014/main" id="{F791C732-68FC-4DBF-A925-B9A44335C54F}"/>
+              </a:ext>
+            </a:extLst>
+          </p:cNvPr>
+          <p:cNvSpPr>
+            <a:spLocks noGrp="1"/>
+          </p:cNvSpPr>
+          <p:nvPr>
+            <p:ph type="title"/>
+          </p:nvPr>
+        </p:nvSpPr>
+        <p:spPr/>
+        <p:txBody>
+          <a:bodyPr/>
+          <a:lstStyle/>
+          <a:p>
+            <a:r>
+              <a:rPr lang="en-GB" dirty="0"/>
+              <a:t>Finding A Catalyst</a:t>
+            </a:r>
+          </a:p>
+        </p:txBody>
+      </p:sp>
+      <p:sp>
+        <p:nvSpPr>
+          <p:cNvPr id="3" name="Content Placeholder 2">
+            <a:extLst>
+              <a:ext uri="{FF2B5EF4-FFF2-40B4-BE49-F238E27FC236}">
+                <a16:creationId xmlns:a16="http://schemas.microsoft.com/office/drawing/2014/main" id="{C206744A-0D9B-4231-BD87-CF25D90A8004}"/>
+              </a:ext>
+            </a:extLst>
+          </p:cNvPr>
+          <p:cNvSpPr>
+            <a:spLocks noGrp="1"/>
+          </p:cNvSpPr>
+          <p:nvPr>
+            <p:ph idx="1"/>
+          </p:nvPr>
+        </p:nvSpPr>
+        <p:spPr/>
+        <p:txBody>
+          <a:bodyPr/>
+          <a:lstStyle/>
+          <a:p>
+            <a:endParaRPr lang="en-GB"/>
+          </a:p>
+        </p:txBody>
+      </p:sp>
+    </p:spTree>
+    <p:extLst>
+      <p:ext uri="{BB962C8B-B14F-4D97-AF65-F5344CB8AC3E}">
+        <p14:creationId xmlns:p14="http://schemas.microsoft.com/office/powerpoint/2010/main" val="4016827040"/>
+      </p:ext>
+    </p:extLst>
+  </p:cSld>
+  <p:clrMapOvr>
+    <a:masterClrMapping/>
+  </p:clrMapOvr>
+</p:sld>
+</file>
+
+<file path=ppt/slides/slide41.xml><?xml version="1.0" encoding="utf-8"?>
+<p:sld xmlns:a="http://schemas.openxmlformats.org/drawingml/2006/main" xmlns:r="http://schemas.openxmlformats.org/officeDocument/2006/relationships" xmlns:p="http://schemas.openxmlformats.org/presentationml/2006/main">
+  <p:cSld>
+    <p:spTree>
+      <p:nvGrpSpPr>
+        <p:cNvPr id="1" name=""/>
+        <p:cNvGrpSpPr/>
+        <p:nvPr/>
+      </p:nvGrpSpPr>
+      <p:grpSpPr>
+        <a:xfrm>
+          <a:off x="0" y="0"/>
+          <a:ext cx="0" cy="0"/>
+          <a:chOff x="0" y="0"/>
+          <a:chExt cx="0" cy="0"/>
+        </a:xfrm>
+      </p:grpSpPr>
+      <p:sp>
+        <p:nvSpPr>
+          <p:cNvPr id="2" name="Title 1">
+            <a:extLst>
+              <a:ext uri="{FF2B5EF4-FFF2-40B4-BE49-F238E27FC236}">
+                <a16:creationId xmlns:a16="http://schemas.microsoft.com/office/drawing/2014/main" id="{32F06B3C-EA2D-46B1-AB79-08EFA8CCC0C1}"/>
+              </a:ext>
+            </a:extLst>
+          </p:cNvPr>
+          <p:cNvSpPr>
+            <a:spLocks noGrp="1"/>
+          </p:cNvSpPr>
+          <p:nvPr>
+            <p:ph type="title"/>
+          </p:nvPr>
+        </p:nvSpPr>
+        <p:spPr/>
+        <p:txBody>
+          <a:bodyPr/>
+          <a:lstStyle/>
+          <a:p>
+            <a:r>
+              <a:rPr lang="en-GB" dirty="0"/>
+              <a:t>Managing Scope and Completing Projects</a:t>
+            </a:r>
+          </a:p>
+        </p:txBody>
+      </p:sp>
+      <p:sp>
+        <p:nvSpPr>
+          <p:cNvPr id="3" name="Content Placeholder 2">
+            <a:extLst>
+              <a:ext uri="{FF2B5EF4-FFF2-40B4-BE49-F238E27FC236}">
+                <a16:creationId xmlns:a16="http://schemas.microsoft.com/office/drawing/2014/main" id="{D2524174-1A6E-43AD-AFB4-E3F8B9B5D53A}"/>
+              </a:ext>
+            </a:extLst>
+          </p:cNvPr>
+          <p:cNvSpPr>
+            <a:spLocks noGrp="1"/>
+          </p:cNvSpPr>
+          <p:nvPr>
+            <p:ph idx="1"/>
+          </p:nvPr>
+        </p:nvSpPr>
+        <p:spPr/>
+        <p:txBody>
+          <a:bodyPr/>
+          <a:lstStyle/>
+          <a:p>
+            <a:endParaRPr lang="en-GB"/>
+          </a:p>
+        </p:txBody>
+      </p:sp>
+    </p:spTree>
+    <p:extLst>
+      <p:ext uri="{BB962C8B-B14F-4D97-AF65-F5344CB8AC3E}">
+        <p14:creationId xmlns:p14="http://schemas.microsoft.com/office/powerpoint/2010/main" val="1162966501"/>
+      </p:ext>
+    </p:extLst>
+  </p:cSld>
+  <p:clrMapOvr>
+    <a:masterClrMapping/>
+  </p:clrMapOvr>
+</p:sld>
+</file>
+
+<file path=ppt/slides/slide42.xml><?xml version="1.0" encoding="utf-8"?>
+<p:sld xmlns:a="http://schemas.openxmlformats.org/drawingml/2006/main" xmlns:r="http://schemas.openxmlformats.org/officeDocument/2006/relationships" xmlns:p="http://schemas.openxmlformats.org/presentationml/2006/main">
+  <p:cSld>
+    <p:spTree>
+      <p:nvGrpSpPr>
+        <p:cNvPr id="1" name=""/>
+        <p:cNvGrpSpPr/>
+        <p:nvPr/>
+      </p:nvGrpSpPr>
+      <p:grpSpPr>
+        <a:xfrm>
+          <a:off x="0" y="0"/>
+          <a:ext cx="0" cy="0"/>
+          <a:chOff x="0" y="0"/>
+          <a:chExt cx="0" cy="0"/>
+        </a:xfrm>
+      </p:grpSpPr>
+      <p:sp>
+        <p:nvSpPr>
+          <p:cNvPr id="2" name="Title 1">
+            <a:extLst>
+              <a:ext uri="{FF2B5EF4-FFF2-40B4-BE49-F238E27FC236}">
+                <a16:creationId xmlns:a16="http://schemas.microsoft.com/office/drawing/2014/main" id="{F106CE47-2D88-4386-9645-6FF2058FA701}"/>
+              </a:ext>
+            </a:extLst>
+          </p:cNvPr>
+          <p:cNvSpPr>
+            <a:spLocks noGrp="1"/>
+          </p:cNvSpPr>
+          <p:nvPr>
+            <p:ph type="title"/>
+          </p:nvPr>
+        </p:nvSpPr>
+        <p:spPr/>
+        <p:txBody>
+          <a:bodyPr/>
+          <a:lstStyle/>
+          <a:p>
+            <a:r>
+              <a:rPr lang="en-GB" dirty="0"/>
+              <a:t>Getting past the feeling of pointlessness</a:t>
+            </a:r>
+          </a:p>
+        </p:txBody>
+      </p:sp>
+      <p:sp>
+        <p:nvSpPr>
+          <p:cNvPr id="3" name="Content Placeholder 2">
+            <a:extLst>
+              <a:ext uri="{FF2B5EF4-FFF2-40B4-BE49-F238E27FC236}">
+                <a16:creationId xmlns:a16="http://schemas.microsoft.com/office/drawing/2014/main" id="{3E7E5D08-3BD9-4083-ABF9-3C1E46633F36}"/>
+              </a:ext>
+            </a:extLst>
+          </p:cNvPr>
+          <p:cNvSpPr>
+            <a:spLocks noGrp="1"/>
+          </p:cNvSpPr>
+          <p:nvPr>
+            <p:ph idx="1"/>
+          </p:nvPr>
+        </p:nvSpPr>
+        <p:spPr/>
+        <p:txBody>
+          <a:bodyPr/>
+          <a:lstStyle/>
+          <a:p>
+            <a:r>
+              <a:rPr lang="en-GB" dirty="0"/>
+              <a:t>Finding a Catalyst, to improve motivation</a:t>
+            </a:r>
+          </a:p>
+          <a:p>
+            <a:pPr lvl="1"/>
+            <a:r>
+              <a:rPr lang="en-GB" dirty="0"/>
+              <a:t>Discussing your project with peers</a:t>
+            </a:r>
+          </a:p>
+          <a:p>
+            <a:pPr lvl="1"/>
+            <a:r>
+              <a:rPr lang="en-GB" dirty="0"/>
+              <a:t>Creating an actual deadline</a:t>
+            </a:r>
+          </a:p>
+          <a:p>
+            <a:pPr lvl="1"/>
+            <a:endParaRPr lang="en-GB" dirty="0"/>
+          </a:p>
+        </p:txBody>
+      </p:sp>
+    </p:spTree>
+    <p:extLst>
+      <p:ext uri="{BB962C8B-B14F-4D97-AF65-F5344CB8AC3E}">
+        <p14:creationId xmlns:p14="http://schemas.microsoft.com/office/powerpoint/2010/main" val="1961839492"/>
+      </p:ext>
+    </p:extLst>
+  </p:cSld>
+  <p:clrMapOvr>
+    <a:masterClrMapping/>
+  </p:clrMapOvr>
+</p:sld>
+</file>
+
+<file path=ppt/slides/slide43.xml><?xml version="1.0" encoding="utf-8"?>
+<p:sld xmlns:a="http://schemas.openxmlformats.org/drawingml/2006/main" xmlns:r="http://schemas.openxmlformats.org/officeDocument/2006/relationships" xmlns:p="http://schemas.openxmlformats.org/presentationml/2006/main">
+  <p:cSld>
+    <p:spTree>
+      <p:nvGrpSpPr>
+        <p:cNvPr id="1" name=""/>
+        <p:cNvGrpSpPr/>
+        <p:nvPr/>
+      </p:nvGrpSpPr>
+      <p:grpSpPr>
+        <a:xfrm>
+          <a:off x="0" y="0"/>
+          <a:ext cx="0" cy="0"/>
+          <a:chOff x="0" y="0"/>
+          <a:chExt cx="0" cy="0"/>
+        </a:xfrm>
+      </p:grpSpPr>
+      <p:sp>
+        <p:nvSpPr>
+          <p:cNvPr id="2" name="Title 1">
+            <a:extLst>
+              <a:ext uri="{FF2B5EF4-FFF2-40B4-BE49-F238E27FC236}">
+                <a16:creationId xmlns:a16="http://schemas.microsoft.com/office/drawing/2014/main" id="{8665D156-403C-4612-AA65-B49BA41EDF64}"/>
+              </a:ext>
+            </a:extLst>
+          </p:cNvPr>
+          <p:cNvSpPr>
+            <a:spLocks noGrp="1"/>
+          </p:cNvSpPr>
+          <p:nvPr>
+            <p:ph type="title"/>
+          </p:nvPr>
+        </p:nvSpPr>
+        <p:spPr/>
+        <p:txBody>
+          <a:bodyPr/>
+          <a:lstStyle/>
+          <a:p>
+            <a:r>
+              <a:rPr lang="en-GB" dirty="0"/>
+              <a:t>Insert Here, Example of 5 gophers one alive, 4 dead </a:t>
+            </a:r>
+          </a:p>
+        </p:txBody>
+      </p:sp>
+      <p:sp>
+        <p:nvSpPr>
+          <p:cNvPr id="3" name="Content Placeholder 2">
+            <a:extLst>
+              <a:ext uri="{FF2B5EF4-FFF2-40B4-BE49-F238E27FC236}">
+                <a16:creationId xmlns:a16="http://schemas.microsoft.com/office/drawing/2014/main" id="{8716B298-CF10-4866-85F6-D856E1963894}"/>
+              </a:ext>
+            </a:extLst>
+          </p:cNvPr>
+          <p:cNvSpPr>
+            <a:spLocks noGrp="1"/>
+          </p:cNvSpPr>
+          <p:nvPr>
+            <p:ph idx="1"/>
+          </p:nvPr>
+        </p:nvSpPr>
+        <p:spPr/>
+        <p:txBody>
+          <a:bodyPr/>
+          <a:lstStyle/>
+          <a:p>
+            <a:endParaRPr lang="en-GB"/>
+          </a:p>
+        </p:txBody>
+      </p:sp>
+    </p:spTree>
+    <p:extLst>
+      <p:ext uri="{BB962C8B-B14F-4D97-AF65-F5344CB8AC3E}">
+        <p14:creationId xmlns:p14="http://schemas.microsoft.com/office/powerpoint/2010/main" val="3790213746"/>
+      </p:ext>
+    </p:extLst>
+  </p:cSld>
+  <p:clrMapOvr>
+    <a:masterClrMapping/>
+  </p:clrMapOvr>
+</p:sld>
+</file>
+
+<file path=ppt/slides/slide44.xml><?xml version="1.0" encoding="utf-8"?>
+<p:sld xmlns:a="http://schemas.openxmlformats.org/drawingml/2006/main" xmlns:r="http://schemas.openxmlformats.org/officeDocument/2006/relationships" xmlns:p="http://schemas.openxmlformats.org/presentationml/2006/main">
+  <p:cSld>
+    <p:spTree>
+      <p:nvGrpSpPr>
+        <p:cNvPr id="1" name=""/>
+        <p:cNvGrpSpPr/>
+        <p:nvPr/>
+      </p:nvGrpSpPr>
+      <p:grpSpPr>
+        <a:xfrm>
+          <a:off x="0" y="0"/>
+          <a:ext cx="0" cy="0"/>
+          <a:chOff x="0" y="0"/>
+          <a:chExt cx="0" cy="0"/>
+        </a:xfrm>
+      </p:grpSpPr>
+      <p:sp>
+        <p:nvSpPr>
+          <p:cNvPr id="2" name="Title 1">
+            <a:extLst>
+              <a:ext uri="{FF2B5EF4-FFF2-40B4-BE49-F238E27FC236}">
+                <a16:creationId xmlns:a16="http://schemas.microsoft.com/office/drawing/2014/main" id="{B88F905B-DC9A-4E15-887A-0D816B2DA849}"/>
+              </a:ext>
+            </a:extLst>
+          </p:cNvPr>
+          <p:cNvSpPr>
+            <a:spLocks noGrp="1"/>
+          </p:cNvSpPr>
+          <p:nvPr>
+            <p:ph type="title"/>
+          </p:nvPr>
+        </p:nvSpPr>
+        <p:spPr/>
+        <p:txBody>
+          <a:bodyPr/>
+          <a:lstStyle/>
+          <a:p>
+            <a:r>
+              <a:rPr lang="en-GB" dirty="0"/>
+              <a:t>Checklist</a:t>
+            </a:r>
+          </a:p>
+        </p:txBody>
+      </p:sp>
+      <p:sp>
+        <p:nvSpPr>
+          <p:cNvPr id="3" name="Content Placeholder 2">
+            <a:extLst>
+              <a:ext uri="{FF2B5EF4-FFF2-40B4-BE49-F238E27FC236}">
+                <a16:creationId xmlns:a16="http://schemas.microsoft.com/office/drawing/2014/main" id="{14229407-2ED8-43A8-819B-30DDEB3D38EC}"/>
+              </a:ext>
+            </a:extLst>
+          </p:cNvPr>
+          <p:cNvSpPr>
+            <a:spLocks noGrp="1"/>
+          </p:cNvSpPr>
+          <p:nvPr>
+            <p:ph idx="1"/>
+          </p:nvPr>
+        </p:nvSpPr>
+        <p:spPr/>
+        <p:txBody>
+          <a:bodyPr/>
+          <a:lstStyle/>
+          <a:p>
+            <a:r>
+              <a:rPr lang="en-GB" dirty="0"/>
+              <a:t>Concurrency is not parallelism </a:t>
+            </a:r>
+            <a:r>
+              <a:rPr lang="en-GB" dirty="0">
+                <a:latin typeface="Segoe MDL2 Assets" panose="050A0102010101010101" pitchFamily="18" charset="0"/>
+              </a:rPr>
+              <a:t> </a:t>
+            </a:r>
+          </a:p>
+          <a:p>
+            <a:endParaRPr lang="en-GB" dirty="0"/>
+          </a:p>
+        </p:txBody>
+      </p:sp>
+    </p:spTree>
+    <p:extLst>
+      <p:ext uri="{BB962C8B-B14F-4D97-AF65-F5344CB8AC3E}">
+        <p14:creationId xmlns:p14="http://schemas.microsoft.com/office/powerpoint/2010/main" val="3193971414"/>
+      </p:ext>
+    </p:extLst>
+  </p:cSld>
+  <p:clrMapOvr>
+    <a:masterClrMapping/>
+  </p:clrMapOvr>
+</p:sld>
+</file>
+
+<file path=ppt/slides/slide45.xml><?xml version="1.0" encoding="utf-8"?>
+<p:sld xmlns:a="http://schemas.openxmlformats.org/drawingml/2006/main" xmlns:r="http://schemas.openxmlformats.org/officeDocument/2006/relationships" xmlns:p="http://schemas.openxmlformats.org/presentationml/2006/main">
+  <p:cSld>
+    <p:spTree>
+      <p:nvGrpSpPr>
+        <p:cNvPr id="1" name=""/>
+        <p:cNvGrpSpPr/>
+        <p:nvPr/>
+      </p:nvGrpSpPr>
+      <p:grpSpPr>
+        <a:xfrm>
+          <a:off x="0" y="0"/>
+          <a:ext cx="0" cy="0"/>
+          <a:chOff x="0" y="0"/>
+          <a:chExt cx="0" cy="0"/>
+        </a:xfrm>
+      </p:grpSpPr>
+      <p:sp>
+        <p:nvSpPr>
+          <p:cNvPr id="2" name="Title 1">
+            <a:extLst>
+              <a:ext uri="{FF2B5EF4-FFF2-40B4-BE49-F238E27FC236}">
+                <a16:creationId xmlns:a16="http://schemas.microsoft.com/office/drawing/2014/main" id="{B88F905B-DC9A-4E15-887A-0D816B2DA849}"/>
+              </a:ext>
+            </a:extLst>
+          </p:cNvPr>
+          <p:cNvSpPr>
+            <a:spLocks noGrp="1"/>
+          </p:cNvSpPr>
+          <p:nvPr>
+            <p:ph type="title"/>
+          </p:nvPr>
+        </p:nvSpPr>
+        <p:spPr/>
+        <p:txBody>
+          <a:bodyPr/>
+          <a:lstStyle/>
+          <a:p>
+            <a:r>
+              <a:rPr lang="en-GB" dirty="0"/>
+              <a:t>Checklist of Mistakes</a:t>
+            </a:r>
+          </a:p>
+        </p:txBody>
+      </p:sp>
+      <p:sp>
+        <p:nvSpPr>
+          <p:cNvPr id="3" name="Content Placeholder 2">
+            <a:extLst>
+              <a:ext uri="{FF2B5EF4-FFF2-40B4-BE49-F238E27FC236}">
+                <a16:creationId xmlns:a16="http://schemas.microsoft.com/office/drawing/2014/main" id="{14229407-2ED8-43A8-819B-30DDEB3D38EC}"/>
+              </a:ext>
+            </a:extLst>
+          </p:cNvPr>
+          <p:cNvSpPr>
+            <a:spLocks noGrp="1"/>
+          </p:cNvSpPr>
+          <p:nvPr>
+            <p:ph idx="1"/>
+          </p:nvPr>
+        </p:nvSpPr>
+        <p:spPr/>
+        <p:txBody>
+          <a:bodyPr/>
+          <a:lstStyle/>
+          <a:p>
+            <a:r>
+              <a:rPr lang="en-GB" dirty="0"/>
+              <a:t>Concurrency is not parallelism </a:t>
+            </a:r>
+            <a:r>
+              <a:rPr lang="en-GB" dirty="0">
+                <a:latin typeface="Segoe MDL2 Assets" panose="050A0102010101010101" pitchFamily="18" charset="0"/>
+              </a:rPr>
+              <a:t> </a:t>
+            </a:r>
+          </a:p>
+          <a:p>
+            <a:r>
+              <a:rPr lang="en-GB" dirty="0"/>
+              <a:t>You can read from maps concurrently, but you can not write to maps.</a:t>
+            </a:r>
+          </a:p>
+          <a:p>
+            <a:r>
+              <a:rPr lang="en-GB"/>
+              <a:t>Importance </a:t>
+            </a:r>
+            <a:r>
+              <a:rPr lang="en-GB" dirty="0"/>
+              <a:t>of structure to avoid circular dependencies and for ease of readability </a:t>
+            </a:r>
+            <a:r>
+              <a:rPr lang="en-GB" dirty="0">
+                <a:latin typeface="Segoe MDL2 Assets" panose="050A0102010101010101" pitchFamily="18" charset="0"/>
+              </a:rPr>
+              <a:t></a:t>
+            </a:r>
+          </a:p>
+          <a:p>
+            <a:r>
+              <a:rPr lang="en-GB" dirty="0"/>
+              <a:t>By saving your files where the GOPATH is you can access local packages without using relative paths. </a:t>
+            </a:r>
+            <a:endParaRPr lang="en-GB" dirty="0">
+              <a:latin typeface="Segoe MDL2 Assets" panose="050A0102010101010101" pitchFamily="18" charset="0"/>
+            </a:endParaRPr>
+          </a:p>
+          <a:p>
+            <a:endParaRPr lang="en-GB" dirty="0"/>
+          </a:p>
+        </p:txBody>
+      </p:sp>
+    </p:spTree>
+    <p:extLst>
+      <p:ext uri="{BB962C8B-B14F-4D97-AF65-F5344CB8AC3E}">
+        <p14:creationId xmlns:p14="http://schemas.microsoft.com/office/powerpoint/2010/main" val="1348224757"/>
+      </p:ext>
+    </p:extLst>
+  </p:cSld>
+  <p:clrMapOvr>
+    <a:masterClrMapping/>
+  </p:clrMapOvr>
+</p:sld>
+</file>
+
+<file path=ppt/slides/slide46.xml><?xml version="1.0" encoding="utf-8"?>
+<p:sld xmlns:a="http://schemas.openxmlformats.org/drawingml/2006/main" xmlns:r="http://schemas.openxmlformats.org/officeDocument/2006/relationships" xmlns:p="http://schemas.openxmlformats.org/presentationml/2006/main">
+  <p:cSld>
+    <p:spTree>
+      <p:nvGrpSpPr>
+        <p:cNvPr id="1" name=""/>
+        <p:cNvGrpSpPr/>
+        <p:nvPr/>
+      </p:nvGrpSpPr>
+      <p:grpSpPr>
+        <a:xfrm>
+          <a:off x="0" y="0"/>
+          <a:ext cx="0" cy="0"/>
+          <a:chOff x="0" y="0"/>
+          <a:chExt cx="0" cy="0"/>
+        </a:xfrm>
+      </p:grpSpPr>
+      <p:sp>
+        <p:nvSpPr>
+          <p:cNvPr id="2" name="Title 1">
+            <a:extLst>
+              <a:ext uri="{FF2B5EF4-FFF2-40B4-BE49-F238E27FC236}">
+                <a16:creationId xmlns:a16="http://schemas.microsoft.com/office/drawing/2014/main" id="{8CEAC96E-108C-4D0F-8090-857DB6659B57}"/>
+              </a:ext>
+            </a:extLst>
+          </p:cNvPr>
+          <p:cNvSpPr>
+            <a:spLocks noGrp="1"/>
+          </p:cNvSpPr>
+          <p:nvPr>
+            <p:ph type="title"/>
+          </p:nvPr>
+        </p:nvSpPr>
+        <p:spPr/>
+        <p:txBody>
+          <a:bodyPr/>
+          <a:lstStyle/>
+          <a:p>
+            <a:r>
+              <a:rPr lang="en-GB" dirty="0"/>
+              <a:t>Solution: Modelling the lives of </a:t>
+            </a:r>
+            <a:br>
+              <a:rPr lang="en-GB" dirty="0"/>
+            </a:br>
+            <a:r>
+              <a:rPr lang="en-GB" dirty="0"/>
+              <a:t>1 million Gophers</a:t>
+            </a:r>
+          </a:p>
+        </p:txBody>
+      </p:sp>
+      <p:sp>
+        <p:nvSpPr>
+          <p:cNvPr id="3" name="Content Placeholder 2">
+            <a:extLst>
+              <a:ext uri="{FF2B5EF4-FFF2-40B4-BE49-F238E27FC236}">
+                <a16:creationId xmlns:a16="http://schemas.microsoft.com/office/drawing/2014/main" id="{8AE99B8D-47E8-4045-8955-7E893F2A54A8}"/>
+              </a:ext>
+            </a:extLst>
+          </p:cNvPr>
+          <p:cNvSpPr>
+            <a:spLocks noGrp="1"/>
+          </p:cNvSpPr>
+          <p:nvPr>
+            <p:ph idx="1"/>
+          </p:nvPr>
+        </p:nvSpPr>
+        <p:spPr/>
+        <p:txBody>
+          <a:bodyPr/>
+          <a:lstStyle/>
+          <a:p>
+            <a:r>
+              <a:rPr lang="en-GB" dirty="0"/>
+              <a:t>Create a PowerPoint presentation talking about the cyclical nature of Learning how to Program. </a:t>
+            </a:r>
+          </a:p>
+          <a:p>
+            <a:endParaRPr lang="en-GB" dirty="0"/>
+          </a:p>
+          <a:p>
+            <a:r>
+              <a:rPr lang="en-GB" dirty="0"/>
+              <a:t>For Newcomers</a:t>
+            </a:r>
+          </a:p>
+          <a:p>
+            <a:endParaRPr lang="en-GB" dirty="0"/>
+          </a:p>
+          <a:p>
+            <a:r>
+              <a:rPr lang="en-GB" dirty="0"/>
+              <a:t>Talk about how by making a presentation those who aren’t Gopher or are new Gophers might see the first steps </a:t>
+            </a:r>
+          </a:p>
+        </p:txBody>
+      </p:sp>
+    </p:spTree>
+    <p:extLst>
+      <p:ext uri="{BB962C8B-B14F-4D97-AF65-F5344CB8AC3E}">
+        <p14:creationId xmlns:p14="http://schemas.microsoft.com/office/powerpoint/2010/main" val="18358553"/>
+      </p:ext>
+    </p:extLst>
+  </p:cSld>
+  <p:clrMapOvr>
+    <a:masterClrMapping/>
+  </p:clrMapOvr>
+</p:sld>
+</file>
+
+<file path=ppt/slides/slide5.xml><?xml version="1.0" encoding="utf-8"?>
+<p:sld xmlns:a="http://schemas.openxmlformats.org/drawingml/2006/main" xmlns:r="http://schemas.openxmlformats.org/officeDocument/2006/relationships" xmlns:p="http://schemas.openxmlformats.org/presentationml/2006/main">
+  <p:cSld>
+    <p:spTree>
+      <p:nvGrpSpPr>
+        <p:cNvPr id="1" name=""/>
+        <p:cNvGrpSpPr/>
+        <p:nvPr/>
+      </p:nvGrpSpPr>
+      <p:grpSpPr>
+        <a:xfrm>
+          <a:off x="0" y="0"/>
+          <a:ext cx="0" cy="0"/>
+          <a:chOff x="0" y="0"/>
+          <a:chExt cx="0" cy="0"/>
+        </a:xfrm>
+      </p:grpSpPr>
+      <p:sp>
+        <p:nvSpPr>
+          <p:cNvPr id="2" name="Title 1">
+            <a:extLst>
+              <a:ext uri="{FF2B5EF4-FFF2-40B4-BE49-F238E27FC236}">
+                <a16:creationId xmlns:a16="http://schemas.microsoft.com/office/drawing/2014/main" id="{80A5BD8C-593C-4BEB-A177-8FE5413399C5}"/>
+              </a:ext>
+            </a:extLst>
+          </p:cNvPr>
+          <p:cNvSpPr>
+            <a:spLocks noGrp="1"/>
+          </p:cNvSpPr>
+          <p:nvPr>
+            <p:ph type="title"/>
+          </p:nvPr>
+        </p:nvSpPr>
+        <p:spPr/>
+        <p:txBody>
+          <a:bodyPr/>
+          <a:lstStyle/>
+          <a:p>
+            <a:r>
+              <a:rPr lang="en-GB" dirty="0"/>
+              <a:t>Part 1 – Getting Started</a:t>
+            </a:r>
+          </a:p>
+        </p:txBody>
+      </p:sp>
+      <p:sp>
+        <p:nvSpPr>
+          <p:cNvPr id="3" name="Content Placeholder 2">
+            <a:extLst>
+              <a:ext uri="{FF2B5EF4-FFF2-40B4-BE49-F238E27FC236}">
+                <a16:creationId xmlns:a16="http://schemas.microsoft.com/office/drawing/2014/main" id="{50E7D223-D3CB-4FF5-A34E-AC0728940385}"/>
+              </a:ext>
+            </a:extLst>
+          </p:cNvPr>
+          <p:cNvSpPr>
+            <a:spLocks noGrp="1"/>
+          </p:cNvSpPr>
+          <p:nvPr>
+            <p:ph idx="1"/>
+          </p:nvPr>
+        </p:nvSpPr>
+        <p:spPr/>
+        <p:txBody>
+          <a:bodyPr/>
+          <a:lstStyle/>
+          <a:p>
+            <a:r>
+              <a:rPr lang="en-GB" dirty="0"/>
+              <a:t>How do I even create a program in Golang?</a:t>
+            </a:r>
+          </a:p>
+          <a:p>
+            <a:pPr marL="0" indent="0">
+              <a:buNone/>
+            </a:pPr>
+            <a:endParaRPr lang="en-GB" dirty="0"/>
+          </a:p>
+          <a:p>
+            <a:r>
+              <a:rPr lang="en-GB" dirty="0"/>
+              <a:t>What are the syntactical differences between Golang and languages I already know? </a:t>
+            </a:r>
+          </a:p>
+          <a:p>
+            <a:endParaRPr lang="en-GB" dirty="0"/>
+          </a:p>
+          <a:p>
+            <a:endParaRPr lang="en-GB" dirty="0"/>
+          </a:p>
+          <a:p>
+            <a:endParaRPr lang="en-GB" dirty="0"/>
+          </a:p>
+        </p:txBody>
+      </p:sp>
+    </p:spTree>
+    <p:extLst>
+      <p:ext uri="{BB962C8B-B14F-4D97-AF65-F5344CB8AC3E}">
+        <p14:creationId xmlns:p14="http://schemas.microsoft.com/office/powerpoint/2010/main" val="988472866"/>
+      </p:ext>
+    </p:extLst>
+  </p:cSld>
+  <p:clrMapOvr>
+    <a:masterClrMapping/>
+  </p:clrMapOvr>
+</p:sld>
+</file>
+
 <file path=ppt/slides/slide6.xml><?xml version="1.0" encoding="utf-8"?>
 <p:sld xmlns:a="http://schemas.openxmlformats.org/drawingml/2006/main" xmlns:r="http://schemas.openxmlformats.org/officeDocument/2006/relationships" xmlns:p="http://schemas.openxmlformats.org/presentationml/2006/main">
   <p:cSld>
@@ -11247,113 +11180,6 @@
           <p:cNvPr id="2" name="Title 1">
             <a:extLst>
               <a:ext uri="{FF2B5EF4-FFF2-40B4-BE49-F238E27FC236}">
-                <a16:creationId xmlns:a16="http://schemas.microsoft.com/office/drawing/2014/main" id="{80A5BD8C-593C-4BEB-A177-8FE5413399C5}"/>
-              </a:ext>
-            </a:extLst>
-          </p:cNvPr>
-          <p:cNvSpPr>
-            <a:spLocks noGrp="1"/>
-          </p:cNvSpPr>
-          <p:nvPr>
-            <p:ph type="title"/>
-          </p:nvPr>
-        </p:nvSpPr>
-        <p:spPr/>
-        <p:txBody>
-          <a:bodyPr/>
-          <a:lstStyle/>
-          <a:p>
-            <a:r>
-              <a:rPr lang="en-GB" dirty="0"/>
-              <a:t>Problem 1 – Getting Started</a:t>
-            </a:r>
-          </a:p>
-        </p:txBody>
-      </p:sp>
-      <p:sp>
-        <p:nvSpPr>
-          <p:cNvPr id="3" name="Content Placeholder 2">
-            <a:extLst>
-              <a:ext uri="{FF2B5EF4-FFF2-40B4-BE49-F238E27FC236}">
-                <a16:creationId xmlns:a16="http://schemas.microsoft.com/office/drawing/2014/main" id="{50E7D223-D3CB-4FF5-A34E-AC0728940385}"/>
-              </a:ext>
-            </a:extLst>
-          </p:cNvPr>
-          <p:cNvSpPr>
-            <a:spLocks noGrp="1"/>
-          </p:cNvSpPr>
-          <p:nvPr>
-            <p:ph idx="1"/>
-          </p:nvPr>
-        </p:nvSpPr>
-        <p:spPr/>
-        <p:txBody>
-          <a:bodyPr/>
-          <a:lstStyle/>
-          <a:p>
-            <a:r>
-              <a:rPr lang="en-GB" dirty="0"/>
-              <a:t>How do I even create a program in Golang?</a:t>
-            </a:r>
-          </a:p>
-          <a:p>
-            <a:pPr marL="0" indent="0">
-              <a:buNone/>
-            </a:pPr>
-            <a:endParaRPr lang="en-GB" dirty="0"/>
-          </a:p>
-          <a:p>
-            <a:r>
-              <a:rPr lang="en-GB" dirty="0"/>
-              <a:t>What are the syntactical differences between Golang and languages I already know? </a:t>
-            </a:r>
-          </a:p>
-          <a:p>
-            <a:endParaRPr lang="en-GB" dirty="0"/>
-          </a:p>
-          <a:p>
-            <a:endParaRPr lang="en-GB" dirty="0"/>
-          </a:p>
-          <a:p>
-            <a:endParaRPr lang="en-GB" dirty="0"/>
-          </a:p>
-        </p:txBody>
-      </p:sp>
-    </p:spTree>
-    <p:extLst>
-      <p:ext uri="{BB962C8B-B14F-4D97-AF65-F5344CB8AC3E}">
-        <p14:creationId xmlns:p14="http://schemas.microsoft.com/office/powerpoint/2010/main" val="988472866"/>
-      </p:ext>
-    </p:extLst>
-  </p:cSld>
-  <p:clrMapOvr>
-    <a:masterClrMapping/>
-  </p:clrMapOvr>
-</p:sld>
-</file>
-
-<file path=ppt/slides/slide7.xml><?xml version="1.0" encoding="utf-8"?>
-<p:sld xmlns:a="http://schemas.openxmlformats.org/drawingml/2006/main" xmlns:r="http://schemas.openxmlformats.org/officeDocument/2006/relationships" xmlns:p="http://schemas.openxmlformats.org/presentationml/2006/main">
-  <p:cSld>
-    <p:spTree>
-      <p:nvGrpSpPr>
-        <p:cNvPr id="1" name=""/>
-        <p:cNvGrpSpPr/>
-        <p:nvPr/>
-      </p:nvGrpSpPr>
-      <p:grpSpPr>
-        <a:xfrm>
-          <a:off x="0" y="0"/>
-          <a:ext cx="0" cy="0"/>
-          <a:chOff x="0" y="0"/>
-          <a:chExt cx="0" cy="0"/>
-        </a:xfrm>
-      </p:grpSpPr>
-      <p:sp>
-        <p:nvSpPr>
-          <p:cNvPr id="2" name="Title 1">
-            <a:extLst>
-              <a:ext uri="{FF2B5EF4-FFF2-40B4-BE49-F238E27FC236}">
                 <a16:creationId xmlns:a16="http://schemas.microsoft.com/office/drawing/2014/main" id="{147AD90E-24E0-4C8B-B0E7-63EA30FE2984}"/>
               </a:ext>
             </a:extLst>
@@ -11455,7 +11281,7 @@
 </p:sld>
 </file>
 
-<file path=ppt/slides/slide8.xml><?xml version="1.0" encoding="utf-8"?>
+<file path=ppt/slides/slide7.xml><?xml version="1.0" encoding="utf-8"?>
 <p:sld xmlns:a="http://schemas.openxmlformats.org/drawingml/2006/main" xmlns:r="http://schemas.openxmlformats.org/officeDocument/2006/relationships" xmlns:p="http://schemas.openxmlformats.org/presentationml/2006/main">
   <p:cSld>
     <p:spTree>
@@ -11637,6 +11463,129 @@
     <p:extLst>
       <p:ext uri="{BB962C8B-B14F-4D97-AF65-F5344CB8AC3E}">
         <p14:creationId xmlns:p14="http://schemas.microsoft.com/office/powerpoint/2010/main" val="94782686"/>
+      </p:ext>
+    </p:extLst>
+  </p:cSld>
+  <p:clrMapOvr>
+    <a:masterClrMapping/>
+  </p:clrMapOvr>
+</p:sld>
+</file>
+
+<file path=ppt/slides/slide8.xml><?xml version="1.0" encoding="utf-8"?>
+<p:sld xmlns:a="http://schemas.openxmlformats.org/drawingml/2006/main" xmlns:r="http://schemas.openxmlformats.org/officeDocument/2006/relationships" xmlns:p="http://schemas.openxmlformats.org/presentationml/2006/main">
+  <p:cSld>
+    <p:spTree>
+      <p:nvGrpSpPr>
+        <p:cNvPr id="1" name=""/>
+        <p:cNvGrpSpPr/>
+        <p:nvPr/>
+      </p:nvGrpSpPr>
+      <p:grpSpPr>
+        <a:xfrm>
+          <a:off x="0" y="0"/>
+          <a:ext cx="0" cy="0"/>
+          <a:chOff x="0" y="0"/>
+          <a:chExt cx="0" cy="0"/>
+        </a:xfrm>
+      </p:grpSpPr>
+      <p:sp>
+        <p:nvSpPr>
+          <p:cNvPr id="2" name="Title 1">
+            <a:extLst>
+              <a:ext uri="{FF2B5EF4-FFF2-40B4-BE49-F238E27FC236}">
+                <a16:creationId xmlns:a16="http://schemas.microsoft.com/office/drawing/2014/main" id="{E1675649-165F-45CD-BCBD-187B22AD8FDA}"/>
+              </a:ext>
+            </a:extLst>
+          </p:cNvPr>
+          <p:cNvSpPr>
+            <a:spLocks noGrp="1"/>
+          </p:cNvSpPr>
+          <p:nvPr>
+            <p:ph type="title"/>
+          </p:nvPr>
+        </p:nvSpPr>
+        <p:spPr/>
+        <p:txBody>
+          <a:bodyPr/>
+          <a:lstStyle/>
+          <a:p>
+            <a:r>
+              <a:rPr lang="en-GB" dirty="0"/>
+              <a:t>Mistakes Checklist -1 </a:t>
+            </a:r>
+          </a:p>
+        </p:txBody>
+      </p:sp>
+      <p:sp>
+        <p:nvSpPr>
+          <p:cNvPr id="3" name="Content Placeholder 2">
+            <a:extLst>
+              <a:ext uri="{FF2B5EF4-FFF2-40B4-BE49-F238E27FC236}">
+                <a16:creationId xmlns:a16="http://schemas.microsoft.com/office/drawing/2014/main" id="{70EF9D5D-3128-464B-8CA9-EE761595681E}"/>
+              </a:ext>
+            </a:extLst>
+          </p:cNvPr>
+          <p:cNvSpPr>
+            <a:spLocks noGrp="1"/>
+          </p:cNvSpPr>
+          <p:nvPr>
+            <p:ph idx="1"/>
+          </p:nvPr>
+        </p:nvSpPr>
+        <p:spPr/>
+        <p:txBody>
+          <a:bodyPr/>
+          <a:lstStyle/>
+          <a:p>
+            <a:r>
+              <a:rPr lang="en-GB" dirty="0"/>
+              <a:t>I missed the Go Tour</a:t>
+            </a:r>
+          </a:p>
+          <a:p>
+            <a:endParaRPr lang="en-GB" dirty="0"/>
+          </a:p>
+          <a:p>
+            <a:r>
+              <a:rPr lang="en-GB" dirty="0"/>
+              <a:t>(Mention the website </a:t>
+            </a:r>
+            <a:r>
+              <a:rPr lang="en-GB" dirty="0" err="1"/>
+              <a:t>gobyexample</a:t>
+            </a:r>
+            <a:r>
+              <a:rPr lang="en-GB" dirty="0"/>
+              <a:t> and </a:t>
+            </a:r>
+            <a:r>
+              <a:rPr lang="en-GB" dirty="0" err="1"/>
+              <a:t>gophercises</a:t>
+            </a:r>
+            <a:r>
+              <a:rPr lang="en-GB" dirty="0"/>
+              <a:t> as good resources) </a:t>
+            </a:r>
+          </a:p>
+          <a:p>
+            <a:endParaRPr lang="en-GB" dirty="0"/>
+          </a:p>
+          <a:p>
+            <a:endParaRPr lang="en-GB" dirty="0"/>
+          </a:p>
+          <a:p>
+            <a:endParaRPr lang="en-GB" dirty="0"/>
+          </a:p>
+          <a:p>
+            <a:endParaRPr lang="en-GB" dirty="0"/>
+          </a:p>
+        </p:txBody>
+      </p:sp>
+    </p:spTree>
+    <p:extLst>
+      <p:ext uri="{BB962C8B-B14F-4D97-AF65-F5344CB8AC3E}">
+        <p14:creationId xmlns:p14="http://schemas.microsoft.com/office/powerpoint/2010/main" val="2770599664"/>
       </p:ext>
     </p:extLst>
   </p:cSld>

</xml_diff>

<commit_message>
Moved food into the world package
</commit_message>
<xml_diff>
--- a/GopherLife.pptx
+++ b/GopherLife.pptx
@@ -5,7 +5,7 @@
     <p:sldMasterId id="2147483678" r:id="rId1"/>
   </p:sldMasterIdLst>
   <p:notesMasterIdLst>
-    <p:notesMasterId r:id="rId48"/>
+    <p:notesMasterId r:id="rId49"/>
   </p:notesMasterIdLst>
   <p:sldIdLst>
     <p:sldId id="256" r:id="rId2"/>
@@ -23,37 +23,38 @@
     <p:sldId id="281" r:id="rId14"/>
     <p:sldId id="280" r:id="rId15"/>
     <p:sldId id="274" r:id="rId16"/>
-    <p:sldId id="305" r:id="rId17"/>
-    <p:sldId id="275" r:id="rId18"/>
-    <p:sldId id="282" r:id="rId19"/>
-    <p:sldId id="291" r:id="rId20"/>
-    <p:sldId id="288" r:id="rId21"/>
-    <p:sldId id="283" r:id="rId22"/>
-    <p:sldId id="284" r:id="rId23"/>
-    <p:sldId id="290" r:id="rId24"/>
-    <p:sldId id="292" r:id="rId25"/>
-    <p:sldId id="289" r:id="rId26"/>
-    <p:sldId id="293" r:id="rId27"/>
-    <p:sldId id="303" r:id="rId28"/>
-    <p:sldId id="298" r:id="rId29"/>
-    <p:sldId id="299" r:id="rId30"/>
-    <p:sldId id="302" r:id="rId31"/>
-    <p:sldId id="301" r:id="rId32"/>
-    <p:sldId id="300" r:id="rId33"/>
-    <p:sldId id="294" r:id="rId34"/>
-    <p:sldId id="295" r:id="rId35"/>
-    <p:sldId id="285" r:id="rId36"/>
-    <p:sldId id="287" r:id="rId37"/>
-    <p:sldId id="286" r:id="rId38"/>
-    <p:sldId id="266" r:id="rId39"/>
-    <p:sldId id="257" r:id="rId40"/>
-    <p:sldId id="258" r:id="rId41"/>
-    <p:sldId id="259" r:id="rId42"/>
-    <p:sldId id="261" r:id="rId43"/>
-    <p:sldId id="263" r:id="rId44"/>
-    <p:sldId id="262" r:id="rId45"/>
-    <p:sldId id="264" r:id="rId46"/>
-    <p:sldId id="279" r:id="rId47"/>
+    <p:sldId id="275" r:id="rId17"/>
+    <p:sldId id="282" r:id="rId18"/>
+    <p:sldId id="291" r:id="rId19"/>
+    <p:sldId id="288" r:id="rId20"/>
+    <p:sldId id="283" r:id="rId21"/>
+    <p:sldId id="284" r:id="rId22"/>
+    <p:sldId id="290" r:id="rId23"/>
+    <p:sldId id="292" r:id="rId24"/>
+    <p:sldId id="289" r:id="rId25"/>
+    <p:sldId id="293" r:id="rId26"/>
+    <p:sldId id="303" r:id="rId27"/>
+    <p:sldId id="298" r:id="rId28"/>
+    <p:sldId id="299" r:id="rId29"/>
+    <p:sldId id="302" r:id="rId30"/>
+    <p:sldId id="301" r:id="rId31"/>
+    <p:sldId id="300" r:id="rId32"/>
+    <p:sldId id="294" r:id="rId33"/>
+    <p:sldId id="295" r:id="rId34"/>
+    <p:sldId id="285" r:id="rId35"/>
+    <p:sldId id="287" r:id="rId36"/>
+    <p:sldId id="286" r:id="rId37"/>
+    <p:sldId id="266" r:id="rId38"/>
+    <p:sldId id="257" r:id="rId39"/>
+    <p:sldId id="258" r:id="rId40"/>
+    <p:sldId id="259" r:id="rId41"/>
+    <p:sldId id="261" r:id="rId42"/>
+    <p:sldId id="263" r:id="rId43"/>
+    <p:sldId id="262" r:id="rId44"/>
+    <p:sldId id="264" r:id="rId45"/>
+    <p:sldId id="279" r:id="rId46"/>
+    <p:sldId id="305" r:id="rId47"/>
+    <p:sldId id="306" r:id="rId48"/>
   </p:sldIdLst>
   <p:sldSz cx="12192000" cy="6858000"/>
   <p:notesSz cx="6858000" cy="9144000"/>
@@ -242,7 +243,7 @@
           <a:p>
             <a:fld id="{4F997A0C-E4B2-467D-ABDF-C6BB0AD1437F}" type="datetimeFigureOut">
               <a:rPr lang="en-GB" smtClean="0"/>
-              <a:t>11/12/2018</a:t>
+              <a:t>15/12/2018</a:t>
             </a:fld>
             <a:endParaRPr lang="en-GB"/>
           </a:p>
@@ -578,7 +579,7 @@
           <a:p>
             <a:fld id="{D37E09BB-0EE2-4AA1-9043-B532D0F5CCDE}" type="slidenum">
               <a:rPr lang="en-GB" smtClean="0"/>
-              <a:t>42</a:t>
+              <a:t>41</a:t>
             </a:fld>
             <a:endParaRPr lang="en-GB"/>
           </a:p>
@@ -783,7 +784,7 @@
           <a:p>
             <a:fld id="{55E4148D-2AA3-4A29-8641-0082B7E18494}" type="datetimeFigureOut">
               <a:rPr lang="en-GB" smtClean="0"/>
-              <a:t>11/12/2018</a:t>
+              <a:t>15/12/2018</a:t>
             </a:fld>
             <a:endParaRPr lang="en-GB"/>
           </a:p>
@@ -1058,7 +1059,7 @@
           <a:p>
             <a:fld id="{55E4148D-2AA3-4A29-8641-0082B7E18494}" type="datetimeFigureOut">
               <a:rPr lang="en-GB" smtClean="0"/>
-              <a:t>11/12/2018</a:t>
+              <a:t>15/12/2018</a:t>
             </a:fld>
             <a:endParaRPr lang="en-GB"/>
           </a:p>
@@ -1252,7 +1253,7 @@
           <a:p>
             <a:fld id="{55E4148D-2AA3-4A29-8641-0082B7E18494}" type="datetimeFigureOut">
               <a:rPr lang="en-GB" smtClean="0"/>
-              <a:t>11/12/2018</a:t>
+              <a:t>15/12/2018</a:t>
             </a:fld>
             <a:endParaRPr lang="en-GB"/>
           </a:p>
@@ -1525,7 +1526,7 @@
           <a:p>
             <a:fld id="{55E4148D-2AA3-4A29-8641-0082B7E18494}" type="datetimeFigureOut">
               <a:rPr lang="en-GB" smtClean="0"/>
-              <a:t>11/12/2018</a:t>
+              <a:t>15/12/2018</a:t>
             </a:fld>
             <a:endParaRPr lang="en-GB"/>
           </a:p>
@@ -1866,7 +1867,7 @@
           <a:p>
             <a:fld id="{55E4148D-2AA3-4A29-8641-0082B7E18494}" type="datetimeFigureOut">
               <a:rPr lang="en-GB" smtClean="0"/>
-              <a:t>11/12/2018</a:t>
+              <a:t>15/12/2018</a:t>
             </a:fld>
             <a:endParaRPr lang="en-GB"/>
           </a:p>
@@ -2489,7 +2490,7 @@
           <a:p>
             <a:fld id="{55E4148D-2AA3-4A29-8641-0082B7E18494}" type="datetimeFigureOut">
               <a:rPr lang="en-GB" smtClean="0"/>
-              <a:t>11/12/2018</a:t>
+              <a:t>15/12/2018</a:t>
             </a:fld>
             <a:endParaRPr lang="en-GB"/>
           </a:p>
@@ -3349,7 +3350,7 @@
           <a:p>
             <a:fld id="{55E4148D-2AA3-4A29-8641-0082B7E18494}" type="datetimeFigureOut">
               <a:rPr lang="en-GB" smtClean="0"/>
-              <a:t>11/12/2018</a:t>
+              <a:t>15/12/2018</a:t>
             </a:fld>
             <a:endParaRPr lang="en-GB"/>
           </a:p>
@@ -3519,7 +3520,7 @@
           <a:p>
             <a:fld id="{55E4148D-2AA3-4A29-8641-0082B7E18494}" type="datetimeFigureOut">
               <a:rPr lang="en-GB" smtClean="0"/>
-              <a:t>11/12/2018</a:t>
+              <a:t>15/12/2018</a:t>
             </a:fld>
             <a:endParaRPr lang="en-GB"/>
           </a:p>
@@ -3699,7 +3700,7 @@
           <a:p>
             <a:fld id="{55E4148D-2AA3-4A29-8641-0082B7E18494}" type="datetimeFigureOut">
               <a:rPr lang="en-GB" smtClean="0"/>
-              <a:t>11/12/2018</a:t>
+              <a:t>15/12/2018</a:t>
             </a:fld>
             <a:endParaRPr lang="en-GB"/>
           </a:p>
@@ -3869,7 +3870,7 @@
           <a:p>
             <a:fld id="{55E4148D-2AA3-4A29-8641-0082B7E18494}" type="datetimeFigureOut">
               <a:rPr lang="en-GB" smtClean="0"/>
-              <a:t>11/12/2018</a:t>
+              <a:t>15/12/2018</a:t>
             </a:fld>
             <a:endParaRPr lang="en-GB"/>
           </a:p>
@@ -4116,7 +4117,7 @@
           <a:p>
             <a:fld id="{55E4148D-2AA3-4A29-8641-0082B7E18494}" type="datetimeFigureOut">
               <a:rPr lang="en-GB" smtClean="0"/>
-              <a:t>11/12/2018</a:t>
+              <a:t>15/12/2018</a:t>
             </a:fld>
             <a:endParaRPr lang="en-GB"/>
           </a:p>
@@ -4408,7 +4409,7 @@
           <a:p>
             <a:fld id="{55E4148D-2AA3-4A29-8641-0082B7E18494}" type="datetimeFigureOut">
               <a:rPr lang="en-GB" smtClean="0"/>
-              <a:t>11/12/2018</a:t>
+              <a:t>15/12/2018</a:t>
             </a:fld>
             <a:endParaRPr lang="en-GB"/>
           </a:p>
@@ -4852,7 +4853,7 @@
           <a:p>
             <a:fld id="{55E4148D-2AA3-4A29-8641-0082B7E18494}" type="datetimeFigureOut">
               <a:rPr lang="en-GB" smtClean="0"/>
-              <a:t>11/12/2018</a:t>
+              <a:t>15/12/2018</a:t>
             </a:fld>
             <a:endParaRPr lang="en-GB"/>
           </a:p>
@@ -4970,7 +4971,7 @@
           <a:p>
             <a:fld id="{55E4148D-2AA3-4A29-8641-0082B7E18494}" type="datetimeFigureOut">
               <a:rPr lang="en-GB" smtClean="0"/>
-              <a:t>11/12/2018</a:t>
+              <a:t>15/12/2018</a:t>
             </a:fld>
             <a:endParaRPr lang="en-GB"/>
           </a:p>
@@ -5065,7 +5066,7 @@
           <a:p>
             <a:fld id="{55E4148D-2AA3-4A29-8641-0082B7E18494}" type="datetimeFigureOut">
               <a:rPr lang="en-GB" smtClean="0"/>
-              <a:t>11/12/2018</a:t>
+              <a:t>15/12/2018</a:t>
             </a:fld>
             <a:endParaRPr lang="en-GB"/>
           </a:p>
@@ -5344,7 +5345,7 @@
           <a:p>
             <a:fld id="{55E4148D-2AA3-4A29-8641-0082B7E18494}" type="datetimeFigureOut">
               <a:rPr lang="en-GB" smtClean="0"/>
-              <a:t>11/12/2018</a:t>
+              <a:t>15/12/2018</a:t>
             </a:fld>
             <a:endParaRPr lang="en-GB"/>
           </a:p>
@@ -5619,7 +5620,7 @@
           <a:p>
             <a:fld id="{55E4148D-2AA3-4A29-8641-0082B7E18494}" type="datetimeFigureOut">
               <a:rPr lang="en-GB" smtClean="0"/>
-              <a:t>11/12/2018</a:t>
+              <a:t>15/12/2018</a:t>
             </a:fld>
             <a:endParaRPr lang="en-GB"/>
           </a:p>
@@ -6048,7 +6049,7 @@
           <a:p>
             <a:fld id="{55E4148D-2AA3-4A29-8641-0082B7E18494}" type="datetimeFigureOut">
               <a:rPr lang="en-GB" smtClean="0"/>
-              <a:t>11/12/2018</a:t>
+              <a:t>15/12/2018</a:t>
             </a:fld>
             <a:endParaRPr lang="en-GB"/>
           </a:p>
@@ -7541,92 +7542,6 @@
           <p:cNvPr id="2" name="Title 1">
             <a:extLst>
               <a:ext uri="{FF2B5EF4-FFF2-40B4-BE49-F238E27FC236}">
-                <a16:creationId xmlns:a16="http://schemas.microsoft.com/office/drawing/2014/main" id="{54FB6E9E-F299-4AF5-80AC-C6B2D6BC8758}"/>
-              </a:ext>
-            </a:extLst>
-          </p:cNvPr>
-          <p:cNvSpPr>
-            <a:spLocks noGrp="1"/>
-          </p:cNvSpPr>
-          <p:nvPr>
-            <p:ph type="title"/>
-          </p:nvPr>
-        </p:nvSpPr>
-        <p:spPr/>
-        <p:txBody>
-          <a:bodyPr/>
-          <a:lstStyle/>
-          <a:p>
-            <a:r>
-              <a:rPr lang="en-GB" dirty="0"/>
-              <a:t>Mistakes 2 </a:t>
-            </a:r>
-          </a:p>
-        </p:txBody>
-      </p:sp>
-      <p:sp>
-        <p:nvSpPr>
-          <p:cNvPr id="3" name="Content Placeholder 2">
-            <a:extLst>
-              <a:ext uri="{FF2B5EF4-FFF2-40B4-BE49-F238E27FC236}">
-                <a16:creationId xmlns:a16="http://schemas.microsoft.com/office/drawing/2014/main" id="{2611C55B-64F9-4512-96E3-D96C582E3AA6}"/>
-              </a:ext>
-            </a:extLst>
-          </p:cNvPr>
-          <p:cNvSpPr>
-            <a:spLocks noGrp="1"/>
-          </p:cNvSpPr>
-          <p:nvPr>
-            <p:ph idx="1"/>
-          </p:nvPr>
-        </p:nvSpPr>
-        <p:spPr/>
-        <p:txBody>
-          <a:bodyPr/>
-          <a:lstStyle/>
-          <a:p>
-            <a:r>
-              <a:rPr lang="en-GB" dirty="0"/>
-              <a:t>$GOPATH is a thing. </a:t>
-            </a:r>
-          </a:p>
-        </p:txBody>
-      </p:sp>
-    </p:spTree>
-    <p:extLst>
-      <p:ext uri="{BB962C8B-B14F-4D97-AF65-F5344CB8AC3E}">
-        <p14:creationId xmlns:p14="http://schemas.microsoft.com/office/powerpoint/2010/main" val="934833991"/>
-      </p:ext>
-    </p:extLst>
-  </p:cSld>
-  <p:clrMapOvr>
-    <a:masterClrMapping/>
-  </p:clrMapOvr>
-</p:sld>
-</file>
-
-<file path=ppt/slides/slide17.xml><?xml version="1.0" encoding="utf-8"?>
-<p:sld xmlns:a="http://schemas.openxmlformats.org/drawingml/2006/main" xmlns:r="http://schemas.openxmlformats.org/officeDocument/2006/relationships" xmlns:p="http://schemas.openxmlformats.org/presentationml/2006/main">
-  <p:cSld>
-    <p:spTree>
-      <p:nvGrpSpPr>
-        <p:cNvPr id="1" name=""/>
-        <p:cNvGrpSpPr/>
-        <p:nvPr/>
-      </p:nvGrpSpPr>
-      <p:grpSpPr>
-        <a:xfrm>
-          <a:off x="0" y="0"/>
-          <a:ext cx="0" cy="0"/>
-          <a:chOff x="0" y="0"/>
-          <a:chExt cx="0" cy="0"/>
-        </a:xfrm>
-      </p:grpSpPr>
-      <p:sp>
-        <p:nvSpPr>
-          <p:cNvPr id="2" name="Title 1">
-            <a:extLst>
-              <a:ext uri="{FF2B5EF4-FFF2-40B4-BE49-F238E27FC236}">
                 <a16:creationId xmlns:a16="http://schemas.microsoft.com/office/drawing/2014/main" id="{BF87F792-881D-45E8-AE31-8DF9ADAEFECE}"/>
               </a:ext>
             </a:extLst>
@@ -7725,7 +7640,7 @@
 </p:sld>
 </file>
 
-<file path=ppt/slides/slide18.xml><?xml version="1.0" encoding="utf-8"?>
+<file path=ppt/slides/slide17.xml><?xml version="1.0" encoding="utf-8"?>
 <p:sld xmlns:a="http://schemas.openxmlformats.org/drawingml/2006/main" xmlns:r="http://schemas.openxmlformats.org/officeDocument/2006/relationships" xmlns:p="http://schemas.openxmlformats.org/presentationml/2006/main">
   <p:cSld>
     <p:spTree>
@@ -7888,6 +7803,89 @@
 </p:sld>
 </file>
 
+<file path=ppt/slides/slide18.xml><?xml version="1.0" encoding="utf-8"?>
+<p:sld xmlns:a="http://schemas.openxmlformats.org/drawingml/2006/main" xmlns:r="http://schemas.openxmlformats.org/officeDocument/2006/relationships" xmlns:p="http://schemas.openxmlformats.org/presentationml/2006/main">
+  <p:cSld>
+    <p:spTree>
+      <p:nvGrpSpPr>
+        <p:cNvPr id="1" name=""/>
+        <p:cNvGrpSpPr/>
+        <p:nvPr/>
+      </p:nvGrpSpPr>
+      <p:grpSpPr>
+        <a:xfrm>
+          <a:off x="0" y="0"/>
+          <a:ext cx="0" cy="0"/>
+          <a:chOff x="0" y="0"/>
+          <a:chExt cx="0" cy="0"/>
+        </a:xfrm>
+      </p:grpSpPr>
+      <p:sp>
+        <p:nvSpPr>
+          <p:cNvPr id="2" name="Title 1">
+            <a:extLst>
+              <a:ext uri="{FF2B5EF4-FFF2-40B4-BE49-F238E27FC236}">
+                <a16:creationId xmlns:a16="http://schemas.microsoft.com/office/drawing/2014/main" id="{B1B69005-AC4F-4731-BD4E-09D539987B55}"/>
+              </a:ext>
+            </a:extLst>
+          </p:cNvPr>
+          <p:cNvSpPr>
+            <a:spLocks noGrp="1"/>
+          </p:cNvSpPr>
+          <p:nvPr>
+            <p:ph type="title"/>
+          </p:nvPr>
+        </p:nvSpPr>
+        <p:spPr/>
+        <p:txBody>
+          <a:bodyPr/>
+          <a:lstStyle/>
+          <a:p>
+            <a:r>
+              <a:rPr lang="en-GB" dirty="0"/>
+              <a:t>Solutions</a:t>
+            </a:r>
+          </a:p>
+        </p:txBody>
+      </p:sp>
+      <p:sp>
+        <p:nvSpPr>
+          <p:cNvPr id="5" name="Content Placeholder 4">
+            <a:extLst>
+              <a:ext uri="{FF2B5EF4-FFF2-40B4-BE49-F238E27FC236}">
+                <a16:creationId xmlns:a16="http://schemas.microsoft.com/office/drawing/2014/main" id="{BBBF52A4-BB0E-45F5-8DD4-ECE7DE140C56}"/>
+              </a:ext>
+            </a:extLst>
+          </p:cNvPr>
+          <p:cNvSpPr>
+            <a:spLocks noGrp="1"/>
+          </p:cNvSpPr>
+          <p:nvPr>
+            <p:ph idx="1"/>
+          </p:nvPr>
+        </p:nvSpPr>
+        <p:spPr/>
+        <p:txBody>
+          <a:bodyPr/>
+          <a:lstStyle/>
+          <a:p>
+            <a:endParaRPr lang="en-GB"/>
+          </a:p>
+        </p:txBody>
+      </p:sp>
+    </p:spTree>
+    <p:extLst>
+      <p:ext uri="{BB962C8B-B14F-4D97-AF65-F5344CB8AC3E}">
+        <p14:creationId xmlns:p14="http://schemas.microsoft.com/office/powerpoint/2010/main" val="3708281905"/>
+      </p:ext>
+    </p:extLst>
+  </p:cSld>
+  <p:clrMapOvr>
+    <a:masterClrMapping/>
+  </p:clrMapOvr>
+</p:sld>
+</file>
+
 <file path=ppt/slides/slide19.xml><?xml version="1.0" encoding="utf-8"?>
 <p:sld xmlns:a="http://schemas.openxmlformats.org/drawingml/2006/main" xmlns:r="http://schemas.openxmlformats.org/officeDocument/2006/relationships" xmlns:p="http://schemas.openxmlformats.org/presentationml/2006/main">
   <p:cSld>
@@ -7910,7 +7908,7 @@
           <p:cNvPr id="2" name="Title 1">
             <a:extLst>
               <a:ext uri="{FF2B5EF4-FFF2-40B4-BE49-F238E27FC236}">
-                <a16:creationId xmlns:a16="http://schemas.microsoft.com/office/drawing/2014/main" id="{B1B69005-AC4F-4731-BD4E-09D539987B55}"/>
+                <a16:creationId xmlns:a16="http://schemas.microsoft.com/office/drawing/2014/main" id="{AA01FFF3-EC99-4485-B32E-E2E568D47B5F}"/>
               </a:ext>
             </a:extLst>
           </p:cNvPr>
@@ -7928,17 +7926,17 @@
           <a:p>
             <a:r>
               <a:rPr lang="en-GB" dirty="0"/>
-              <a:t>Solutions</a:t>
-            </a:r>
-          </a:p>
-        </p:txBody>
-      </p:sp>
-      <p:sp>
-        <p:nvSpPr>
-          <p:cNvPr id="5" name="Content Placeholder 4">
+              <a:t>Progress Checklist 3 - 10</a:t>
+            </a:r>
+          </a:p>
+        </p:txBody>
+      </p:sp>
+      <p:sp>
+        <p:nvSpPr>
+          <p:cNvPr id="3" name="Content Placeholder 2">
             <a:extLst>
               <a:ext uri="{FF2B5EF4-FFF2-40B4-BE49-F238E27FC236}">
-                <a16:creationId xmlns:a16="http://schemas.microsoft.com/office/drawing/2014/main" id="{BBBF52A4-BB0E-45F5-8DD4-ECE7DE140C56}"/>
+                <a16:creationId xmlns:a16="http://schemas.microsoft.com/office/drawing/2014/main" id="{A2755EB5-1D4C-4DDE-A6D0-AFBE7C6CD484}"/>
               </a:ext>
             </a:extLst>
           </p:cNvPr>
@@ -7954,14 +7952,83 @@
           <a:bodyPr/>
           <a:lstStyle/>
           <a:p>
-            <a:endParaRPr lang="en-GB"/>
+            <a:r>
+              <a:rPr lang="en-GB" dirty="0"/>
+              <a:t>Project Structure and avoiding Circular Dependencies </a:t>
+            </a:r>
+            <a:r>
+              <a:rPr lang="en-GB" dirty="0">
+                <a:latin typeface="Segoe MDL2 Assets" panose="050A0102010101010101" pitchFamily="18" charset="0"/>
+              </a:rPr>
+              <a:t></a:t>
+            </a:r>
+          </a:p>
+          <a:p>
+            <a:endParaRPr lang="en-GB" dirty="0"/>
+          </a:p>
+          <a:p>
+            <a:r>
+              <a:rPr lang="en-GB" dirty="0"/>
+              <a:t>GOPATH and where to place your projects </a:t>
+            </a:r>
+            <a:r>
+              <a:rPr lang="en-GB" dirty="0">
+                <a:latin typeface="Segoe MDL2 Assets" panose="050A0102010101010101" pitchFamily="18" charset="0"/>
+              </a:rPr>
+              <a:t></a:t>
+            </a:r>
+          </a:p>
+          <a:p>
+            <a:endParaRPr lang="en-GB" dirty="0"/>
+          </a:p>
+          <a:p>
+            <a:r>
+              <a:rPr lang="en-GB" dirty="0"/>
+              <a:t>Implementing Basic Pathing Using Coordinates </a:t>
+            </a:r>
+            <a:r>
+              <a:rPr lang="en-GB" dirty="0">
+                <a:latin typeface="Segoe MDL2 Assets" panose="050A0102010101010101" pitchFamily="18" charset="0"/>
+              </a:rPr>
+              <a:t></a:t>
+            </a:r>
+          </a:p>
+          <a:p>
+            <a:endParaRPr lang="en-GB" dirty="0">
+              <a:latin typeface="Segoe MDL2 Assets" panose="050A0102010101010101" pitchFamily="18" charset="0"/>
+            </a:endParaRPr>
+          </a:p>
+          <a:p>
+            <a:r>
+              <a:rPr lang="en-GB" dirty="0"/>
+              <a:t>Improve understanding of how different structures interact concurrently </a:t>
+            </a:r>
+            <a:r>
+              <a:rPr lang="en-GB" dirty="0">
+                <a:latin typeface="Segoe MDL2 Assets" panose="050A0102010101010101" pitchFamily="18" charset="0"/>
+              </a:rPr>
+              <a:t></a:t>
+            </a:r>
+          </a:p>
+          <a:p>
+            <a:endParaRPr lang="en-GB" dirty="0">
+              <a:latin typeface="Segoe MDL2 Assets" panose="050A0102010101010101" pitchFamily="18" charset="0"/>
+            </a:endParaRPr>
+          </a:p>
+          <a:p>
+            <a:endParaRPr lang="en-GB" dirty="0">
+              <a:latin typeface="Segoe MDL2 Assets" panose="050A0102010101010101" pitchFamily="18" charset="0"/>
+            </a:endParaRPr>
+          </a:p>
+          <a:p>
+            <a:endParaRPr lang="en-GB" dirty="0"/>
           </a:p>
         </p:txBody>
       </p:sp>
     </p:spTree>
     <p:extLst>
       <p:ext uri="{BB962C8B-B14F-4D97-AF65-F5344CB8AC3E}">
-        <p14:creationId xmlns:p14="http://schemas.microsoft.com/office/powerpoint/2010/main" val="3708281905"/>
+        <p14:creationId xmlns:p14="http://schemas.microsoft.com/office/powerpoint/2010/main" val="3768594580"/>
       </p:ext>
     </p:extLst>
   </p:cSld>
@@ -8127,7 +8194,7 @@
           <p:cNvPr id="2" name="Title 1">
             <a:extLst>
               <a:ext uri="{FF2B5EF4-FFF2-40B4-BE49-F238E27FC236}">
-                <a16:creationId xmlns:a16="http://schemas.microsoft.com/office/drawing/2014/main" id="{AA01FFF3-EC99-4485-B32E-E2E568D47B5F}"/>
+                <a16:creationId xmlns:a16="http://schemas.microsoft.com/office/drawing/2014/main" id="{D2EE31CB-2F81-4A36-8A60-7DA0689FF389}"/>
               </a:ext>
             </a:extLst>
           </p:cNvPr>
@@ -8145,7 +8212,7 @@
           <a:p>
             <a:r>
               <a:rPr lang="en-GB" dirty="0"/>
-              <a:t>Progress Checklist 3 - 10</a:t>
+              <a:t>Problem 4 – Visual Representation</a:t>
             </a:r>
           </a:p>
         </p:txBody>
@@ -8155,7 +8222,7 @@
           <p:cNvPr id="3" name="Content Placeholder 2">
             <a:extLst>
               <a:ext uri="{FF2B5EF4-FFF2-40B4-BE49-F238E27FC236}">
-                <a16:creationId xmlns:a16="http://schemas.microsoft.com/office/drawing/2014/main" id="{A2755EB5-1D4C-4DDE-A6D0-AFBE7C6CD484}"/>
+                <a16:creationId xmlns:a16="http://schemas.microsoft.com/office/drawing/2014/main" id="{A8B919FE-5B99-442A-897F-39F7A3FBA3BF}"/>
               </a:ext>
             </a:extLst>
           </p:cNvPr>
@@ -8173,71 +8240,26 @@
           <a:p>
             <a:r>
               <a:rPr lang="en-GB" dirty="0"/>
-              <a:t>Project Structure and avoiding Circular Dependencies </a:t>
-            </a:r>
-            <a:r>
-              <a:rPr lang="en-GB" dirty="0">
-                <a:latin typeface="Segoe MDL2 Assets" panose="050A0102010101010101" pitchFamily="18" charset="0"/>
-              </a:rPr>
-              <a:t></a:t>
+              <a:t>I have no idea what I’m doing or if it works</a:t>
             </a:r>
           </a:p>
           <a:p>
             <a:endParaRPr lang="en-GB" dirty="0"/>
           </a:p>
           <a:p>
-            <a:r>
-              <a:rPr lang="en-GB" dirty="0"/>
-              <a:t>GOPATH and where to place your projects </a:t>
-            </a:r>
-            <a:r>
-              <a:rPr lang="en-GB" dirty="0">
-                <a:latin typeface="Segoe MDL2 Assets" panose="050A0102010101010101" pitchFamily="18" charset="0"/>
-              </a:rPr>
-              <a:t></a:t>
-            </a:r>
-          </a:p>
-          <a:p>
             <a:endParaRPr lang="en-GB" dirty="0"/>
           </a:p>
           <a:p>
-            <a:r>
-              <a:rPr lang="en-GB" dirty="0"/>
-              <a:t>Implementing Basic Pathing Using Coordinates </a:t>
-            </a:r>
-            <a:r>
-              <a:rPr lang="en-GB" dirty="0">
-                <a:latin typeface="Segoe MDL2 Assets" panose="050A0102010101010101" pitchFamily="18" charset="0"/>
-              </a:rPr>
-              <a:t></a:t>
-            </a:r>
-          </a:p>
-          <a:p>
-            <a:endParaRPr lang="en-GB" dirty="0">
-              <a:latin typeface="Segoe MDL2 Assets" panose="050A0102010101010101" pitchFamily="18" charset="0"/>
-            </a:endParaRPr>
-          </a:p>
-          <a:p>
-            <a:r>
-              <a:rPr lang="en-GB" dirty="0"/>
-              <a:t>Improve understanding of how different structures interact concurrently </a:t>
-            </a:r>
-            <a:r>
-              <a:rPr lang="en-GB" dirty="0">
-                <a:latin typeface="Segoe MDL2 Assets" panose="050A0102010101010101" pitchFamily="18" charset="0"/>
-              </a:rPr>
-              <a:t></a:t>
-            </a:r>
-          </a:p>
-          <a:p>
-            <a:endParaRPr lang="en-GB" dirty="0">
-              <a:latin typeface="Segoe MDL2 Assets" panose="050A0102010101010101" pitchFamily="18" charset="0"/>
-            </a:endParaRPr>
-          </a:p>
-          <a:p>
-            <a:endParaRPr lang="en-GB" dirty="0">
-              <a:latin typeface="Segoe MDL2 Assets" panose="050A0102010101010101" pitchFamily="18" charset="0"/>
-            </a:endParaRPr>
+            <a:endParaRPr lang="en-GB" dirty="0"/>
+          </a:p>
+          <a:p>
+            <a:endParaRPr lang="en-GB" dirty="0"/>
+          </a:p>
+          <a:p>
+            <a:endParaRPr lang="en-GB" dirty="0"/>
+          </a:p>
+          <a:p>
+            <a:endParaRPr lang="en-GB" dirty="0"/>
           </a:p>
           <a:p>
             <a:endParaRPr lang="en-GB" dirty="0"/>
@@ -8247,7 +8269,7 @@
     </p:spTree>
     <p:extLst>
       <p:ext uri="{BB962C8B-B14F-4D97-AF65-F5344CB8AC3E}">
-        <p14:creationId xmlns:p14="http://schemas.microsoft.com/office/powerpoint/2010/main" val="3768594580"/>
+        <p14:creationId xmlns:p14="http://schemas.microsoft.com/office/powerpoint/2010/main" val="52941393"/>
       </p:ext>
     </p:extLst>
   </p:cSld>
@@ -8279,7 +8301,7 @@
           <p:cNvPr id="2" name="Title 1">
             <a:extLst>
               <a:ext uri="{FF2B5EF4-FFF2-40B4-BE49-F238E27FC236}">
-                <a16:creationId xmlns:a16="http://schemas.microsoft.com/office/drawing/2014/main" id="{D2EE31CB-2F81-4A36-8A60-7DA0689FF389}"/>
+                <a16:creationId xmlns:a16="http://schemas.microsoft.com/office/drawing/2014/main" id="{E2D24B9C-4460-4D79-AE21-23356AF1FB37}"/>
               </a:ext>
             </a:extLst>
           </p:cNvPr>
@@ -8297,7 +8319,7 @@
           <a:p>
             <a:r>
               <a:rPr lang="en-GB" dirty="0"/>
-              <a:t>Problem 4 – Visual Representation</a:t>
+              <a:t>Solutions</a:t>
             </a:r>
           </a:p>
         </p:txBody>
@@ -8307,7 +8329,7 @@
           <p:cNvPr id="3" name="Content Placeholder 2">
             <a:extLst>
               <a:ext uri="{FF2B5EF4-FFF2-40B4-BE49-F238E27FC236}">
-                <a16:creationId xmlns:a16="http://schemas.microsoft.com/office/drawing/2014/main" id="{A8B919FE-5B99-442A-897F-39F7A3FBA3BF}"/>
+                <a16:creationId xmlns:a16="http://schemas.microsoft.com/office/drawing/2014/main" id="{DBA319FF-5EEE-4C2D-B80B-5DF0D120CF5E}"/>
               </a:ext>
             </a:extLst>
           </p:cNvPr>
@@ -8325,36 +8347,15 @@
           <a:p>
             <a:r>
               <a:rPr lang="en-GB" dirty="0"/>
-              <a:t>I have no idea what I’m doing or if it works</a:t>
-            </a:r>
-          </a:p>
-          <a:p>
-            <a:endParaRPr lang="en-GB" dirty="0"/>
-          </a:p>
-          <a:p>
-            <a:endParaRPr lang="en-GB" dirty="0"/>
-          </a:p>
-          <a:p>
-            <a:endParaRPr lang="en-GB" dirty="0"/>
-          </a:p>
-          <a:p>
-            <a:endParaRPr lang="en-GB" dirty="0"/>
-          </a:p>
-          <a:p>
-            <a:endParaRPr lang="en-GB" dirty="0"/>
-          </a:p>
-          <a:p>
-            <a:endParaRPr lang="en-GB" dirty="0"/>
-          </a:p>
-          <a:p>
-            <a:endParaRPr lang="en-GB" dirty="0"/>
+              <a:t>Render the world using </a:t>
+            </a:r>
           </a:p>
         </p:txBody>
       </p:sp>
     </p:spTree>
     <p:extLst>
       <p:ext uri="{BB962C8B-B14F-4D97-AF65-F5344CB8AC3E}">
-        <p14:creationId xmlns:p14="http://schemas.microsoft.com/office/powerpoint/2010/main" val="52941393"/>
+        <p14:creationId xmlns:p14="http://schemas.microsoft.com/office/powerpoint/2010/main" val="1519006128"/>
       </p:ext>
     </p:extLst>
   </p:cSld>
@@ -8386,7 +8387,7 @@
           <p:cNvPr id="2" name="Title 1">
             <a:extLst>
               <a:ext uri="{FF2B5EF4-FFF2-40B4-BE49-F238E27FC236}">
-                <a16:creationId xmlns:a16="http://schemas.microsoft.com/office/drawing/2014/main" id="{E2D24B9C-4460-4D79-AE21-23356AF1FB37}"/>
+                <a16:creationId xmlns:a16="http://schemas.microsoft.com/office/drawing/2014/main" id="{0BB2E70A-E100-4BA0-95EC-7B26B97549BA}"/>
               </a:ext>
             </a:extLst>
           </p:cNvPr>
@@ -8404,7 +8405,7 @@
           <a:p>
             <a:r>
               <a:rPr lang="en-GB" dirty="0"/>
-              <a:t>Solutions</a:t>
+              <a:t>Progress Checklist 11-14</a:t>
             </a:r>
           </a:p>
         </p:txBody>
@@ -8414,7 +8415,7 @@
           <p:cNvPr id="3" name="Content Placeholder 2">
             <a:extLst>
               <a:ext uri="{FF2B5EF4-FFF2-40B4-BE49-F238E27FC236}">
-                <a16:creationId xmlns:a16="http://schemas.microsoft.com/office/drawing/2014/main" id="{DBA319FF-5EEE-4C2D-B80B-5DF0D120CF5E}"/>
+                <a16:creationId xmlns:a16="http://schemas.microsoft.com/office/drawing/2014/main" id="{00B55E60-9E9B-4A07-AD19-88E525512438}"/>
               </a:ext>
             </a:extLst>
           </p:cNvPr>
@@ -8432,15 +8433,60 @@
           <a:p>
             <a:r>
               <a:rPr lang="en-GB" dirty="0"/>
-              <a:t>Render the world using </a:t>
-            </a:r>
+              <a:t>Learnt how to use http/html packages for rendering a webpage </a:t>
+            </a:r>
+            <a:r>
+              <a:rPr lang="en-GB" dirty="0">
+                <a:latin typeface="Segoe MDL2 Assets" panose="050A0102010101010101" pitchFamily="18" charset="0"/>
+              </a:rPr>
+              <a:t></a:t>
+            </a:r>
+          </a:p>
+          <a:p>
+            <a:endParaRPr lang="en-GB" dirty="0"/>
+          </a:p>
+          <a:p>
+            <a:r>
+              <a:rPr lang="en-GB" dirty="0"/>
+              <a:t>Learnt how to use http function handlers </a:t>
+            </a:r>
+            <a:r>
+              <a:rPr lang="en-GB" dirty="0">
+                <a:latin typeface="Segoe MDL2 Assets" panose="050A0102010101010101" pitchFamily="18" charset="0"/>
+              </a:rPr>
+              <a:t></a:t>
+            </a:r>
+          </a:p>
+          <a:p>
+            <a:endParaRPr lang="en-GB" dirty="0"/>
+          </a:p>
+          <a:p>
+            <a:r>
+              <a:rPr lang="en-GB" dirty="0"/>
+              <a:t>Learnt a bit about </a:t>
+            </a:r>
+            <a:r>
+              <a:rPr lang="en-GB" dirty="0" err="1"/>
+              <a:t>css</a:t>
+            </a:r>
+            <a:r>
+              <a:rPr lang="en-GB" dirty="0"/>
+              <a:t> grid </a:t>
+            </a:r>
+            <a:r>
+              <a:rPr lang="en-GB" dirty="0">
+                <a:latin typeface="Segoe MDL2 Assets" panose="050A0102010101010101" pitchFamily="18" charset="0"/>
+              </a:rPr>
+              <a:t></a:t>
+            </a:r>
+            <a:endParaRPr lang="en-GB" dirty="0"/>
           </a:p>
         </p:txBody>
       </p:sp>
     </p:spTree>
     <p:extLst>
       <p:ext uri="{BB962C8B-B14F-4D97-AF65-F5344CB8AC3E}">
-        <p14:creationId xmlns:p14="http://schemas.microsoft.com/office/powerpoint/2010/main" val="1519006128"/>
+        <p14:creationId xmlns:p14="http://schemas.microsoft.com/office/powerpoint/2010/main" val="3521459611"/>
       </p:ext>
     </p:extLst>
   </p:cSld>
@@ -8472,7 +8518,7 @@
           <p:cNvPr id="2" name="Title 1">
             <a:extLst>
               <a:ext uri="{FF2B5EF4-FFF2-40B4-BE49-F238E27FC236}">
-                <a16:creationId xmlns:a16="http://schemas.microsoft.com/office/drawing/2014/main" id="{0BB2E70A-E100-4BA0-95EC-7B26B97549BA}"/>
+                <a16:creationId xmlns:a16="http://schemas.microsoft.com/office/drawing/2014/main" id="{0B70B174-F9FD-432F-9D87-8193A5BF99F5}"/>
               </a:ext>
             </a:extLst>
           </p:cNvPr>
@@ -8490,7 +8536,7 @@
           <a:p>
             <a:r>
               <a:rPr lang="en-GB" dirty="0"/>
-              <a:t>Progress Checklist 11-14</a:t>
+              <a:t>Solutions – Early Demo</a:t>
             </a:r>
           </a:p>
         </p:txBody>
@@ -8500,7 +8546,7 @@
           <p:cNvPr id="3" name="Content Placeholder 2">
             <a:extLst>
               <a:ext uri="{FF2B5EF4-FFF2-40B4-BE49-F238E27FC236}">
-                <a16:creationId xmlns:a16="http://schemas.microsoft.com/office/drawing/2014/main" id="{00B55E60-9E9B-4A07-AD19-88E525512438}"/>
+                <a16:creationId xmlns:a16="http://schemas.microsoft.com/office/drawing/2014/main" id="{9CCEF8BA-DD87-47C3-8861-0A56DB73CB4C}"/>
               </a:ext>
             </a:extLst>
           </p:cNvPr>
@@ -8516,54 +8562,6 @@
           <a:bodyPr/>
           <a:lstStyle/>
           <a:p>
-            <a:r>
-              <a:rPr lang="en-GB" dirty="0"/>
-              <a:t>Learnt how to use http/html packages for rendering a webpage </a:t>
-            </a:r>
-            <a:r>
-              <a:rPr lang="en-GB" dirty="0">
-                <a:latin typeface="Segoe MDL2 Assets" panose="050A0102010101010101" pitchFamily="18" charset="0"/>
-              </a:rPr>
-              <a:t></a:t>
-            </a:r>
-          </a:p>
-          <a:p>
-            <a:endParaRPr lang="en-GB" dirty="0"/>
-          </a:p>
-          <a:p>
-            <a:r>
-              <a:rPr lang="en-GB" dirty="0"/>
-              <a:t>Learnt how to use http function handlers </a:t>
-            </a:r>
-            <a:r>
-              <a:rPr lang="en-GB" dirty="0">
-                <a:latin typeface="Segoe MDL2 Assets" panose="050A0102010101010101" pitchFamily="18" charset="0"/>
-              </a:rPr>
-              <a:t></a:t>
-            </a:r>
-          </a:p>
-          <a:p>
-            <a:endParaRPr lang="en-GB" dirty="0"/>
-          </a:p>
-          <a:p>
-            <a:r>
-              <a:rPr lang="en-GB" dirty="0"/>
-              <a:t>Learnt a bit about </a:t>
-            </a:r>
-            <a:r>
-              <a:rPr lang="en-GB" dirty="0" err="1"/>
-              <a:t>css</a:t>
-            </a:r>
-            <a:r>
-              <a:rPr lang="en-GB" dirty="0"/>
-              <a:t> grid </a:t>
-            </a:r>
-            <a:r>
-              <a:rPr lang="en-GB" dirty="0">
-                <a:latin typeface="Segoe MDL2 Assets" panose="050A0102010101010101" pitchFamily="18" charset="0"/>
-              </a:rPr>
-              <a:t></a:t>
-            </a:r>
             <a:endParaRPr lang="en-GB" dirty="0"/>
           </a:p>
         </p:txBody>
@@ -8571,7 +8569,7 @@
     </p:spTree>
     <p:extLst>
       <p:ext uri="{BB962C8B-B14F-4D97-AF65-F5344CB8AC3E}">
-        <p14:creationId xmlns:p14="http://schemas.microsoft.com/office/powerpoint/2010/main" val="3521459611"/>
+        <p14:creationId xmlns:p14="http://schemas.microsoft.com/office/powerpoint/2010/main" val="1692078946"/>
       </p:ext>
     </p:extLst>
   </p:cSld>
@@ -8603,7 +8601,7 @@
           <p:cNvPr id="2" name="Title 1">
             <a:extLst>
               <a:ext uri="{FF2B5EF4-FFF2-40B4-BE49-F238E27FC236}">
-                <a16:creationId xmlns:a16="http://schemas.microsoft.com/office/drawing/2014/main" id="{0B70B174-F9FD-432F-9D87-8193A5BF99F5}"/>
+                <a16:creationId xmlns:a16="http://schemas.microsoft.com/office/drawing/2014/main" id="{75C50CEC-C87D-40B9-990D-303CFFD16359}"/>
               </a:ext>
             </a:extLst>
           </p:cNvPr>
@@ -8621,7 +8619,7 @@
           <a:p>
             <a:r>
               <a:rPr lang="en-GB" dirty="0"/>
-              <a:t>Solutions – Early Demo</a:t>
+              <a:t>Problem 5 - Optimization</a:t>
             </a:r>
           </a:p>
         </p:txBody>
@@ -8631,7 +8629,7 @@
           <p:cNvPr id="3" name="Content Placeholder 2">
             <a:extLst>
               <a:ext uri="{FF2B5EF4-FFF2-40B4-BE49-F238E27FC236}">
-                <a16:creationId xmlns:a16="http://schemas.microsoft.com/office/drawing/2014/main" id="{9CCEF8BA-DD87-47C3-8861-0A56DB73CB4C}"/>
+                <a16:creationId xmlns:a16="http://schemas.microsoft.com/office/drawing/2014/main" id="{6CE96895-52F6-414F-B7B4-DBAF2D31353D}"/>
               </a:ext>
             </a:extLst>
           </p:cNvPr>
@@ -8647,14 +8645,17 @@
           <a:bodyPr/>
           <a:lstStyle/>
           <a:p>
-            <a:endParaRPr lang="en-GB" dirty="0"/>
+            <a:r>
+              <a:rPr lang="en-GB" dirty="0"/>
+              <a:t>As the number of gophers increased the time it takes to process each gopher also increases. </a:t>
+            </a:r>
           </a:p>
         </p:txBody>
       </p:sp>
     </p:spTree>
     <p:extLst>
       <p:ext uri="{BB962C8B-B14F-4D97-AF65-F5344CB8AC3E}">
-        <p14:creationId xmlns:p14="http://schemas.microsoft.com/office/powerpoint/2010/main" val="1692078946"/>
+        <p14:creationId xmlns:p14="http://schemas.microsoft.com/office/powerpoint/2010/main" val="1147479734"/>
       </p:ext>
     </p:extLst>
   </p:cSld>
@@ -8686,7 +8687,7 @@
           <p:cNvPr id="2" name="Title 1">
             <a:extLst>
               <a:ext uri="{FF2B5EF4-FFF2-40B4-BE49-F238E27FC236}">
-                <a16:creationId xmlns:a16="http://schemas.microsoft.com/office/drawing/2014/main" id="{75C50CEC-C87D-40B9-990D-303CFFD16359}"/>
+                <a16:creationId xmlns:a16="http://schemas.microsoft.com/office/drawing/2014/main" id="{96C67DBF-3E03-4AC3-8F08-C9A56B0C5933}"/>
               </a:ext>
             </a:extLst>
           </p:cNvPr>
@@ -8704,7 +8705,7 @@
           <a:p>
             <a:r>
               <a:rPr lang="en-GB" dirty="0"/>
-              <a:t>Problem 5 - Optimization</a:t>
+              <a:t>Solutions	</a:t>
             </a:r>
           </a:p>
         </p:txBody>
@@ -8714,7 +8715,7 @@
           <p:cNvPr id="3" name="Content Placeholder 2">
             <a:extLst>
               <a:ext uri="{FF2B5EF4-FFF2-40B4-BE49-F238E27FC236}">
-                <a16:creationId xmlns:a16="http://schemas.microsoft.com/office/drawing/2014/main" id="{6CE96895-52F6-414F-B7B4-DBAF2D31353D}"/>
+                <a16:creationId xmlns:a16="http://schemas.microsoft.com/office/drawing/2014/main" id="{2E3CB77D-CB5F-495D-84F6-E0A5AB452645}"/>
               </a:ext>
             </a:extLst>
           </p:cNvPr>
@@ -8732,15 +8733,48 @@
           <a:p>
             <a:r>
               <a:rPr lang="en-GB" dirty="0"/>
-              <a:t>As the number of gophers increased the time it takes to process each gopher also increases. </a:t>
-            </a:r>
+              <a:t>Optimizing how long it takes Gophers to find food. </a:t>
+            </a:r>
+          </a:p>
+          <a:p>
+            <a:pPr lvl="1"/>
+            <a:r>
+              <a:rPr lang="en-GB" dirty="0"/>
+              <a:t>Spiral Searching, </a:t>
+            </a:r>
+          </a:p>
+          <a:p>
+            <a:pPr lvl="1"/>
+            <a:r>
+              <a:rPr lang="en-GB" dirty="0"/>
+              <a:t>Quadtree Queries</a:t>
+            </a:r>
+          </a:p>
+          <a:p>
+            <a:pPr lvl="1"/>
+            <a:r>
+              <a:rPr lang="en-GB" dirty="0"/>
+              <a:t>Spatial Partitioning</a:t>
+            </a:r>
+          </a:p>
+          <a:p>
+            <a:pPr lvl="1"/>
+            <a:endParaRPr lang="en-GB" dirty="0"/>
+          </a:p>
+          <a:p>
+            <a:pPr lvl="1"/>
+            <a:endParaRPr lang="en-GB" dirty="0"/>
+          </a:p>
+          <a:p>
+            <a:pPr lvl="1"/>
+            <a:endParaRPr lang="en-GB" dirty="0"/>
           </a:p>
         </p:txBody>
       </p:sp>
     </p:spTree>
     <p:extLst>
       <p:ext uri="{BB962C8B-B14F-4D97-AF65-F5344CB8AC3E}">
-        <p14:creationId xmlns:p14="http://schemas.microsoft.com/office/powerpoint/2010/main" val="1147479734"/>
+        <p14:creationId xmlns:p14="http://schemas.microsoft.com/office/powerpoint/2010/main" val="2433235080"/>
       </p:ext>
     </p:extLst>
   </p:cSld>
@@ -8772,125 +8806,6 @@
           <p:cNvPr id="2" name="Title 1">
             <a:extLst>
               <a:ext uri="{FF2B5EF4-FFF2-40B4-BE49-F238E27FC236}">
-                <a16:creationId xmlns:a16="http://schemas.microsoft.com/office/drawing/2014/main" id="{96C67DBF-3E03-4AC3-8F08-C9A56B0C5933}"/>
-              </a:ext>
-            </a:extLst>
-          </p:cNvPr>
-          <p:cNvSpPr>
-            <a:spLocks noGrp="1"/>
-          </p:cNvSpPr>
-          <p:nvPr>
-            <p:ph type="title"/>
-          </p:nvPr>
-        </p:nvSpPr>
-        <p:spPr/>
-        <p:txBody>
-          <a:bodyPr/>
-          <a:lstStyle/>
-          <a:p>
-            <a:r>
-              <a:rPr lang="en-GB" dirty="0"/>
-              <a:t>Solutions	</a:t>
-            </a:r>
-          </a:p>
-        </p:txBody>
-      </p:sp>
-      <p:sp>
-        <p:nvSpPr>
-          <p:cNvPr id="3" name="Content Placeholder 2">
-            <a:extLst>
-              <a:ext uri="{FF2B5EF4-FFF2-40B4-BE49-F238E27FC236}">
-                <a16:creationId xmlns:a16="http://schemas.microsoft.com/office/drawing/2014/main" id="{2E3CB77D-CB5F-495D-84F6-E0A5AB452645}"/>
-              </a:ext>
-            </a:extLst>
-          </p:cNvPr>
-          <p:cNvSpPr>
-            <a:spLocks noGrp="1"/>
-          </p:cNvSpPr>
-          <p:nvPr>
-            <p:ph idx="1"/>
-          </p:nvPr>
-        </p:nvSpPr>
-        <p:spPr/>
-        <p:txBody>
-          <a:bodyPr/>
-          <a:lstStyle/>
-          <a:p>
-            <a:r>
-              <a:rPr lang="en-GB" dirty="0"/>
-              <a:t>Optimizing how long it takes Gophers to find food. </a:t>
-            </a:r>
-          </a:p>
-          <a:p>
-            <a:pPr lvl="1"/>
-            <a:r>
-              <a:rPr lang="en-GB" dirty="0"/>
-              <a:t>Spiral Searching, </a:t>
-            </a:r>
-          </a:p>
-          <a:p>
-            <a:pPr lvl="1"/>
-            <a:r>
-              <a:rPr lang="en-GB" dirty="0"/>
-              <a:t>Quadtree Queries</a:t>
-            </a:r>
-          </a:p>
-          <a:p>
-            <a:pPr lvl="1"/>
-            <a:r>
-              <a:rPr lang="en-GB" dirty="0"/>
-              <a:t>Spatial Partitioning</a:t>
-            </a:r>
-          </a:p>
-          <a:p>
-            <a:pPr lvl="1"/>
-            <a:endParaRPr lang="en-GB" dirty="0"/>
-          </a:p>
-          <a:p>
-            <a:pPr lvl="1"/>
-            <a:endParaRPr lang="en-GB" dirty="0"/>
-          </a:p>
-          <a:p>
-            <a:pPr lvl="1"/>
-            <a:endParaRPr lang="en-GB" dirty="0"/>
-          </a:p>
-        </p:txBody>
-      </p:sp>
-    </p:spTree>
-    <p:extLst>
-      <p:ext uri="{BB962C8B-B14F-4D97-AF65-F5344CB8AC3E}">
-        <p14:creationId xmlns:p14="http://schemas.microsoft.com/office/powerpoint/2010/main" val="2433235080"/>
-      </p:ext>
-    </p:extLst>
-  </p:cSld>
-  <p:clrMapOvr>
-    <a:masterClrMapping/>
-  </p:clrMapOvr>
-</p:sld>
-</file>
-
-<file path=ppt/slides/slide27.xml><?xml version="1.0" encoding="utf-8"?>
-<p:sld xmlns:a="http://schemas.openxmlformats.org/drawingml/2006/main" xmlns:r="http://schemas.openxmlformats.org/officeDocument/2006/relationships" xmlns:p="http://schemas.openxmlformats.org/presentationml/2006/main">
-  <p:cSld>
-    <p:spTree>
-      <p:nvGrpSpPr>
-        <p:cNvPr id="1" name=""/>
-        <p:cNvGrpSpPr/>
-        <p:nvPr/>
-      </p:nvGrpSpPr>
-      <p:grpSpPr>
-        <a:xfrm>
-          <a:off x="0" y="0"/>
-          <a:ext cx="0" cy="0"/>
-          <a:chOff x="0" y="0"/>
-          <a:chExt cx="0" cy="0"/>
-        </a:xfrm>
-      </p:grpSpPr>
-      <p:sp>
-        <p:nvSpPr>
-          <p:cNvPr id="2" name="Title 1">
-            <a:extLst>
-              <a:ext uri="{FF2B5EF4-FFF2-40B4-BE49-F238E27FC236}">
                 <a16:creationId xmlns:a16="http://schemas.microsoft.com/office/drawing/2014/main" id="{D5AD34E6-B9F5-484D-8BC0-F61BE7177945}"/>
               </a:ext>
             </a:extLst>
@@ -9000,7 +8915,7 @@
 </p:sld>
 </file>
 
-<file path=ppt/slides/slide28.xml><?xml version="1.0" encoding="utf-8"?>
+<file path=ppt/slides/slide27.xml><?xml version="1.0" encoding="utf-8"?>
 <p:sld xmlns:a="http://schemas.openxmlformats.org/drawingml/2006/main" xmlns:r="http://schemas.openxmlformats.org/officeDocument/2006/relationships" xmlns:p="http://schemas.openxmlformats.org/presentationml/2006/main">
   <p:cSld>
     <p:spTree>
@@ -9113,7 +9028,7 @@
 </p:sld>
 </file>
 
-<file path=ppt/slides/slide29.xml><?xml version="1.0" encoding="utf-8"?>
+<file path=ppt/slides/slide28.xml><?xml version="1.0" encoding="utf-8"?>
 <p:sld xmlns:a="http://schemas.openxmlformats.org/drawingml/2006/main" xmlns:r="http://schemas.openxmlformats.org/officeDocument/2006/relationships" xmlns:p="http://schemas.openxmlformats.org/presentationml/2006/main">
   <p:cSld>
     <p:spTree>
@@ -9226,6 +9141,89 @@
 </p:sld>
 </file>
 
+<file path=ppt/slides/slide29.xml><?xml version="1.0" encoding="utf-8"?>
+<p:sld xmlns:a="http://schemas.openxmlformats.org/drawingml/2006/main" xmlns:r="http://schemas.openxmlformats.org/officeDocument/2006/relationships" xmlns:p="http://schemas.openxmlformats.org/presentationml/2006/main">
+  <p:cSld>
+    <p:spTree>
+      <p:nvGrpSpPr>
+        <p:cNvPr id="1" name=""/>
+        <p:cNvGrpSpPr/>
+        <p:nvPr/>
+      </p:nvGrpSpPr>
+      <p:grpSpPr>
+        <a:xfrm>
+          <a:off x="0" y="0"/>
+          <a:ext cx="0" cy="0"/>
+          <a:chOff x="0" y="0"/>
+          <a:chExt cx="0" cy="0"/>
+        </a:xfrm>
+      </p:grpSpPr>
+      <p:sp>
+        <p:nvSpPr>
+          <p:cNvPr id="2" name="Title 1">
+            <a:extLst>
+              <a:ext uri="{FF2B5EF4-FFF2-40B4-BE49-F238E27FC236}">
+                <a16:creationId xmlns:a16="http://schemas.microsoft.com/office/drawing/2014/main" id="{C5BFB68C-7564-4E23-8DBD-22953A0313B7}"/>
+              </a:ext>
+            </a:extLst>
+          </p:cNvPr>
+          <p:cNvSpPr>
+            <a:spLocks noGrp="1"/>
+          </p:cNvSpPr>
+          <p:nvPr>
+            <p:ph type="title"/>
+          </p:nvPr>
+        </p:nvSpPr>
+        <p:spPr/>
+        <p:txBody>
+          <a:bodyPr/>
+          <a:lstStyle/>
+          <a:p>
+            <a:r>
+              <a:rPr lang="en-GB" dirty="0"/>
+              <a:t>After a few optimisations</a:t>
+            </a:r>
+          </a:p>
+        </p:txBody>
+      </p:sp>
+      <p:sp>
+        <p:nvSpPr>
+          <p:cNvPr id="3" name="Content Placeholder 2">
+            <a:extLst>
+              <a:ext uri="{FF2B5EF4-FFF2-40B4-BE49-F238E27FC236}">
+                <a16:creationId xmlns:a16="http://schemas.microsoft.com/office/drawing/2014/main" id="{5CD02D51-FB37-407C-99B2-5CD0F489A03C}"/>
+              </a:ext>
+            </a:extLst>
+          </p:cNvPr>
+          <p:cNvSpPr>
+            <a:spLocks noGrp="1"/>
+          </p:cNvSpPr>
+          <p:nvPr>
+            <p:ph idx="1"/>
+          </p:nvPr>
+        </p:nvSpPr>
+        <p:spPr/>
+        <p:txBody>
+          <a:bodyPr/>
+          <a:lstStyle/>
+          <a:p>
+            <a:endParaRPr lang="en-GB"/>
+          </a:p>
+        </p:txBody>
+      </p:sp>
+    </p:spTree>
+    <p:extLst>
+      <p:ext uri="{BB962C8B-B14F-4D97-AF65-F5344CB8AC3E}">
+        <p14:creationId xmlns:p14="http://schemas.microsoft.com/office/powerpoint/2010/main" val="178600232"/>
+      </p:ext>
+    </p:extLst>
+  </p:cSld>
+  <p:clrMapOvr>
+    <a:masterClrMapping/>
+  </p:clrMapOvr>
+</p:sld>
+</file>
+
 <file path=ppt/slides/slide3.xml><?xml version="1.0" encoding="utf-8"?>
 <p:sld xmlns:a="http://schemas.openxmlformats.org/drawingml/2006/main" xmlns:r="http://schemas.openxmlformats.org/officeDocument/2006/relationships" xmlns:p="http://schemas.openxmlformats.org/presentationml/2006/main">
   <p:cSld>
@@ -9331,89 +9329,6 @@
 </file>
 
 <file path=ppt/slides/slide30.xml><?xml version="1.0" encoding="utf-8"?>
-<p:sld xmlns:a="http://schemas.openxmlformats.org/drawingml/2006/main" xmlns:r="http://schemas.openxmlformats.org/officeDocument/2006/relationships" xmlns:p="http://schemas.openxmlformats.org/presentationml/2006/main">
-  <p:cSld>
-    <p:spTree>
-      <p:nvGrpSpPr>
-        <p:cNvPr id="1" name=""/>
-        <p:cNvGrpSpPr/>
-        <p:nvPr/>
-      </p:nvGrpSpPr>
-      <p:grpSpPr>
-        <a:xfrm>
-          <a:off x="0" y="0"/>
-          <a:ext cx="0" cy="0"/>
-          <a:chOff x="0" y="0"/>
-          <a:chExt cx="0" cy="0"/>
-        </a:xfrm>
-      </p:grpSpPr>
-      <p:sp>
-        <p:nvSpPr>
-          <p:cNvPr id="2" name="Title 1">
-            <a:extLst>
-              <a:ext uri="{FF2B5EF4-FFF2-40B4-BE49-F238E27FC236}">
-                <a16:creationId xmlns:a16="http://schemas.microsoft.com/office/drawing/2014/main" id="{C5BFB68C-7564-4E23-8DBD-22953A0313B7}"/>
-              </a:ext>
-            </a:extLst>
-          </p:cNvPr>
-          <p:cNvSpPr>
-            <a:spLocks noGrp="1"/>
-          </p:cNvSpPr>
-          <p:nvPr>
-            <p:ph type="title"/>
-          </p:nvPr>
-        </p:nvSpPr>
-        <p:spPr/>
-        <p:txBody>
-          <a:bodyPr/>
-          <a:lstStyle/>
-          <a:p>
-            <a:r>
-              <a:rPr lang="en-GB" dirty="0"/>
-              <a:t>After a few optimisations</a:t>
-            </a:r>
-          </a:p>
-        </p:txBody>
-      </p:sp>
-      <p:sp>
-        <p:nvSpPr>
-          <p:cNvPr id="3" name="Content Placeholder 2">
-            <a:extLst>
-              <a:ext uri="{FF2B5EF4-FFF2-40B4-BE49-F238E27FC236}">
-                <a16:creationId xmlns:a16="http://schemas.microsoft.com/office/drawing/2014/main" id="{5CD02D51-FB37-407C-99B2-5CD0F489A03C}"/>
-              </a:ext>
-            </a:extLst>
-          </p:cNvPr>
-          <p:cNvSpPr>
-            <a:spLocks noGrp="1"/>
-          </p:cNvSpPr>
-          <p:nvPr>
-            <p:ph idx="1"/>
-          </p:nvPr>
-        </p:nvSpPr>
-        <p:spPr/>
-        <p:txBody>
-          <a:bodyPr/>
-          <a:lstStyle/>
-          <a:p>
-            <a:endParaRPr lang="en-GB"/>
-          </a:p>
-        </p:txBody>
-      </p:sp>
-    </p:spTree>
-    <p:extLst>
-      <p:ext uri="{BB962C8B-B14F-4D97-AF65-F5344CB8AC3E}">
-        <p14:creationId xmlns:p14="http://schemas.microsoft.com/office/powerpoint/2010/main" val="178600232"/>
-      </p:ext>
-    </p:extLst>
-  </p:cSld>
-  <p:clrMapOvr>
-    <a:masterClrMapping/>
-  </p:clrMapOvr>
-</p:sld>
-</file>
-
-<file path=ppt/slides/slide31.xml><?xml version="1.0" encoding="utf-8"?>
 <p:sld xmlns:a="http://schemas.openxmlformats.org/drawingml/2006/main" xmlns:r="http://schemas.openxmlformats.org/officeDocument/2006/relationships" xmlns:p="http://schemas.openxmlformats.org/presentationml/2006/main">
   <p:cSld>
     <p:spTree>
@@ -9523,6 +9438,86 @@
 </p:sld>
 </file>
 
+<file path=ppt/slides/slide31.xml><?xml version="1.0" encoding="utf-8"?>
+<p:sld xmlns:a="http://schemas.openxmlformats.org/drawingml/2006/main" xmlns:r="http://schemas.openxmlformats.org/officeDocument/2006/relationships" xmlns:p="http://schemas.openxmlformats.org/presentationml/2006/main">
+  <p:cSld>
+    <p:spTree>
+      <p:nvGrpSpPr>
+        <p:cNvPr id="1" name=""/>
+        <p:cNvGrpSpPr/>
+        <p:nvPr/>
+      </p:nvGrpSpPr>
+      <p:grpSpPr>
+        <a:xfrm>
+          <a:off x="0" y="0"/>
+          <a:ext cx="0" cy="0"/>
+          <a:chOff x="0" y="0"/>
+          <a:chExt cx="0" cy="0"/>
+        </a:xfrm>
+      </p:grpSpPr>
+      <p:sp>
+        <p:nvSpPr>
+          <p:cNvPr id="2" name="Title 1">
+            <a:extLst>
+              <a:ext uri="{FF2B5EF4-FFF2-40B4-BE49-F238E27FC236}">
+                <a16:creationId xmlns:a16="http://schemas.microsoft.com/office/drawing/2014/main" id="{C5BFB68C-7564-4E23-8DBD-22953A0313B7}"/>
+              </a:ext>
+            </a:extLst>
+          </p:cNvPr>
+          <p:cNvSpPr>
+            <a:spLocks noGrp="1"/>
+          </p:cNvSpPr>
+          <p:nvPr>
+            <p:ph type="title"/>
+          </p:nvPr>
+        </p:nvSpPr>
+        <p:spPr/>
+        <p:txBody>
+          <a:bodyPr/>
+          <a:lstStyle/>
+          <a:p>
+            <a:endParaRPr lang="en-GB"/>
+          </a:p>
+        </p:txBody>
+      </p:sp>
+      <p:sp>
+        <p:nvSpPr>
+          <p:cNvPr id="3" name="Content Placeholder 2">
+            <a:extLst>
+              <a:ext uri="{FF2B5EF4-FFF2-40B4-BE49-F238E27FC236}">
+                <a16:creationId xmlns:a16="http://schemas.microsoft.com/office/drawing/2014/main" id="{5CD02D51-FB37-407C-99B2-5CD0F489A03C}"/>
+              </a:ext>
+            </a:extLst>
+          </p:cNvPr>
+          <p:cNvSpPr>
+            <a:spLocks noGrp="1"/>
+          </p:cNvSpPr>
+          <p:nvPr>
+            <p:ph idx="1"/>
+          </p:nvPr>
+        </p:nvSpPr>
+        <p:spPr/>
+        <p:txBody>
+          <a:bodyPr/>
+          <a:lstStyle/>
+          <a:p>
+            <a:endParaRPr lang="en-GB"/>
+          </a:p>
+        </p:txBody>
+      </p:sp>
+    </p:spTree>
+    <p:extLst>
+      <p:ext uri="{BB962C8B-B14F-4D97-AF65-F5344CB8AC3E}">
+        <p14:creationId xmlns:p14="http://schemas.microsoft.com/office/powerpoint/2010/main" val="4076716880"/>
+      </p:ext>
+    </p:extLst>
+  </p:cSld>
+  <p:clrMapOvr>
+    <a:masterClrMapping/>
+  </p:clrMapOvr>
+</p:sld>
+</file>
+
 <file path=ppt/slides/slide32.xml><?xml version="1.0" encoding="utf-8"?>
 <p:sld xmlns:a="http://schemas.openxmlformats.org/drawingml/2006/main" xmlns:r="http://schemas.openxmlformats.org/officeDocument/2006/relationships" xmlns:p="http://schemas.openxmlformats.org/presentationml/2006/main">
   <p:cSld>
@@ -9545,7 +9540,7 @@
           <p:cNvPr id="2" name="Title 1">
             <a:extLst>
               <a:ext uri="{FF2B5EF4-FFF2-40B4-BE49-F238E27FC236}">
-                <a16:creationId xmlns:a16="http://schemas.microsoft.com/office/drawing/2014/main" id="{C5BFB68C-7564-4E23-8DBD-22953A0313B7}"/>
+                <a16:creationId xmlns:a16="http://schemas.microsoft.com/office/drawing/2014/main" id="{B35498C6-960E-4458-8130-6765F4CA74F7}"/>
               </a:ext>
             </a:extLst>
           </p:cNvPr>
@@ -9561,7 +9556,10 @@
           <a:bodyPr/>
           <a:lstStyle/>
           <a:p>
-            <a:endParaRPr lang="en-GB"/>
+            <a:r>
+              <a:rPr lang="en-GB" dirty="0"/>
+              <a:t>	Progress Checklist	</a:t>
+            </a:r>
           </a:p>
         </p:txBody>
       </p:sp>
@@ -9570,7 +9568,7 @@
           <p:cNvPr id="3" name="Content Placeholder 2">
             <a:extLst>
               <a:ext uri="{FF2B5EF4-FFF2-40B4-BE49-F238E27FC236}">
-                <a16:creationId xmlns:a16="http://schemas.microsoft.com/office/drawing/2014/main" id="{5CD02D51-FB37-407C-99B2-5CD0F489A03C}"/>
+                <a16:creationId xmlns:a16="http://schemas.microsoft.com/office/drawing/2014/main" id="{03803CF5-7407-403C-AA75-7FD98A1144C0}"/>
               </a:ext>
             </a:extLst>
           </p:cNvPr>
@@ -9586,14 +9584,26 @@
           <a:bodyPr/>
           <a:lstStyle/>
           <a:p>
-            <a:endParaRPr lang="en-GB"/>
+            <a:r>
+              <a:rPr lang="en-GB" dirty="0"/>
+              <a:t>Introduction to using go benchmark and go race. </a:t>
+            </a:r>
+          </a:p>
+          <a:p>
+            <a:endParaRPr lang="en-GB" dirty="0"/>
+          </a:p>
+          <a:p>
+            <a:r>
+              <a:rPr lang="en-GB" dirty="0"/>
+              <a:t>Increased knowledge of different ways to optimize searching problems. </a:t>
+            </a:r>
           </a:p>
         </p:txBody>
       </p:sp>
     </p:spTree>
     <p:extLst>
       <p:ext uri="{BB962C8B-B14F-4D97-AF65-F5344CB8AC3E}">
-        <p14:creationId xmlns:p14="http://schemas.microsoft.com/office/powerpoint/2010/main" val="4076716880"/>
+        <p14:creationId xmlns:p14="http://schemas.microsoft.com/office/powerpoint/2010/main" val="3598754192"/>
       </p:ext>
     </p:extLst>
   </p:cSld>
@@ -9625,7 +9635,7 @@
           <p:cNvPr id="2" name="Title 1">
             <a:extLst>
               <a:ext uri="{FF2B5EF4-FFF2-40B4-BE49-F238E27FC236}">
-                <a16:creationId xmlns:a16="http://schemas.microsoft.com/office/drawing/2014/main" id="{B35498C6-960E-4458-8130-6765F4CA74F7}"/>
+                <a16:creationId xmlns:a16="http://schemas.microsoft.com/office/drawing/2014/main" id="{13A895C3-4AA3-4DF4-9348-F010A665C356}"/>
               </a:ext>
             </a:extLst>
           </p:cNvPr>
@@ -9641,10 +9651,7 @@
           <a:bodyPr/>
           <a:lstStyle/>
           <a:p>
-            <a:r>
-              <a:rPr lang="en-GB" dirty="0"/>
-              <a:t>	Progress Checklist	</a:t>
-            </a:r>
+            <a:endParaRPr lang="en-GB" dirty="0"/>
           </a:p>
         </p:txBody>
       </p:sp>
@@ -9653,7 +9660,7 @@
           <p:cNvPr id="3" name="Content Placeholder 2">
             <a:extLst>
               <a:ext uri="{FF2B5EF4-FFF2-40B4-BE49-F238E27FC236}">
-                <a16:creationId xmlns:a16="http://schemas.microsoft.com/office/drawing/2014/main" id="{03803CF5-7407-403C-AA75-7FD98A1144C0}"/>
+                <a16:creationId xmlns:a16="http://schemas.microsoft.com/office/drawing/2014/main" id="{ABB9FD90-D046-487F-ACA7-C1C377ED3A6F}"/>
               </a:ext>
             </a:extLst>
           </p:cNvPr>
@@ -9669,26 +9676,14 @@
           <a:bodyPr/>
           <a:lstStyle/>
           <a:p>
-            <a:r>
-              <a:rPr lang="en-GB" dirty="0"/>
-              <a:t>Introduction to using go benchmark and go race. </a:t>
-            </a:r>
-          </a:p>
-          <a:p>
-            <a:endParaRPr lang="en-GB" dirty="0"/>
-          </a:p>
-          <a:p>
-            <a:r>
-              <a:rPr lang="en-GB" dirty="0"/>
-              <a:t>Increased knowledge of different ways to optimize searching problems. </a:t>
-            </a:r>
+            <a:endParaRPr lang="en-GB"/>
           </a:p>
         </p:txBody>
       </p:sp>
     </p:spTree>
     <p:extLst>
       <p:ext uri="{BB962C8B-B14F-4D97-AF65-F5344CB8AC3E}">
-        <p14:creationId xmlns:p14="http://schemas.microsoft.com/office/powerpoint/2010/main" val="3598754192"/>
+        <p14:creationId xmlns:p14="http://schemas.microsoft.com/office/powerpoint/2010/main" val="3172546742"/>
       </p:ext>
     </p:extLst>
   </p:cSld>
@@ -9720,7 +9715,7 @@
           <p:cNvPr id="2" name="Title 1">
             <a:extLst>
               <a:ext uri="{FF2B5EF4-FFF2-40B4-BE49-F238E27FC236}">
-                <a16:creationId xmlns:a16="http://schemas.microsoft.com/office/drawing/2014/main" id="{13A895C3-4AA3-4DF4-9348-F010A665C356}"/>
+                <a16:creationId xmlns:a16="http://schemas.microsoft.com/office/drawing/2014/main" id="{5F649051-170D-4D88-A1EB-CD53B67517C2}"/>
               </a:ext>
             </a:extLst>
           </p:cNvPr>
@@ -9736,7 +9731,10 @@
           <a:bodyPr/>
           <a:lstStyle/>
           <a:p>
-            <a:endParaRPr lang="en-GB" dirty="0"/>
+            <a:r>
+              <a:rPr lang="en-GB" dirty="0"/>
+              <a:t>Final Showcase</a:t>
+            </a:r>
           </a:p>
         </p:txBody>
       </p:sp>
@@ -9745,7 +9743,7 @@
           <p:cNvPr id="3" name="Content Placeholder 2">
             <a:extLst>
               <a:ext uri="{FF2B5EF4-FFF2-40B4-BE49-F238E27FC236}">
-                <a16:creationId xmlns:a16="http://schemas.microsoft.com/office/drawing/2014/main" id="{ABB9FD90-D046-487F-ACA7-C1C377ED3A6F}"/>
+                <a16:creationId xmlns:a16="http://schemas.microsoft.com/office/drawing/2014/main" id="{E28FB5CC-2E35-4352-B03D-454660443443}"/>
               </a:ext>
             </a:extLst>
           </p:cNvPr>
@@ -9768,7 +9766,7 @@
     </p:spTree>
     <p:extLst>
       <p:ext uri="{BB962C8B-B14F-4D97-AF65-F5344CB8AC3E}">
-        <p14:creationId xmlns:p14="http://schemas.microsoft.com/office/powerpoint/2010/main" val="3172546742"/>
+        <p14:creationId xmlns:p14="http://schemas.microsoft.com/office/powerpoint/2010/main" val="2232509740"/>
       </p:ext>
     </p:extLst>
   </p:cSld>
@@ -9800,7 +9798,7 @@
           <p:cNvPr id="2" name="Title 1">
             <a:extLst>
               <a:ext uri="{FF2B5EF4-FFF2-40B4-BE49-F238E27FC236}">
-                <a16:creationId xmlns:a16="http://schemas.microsoft.com/office/drawing/2014/main" id="{5F649051-170D-4D88-A1EB-CD53B67517C2}"/>
+                <a16:creationId xmlns:a16="http://schemas.microsoft.com/office/drawing/2014/main" id="{6CDC4756-BE7A-4B78-81FE-29031289A2AD}"/>
               </a:ext>
             </a:extLst>
           </p:cNvPr>
@@ -9818,7 +9816,7 @@
           <a:p>
             <a:r>
               <a:rPr lang="en-GB" dirty="0"/>
-              <a:t>Final Showcase</a:t>
+              <a:t>Final Checklist </a:t>
             </a:r>
           </a:p>
         </p:txBody>
@@ -9828,7 +9826,7 @@
           <p:cNvPr id="3" name="Content Placeholder 2">
             <a:extLst>
               <a:ext uri="{FF2B5EF4-FFF2-40B4-BE49-F238E27FC236}">
-                <a16:creationId xmlns:a16="http://schemas.microsoft.com/office/drawing/2014/main" id="{E28FB5CC-2E35-4352-B03D-454660443443}"/>
+                <a16:creationId xmlns:a16="http://schemas.microsoft.com/office/drawing/2014/main" id="{07D7EF34-638C-4C71-99D1-10742B4D9377}"/>
               </a:ext>
             </a:extLst>
           </p:cNvPr>
@@ -9851,7 +9849,7 @@
     </p:spTree>
     <p:extLst>
       <p:ext uri="{BB962C8B-B14F-4D97-AF65-F5344CB8AC3E}">
-        <p14:creationId xmlns:p14="http://schemas.microsoft.com/office/powerpoint/2010/main" val="2232509740"/>
+        <p14:creationId xmlns:p14="http://schemas.microsoft.com/office/powerpoint/2010/main" val="2595392705"/>
       </p:ext>
     </p:extLst>
   </p:cSld>
@@ -9883,7 +9881,7 @@
           <p:cNvPr id="2" name="Title 1">
             <a:extLst>
               <a:ext uri="{FF2B5EF4-FFF2-40B4-BE49-F238E27FC236}">
-                <a16:creationId xmlns:a16="http://schemas.microsoft.com/office/drawing/2014/main" id="{6CDC4756-BE7A-4B78-81FE-29031289A2AD}"/>
+                <a16:creationId xmlns:a16="http://schemas.microsoft.com/office/drawing/2014/main" id="{C6A1F8BE-8B71-4987-BE2C-B485EE46CDB8}"/>
               </a:ext>
             </a:extLst>
           </p:cNvPr>
@@ -9901,7 +9899,7 @@
           <a:p>
             <a:r>
               <a:rPr lang="en-GB" dirty="0"/>
-              <a:t>Final Checklist </a:t>
+              <a:t>Conclusion</a:t>
             </a:r>
           </a:p>
         </p:txBody>
@@ -9911,7 +9909,7 @@
           <p:cNvPr id="3" name="Content Placeholder 2">
             <a:extLst>
               <a:ext uri="{FF2B5EF4-FFF2-40B4-BE49-F238E27FC236}">
-                <a16:creationId xmlns:a16="http://schemas.microsoft.com/office/drawing/2014/main" id="{07D7EF34-638C-4C71-99D1-10742B4D9377}"/>
+                <a16:creationId xmlns:a16="http://schemas.microsoft.com/office/drawing/2014/main" id="{C6489CD9-246E-4EF9-8A1F-DF0D212B8A29}"/>
               </a:ext>
             </a:extLst>
           </p:cNvPr>
@@ -9934,7 +9932,7 @@
     </p:spTree>
     <p:extLst>
       <p:ext uri="{BB962C8B-B14F-4D97-AF65-F5344CB8AC3E}">
-        <p14:creationId xmlns:p14="http://schemas.microsoft.com/office/powerpoint/2010/main" val="2595392705"/>
+        <p14:creationId xmlns:p14="http://schemas.microsoft.com/office/powerpoint/2010/main" val="2651521754"/>
       </p:ext>
     </p:extLst>
   </p:cSld>
@@ -9966,7 +9964,7 @@
           <p:cNvPr id="2" name="Title 1">
             <a:extLst>
               <a:ext uri="{FF2B5EF4-FFF2-40B4-BE49-F238E27FC236}">
-                <a16:creationId xmlns:a16="http://schemas.microsoft.com/office/drawing/2014/main" id="{C6A1F8BE-8B71-4987-BE2C-B485EE46CDB8}"/>
+                <a16:creationId xmlns:a16="http://schemas.microsoft.com/office/drawing/2014/main" id="{DDA23A98-14C6-40E0-A90C-6468725EFA2C}"/>
               </a:ext>
             </a:extLst>
           </p:cNvPr>
@@ -9984,7 +9982,7 @@
           <a:p>
             <a:r>
               <a:rPr lang="en-GB" dirty="0"/>
-              <a:t>Conclusion</a:t>
+              <a:t>Perseverance</a:t>
             </a:r>
           </a:p>
         </p:txBody>
@@ -9994,7 +9992,7 @@
           <p:cNvPr id="3" name="Content Placeholder 2">
             <a:extLst>
               <a:ext uri="{FF2B5EF4-FFF2-40B4-BE49-F238E27FC236}">
-                <a16:creationId xmlns:a16="http://schemas.microsoft.com/office/drawing/2014/main" id="{C6489CD9-246E-4EF9-8A1F-DF0D212B8A29}"/>
+                <a16:creationId xmlns:a16="http://schemas.microsoft.com/office/drawing/2014/main" id="{B7866C6F-7AB4-4FF2-AC93-597F73926565}"/>
               </a:ext>
             </a:extLst>
           </p:cNvPr>
@@ -10010,14 +10008,23 @@
           <a:bodyPr/>
           <a:lstStyle/>
           <a:p>
-            <a:endParaRPr lang="en-GB"/>
+            <a:r>
+              <a:rPr lang="en-GB" dirty="0"/>
+              <a:t>Talking about your project with other developers </a:t>
+            </a:r>
+          </a:p>
+          <a:p>
+            <a:r>
+              <a:rPr lang="en-GB" dirty="0"/>
+              <a:t>Getting help</a:t>
+            </a:r>
           </a:p>
         </p:txBody>
       </p:sp>
     </p:spTree>
     <p:extLst>
       <p:ext uri="{BB962C8B-B14F-4D97-AF65-F5344CB8AC3E}">
-        <p14:creationId xmlns:p14="http://schemas.microsoft.com/office/powerpoint/2010/main" val="2651521754"/>
+        <p14:creationId xmlns:p14="http://schemas.microsoft.com/office/powerpoint/2010/main" val="847199732"/>
       </p:ext>
     </p:extLst>
   </p:cSld>
@@ -10049,7 +10056,7 @@
           <p:cNvPr id="2" name="Title 1">
             <a:extLst>
               <a:ext uri="{FF2B5EF4-FFF2-40B4-BE49-F238E27FC236}">
-                <a16:creationId xmlns:a16="http://schemas.microsoft.com/office/drawing/2014/main" id="{DDA23A98-14C6-40E0-A90C-6468725EFA2C}"/>
+                <a16:creationId xmlns:a16="http://schemas.microsoft.com/office/drawing/2014/main" id="{CFF32C6C-3D00-4977-9425-46509C1A3129}"/>
               </a:ext>
             </a:extLst>
           </p:cNvPr>
@@ -10067,7 +10074,7 @@
           <a:p>
             <a:r>
               <a:rPr lang="en-GB" dirty="0"/>
-              <a:t>Perseverance</a:t>
+              <a:t>Go – Starter Pack</a:t>
             </a:r>
           </a:p>
         </p:txBody>
@@ -10077,7 +10084,7 @@
           <p:cNvPr id="3" name="Content Placeholder 2">
             <a:extLst>
               <a:ext uri="{FF2B5EF4-FFF2-40B4-BE49-F238E27FC236}">
-                <a16:creationId xmlns:a16="http://schemas.microsoft.com/office/drawing/2014/main" id="{B7866C6F-7AB4-4FF2-AC93-597F73926565}"/>
+                <a16:creationId xmlns:a16="http://schemas.microsoft.com/office/drawing/2014/main" id="{3B81F4FB-26EB-4DA4-9507-E147BFC741B8}"/>
               </a:ext>
             </a:extLst>
           </p:cNvPr>
@@ -10095,21 +10102,24 @@
           <a:p>
             <a:r>
               <a:rPr lang="en-GB" dirty="0"/>
-              <a:t>Talking about your project with other developers </a:t>
-            </a:r>
-          </a:p>
-          <a:p>
-            <a:r>
-              <a:rPr lang="en-GB" dirty="0"/>
-              <a:t>Getting help</a:t>
-            </a:r>
+              <a:t>Installing GO. </a:t>
+            </a:r>
+          </a:p>
+          <a:p>
+            <a:r>
+              <a:rPr lang="en-GB" dirty="0"/>
+              <a:t>Learning the syntax</a:t>
+            </a:r>
+          </a:p>
+          <a:p>
+            <a:endParaRPr lang="en-GB" dirty="0"/>
           </a:p>
         </p:txBody>
       </p:sp>
     </p:spTree>
     <p:extLst>
       <p:ext uri="{BB962C8B-B14F-4D97-AF65-F5344CB8AC3E}">
-        <p14:creationId xmlns:p14="http://schemas.microsoft.com/office/powerpoint/2010/main" val="847199732"/>
+        <p14:creationId xmlns:p14="http://schemas.microsoft.com/office/powerpoint/2010/main" val="1566399315"/>
       </p:ext>
     </p:extLst>
   </p:cSld>
@@ -10141,7 +10151,7 @@
           <p:cNvPr id="2" name="Title 1">
             <a:extLst>
               <a:ext uri="{FF2B5EF4-FFF2-40B4-BE49-F238E27FC236}">
-                <a16:creationId xmlns:a16="http://schemas.microsoft.com/office/drawing/2014/main" id="{CFF32C6C-3D00-4977-9425-46509C1A3129}"/>
+                <a16:creationId xmlns:a16="http://schemas.microsoft.com/office/drawing/2014/main" id="{F791C732-68FC-4DBF-A925-B9A44335C54F}"/>
               </a:ext>
             </a:extLst>
           </p:cNvPr>
@@ -10159,7 +10169,7 @@
           <a:p>
             <a:r>
               <a:rPr lang="en-GB" dirty="0"/>
-              <a:t>Go – Starter Pack</a:t>
+              <a:t>Finding A Catalyst</a:t>
             </a:r>
           </a:p>
         </p:txBody>
@@ -10169,7 +10179,7 @@
           <p:cNvPr id="3" name="Content Placeholder 2">
             <a:extLst>
               <a:ext uri="{FF2B5EF4-FFF2-40B4-BE49-F238E27FC236}">
-                <a16:creationId xmlns:a16="http://schemas.microsoft.com/office/drawing/2014/main" id="{3B81F4FB-26EB-4DA4-9507-E147BFC741B8}"/>
+                <a16:creationId xmlns:a16="http://schemas.microsoft.com/office/drawing/2014/main" id="{C206744A-0D9B-4231-BD87-CF25D90A8004}"/>
               </a:ext>
             </a:extLst>
           </p:cNvPr>
@@ -10185,26 +10195,14 @@
           <a:bodyPr/>
           <a:lstStyle/>
           <a:p>
-            <a:r>
-              <a:rPr lang="en-GB" dirty="0"/>
-              <a:t>Installing GO. </a:t>
-            </a:r>
-          </a:p>
-          <a:p>
-            <a:r>
-              <a:rPr lang="en-GB" dirty="0"/>
-              <a:t>Learning the syntax</a:t>
-            </a:r>
-          </a:p>
-          <a:p>
-            <a:endParaRPr lang="en-GB" dirty="0"/>
+            <a:endParaRPr lang="en-GB"/>
           </a:p>
         </p:txBody>
       </p:sp>
     </p:spTree>
     <p:extLst>
       <p:ext uri="{BB962C8B-B14F-4D97-AF65-F5344CB8AC3E}">
-        <p14:creationId xmlns:p14="http://schemas.microsoft.com/office/powerpoint/2010/main" val="1566399315"/>
+        <p14:creationId xmlns:p14="http://schemas.microsoft.com/office/powerpoint/2010/main" val="4016827040"/>
       </p:ext>
     </p:extLst>
   </p:cSld>
@@ -10388,7 +10386,7 @@
           <p:cNvPr id="2" name="Title 1">
             <a:extLst>
               <a:ext uri="{FF2B5EF4-FFF2-40B4-BE49-F238E27FC236}">
-                <a16:creationId xmlns:a16="http://schemas.microsoft.com/office/drawing/2014/main" id="{F791C732-68FC-4DBF-A925-B9A44335C54F}"/>
+                <a16:creationId xmlns:a16="http://schemas.microsoft.com/office/drawing/2014/main" id="{32F06B3C-EA2D-46B1-AB79-08EFA8CCC0C1}"/>
               </a:ext>
             </a:extLst>
           </p:cNvPr>
@@ -10406,7 +10404,7 @@
           <a:p>
             <a:r>
               <a:rPr lang="en-GB" dirty="0"/>
-              <a:t>Finding A Catalyst</a:t>
+              <a:t>Managing Scope and Completing Projects</a:t>
             </a:r>
           </a:p>
         </p:txBody>
@@ -10416,7 +10414,7 @@
           <p:cNvPr id="3" name="Content Placeholder 2">
             <a:extLst>
               <a:ext uri="{FF2B5EF4-FFF2-40B4-BE49-F238E27FC236}">
-                <a16:creationId xmlns:a16="http://schemas.microsoft.com/office/drawing/2014/main" id="{C206744A-0D9B-4231-BD87-CF25D90A8004}"/>
+                <a16:creationId xmlns:a16="http://schemas.microsoft.com/office/drawing/2014/main" id="{D2524174-1A6E-43AD-AFB4-E3F8B9B5D53A}"/>
               </a:ext>
             </a:extLst>
           </p:cNvPr>
@@ -10439,7 +10437,7 @@
     </p:spTree>
     <p:extLst>
       <p:ext uri="{BB962C8B-B14F-4D97-AF65-F5344CB8AC3E}">
-        <p14:creationId xmlns:p14="http://schemas.microsoft.com/office/powerpoint/2010/main" val="4016827040"/>
+        <p14:creationId xmlns:p14="http://schemas.microsoft.com/office/powerpoint/2010/main" val="1162966501"/>
       </p:ext>
     </p:extLst>
   </p:cSld>
@@ -10471,7 +10469,7 @@
           <p:cNvPr id="2" name="Title 1">
             <a:extLst>
               <a:ext uri="{FF2B5EF4-FFF2-40B4-BE49-F238E27FC236}">
-                <a16:creationId xmlns:a16="http://schemas.microsoft.com/office/drawing/2014/main" id="{32F06B3C-EA2D-46B1-AB79-08EFA8CCC0C1}"/>
+                <a16:creationId xmlns:a16="http://schemas.microsoft.com/office/drawing/2014/main" id="{F106CE47-2D88-4386-9645-6FF2058FA701}"/>
               </a:ext>
             </a:extLst>
           </p:cNvPr>
@@ -10489,7 +10487,7 @@
           <a:p>
             <a:r>
               <a:rPr lang="en-GB" dirty="0"/>
-              <a:t>Managing Scope and Completing Projects</a:t>
+              <a:t>Getting past the feeling of pointlessness</a:t>
             </a:r>
           </a:p>
         </p:txBody>
@@ -10499,7 +10497,7 @@
           <p:cNvPr id="3" name="Content Placeholder 2">
             <a:extLst>
               <a:ext uri="{FF2B5EF4-FFF2-40B4-BE49-F238E27FC236}">
-                <a16:creationId xmlns:a16="http://schemas.microsoft.com/office/drawing/2014/main" id="{D2524174-1A6E-43AD-AFB4-E3F8B9B5D53A}"/>
+                <a16:creationId xmlns:a16="http://schemas.microsoft.com/office/drawing/2014/main" id="{3E7E5D08-3BD9-4083-ABF9-3C1E46633F36}"/>
               </a:ext>
             </a:extLst>
           </p:cNvPr>
@@ -10515,14 +10513,35 @@
           <a:bodyPr/>
           <a:lstStyle/>
           <a:p>
-            <a:endParaRPr lang="en-GB"/>
+            <a:r>
+              <a:rPr lang="en-GB" dirty="0"/>
+              <a:t>Finding a Catalyst, to improve motivation</a:t>
+            </a:r>
+          </a:p>
+          <a:p>
+            <a:pPr lvl="1"/>
+            <a:r>
+              <a:rPr lang="en-GB" dirty="0"/>
+              <a:t>Discussing your project with peers</a:t>
+            </a:r>
+          </a:p>
+          <a:p>
+            <a:pPr lvl="1"/>
+            <a:r>
+              <a:rPr lang="en-GB" dirty="0"/>
+              <a:t>Creating an actual deadline</a:t>
+            </a:r>
+          </a:p>
+          <a:p>
+            <a:pPr lvl="1"/>
+            <a:endParaRPr lang="en-GB" dirty="0"/>
           </a:p>
         </p:txBody>
       </p:sp>
     </p:spTree>
     <p:extLst>
       <p:ext uri="{BB962C8B-B14F-4D97-AF65-F5344CB8AC3E}">
-        <p14:creationId xmlns:p14="http://schemas.microsoft.com/office/powerpoint/2010/main" val="1162966501"/>
+        <p14:creationId xmlns:p14="http://schemas.microsoft.com/office/powerpoint/2010/main" val="1961839492"/>
       </p:ext>
     </p:extLst>
   </p:cSld>
@@ -10554,7 +10573,7 @@
           <p:cNvPr id="2" name="Title 1">
             <a:extLst>
               <a:ext uri="{FF2B5EF4-FFF2-40B4-BE49-F238E27FC236}">
-                <a16:creationId xmlns:a16="http://schemas.microsoft.com/office/drawing/2014/main" id="{F106CE47-2D88-4386-9645-6FF2058FA701}"/>
+                <a16:creationId xmlns:a16="http://schemas.microsoft.com/office/drawing/2014/main" id="{8665D156-403C-4612-AA65-B49BA41EDF64}"/>
               </a:ext>
             </a:extLst>
           </p:cNvPr>
@@ -10572,7 +10591,7 @@
           <a:p>
             <a:r>
               <a:rPr lang="en-GB" dirty="0"/>
-              <a:t>Getting past the feeling of pointlessness</a:t>
+              <a:t>Insert Here, Example of 5 gophers one alive, 4 dead </a:t>
             </a:r>
           </a:p>
         </p:txBody>
@@ -10582,7 +10601,7 @@
           <p:cNvPr id="3" name="Content Placeholder 2">
             <a:extLst>
               <a:ext uri="{FF2B5EF4-FFF2-40B4-BE49-F238E27FC236}">
-                <a16:creationId xmlns:a16="http://schemas.microsoft.com/office/drawing/2014/main" id="{3E7E5D08-3BD9-4083-ABF9-3C1E46633F36}"/>
+                <a16:creationId xmlns:a16="http://schemas.microsoft.com/office/drawing/2014/main" id="{8716B298-CF10-4866-85F6-D856E1963894}"/>
               </a:ext>
             </a:extLst>
           </p:cNvPr>
@@ -10598,35 +10617,14 @@
           <a:bodyPr/>
           <a:lstStyle/>
           <a:p>
-            <a:r>
-              <a:rPr lang="en-GB" dirty="0"/>
-              <a:t>Finding a Catalyst, to improve motivation</a:t>
-            </a:r>
-          </a:p>
-          <a:p>
-            <a:pPr lvl="1"/>
-            <a:r>
-              <a:rPr lang="en-GB" dirty="0"/>
-              <a:t>Discussing your project with peers</a:t>
-            </a:r>
-          </a:p>
-          <a:p>
-            <a:pPr lvl="1"/>
-            <a:r>
-              <a:rPr lang="en-GB" dirty="0"/>
-              <a:t>Creating an actual deadline</a:t>
-            </a:r>
-          </a:p>
-          <a:p>
-            <a:pPr lvl="1"/>
-            <a:endParaRPr lang="en-GB" dirty="0"/>
+            <a:endParaRPr lang="en-GB"/>
           </a:p>
         </p:txBody>
       </p:sp>
     </p:spTree>
     <p:extLst>
       <p:ext uri="{BB962C8B-B14F-4D97-AF65-F5344CB8AC3E}">
-        <p14:creationId xmlns:p14="http://schemas.microsoft.com/office/powerpoint/2010/main" val="1961839492"/>
+        <p14:creationId xmlns:p14="http://schemas.microsoft.com/office/powerpoint/2010/main" val="3790213746"/>
       </p:ext>
     </p:extLst>
   </p:cSld>
@@ -10658,7 +10656,7 @@
           <p:cNvPr id="2" name="Title 1">
             <a:extLst>
               <a:ext uri="{FF2B5EF4-FFF2-40B4-BE49-F238E27FC236}">
-                <a16:creationId xmlns:a16="http://schemas.microsoft.com/office/drawing/2014/main" id="{8665D156-403C-4612-AA65-B49BA41EDF64}"/>
+                <a16:creationId xmlns:a16="http://schemas.microsoft.com/office/drawing/2014/main" id="{B88F905B-DC9A-4E15-887A-0D816B2DA849}"/>
               </a:ext>
             </a:extLst>
           </p:cNvPr>
@@ -10676,7 +10674,7 @@
           <a:p>
             <a:r>
               <a:rPr lang="en-GB" dirty="0"/>
-              <a:t>Insert Here, Example of 5 gophers one alive, 4 dead </a:t>
+              <a:t>Checklist</a:t>
             </a:r>
           </a:p>
         </p:txBody>
@@ -10686,7 +10684,7 @@
           <p:cNvPr id="3" name="Content Placeholder 2">
             <a:extLst>
               <a:ext uri="{FF2B5EF4-FFF2-40B4-BE49-F238E27FC236}">
-                <a16:creationId xmlns:a16="http://schemas.microsoft.com/office/drawing/2014/main" id="{8716B298-CF10-4866-85F6-D856E1963894}"/>
+                <a16:creationId xmlns:a16="http://schemas.microsoft.com/office/drawing/2014/main" id="{14229407-2ED8-43A8-819B-30DDEB3D38EC}"/>
               </a:ext>
             </a:extLst>
           </p:cNvPr>
@@ -10702,14 +10700,26 @@
           <a:bodyPr/>
           <a:lstStyle/>
           <a:p>
-            <a:endParaRPr lang="en-GB"/>
+            <a:r>
+              <a:rPr lang="en-GB" dirty="0"/>
+              <a:t>Concurrency is not parallelism </a:t>
+            </a:r>
+            <a:r>
+              <a:rPr lang="en-GB" dirty="0">
+                <a:latin typeface="Segoe MDL2 Assets" panose="050A0102010101010101" pitchFamily="18" charset="0"/>
+              </a:rPr>
+              <a:t> </a:t>
+            </a:r>
+          </a:p>
+          <a:p>
+            <a:endParaRPr lang="en-GB" dirty="0"/>
           </a:p>
         </p:txBody>
       </p:sp>
     </p:spTree>
     <p:extLst>
       <p:ext uri="{BB962C8B-B14F-4D97-AF65-F5344CB8AC3E}">
-        <p14:creationId xmlns:p14="http://schemas.microsoft.com/office/powerpoint/2010/main" val="3790213746"/>
+        <p14:creationId xmlns:p14="http://schemas.microsoft.com/office/powerpoint/2010/main" val="3193971414"/>
       </p:ext>
     </p:extLst>
   </p:cSld>
@@ -10759,7 +10769,7 @@
           <a:p>
             <a:r>
               <a:rPr lang="en-GB" dirty="0"/>
-              <a:t>Checklist</a:t>
+              <a:t>Checklist of Mistakes</a:t>
             </a:r>
           </a:p>
         </p:txBody>
@@ -10797,6 +10807,37 @@
             </a:r>
           </a:p>
           <a:p>
+            <a:r>
+              <a:rPr lang="en-GB" dirty="0"/>
+              <a:t>You can read from maps concurrently, but you can not write to maps.</a:t>
+            </a:r>
+          </a:p>
+          <a:p>
+            <a:r>
+              <a:rPr lang="en-GB"/>
+              <a:t>Importance </a:t>
+            </a:r>
+            <a:r>
+              <a:rPr lang="en-GB" dirty="0"/>
+              <a:t>of structure to avoid circular dependencies and for ease of readability </a:t>
+            </a:r>
+            <a:r>
+              <a:rPr lang="en-GB" dirty="0">
+                <a:latin typeface="Segoe MDL2 Assets" panose="050A0102010101010101" pitchFamily="18" charset="0"/>
+              </a:rPr>
+              <a:t></a:t>
+            </a:r>
+          </a:p>
+          <a:p>
+            <a:r>
+              <a:rPr lang="en-GB" dirty="0"/>
+              <a:t>By saving your files where the GOPATH is you can access local packages without using relative paths. </a:t>
+            </a:r>
+            <a:endParaRPr lang="en-GB" dirty="0">
+              <a:latin typeface="Segoe MDL2 Assets" panose="050A0102010101010101" pitchFamily="18" charset="0"/>
+            </a:endParaRPr>
+          </a:p>
+          <a:p>
             <a:endParaRPr lang="en-GB" dirty="0"/>
           </a:p>
         </p:txBody>
@@ -10804,7 +10845,7 @@
     </p:spTree>
     <p:extLst>
       <p:ext uri="{BB962C8B-B14F-4D97-AF65-F5344CB8AC3E}">
-        <p14:creationId xmlns:p14="http://schemas.microsoft.com/office/powerpoint/2010/main" val="3193971414"/>
+        <p14:creationId xmlns:p14="http://schemas.microsoft.com/office/powerpoint/2010/main" val="1348224757"/>
       </p:ext>
     </p:extLst>
   </p:cSld>
@@ -10836,7 +10877,7 @@
           <p:cNvPr id="2" name="Title 1">
             <a:extLst>
               <a:ext uri="{FF2B5EF4-FFF2-40B4-BE49-F238E27FC236}">
-                <a16:creationId xmlns:a16="http://schemas.microsoft.com/office/drawing/2014/main" id="{B88F905B-DC9A-4E15-887A-0D816B2DA849}"/>
+                <a16:creationId xmlns:a16="http://schemas.microsoft.com/office/drawing/2014/main" id="{8CEAC96E-108C-4D0F-8090-857DB6659B57}"/>
               </a:ext>
             </a:extLst>
           </p:cNvPr>
@@ -10854,7 +10895,14 @@
           <a:p>
             <a:r>
               <a:rPr lang="en-GB" dirty="0"/>
-              <a:t>Checklist of Mistakes</a:t>
+              <a:t>Solution: Modelling the lives of </a:t>
+            </a:r>
+            <a:br>
+              <a:rPr lang="en-GB" dirty="0"/>
+            </a:br>
+            <a:r>
+              <a:rPr lang="en-GB" dirty="0"/>
+              <a:t>1 million Gophers</a:t>
             </a:r>
           </a:p>
         </p:txBody>
@@ -10864,7 +10912,7 @@
           <p:cNvPr id="3" name="Content Placeholder 2">
             <a:extLst>
               <a:ext uri="{FF2B5EF4-FFF2-40B4-BE49-F238E27FC236}">
-                <a16:creationId xmlns:a16="http://schemas.microsoft.com/office/drawing/2014/main" id="{14229407-2ED8-43A8-819B-30DDEB3D38EC}"/>
+                <a16:creationId xmlns:a16="http://schemas.microsoft.com/office/drawing/2014/main" id="{8AE99B8D-47E8-4045-8955-7E893F2A54A8}"/>
               </a:ext>
             </a:extLst>
           </p:cNvPr>
@@ -10882,55 +10930,33 @@
           <a:p>
             <a:r>
               <a:rPr lang="en-GB" dirty="0"/>
-              <a:t>Concurrency is not parallelism </a:t>
-            </a:r>
-            <a:r>
-              <a:rPr lang="en-GB" dirty="0">
-                <a:latin typeface="Segoe MDL2 Assets" panose="050A0102010101010101" pitchFamily="18" charset="0"/>
-              </a:rPr>
-              <a:t> </a:t>
-            </a:r>
-          </a:p>
-          <a:p>
-            <a:r>
-              <a:rPr lang="en-GB" dirty="0"/>
-              <a:t>You can read from maps concurrently, but you can not write to maps.</a:t>
-            </a:r>
-          </a:p>
-          <a:p>
-            <a:r>
-              <a:rPr lang="en-GB"/>
-              <a:t>Importance </a:t>
-            </a:r>
-            <a:r>
-              <a:rPr lang="en-GB" dirty="0"/>
-              <a:t>of structure to avoid circular dependencies and for ease of readability </a:t>
-            </a:r>
-            <a:r>
-              <a:rPr lang="en-GB" dirty="0">
-                <a:latin typeface="Segoe MDL2 Assets" panose="050A0102010101010101" pitchFamily="18" charset="0"/>
-              </a:rPr>
-              <a:t></a:t>
-            </a:r>
-          </a:p>
-          <a:p>
-            <a:r>
-              <a:rPr lang="en-GB" dirty="0"/>
-              <a:t>By saving your files where the GOPATH is you can access local packages without using relative paths. </a:t>
-            </a:r>
-            <a:endParaRPr lang="en-GB" dirty="0">
-              <a:latin typeface="Segoe MDL2 Assets" panose="050A0102010101010101" pitchFamily="18" charset="0"/>
-            </a:endParaRPr>
+              <a:t>Create a PowerPoint presentation talking about the cyclical nature of Learning how to Program. </a:t>
+            </a:r>
           </a:p>
           <a:p>
             <a:endParaRPr lang="en-GB" dirty="0"/>
+          </a:p>
+          <a:p>
+            <a:r>
+              <a:rPr lang="en-GB" dirty="0"/>
+              <a:t>For Newcomers</a:t>
+            </a:r>
+          </a:p>
+          <a:p>
+            <a:endParaRPr lang="en-GB" dirty="0"/>
+          </a:p>
+          <a:p>
+            <a:r>
+              <a:rPr lang="en-GB" dirty="0"/>
+              <a:t>Talk about how by making a presentation those who aren’t Gopher or are new Gophers might see the first steps </a:t>
+            </a:r>
           </a:p>
         </p:txBody>
       </p:sp>
     </p:spTree>
     <p:extLst>
       <p:ext uri="{BB962C8B-B14F-4D97-AF65-F5344CB8AC3E}">
-        <p14:creationId xmlns:p14="http://schemas.microsoft.com/office/powerpoint/2010/main" val="1348224757"/>
+        <p14:creationId xmlns:p14="http://schemas.microsoft.com/office/powerpoint/2010/main" val="18358553"/>
       </p:ext>
     </p:extLst>
   </p:cSld>
@@ -10962,7 +10988,7 @@
           <p:cNvPr id="2" name="Title 1">
             <a:extLst>
               <a:ext uri="{FF2B5EF4-FFF2-40B4-BE49-F238E27FC236}">
-                <a16:creationId xmlns:a16="http://schemas.microsoft.com/office/drawing/2014/main" id="{8CEAC96E-108C-4D0F-8090-857DB6659B57}"/>
+                <a16:creationId xmlns:a16="http://schemas.microsoft.com/office/drawing/2014/main" id="{4308289F-0E0E-476A-B59D-4EA725293BE4}"/>
               </a:ext>
             </a:extLst>
           </p:cNvPr>
@@ -10978,17 +11004,7 @@
           <a:bodyPr/>
           <a:lstStyle/>
           <a:p>
-            <a:r>
-              <a:rPr lang="en-GB" dirty="0"/>
-              <a:t>Solution: Modelling the lives of </a:t>
-            </a:r>
-            <a:br>
-              <a:rPr lang="en-GB" dirty="0"/>
-            </a:br>
-            <a:r>
-              <a:rPr lang="en-GB" dirty="0"/>
-              <a:t>1 million Gophers</a:t>
-            </a:r>
+            <a:endParaRPr lang="en-GB"/>
           </a:p>
         </p:txBody>
       </p:sp>
@@ -10997,7 +11013,7 @@
           <p:cNvPr id="3" name="Content Placeholder 2">
             <a:extLst>
               <a:ext uri="{FF2B5EF4-FFF2-40B4-BE49-F238E27FC236}">
-                <a16:creationId xmlns:a16="http://schemas.microsoft.com/office/drawing/2014/main" id="{8AE99B8D-47E8-4045-8955-7E893F2A54A8}"/>
+                <a16:creationId xmlns:a16="http://schemas.microsoft.com/office/drawing/2014/main" id="{BEF9C690-EE15-4B2C-B36B-FCEB4E2D0BA8}"/>
               </a:ext>
             </a:extLst>
           </p:cNvPr>
@@ -11013,35 +11029,161 @@
           <a:bodyPr/>
           <a:lstStyle/>
           <a:p>
-            <a:r>
-              <a:rPr lang="en-GB" dirty="0"/>
-              <a:t>Create a PowerPoint presentation talking about the cyclical nature of Learning how to Program. </a:t>
-            </a:r>
-          </a:p>
-          <a:p>
-            <a:endParaRPr lang="en-GB" dirty="0"/>
-          </a:p>
-          <a:p>
-            <a:r>
-              <a:rPr lang="en-GB" dirty="0"/>
-              <a:t>For Newcomers</a:t>
-            </a:r>
-          </a:p>
-          <a:p>
-            <a:endParaRPr lang="en-GB" dirty="0"/>
-          </a:p>
-          <a:p>
-            <a:r>
-              <a:rPr lang="en-GB" dirty="0"/>
-              <a:t>Talk about how by making a presentation those who aren’t Gopher or are new Gophers might see the first steps </a:t>
-            </a:r>
-          </a:p>
-        </p:txBody>
-      </p:sp>
+            <a:endParaRPr lang="en-GB"/>
+          </a:p>
+        </p:txBody>
+      </p:sp>
+      <p:pic>
+        <p:nvPicPr>
+          <p:cNvPr id="4" name="Picture 3">
+            <a:extLst>
+              <a:ext uri="{FF2B5EF4-FFF2-40B4-BE49-F238E27FC236}">
+                <a16:creationId xmlns:a16="http://schemas.microsoft.com/office/drawing/2014/main" id="{39228C1A-0187-4B3B-87CE-71B44540FC75}"/>
+              </a:ext>
+            </a:extLst>
+          </p:cNvPr>
+          <p:cNvPicPr>
+            <a:picLocks noChangeAspect="1"/>
+          </p:cNvPicPr>
+          <p:nvPr/>
+        </p:nvPicPr>
+        <p:blipFill>
+          <a:blip r:embed="rId2"/>
+          <a:stretch>
+            <a:fillRect/>
+          </a:stretch>
+        </p:blipFill>
+        <p:spPr>
+          <a:xfrm>
+            <a:off x="0" y="436838"/>
+            <a:ext cx="12192000" cy="5984323"/>
+          </a:xfrm>
+          <a:prstGeom prst="rect">
+            <a:avLst/>
+          </a:prstGeom>
+        </p:spPr>
+      </p:pic>
     </p:spTree>
     <p:extLst>
       <p:ext uri="{BB962C8B-B14F-4D97-AF65-F5344CB8AC3E}">
-        <p14:creationId xmlns:p14="http://schemas.microsoft.com/office/powerpoint/2010/main" val="18358553"/>
+        <p14:creationId xmlns:p14="http://schemas.microsoft.com/office/powerpoint/2010/main" val="2478653298"/>
+      </p:ext>
+    </p:extLst>
+  </p:cSld>
+  <p:clrMapOvr>
+    <a:masterClrMapping/>
+  </p:clrMapOvr>
+</p:sld>
+</file>
+
+<file path=ppt/slides/slide47.xml><?xml version="1.0" encoding="utf-8"?>
+<p:sld xmlns:a="http://schemas.openxmlformats.org/drawingml/2006/main" xmlns:r="http://schemas.openxmlformats.org/officeDocument/2006/relationships" xmlns:p="http://schemas.openxmlformats.org/presentationml/2006/main">
+  <p:cSld>
+    <p:spTree>
+      <p:nvGrpSpPr>
+        <p:cNvPr id="1" name=""/>
+        <p:cNvGrpSpPr/>
+        <p:nvPr/>
+      </p:nvGrpSpPr>
+      <p:grpSpPr>
+        <a:xfrm>
+          <a:off x="0" y="0"/>
+          <a:ext cx="0" cy="0"/>
+          <a:chOff x="0" y="0"/>
+          <a:chExt cx="0" cy="0"/>
+        </a:xfrm>
+      </p:grpSpPr>
+      <p:sp>
+        <p:nvSpPr>
+          <p:cNvPr id="2" name="Title 1">
+            <a:extLst>
+              <a:ext uri="{FF2B5EF4-FFF2-40B4-BE49-F238E27FC236}">
+                <a16:creationId xmlns:a16="http://schemas.microsoft.com/office/drawing/2014/main" id="{E860577F-CE5A-4C36-9B88-C0A36F3002B3}"/>
+              </a:ext>
+            </a:extLst>
+          </p:cNvPr>
+          <p:cNvSpPr>
+            <a:spLocks noGrp="1"/>
+          </p:cNvSpPr>
+          <p:nvPr>
+            <p:ph type="title"/>
+          </p:nvPr>
+        </p:nvSpPr>
+        <p:spPr/>
+        <p:txBody>
+          <a:bodyPr/>
+          <a:lstStyle/>
+          <a:p>
+            <a:r>
+              <a:rPr lang="en-GB" dirty="0"/>
+              <a:t>After </a:t>
+            </a:r>
+            <a:r>
+              <a:rPr lang="en-GB"/>
+              <a:t>The Spiral Change</a:t>
+            </a:r>
+          </a:p>
+        </p:txBody>
+      </p:sp>
+      <p:sp>
+        <p:nvSpPr>
+          <p:cNvPr id="3" name="Content Placeholder 2">
+            <a:extLst>
+              <a:ext uri="{FF2B5EF4-FFF2-40B4-BE49-F238E27FC236}">
+                <a16:creationId xmlns:a16="http://schemas.microsoft.com/office/drawing/2014/main" id="{8B8DE919-1F1F-4856-AED7-D0129CB20F6A}"/>
+              </a:ext>
+            </a:extLst>
+          </p:cNvPr>
+          <p:cNvSpPr>
+            <a:spLocks noGrp="1"/>
+          </p:cNvSpPr>
+          <p:nvPr>
+            <p:ph idx="1"/>
+          </p:nvPr>
+        </p:nvSpPr>
+        <p:spPr/>
+        <p:txBody>
+          <a:bodyPr/>
+          <a:lstStyle/>
+          <a:p>
+            <a:endParaRPr lang="en-GB"/>
+          </a:p>
+        </p:txBody>
+      </p:sp>
+      <p:pic>
+        <p:nvPicPr>
+          <p:cNvPr id="4" name="Picture 3">
+            <a:extLst>
+              <a:ext uri="{FF2B5EF4-FFF2-40B4-BE49-F238E27FC236}">
+                <a16:creationId xmlns:a16="http://schemas.microsoft.com/office/drawing/2014/main" id="{777F68AB-4738-482A-88C4-4C23BED7816E}"/>
+              </a:ext>
+            </a:extLst>
+          </p:cNvPr>
+          <p:cNvPicPr>
+            <a:picLocks noChangeAspect="1"/>
+          </p:cNvPicPr>
+          <p:nvPr/>
+        </p:nvPicPr>
+        <p:blipFill>
+          <a:blip r:embed="rId2"/>
+          <a:stretch>
+            <a:fillRect/>
+          </a:stretch>
+        </p:blipFill>
+        <p:spPr>
+          <a:xfrm>
+            <a:off x="3335628" y="1816770"/>
+            <a:ext cx="5937691" cy="4755918"/>
+          </a:xfrm>
+          <a:prstGeom prst="rect">
+            <a:avLst/>
+          </a:prstGeom>
+        </p:spPr>
+      </p:pic>
+    </p:spTree>
+    <p:extLst>
+      <p:ext uri="{BB962C8B-B14F-4D97-AF65-F5344CB8AC3E}">
+        <p14:creationId xmlns:p14="http://schemas.microsoft.com/office/powerpoint/2010/main" val="153626428"/>
       </p:ext>
     </p:extLst>
   </p:cSld>

</xml_diff>

<commit_message>
Partition map stuff and presentation updates. It's been like 2 weeks
</commit_message>
<xml_diff>
--- a/GopherLife.pptx
+++ b/GopherLife.pptx
@@ -5,7 +5,7 @@
     <p:sldMasterId id="2147483678" r:id="rId1"/>
   </p:sldMasterIdLst>
   <p:notesMasterIdLst>
-    <p:notesMasterId r:id="rId51"/>
+    <p:notesMasterId r:id="rId48"/>
   </p:notesMasterIdLst>
   <p:sldIdLst>
     <p:sldId id="256" r:id="rId2"/>
@@ -23,40 +23,37 @@
     <p:sldId id="281" r:id="rId14"/>
     <p:sldId id="280" r:id="rId15"/>
     <p:sldId id="274" r:id="rId16"/>
-    <p:sldId id="275" r:id="rId17"/>
-    <p:sldId id="282" r:id="rId18"/>
-    <p:sldId id="291" r:id="rId19"/>
-    <p:sldId id="288" r:id="rId20"/>
-    <p:sldId id="283" r:id="rId21"/>
-    <p:sldId id="284" r:id="rId22"/>
-    <p:sldId id="292" r:id="rId23"/>
-    <p:sldId id="290" r:id="rId24"/>
-    <p:sldId id="307" r:id="rId25"/>
-    <p:sldId id="289" r:id="rId26"/>
-    <p:sldId id="308" r:id="rId27"/>
-    <p:sldId id="303" r:id="rId28"/>
-    <p:sldId id="313" r:id="rId29"/>
-    <p:sldId id="309" r:id="rId30"/>
-    <p:sldId id="314" r:id="rId31"/>
-    <p:sldId id="311" r:id="rId32"/>
-    <p:sldId id="315" r:id="rId33"/>
-    <p:sldId id="316" r:id="rId34"/>
-    <p:sldId id="317" r:id="rId35"/>
-    <p:sldId id="318" r:id="rId36"/>
-    <p:sldId id="320" r:id="rId37"/>
-    <p:sldId id="321" r:id="rId38"/>
-    <p:sldId id="323" r:id="rId39"/>
-    <p:sldId id="322" r:id="rId40"/>
-    <p:sldId id="319" r:id="rId41"/>
-    <p:sldId id="324" r:id="rId42"/>
-    <p:sldId id="287" r:id="rId43"/>
-    <p:sldId id="286" r:id="rId44"/>
-    <p:sldId id="327" r:id="rId45"/>
-    <p:sldId id="325" r:id="rId46"/>
-    <p:sldId id="264" r:id="rId47"/>
-    <p:sldId id="301" r:id="rId48"/>
-    <p:sldId id="305" r:id="rId49"/>
-    <p:sldId id="306" r:id="rId50"/>
+    <p:sldId id="330" r:id="rId17"/>
+    <p:sldId id="331" r:id="rId18"/>
+    <p:sldId id="332" r:id="rId19"/>
+    <p:sldId id="333" r:id="rId20"/>
+    <p:sldId id="334" r:id="rId21"/>
+    <p:sldId id="288" r:id="rId22"/>
+    <p:sldId id="289" r:id="rId23"/>
+    <p:sldId id="308" r:id="rId24"/>
+    <p:sldId id="303" r:id="rId25"/>
+    <p:sldId id="313" r:id="rId26"/>
+    <p:sldId id="309" r:id="rId27"/>
+    <p:sldId id="314" r:id="rId28"/>
+    <p:sldId id="311" r:id="rId29"/>
+    <p:sldId id="315" r:id="rId30"/>
+    <p:sldId id="316" r:id="rId31"/>
+    <p:sldId id="317" r:id="rId32"/>
+    <p:sldId id="318" r:id="rId33"/>
+    <p:sldId id="320" r:id="rId34"/>
+    <p:sldId id="321" r:id="rId35"/>
+    <p:sldId id="323" r:id="rId36"/>
+    <p:sldId id="322" r:id="rId37"/>
+    <p:sldId id="319" r:id="rId38"/>
+    <p:sldId id="324" r:id="rId39"/>
+    <p:sldId id="287" r:id="rId40"/>
+    <p:sldId id="286" r:id="rId41"/>
+    <p:sldId id="327" r:id="rId42"/>
+    <p:sldId id="325" r:id="rId43"/>
+    <p:sldId id="264" r:id="rId44"/>
+    <p:sldId id="301" r:id="rId45"/>
+    <p:sldId id="305" r:id="rId46"/>
+    <p:sldId id="306" r:id="rId47"/>
   </p:sldIdLst>
   <p:sldSz cx="12192000" cy="6858000"/>
   <p:notesSz cx="6858000" cy="9144000"/>
@@ -245,7 +242,7 @@
           <a:p>
             <a:fld id="{4F997A0C-E4B2-467D-ABDF-C6BB0AD1437F}" type="datetimeFigureOut">
               <a:rPr lang="en-GB" smtClean="0"/>
-              <a:t>31/12/2018</a:t>
+              <a:t>23/01/2019</a:t>
             </a:fld>
             <a:endParaRPr lang="en-GB"/>
           </a:p>
@@ -578,7 +575,7 @@
           <a:p>
             <a:fld id="{D37E09BB-0EE2-4AA1-9043-B532D0F5CCDE}" type="slidenum">
               <a:rPr lang="en-GB" smtClean="0"/>
-              <a:t>27</a:t>
+              <a:t>24</a:t>
             </a:fld>
             <a:endParaRPr lang="en-GB"/>
           </a:p>
@@ -783,7 +780,7 @@
           <a:p>
             <a:fld id="{55E4148D-2AA3-4A29-8641-0082B7E18494}" type="datetimeFigureOut">
               <a:rPr lang="en-GB" smtClean="0"/>
-              <a:t>31/12/2018</a:t>
+              <a:t>23/01/2019</a:t>
             </a:fld>
             <a:endParaRPr lang="en-GB"/>
           </a:p>
@@ -1058,7 +1055,7 @@
           <a:p>
             <a:fld id="{55E4148D-2AA3-4A29-8641-0082B7E18494}" type="datetimeFigureOut">
               <a:rPr lang="en-GB" smtClean="0"/>
-              <a:t>31/12/2018</a:t>
+              <a:t>23/01/2019</a:t>
             </a:fld>
             <a:endParaRPr lang="en-GB"/>
           </a:p>
@@ -1252,7 +1249,7 @@
           <a:p>
             <a:fld id="{55E4148D-2AA3-4A29-8641-0082B7E18494}" type="datetimeFigureOut">
               <a:rPr lang="en-GB" smtClean="0"/>
-              <a:t>31/12/2018</a:t>
+              <a:t>23/01/2019</a:t>
             </a:fld>
             <a:endParaRPr lang="en-GB"/>
           </a:p>
@@ -1525,7 +1522,7 @@
           <a:p>
             <a:fld id="{55E4148D-2AA3-4A29-8641-0082B7E18494}" type="datetimeFigureOut">
               <a:rPr lang="en-GB" smtClean="0"/>
-              <a:t>31/12/2018</a:t>
+              <a:t>23/01/2019</a:t>
             </a:fld>
             <a:endParaRPr lang="en-GB"/>
           </a:p>
@@ -1866,7 +1863,7 @@
           <a:p>
             <a:fld id="{55E4148D-2AA3-4A29-8641-0082B7E18494}" type="datetimeFigureOut">
               <a:rPr lang="en-GB" smtClean="0"/>
-              <a:t>31/12/2018</a:t>
+              <a:t>23/01/2019</a:t>
             </a:fld>
             <a:endParaRPr lang="en-GB"/>
           </a:p>
@@ -2489,7 +2486,7 @@
           <a:p>
             <a:fld id="{55E4148D-2AA3-4A29-8641-0082B7E18494}" type="datetimeFigureOut">
               <a:rPr lang="en-GB" smtClean="0"/>
-              <a:t>31/12/2018</a:t>
+              <a:t>23/01/2019</a:t>
             </a:fld>
             <a:endParaRPr lang="en-GB"/>
           </a:p>
@@ -3349,7 +3346,7 @@
           <a:p>
             <a:fld id="{55E4148D-2AA3-4A29-8641-0082B7E18494}" type="datetimeFigureOut">
               <a:rPr lang="en-GB" smtClean="0"/>
-              <a:t>31/12/2018</a:t>
+              <a:t>23/01/2019</a:t>
             </a:fld>
             <a:endParaRPr lang="en-GB"/>
           </a:p>
@@ -3519,7 +3516,7 @@
           <a:p>
             <a:fld id="{55E4148D-2AA3-4A29-8641-0082B7E18494}" type="datetimeFigureOut">
               <a:rPr lang="en-GB" smtClean="0"/>
-              <a:t>31/12/2018</a:t>
+              <a:t>23/01/2019</a:t>
             </a:fld>
             <a:endParaRPr lang="en-GB"/>
           </a:p>
@@ -3699,7 +3696,7 @@
           <a:p>
             <a:fld id="{55E4148D-2AA3-4A29-8641-0082B7E18494}" type="datetimeFigureOut">
               <a:rPr lang="en-GB" smtClean="0"/>
-              <a:t>31/12/2018</a:t>
+              <a:t>23/01/2019</a:t>
             </a:fld>
             <a:endParaRPr lang="en-GB"/>
           </a:p>
@@ -3869,7 +3866,7 @@
           <a:p>
             <a:fld id="{55E4148D-2AA3-4A29-8641-0082B7E18494}" type="datetimeFigureOut">
               <a:rPr lang="en-GB" smtClean="0"/>
-              <a:t>31/12/2018</a:t>
+              <a:t>23/01/2019</a:t>
             </a:fld>
             <a:endParaRPr lang="en-GB"/>
           </a:p>
@@ -4116,7 +4113,7 @@
           <a:p>
             <a:fld id="{55E4148D-2AA3-4A29-8641-0082B7E18494}" type="datetimeFigureOut">
               <a:rPr lang="en-GB" smtClean="0"/>
-              <a:t>31/12/2018</a:t>
+              <a:t>23/01/2019</a:t>
             </a:fld>
             <a:endParaRPr lang="en-GB"/>
           </a:p>
@@ -4408,7 +4405,7 @@
           <a:p>
             <a:fld id="{55E4148D-2AA3-4A29-8641-0082B7E18494}" type="datetimeFigureOut">
               <a:rPr lang="en-GB" smtClean="0"/>
-              <a:t>31/12/2018</a:t>
+              <a:t>23/01/2019</a:t>
             </a:fld>
             <a:endParaRPr lang="en-GB"/>
           </a:p>
@@ -4852,7 +4849,7 @@
           <a:p>
             <a:fld id="{55E4148D-2AA3-4A29-8641-0082B7E18494}" type="datetimeFigureOut">
               <a:rPr lang="en-GB" smtClean="0"/>
-              <a:t>31/12/2018</a:t>
+              <a:t>23/01/2019</a:t>
             </a:fld>
             <a:endParaRPr lang="en-GB"/>
           </a:p>
@@ -4970,7 +4967,7 @@
           <a:p>
             <a:fld id="{55E4148D-2AA3-4A29-8641-0082B7E18494}" type="datetimeFigureOut">
               <a:rPr lang="en-GB" smtClean="0"/>
-              <a:t>31/12/2018</a:t>
+              <a:t>23/01/2019</a:t>
             </a:fld>
             <a:endParaRPr lang="en-GB"/>
           </a:p>
@@ -5065,7 +5062,7 @@
           <a:p>
             <a:fld id="{55E4148D-2AA3-4A29-8641-0082B7E18494}" type="datetimeFigureOut">
               <a:rPr lang="en-GB" smtClean="0"/>
-              <a:t>31/12/2018</a:t>
+              <a:t>23/01/2019</a:t>
             </a:fld>
             <a:endParaRPr lang="en-GB"/>
           </a:p>
@@ -5344,7 +5341,7 @@
           <a:p>
             <a:fld id="{55E4148D-2AA3-4A29-8641-0082B7E18494}" type="datetimeFigureOut">
               <a:rPr lang="en-GB" smtClean="0"/>
-              <a:t>31/12/2018</a:t>
+              <a:t>23/01/2019</a:t>
             </a:fld>
             <a:endParaRPr lang="en-GB"/>
           </a:p>
@@ -5619,7 +5616,7 @@
           <a:p>
             <a:fld id="{55E4148D-2AA3-4A29-8641-0082B7E18494}" type="datetimeFigureOut">
               <a:rPr lang="en-GB" smtClean="0"/>
-              <a:t>31/12/2018</a:t>
+              <a:t>23/01/2019</a:t>
             </a:fld>
             <a:endParaRPr lang="en-GB"/>
           </a:p>
@@ -6048,7 +6045,7 @@
           <a:p>
             <a:fld id="{55E4148D-2AA3-4A29-8641-0082B7E18494}" type="datetimeFigureOut">
               <a:rPr lang="en-GB" smtClean="0"/>
-              <a:t>31/12/2018</a:t>
+              <a:t>23/01/2019</a:t>
             </a:fld>
             <a:endParaRPr lang="en-GB"/>
           </a:p>
@@ -7541,7 +7538,7 @@
           <p:cNvPr id="2" name="Title 1">
             <a:extLst>
               <a:ext uri="{FF2B5EF4-FFF2-40B4-BE49-F238E27FC236}">
-                <a16:creationId xmlns:a16="http://schemas.microsoft.com/office/drawing/2014/main" id="{BF87F792-881D-45E8-AE31-8DF9ADAEFECE}"/>
+                <a16:creationId xmlns:a16="http://schemas.microsoft.com/office/drawing/2014/main" id="{4F111F9A-FE2E-4C4B-9E7F-E241325C02DC}"/>
               </a:ext>
             </a:extLst>
           </p:cNvPr>
@@ -7552,19 +7549,14 @@
             <p:ph type="title"/>
           </p:nvPr>
         </p:nvSpPr>
-        <p:spPr>
-          <a:xfrm>
-            <a:off x="646111" y="452718"/>
-            <a:ext cx="9795466" cy="1400530"/>
-          </a:xfrm>
-        </p:spPr>
-        <p:txBody>
-          <a:bodyPr/>
-          <a:lstStyle/>
-          <a:p>
-            <a:r>
-              <a:rPr lang="en-GB" dirty="0"/>
-              <a:t>Problem 3 – Life is a bit Empty isn’t it?</a:t>
+        <p:spPr/>
+        <p:txBody>
+          <a:bodyPr/>
+          <a:lstStyle/>
+          <a:p>
+            <a:r>
+              <a:rPr lang="en-GB" dirty="0"/>
+              <a:t>Part 3 – Life is a bit Empty isn’t it?</a:t>
             </a:r>
           </a:p>
         </p:txBody>
@@ -7574,7 +7566,7 @@
           <p:cNvPr id="3" name="Content Placeholder 2">
             <a:extLst>
               <a:ext uri="{FF2B5EF4-FFF2-40B4-BE49-F238E27FC236}">
-                <a16:creationId xmlns:a16="http://schemas.microsoft.com/office/drawing/2014/main" id="{817514AC-09C2-45A7-9888-12674F0EB104}"/>
+                <a16:creationId xmlns:a16="http://schemas.microsoft.com/office/drawing/2014/main" id="{2AB82B5F-3975-4898-A237-0D7CC86754E1}"/>
               </a:ext>
             </a:extLst>
           </p:cNvPr>
@@ -7592,48 +7584,45 @@
           <a:p>
             <a:r>
               <a:rPr lang="en-GB" dirty="0"/>
-              <a:t>Gophers need things to do. </a:t>
-            </a:r>
-          </a:p>
-          <a:p>
-            <a:endParaRPr lang="en-GB" dirty="0"/>
-          </a:p>
-          <a:p>
-            <a:r>
-              <a:rPr lang="en-GB" dirty="0"/>
-              <a:t>They need space to wonder around and frolic freely!</a:t>
-            </a:r>
-          </a:p>
-          <a:p>
-            <a:endParaRPr lang="en-GB" dirty="0"/>
-          </a:p>
-          <a:p>
-            <a:r>
-              <a:rPr lang="en-GB" dirty="0"/>
-              <a:t>They need food to stop from going hungry. </a:t>
-            </a:r>
-          </a:p>
-          <a:p>
-            <a:endParaRPr lang="en-GB" dirty="0"/>
-          </a:p>
-          <a:p>
-            <a:r>
-              <a:rPr lang="en-GB" dirty="0"/>
-              <a:t>They need companionship?</a:t>
-            </a:r>
-          </a:p>
-          <a:p>
-            <a:endParaRPr lang="en-GB" dirty="0"/>
-          </a:p>
-          <a:p>
-            <a:endParaRPr lang="en-GB" dirty="0"/>
-          </a:p>
-        </p:txBody>
-      </p:sp>
+              <a:t>I decided to expand on what a gopher needed to do with it’s life</a:t>
+            </a:r>
+          </a:p>
+        </p:txBody>
+      </p:sp>
+      <p:pic>
+        <p:nvPicPr>
+          <p:cNvPr id="4" name="Picture 3">
+            <a:extLst>
+              <a:ext uri="{FF2B5EF4-FFF2-40B4-BE49-F238E27FC236}">
+                <a16:creationId xmlns:a16="http://schemas.microsoft.com/office/drawing/2014/main" id="{D908064B-4D88-463C-AE8A-ABE0AB49F595}"/>
+              </a:ext>
+            </a:extLst>
+          </p:cNvPr>
+          <p:cNvPicPr>
+            <a:picLocks noChangeAspect="1"/>
+          </p:cNvPicPr>
+          <p:nvPr/>
+        </p:nvPicPr>
+        <p:blipFill>
+          <a:blip r:embed="rId2"/>
+          <a:stretch>
+            <a:fillRect/>
+          </a:stretch>
+        </p:blipFill>
+        <p:spPr>
+          <a:xfrm>
+            <a:off x="4184370" y="2756519"/>
+            <a:ext cx="3823259" cy="3810300"/>
+          </a:xfrm>
+          <a:prstGeom prst="rect">
+            <a:avLst/>
+          </a:prstGeom>
+        </p:spPr>
+      </p:pic>
     </p:spTree>
     <p:extLst>
       <p:ext uri="{BB962C8B-B14F-4D97-AF65-F5344CB8AC3E}">
-        <p14:creationId xmlns:p14="http://schemas.microsoft.com/office/powerpoint/2010/main" val="1176287068"/>
+        <p14:creationId xmlns:p14="http://schemas.microsoft.com/office/powerpoint/2010/main" val="3355872224"/>
       </p:ext>
     </p:extLst>
   </p:cSld>
@@ -7665,7 +7654,7 @@
           <p:cNvPr id="2" name="Title 1">
             <a:extLst>
               <a:ext uri="{FF2B5EF4-FFF2-40B4-BE49-F238E27FC236}">
-                <a16:creationId xmlns:a16="http://schemas.microsoft.com/office/drawing/2014/main" id="{03C8D16E-7E18-4405-A51A-FB0FEAC886AF}"/>
+                <a16:creationId xmlns:a16="http://schemas.microsoft.com/office/drawing/2014/main" id="{C4FA78B2-BB2F-4238-BA67-BC45713BF05D}"/>
               </a:ext>
             </a:extLst>
           </p:cNvPr>
@@ -7683,7 +7672,7 @@
           <a:p>
             <a:r>
               <a:rPr lang="en-GB" dirty="0"/>
-              <a:t>Solutions</a:t>
+              <a:t>Part 3 - Continued</a:t>
             </a:r>
           </a:p>
         </p:txBody>
@@ -7693,7 +7682,7 @@
           <p:cNvPr id="3" name="Content Placeholder 2">
             <a:extLst>
               <a:ext uri="{FF2B5EF4-FFF2-40B4-BE49-F238E27FC236}">
-                <a16:creationId xmlns:a16="http://schemas.microsoft.com/office/drawing/2014/main" id="{AFADAECE-6040-4858-8EA5-603B2078386D}"/>
+                <a16:creationId xmlns:a16="http://schemas.microsoft.com/office/drawing/2014/main" id="{F5F72E8E-2DF7-4D69-BE10-F5C941F78E27}"/>
               </a:ext>
             </a:extLst>
           </p:cNvPr>
@@ -7704,19 +7693,22 @@
             <p:ph idx="1"/>
           </p:nvPr>
         </p:nvSpPr>
-        <p:spPr>
-          <a:xfrm>
-            <a:off x="646111" y="1853248"/>
-            <a:ext cx="5195887" cy="4195481"/>
-          </a:xfrm>
-        </p:spPr>
-        <p:txBody>
-          <a:bodyPr/>
-          <a:lstStyle/>
-          <a:p>
-            <a:r>
-              <a:rPr lang="en-GB" dirty="0"/>
-              <a:t>Creating a World and giving gophers a position in it. </a:t>
+        <p:spPr/>
+        <p:txBody>
+          <a:bodyPr/>
+          <a:lstStyle/>
+          <a:p>
+            <a:r>
+              <a:rPr lang="en-GB" dirty="0"/>
+              <a:t>The world is represented using ye </a:t>
+            </a:r>
+            <a:r>
+              <a:rPr lang="en-GB" dirty="0" err="1"/>
+              <a:t>olde</a:t>
+            </a:r>
+            <a:r>
+              <a:rPr lang="en-GB" dirty="0"/>
+              <a:t> 2D map idea. </a:t>
             </a:r>
           </a:p>
           <a:p>
@@ -7725,11 +7717,8 @@
           <a:p>
             <a:r>
               <a:rPr lang="en-GB" dirty="0"/>
-              <a:t>Creating objectives for gophers to do during their lives. </a:t>
-            </a:r>
-          </a:p>
-          <a:p>
-            <a:endParaRPr lang="en-GB" dirty="0"/>
+              <a:t>Each  Coordinate can contain a gopher and some food but not multiple of each</a:t>
+            </a:r>
           </a:p>
         </p:txBody>
       </p:sp>
@@ -7738,7 +7727,7 @@
           <p:cNvPr id="4" name="Picture 3">
             <a:extLst>
               <a:ext uri="{FF2B5EF4-FFF2-40B4-BE49-F238E27FC236}">
-                <a16:creationId xmlns:a16="http://schemas.microsoft.com/office/drawing/2014/main" id="{30053788-80FF-4215-907E-5BB1331D61D1}"/>
+                <a16:creationId xmlns:a16="http://schemas.microsoft.com/office/drawing/2014/main" id="{DAB6C06B-8E3F-4383-A18F-2E9F0D59B17D}"/>
               </a:ext>
             </a:extLst>
           </p:cNvPr>
@@ -7755,37 +7744,7 @@
         </p:blipFill>
         <p:spPr>
           <a:xfrm>
-            <a:off x="6096000" y="1152983"/>
-            <a:ext cx="2726267" cy="2717026"/>
-          </a:xfrm>
-          <a:prstGeom prst="rect">
-            <a:avLst/>
-          </a:prstGeom>
-        </p:spPr>
-      </p:pic>
-      <p:pic>
-        <p:nvPicPr>
-          <p:cNvPr id="5" name="Picture 4">
-            <a:extLst>
-              <a:ext uri="{FF2B5EF4-FFF2-40B4-BE49-F238E27FC236}">
-                <a16:creationId xmlns:a16="http://schemas.microsoft.com/office/drawing/2014/main" id="{6E30225E-5CE2-4F89-9DA2-E0A7A0F2AB4D}"/>
-              </a:ext>
-            </a:extLst>
-          </p:cNvPr>
-          <p:cNvPicPr>
-            <a:picLocks noChangeAspect="1"/>
-          </p:cNvPicPr>
-          <p:nvPr/>
-        </p:nvPicPr>
-        <p:blipFill>
-          <a:blip r:embed="rId3"/>
-          <a:stretch>
-            <a:fillRect/>
-          </a:stretch>
-        </p:blipFill>
-        <p:spPr>
-          <a:xfrm>
-            <a:off x="6096000" y="4570274"/>
+            <a:off x="3828500" y="3942921"/>
             <a:ext cx="3496163" cy="1724266"/>
           </a:xfrm>
           <a:prstGeom prst="rect">
@@ -7796,7 +7755,7 @@
     </p:spTree>
     <p:extLst>
       <p:ext uri="{BB962C8B-B14F-4D97-AF65-F5344CB8AC3E}">
-        <p14:creationId xmlns:p14="http://schemas.microsoft.com/office/powerpoint/2010/main" val="3807005577"/>
+        <p14:creationId xmlns:p14="http://schemas.microsoft.com/office/powerpoint/2010/main" val="1539430830"/>
       </p:ext>
     </p:extLst>
   </p:cSld>
@@ -7828,7 +7787,7 @@
           <p:cNvPr id="2" name="Title 1">
             <a:extLst>
               <a:ext uri="{FF2B5EF4-FFF2-40B4-BE49-F238E27FC236}">
-                <a16:creationId xmlns:a16="http://schemas.microsoft.com/office/drawing/2014/main" id="{B1B69005-AC4F-4731-BD4E-09D539987B55}"/>
+                <a16:creationId xmlns:a16="http://schemas.microsoft.com/office/drawing/2014/main" id="{D0126B37-117B-4921-B225-375473E6B464}"/>
               </a:ext>
             </a:extLst>
           </p:cNvPr>
@@ -7846,17 +7805,17 @@
           <a:p>
             <a:r>
               <a:rPr lang="en-GB" dirty="0"/>
-              <a:t>Solutions</a:t>
-            </a:r>
-          </a:p>
-        </p:txBody>
-      </p:sp>
-      <p:sp>
-        <p:nvSpPr>
-          <p:cNvPr id="5" name="Content Placeholder 4">
+              <a:t>Part 3 - Continued</a:t>
+            </a:r>
+          </a:p>
+        </p:txBody>
+      </p:sp>
+      <p:sp>
+        <p:nvSpPr>
+          <p:cNvPr id="3" name="Content Placeholder 2">
             <a:extLst>
               <a:ext uri="{FF2B5EF4-FFF2-40B4-BE49-F238E27FC236}">
-                <a16:creationId xmlns:a16="http://schemas.microsoft.com/office/drawing/2014/main" id="{BBBF52A4-BB0E-45F5-8DD4-ECE7DE140C56}"/>
+                <a16:creationId xmlns:a16="http://schemas.microsoft.com/office/drawing/2014/main" id="{1A34EBD0-0B29-44EC-88B3-7EEEA473C965}"/>
               </a:ext>
             </a:extLst>
           </p:cNvPr>
@@ -7874,7 +7833,25 @@
           <a:p>
             <a:r>
               <a:rPr lang="en-GB" dirty="0"/>
-              <a:t>(Currently empty but will expand)</a:t>
+              <a:t>Each world ‘frame’ a gopher would decide what to do. </a:t>
+            </a:r>
+          </a:p>
+          <a:p>
+            <a:endParaRPr lang="en-GB" dirty="0"/>
+          </a:p>
+          <a:p>
+            <a:r>
+              <a:rPr lang="en-GB" dirty="0"/>
+              <a:t>This would range from moving towards food, eating food it picked  up, feeling hungry, or just wandering around because it couldn’t find any food. </a:t>
+            </a:r>
+          </a:p>
+          <a:p>
+            <a:endParaRPr lang="en-GB" dirty="0"/>
+          </a:p>
+          <a:p>
+            <a:r>
+              <a:rPr lang="en-GB" dirty="0"/>
+              <a:t>This was pretty difficult to see using text so I needed to find a way to visualize what I was doing</a:t>
             </a:r>
           </a:p>
         </p:txBody>
@@ -7882,7 +7859,7 @@
     </p:spTree>
     <p:extLst>
       <p:ext uri="{BB962C8B-B14F-4D97-AF65-F5344CB8AC3E}">
-        <p14:creationId xmlns:p14="http://schemas.microsoft.com/office/powerpoint/2010/main" val="3708281905"/>
+        <p14:creationId xmlns:p14="http://schemas.microsoft.com/office/powerpoint/2010/main" val="2684329714"/>
       </p:ext>
     </p:extLst>
   </p:cSld>
@@ -7914,7 +7891,7 @@
           <p:cNvPr id="2" name="Title 1">
             <a:extLst>
               <a:ext uri="{FF2B5EF4-FFF2-40B4-BE49-F238E27FC236}">
-                <a16:creationId xmlns:a16="http://schemas.microsoft.com/office/drawing/2014/main" id="{AA01FFF3-EC99-4485-B32E-E2E568D47B5F}"/>
+                <a16:creationId xmlns:a16="http://schemas.microsoft.com/office/drawing/2014/main" id="{9B72C8D0-0707-4EB6-AA65-ACC6851307E0}"/>
               </a:ext>
             </a:extLst>
           </p:cNvPr>
@@ -7932,7 +7909,7 @@
           <a:p>
             <a:r>
               <a:rPr lang="en-GB" dirty="0"/>
-              <a:t>Progress Checklist 3 </a:t>
+              <a:t>Part 3 - Continued</a:t>
             </a:r>
           </a:p>
         </p:txBody>
@@ -7942,7 +7919,7 @@
           <p:cNvPr id="3" name="Content Placeholder 2">
             <a:extLst>
               <a:ext uri="{FF2B5EF4-FFF2-40B4-BE49-F238E27FC236}">
-                <a16:creationId xmlns:a16="http://schemas.microsoft.com/office/drawing/2014/main" id="{A2755EB5-1D4C-4DDE-A6D0-AFBE7C6CD484}"/>
+                <a16:creationId xmlns:a16="http://schemas.microsoft.com/office/drawing/2014/main" id="{551353EF-3932-435E-A540-DB3508247885}"/>
               </a:ext>
             </a:extLst>
           </p:cNvPr>
@@ -7953,66 +7930,344 @@
             <p:ph idx="1"/>
           </p:nvPr>
         </p:nvSpPr>
-        <p:spPr/>
-        <p:txBody>
-          <a:bodyPr/>
-          <a:lstStyle/>
-          <a:p>
-            <a:r>
-              <a:rPr lang="en-GB" dirty="0"/>
-              <a:t>Project Structure and avoiding Circular Dependencies </a:t>
-            </a:r>
-            <a:r>
-              <a:rPr lang="en-GB" dirty="0">
-                <a:latin typeface="Segoe MDL2 Assets" panose="050A0102010101010101" pitchFamily="18" charset="0"/>
+        <p:spPr>
+          <a:xfrm>
+            <a:off x="1103312" y="2052919"/>
+            <a:ext cx="8946541" cy="2020318"/>
+          </a:xfrm>
+        </p:spPr>
+        <p:txBody>
+          <a:bodyPr>
+            <a:normAutofit lnSpcReduction="10000"/>
+          </a:bodyPr>
+          <a:lstStyle/>
+          <a:p>
+            <a:r>
+              <a:rPr lang="en-GB" dirty="0"/>
+              <a:t>Go fortunately had packages for rendering to html </a:t>
+            </a:r>
+          </a:p>
+          <a:p>
+            <a:endParaRPr lang="en-GB" dirty="0"/>
+          </a:p>
+          <a:p>
+            <a:r>
+              <a:rPr lang="en-GB" dirty="0"/>
+              <a:t>Here is an example of what the project first looked like:</a:t>
+            </a:r>
+          </a:p>
+          <a:p>
+            <a:endParaRPr lang="en-GB" dirty="0"/>
+          </a:p>
+          <a:p>
+            <a:pPr marL="0" indent="0">
+              <a:buNone/>
+            </a:pPr>
+            <a:r>
+              <a:rPr lang="en-GB" dirty="0"/>
+              <a:t>(This is where you show something on your laptop!)</a:t>
+            </a:r>
+          </a:p>
+          <a:p>
+            <a:endParaRPr lang="en-GB" dirty="0"/>
+          </a:p>
+          <a:p>
+            <a:endParaRPr lang="en-GB" dirty="0"/>
+          </a:p>
+          <a:p>
+            <a:endParaRPr lang="en-GB" dirty="0"/>
+          </a:p>
+        </p:txBody>
+      </p:sp>
+      <p:sp>
+        <p:nvSpPr>
+          <p:cNvPr id="5" name="Content Placeholder 2">
+            <a:extLst>
+              <a:ext uri="{FF2B5EF4-FFF2-40B4-BE49-F238E27FC236}">
+                <a16:creationId xmlns:a16="http://schemas.microsoft.com/office/drawing/2014/main" id="{AD77FDDF-E933-4F8C-9C77-D897794B8A16}"/>
+              </a:ext>
+            </a:extLst>
+          </p:cNvPr>
+          <p:cNvSpPr txBox="1">
+            <a:spLocks/>
+          </p:cNvSpPr>
+          <p:nvPr/>
+        </p:nvSpPr>
+        <p:spPr>
+          <a:xfrm>
+            <a:off x="3859480" y="5127380"/>
+            <a:ext cx="5498276" cy="457896"/>
+          </a:xfrm>
+          <a:prstGeom prst="rect">
+            <a:avLst/>
+          </a:prstGeom>
+        </p:spPr>
+        <p:txBody>
+          <a:bodyPr vert="horz" lIns="91440" tIns="45720" rIns="91440" bIns="45720" rtlCol="0">
+            <a:normAutofit fontScale="85000" lnSpcReduction="20000"/>
+          </a:bodyPr>
+          <a:lstStyle>
+            <a:lvl1pPr marL="342900" indent="-342900" algn="l" defTabSz="457200" rtl="0" eaLnBrk="1" latinLnBrk="0" hangingPunct="1">
+              <a:spcBef>
+                <a:spcPts val="1000"/>
+              </a:spcBef>
+              <a:spcAft>
+                <a:spcPts val="0"/>
+              </a:spcAft>
+              <a:buClr>
+                <a:schemeClr val="bg2">
+                  <a:lumMod val="40000"/>
+                  <a:lumOff val="60000"/>
+                </a:schemeClr>
+              </a:buClr>
+              <a:buSzPct val="80000"/>
+              <a:buFont typeface="Wingdings 3" charset="2"/>
+              <a:buChar char=""/>
+              <a:defRPr sz="2000" b="0" i="0" kern="1200">
+                <a:solidFill>
+                  <a:schemeClr val="tx1"/>
+                </a:solidFill>
+                <a:latin typeface="+mj-lt"/>
+                <a:ea typeface="+mj-ea"/>
+                <a:cs typeface="+mj-cs"/>
+              </a:defRPr>
+            </a:lvl1pPr>
+            <a:lvl2pPr marL="742950" indent="-285750" algn="l" defTabSz="457200" rtl="0" eaLnBrk="1" latinLnBrk="0" hangingPunct="1">
+              <a:spcBef>
+                <a:spcPts val="1000"/>
+              </a:spcBef>
+              <a:spcAft>
+                <a:spcPts val="0"/>
+              </a:spcAft>
+              <a:buClr>
+                <a:schemeClr val="bg2">
+                  <a:lumMod val="40000"/>
+                  <a:lumOff val="60000"/>
+                </a:schemeClr>
+              </a:buClr>
+              <a:buSzPct val="80000"/>
+              <a:buFont typeface="Wingdings 3" charset="2"/>
+              <a:buChar char=""/>
+              <a:defRPr sz="1800" b="0" i="0" kern="1200">
+                <a:solidFill>
+                  <a:schemeClr val="tx1"/>
+                </a:solidFill>
+                <a:latin typeface="+mj-lt"/>
+                <a:ea typeface="+mj-ea"/>
+                <a:cs typeface="+mj-cs"/>
+              </a:defRPr>
+            </a:lvl2pPr>
+            <a:lvl3pPr marL="1143000" indent="-228600" algn="l" defTabSz="457200" rtl="0" eaLnBrk="1" latinLnBrk="0" hangingPunct="1">
+              <a:spcBef>
+                <a:spcPts val="1000"/>
+              </a:spcBef>
+              <a:spcAft>
+                <a:spcPts val="0"/>
+              </a:spcAft>
+              <a:buClr>
+                <a:schemeClr val="bg2">
+                  <a:lumMod val="40000"/>
+                  <a:lumOff val="60000"/>
+                </a:schemeClr>
+              </a:buClr>
+              <a:buSzPct val="80000"/>
+              <a:buFont typeface="Wingdings 3" charset="2"/>
+              <a:buChar char=""/>
+              <a:defRPr sz="1600" b="0" i="0" kern="1200">
+                <a:solidFill>
+                  <a:schemeClr val="tx1"/>
+                </a:solidFill>
+                <a:latin typeface="+mj-lt"/>
+                <a:ea typeface="+mj-ea"/>
+                <a:cs typeface="+mj-cs"/>
+              </a:defRPr>
+            </a:lvl3pPr>
+            <a:lvl4pPr marL="1600200" indent="-228600" algn="l" defTabSz="457200" rtl="0" eaLnBrk="1" latinLnBrk="0" hangingPunct="1">
+              <a:spcBef>
+                <a:spcPts val="1000"/>
+              </a:spcBef>
+              <a:spcAft>
+                <a:spcPts val="0"/>
+              </a:spcAft>
+              <a:buClr>
+                <a:schemeClr val="bg2">
+                  <a:lumMod val="40000"/>
+                  <a:lumOff val="60000"/>
+                </a:schemeClr>
+              </a:buClr>
+              <a:buSzPct val="80000"/>
+              <a:buFont typeface="Wingdings 3" charset="2"/>
+              <a:buChar char=""/>
+              <a:defRPr sz="1400" b="0" i="0" kern="1200">
+                <a:solidFill>
+                  <a:schemeClr val="tx1"/>
+                </a:solidFill>
+                <a:latin typeface="+mj-lt"/>
+                <a:ea typeface="+mj-ea"/>
+                <a:cs typeface="+mj-cs"/>
+              </a:defRPr>
+            </a:lvl4pPr>
+            <a:lvl5pPr marL="2057400" indent="-228600" algn="l" defTabSz="457200" rtl="0" eaLnBrk="1" latinLnBrk="0" hangingPunct="1">
+              <a:spcBef>
+                <a:spcPts val="1000"/>
+              </a:spcBef>
+              <a:spcAft>
+                <a:spcPts val="0"/>
+              </a:spcAft>
+              <a:buClr>
+                <a:schemeClr val="bg2">
+                  <a:lumMod val="40000"/>
+                  <a:lumOff val="60000"/>
+                </a:schemeClr>
+              </a:buClr>
+              <a:buSzPct val="80000"/>
+              <a:buFont typeface="Wingdings 3" charset="2"/>
+              <a:buChar char=""/>
+              <a:defRPr sz="1400" b="0" i="0" kern="1200">
+                <a:solidFill>
+                  <a:schemeClr val="tx1"/>
+                </a:solidFill>
+                <a:latin typeface="+mj-lt"/>
+                <a:ea typeface="+mj-ea"/>
+                <a:cs typeface="+mj-cs"/>
+              </a:defRPr>
+            </a:lvl5pPr>
+            <a:lvl6pPr marL="2506000" indent="-228600" algn="l" defTabSz="457200" rtl="0" eaLnBrk="1" latinLnBrk="0" hangingPunct="1">
+              <a:spcBef>
+                <a:spcPts val="1000"/>
+              </a:spcBef>
+              <a:spcAft>
+                <a:spcPts val="0"/>
+              </a:spcAft>
+              <a:buClr>
+                <a:schemeClr val="bg2">
+                  <a:lumMod val="40000"/>
+                  <a:lumOff val="60000"/>
+                </a:schemeClr>
+              </a:buClr>
+              <a:buSzPct val="80000"/>
+              <a:buFont typeface="Wingdings 3" charset="2"/>
+              <a:buChar char=""/>
+              <a:defRPr sz="1400" b="0" i="0" kern="1200">
+                <a:solidFill>
+                  <a:schemeClr val="tx1"/>
+                </a:solidFill>
+                <a:latin typeface="+mj-lt"/>
+                <a:ea typeface="+mj-ea"/>
+                <a:cs typeface="+mj-cs"/>
+              </a:defRPr>
+            </a:lvl6pPr>
+            <a:lvl7pPr marL="2971800" indent="-228600" algn="l" defTabSz="457200" rtl="0" eaLnBrk="1" latinLnBrk="0" hangingPunct="1">
+              <a:spcBef>
+                <a:spcPts val="1000"/>
+              </a:spcBef>
+              <a:spcAft>
+                <a:spcPts val="0"/>
+              </a:spcAft>
+              <a:buClr>
+                <a:schemeClr val="bg2">
+                  <a:lumMod val="40000"/>
+                  <a:lumOff val="60000"/>
+                </a:schemeClr>
+              </a:buClr>
+              <a:buSzPct val="80000"/>
+              <a:buFont typeface="Wingdings 3" charset="2"/>
+              <a:buChar char=""/>
+              <a:defRPr sz="1400" b="0" i="0" kern="1200">
+                <a:solidFill>
+                  <a:schemeClr val="tx1"/>
+                </a:solidFill>
+                <a:latin typeface="+mj-lt"/>
+                <a:ea typeface="+mj-ea"/>
+                <a:cs typeface="+mj-cs"/>
+              </a:defRPr>
+            </a:lvl7pPr>
+            <a:lvl8pPr marL="3429000" indent="-228600" algn="l" defTabSz="457200" rtl="0" eaLnBrk="1" latinLnBrk="0" hangingPunct="1">
+              <a:spcBef>
+                <a:spcPts val="1000"/>
+              </a:spcBef>
+              <a:spcAft>
+                <a:spcPts val="0"/>
+              </a:spcAft>
+              <a:buClr>
+                <a:schemeClr val="bg2">
+                  <a:lumMod val="40000"/>
+                  <a:lumOff val="60000"/>
+                </a:schemeClr>
+              </a:buClr>
+              <a:buSzPct val="80000"/>
+              <a:buFont typeface="Wingdings 3" charset="2"/>
+              <a:buChar char=""/>
+              <a:defRPr sz="1400" b="0" i="0" kern="1200">
+                <a:solidFill>
+                  <a:schemeClr val="tx1"/>
+                </a:solidFill>
+                <a:latin typeface="+mj-lt"/>
+                <a:ea typeface="+mj-ea"/>
+                <a:cs typeface="+mj-cs"/>
+              </a:defRPr>
+            </a:lvl8pPr>
+            <a:lvl9pPr marL="3886200" indent="-228600" algn="l" defTabSz="457200" rtl="0" eaLnBrk="1" latinLnBrk="0" hangingPunct="1">
+              <a:spcBef>
+                <a:spcPts val="1000"/>
+              </a:spcBef>
+              <a:spcAft>
+                <a:spcPts val="0"/>
+              </a:spcAft>
+              <a:buClr>
+                <a:schemeClr val="bg2">
+                  <a:lumMod val="40000"/>
+                  <a:lumOff val="60000"/>
+                </a:schemeClr>
+              </a:buClr>
+              <a:buSzPct val="80000"/>
+              <a:buFont typeface="Wingdings 3" charset="2"/>
+              <a:buChar char=""/>
+              <a:defRPr sz="1400" b="0" i="0" kern="1200">
+                <a:solidFill>
+                  <a:schemeClr val="tx1"/>
+                </a:solidFill>
+                <a:latin typeface="+mj-lt"/>
+                <a:ea typeface="+mj-ea"/>
+                <a:cs typeface="+mj-cs"/>
+              </a:defRPr>
+            </a:lvl9pPr>
+          </a:lstStyle>
+          <a:p>
+            <a:pPr marL="0" indent="0" algn="ctr">
+              <a:buNone/>
+            </a:pPr>
+            <a:r>
+              <a:rPr lang="en-GB" sz="3400" dirty="0">
+                <a:solidFill>
+                  <a:schemeClr val="accent1">
+                    <a:lumMod val="60000"/>
+                    <a:lumOff val="40000"/>
+                  </a:schemeClr>
+                </a:solidFill>
               </a:rPr>
-              <a:t></a:t>
-            </a:r>
-          </a:p>
-          <a:p>
-            <a:pPr marL="0" indent="0">
-              <a:buNone/>
-            </a:pPr>
+              <a:t>!</a:t>
+            </a:r>
+            <a:r>
+              <a:rPr lang="en-GB" sz="3400" dirty="0"/>
+              <a:t> – Carrot 		</a:t>
+            </a:r>
+            <a:r>
+              <a:rPr lang="en-GB" sz="3400" dirty="0">
+                <a:solidFill>
+                  <a:srgbClr val="00B050"/>
+                </a:solidFill>
+              </a:rPr>
+              <a:t>G </a:t>
+            </a:r>
+            <a:r>
+              <a:rPr lang="en-GB" sz="3400" dirty="0"/>
+              <a:t>- Gopher</a:t>
+            </a:r>
+          </a:p>
+          <a:p>
+            <a:pPr algn="ctr"/>
             <a:endParaRPr lang="en-GB" dirty="0"/>
-          </a:p>
-          <a:p>
-            <a:r>
-              <a:rPr lang="en-GB" dirty="0"/>
-              <a:t>Implementing Basic Pathing Using Coordinates </a:t>
-            </a:r>
-            <a:r>
-              <a:rPr lang="en-GB" dirty="0">
-                <a:latin typeface="Segoe MDL2 Assets" panose="050A0102010101010101" pitchFamily="18" charset="0"/>
-              </a:rPr>
-              <a:t></a:t>
-            </a:r>
-          </a:p>
-          <a:p>
-            <a:endParaRPr lang="en-GB" dirty="0">
-              <a:latin typeface="Segoe MDL2 Assets" panose="050A0102010101010101" pitchFamily="18" charset="0"/>
-            </a:endParaRPr>
-          </a:p>
-          <a:p>
-            <a:r>
-              <a:rPr lang="en-GB" dirty="0"/>
-              <a:t>Improve understanding of how different structures interact concurrently </a:t>
-            </a:r>
-            <a:r>
-              <a:rPr lang="en-GB" dirty="0">
-                <a:latin typeface="Segoe MDL2 Assets" panose="050A0102010101010101" pitchFamily="18" charset="0"/>
-              </a:rPr>
-              <a:t></a:t>
-            </a:r>
-          </a:p>
-          <a:p>
-            <a:endParaRPr lang="en-GB" dirty="0">
-              <a:latin typeface="Segoe MDL2 Assets" panose="050A0102010101010101" pitchFamily="18" charset="0"/>
-            </a:endParaRPr>
-          </a:p>
-          <a:p>
-            <a:endParaRPr lang="en-GB" dirty="0">
-              <a:latin typeface="Segoe MDL2 Assets" panose="050A0102010101010101" pitchFamily="18" charset="0"/>
-            </a:endParaRPr>
           </a:p>
           <a:p>
             <a:endParaRPr lang="en-GB" dirty="0"/>
@@ -8022,7 +8277,7 @@
     </p:spTree>
     <p:extLst>
       <p:ext uri="{BB962C8B-B14F-4D97-AF65-F5344CB8AC3E}">
-        <p14:creationId xmlns:p14="http://schemas.microsoft.com/office/powerpoint/2010/main" val="3768594580"/>
+        <p14:creationId xmlns:p14="http://schemas.microsoft.com/office/powerpoint/2010/main" val="2517849022"/>
       </p:ext>
     </p:extLst>
   </p:cSld>
@@ -8194,7 +8449,7 @@
           <p:cNvPr id="2" name="Title 1">
             <a:extLst>
               <a:ext uri="{FF2B5EF4-FFF2-40B4-BE49-F238E27FC236}">
-                <a16:creationId xmlns:a16="http://schemas.microsoft.com/office/drawing/2014/main" id="{D2EE31CB-2F81-4A36-8A60-7DA0689FF389}"/>
+                <a16:creationId xmlns:a16="http://schemas.microsoft.com/office/drawing/2014/main" id="{A3AF9153-8197-46E9-927C-5BA3DB22894B}"/>
               </a:ext>
             </a:extLst>
           </p:cNvPr>
@@ -8208,7 +8463,7 @@
         <p:spPr>
           <a:xfrm>
             <a:off x="646111" y="452718"/>
-            <a:ext cx="9404723" cy="1400530"/>
+            <a:ext cx="10849203" cy="1400530"/>
           </a:xfrm>
         </p:spPr>
         <p:txBody>
@@ -8217,7 +8472,7 @@
           <a:p>
             <a:r>
               <a:rPr lang="en-GB" dirty="0"/>
-              <a:t>Problem 4 – Visual Representation</a:t>
+              <a:t>Part 3 - 	Talk about adding in population increases and the redesign</a:t>
             </a:r>
           </a:p>
         </p:txBody>
@@ -8227,7 +8482,7 @@
           <p:cNvPr id="3" name="Content Placeholder 2">
             <a:extLst>
               <a:ext uri="{FF2B5EF4-FFF2-40B4-BE49-F238E27FC236}">
-                <a16:creationId xmlns:a16="http://schemas.microsoft.com/office/drawing/2014/main" id="{A8B919FE-5B99-442A-897F-39F7A3FBA3BF}"/>
+                <a16:creationId xmlns:a16="http://schemas.microsoft.com/office/drawing/2014/main" id="{141E7F95-1A50-45F4-9E3B-879687836CF3}"/>
               </a:ext>
             </a:extLst>
           </p:cNvPr>
@@ -8238,155 +8493,64 @@
             <p:ph idx="1"/>
           </p:nvPr>
         </p:nvSpPr>
-        <p:spPr>
-          <a:xfrm>
-            <a:off x="1103312" y="2052918"/>
-            <a:ext cx="8946541" cy="933563"/>
-          </a:xfrm>
-        </p:spPr>
-        <p:txBody>
-          <a:bodyPr/>
-          <a:lstStyle/>
-          <a:p>
-            <a:r>
-              <a:rPr lang="en-GB" dirty="0"/>
-              <a:t>I couldn’t see if anything I had currently worked on was actually working. </a:t>
+        <p:spPr/>
+        <p:txBody>
+          <a:bodyPr/>
+          <a:lstStyle/>
+          <a:p>
+            <a:r>
+              <a:rPr lang="en-GB" dirty="0"/>
+              <a:t>Added reproduction </a:t>
             </a:r>
           </a:p>
           <a:p>
             <a:endParaRPr lang="en-GB" dirty="0"/>
           </a:p>
           <a:p>
+            <a:r>
+              <a:rPr lang="en-GB" dirty="0"/>
+              <a:t>Changed the design of the render (Shown Below)</a:t>
+            </a:r>
+          </a:p>
+          <a:p>
             <a:endParaRPr lang="en-GB" dirty="0"/>
           </a:p>
-          <a:p>
-            <a:endParaRPr lang="en-GB" dirty="0"/>
-          </a:p>
-          <a:p>
-            <a:endParaRPr lang="en-GB" dirty="0"/>
-          </a:p>
-          <a:p>
-            <a:endParaRPr lang="en-GB" dirty="0"/>
-          </a:p>
-          <a:p>
-            <a:endParaRPr lang="en-GB" dirty="0"/>
-          </a:p>
-          <a:p>
-            <a:endParaRPr lang="en-GB" dirty="0"/>
-          </a:p>
-          <a:p>
-            <a:endParaRPr lang="en-GB" dirty="0"/>
-          </a:p>
-        </p:txBody>
-      </p:sp>
-      <p:sp>
-        <p:nvSpPr>
-          <p:cNvPr id="4" name="Title 1">
+        </p:txBody>
+      </p:sp>
+      <p:pic>
+        <p:nvPicPr>
+          <p:cNvPr id="4" name="Picture 3">
             <a:extLst>
               <a:ext uri="{FF2B5EF4-FFF2-40B4-BE49-F238E27FC236}">
-                <a16:creationId xmlns:a16="http://schemas.microsoft.com/office/drawing/2014/main" id="{FB7FEEF8-732A-45AE-A5B4-9505CE898748}"/>
+                <a16:creationId xmlns:a16="http://schemas.microsoft.com/office/drawing/2014/main" id="{2E189E3D-B0D1-4F88-8899-04E670FA75E8}"/>
               </a:ext>
             </a:extLst>
           </p:cNvPr>
-          <p:cNvSpPr txBox="1">
-            <a:spLocks/>
-          </p:cNvSpPr>
+          <p:cNvPicPr>
+            <a:picLocks noChangeAspect="1"/>
+          </p:cNvPicPr>
           <p:nvPr/>
-        </p:nvSpPr>
+        </p:nvPicPr>
+        <p:blipFill>
+          <a:blip r:embed="rId2"/>
+          <a:stretch>
+            <a:fillRect/>
+          </a:stretch>
+        </p:blipFill>
         <p:spPr>
           <a:xfrm>
-            <a:off x="645130" y="3222484"/>
-            <a:ext cx="9404723" cy="1400530"/>
+            <a:off x="5576582" y="3252076"/>
+            <a:ext cx="5881863" cy="3605924"/>
           </a:xfrm>
           <a:prstGeom prst="rect">
             <a:avLst/>
           </a:prstGeom>
         </p:spPr>
-        <p:txBody>
-          <a:bodyPr vert="horz" lIns="91440" tIns="45720" rIns="91440" bIns="45720" rtlCol="0" anchor="t">
-            <a:noAutofit/>
-          </a:bodyPr>
-          <a:lstStyle>
-            <a:lvl1pPr algn="l" defTabSz="457200" rtl="0" eaLnBrk="1" latinLnBrk="0" hangingPunct="1">
-              <a:spcBef>
-                <a:spcPct val="0"/>
-              </a:spcBef>
-              <a:buNone/>
-              <a:defRPr sz="4200" b="0" i="0" kern="1200">
-                <a:solidFill>
-                  <a:schemeClr val="tx2"/>
-                </a:solidFill>
-                <a:latin typeface="+mj-lt"/>
-                <a:ea typeface="+mj-ea"/>
-                <a:cs typeface="+mj-cs"/>
-              </a:defRPr>
-            </a:lvl1pPr>
-            <a:lvl2pPr eaLnBrk="1" hangingPunct="1">
-              <a:defRPr>
-                <a:solidFill>
-                  <a:schemeClr val="tx2"/>
-                </a:solidFill>
-              </a:defRPr>
-            </a:lvl2pPr>
-            <a:lvl3pPr eaLnBrk="1" hangingPunct="1">
-              <a:defRPr>
-                <a:solidFill>
-                  <a:schemeClr val="tx2"/>
-                </a:solidFill>
-              </a:defRPr>
-            </a:lvl3pPr>
-            <a:lvl4pPr eaLnBrk="1" hangingPunct="1">
-              <a:defRPr>
-                <a:solidFill>
-                  <a:schemeClr val="tx2"/>
-                </a:solidFill>
-              </a:defRPr>
-            </a:lvl4pPr>
-            <a:lvl5pPr eaLnBrk="1" hangingPunct="1">
-              <a:defRPr>
-                <a:solidFill>
-                  <a:schemeClr val="tx2"/>
-                </a:solidFill>
-              </a:defRPr>
-            </a:lvl5pPr>
-            <a:lvl6pPr eaLnBrk="1" hangingPunct="1">
-              <a:defRPr>
-                <a:solidFill>
-                  <a:schemeClr val="tx2"/>
-                </a:solidFill>
-              </a:defRPr>
-            </a:lvl6pPr>
-            <a:lvl7pPr eaLnBrk="1" hangingPunct="1">
-              <a:defRPr>
-                <a:solidFill>
-                  <a:schemeClr val="tx2"/>
-                </a:solidFill>
-              </a:defRPr>
-            </a:lvl7pPr>
-            <a:lvl8pPr eaLnBrk="1" hangingPunct="1">
-              <a:defRPr>
-                <a:solidFill>
-                  <a:schemeClr val="tx2"/>
-                </a:solidFill>
-              </a:defRPr>
-            </a:lvl8pPr>
-            <a:lvl9pPr eaLnBrk="1" hangingPunct="1">
-              <a:defRPr>
-                <a:solidFill>
-                  <a:schemeClr val="tx2"/>
-                </a:solidFill>
-              </a:defRPr>
-            </a:lvl9pPr>
-          </a:lstStyle>
-          <a:p>
-            <a:endParaRPr lang="en-GB" dirty="0"/>
-          </a:p>
-        </p:txBody>
-      </p:sp>
+      </p:pic>
     </p:spTree>
     <p:extLst>
       <p:ext uri="{BB962C8B-B14F-4D97-AF65-F5344CB8AC3E}">
-        <p14:creationId xmlns:p14="http://schemas.microsoft.com/office/powerpoint/2010/main" val="52941393"/>
+        <p14:creationId xmlns:p14="http://schemas.microsoft.com/office/powerpoint/2010/main" val="3767185925"/>
       </p:ext>
     </p:extLst>
   </p:cSld>
@@ -8418,7 +8582,7 @@
           <p:cNvPr id="2" name="Title 1">
             <a:extLst>
               <a:ext uri="{FF2B5EF4-FFF2-40B4-BE49-F238E27FC236}">
-                <a16:creationId xmlns:a16="http://schemas.microsoft.com/office/drawing/2014/main" id="{E2D24B9C-4460-4D79-AE21-23356AF1FB37}"/>
+                <a16:creationId xmlns:a16="http://schemas.microsoft.com/office/drawing/2014/main" id="{AA01FFF3-EC99-4485-B32E-E2E568D47B5F}"/>
               </a:ext>
             </a:extLst>
           </p:cNvPr>
@@ -8436,7 +8600,7 @@
           <a:p>
             <a:r>
               <a:rPr lang="en-GB" dirty="0"/>
-              <a:t>Solutions</a:t>
+              <a:t>Progress Checklist 3 </a:t>
             </a:r>
           </a:p>
         </p:txBody>
@@ -8446,7 +8610,7 @@
           <p:cNvPr id="3" name="Content Placeholder 2">
             <a:extLst>
               <a:ext uri="{FF2B5EF4-FFF2-40B4-BE49-F238E27FC236}">
-                <a16:creationId xmlns:a16="http://schemas.microsoft.com/office/drawing/2014/main" id="{DBA319FF-5EEE-4C2D-B80B-5DF0D120CF5E}"/>
+                <a16:creationId xmlns:a16="http://schemas.microsoft.com/office/drawing/2014/main" id="{A2755EB5-1D4C-4DDE-A6D0-AFBE7C6CD484}"/>
               </a:ext>
             </a:extLst>
           </p:cNvPr>
@@ -8457,22 +8621,144 @@
             <p:ph idx="1"/>
           </p:nvPr>
         </p:nvSpPr>
-        <p:spPr/>
-        <p:txBody>
-          <a:bodyPr/>
-          <a:lstStyle/>
-          <a:p>
-            <a:r>
-              <a:rPr lang="en-GB" dirty="0"/>
-              <a:t>Render the world in html using coordinates?</a:t>
-            </a:r>
+        <p:spPr>
+          <a:xfrm>
+            <a:off x="1103312" y="2052918"/>
+            <a:ext cx="9299472" cy="4195481"/>
+          </a:xfrm>
+        </p:spPr>
+        <p:txBody>
+          <a:bodyPr>
+            <a:normAutofit fontScale="92500" lnSpcReduction="20000"/>
+          </a:bodyPr>
+          <a:lstStyle/>
+          <a:p>
+            <a:r>
+              <a:rPr lang="en-GB" dirty="0"/>
+              <a:t>Project Structure and avoiding Circular Dependencies </a:t>
+            </a:r>
+            <a:r>
+              <a:rPr lang="en-GB" dirty="0">
+                <a:latin typeface="Segoe MDL2 Assets" panose="050A0102010101010101" pitchFamily="18" charset="0"/>
+              </a:rPr>
+              <a:t></a:t>
+            </a:r>
+          </a:p>
+          <a:p>
+            <a:pPr marL="0" indent="0">
+              <a:buNone/>
+            </a:pPr>
+            <a:endParaRPr lang="en-GB" dirty="0"/>
+          </a:p>
+          <a:p>
+            <a:r>
+              <a:rPr lang="en-GB" dirty="0"/>
+              <a:t>Implementing Basic Pathing Using Coordinates </a:t>
+            </a:r>
+            <a:r>
+              <a:rPr lang="en-GB" dirty="0">
+                <a:latin typeface="Segoe MDL2 Assets" panose="050A0102010101010101" pitchFamily="18" charset="0"/>
+              </a:rPr>
+              <a:t></a:t>
+            </a:r>
+          </a:p>
+          <a:p>
+            <a:endParaRPr lang="en-GB" dirty="0">
+              <a:latin typeface="Segoe MDL2 Assets" panose="050A0102010101010101" pitchFamily="18" charset="0"/>
+            </a:endParaRPr>
+          </a:p>
+          <a:p>
+            <a:r>
+              <a:rPr lang="en-GB" dirty="0"/>
+              <a:t>Improve understanding of how different structures interact concurrently </a:t>
+            </a:r>
+            <a:r>
+              <a:rPr lang="en-GB" dirty="0">
+                <a:latin typeface="Segoe MDL2 Assets" panose="050A0102010101010101" pitchFamily="18" charset="0"/>
+              </a:rPr>
+              <a:t></a:t>
+            </a:r>
+          </a:p>
+          <a:p>
+            <a:endParaRPr lang="en-GB" dirty="0">
+              <a:latin typeface="Segoe MDL2 Assets" panose="050A0102010101010101" pitchFamily="18" charset="0"/>
+            </a:endParaRPr>
+          </a:p>
+          <a:p>
+            <a:r>
+              <a:rPr lang="en-GB" dirty="0"/>
+              <a:t>Learnt how to use http/html packages for rendering a webpage </a:t>
+            </a:r>
+            <a:r>
+              <a:rPr lang="en-GB" dirty="0">
+                <a:latin typeface="Segoe MDL2 Assets" panose="050A0102010101010101" pitchFamily="18" charset="0"/>
+              </a:rPr>
+              <a:t></a:t>
+            </a:r>
+          </a:p>
+          <a:p>
+            <a:endParaRPr lang="en-GB" dirty="0"/>
+          </a:p>
+          <a:p>
+            <a:r>
+              <a:rPr lang="en-GB" dirty="0"/>
+              <a:t>Learnt how to use http function handlers </a:t>
+            </a:r>
+            <a:r>
+              <a:rPr lang="en-GB" dirty="0">
+                <a:latin typeface="Segoe MDL2 Assets" panose="050A0102010101010101" pitchFamily="18" charset="0"/>
+              </a:rPr>
+              <a:t></a:t>
+            </a:r>
+          </a:p>
+          <a:p>
+            <a:endParaRPr lang="en-GB" dirty="0"/>
+          </a:p>
+          <a:p>
+            <a:r>
+              <a:rPr lang="en-GB" dirty="0"/>
+              <a:t>Learnt a bit about </a:t>
+            </a:r>
+            <a:r>
+              <a:rPr lang="en-GB" dirty="0" err="1"/>
+              <a:t>css</a:t>
+            </a:r>
+            <a:r>
+              <a:rPr lang="en-GB" dirty="0"/>
+              <a:t> grid (Not go-related) </a:t>
+            </a:r>
+            <a:r>
+              <a:rPr lang="en-GB" dirty="0">
+                <a:latin typeface="Segoe MDL2 Assets" panose="050A0102010101010101" pitchFamily="18" charset="0"/>
+              </a:rPr>
+              <a:t> </a:t>
+            </a:r>
+            <a:endParaRPr lang="en-GB" dirty="0"/>
+          </a:p>
+          <a:p>
+            <a:endParaRPr lang="en-GB" dirty="0">
+              <a:latin typeface="Segoe MDL2 Assets" panose="050A0102010101010101" pitchFamily="18" charset="0"/>
+            </a:endParaRPr>
+          </a:p>
+          <a:p>
+            <a:endParaRPr lang="en-GB" dirty="0">
+              <a:latin typeface="Segoe MDL2 Assets" panose="050A0102010101010101" pitchFamily="18" charset="0"/>
+            </a:endParaRPr>
+          </a:p>
+          <a:p>
+            <a:endParaRPr lang="en-GB" dirty="0">
+              <a:latin typeface="Segoe MDL2 Assets" panose="050A0102010101010101" pitchFamily="18" charset="0"/>
+            </a:endParaRPr>
+          </a:p>
+          <a:p>
+            <a:endParaRPr lang="en-GB" dirty="0"/>
           </a:p>
         </p:txBody>
       </p:sp>
     </p:spTree>
     <p:extLst>
       <p:ext uri="{BB962C8B-B14F-4D97-AF65-F5344CB8AC3E}">
-        <p14:creationId xmlns:p14="http://schemas.microsoft.com/office/powerpoint/2010/main" val="1519006128"/>
+        <p14:creationId xmlns:p14="http://schemas.microsoft.com/office/powerpoint/2010/main" val="3768594580"/>
       </p:ext>
     </p:extLst>
   </p:cSld>
@@ -8504,348 +8790,6 @@
           <p:cNvPr id="2" name="Title 1">
             <a:extLst>
               <a:ext uri="{FF2B5EF4-FFF2-40B4-BE49-F238E27FC236}">
-                <a16:creationId xmlns:a16="http://schemas.microsoft.com/office/drawing/2014/main" id="{0B70B174-F9FD-432F-9D87-8193A5BF99F5}"/>
-              </a:ext>
-            </a:extLst>
-          </p:cNvPr>
-          <p:cNvSpPr>
-            <a:spLocks noGrp="1"/>
-          </p:cNvSpPr>
-          <p:nvPr>
-            <p:ph type="title"/>
-          </p:nvPr>
-        </p:nvSpPr>
-        <p:spPr/>
-        <p:txBody>
-          <a:bodyPr/>
-          <a:lstStyle/>
-          <a:p>
-            <a:r>
-              <a:rPr lang="en-GB" dirty="0"/>
-              <a:t>Solutions – Early Demo</a:t>
-            </a:r>
-          </a:p>
-        </p:txBody>
-      </p:sp>
-      <p:sp>
-        <p:nvSpPr>
-          <p:cNvPr id="3" name="Content Placeholder 2">
-            <a:extLst>
-              <a:ext uri="{FF2B5EF4-FFF2-40B4-BE49-F238E27FC236}">
-                <a16:creationId xmlns:a16="http://schemas.microsoft.com/office/drawing/2014/main" id="{9CCEF8BA-DD87-47C3-8861-0A56DB73CB4C}"/>
-              </a:ext>
-            </a:extLst>
-          </p:cNvPr>
-          <p:cNvSpPr>
-            <a:spLocks noGrp="1"/>
-          </p:cNvSpPr>
-          <p:nvPr>
-            <p:ph idx="1"/>
-          </p:nvPr>
-        </p:nvSpPr>
-        <p:spPr/>
-        <p:txBody>
-          <a:bodyPr/>
-          <a:lstStyle/>
-          <a:p>
-            <a:r>
-              <a:rPr lang="en-GB" dirty="0"/>
-              <a:t>Note: Display an example of an early visual display.</a:t>
-            </a:r>
-          </a:p>
-        </p:txBody>
-      </p:sp>
-    </p:spTree>
-    <p:extLst>
-      <p:ext uri="{BB962C8B-B14F-4D97-AF65-F5344CB8AC3E}">
-        <p14:creationId xmlns:p14="http://schemas.microsoft.com/office/powerpoint/2010/main" val="1692078946"/>
-      </p:ext>
-    </p:extLst>
-  </p:cSld>
-  <p:clrMapOvr>
-    <a:masterClrMapping/>
-  </p:clrMapOvr>
-</p:sld>
-</file>
-
-<file path=ppt/slides/slide23.xml><?xml version="1.0" encoding="utf-8"?>
-<p:sld xmlns:a="http://schemas.openxmlformats.org/drawingml/2006/main" xmlns:r="http://schemas.openxmlformats.org/officeDocument/2006/relationships" xmlns:p="http://schemas.openxmlformats.org/presentationml/2006/main">
-  <p:cSld>
-    <p:spTree>
-      <p:nvGrpSpPr>
-        <p:cNvPr id="1" name=""/>
-        <p:cNvGrpSpPr/>
-        <p:nvPr/>
-      </p:nvGrpSpPr>
-      <p:grpSpPr>
-        <a:xfrm>
-          <a:off x="0" y="0"/>
-          <a:ext cx="0" cy="0"/>
-          <a:chOff x="0" y="0"/>
-          <a:chExt cx="0" cy="0"/>
-        </a:xfrm>
-      </p:grpSpPr>
-      <p:sp>
-        <p:nvSpPr>
-          <p:cNvPr id="2" name="Title 1">
-            <a:extLst>
-              <a:ext uri="{FF2B5EF4-FFF2-40B4-BE49-F238E27FC236}">
-                <a16:creationId xmlns:a16="http://schemas.microsoft.com/office/drawing/2014/main" id="{0BB2E70A-E100-4BA0-95EC-7B26B97549BA}"/>
-              </a:ext>
-            </a:extLst>
-          </p:cNvPr>
-          <p:cNvSpPr>
-            <a:spLocks noGrp="1"/>
-          </p:cNvSpPr>
-          <p:nvPr>
-            <p:ph type="title"/>
-          </p:nvPr>
-        </p:nvSpPr>
-        <p:spPr/>
-        <p:txBody>
-          <a:bodyPr/>
-          <a:lstStyle/>
-          <a:p>
-            <a:r>
-              <a:rPr lang="en-GB" dirty="0"/>
-              <a:t>Progress Checklist 4</a:t>
-            </a:r>
-          </a:p>
-        </p:txBody>
-      </p:sp>
-      <p:sp>
-        <p:nvSpPr>
-          <p:cNvPr id="3" name="Content Placeholder 2">
-            <a:extLst>
-              <a:ext uri="{FF2B5EF4-FFF2-40B4-BE49-F238E27FC236}">
-                <a16:creationId xmlns:a16="http://schemas.microsoft.com/office/drawing/2014/main" id="{00B55E60-9E9B-4A07-AD19-88E525512438}"/>
-              </a:ext>
-            </a:extLst>
-          </p:cNvPr>
-          <p:cNvSpPr>
-            <a:spLocks noGrp="1"/>
-          </p:cNvSpPr>
-          <p:nvPr>
-            <p:ph idx="1"/>
-          </p:nvPr>
-        </p:nvSpPr>
-        <p:spPr/>
-        <p:txBody>
-          <a:bodyPr/>
-          <a:lstStyle/>
-          <a:p>
-            <a:r>
-              <a:rPr lang="en-GB" dirty="0"/>
-              <a:t>Learnt how to use http/html packages for rendering a webpage </a:t>
-            </a:r>
-            <a:r>
-              <a:rPr lang="en-GB" dirty="0">
-                <a:latin typeface="Segoe MDL2 Assets" panose="050A0102010101010101" pitchFamily="18" charset="0"/>
-              </a:rPr>
-              <a:t></a:t>
-            </a:r>
-          </a:p>
-          <a:p>
-            <a:endParaRPr lang="en-GB" dirty="0"/>
-          </a:p>
-          <a:p>
-            <a:r>
-              <a:rPr lang="en-GB" dirty="0"/>
-              <a:t>Learnt how to use http function handlers </a:t>
-            </a:r>
-            <a:r>
-              <a:rPr lang="en-GB" dirty="0">
-                <a:latin typeface="Segoe MDL2 Assets" panose="050A0102010101010101" pitchFamily="18" charset="0"/>
-              </a:rPr>
-              <a:t></a:t>
-            </a:r>
-          </a:p>
-          <a:p>
-            <a:endParaRPr lang="en-GB" dirty="0"/>
-          </a:p>
-          <a:p>
-            <a:r>
-              <a:rPr lang="en-GB" dirty="0"/>
-              <a:t>Learnt a bit about </a:t>
-            </a:r>
-            <a:r>
-              <a:rPr lang="en-GB" dirty="0" err="1"/>
-              <a:t>css</a:t>
-            </a:r>
-            <a:r>
-              <a:rPr lang="en-GB" dirty="0"/>
-              <a:t> grid (Not go-related) </a:t>
-            </a:r>
-            <a:r>
-              <a:rPr lang="en-GB" dirty="0">
-                <a:latin typeface="Segoe MDL2 Assets" panose="050A0102010101010101" pitchFamily="18" charset="0"/>
-              </a:rPr>
-              <a:t> </a:t>
-            </a:r>
-            <a:endParaRPr lang="en-GB" dirty="0"/>
-          </a:p>
-        </p:txBody>
-      </p:sp>
-    </p:spTree>
-    <p:extLst>
-      <p:ext uri="{BB962C8B-B14F-4D97-AF65-F5344CB8AC3E}">
-        <p14:creationId xmlns:p14="http://schemas.microsoft.com/office/powerpoint/2010/main" val="3521459611"/>
-      </p:ext>
-    </p:extLst>
-  </p:cSld>
-  <p:clrMapOvr>
-    <a:masterClrMapping/>
-  </p:clrMapOvr>
-</p:sld>
-</file>
-
-<file path=ppt/slides/slide24.xml><?xml version="1.0" encoding="utf-8"?>
-<p:sld xmlns:a="http://schemas.openxmlformats.org/drawingml/2006/main" xmlns:r="http://schemas.openxmlformats.org/officeDocument/2006/relationships" xmlns:p="http://schemas.openxmlformats.org/presentationml/2006/main">
-  <p:cSld>
-    <p:spTree>
-      <p:nvGrpSpPr>
-        <p:cNvPr id="1" name=""/>
-        <p:cNvGrpSpPr/>
-        <p:nvPr/>
-      </p:nvGrpSpPr>
-      <p:grpSpPr>
-        <a:xfrm>
-          <a:off x="0" y="0"/>
-          <a:ext cx="0" cy="0"/>
-          <a:chOff x="0" y="0"/>
-          <a:chExt cx="0" cy="0"/>
-        </a:xfrm>
-      </p:grpSpPr>
-      <p:sp>
-        <p:nvSpPr>
-          <p:cNvPr id="2" name="Title 1">
-            <a:extLst>
-              <a:ext uri="{FF2B5EF4-FFF2-40B4-BE49-F238E27FC236}">
-                <a16:creationId xmlns:a16="http://schemas.microsoft.com/office/drawing/2014/main" id="{26CCB51B-31E4-4BDD-91E8-9034FFFCA1CF}"/>
-              </a:ext>
-            </a:extLst>
-          </p:cNvPr>
-          <p:cNvSpPr>
-            <a:spLocks noGrp="1"/>
-          </p:cNvSpPr>
-          <p:nvPr>
-            <p:ph type="title"/>
-          </p:nvPr>
-        </p:nvSpPr>
-        <p:spPr/>
-        <p:txBody>
-          <a:bodyPr/>
-          <a:lstStyle/>
-          <a:p>
-            <a:r>
-              <a:rPr lang="en-GB" dirty="0"/>
-              <a:t>Between Problem 4 and Problem 5</a:t>
-            </a:r>
-          </a:p>
-        </p:txBody>
-      </p:sp>
-      <p:sp>
-        <p:nvSpPr>
-          <p:cNvPr id="3" name="Content Placeholder 2">
-            <a:extLst>
-              <a:ext uri="{FF2B5EF4-FFF2-40B4-BE49-F238E27FC236}">
-                <a16:creationId xmlns:a16="http://schemas.microsoft.com/office/drawing/2014/main" id="{DE2CCCF4-3B29-4430-A762-04F28E65352F}"/>
-              </a:ext>
-            </a:extLst>
-          </p:cNvPr>
-          <p:cNvSpPr>
-            <a:spLocks noGrp="1"/>
-          </p:cNvSpPr>
-          <p:nvPr>
-            <p:ph idx="1"/>
-          </p:nvPr>
-        </p:nvSpPr>
-        <p:spPr/>
-        <p:txBody>
-          <a:bodyPr/>
-          <a:lstStyle/>
-          <a:p>
-            <a:r>
-              <a:rPr lang="en-GB" dirty="0"/>
-              <a:t>Added reproduction </a:t>
-            </a:r>
-          </a:p>
-          <a:p>
-            <a:endParaRPr lang="en-GB" dirty="0"/>
-          </a:p>
-          <a:p>
-            <a:r>
-              <a:rPr lang="en-GB" dirty="0"/>
-              <a:t>Changed the design of the render (Shown Below)</a:t>
-            </a:r>
-          </a:p>
-        </p:txBody>
-      </p:sp>
-      <p:pic>
-        <p:nvPicPr>
-          <p:cNvPr id="4" name="Picture 3">
-            <a:extLst>
-              <a:ext uri="{FF2B5EF4-FFF2-40B4-BE49-F238E27FC236}">
-                <a16:creationId xmlns:a16="http://schemas.microsoft.com/office/drawing/2014/main" id="{9EF065BC-4138-4CB4-B48A-3AF87E21B3AA}"/>
-              </a:ext>
-            </a:extLst>
-          </p:cNvPr>
-          <p:cNvPicPr>
-            <a:picLocks noChangeAspect="1"/>
-          </p:cNvPicPr>
-          <p:nvPr/>
-        </p:nvPicPr>
-        <p:blipFill>
-          <a:blip r:embed="rId2"/>
-          <a:stretch>
-            <a:fillRect/>
-          </a:stretch>
-        </p:blipFill>
-        <p:spPr>
-          <a:xfrm>
-            <a:off x="3986532" y="3723885"/>
-            <a:ext cx="4218935" cy="2586452"/>
-          </a:xfrm>
-          <a:prstGeom prst="rect">
-            <a:avLst/>
-          </a:prstGeom>
-        </p:spPr>
-      </p:pic>
-    </p:spTree>
-    <p:extLst>
-      <p:ext uri="{BB962C8B-B14F-4D97-AF65-F5344CB8AC3E}">
-        <p14:creationId xmlns:p14="http://schemas.microsoft.com/office/powerpoint/2010/main" val="2985876393"/>
-      </p:ext>
-    </p:extLst>
-  </p:cSld>
-  <p:clrMapOvr>
-    <a:masterClrMapping/>
-  </p:clrMapOvr>
-</p:sld>
-</file>
-
-<file path=ppt/slides/slide25.xml><?xml version="1.0" encoding="utf-8"?>
-<p:sld xmlns:a="http://schemas.openxmlformats.org/drawingml/2006/main" xmlns:r="http://schemas.openxmlformats.org/officeDocument/2006/relationships" xmlns:p="http://schemas.openxmlformats.org/presentationml/2006/main">
-  <p:cSld>
-    <p:spTree>
-      <p:nvGrpSpPr>
-        <p:cNvPr id="1" name=""/>
-        <p:cNvGrpSpPr/>
-        <p:nvPr/>
-      </p:nvGrpSpPr>
-      <p:grpSpPr>
-        <a:xfrm>
-          <a:off x="0" y="0"/>
-          <a:ext cx="0" cy="0"/>
-          <a:chOff x="0" y="0"/>
-          <a:chExt cx="0" cy="0"/>
-        </a:xfrm>
-      </p:grpSpPr>
-      <p:sp>
-        <p:nvSpPr>
-          <p:cNvPr id="2" name="Title 1">
-            <a:extLst>
-              <a:ext uri="{FF2B5EF4-FFF2-40B4-BE49-F238E27FC236}">
                 <a16:creationId xmlns:a16="http://schemas.microsoft.com/office/drawing/2014/main" id="{75C50CEC-C87D-40B9-990D-303CFFD16359}"/>
               </a:ext>
             </a:extLst>
@@ -8925,7 +8869,7 @@
 </p:sld>
 </file>
 
-<file path=ppt/slides/slide26.xml><?xml version="1.0" encoding="utf-8"?>
+<file path=ppt/slides/slide23.xml><?xml version="1.0" encoding="utf-8"?>
 <p:sld xmlns:a="http://schemas.openxmlformats.org/drawingml/2006/main" xmlns:r="http://schemas.openxmlformats.org/officeDocument/2006/relationships" xmlns:p="http://schemas.openxmlformats.org/presentationml/2006/main">
   <p:cSld>
     <p:spTree>
@@ -9081,6 +9025,345 @@
 </p:sld>
 </file>
 
+<file path=ppt/slides/slide24.xml><?xml version="1.0" encoding="utf-8"?>
+<p:sld xmlns:a="http://schemas.openxmlformats.org/drawingml/2006/main" xmlns:r="http://schemas.openxmlformats.org/officeDocument/2006/relationships" xmlns:p="http://schemas.openxmlformats.org/presentationml/2006/main">
+  <p:cSld>
+    <p:spTree>
+      <p:nvGrpSpPr>
+        <p:cNvPr id="1" name=""/>
+        <p:cNvGrpSpPr/>
+        <p:nvPr/>
+      </p:nvGrpSpPr>
+      <p:grpSpPr>
+        <a:xfrm>
+          <a:off x="0" y="0"/>
+          <a:ext cx="0" cy="0"/>
+          <a:chOff x="0" y="0"/>
+          <a:chExt cx="0" cy="0"/>
+        </a:xfrm>
+      </p:grpSpPr>
+      <p:sp>
+        <p:nvSpPr>
+          <p:cNvPr id="2" name="Title 1">
+            <a:extLst>
+              <a:ext uri="{FF2B5EF4-FFF2-40B4-BE49-F238E27FC236}">
+                <a16:creationId xmlns:a16="http://schemas.microsoft.com/office/drawing/2014/main" id="{D5AD34E6-B9F5-484D-8BC0-F61BE7177945}"/>
+              </a:ext>
+            </a:extLst>
+          </p:cNvPr>
+          <p:cNvSpPr>
+            <a:spLocks noGrp="1"/>
+          </p:cNvSpPr>
+          <p:nvPr>
+            <p:ph type="title"/>
+          </p:nvPr>
+        </p:nvSpPr>
+        <p:spPr/>
+        <p:txBody>
+          <a:bodyPr/>
+          <a:lstStyle/>
+          <a:p>
+            <a:r>
+              <a:rPr lang="en-GB" dirty="0"/>
+              <a:t>Test Parameters</a:t>
+            </a:r>
+          </a:p>
+        </p:txBody>
+      </p:sp>
+      <p:sp>
+        <p:nvSpPr>
+          <p:cNvPr id="3" name="Content Placeholder 2">
+            <a:extLst>
+              <a:ext uri="{FF2B5EF4-FFF2-40B4-BE49-F238E27FC236}">
+                <a16:creationId xmlns:a16="http://schemas.microsoft.com/office/drawing/2014/main" id="{E3E7B6E3-350A-42E9-901D-4256E39894ED}"/>
+              </a:ext>
+            </a:extLst>
+          </p:cNvPr>
+          <p:cNvSpPr>
+            <a:spLocks noGrp="1"/>
+          </p:cNvSpPr>
+          <p:nvPr>
+            <p:ph idx="1"/>
+          </p:nvPr>
+        </p:nvSpPr>
+        <p:spPr>
+          <a:xfrm>
+            <a:off x="1104293" y="1331259"/>
+            <a:ext cx="8946541" cy="5186987"/>
+          </a:xfrm>
+        </p:spPr>
+        <p:txBody>
+          <a:bodyPr>
+            <a:normAutofit fontScale="92500" lnSpcReduction="20000"/>
+          </a:bodyPr>
+          <a:lstStyle/>
+          <a:p>
+            <a:r>
+              <a:rPr lang="en-GB" dirty="0"/>
+              <a:t>Time how many gophers are generated in a minute and time how long it takes to reach 1 million gophers</a:t>
+            </a:r>
+          </a:p>
+          <a:p>
+            <a:endParaRPr lang="en-GB" dirty="0"/>
+          </a:p>
+          <a:p>
+            <a:r>
+              <a:rPr lang="en-GB" dirty="0"/>
+              <a:t>Starting Number Of Gophers is 5000</a:t>
+            </a:r>
+          </a:p>
+          <a:p>
+            <a:pPr lvl="1"/>
+            <a:r>
+              <a:rPr lang="en-GB" dirty="0"/>
+              <a:t>Gopher lifespans are around 500 frames</a:t>
+            </a:r>
+          </a:p>
+          <a:p>
+            <a:pPr lvl="1"/>
+            <a:r>
+              <a:rPr lang="en-GB" dirty="0"/>
+              <a:t>Gophers can reproduce at 150 frames</a:t>
+            </a:r>
+          </a:p>
+          <a:p>
+            <a:endParaRPr lang="en-GB" dirty="0"/>
+          </a:p>
+          <a:p>
+            <a:r>
+              <a:rPr lang="en-GB" dirty="0"/>
+              <a:t>Number Of Food on the map is around 1 million </a:t>
+            </a:r>
+          </a:p>
+          <a:p>
+            <a:endParaRPr lang="en-GB" dirty="0"/>
+          </a:p>
+          <a:p>
+            <a:r>
+              <a:rPr lang="en-GB" dirty="0"/>
+              <a:t>World Size is 3000 x 3000</a:t>
+            </a:r>
+          </a:p>
+          <a:p>
+            <a:endParaRPr lang="en-GB" dirty="0"/>
+          </a:p>
+          <a:p>
+            <a:r>
+              <a:rPr lang="en-GB" dirty="0"/>
+              <a:t>Hunger per frame is 5 </a:t>
+            </a:r>
+          </a:p>
+          <a:p>
+            <a:endParaRPr lang="en-GB" dirty="0"/>
+          </a:p>
+          <a:p>
+            <a:r>
+              <a:rPr lang="en-GB" dirty="0"/>
+              <a:t>Birth-rate is 20 – because I forgot to change it to 7</a:t>
+            </a:r>
+          </a:p>
+          <a:p>
+            <a:endParaRPr lang="en-GB" dirty="0"/>
+          </a:p>
+          <a:p>
+            <a:endParaRPr lang="en-GB" dirty="0"/>
+          </a:p>
+        </p:txBody>
+      </p:sp>
+    </p:spTree>
+    <p:extLst>
+      <p:ext uri="{BB962C8B-B14F-4D97-AF65-F5344CB8AC3E}">
+        <p14:creationId xmlns:p14="http://schemas.microsoft.com/office/powerpoint/2010/main" val="3390754349"/>
+      </p:ext>
+    </p:extLst>
+  </p:cSld>
+  <p:clrMapOvr>
+    <a:masterClrMapping/>
+  </p:clrMapOvr>
+</p:sld>
+</file>
+
+<file path=ppt/slides/slide25.xml><?xml version="1.0" encoding="utf-8"?>
+<p:sld xmlns:a="http://schemas.openxmlformats.org/drawingml/2006/main" xmlns:r="http://schemas.openxmlformats.org/officeDocument/2006/relationships" xmlns:p="http://schemas.openxmlformats.org/presentationml/2006/main">
+  <p:cSld>
+    <p:spTree>
+      <p:nvGrpSpPr>
+        <p:cNvPr id="1" name=""/>
+        <p:cNvGrpSpPr/>
+        <p:nvPr/>
+      </p:nvGrpSpPr>
+      <p:grpSpPr>
+        <a:xfrm>
+          <a:off x="0" y="0"/>
+          <a:ext cx="0" cy="0"/>
+          <a:chOff x="0" y="0"/>
+          <a:chExt cx="0" cy="0"/>
+        </a:xfrm>
+      </p:grpSpPr>
+      <p:sp>
+        <p:nvSpPr>
+          <p:cNvPr id="2" name="Title 1">
+            <a:extLst>
+              <a:ext uri="{FF2B5EF4-FFF2-40B4-BE49-F238E27FC236}">
+                <a16:creationId xmlns:a16="http://schemas.microsoft.com/office/drawing/2014/main" id="{BD797834-109E-4C93-9155-20AC7E966615}"/>
+              </a:ext>
+            </a:extLst>
+          </p:cNvPr>
+          <p:cNvSpPr>
+            <a:spLocks noGrp="1"/>
+          </p:cNvSpPr>
+          <p:nvPr>
+            <p:ph type="title"/>
+          </p:nvPr>
+        </p:nvSpPr>
+        <p:spPr/>
+        <p:txBody>
+          <a:bodyPr/>
+          <a:lstStyle/>
+          <a:p>
+            <a:r>
+              <a:rPr lang="en-GB" dirty="0"/>
+              <a:t>Initial Investigation</a:t>
+            </a:r>
+          </a:p>
+        </p:txBody>
+      </p:sp>
+      <p:sp>
+        <p:nvSpPr>
+          <p:cNvPr id="3" name="Content Placeholder 2">
+            <a:extLst>
+              <a:ext uri="{FF2B5EF4-FFF2-40B4-BE49-F238E27FC236}">
+                <a16:creationId xmlns:a16="http://schemas.microsoft.com/office/drawing/2014/main" id="{941E686B-6ADC-487D-923D-7D46F5FDADC5}"/>
+              </a:ext>
+            </a:extLst>
+          </p:cNvPr>
+          <p:cNvSpPr>
+            <a:spLocks noGrp="1"/>
+          </p:cNvSpPr>
+          <p:nvPr>
+            <p:ph idx="1"/>
+          </p:nvPr>
+        </p:nvSpPr>
+        <p:spPr/>
+        <p:txBody>
+          <a:bodyPr/>
+          <a:lstStyle/>
+          <a:p>
+            <a:r>
+              <a:rPr lang="en-GB" dirty="0"/>
+              <a:t>It was clear the method I used to find food was inefficient </a:t>
+            </a:r>
+          </a:p>
+          <a:p>
+            <a:endParaRPr lang="en-GB" dirty="0"/>
+          </a:p>
+          <a:p>
+            <a:r>
+              <a:rPr lang="en-GB" dirty="0"/>
+              <a:t>I switched to using a spiral search method to find the nearest food to a gopher </a:t>
+            </a:r>
+          </a:p>
+        </p:txBody>
+      </p:sp>
+    </p:spTree>
+    <p:extLst>
+      <p:ext uri="{BB962C8B-B14F-4D97-AF65-F5344CB8AC3E}">
+        <p14:creationId xmlns:p14="http://schemas.microsoft.com/office/powerpoint/2010/main" val="1875626122"/>
+      </p:ext>
+    </p:extLst>
+  </p:cSld>
+  <p:clrMapOvr>
+    <a:masterClrMapping/>
+  </p:clrMapOvr>
+</p:sld>
+</file>
+
+<file path=ppt/slides/slide26.xml><?xml version="1.0" encoding="utf-8"?>
+<p:sld xmlns:a="http://schemas.openxmlformats.org/drawingml/2006/main" xmlns:r="http://schemas.openxmlformats.org/officeDocument/2006/relationships" xmlns:p="http://schemas.openxmlformats.org/presentationml/2006/main">
+  <p:cSld>
+    <p:spTree>
+      <p:nvGrpSpPr>
+        <p:cNvPr id="1" name=""/>
+        <p:cNvGrpSpPr/>
+        <p:nvPr/>
+      </p:nvGrpSpPr>
+      <p:grpSpPr>
+        <a:xfrm>
+          <a:off x="0" y="0"/>
+          <a:ext cx="0" cy="0"/>
+          <a:chOff x="0" y="0"/>
+          <a:chExt cx="0" cy="0"/>
+        </a:xfrm>
+      </p:grpSpPr>
+      <p:sp>
+        <p:nvSpPr>
+          <p:cNvPr id="2" name="Title 1">
+            <a:extLst>
+              <a:ext uri="{FF2B5EF4-FFF2-40B4-BE49-F238E27FC236}">
+                <a16:creationId xmlns:a16="http://schemas.microsoft.com/office/drawing/2014/main" id="{AA9063F6-F330-401D-A4C7-FFE2796F151C}"/>
+              </a:ext>
+            </a:extLst>
+          </p:cNvPr>
+          <p:cNvSpPr>
+            <a:spLocks noGrp="1"/>
+          </p:cNvSpPr>
+          <p:nvPr>
+            <p:ph type="title"/>
+          </p:nvPr>
+        </p:nvSpPr>
+        <p:spPr/>
+        <p:txBody>
+          <a:bodyPr/>
+          <a:lstStyle/>
+          <a:p>
+            <a:r>
+              <a:rPr lang="en-GB" dirty="0"/>
+              <a:t>The Results of Spiral Searching</a:t>
+            </a:r>
+          </a:p>
+        </p:txBody>
+      </p:sp>
+      <p:sp>
+        <p:nvSpPr>
+          <p:cNvPr id="3" name="Content Placeholder 2">
+            <a:extLst>
+              <a:ext uri="{FF2B5EF4-FFF2-40B4-BE49-F238E27FC236}">
+                <a16:creationId xmlns:a16="http://schemas.microsoft.com/office/drawing/2014/main" id="{0BD5C38D-3E3B-4175-8049-DF396C898E25}"/>
+              </a:ext>
+            </a:extLst>
+          </p:cNvPr>
+          <p:cNvSpPr>
+            <a:spLocks noGrp="1"/>
+          </p:cNvSpPr>
+          <p:nvPr>
+            <p:ph idx="1"/>
+          </p:nvPr>
+        </p:nvSpPr>
+        <p:spPr/>
+        <p:txBody>
+          <a:bodyPr/>
+          <a:lstStyle/>
+          <a:p>
+            <a:r>
+              <a:rPr lang="en-GB" dirty="0"/>
+              <a:t>(Image of Spiral Search Results)</a:t>
+            </a:r>
+          </a:p>
+        </p:txBody>
+      </p:sp>
+    </p:spTree>
+    <p:extLst>
+      <p:ext uri="{BB962C8B-B14F-4D97-AF65-F5344CB8AC3E}">
+        <p14:creationId xmlns:p14="http://schemas.microsoft.com/office/powerpoint/2010/main" val="3865873831"/>
+      </p:ext>
+    </p:extLst>
+  </p:cSld>
+  <p:clrMapOvr>
+    <a:masterClrMapping/>
+  </p:clrMapOvr>
+</p:sld>
+</file>
+
 <file path=ppt/slides/slide27.xml><?xml version="1.0" encoding="utf-8"?>
 <p:sld xmlns:a="http://schemas.openxmlformats.org/drawingml/2006/main" xmlns:r="http://schemas.openxmlformats.org/officeDocument/2006/relationships" xmlns:p="http://schemas.openxmlformats.org/presentationml/2006/main">
   <p:cSld>
@@ -9103,449 +9386,6 @@
           <p:cNvPr id="2" name="Title 1">
             <a:extLst>
               <a:ext uri="{FF2B5EF4-FFF2-40B4-BE49-F238E27FC236}">
-                <a16:creationId xmlns:a16="http://schemas.microsoft.com/office/drawing/2014/main" id="{D5AD34E6-B9F5-484D-8BC0-F61BE7177945}"/>
-              </a:ext>
-            </a:extLst>
-          </p:cNvPr>
-          <p:cNvSpPr>
-            <a:spLocks noGrp="1"/>
-          </p:cNvSpPr>
-          <p:nvPr>
-            <p:ph type="title"/>
-          </p:nvPr>
-        </p:nvSpPr>
-        <p:spPr/>
-        <p:txBody>
-          <a:bodyPr/>
-          <a:lstStyle/>
-          <a:p>
-            <a:r>
-              <a:rPr lang="en-GB" dirty="0"/>
-              <a:t>Test Parameters</a:t>
-            </a:r>
-          </a:p>
-        </p:txBody>
-      </p:sp>
-      <p:sp>
-        <p:nvSpPr>
-          <p:cNvPr id="3" name="Content Placeholder 2">
-            <a:extLst>
-              <a:ext uri="{FF2B5EF4-FFF2-40B4-BE49-F238E27FC236}">
-                <a16:creationId xmlns:a16="http://schemas.microsoft.com/office/drawing/2014/main" id="{E3E7B6E3-350A-42E9-901D-4256E39894ED}"/>
-              </a:ext>
-            </a:extLst>
-          </p:cNvPr>
-          <p:cNvSpPr>
-            <a:spLocks noGrp="1"/>
-          </p:cNvSpPr>
-          <p:nvPr>
-            <p:ph idx="1"/>
-          </p:nvPr>
-        </p:nvSpPr>
-        <p:spPr>
-          <a:xfrm>
-            <a:off x="1104293" y="1331259"/>
-            <a:ext cx="8946541" cy="5186987"/>
-          </a:xfrm>
-        </p:spPr>
-        <p:txBody>
-          <a:bodyPr>
-            <a:normAutofit fontScale="92500" lnSpcReduction="20000"/>
-          </a:bodyPr>
-          <a:lstStyle/>
-          <a:p>
-            <a:r>
-              <a:rPr lang="en-GB" dirty="0"/>
-              <a:t>Time how many gophers are generated in a minute and time how long it takes to reach 1 million gophers</a:t>
-            </a:r>
-          </a:p>
-          <a:p>
-            <a:endParaRPr lang="en-GB" dirty="0"/>
-          </a:p>
-          <a:p>
-            <a:r>
-              <a:rPr lang="en-GB" dirty="0"/>
-              <a:t>Starting Number Of Gophers is 5000</a:t>
-            </a:r>
-          </a:p>
-          <a:p>
-            <a:pPr lvl="1"/>
-            <a:r>
-              <a:rPr lang="en-GB" dirty="0"/>
-              <a:t>Gopher lifespans are around 500 frames</a:t>
-            </a:r>
-          </a:p>
-          <a:p>
-            <a:pPr lvl="1"/>
-            <a:r>
-              <a:rPr lang="en-GB" dirty="0"/>
-              <a:t>Gophers can reproduce at 150 frames</a:t>
-            </a:r>
-          </a:p>
-          <a:p>
-            <a:endParaRPr lang="en-GB" dirty="0"/>
-          </a:p>
-          <a:p>
-            <a:r>
-              <a:rPr lang="en-GB" dirty="0"/>
-              <a:t>Number Of Food on the map is around 1 million </a:t>
-            </a:r>
-          </a:p>
-          <a:p>
-            <a:endParaRPr lang="en-GB" dirty="0"/>
-          </a:p>
-          <a:p>
-            <a:r>
-              <a:rPr lang="en-GB" dirty="0"/>
-              <a:t>World Size is 3000 x 3000</a:t>
-            </a:r>
-          </a:p>
-          <a:p>
-            <a:endParaRPr lang="en-GB" dirty="0"/>
-          </a:p>
-          <a:p>
-            <a:r>
-              <a:rPr lang="en-GB" dirty="0"/>
-              <a:t>Hunger per frame is 5 </a:t>
-            </a:r>
-          </a:p>
-          <a:p>
-            <a:endParaRPr lang="en-GB" dirty="0"/>
-          </a:p>
-          <a:p>
-            <a:r>
-              <a:rPr lang="en-GB" dirty="0"/>
-              <a:t>Birth-rate is 20 – because I forgot to change it to 7</a:t>
-            </a:r>
-          </a:p>
-          <a:p>
-            <a:endParaRPr lang="en-GB" dirty="0"/>
-          </a:p>
-          <a:p>
-            <a:endParaRPr lang="en-GB" dirty="0"/>
-          </a:p>
-        </p:txBody>
-      </p:sp>
-    </p:spTree>
-    <p:extLst>
-      <p:ext uri="{BB962C8B-B14F-4D97-AF65-F5344CB8AC3E}">
-        <p14:creationId xmlns:p14="http://schemas.microsoft.com/office/powerpoint/2010/main" val="3390754349"/>
-      </p:ext>
-    </p:extLst>
-  </p:cSld>
-  <p:clrMapOvr>
-    <a:masterClrMapping/>
-  </p:clrMapOvr>
-</p:sld>
-</file>
-
-<file path=ppt/slides/slide28.xml><?xml version="1.0" encoding="utf-8"?>
-<p:sld xmlns:a="http://schemas.openxmlformats.org/drawingml/2006/main" xmlns:r="http://schemas.openxmlformats.org/officeDocument/2006/relationships" xmlns:p="http://schemas.openxmlformats.org/presentationml/2006/main">
-  <p:cSld>
-    <p:spTree>
-      <p:nvGrpSpPr>
-        <p:cNvPr id="1" name=""/>
-        <p:cNvGrpSpPr/>
-        <p:nvPr/>
-      </p:nvGrpSpPr>
-      <p:grpSpPr>
-        <a:xfrm>
-          <a:off x="0" y="0"/>
-          <a:ext cx="0" cy="0"/>
-          <a:chOff x="0" y="0"/>
-          <a:chExt cx="0" cy="0"/>
-        </a:xfrm>
-      </p:grpSpPr>
-      <p:sp>
-        <p:nvSpPr>
-          <p:cNvPr id="2" name="Title 1">
-            <a:extLst>
-              <a:ext uri="{FF2B5EF4-FFF2-40B4-BE49-F238E27FC236}">
-                <a16:creationId xmlns:a16="http://schemas.microsoft.com/office/drawing/2014/main" id="{BD797834-109E-4C93-9155-20AC7E966615}"/>
-              </a:ext>
-            </a:extLst>
-          </p:cNvPr>
-          <p:cNvSpPr>
-            <a:spLocks noGrp="1"/>
-          </p:cNvSpPr>
-          <p:nvPr>
-            <p:ph type="title"/>
-          </p:nvPr>
-        </p:nvSpPr>
-        <p:spPr/>
-        <p:txBody>
-          <a:bodyPr/>
-          <a:lstStyle/>
-          <a:p>
-            <a:r>
-              <a:rPr lang="en-GB" dirty="0"/>
-              <a:t>Initial Investigation</a:t>
-            </a:r>
-          </a:p>
-        </p:txBody>
-      </p:sp>
-      <p:sp>
-        <p:nvSpPr>
-          <p:cNvPr id="3" name="Content Placeholder 2">
-            <a:extLst>
-              <a:ext uri="{FF2B5EF4-FFF2-40B4-BE49-F238E27FC236}">
-                <a16:creationId xmlns:a16="http://schemas.microsoft.com/office/drawing/2014/main" id="{941E686B-6ADC-487D-923D-7D46F5FDADC5}"/>
-              </a:ext>
-            </a:extLst>
-          </p:cNvPr>
-          <p:cNvSpPr>
-            <a:spLocks noGrp="1"/>
-          </p:cNvSpPr>
-          <p:nvPr>
-            <p:ph idx="1"/>
-          </p:nvPr>
-        </p:nvSpPr>
-        <p:spPr/>
-        <p:txBody>
-          <a:bodyPr/>
-          <a:lstStyle/>
-          <a:p>
-            <a:r>
-              <a:rPr lang="en-GB" dirty="0"/>
-              <a:t>It was clear the method I used to find food was inefficient </a:t>
-            </a:r>
-          </a:p>
-          <a:p>
-            <a:endParaRPr lang="en-GB" dirty="0"/>
-          </a:p>
-          <a:p>
-            <a:r>
-              <a:rPr lang="en-GB" dirty="0"/>
-              <a:t>I switched to using a spiral search method to find the nearest food to a gopher </a:t>
-            </a:r>
-          </a:p>
-        </p:txBody>
-      </p:sp>
-    </p:spTree>
-    <p:extLst>
-      <p:ext uri="{BB962C8B-B14F-4D97-AF65-F5344CB8AC3E}">
-        <p14:creationId xmlns:p14="http://schemas.microsoft.com/office/powerpoint/2010/main" val="1875626122"/>
-      </p:ext>
-    </p:extLst>
-  </p:cSld>
-  <p:clrMapOvr>
-    <a:masterClrMapping/>
-  </p:clrMapOvr>
-</p:sld>
-</file>
-
-<file path=ppt/slides/slide29.xml><?xml version="1.0" encoding="utf-8"?>
-<p:sld xmlns:a="http://schemas.openxmlformats.org/drawingml/2006/main" xmlns:r="http://schemas.openxmlformats.org/officeDocument/2006/relationships" xmlns:p="http://schemas.openxmlformats.org/presentationml/2006/main">
-  <p:cSld>
-    <p:spTree>
-      <p:nvGrpSpPr>
-        <p:cNvPr id="1" name=""/>
-        <p:cNvGrpSpPr/>
-        <p:nvPr/>
-      </p:nvGrpSpPr>
-      <p:grpSpPr>
-        <a:xfrm>
-          <a:off x="0" y="0"/>
-          <a:ext cx="0" cy="0"/>
-          <a:chOff x="0" y="0"/>
-          <a:chExt cx="0" cy="0"/>
-        </a:xfrm>
-      </p:grpSpPr>
-      <p:sp>
-        <p:nvSpPr>
-          <p:cNvPr id="2" name="Title 1">
-            <a:extLst>
-              <a:ext uri="{FF2B5EF4-FFF2-40B4-BE49-F238E27FC236}">
-                <a16:creationId xmlns:a16="http://schemas.microsoft.com/office/drawing/2014/main" id="{AA9063F6-F330-401D-A4C7-FFE2796F151C}"/>
-              </a:ext>
-            </a:extLst>
-          </p:cNvPr>
-          <p:cNvSpPr>
-            <a:spLocks noGrp="1"/>
-          </p:cNvSpPr>
-          <p:nvPr>
-            <p:ph type="title"/>
-          </p:nvPr>
-        </p:nvSpPr>
-        <p:spPr/>
-        <p:txBody>
-          <a:bodyPr/>
-          <a:lstStyle/>
-          <a:p>
-            <a:r>
-              <a:rPr lang="en-GB" dirty="0"/>
-              <a:t>The Results of Spiral Searching</a:t>
-            </a:r>
-          </a:p>
-        </p:txBody>
-      </p:sp>
-      <p:sp>
-        <p:nvSpPr>
-          <p:cNvPr id="3" name="Content Placeholder 2">
-            <a:extLst>
-              <a:ext uri="{FF2B5EF4-FFF2-40B4-BE49-F238E27FC236}">
-                <a16:creationId xmlns:a16="http://schemas.microsoft.com/office/drawing/2014/main" id="{0BD5C38D-3E3B-4175-8049-DF396C898E25}"/>
-              </a:ext>
-            </a:extLst>
-          </p:cNvPr>
-          <p:cNvSpPr>
-            <a:spLocks noGrp="1"/>
-          </p:cNvSpPr>
-          <p:nvPr>
-            <p:ph idx="1"/>
-          </p:nvPr>
-        </p:nvSpPr>
-        <p:spPr/>
-        <p:txBody>
-          <a:bodyPr/>
-          <a:lstStyle/>
-          <a:p>
-            <a:r>
-              <a:rPr lang="en-GB" dirty="0"/>
-              <a:t>(Image of Spiral Search Results)</a:t>
-            </a:r>
-          </a:p>
-        </p:txBody>
-      </p:sp>
-    </p:spTree>
-    <p:extLst>
-      <p:ext uri="{BB962C8B-B14F-4D97-AF65-F5344CB8AC3E}">
-        <p14:creationId xmlns:p14="http://schemas.microsoft.com/office/powerpoint/2010/main" val="3865873831"/>
-      </p:ext>
-    </p:extLst>
-  </p:cSld>
-  <p:clrMapOvr>
-    <a:masterClrMapping/>
-  </p:clrMapOvr>
-</p:sld>
-</file>
-
-<file path=ppt/slides/slide3.xml><?xml version="1.0" encoding="utf-8"?>
-<p:sld xmlns:a="http://schemas.openxmlformats.org/drawingml/2006/main" xmlns:r="http://schemas.openxmlformats.org/officeDocument/2006/relationships" xmlns:p="http://schemas.openxmlformats.org/presentationml/2006/main">
-  <p:cSld>
-    <p:spTree>
-      <p:nvGrpSpPr>
-        <p:cNvPr id="1" name=""/>
-        <p:cNvGrpSpPr/>
-        <p:nvPr/>
-      </p:nvGrpSpPr>
-      <p:grpSpPr>
-        <a:xfrm>
-          <a:off x="0" y="0"/>
-          <a:ext cx="0" cy="0"/>
-          <a:chOff x="0" y="0"/>
-          <a:chExt cx="0" cy="0"/>
-        </a:xfrm>
-      </p:grpSpPr>
-      <p:sp>
-        <p:nvSpPr>
-          <p:cNvPr id="2" name="Title 1">
-            <a:extLst>
-              <a:ext uri="{FF2B5EF4-FFF2-40B4-BE49-F238E27FC236}">
-                <a16:creationId xmlns:a16="http://schemas.microsoft.com/office/drawing/2014/main" id="{B28B1B21-C9ED-4BEB-9BF9-FCC6429558A2}"/>
-              </a:ext>
-            </a:extLst>
-          </p:cNvPr>
-          <p:cNvSpPr>
-            <a:spLocks noGrp="1"/>
-          </p:cNvSpPr>
-          <p:nvPr>
-            <p:ph type="title"/>
-          </p:nvPr>
-        </p:nvSpPr>
-        <p:spPr/>
-        <p:txBody>
-          <a:bodyPr/>
-          <a:lstStyle/>
-          <a:p>
-            <a:r>
-              <a:rPr lang="en-GB" dirty="0"/>
-              <a:t>Plan for the next ‘x’ minutes</a:t>
-            </a:r>
-          </a:p>
-        </p:txBody>
-      </p:sp>
-      <p:sp>
-        <p:nvSpPr>
-          <p:cNvPr id="3" name="Content Placeholder 2">
-            <a:extLst>
-              <a:ext uri="{FF2B5EF4-FFF2-40B4-BE49-F238E27FC236}">
-                <a16:creationId xmlns:a16="http://schemas.microsoft.com/office/drawing/2014/main" id="{BFEEA1E6-BC10-414E-A147-7431DFDA4A06}"/>
-              </a:ext>
-            </a:extLst>
-          </p:cNvPr>
-          <p:cNvSpPr>
-            <a:spLocks noGrp="1"/>
-          </p:cNvSpPr>
-          <p:nvPr>
-            <p:ph idx="1"/>
-          </p:nvPr>
-        </p:nvSpPr>
-        <p:spPr/>
-        <p:txBody>
-          <a:bodyPr/>
-          <a:lstStyle/>
-          <a:p>
-            <a:r>
-              <a:rPr lang="en-GB" dirty="0"/>
-              <a:t>Talk about my experience with my first small Go project. </a:t>
-            </a:r>
-          </a:p>
-          <a:p>
-            <a:endParaRPr lang="en-GB" dirty="0"/>
-          </a:p>
-          <a:p>
-            <a:r>
-              <a:rPr lang="en-GB" dirty="0"/>
-              <a:t>Create a list of things I’ve learnt and mistakes I encountered. </a:t>
-            </a:r>
-          </a:p>
-          <a:p>
-            <a:endParaRPr lang="en-GB" dirty="0"/>
-          </a:p>
-          <a:p>
-            <a:r>
-              <a:rPr lang="en-GB" dirty="0"/>
-              <a:t>Showcase the thoughts of a developer when starting to learn a new language. </a:t>
-            </a:r>
-          </a:p>
-        </p:txBody>
-      </p:sp>
-    </p:spTree>
-    <p:extLst>
-      <p:ext uri="{BB962C8B-B14F-4D97-AF65-F5344CB8AC3E}">
-        <p14:creationId xmlns:p14="http://schemas.microsoft.com/office/powerpoint/2010/main" val="340441809"/>
-      </p:ext>
-    </p:extLst>
-  </p:cSld>
-  <p:clrMapOvr>
-    <a:masterClrMapping/>
-  </p:clrMapOvr>
-</p:sld>
-</file>
-
-<file path=ppt/slides/slide30.xml><?xml version="1.0" encoding="utf-8"?>
-<p:sld xmlns:a="http://schemas.openxmlformats.org/drawingml/2006/main" xmlns:r="http://schemas.openxmlformats.org/officeDocument/2006/relationships" xmlns:p="http://schemas.openxmlformats.org/presentationml/2006/main">
-  <p:cSld>
-    <p:spTree>
-      <p:nvGrpSpPr>
-        <p:cNvPr id="1" name=""/>
-        <p:cNvGrpSpPr/>
-        <p:nvPr/>
-      </p:nvGrpSpPr>
-      <p:grpSpPr>
-        <a:xfrm>
-          <a:off x="0" y="0"/>
-          <a:ext cx="0" cy="0"/>
-          <a:chOff x="0" y="0"/>
-          <a:chExt cx="0" cy="0"/>
-        </a:xfrm>
-      </p:grpSpPr>
-      <p:sp>
-        <p:nvSpPr>
-          <p:cNvPr id="2" name="Title 1">
-            <a:extLst>
-              <a:ext uri="{FF2B5EF4-FFF2-40B4-BE49-F238E27FC236}">
                 <a16:creationId xmlns:a16="http://schemas.microsoft.com/office/drawing/2014/main" id="{450E2F24-6B36-4CDF-9981-77D7080A3EA2}"/>
               </a:ext>
             </a:extLst>
@@ -9628,7 +9468,7 @@
 </p:sld>
 </file>
 
-<file path=ppt/slides/slide31.xml><?xml version="1.0" encoding="utf-8"?>
+<file path=ppt/slides/slide28.xml><?xml version="1.0" encoding="utf-8"?>
 <p:sld xmlns:a="http://schemas.openxmlformats.org/drawingml/2006/main" xmlns:r="http://schemas.openxmlformats.org/officeDocument/2006/relationships" xmlns:p="http://schemas.openxmlformats.org/presentationml/2006/main">
   <p:cSld>
     <p:spTree>
@@ -9756,7 +9596,7 @@
 </p:sld>
 </file>
 
-<file path=ppt/slides/slide32.xml><?xml version="1.0" encoding="utf-8"?>
+<file path=ppt/slides/slide29.xml><?xml version="1.0" encoding="utf-8"?>
 <p:sld xmlns:a="http://schemas.openxmlformats.org/drawingml/2006/main" xmlns:r="http://schemas.openxmlformats.org/officeDocument/2006/relationships" xmlns:p="http://schemas.openxmlformats.org/presentationml/2006/main">
   <p:cSld>
     <p:spTree>
@@ -9842,7 +9682,7 @@
 </p:sld>
 </file>
 
-<file path=ppt/slides/slide33.xml><?xml version="1.0" encoding="utf-8"?>
+<file path=ppt/slides/slide3.xml><?xml version="1.0" encoding="utf-8"?>
 <p:sld xmlns:a="http://schemas.openxmlformats.org/drawingml/2006/main" xmlns:r="http://schemas.openxmlformats.org/officeDocument/2006/relationships" xmlns:p="http://schemas.openxmlformats.org/presentationml/2006/main">
   <p:cSld>
     <p:spTree>
@@ -9864,6 +9704,110 @@
           <p:cNvPr id="2" name="Title 1">
             <a:extLst>
               <a:ext uri="{FF2B5EF4-FFF2-40B4-BE49-F238E27FC236}">
+                <a16:creationId xmlns:a16="http://schemas.microsoft.com/office/drawing/2014/main" id="{B28B1B21-C9ED-4BEB-9BF9-FCC6429558A2}"/>
+              </a:ext>
+            </a:extLst>
+          </p:cNvPr>
+          <p:cNvSpPr>
+            <a:spLocks noGrp="1"/>
+          </p:cNvSpPr>
+          <p:nvPr>
+            <p:ph type="title"/>
+          </p:nvPr>
+        </p:nvSpPr>
+        <p:spPr/>
+        <p:txBody>
+          <a:bodyPr/>
+          <a:lstStyle/>
+          <a:p>
+            <a:r>
+              <a:rPr lang="en-GB" dirty="0"/>
+              <a:t>Plan for the next ‘x’ minutes</a:t>
+            </a:r>
+          </a:p>
+        </p:txBody>
+      </p:sp>
+      <p:sp>
+        <p:nvSpPr>
+          <p:cNvPr id="3" name="Content Placeholder 2">
+            <a:extLst>
+              <a:ext uri="{FF2B5EF4-FFF2-40B4-BE49-F238E27FC236}">
+                <a16:creationId xmlns:a16="http://schemas.microsoft.com/office/drawing/2014/main" id="{BFEEA1E6-BC10-414E-A147-7431DFDA4A06}"/>
+              </a:ext>
+            </a:extLst>
+          </p:cNvPr>
+          <p:cNvSpPr>
+            <a:spLocks noGrp="1"/>
+          </p:cNvSpPr>
+          <p:nvPr>
+            <p:ph idx="1"/>
+          </p:nvPr>
+        </p:nvSpPr>
+        <p:spPr/>
+        <p:txBody>
+          <a:bodyPr/>
+          <a:lstStyle/>
+          <a:p>
+            <a:r>
+              <a:rPr lang="en-GB" dirty="0"/>
+              <a:t>Talk about my experience with my first small Go project. </a:t>
+            </a:r>
+          </a:p>
+          <a:p>
+            <a:endParaRPr lang="en-GB" dirty="0"/>
+          </a:p>
+          <a:p>
+            <a:r>
+              <a:rPr lang="en-GB" dirty="0"/>
+              <a:t>Create a list of things I’ve learnt and mistakes I encountered. </a:t>
+            </a:r>
+          </a:p>
+          <a:p>
+            <a:endParaRPr lang="en-GB" dirty="0"/>
+          </a:p>
+          <a:p>
+            <a:r>
+              <a:rPr lang="en-GB" dirty="0"/>
+              <a:t>Showcase the thoughts of a developer when starting to learn a new language. </a:t>
+            </a:r>
+          </a:p>
+        </p:txBody>
+      </p:sp>
+    </p:spTree>
+    <p:extLst>
+      <p:ext uri="{BB962C8B-B14F-4D97-AF65-F5344CB8AC3E}">
+        <p14:creationId xmlns:p14="http://schemas.microsoft.com/office/powerpoint/2010/main" val="340441809"/>
+      </p:ext>
+    </p:extLst>
+  </p:cSld>
+  <p:clrMapOvr>
+    <a:masterClrMapping/>
+  </p:clrMapOvr>
+</p:sld>
+</file>
+
+<file path=ppt/slides/slide30.xml><?xml version="1.0" encoding="utf-8"?>
+<p:sld xmlns:a="http://schemas.openxmlformats.org/drawingml/2006/main" xmlns:r="http://schemas.openxmlformats.org/officeDocument/2006/relationships" xmlns:p="http://schemas.openxmlformats.org/presentationml/2006/main">
+  <p:cSld>
+    <p:spTree>
+      <p:nvGrpSpPr>
+        <p:cNvPr id="1" name=""/>
+        <p:cNvGrpSpPr/>
+        <p:nvPr/>
+      </p:nvGrpSpPr>
+      <p:grpSpPr>
+        <a:xfrm>
+          <a:off x="0" y="0"/>
+          <a:ext cx="0" cy="0"/>
+          <a:chOff x="0" y="0"/>
+          <a:chExt cx="0" cy="0"/>
+        </a:xfrm>
+      </p:grpSpPr>
+      <p:sp>
+        <p:nvSpPr>
+          <p:cNvPr id="2" name="Title 1">
+            <a:extLst>
+              <a:ext uri="{FF2B5EF4-FFF2-40B4-BE49-F238E27FC236}">
                 <a16:creationId xmlns:a16="http://schemas.microsoft.com/office/drawing/2014/main" id="{DF29D87C-482C-4F54-87E0-F2334586C8F5}"/>
               </a:ext>
             </a:extLst>
@@ -9946,7 +9890,7 @@
 </p:sld>
 </file>
 
-<file path=ppt/slides/slide34.xml><?xml version="1.0" encoding="utf-8"?>
+<file path=ppt/slides/slide31.xml><?xml version="1.0" encoding="utf-8"?>
 <p:sld xmlns:a="http://schemas.openxmlformats.org/drawingml/2006/main" xmlns:r="http://schemas.openxmlformats.org/officeDocument/2006/relationships" xmlns:p="http://schemas.openxmlformats.org/presentationml/2006/main">
   <p:cSld>
     <p:spTree>
@@ -10130,7 +10074,7 @@
 </p:sld>
 </file>
 
-<file path=ppt/slides/slide35.xml><?xml version="1.0" encoding="utf-8"?>
+<file path=ppt/slides/slide32.xml><?xml version="1.0" encoding="utf-8"?>
 <p:sld xmlns:a="http://schemas.openxmlformats.org/drawingml/2006/main" xmlns:r="http://schemas.openxmlformats.org/officeDocument/2006/relationships" xmlns:p="http://schemas.openxmlformats.org/presentationml/2006/main">
   <p:cSld>
     <p:spTree>
@@ -10272,7 +10216,7 @@
 </p:sld>
 </file>
 
-<file path=ppt/slides/slide36.xml><?xml version="1.0" encoding="utf-8"?>
+<file path=ppt/slides/slide33.xml><?xml version="1.0" encoding="utf-8"?>
 <p:sld xmlns:a="http://schemas.openxmlformats.org/drawingml/2006/main" xmlns:r="http://schemas.openxmlformats.org/officeDocument/2006/relationships" xmlns:p="http://schemas.openxmlformats.org/presentationml/2006/main">
   <p:cSld>
     <p:spTree>
@@ -10417,6 +10361,316 @@
 </p:sld>
 </file>
 
+<file path=ppt/slides/slide34.xml><?xml version="1.0" encoding="utf-8"?>
+<p:sld xmlns:a="http://schemas.openxmlformats.org/drawingml/2006/main" xmlns:r="http://schemas.openxmlformats.org/officeDocument/2006/relationships" xmlns:p="http://schemas.openxmlformats.org/presentationml/2006/main">
+  <p:cSld>
+    <p:spTree>
+      <p:nvGrpSpPr>
+        <p:cNvPr id="1" name=""/>
+        <p:cNvGrpSpPr/>
+        <p:nvPr/>
+      </p:nvGrpSpPr>
+      <p:grpSpPr>
+        <a:xfrm>
+          <a:off x="0" y="0"/>
+          <a:ext cx="0" cy="0"/>
+          <a:chOff x="0" y="0"/>
+          <a:chExt cx="0" cy="0"/>
+        </a:xfrm>
+      </p:grpSpPr>
+      <p:sp>
+        <p:nvSpPr>
+          <p:cNvPr id="2" name="Title 1">
+            <a:extLst>
+              <a:ext uri="{FF2B5EF4-FFF2-40B4-BE49-F238E27FC236}">
+                <a16:creationId xmlns:a16="http://schemas.microsoft.com/office/drawing/2014/main" id="{CF873E05-26F9-4905-B975-58FB87938655}"/>
+              </a:ext>
+            </a:extLst>
+          </p:cNvPr>
+          <p:cNvSpPr>
+            <a:spLocks noGrp="1"/>
+          </p:cNvSpPr>
+          <p:nvPr>
+            <p:ph type="title"/>
+          </p:nvPr>
+        </p:nvSpPr>
+        <p:spPr/>
+        <p:txBody>
+          <a:bodyPr/>
+          <a:lstStyle/>
+          <a:p>
+            <a:r>
+              <a:rPr lang="en-GB" dirty="0"/>
+              <a:t>The Results of the Benchmark Investigation</a:t>
+            </a:r>
+          </a:p>
+        </p:txBody>
+      </p:sp>
+      <p:sp>
+        <p:nvSpPr>
+          <p:cNvPr id="3" name="Content Placeholder 2">
+            <a:extLst>
+              <a:ext uri="{FF2B5EF4-FFF2-40B4-BE49-F238E27FC236}">
+                <a16:creationId xmlns:a16="http://schemas.microsoft.com/office/drawing/2014/main" id="{07CAA66F-9760-4A5A-B5DD-435568CB399C}"/>
+              </a:ext>
+            </a:extLst>
+          </p:cNvPr>
+          <p:cNvSpPr>
+            <a:spLocks noGrp="1"/>
+          </p:cNvSpPr>
+          <p:nvPr>
+            <p:ph idx="1"/>
+          </p:nvPr>
+        </p:nvSpPr>
+        <p:spPr/>
+        <p:txBody>
+          <a:bodyPr/>
+          <a:lstStyle/>
+          <a:p>
+            <a:r>
+              <a:rPr lang="en-GB" dirty="0"/>
+              <a:t>However, the solution was much faster at a lower population and only slowed down as the population increased. </a:t>
+            </a:r>
+          </a:p>
+          <a:p>
+            <a:endParaRPr lang="en-GB" dirty="0"/>
+          </a:p>
+          <a:p>
+            <a:r>
+              <a:rPr lang="en-GB" dirty="0"/>
+              <a:t>(Explain why here, basically, the number of gophers and food pulled in from the grid got too large as the world size is too small) </a:t>
+            </a:r>
+          </a:p>
+          <a:p>
+            <a:r>
+              <a:rPr lang="en-GB" dirty="0"/>
+              <a:t>(Where there is a much smaller population it performs a lot faster than the spiral search method). </a:t>
+            </a:r>
+          </a:p>
+          <a:p>
+            <a:endParaRPr lang="en-GB" dirty="0"/>
+          </a:p>
+          <a:p>
+            <a:endParaRPr lang="en-GB" dirty="0"/>
+          </a:p>
+          <a:p>
+            <a:endParaRPr lang="en-GB" dirty="0"/>
+          </a:p>
+          <a:p>
+            <a:endParaRPr lang="en-GB" dirty="0"/>
+          </a:p>
+        </p:txBody>
+      </p:sp>
+    </p:spTree>
+    <p:extLst>
+      <p:ext uri="{BB962C8B-B14F-4D97-AF65-F5344CB8AC3E}">
+        <p14:creationId xmlns:p14="http://schemas.microsoft.com/office/powerpoint/2010/main" val="156669204"/>
+      </p:ext>
+    </p:extLst>
+  </p:cSld>
+  <p:clrMapOvr>
+    <a:masterClrMapping/>
+  </p:clrMapOvr>
+</p:sld>
+</file>
+
+<file path=ppt/slides/slide35.xml><?xml version="1.0" encoding="utf-8"?>
+<p:sld xmlns:a="http://schemas.openxmlformats.org/drawingml/2006/main" xmlns:r="http://schemas.openxmlformats.org/officeDocument/2006/relationships" xmlns:p="http://schemas.openxmlformats.org/presentationml/2006/main">
+  <p:cSld>
+    <p:spTree>
+      <p:nvGrpSpPr>
+        <p:cNvPr id="1" name=""/>
+        <p:cNvGrpSpPr/>
+        <p:nvPr/>
+      </p:nvGrpSpPr>
+      <p:grpSpPr>
+        <a:xfrm>
+          <a:off x="0" y="0"/>
+          <a:ext cx="0" cy="0"/>
+          <a:chOff x="0" y="0"/>
+          <a:chExt cx="0" cy="0"/>
+        </a:xfrm>
+      </p:grpSpPr>
+      <p:sp>
+        <p:nvSpPr>
+          <p:cNvPr id="2" name="Title 1">
+            <a:extLst>
+              <a:ext uri="{FF2B5EF4-FFF2-40B4-BE49-F238E27FC236}">
+                <a16:creationId xmlns:a16="http://schemas.microsoft.com/office/drawing/2014/main" id="{82F31E74-FF2C-4AA6-B960-F1B140B8A059}"/>
+              </a:ext>
+            </a:extLst>
+          </p:cNvPr>
+          <p:cNvSpPr>
+            <a:spLocks noGrp="1"/>
+          </p:cNvSpPr>
+          <p:nvPr>
+            <p:ph type="title"/>
+          </p:nvPr>
+        </p:nvSpPr>
+        <p:spPr/>
+        <p:txBody>
+          <a:bodyPr/>
+          <a:lstStyle/>
+          <a:p>
+            <a:r>
+              <a:rPr lang="en-GB" dirty="0"/>
+              <a:t>The Results of the Benchmark Investigation</a:t>
+            </a:r>
+          </a:p>
+        </p:txBody>
+      </p:sp>
+      <p:sp>
+        <p:nvSpPr>
+          <p:cNvPr id="3" name="Content Placeholder 2">
+            <a:extLst>
+              <a:ext uri="{FF2B5EF4-FFF2-40B4-BE49-F238E27FC236}">
+                <a16:creationId xmlns:a16="http://schemas.microsoft.com/office/drawing/2014/main" id="{0322FAC7-7AE0-4CB5-95D2-FA567FB8A478}"/>
+              </a:ext>
+            </a:extLst>
+          </p:cNvPr>
+          <p:cNvSpPr>
+            <a:spLocks noGrp="1"/>
+          </p:cNvSpPr>
+          <p:nvPr>
+            <p:ph idx="1"/>
+          </p:nvPr>
+        </p:nvSpPr>
+        <p:spPr/>
+        <p:txBody>
+          <a:bodyPr/>
+          <a:lstStyle/>
+          <a:p>
+            <a:r>
+              <a:rPr lang="en-GB" dirty="0"/>
+              <a:t>(Display images of a 1 minute in and then 10 minutes in)</a:t>
+            </a:r>
+          </a:p>
+        </p:txBody>
+      </p:sp>
+    </p:spTree>
+    <p:extLst>
+      <p:ext uri="{BB962C8B-B14F-4D97-AF65-F5344CB8AC3E}">
+        <p14:creationId xmlns:p14="http://schemas.microsoft.com/office/powerpoint/2010/main" val="2219924094"/>
+      </p:ext>
+    </p:extLst>
+  </p:cSld>
+  <p:clrMapOvr>
+    <a:masterClrMapping/>
+  </p:clrMapOvr>
+</p:sld>
+</file>
+
+<file path=ppt/slides/slide36.xml><?xml version="1.0" encoding="utf-8"?>
+<p:sld xmlns:a="http://schemas.openxmlformats.org/drawingml/2006/main" xmlns:r="http://schemas.openxmlformats.org/officeDocument/2006/relationships" xmlns:p="http://schemas.openxmlformats.org/presentationml/2006/main">
+  <p:cSld>
+    <p:spTree>
+      <p:nvGrpSpPr>
+        <p:cNvPr id="1" name=""/>
+        <p:cNvGrpSpPr/>
+        <p:nvPr/>
+      </p:nvGrpSpPr>
+      <p:grpSpPr>
+        <a:xfrm>
+          <a:off x="0" y="0"/>
+          <a:ext cx="0" cy="0"/>
+          <a:chOff x="0" y="0"/>
+          <a:chExt cx="0" cy="0"/>
+        </a:xfrm>
+      </p:grpSpPr>
+      <p:sp>
+        <p:nvSpPr>
+          <p:cNvPr id="2" name="Title 1">
+            <a:extLst>
+              <a:ext uri="{FF2B5EF4-FFF2-40B4-BE49-F238E27FC236}">
+                <a16:creationId xmlns:a16="http://schemas.microsoft.com/office/drawing/2014/main" id="{4B056CFC-4192-4187-AA6D-8152567D2ECB}"/>
+              </a:ext>
+            </a:extLst>
+          </p:cNvPr>
+          <p:cNvSpPr>
+            <a:spLocks noGrp="1"/>
+          </p:cNvSpPr>
+          <p:nvPr>
+            <p:ph type="title"/>
+          </p:nvPr>
+        </p:nvSpPr>
+        <p:spPr/>
+        <p:txBody>
+          <a:bodyPr/>
+          <a:lstStyle/>
+          <a:p>
+            <a:r>
+              <a:rPr lang="en-GB" dirty="0"/>
+              <a:t>Spiral Search with 2-Dimensional Array</a:t>
+            </a:r>
+          </a:p>
+        </p:txBody>
+      </p:sp>
+      <p:sp>
+        <p:nvSpPr>
+          <p:cNvPr id="3" name="Content Placeholder 2">
+            <a:extLst>
+              <a:ext uri="{FF2B5EF4-FFF2-40B4-BE49-F238E27FC236}">
+                <a16:creationId xmlns:a16="http://schemas.microsoft.com/office/drawing/2014/main" id="{3B700D3B-EE3F-49D2-96FD-D1FFFFE2DAF4}"/>
+              </a:ext>
+            </a:extLst>
+          </p:cNvPr>
+          <p:cNvSpPr>
+            <a:spLocks noGrp="1"/>
+          </p:cNvSpPr>
+          <p:nvPr>
+            <p:ph idx="1"/>
+          </p:nvPr>
+        </p:nvSpPr>
+        <p:spPr/>
+        <p:txBody>
+          <a:bodyPr/>
+          <a:lstStyle/>
+          <a:p>
+            <a:r>
+              <a:rPr lang="en-GB" dirty="0"/>
+              <a:t>I went back to an older branch and converted it to use a 2-dimensional array instead of the over-use of the map-key method and here are the results</a:t>
+            </a:r>
+          </a:p>
+          <a:p>
+            <a:endParaRPr lang="en-GB" dirty="0"/>
+          </a:p>
+          <a:p>
+            <a:pPr algn="ctr"/>
+            <a:r>
+              <a:rPr lang="en-GB" dirty="0"/>
+              <a:t>1 minute in :</a:t>
+            </a:r>
+          </a:p>
+          <a:p>
+            <a:pPr algn="ctr"/>
+            <a:endParaRPr lang="en-GB" dirty="0"/>
+          </a:p>
+          <a:p>
+            <a:pPr algn="ctr"/>
+            <a:endParaRPr lang="en-GB" dirty="0"/>
+          </a:p>
+          <a:p>
+            <a:pPr algn="ctr"/>
+            <a:r>
+              <a:rPr lang="en-GB" dirty="0"/>
+              <a:t>Time to reach 1 million: </a:t>
+            </a:r>
+          </a:p>
+        </p:txBody>
+      </p:sp>
+    </p:spTree>
+    <p:extLst>
+      <p:ext uri="{BB962C8B-B14F-4D97-AF65-F5344CB8AC3E}">
+        <p14:creationId xmlns:p14="http://schemas.microsoft.com/office/powerpoint/2010/main" val="62414064"/>
+      </p:ext>
+    </p:extLst>
+  </p:cSld>
+  <p:clrMapOvr>
+    <a:masterClrMapping/>
+  </p:clrMapOvr>
+</p:sld>
+</file>
+
 <file path=ppt/slides/slide37.xml><?xml version="1.0" encoding="utf-8"?>
 <p:sld xmlns:a="http://schemas.openxmlformats.org/drawingml/2006/main" xmlns:r="http://schemas.openxmlformats.org/officeDocument/2006/relationships" xmlns:p="http://schemas.openxmlformats.org/presentationml/2006/main">
   <p:cSld>
@@ -10439,7 +10693,7 @@
           <p:cNvPr id="2" name="Title 1">
             <a:extLst>
               <a:ext uri="{FF2B5EF4-FFF2-40B4-BE49-F238E27FC236}">
-                <a16:creationId xmlns:a16="http://schemas.microsoft.com/office/drawing/2014/main" id="{CF873E05-26F9-4905-B975-58FB87938655}"/>
+                <a16:creationId xmlns:a16="http://schemas.microsoft.com/office/drawing/2014/main" id="{772F772B-18A9-49DB-8E8C-7D464AEBD39F}"/>
               </a:ext>
             </a:extLst>
           </p:cNvPr>
@@ -10457,7 +10711,7 @@
           <a:p>
             <a:r>
               <a:rPr lang="en-GB" dirty="0"/>
-              <a:t>The Results of the Benchmark Investigation</a:t>
+              <a:t>Problem 5 Checklist</a:t>
             </a:r>
           </a:p>
         </p:txBody>
@@ -10467,7 +10721,7 @@
           <p:cNvPr id="3" name="Content Placeholder 2">
             <a:extLst>
               <a:ext uri="{FF2B5EF4-FFF2-40B4-BE49-F238E27FC236}">
-                <a16:creationId xmlns:a16="http://schemas.microsoft.com/office/drawing/2014/main" id="{07CAA66F-9760-4A5A-B5DD-435568CB399C}"/>
+                <a16:creationId xmlns:a16="http://schemas.microsoft.com/office/drawing/2014/main" id="{5F3CDD0F-C6C9-4D9D-9575-AC672B20A3A1}"/>
               </a:ext>
             </a:extLst>
           </p:cNvPr>
@@ -10480,31 +10734,104 @@
         </p:nvSpPr>
         <p:spPr/>
         <p:txBody>
-          <a:bodyPr/>
-          <a:lstStyle/>
-          <a:p>
-            <a:r>
-              <a:rPr lang="en-GB" dirty="0"/>
-              <a:t>However, the solution was much faster at a lower population and only slowed down as the population increased. </a:t>
-            </a:r>
-          </a:p>
-          <a:p>
+          <a:bodyPr>
+            <a:normAutofit/>
+          </a:bodyPr>
+          <a:lstStyle/>
+          <a:p>
+            <a:r>
+              <a:rPr lang="en-GB" dirty="0"/>
+              <a:t>A lot </a:t>
+            </a:r>
+          </a:p>
+          <a:p>
+            <a:r>
+              <a:rPr lang="en-GB" dirty="0"/>
+              <a:t>Searching in a 2-D Space in Go </a:t>
+            </a:r>
+            <a:r>
+              <a:rPr lang="en-GB" dirty="0">
+                <a:latin typeface="Segoe MDL2 Assets" panose="050A0102010101010101" pitchFamily="18" charset="0"/>
+              </a:rPr>
+              <a:t></a:t>
+            </a:r>
             <a:endParaRPr lang="en-GB" dirty="0"/>
           </a:p>
           <a:p>
             <a:r>
               <a:rPr lang="en-GB" dirty="0"/>
-              <a:t>(Explain why here, basically, the number of gophers and food pulled in from the grid got too large as the world size is too small) </a:t>
-            </a:r>
-          </a:p>
-          <a:p>
-            <a:r>
-              <a:rPr lang="en-GB" dirty="0"/>
-              <a:t>(Where there is a much smaller population it performs a lot faster than the spiral search method). </a:t>
-            </a:r>
-          </a:p>
-          <a:p>
+              <a:t>Spatial Petitioning Methodologies (Grids/Quadtrees) in Go </a:t>
+            </a:r>
+            <a:r>
+              <a:rPr lang="en-GB" dirty="0">
+                <a:latin typeface="Segoe MDL2 Assets" panose="050A0102010101010101" pitchFamily="18" charset="0"/>
+              </a:rPr>
+              <a:t></a:t>
+            </a:r>
             <a:endParaRPr lang="en-GB" dirty="0"/>
+          </a:p>
+          <a:p>
+            <a:r>
+              <a:rPr lang="en-GB" dirty="0"/>
+              <a:t>Mutexes and More Fundamentals of Concurrency </a:t>
+            </a:r>
+            <a:r>
+              <a:rPr lang="en-GB" dirty="0">
+                <a:latin typeface="Segoe MDL2 Assets" panose="050A0102010101010101" pitchFamily="18" charset="0"/>
+              </a:rPr>
+              <a:t></a:t>
+            </a:r>
+            <a:endParaRPr lang="en-GB" dirty="0"/>
+          </a:p>
+          <a:p>
+            <a:r>
+              <a:rPr lang="en-GB" dirty="0"/>
+              <a:t>Go Benchmarking  </a:t>
+            </a:r>
+            <a:r>
+              <a:rPr lang="en-GB" dirty="0">
+                <a:latin typeface="Segoe MDL2 Assets" panose="050A0102010101010101" pitchFamily="18" charset="0"/>
+              </a:rPr>
+              <a:t></a:t>
+            </a:r>
+          </a:p>
+          <a:p>
+            <a:r>
+              <a:rPr lang="en-GB" dirty="0"/>
+              <a:t>Go Race Detector </a:t>
+            </a:r>
+            <a:r>
+              <a:rPr lang="en-GB" dirty="0">
+                <a:latin typeface="Segoe MDL2 Assets" panose="050A0102010101010101" pitchFamily="18" charset="0"/>
+              </a:rPr>
+              <a:t></a:t>
+            </a:r>
+            <a:endParaRPr lang="en-GB" dirty="0"/>
+          </a:p>
+          <a:p>
+            <a:r>
+              <a:rPr lang="en-GB" dirty="0"/>
+              <a:t>Finding out slices contain pointers to arrays </a:t>
+            </a:r>
+            <a:r>
+              <a:rPr lang="en-GB" dirty="0">
+                <a:latin typeface="Segoe MDL2 Assets" panose="050A0102010101010101" pitchFamily="18" charset="0"/>
+              </a:rPr>
+              <a:t></a:t>
+            </a:r>
+            <a:endParaRPr lang="en-GB" dirty="0"/>
+          </a:p>
+          <a:p>
+            <a:r>
+              <a:rPr lang="en-GB" dirty="0"/>
+              <a:t>Denial is a powerful motivator </a:t>
+            </a:r>
+            <a:r>
+              <a:rPr lang="en-GB" dirty="0">
+                <a:latin typeface="Segoe MDL2 Assets" panose="050A0102010101010101" pitchFamily="18" charset="0"/>
+              </a:rPr>
+              <a:t></a:t>
+            </a:r>
           </a:p>
           <a:p>
             <a:endParaRPr lang="en-GB" dirty="0"/>
@@ -10520,7 +10847,7 @@
     </p:spTree>
     <p:extLst>
       <p:ext uri="{BB962C8B-B14F-4D97-AF65-F5344CB8AC3E}">
-        <p14:creationId xmlns:p14="http://schemas.microsoft.com/office/powerpoint/2010/main" val="156669204"/>
+        <p14:creationId xmlns:p14="http://schemas.microsoft.com/office/powerpoint/2010/main" val="3542417835"/>
       </p:ext>
     </p:extLst>
   </p:cSld>
@@ -10552,541 +10879,6 @@
           <p:cNvPr id="2" name="Title 1">
             <a:extLst>
               <a:ext uri="{FF2B5EF4-FFF2-40B4-BE49-F238E27FC236}">
-                <a16:creationId xmlns:a16="http://schemas.microsoft.com/office/drawing/2014/main" id="{82F31E74-FF2C-4AA6-B960-F1B140B8A059}"/>
-              </a:ext>
-            </a:extLst>
-          </p:cNvPr>
-          <p:cNvSpPr>
-            <a:spLocks noGrp="1"/>
-          </p:cNvSpPr>
-          <p:nvPr>
-            <p:ph type="title"/>
-          </p:nvPr>
-        </p:nvSpPr>
-        <p:spPr/>
-        <p:txBody>
-          <a:bodyPr/>
-          <a:lstStyle/>
-          <a:p>
-            <a:r>
-              <a:rPr lang="en-GB" dirty="0"/>
-              <a:t>The Results of the Benchmark Investigation</a:t>
-            </a:r>
-          </a:p>
-        </p:txBody>
-      </p:sp>
-      <p:sp>
-        <p:nvSpPr>
-          <p:cNvPr id="3" name="Content Placeholder 2">
-            <a:extLst>
-              <a:ext uri="{FF2B5EF4-FFF2-40B4-BE49-F238E27FC236}">
-                <a16:creationId xmlns:a16="http://schemas.microsoft.com/office/drawing/2014/main" id="{0322FAC7-7AE0-4CB5-95D2-FA567FB8A478}"/>
-              </a:ext>
-            </a:extLst>
-          </p:cNvPr>
-          <p:cNvSpPr>
-            <a:spLocks noGrp="1"/>
-          </p:cNvSpPr>
-          <p:nvPr>
-            <p:ph idx="1"/>
-          </p:nvPr>
-        </p:nvSpPr>
-        <p:spPr/>
-        <p:txBody>
-          <a:bodyPr/>
-          <a:lstStyle/>
-          <a:p>
-            <a:r>
-              <a:rPr lang="en-GB" dirty="0"/>
-              <a:t>(Display images of a 1 minute in and then 10 minutes in)</a:t>
-            </a:r>
-          </a:p>
-        </p:txBody>
-      </p:sp>
-    </p:spTree>
-    <p:extLst>
-      <p:ext uri="{BB962C8B-B14F-4D97-AF65-F5344CB8AC3E}">
-        <p14:creationId xmlns:p14="http://schemas.microsoft.com/office/powerpoint/2010/main" val="2219924094"/>
-      </p:ext>
-    </p:extLst>
-  </p:cSld>
-  <p:clrMapOvr>
-    <a:masterClrMapping/>
-  </p:clrMapOvr>
-</p:sld>
-</file>
-
-<file path=ppt/slides/slide39.xml><?xml version="1.0" encoding="utf-8"?>
-<p:sld xmlns:a="http://schemas.openxmlformats.org/drawingml/2006/main" xmlns:r="http://schemas.openxmlformats.org/officeDocument/2006/relationships" xmlns:p="http://schemas.openxmlformats.org/presentationml/2006/main">
-  <p:cSld>
-    <p:spTree>
-      <p:nvGrpSpPr>
-        <p:cNvPr id="1" name=""/>
-        <p:cNvGrpSpPr/>
-        <p:nvPr/>
-      </p:nvGrpSpPr>
-      <p:grpSpPr>
-        <a:xfrm>
-          <a:off x="0" y="0"/>
-          <a:ext cx="0" cy="0"/>
-          <a:chOff x="0" y="0"/>
-          <a:chExt cx="0" cy="0"/>
-        </a:xfrm>
-      </p:grpSpPr>
-      <p:sp>
-        <p:nvSpPr>
-          <p:cNvPr id="2" name="Title 1">
-            <a:extLst>
-              <a:ext uri="{FF2B5EF4-FFF2-40B4-BE49-F238E27FC236}">
-                <a16:creationId xmlns:a16="http://schemas.microsoft.com/office/drawing/2014/main" id="{4B056CFC-4192-4187-AA6D-8152567D2ECB}"/>
-              </a:ext>
-            </a:extLst>
-          </p:cNvPr>
-          <p:cNvSpPr>
-            <a:spLocks noGrp="1"/>
-          </p:cNvSpPr>
-          <p:nvPr>
-            <p:ph type="title"/>
-          </p:nvPr>
-        </p:nvSpPr>
-        <p:spPr/>
-        <p:txBody>
-          <a:bodyPr/>
-          <a:lstStyle/>
-          <a:p>
-            <a:r>
-              <a:rPr lang="en-GB" dirty="0"/>
-              <a:t>Spiral Search with 2-Dimensional Array</a:t>
-            </a:r>
-          </a:p>
-        </p:txBody>
-      </p:sp>
-      <p:sp>
-        <p:nvSpPr>
-          <p:cNvPr id="3" name="Content Placeholder 2">
-            <a:extLst>
-              <a:ext uri="{FF2B5EF4-FFF2-40B4-BE49-F238E27FC236}">
-                <a16:creationId xmlns:a16="http://schemas.microsoft.com/office/drawing/2014/main" id="{3B700D3B-EE3F-49D2-96FD-D1FFFFE2DAF4}"/>
-              </a:ext>
-            </a:extLst>
-          </p:cNvPr>
-          <p:cNvSpPr>
-            <a:spLocks noGrp="1"/>
-          </p:cNvSpPr>
-          <p:nvPr>
-            <p:ph idx="1"/>
-          </p:nvPr>
-        </p:nvSpPr>
-        <p:spPr/>
-        <p:txBody>
-          <a:bodyPr/>
-          <a:lstStyle/>
-          <a:p>
-            <a:r>
-              <a:rPr lang="en-GB" dirty="0"/>
-              <a:t>I went back to an older branch and converted it to use a 2-dimensional array instead of the over-use of the map-key method and here are the results</a:t>
-            </a:r>
-          </a:p>
-          <a:p>
-            <a:endParaRPr lang="en-GB" dirty="0"/>
-          </a:p>
-          <a:p>
-            <a:pPr algn="ctr"/>
-            <a:r>
-              <a:rPr lang="en-GB" dirty="0"/>
-              <a:t>1 minute in :</a:t>
-            </a:r>
-          </a:p>
-          <a:p>
-            <a:pPr algn="ctr"/>
-            <a:endParaRPr lang="en-GB" dirty="0"/>
-          </a:p>
-          <a:p>
-            <a:pPr algn="ctr"/>
-            <a:endParaRPr lang="en-GB" dirty="0"/>
-          </a:p>
-          <a:p>
-            <a:pPr algn="ctr"/>
-            <a:r>
-              <a:rPr lang="en-GB" dirty="0"/>
-              <a:t>Time to reach 1 million: </a:t>
-            </a:r>
-          </a:p>
-        </p:txBody>
-      </p:sp>
-    </p:spTree>
-    <p:extLst>
-      <p:ext uri="{BB962C8B-B14F-4D97-AF65-F5344CB8AC3E}">
-        <p14:creationId xmlns:p14="http://schemas.microsoft.com/office/powerpoint/2010/main" val="62414064"/>
-      </p:ext>
-    </p:extLst>
-  </p:cSld>
-  <p:clrMapOvr>
-    <a:masterClrMapping/>
-  </p:clrMapOvr>
-</p:sld>
-</file>
-
-<file path=ppt/slides/slide4.xml><?xml version="1.0" encoding="utf-8"?>
-<p:sld xmlns:a="http://schemas.openxmlformats.org/drawingml/2006/main" xmlns:r="http://schemas.openxmlformats.org/officeDocument/2006/relationships" xmlns:p="http://schemas.openxmlformats.org/presentationml/2006/main">
-  <p:cSld>
-    <p:spTree>
-      <p:nvGrpSpPr>
-        <p:cNvPr id="1" name=""/>
-        <p:cNvGrpSpPr/>
-        <p:nvPr/>
-      </p:nvGrpSpPr>
-      <p:grpSpPr>
-        <a:xfrm>
-          <a:off x="0" y="0"/>
-          <a:ext cx="0" cy="0"/>
-          <a:chOff x="0" y="0"/>
-          <a:chExt cx="0" cy="0"/>
-        </a:xfrm>
-      </p:grpSpPr>
-      <p:sp>
-        <p:nvSpPr>
-          <p:cNvPr id="2" name="Title 1">
-            <a:extLst>
-              <a:ext uri="{FF2B5EF4-FFF2-40B4-BE49-F238E27FC236}">
-                <a16:creationId xmlns:a16="http://schemas.microsoft.com/office/drawing/2014/main" id="{4F7D31D1-092D-4684-8FC3-0EA5272BA68F}"/>
-              </a:ext>
-            </a:extLst>
-          </p:cNvPr>
-          <p:cNvSpPr>
-            <a:spLocks noGrp="1"/>
-          </p:cNvSpPr>
-          <p:nvPr>
-            <p:ph type="title"/>
-          </p:nvPr>
-        </p:nvSpPr>
-        <p:spPr/>
-        <p:txBody>
-          <a:bodyPr/>
-          <a:lstStyle/>
-          <a:p>
-            <a:r>
-              <a:rPr lang="en-GB" dirty="0"/>
-              <a:t>My First Project Idea</a:t>
-            </a:r>
-          </a:p>
-        </p:txBody>
-      </p:sp>
-      <p:sp>
-        <p:nvSpPr>
-          <p:cNvPr id="3" name="Content Placeholder 2">
-            <a:extLst>
-              <a:ext uri="{FF2B5EF4-FFF2-40B4-BE49-F238E27FC236}">
-                <a16:creationId xmlns:a16="http://schemas.microsoft.com/office/drawing/2014/main" id="{0BA4CED0-14AF-4666-B0F9-8CD738326E3F}"/>
-              </a:ext>
-            </a:extLst>
-          </p:cNvPr>
-          <p:cNvSpPr>
-            <a:spLocks noGrp="1"/>
-          </p:cNvSpPr>
-          <p:nvPr>
-            <p:ph idx="1"/>
-          </p:nvPr>
-        </p:nvSpPr>
-        <p:spPr>
-          <a:xfrm>
-            <a:off x="1103312" y="2052918"/>
-            <a:ext cx="6194955" cy="4195481"/>
-          </a:xfrm>
-        </p:spPr>
-        <p:txBody>
-          <a:bodyPr/>
-          <a:lstStyle/>
-          <a:p>
-            <a:r>
-              <a:rPr lang="en-GB" dirty="0"/>
-              <a:t>Build a program that would model the life of 1 million gophers (the animal) using Go (obviously)</a:t>
-            </a:r>
-          </a:p>
-          <a:p>
-            <a:endParaRPr lang="en-GB" dirty="0"/>
-          </a:p>
-          <a:p>
-            <a:r>
-              <a:rPr lang="en-GB" dirty="0"/>
-              <a:t>Before beginning the program I looked online for some facts about gophers. </a:t>
-            </a:r>
-            <a:r>
-              <a:rPr lang="en-GB" dirty="0">
-                <a:hlinkClick r:id="rId2"/>
-              </a:rPr>
-              <a:t>https://www.livescience.com/57623-gopher-facts.html</a:t>
-            </a:r>
-            <a:endParaRPr lang="en-GB" dirty="0"/>
-          </a:p>
-          <a:p>
-            <a:pPr marL="457200" lvl="1" indent="0">
-              <a:buNone/>
-            </a:pPr>
-            <a:endParaRPr lang="en-GB" dirty="0"/>
-          </a:p>
-          <a:p>
-            <a:endParaRPr lang="en-GB" dirty="0"/>
-          </a:p>
-        </p:txBody>
-      </p:sp>
-      <p:pic>
-        <p:nvPicPr>
-          <p:cNvPr id="6" name="Picture 5">
-            <a:extLst>
-              <a:ext uri="{FF2B5EF4-FFF2-40B4-BE49-F238E27FC236}">
-                <a16:creationId xmlns:a16="http://schemas.microsoft.com/office/drawing/2014/main" id="{9378717A-1D2F-4DA1-A508-A543F6288D06}"/>
-              </a:ext>
-            </a:extLst>
-          </p:cNvPr>
-          <p:cNvPicPr>
-            <a:picLocks noChangeAspect="1"/>
-          </p:cNvPicPr>
-          <p:nvPr/>
-        </p:nvPicPr>
-        <p:blipFill>
-          <a:blip r:embed="rId3">
-            <a:extLst>
-              <a:ext uri="{28A0092B-C50C-407E-A947-70E740481C1C}">
-                <a14:useLocalDpi xmlns:a14="http://schemas.microsoft.com/office/drawing/2010/main" val="0"/>
-              </a:ext>
-            </a:extLst>
-          </a:blip>
-          <a:stretch>
-            <a:fillRect/>
-          </a:stretch>
-        </p:blipFill>
-        <p:spPr>
-          <a:xfrm>
-            <a:off x="7829531" y="2347258"/>
-            <a:ext cx="3259157" cy="3606800"/>
-          </a:xfrm>
-          <a:prstGeom prst="rect">
-            <a:avLst/>
-          </a:prstGeom>
-        </p:spPr>
-      </p:pic>
-    </p:spTree>
-    <p:extLst>
-      <p:ext uri="{BB962C8B-B14F-4D97-AF65-F5344CB8AC3E}">
-        <p14:creationId xmlns:p14="http://schemas.microsoft.com/office/powerpoint/2010/main" val="1992650848"/>
-      </p:ext>
-    </p:extLst>
-  </p:cSld>
-  <p:clrMapOvr>
-    <a:masterClrMapping/>
-  </p:clrMapOvr>
-</p:sld>
-</file>
-
-<file path=ppt/slides/slide40.xml><?xml version="1.0" encoding="utf-8"?>
-<p:sld xmlns:a="http://schemas.openxmlformats.org/drawingml/2006/main" xmlns:r="http://schemas.openxmlformats.org/officeDocument/2006/relationships" xmlns:p="http://schemas.openxmlformats.org/presentationml/2006/main">
-  <p:cSld>
-    <p:spTree>
-      <p:nvGrpSpPr>
-        <p:cNvPr id="1" name=""/>
-        <p:cNvGrpSpPr/>
-        <p:nvPr/>
-      </p:nvGrpSpPr>
-      <p:grpSpPr>
-        <a:xfrm>
-          <a:off x="0" y="0"/>
-          <a:ext cx="0" cy="0"/>
-          <a:chOff x="0" y="0"/>
-          <a:chExt cx="0" cy="0"/>
-        </a:xfrm>
-      </p:grpSpPr>
-      <p:sp>
-        <p:nvSpPr>
-          <p:cNvPr id="2" name="Title 1">
-            <a:extLst>
-              <a:ext uri="{FF2B5EF4-FFF2-40B4-BE49-F238E27FC236}">
-                <a16:creationId xmlns:a16="http://schemas.microsoft.com/office/drawing/2014/main" id="{772F772B-18A9-49DB-8E8C-7D464AEBD39F}"/>
-              </a:ext>
-            </a:extLst>
-          </p:cNvPr>
-          <p:cNvSpPr>
-            <a:spLocks noGrp="1"/>
-          </p:cNvSpPr>
-          <p:nvPr>
-            <p:ph type="title"/>
-          </p:nvPr>
-        </p:nvSpPr>
-        <p:spPr/>
-        <p:txBody>
-          <a:bodyPr/>
-          <a:lstStyle/>
-          <a:p>
-            <a:r>
-              <a:rPr lang="en-GB" dirty="0"/>
-              <a:t>Problem 5 Checklist</a:t>
-            </a:r>
-          </a:p>
-        </p:txBody>
-      </p:sp>
-      <p:sp>
-        <p:nvSpPr>
-          <p:cNvPr id="3" name="Content Placeholder 2">
-            <a:extLst>
-              <a:ext uri="{FF2B5EF4-FFF2-40B4-BE49-F238E27FC236}">
-                <a16:creationId xmlns:a16="http://schemas.microsoft.com/office/drawing/2014/main" id="{5F3CDD0F-C6C9-4D9D-9575-AC672B20A3A1}"/>
-              </a:ext>
-            </a:extLst>
-          </p:cNvPr>
-          <p:cNvSpPr>
-            <a:spLocks noGrp="1"/>
-          </p:cNvSpPr>
-          <p:nvPr>
-            <p:ph idx="1"/>
-          </p:nvPr>
-        </p:nvSpPr>
-        <p:spPr/>
-        <p:txBody>
-          <a:bodyPr>
-            <a:normAutofit/>
-          </a:bodyPr>
-          <a:lstStyle/>
-          <a:p>
-            <a:r>
-              <a:rPr lang="en-GB" dirty="0"/>
-              <a:t>A lot </a:t>
-            </a:r>
-          </a:p>
-          <a:p>
-            <a:r>
-              <a:rPr lang="en-GB" dirty="0"/>
-              <a:t>Searching in a 2-D Space in Go </a:t>
-            </a:r>
-            <a:r>
-              <a:rPr lang="en-GB" dirty="0">
-                <a:latin typeface="Segoe MDL2 Assets" panose="050A0102010101010101" pitchFamily="18" charset="0"/>
-              </a:rPr>
-              <a:t></a:t>
-            </a:r>
-            <a:endParaRPr lang="en-GB" dirty="0"/>
-          </a:p>
-          <a:p>
-            <a:r>
-              <a:rPr lang="en-GB" dirty="0"/>
-              <a:t>Spatial Petitioning Methodologies (Grids/Quadtrees) in Go </a:t>
-            </a:r>
-            <a:r>
-              <a:rPr lang="en-GB" dirty="0">
-                <a:latin typeface="Segoe MDL2 Assets" panose="050A0102010101010101" pitchFamily="18" charset="0"/>
-              </a:rPr>
-              <a:t></a:t>
-            </a:r>
-            <a:endParaRPr lang="en-GB" dirty="0"/>
-          </a:p>
-          <a:p>
-            <a:r>
-              <a:rPr lang="en-GB" dirty="0"/>
-              <a:t>Mutexes and More Fundamentals of Concurrency </a:t>
-            </a:r>
-            <a:r>
-              <a:rPr lang="en-GB" dirty="0">
-                <a:latin typeface="Segoe MDL2 Assets" panose="050A0102010101010101" pitchFamily="18" charset="0"/>
-              </a:rPr>
-              <a:t></a:t>
-            </a:r>
-            <a:endParaRPr lang="en-GB" dirty="0"/>
-          </a:p>
-          <a:p>
-            <a:r>
-              <a:rPr lang="en-GB" dirty="0"/>
-              <a:t>Go Benchmarking  </a:t>
-            </a:r>
-            <a:r>
-              <a:rPr lang="en-GB" dirty="0">
-                <a:latin typeface="Segoe MDL2 Assets" panose="050A0102010101010101" pitchFamily="18" charset="0"/>
-              </a:rPr>
-              <a:t></a:t>
-            </a:r>
-          </a:p>
-          <a:p>
-            <a:r>
-              <a:rPr lang="en-GB" dirty="0"/>
-              <a:t>Go Race Detector </a:t>
-            </a:r>
-            <a:r>
-              <a:rPr lang="en-GB" dirty="0">
-                <a:latin typeface="Segoe MDL2 Assets" panose="050A0102010101010101" pitchFamily="18" charset="0"/>
-              </a:rPr>
-              <a:t></a:t>
-            </a:r>
-            <a:endParaRPr lang="en-GB" dirty="0"/>
-          </a:p>
-          <a:p>
-            <a:r>
-              <a:rPr lang="en-GB" dirty="0"/>
-              <a:t>Finding out slices contain pointers to arrays </a:t>
-            </a:r>
-            <a:r>
-              <a:rPr lang="en-GB" dirty="0">
-                <a:latin typeface="Segoe MDL2 Assets" panose="050A0102010101010101" pitchFamily="18" charset="0"/>
-              </a:rPr>
-              <a:t></a:t>
-            </a:r>
-            <a:endParaRPr lang="en-GB" dirty="0"/>
-          </a:p>
-          <a:p>
-            <a:r>
-              <a:rPr lang="en-GB" dirty="0"/>
-              <a:t>Denial is a powerful motivator </a:t>
-            </a:r>
-            <a:r>
-              <a:rPr lang="en-GB" dirty="0">
-                <a:latin typeface="Segoe MDL2 Assets" panose="050A0102010101010101" pitchFamily="18" charset="0"/>
-              </a:rPr>
-              <a:t></a:t>
-            </a:r>
-          </a:p>
-          <a:p>
-            <a:endParaRPr lang="en-GB" dirty="0"/>
-          </a:p>
-          <a:p>
-            <a:endParaRPr lang="en-GB" dirty="0"/>
-          </a:p>
-          <a:p>
-            <a:endParaRPr lang="en-GB" dirty="0"/>
-          </a:p>
-        </p:txBody>
-      </p:sp>
-    </p:spTree>
-    <p:extLst>
-      <p:ext uri="{BB962C8B-B14F-4D97-AF65-F5344CB8AC3E}">
-        <p14:creationId xmlns:p14="http://schemas.microsoft.com/office/powerpoint/2010/main" val="3542417835"/>
-      </p:ext>
-    </p:extLst>
-  </p:cSld>
-  <p:clrMapOvr>
-    <a:masterClrMapping/>
-  </p:clrMapOvr>
-</p:sld>
-</file>
-
-<file path=ppt/slides/slide41.xml><?xml version="1.0" encoding="utf-8"?>
-<p:sld xmlns:a="http://schemas.openxmlformats.org/drawingml/2006/main" xmlns:r="http://schemas.openxmlformats.org/officeDocument/2006/relationships" xmlns:p="http://schemas.openxmlformats.org/presentationml/2006/main">
-  <p:cSld>
-    <p:spTree>
-      <p:nvGrpSpPr>
-        <p:cNvPr id="1" name=""/>
-        <p:cNvGrpSpPr/>
-        <p:nvPr/>
-      </p:nvGrpSpPr>
-      <p:grpSpPr>
-        <a:xfrm>
-          <a:off x="0" y="0"/>
-          <a:ext cx="0" cy="0"/>
-          <a:chOff x="0" y="0"/>
-          <a:chExt cx="0" cy="0"/>
-        </a:xfrm>
-      </p:grpSpPr>
-      <p:sp>
-        <p:nvSpPr>
-          <p:cNvPr id="2" name="Title 1">
-            <a:extLst>
-              <a:ext uri="{FF2B5EF4-FFF2-40B4-BE49-F238E27FC236}">
                 <a16:creationId xmlns:a16="http://schemas.microsoft.com/office/drawing/2014/main" id="{4CD641E4-A7E1-4915-9226-8DED4B01769C}"/>
               </a:ext>
             </a:extLst>
@@ -11148,7 +10940,7 @@
 </p:sld>
 </file>
 
-<file path=ppt/slides/slide42.xml><?xml version="1.0" encoding="utf-8"?>
+<file path=ppt/slides/slide39.xml><?xml version="1.0" encoding="utf-8"?>
 <p:sld xmlns:a="http://schemas.openxmlformats.org/drawingml/2006/main" xmlns:r="http://schemas.openxmlformats.org/officeDocument/2006/relationships" xmlns:p="http://schemas.openxmlformats.org/presentationml/2006/main">
   <p:cSld>
     <p:spTree>
@@ -12330,7 +12122,159 @@
 </p:sld>
 </file>
 
-<file path=ppt/slides/slide43.xml><?xml version="1.0" encoding="utf-8"?>
+<file path=ppt/slides/slide4.xml><?xml version="1.0" encoding="utf-8"?>
+<p:sld xmlns:a="http://schemas.openxmlformats.org/drawingml/2006/main" xmlns:r="http://schemas.openxmlformats.org/officeDocument/2006/relationships" xmlns:p="http://schemas.openxmlformats.org/presentationml/2006/main">
+  <p:cSld>
+    <p:spTree>
+      <p:nvGrpSpPr>
+        <p:cNvPr id="1" name=""/>
+        <p:cNvGrpSpPr/>
+        <p:nvPr/>
+      </p:nvGrpSpPr>
+      <p:grpSpPr>
+        <a:xfrm>
+          <a:off x="0" y="0"/>
+          <a:ext cx="0" cy="0"/>
+          <a:chOff x="0" y="0"/>
+          <a:chExt cx="0" cy="0"/>
+        </a:xfrm>
+      </p:grpSpPr>
+      <p:sp>
+        <p:nvSpPr>
+          <p:cNvPr id="2" name="Title 1">
+            <a:extLst>
+              <a:ext uri="{FF2B5EF4-FFF2-40B4-BE49-F238E27FC236}">
+                <a16:creationId xmlns:a16="http://schemas.microsoft.com/office/drawing/2014/main" id="{4F7D31D1-092D-4684-8FC3-0EA5272BA68F}"/>
+              </a:ext>
+            </a:extLst>
+          </p:cNvPr>
+          <p:cNvSpPr>
+            <a:spLocks noGrp="1"/>
+          </p:cNvSpPr>
+          <p:nvPr>
+            <p:ph type="title"/>
+          </p:nvPr>
+        </p:nvSpPr>
+        <p:spPr/>
+        <p:txBody>
+          <a:bodyPr/>
+          <a:lstStyle/>
+          <a:p>
+            <a:r>
+              <a:rPr lang="en-GB" dirty="0"/>
+              <a:t>My First Project Idea</a:t>
+            </a:r>
+          </a:p>
+        </p:txBody>
+      </p:sp>
+      <p:sp>
+        <p:nvSpPr>
+          <p:cNvPr id="3" name="Content Placeholder 2">
+            <a:extLst>
+              <a:ext uri="{FF2B5EF4-FFF2-40B4-BE49-F238E27FC236}">
+                <a16:creationId xmlns:a16="http://schemas.microsoft.com/office/drawing/2014/main" id="{0BA4CED0-14AF-4666-B0F9-8CD738326E3F}"/>
+              </a:ext>
+            </a:extLst>
+          </p:cNvPr>
+          <p:cNvSpPr>
+            <a:spLocks noGrp="1"/>
+          </p:cNvSpPr>
+          <p:nvPr>
+            <p:ph idx="1"/>
+          </p:nvPr>
+        </p:nvSpPr>
+        <p:spPr>
+          <a:xfrm>
+            <a:off x="1103312" y="2052918"/>
+            <a:ext cx="6194955" cy="4195481"/>
+          </a:xfrm>
+        </p:spPr>
+        <p:txBody>
+          <a:bodyPr/>
+          <a:lstStyle/>
+          <a:p>
+            <a:r>
+              <a:rPr lang="en-GB" dirty="0"/>
+              <a:t>Build a program that would model the life of 1 million gophers (the animal) using Go (obviously)</a:t>
+            </a:r>
+          </a:p>
+          <a:p>
+            <a:endParaRPr lang="en-GB" dirty="0"/>
+          </a:p>
+          <a:p>
+            <a:r>
+              <a:rPr lang="en-GB" dirty="0"/>
+              <a:t>Before beginning the program I looked online for some facts about gophers. </a:t>
+            </a:r>
+            <a:r>
+              <a:rPr lang="en-GB" dirty="0">
+                <a:hlinkClick r:id="rId2"/>
+              </a:rPr>
+              <a:t>https://www.livescience.com/57623-gopher-facts.html</a:t>
+            </a:r>
+            <a:endParaRPr lang="en-GB" dirty="0"/>
+          </a:p>
+          <a:p>
+            <a:pPr marL="457200" lvl="1" indent="0">
+              <a:buNone/>
+            </a:pPr>
+            <a:endParaRPr lang="en-GB" dirty="0"/>
+          </a:p>
+          <a:p>
+            <a:endParaRPr lang="en-GB" dirty="0"/>
+          </a:p>
+        </p:txBody>
+      </p:sp>
+      <p:pic>
+        <p:nvPicPr>
+          <p:cNvPr id="6" name="Picture 5">
+            <a:extLst>
+              <a:ext uri="{FF2B5EF4-FFF2-40B4-BE49-F238E27FC236}">
+                <a16:creationId xmlns:a16="http://schemas.microsoft.com/office/drawing/2014/main" id="{9378717A-1D2F-4DA1-A508-A543F6288D06}"/>
+              </a:ext>
+            </a:extLst>
+          </p:cNvPr>
+          <p:cNvPicPr>
+            <a:picLocks noChangeAspect="1"/>
+          </p:cNvPicPr>
+          <p:nvPr/>
+        </p:nvPicPr>
+        <p:blipFill>
+          <a:blip r:embed="rId3">
+            <a:extLst>
+              <a:ext uri="{28A0092B-C50C-407E-A947-70E740481C1C}">
+                <a14:useLocalDpi xmlns:a14="http://schemas.microsoft.com/office/drawing/2010/main" val="0"/>
+              </a:ext>
+            </a:extLst>
+          </a:blip>
+          <a:stretch>
+            <a:fillRect/>
+          </a:stretch>
+        </p:blipFill>
+        <p:spPr>
+          <a:xfrm>
+            <a:off x="7829531" y="2347258"/>
+            <a:ext cx="3259157" cy="3606800"/>
+          </a:xfrm>
+          <a:prstGeom prst="rect">
+            <a:avLst/>
+          </a:prstGeom>
+        </p:spPr>
+      </p:pic>
+    </p:spTree>
+    <p:extLst>
+      <p:ext uri="{BB962C8B-B14F-4D97-AF65-F5344CB8AC3E}">
+        <p14:creationId xmlns:p14="http://schemas.microsoft.com/office/powerpoint/2010/main" val="1992650848"/>
+      </p:ext>
+    </p:extLst>
+  </p:cSld>
+  <p:clrMapOvr>
+    <a:masterClrMapping/>
+  </p:clrMapOvr>
+</p:sld>
+</file>
+
+<file path=ppt/slides/slide40.xml><?xml version="1.0" encoding="utf-8"?>
 <p:sld xmlns:a="http://schemas.openxmlformats.org/drawingml/2006/main" xmlns:r="http://schemas.openxmlformats.org/officeDocument/2006/relationships" xmlns:p="http://schemas.openxmlformats.org/presentationml/2006/main">
   <p:cSld>
     <p:spTree>
@@ -12490,7 +12434,7 @@
 </p:sld>
 </file>
 
-<file path=ppt/slides/slide44.xml><?xml version="1.0" encoding="utf-8"?>
+<file path=ppt/slides/slide41.xml><?xml version="1.0" encoding="utf-8"?>
 <p:sld xmlns:a="http://schemas.openxmlformats.org/drawingml/2006/main" xmlns:r="http://schemas.openxmlformats.org/officeDocument/2006/relationships" xmlns:p="http://schemas.openxmlformats.org/presentationml/2006/main">
   <p:cSld>
     <p:spTree>
@@ -12554,7 +12498,7 @@
 </p:sld>
 </file>
 
-<file path=ppt/slides/slide45.xml><?xml version="1.0" encoding="utf-8"?>
+<file path=ppt/slides/slide42.xml><?xml version="1.0" encoding="utf-8"?>
 <p:sld xmlns:a="http://schemas.openxmlformats.org/drawingml/2006/main" xmlns:r="http://schemas.openxmlformats.org/officeDocument/2006/relationships" xmlns:p="http://schemas.openxmlformats.org/presentationml/2006/main">
   <p:cSld>
     <p:spTree>
@@ -12637,7 +12581,7 @@
 </p:sld>
 </file>
 
-<file path=ppt/slides/slide46.xml><?xml version="1.0" encoding="utf-8"?>
+<file path=ppt/slides/slide43.xml><?xml version="1.0" encoding="utf-8"?>
 <p:sld xmlns:a="http://schemas.openxmlformats.org/drawingml/2006/main" xmlns:r="http://schemas.openxmlformats.org/officeDocument/2006/relationships" xmlns:p="http://schemas.openxmlformats.org/presentationml/2006/main">
   <p:cSld>
     <p:spTree>
@@ -12763,7 +12707,7 @@
 </p:sld>
 </file>
 
-<file path=ppt/slides/slide47.xml><?xml version="1.0" encoding="utf-8"?>
+<file path=ppt/slides/slide44.xml><?xml version="1.0" encoding="utf-8"?>
 <p:sld xmlns:a="http://schemas.openxmlformats.org/drawingml/2006/main" xmlns:r="http://schemas.openxmlformats.org/officeDocument/2006/relationships" xmlns:p="http://schemas.openxmlformats.org/presentationml/2006/main">
   <p:cSld>
     <p:spTree>
@@ -12873,7 +12817,7 @@
 </p:sld>
 </file>
 
-<file path=ppt/slides/slide48.xml><?xml version="1.0" encoding="utf-8"?>
+<file path=ppt/slides/slide45.xml><?xml version="1.0" encoding="utf-8"?>
 <p:sld xmlns:a="http://schemas.openxmlformats.org/drawingml/2006/main" xmlns:r="http://schemas.openxmlformats.org/officeDocument/2006/relationships" xmlns:p="http://schemas.openxmlformats.org/presentationml/2006/main">
   <p:cSld>
     <p:spTree>
@@ -12983,7 +12927,7 @@
 </p:sld>
 </file>
 
-<file path=ppt/slides/slide49.xml><?xml version="1.0" encoding="utf-8"?>
+<file path=ppt/slides/slide46.xml><?xml version="1.0" encoding="utf-8"?>
 <p:sld xmlns:a="http://schemas.openxmlformats.org/drawingml/2006/main" xmlns:r="http://schemas.openxmlformats.org/officeDocument/2006/relationships" xmlns:p="http://schemas.openxmlformats.org/presentationml/2006/main">
   <p:cSld>
     <p:spTree>
@@ -13703,7 +13647,7 @@
           <a:p>
             <a:r>
               <a:rPr lang="en-GB" dirty="0"/>
-              <a:t>Problem 2 – Modelling the life of 10 Gophers </a:t>
+              <a:t>Part 2 – Modelling the life of 10 Gophers </a:t>
             </a:r>
           </a:p>
         </p:txBody>

</xml_diff>

<commit_message>
Moved to using bootstrap 4
</commit_message>
<xml_diff>
--- a/GopherLife.pptx
+++ b/GopherLife.pptx
@@ -242,7 +242,7 @@
           <a:p>
             <a:fld id="{4F997A0C-E4B2-467D-ABDF-C6BB0AD1437F}" type="datetimeFigureOut">
               <a:rPr lang="en-GB" smtClean="0"/>
-              <a:t>23/01/2019</a:t>
+              <a:t>26/01/2019</a:t>
             </a:fld>
             <a:endParaRPr lang="en-GB"/>
           </a:p>
@@ -780,7 +780,7 @@
           <a:p>
             <a:fld id="{55E4148D-2AA3-4A29-8641-0082B7E18494}" type="datetimeFigureOut">
               <a:rPr lang="en-GB" smtClean="0"/>
-              <a:t>23/01/2019</a:t>
+              <a:t>26/01/2019</a:t>
             </a:fld>
             <a:endParaRPr lang="en-GB"/>
           </a:p>
@@ -1055,7 +1055,7 @@
           <a:p>
             <a:fld id="{55E4148D-2AA3-4A29-8641-0082B7E18494}" type="datetimeFigureOut">
               <a:rPr lang="en-GB" smtClean="0"/>
-              <a:t>23/01/2019</a:t>
+              <a:t>26/01/2019</a:t>
             </a:fld>
             <a:endParaRPr lang="en-GB"/>
           </a:p>
@@ -1249,7 +1249,7 @@
           <a:p>
             <a:fld id="{55E4148D-2AA3-4A29-8641-0082B7E18494}" type="datetimeFigureOut">
               <a:rPr lang="en-GB" smtClean="0"/>
-              <a:t>23/01/2019</a:t>
+              <a:t>26/01/2019</a:t>
             </a:fld>
             <a:endParaRPr lang="en-GB"/>
           </a:p>
@@ -1522,7 +1522,7 @@
           <a:p>
             <a:fld id="{55E4148D-2AA3-4A29-8641-0082B7E18494}" type="datetimeFigureOut">
               <a:rPr lang="en-GB" smtClean="0"/>
-              <a:t>23/01/2019</a:t>
+              <a:t>26/01/2019</a:t>
             </a:fld>
             <a:endParaRPr lang="en-GB"/>
           </a:p>
@@ -1863,7 +1863,7 @@
           <a:p>
             <a:fld id="{55E4148D-2AA3-4A29-8641-0082B7E18494}" type="datetimeFigureOut">
               <a:rPr lang="en-GB" smtClean="0"/>
-              <a:t>23/01/2019</a:t>
+              <a:t>26/01/2019</a:t>
             </a:fld>
             <a:endParaRPr lang="en-GB"/>
           </a:p>
@@ -2486,7 +2486,7 @@
           <a:p>
             <a:fld id="{55E4148D-2AA3-4A29-8641-0082B7E18494}" type="datetimeFigureOut">
               <a:rPr lang="en-GB" smtClean="0"/>
-              <a:t>23/01/2019</a:t>
+              <a:t>26/01/2019</a:t>
             </a:fld>
             <a:endParaRPr lang="en-GB"/>
           </a:p>
@@ -3346,7 +3346,7 @@
           <a:p>
             <a:fld id="{55E4148D-2AA3-4A29-8641-0082B7E18494}" type="datetimeFigureOut">
               <a:rPr lang="en-GB" smtClean="0"/>
-              <a:t>23/01/2019</a:t>
+              <a:t>26/01/2019</a:t>
             </a:fld>
             <a:endParaRPr lang="en-GB"/>
           </a:p>
@@ -3516,7 +3516,7 @@
           <a:p>
             <a:fld id="{55E4148D-2AA3-4A29-8641-0082B7E18494}" type="datetimeFigureOut">
               <a:rPr lang="en-GB" smtClean="0"/>
-              <a:t>23/01/2019</a:t>
+              <a:t>26/01/2019</a:t>
             </a:fld>
             <a:endParaRPr lang="en-GB"/>
           </a:p>
@@ -3696,7 +3696,7 @@
           <a:p>
             <a:fld id="{55E4148D-2AA3-4A29-8641-0082B7E18494}" type="datetimeFigureOut">
               <a:rPr lang="en-GB" smtClean="0"/>
-              <a:t>23/01/2019</a:t>
+              <a:t>26/01/2019</a:t>
             </a:fld>
             <a:endParaRPr lang="en-GB"/>
           </a:p>
@@ -3866,7 +3866,7 @@
           <a:p>
             <a:fld id="{55E4148D-2AA3-4A29-8641-0082B7E18494}" type="datetimeFigureOut">
               <a:rPr lang="en-GB" smtClean="0"/>
-              <a:t>23/01/2019</a:t>
+              <a:t>26/01/2019</a:t>
             </a:fld>
             <a:endParaRPr lang="en-GB"/>
           </a:p>
@@ -4113,7 +4113,7 @@
           <a:p>
             <a:fld id="{55E4148D-2AA3-4A29-8641-0082B7E18494}" type="datetimeFigureOut">
               <a:rPr lang="en-GB" smtClean="0"/>
-              <a:t>23/01/2019</a:t>
+              <a:t>26/01/2019</a:t>
             </a:fld>
             <a:endParaRPr lang="en-GB"/>
           </a:p>
@@ -4405,7 +4405,7 @@
           <a:p>
             <a:fld id="{55E4148D-2AA3-4A29-8641-0082B7E18494}" type="datetimeFigureOut">
               <a:rPr lang="en-GB" smtClean="0"/>
-              <a:t>23/01/2019</a:t>
+              <a:t>26/01/2019</a:t>
             </a:fld>
             <a:endParaRPr lang="en-GB"/>
           </a:p>
@@ -4849,7 +4849,7 @@
           <a:p>
             <a:fld id="{55E4148D-2AA3-4A29-8641-0082B7E18494}" type="datetimeFigureOut">
               <a:rPr lang="en-GB" smtClean="0"/>
-              <a:t>23/01/2019</a:t>
+              <a:t>26/01/2019</a:t>
             </a:fld>
             <a:endParaRPr lang="en-GB"/>
           </a:p>
@@ -4967,7 +4967,7 @@
           <a:p>
             <a:fld id="{55E4148D-2AA3-4A29-8641-0082B7E18494}" type="datetimeFigureOut">
               <a:rPr lang="en-GB" smtClean="0"/>
-              <a:t>23/01/2019</a:t>
+              <a:t>26/01/2019</a:t>
             </a:fld>
             <a:endParaRPr lang="en-GB"/>
           </a:p>
@@ -5062,7 +5062,7 @@
           <a:p>
             <a:fld id="{55E4148D-2AA3-4A29-8641-0082B7E18494}" type="datetimeFigureOut">
               <a:rPr lang="en-GB" smtClean="0"/>
-              <a:t>23/01/2019</a:t>
+              <a:t>26/01/2019</a:t>
             </a:fld>
             <a:endParaRPr lang="en-GB"/>
           </a:p>
@@ -5341,7 +5341,7 @@
           <a:p>
             <a:fld id="{55E4148D-2AA3-4A29-8641-0082B7E18494}" type="datetimeFigureOut">
               <a:rPr lang="en-GB" smtClean="0"/>
-              <a:t>23/01/2019</a:t>
+              <a:t>26/01/2019</a:t>
             </a:fld>
             <a:endParaRPr lang="en-GB"/>
           </a:p>
@@ -5616,7 +5616,7 @@
           <a:p>
             <a:fld id="{55E4148D-2AA3-4A29-8641-0082B7E18494}" type="datetimeFigureOut">
               <a:rPr lang="en-GB" smtClean="0"/>
-              <a:t>23/01/2019</a:t>
+              <a:t>26/01/2019</a:t>
             </a:fld>
             <a:endParaRPr lang="en-GB"/>
           </a:p>
@@ -6045,7 +6045,7 @@
           <a:p>
             <a:fld id="{55E4148D-2AA3-4A29-8641-0082B7E18494}" type="datetimeFigureOut">
               <a:rPr lang="en-GB" smtClean="0"/>
-              <a:t>23/01/2019</a:t>
+              <a:t>26/01/2019</a:t>
             </a:fld>
             <a:endParaRPr lang="en-GB"/>
           </a:p>
@@ -8808,7 +8808,7 @@
           <a:p>
             <a:r>
               <a:rPr lang="en-GB" dirty="0"/>
-              <a:t>Problem 5 - Optimization</a:t>
+              <a:t>Part 5 - Optimization</a:t>
             </a:r>
           </a:p>
         </p:txBody>
@@ -8909,7 +8909,7 @@
           <a:p>
             <a:r>
               <a:rPr lang="en-GB" dirty="0"/>
-              <a:t>Problem 5 - Optimization</a:t>
+              <a:t>Part 4 - Optimization</a:t>
             </a:r>
           </a:p>
         </p:txBody>
@@ -8933,7 +8933,7 @@
         <p:spPr>
           <a:xfrm>
             <a:off x="214079" y="2052916"/>
-            <a:ext cx="5193944" cy="4195481"/>
+            <a:ext cx="5568412" cy="4195481"/>
           </a:xfrm>
         </p:spPr>
         <p:txBody>
@@ -8945,18 +8945,6 @@
             <a:r>
               <a:rPr lang="en-GB" sz="1600" dirty="0"/>
               <a:t>At only 6% of my target goal it was taking nearly ½ a second to process a single frame. </a:t>
-            </a:r>
-          </a:p>
-          <a:p>
-            <a:r>
-              <a:rPr lang="en-GB" sz="1600" dirty="0"/>
-              <a:t>(Note this should show an image of pre-spiral results)</a:t>
-            </a:r>
-          </a:p>
-          <a:p>
-            <a:r>
-              <a:rPr lang="en-GB" sz="1600" dirty="0"/>
-              <a:t>What was the cause? </a:t>
             </a:r>
           </a:p>
           <a:p>
@@ -9004,7 +8992,7 @@
         </p:blipFill>
         <p:spPr>
           <a:xfrm>
-            <a:off x="5546609" y="2192254"/>
+            <a:off x="5973329" y="2052916"/>
             <a:ext cx="6105460" cy="3743002"/>
           </a:xfrm>
           <a:prstGeom prst="rect">

</xml_diff>

<commit_message>
Added some gifs to the powerpoint
</commit_message>
<xml_diff>
--- a/GopherLife.pptx
+++ b/GopherLife.pptx
@@ -5,7 +5,7 @@
     <p:sldMasterId id="2147483678" r:id="rId1"/>
   </p:sldMasterIdLst>
   <p:notesMasterIdLst>
-    <p:notesMasterId r:id="rId55"/>
+    <p:notesMasterId r:id="rId56"/>
   </p:notesMasterIdLst>
   <p:sldIdLst>
     <p:sldId id="256" r:id="rId2"/>
@@ -32,35 +32,36 @@
     <p:sldId id="331" r:id="rId23"/>
     <p:sldId id="332" r:id="rId24"/>
     <p:sldId id="333" r:id="rId25"/>
-    <p:sldId id="334" r:id="rId26"/>
-    <p:sldId id="288" r:id="rId27"/>
-    <p:sldId id="337" r:id="rId28"/>
-    <p:sldId id="338" r:id="rId29"/>
-    <p:sldId id="289" r:id="rId30"/>
-    <p:sldId id="308" r:id="rId31"/>
-    <p:sldId id="303" r:id="rId32"/>
-    <p:sldId id="313" r:id="rId33"/>
-    <p:sldId id="309" r:id="rId34"/>
-    <p:sldId id="314" r:id="rId35"/>
-    <p:sldId id="311" r:id="rId36"/>
-    <p:sldId id="315" r:id="rId37"/>
-    <p:sldId id="316" r:id="rId38"/>
-    <p:sldId id="317" r:id="rId39"/>
-    <p:sldId id="318" r:id="rId40"/>
-    <p:sldId id="320" r:id="rId41"/>
-    <p:sldId id="321" r:id="rId42"/>
-    <p:sldId id="323" r:id="rId43"/>
-    <p:sldId id="322" r:id="rId44"/>
-    <p:sldId id="319" r:id="rId45"/>
-    <p:sldId id="324" r:id="rId46"/>
-    <p:sldId id="287" r:id="rId47"/>
-    <p:sldId id="286" r:id="rId48"/>
-    <p:sldId id="327" r:id="rId49"/>
-    <p:sldId id="325" r:id="rId50"/>
-    <p:sldId id="264" r:id="rId51"/>
-    <p:sldId id="301" r:id="rId52"/>
-    <p:sldId id="305" r:id="rId53"/>
-    <p:sldId id="306" r:id="rId54"/>
+    <p:sldId id="342" r:id="rId26"/>
+    <p:sldId id="334" r:id="rId27"/>
+    <p:sldId id="343" r:id="rId28"/>
+    <p:sldId id="288" r:id="rId29"/>
+    <p:sldId id="338" r:id="rId30"/>
+    <p:sldId id="289" r:id="rId31"/>
+    <p:sldId id="308" r:id="rId32"/>
+    <p:sldId id="303" r:id="rId33"/>
+    <p:sldId id="313" r:id="rId34"/>
+    <p:sldId id="309" r:id="rId35"/>
+    <p:sldId id="314" r:id="rId36"/>
+    <p:sldId id="311" r:id="rId37"/>
+    <p:sldId id="315" r:id="rId38"/>
+    <p:sldId id="316" r:id="rId39"/>
+    <p:sldId id="317" r:id="rId40"/>
+    <p:sldId id="318" r:id="rId41"/>
+    <p:sldId id="320" r:id="rId42"/>
+    <p:sldId id="321" r:id="rId43"/>
+    <p:sldId id="323" r:id="rId44"/>
+    <p:sldId id="322" r:id="rId45"/>
+    <p:sldId id="319" r:id="rId46"/>
+    <p:sldId id="324" r:id="rId47"/>
+    <p:sldId id="287" r:id="rId48"/>
+    <p:sldId id="286" r:id="rId49"/>
+    <p:sldId id="327" r:id="rId50"/>
+    <p:sldId id="325" r:id="rId51"/>
+    <p:sldId id="264" r:id="rId52"/>
+    <p:sldId id="301" r:id="rId53"/>
+    <p:sldId id="305" r:id="rId54"/>
+    <p:sldId id="306" r:id="rId55"/>
   </p:sldIdLst>
   <p:sldSz cx="12192000" cy="6858000"/>
   <p:notesSz cx="6858000" cy="9144000"/>
@@ -582,7 +583,7 @@
           <a:p>
             <a:fld id="{D37E09BB-0EE2-4AA1-9043-B532D0F5CCDE}" type="slidenum">
               <a:rPr lang="en-GB" smtClean="0"/>
-              <a:t>31</a:t>
+              <a:t>32</a:t>
             </a:fld>
             <a:endParaRPr lang="en-GB"/>
           </a:p>
@@ -8251,34 +8252,6 @@
       </p:grpSpPr>
       <p:sp>
         <p:nvSpPr>
-          <p:cNvPr id="2" name="Title 1">
-            <a:extLst>
-              <a:ext uri="{FF2B5EF4-FFF2-40B4-BE49-F238E27FC236}">
-                <a16:creationId xmlns:a16="http://schemas.microsoft.com/office/drawing/2014/main" id="{C4FA78B2-BB2F-4238-BA67-BC45713BF05D}"/>
-              </a:ext>
-            </a:extLst>
-          </p:cNvPr>
-          <p:cNvSpPr>
-            <a:spLocks noGrp="1"/>
-          </p:cNvSpPr>
-          <p:nvPr>
-            <p:ph type="title"/>
-          </p:nvPr>
-        </p:nvSpPr>
-        <p:spPr/>
-        <p:txBody>
-          <a:bodyPr/>
-          <a:lstStyle/>
-          <a:p>
-            <a:r>
-              <a:rPr lang="en-GB" dirty="0"/>
-              <a:t>Part 3 - Continued</a:t>
-            </a:r>
-          </a:p>
-        </p:txBody>
-      </p:sp>
-      <p:sp>
-        <p:nvSpPr>
           <p:cNvPr id="3" name="Content Placeholder 2">
             <a:extLst>
               <a:ext uri="{FF2B5EF4-FFF2-40B4-BE49-F238E27FC236}">
@@ -8295,7 +8268,7 @@
         </p:nvSpPr>
         <p:spPr>
           <a:xfrm>
-            <a:off x="1622729" y="1604597"/>
+            <a:off x="1622729" y="709266"/>
             <a:ext cx="8946541" cy="4195481"/>
           </a:xfrm>
         </p:spPr>
@@ -8305,15 +8278,7 @@
           <a:p>
             <a:r>
               <a:rPr lang="en-GB" dirty="0"/>
-              <a:t>The world is represented using ye </a:t>
-            </a:r>
-            <a:r>
-              <a:rPr lang="en-GB" dirty="0" err="1"/>
-              <a:t>olde</a:t>
-            </a:r>
-            <a:r>
-              <a:rPr lang="en-GB" dirty="0"/>
-              <a:t> 2D map idea. </a:t>
+              <a:t>The world is now represented as a 2D map</a:t>
             </a:r>
           </a:p>
           <a:p>
@@ -8329,10 +8294,10 @@
       </p:sp>
       <p:pic>
         <p:nvPicPr>
-          <p:cNvPr id="4" name="Picture 3">
+          <p:cNvPr id="6" name="Picture 5">
             <a:extLst>
               <a:ext uri="{FF2B5EF4-FFF2-40B4-BE49-F238E27FC236}">
-                <a16:creationId xmlns:a16="http://schemas.microsoft.com/office/drawing/2014/main" id="{DAB6C06B-8E3F-4383-A18F-2E9F0D59B17D}"/>
+                <a16:creationId xmlns:a16="http://schemas.microsoft.com/office/drawing/2014/main" id="{43282969-2E50-4641-8343-DBAF3F6C62A1}"/>
               </a:ext>
             </a:extLst>
           </p:cNvPr>
@@ -8349,8 +8314,38 @@
         </p:blipFill>
         <p:spPr>
           <a:xfrm>
-            <a:off x="6395645" y="3702337"/>
-            <a:ext cx="3496163" cy="1724266"/>
+            <a:off x="6501204" y="3762313"/>
+            <a:ext cx="1781424" cy="819264"/>
+          </a:xfrm>
+          <a:prstGeom prst="rect">
+            <a:avLst/>
+          </a:prstGeom>
+        </p:spPr>
+      </p:pic>
+      <p:pic>
+        <p:nvPicPr>
+          <p:cNvPr id="8" name="Picture 7">
+            <a:extLst>
+              <a:ext uri="{FF2B5EF4-FFF2-40B4-BE49-F238E27FC236}">
+                <a16:creationId xmlns:a16="http://schemas.microsoft.com/office/drawing/2014/main" id="{5B92B482-910E-4B1A-B664-A07ACC828E72}"/>
+              </a:ext>
+            </a:extLst>
+          </p:cNvPr>
+          <p:cNvPicPr>
+            <a:picLocks noChangeAspect="1"/>
+          </p:cNvPicPr>
+          <p:nvPr/>
+        </p:nvPicPr>
+        <p:blipFill>
+          <a:blip r:embed="rId3"/>
+          <a:stretch>
+            <a:fillRect/>
+          </a:stretch>
+        </p:blipFill>
+        <p:spPr>
+          <a:xfrm>
+            <a:off x="2770251" y="2485297"/>
+            <a:ext cx="2920547" cy="4192561"/>
           </a:xfrm>
           <a:prstGeom prst="rect">
             <a:avLst/>
@@ -8914,7 +8909,7 @@
           <p:cNvPr id="2" name="Title 1">
             <a:extLst>
               <a:ext uri="{FF2B5EF4-FFF2-40B4-BE49-F238E27FC236}">
-                <a16:creationId xmlns:a16="http://schemas.microsoft.com/office/drawing/2014/main" id="{A3AF9153-8197-46E9-927C-5BA3DB22894B}"/>
+                <a16:creationId xmlns:a16="http://schemas.microsoft.com/office/drawing/2014/main" id="{F7845130-86DF-473D-8EE9-5D5B066B769B}"/>
               </a:ext>
             </a:extLst>
           </p:cNvPr>
@@ -8925,97 +8920,360 @@
             <p:ph type="title"/>
           </p:nvPr>
         </p:nvSpPr>
-        <p:spPr>
-          <a:xfrm>
-            <a:off x="646111" y="452718"/>
-            <a:ext cx="10849203" cy="1400530"/>
-          </a:xfrm>
-        </p:spPr>
+        <p:spPr/>
         <p:txBody>
           <a:bodyPr/>
           <a:lstStyle/>
           <a:p>
             <a:r>
+              <a:rPr lang="en-GB" dirty="0" err="1"/>
+              <a:t>Gopherlife</a:t>
+            </a:r>
+            <a:r>
               <a:rPr lang="en-GB" dirty="0"/>
-              <a:t>Part 3 - 	Talk about adding in population increases and the redesign</a:t>
-            </a:r>
-          </a:p>
-        </p:txBody>
-      </p:sp>
-      <p:sp>
-        <p:nvSpPr>
-          <p:cNvPr id="3" name="Content Placeholder 2">
+              <a:t> (Alpha)</a:t>
+            </a:r>
+          </a:p>
+        </p:txBody>
+      </p:sp>
+      <p:pic>
+        <p:nvPicPr>
+          <p:cNvPr id="5" name="Content Placeholder 4">
             <a:extLst>
               <a:ext uri="{FF2B5EF4-FFF2-40B4-BE49-F238E27FC236}">
-                <a16:creationId xmlns:a16="http://schemas.microsoft.com/office/drawing/2014/main" id="{141E7F95-1A50-45F4-9E3B-879687836CF3}"/>
-              </a:ext>
-            </a:extLst>
-          </p:cNvPr>
-          <p:cNvSpPr>
-            <a:spLocks noGrp="1"/>
-          </p:cNvSpPr>
-          <p:nvPr>
-            <p:ph idx="1"/>
-          </p:nvPr>
-        </p:nvSpPr>
-        <p:spPr/>
-        <p:txBody>
-          <a:bodyPr/>
-          <a:lstStyle/>
-          <a:p>
-            <a:r>
-              <a:rPr lang="en-GB" dirty="0"/>
-              <a:t>Added reproduction </a:t>
-            </a:r>
-          </a:p>
-          <a:p>
-            <a:endParaRPr lang="en-GB" dirty="0"/>
-          </a:p>
-          <a:p>
-            <a:r>
-              <a:rPr lang="en-GB" dirty="0"/>
-              <a:t>Changed the design of the render (Shown Below)</a:t>
-            </a:r>
-          </a:p>
-          <a:p>
-            <a:endParaRPr lang="en-GB" dirty="0"/>
-          </a:p>
-        </p:txBody>
-      </p:sp>
-      <p:pic>
-        <p:nvPicPr>
-          <p:cNvPr id="4" name="Picture 3">
-            <a:extLst>
-              <a:ext uri="{FF2B5EF4-FFF2-40B4-BE49-F238E27FC236}">
-                <a16:creationId xmlns:a16="http://schemas.microsoft.com/office/drawing/2014/main" id="{2E189E3D-B0D1-4F88-8899-04E670FA75E8}"/>
+                <a16:creationId xmlns:a16="http://schemas.microsoft.com/office/drawing/2014/main" id="{6FB4E8A9-E8F6-4901-992E-B81482D05939}"/>
               </a:ext>
             </a:extLst>
           </p:cNvPr>
           <p:cNvPicPr>
-            <a:picLocks noChangeAspect="1"/>
+            <a:picLocks noGrp="1" noChangeAspect="1"/>
           </p:cNvPicPr>
-          <p:nvPr/>
+          <p:nvPr>
+            <p:ph idx="1"/>
+          </p:nvPr>
         </p:nvPicPr>
         <p:blipFill>
-          <a:blip r:embed="rId2"/>
+          <a:blip r:embed="rId2">
+            <a:extLst>
+              <a:ext uri="{28A0092B-C50C-407E-A947-70E740481C1C}">
+                <a14:useLocalDpi xmlns:a14="http://schemas.microsoft.com/office/drawing/2010/main" val="0"/>
+              </a:ext>
+            </a:extLst>
+          </a:blip>
           <a:stretch>
             <a:fillRect/>
           </a:stretch>
         </p:blipFill>
         <p:spPr>
           <a:xfrm>
-            <a:off x="5576582" y="3252076"/>
-            <a:ext cx="5881863" cy="3605924"/>
+            <a:off x="1533588" y="2052638"/>
+            <a:ext cx="8086599" cy="4195762"/>
+          </a:xfrm>
+        </p:spPr>
+      </p:pic>
+      <p:sp>
+        <p:nvSpPr>
+          <p:cNvPr id="6" name="Content Placeholder 2">
+            <a:extLst>
+              <a:ext uri="{FF2B5EF4-FFF2-40B4-BE49-F238E27FC236}">
+                <a16:creationId xmlns:a16="http://schemas.microsoft.com/office/drawing/2014/main" id="{BE2DE85D-B172-465F-AFBF-2AC01847FCEC}"/>
+              </a:ext>
+            </a:extLst>
+          </p:cNvPr>
+          <p:cNvSpPr txBox="1">
+            <a:spLocks/>
+          </p:cNvSpPr>
+          <p:nvPr/>
+        </p:nvSpPr>
+        <p:spPr>
+          <a:xfrm>
+            <a:off x="147297" y="1395352"/>
+            <a:ext cx="10402349" cy="457896"/>
           </a:xfrm>
           <a:prstGeom prst="rect">
             <a:avLst/>
           </a:prstGeom>
         </p:spPr>
-      </p:pic>
+        <p:txBody>
+          <a:bodyPr vert="horz" lIns="91440" tIns="45720" rIns="91440" bIns="45720" rtlCol="0">
+            <a:normAutofit fontScale="85000" lnSpcReduction="20000"/>
+          </a:bodyPr>
+          <a:lstStyle>
+            <a:lvl1pPr marL="342900" indent="-342900" algn="l" defTabSz="457200" rtl="0" eaLnBrk="1" latinLnBrk="0" hangingPunct="1">
+              <a:spcBef>
+                <a:spcPts val="1000"/>
+              </a:spcBef>
+              <a:spcAft>
+                <a:spcPts val="0"/>
+              </a:spcAft>
+              <a:buClr>
+                <a:schemeClr val="bg2">
+                  <a:lumMod val="40000"/>
+                  <a:lumOff val="60000"/>
+                </a:schemeClr>
+              </a:buClr>
+              <a:buSzPct val="80000"/>
+              <a:buFont typeface="Wingdings 3" charset="2"/>
+              <a:buChar char=""/>
+              <a:defRPr sz="2000" b="0" i="0" kern="1200">
+                <a:solidFill>
+                  <a:schemeClr val="tx1"/>
+                </a:solidFill>
+                <a:latin typeface="+mj-lt"/>
+                <a:ea typeface="+mj-ea"/>
+                <a:cs typeface="+mj-cs"/>
+              </a:defRPr>
+            </a:lvl1pPr>
+            <a:lvl2pPr marL="742950" indent="-285750" algn="l" defTabSz="457200" rtl="0" eaLnBrk="1" latinLnBrk="0" hangingPunct="1">
+              <a:spcBef>
+                <a:spcPts val="1000"/>
+              </a:spcBef>
+              <a:spcAft>
+                <a:spcPts val="0"/>
+              </a:spcAft>
+              <a:buClr>
+                <a:schemeClr val="bg2">
+                  <a:lumMod val="40000"/>
+                  <a:lumOff val="60000"/>
+                </a:schemeClr>
+              </a:buClr>
+              <a:buSzPct val="80000"/>
+              <a:buFont typeface="Wingdings 3" charset="2"/>
+              <a:buChar char=""/>
+              <a:defRPr sz="1800" b="0" i="0" kern="1200">
+                <a:solidFill>
+                  <a:schemeClr val="tx1"/>
+                </a:solidFill>
+                <a:latin typeface="+mj-lt"/>
+                <a:ea typeface="+mj-ea"/>
+                <a:cs typeface="+mj-cs"/>
+              </a:defRPr>
+            </a:lvl2pPr>
+            <a:lvl3pPr marL="1143000" indent="-228600" algn="l" defTabSz="457200" rtl="0" eaLnBrk="1" latinLnBrk="0" hangingPunct="1">
+              <a:spcBef>
+                <a:spcPts val="1000"/>
+              </a:spcBef>
+              <a:spcAft>
+                <a:spcPts val="0"/>
+              </a:spcAft>
+              <a:buClr>
+                <a:schemeClr val="bg2">
+                  <a:lumMod val="40000"/>
+                  <a:lumOff val="60000"/>
+                </a:schemeClr>
+              </a:buClr>
+              <a:buSzPct val="80000"/>
+              <a:buFont typeface="Wingdings 3" charset="2"/>
+              <a:buChar char=""/>
+              <a:defRPr sz="1600" b="0" i="0" kern="1200">
+                <a:solidFill>
+                  <a:schemeClr val="tx1"/>
+                </a:solidFill>
+                <a:latin typeface="+mj-lt"/>
+                <a:ea typeface="+mj-ea"/>
+                <a:cs typeface="+mj-cs"/>
+              </a:defRPr>
+            </a:lvl3pPr>
+            <a:lvl4pPr marL="1600200" indent="-228600" algn="l" defTabSz="457200" rtl="0" eaLnBrk="1" latinLnBrk="0" hangingPunct="1">
+              <a:spcBef>
+                <a:spcPts val="1000"/>
+              </a:spcBef>
+              <a:spcAft>
+                <a:spcPts val="0"/>
+              </a:spcAft>
+              <a:buClr>
+                <a:schemeClr val="bg2">
+                  <a:lumMod val="40000"/>
+                  <a:lumOff val="60000"/>
+                </a:schemeClr>
+              </a:buClr>
+              <a:buSzPct val="80000"/>
+              <a:buFont typeface="Wingdings 3" charset="2"/>
+              <a:buChar char=""/>
+              <a:defRPr sz="1400" b="0" i="0" kern="1200">
+                <a:solidFill>
+                  <a:schemeClr val="tx1"/>
+                </a:solidFill>
+                <a:latin typeface="+mj-lt"/>
+                <a:ea typeface="+mj-ea"/>
+                <a:cs typeface="+mj-cs"/>
+              </a:defRPr>
+            </a:lvl4pPr>
+            <a:lvl5pPr marL="2057400" indent="-228600" algn="l" defTabSz="457200" rtl="0" eaLnBrk="1" latinLnBrk="0" hangingPunct="1">
+              <a:spcBef>
+                <a:spcPts val="1000"/>
+              </a:spcBef>
+              <a:spcAft>
+                <a:spcPts val="0"/>
+              </a:spcAft>
+              <a:buClr>
+                <a:schemeClr val="bg2">
+                  <a:lumMod val="40000"/>
+                  <a:lumOff val="60000"/>
+                </a:schemeClr>
+              </a:buClr>
+              <a:buSzPct val="80000"/>
+              <a:buFont typeface="Wingdings 3" charset="2"/>
+              <a:buChar char=""/>
+              <a:defRPr sz="1400" b="0" i="0" kern="1200">
+                <a:solidFill>
+                  <a:schemeClr val="tx1"/>
+                </a:solidFill>
+                <a:latin typeface="+mj-lt"/>
+                <a:ea typeface="+mj-ea"/>
+                <a:cs typeface="+mj-cs"/>
+              </a:defRPr>
+            </a:lvl5pPr>
+            <a:lvl6pPr marL="2506000" indent="-228600" algn="l" defTabSz="457200" rtl="0" eaLnBrk="1" latinLnBrk="0" hangingPunct="1">
+              <a:spcBef>
+                <a:spcPts val="1000"/>
+              </a:spcBef>
+              <a:spcAft>
+                <a:spcPts val="0"/>
+              </a:spcAft>
+              <a:buClr>
+                <a:schemeClr val="bg2">
+                  <a:lumMod val="40000"/>
+                  <a:lumOff val="60000"/>
+                </a:schemeClr>
+              </a:buClr>
+              <a:buSzPct val="80000"/>
+              <a:buFont typeface="Wingdings 3" charset="2"/>
+              <a:buChar char=""/>
+              <a:defRPr sz="1400" b="0" i="0" kern="1200">
+                <a:solidFill>
+                  <a:schemeClr val="tx1"/>
+                </a:solidFill>
+                <a:latin typeface="+mj-lt"/>
+                <a:ea typeface="+mj-ea"/>
+                <a:cs typeface="+mj-cs"/>
+              </a:defRPr>
+            </a:lvl6pPr>
+            <a:lvl7pPr marL="2971800" indent="-228600" algn="l" defTabSz="457200" rtl="0" eaLnBrk="1" latinLnBrk="0" hangingPunct="1">
+              <a:spcBef>
+                <a:spcPts val="1000"/>
+              </a:spcBef>
+              <a:spcAft>
+                <a:spcPts val="0"/>
+              </a:spcAft>
+              <a:buClr>
+                <a:schemeClr val="bg2">
+                  <a:lumMod val="40000"/>
+                  <a:lumOff val="60000"/>
+                </a:schemeClr>
+              </a:buClr>
+              <a:buSzPct val="80000"/>
+              <a:buFont typeface="Wingdings 3" charset="2"/>
+              <a:buChar char=""/>
+              <a:defRPr sz="1400" b="0" i="0" kern="1200">
+                <a:solidFill>
+                  <a:schemeClr val="tx1"/>
+                </a:solidFill>
+                <a:latin typeface="+mj-lt"/>
+                <a:ea typeface="+mj-ea"/>
+                <a:cs typeface="+mj-cs"/>
+              </a:defRPr>
+            </a:lvl7pPr>
+            <a:lvl8pPr marL="3429000" indent="-228600" algn="l" defTabSz="457200" rtl="0" eaLnBrk="1" latinLnBrk="0" hangingPunct="1">
+              <a:spcBef>
+                <a:spcPts val="1000"/>
+              </a:spcBef>
+              <a:spcAft>
+                <a:spcPts val="0"/>
+              </a:spcAft>
+              <a:buClr>
+                <a:schemeClr val="bg2">
+                  <a:lumMod val="40000"/>
+                  <a:lumOff val="60000"/>
+                </a:schemeClr>
+              </a:buClr>
+              <a:buSzPct val="80000"/>
+              <a:buFont typeface="Wingdings 3" charset="2"/>
+              <a:buChar char=""/>
+              <a:defRPr sz="1400" b="0" i="0" kern="1200">
+                <a:solidFill>
+                  <a:schemeClr val="tx1"/>
+                </a:solidFill>
+                <a:latin typeface="+mj-lt"/>
+                <a:ea typeface="+mj-ea"/>
+                <a:cs typeface="+mj-cs"/>
+              </a:defRPr>
+            </a:lvl8pPr>
+            <a:lvl9pPr marL="3886200" indent="-228600" algn="l" defTabSz="457200" rtl="0" eaLnBrk="1" latinLnBrk="0" hangingPunct="1">
+              <a:spcBef>
+                <a:spcPts val="1000"/>
+              </a:spcBef>
+              <a:spcAft>
+                <a:spcPts val="0"/>
+              </a:spcAft>
+              <a:buClr>
+                <a:schemeClr val="bg2">
+                  <a:lumMod val="40000"/>
+                  <a:lumOff val="60000"/>
+                </a:schemeClr>
+              </a:buClr>
+              <a:buSzPct val="80000"/>
+              <a:buFont typeface="Wingdings 3" charset="2"/>
+              <a:buChar char=""/>
+              <a:defRPr sz="1400" b="0" i="0" kern="1200">
+                <a:solidFill>
+                  <a:schemeClr val="tx1"/>
+                </a:solidFill>
+                <a:latin typeface="+mj-lt"/>
+                <a:ea typeface="+mj-ea"/>
+                <a:cs typeface="+mj-cs"/>
+              </a:defRPr>
+            </a:lvl9pPr>
+          </a:lstStyle>
+          <a:p>
+            <a:pPr marL="0" indent="0" algn="ctr">
+              <a:buNone/>
+            </a:pPr>
+            <a:r>
+              <a:rPr lang="en-GB" sz="3400" dirty="0"/>
+              <a:t>Key: (</a:t>
+            </a:r>
+            <a:r>
+              <a:rPr lang="en-GB" sz="3400" dirty="0">
+                <a:solidFill>
+                  <a:schemeClr val="accent1">
+                    <a:lumMod val="60000"/>
+                    <a:lumOff val="40000"/>
+                  </a:schemeClr>
+                </a:solidFill>
+              </a:rPr>
+              <a:t>!</a:t>
+            </a:r>
+            <a:r>
+              <a:rPr lang="en-GB" sz="3400" dirty="0"/>
+              <a:t> = Carrot) 	(G = Gopher)	 (</a:t>
+            </a:r>
+            <a:r>
+              <a:rPr lang="en-GB" sz="3400" dirty="0">
+                <a:solidFill>
+                  <a:srgbClr val="00B050"/>
+                </a:solidFill>
+              </a:rPr>
+              <a:t>/</a:t>
+            </a:r>
+            <a:r>
+              <a:rPr lang="en-GB" sz="3400" dirty="0"/>
+              <a:t> = Grass)</a:t>
+            </a:r>
+          </a:p>
+          <a:p>
+            <a:pPr algn="ctr"/>
+            <a:endParaRPr lang="en-GB" dirty="0"/>
+          </a:p>
+          <a:p>
+            <a:endParaRPr lang="en-GB" dirty="0"/>
+          </a:p>
+        </p:txBody>
+      </p:sp>
     </p:spTree>
     <p:extLst>
       <p:ext uri="{BB962C8B-B14F-4D97-AF65-F5344CB8AC3E}">
-        <p14:creationId xmlns:p14="http://schemas.microsoft.com/office/powerpoint/2010/main" val="3767185925"/>
+        <p14:creationId xmlns:p14="http://schemas.microsoft.com/office/powerpoint/2010/main" val="3871026121"/>
       </p:ext>
     </p:extLst>
   </p:cSld>
@@ -9047,7 +9305,7 @@
           <p:cNvPr id="2" name="Title 1">
             <a:extLst>
               <a:ext uri="{FF2B5EF4-FFF2-40B4-BE49-F238E27FC236}">
-                <a16:creationId xmlns:a16="http://schemas.microsoft.com/office/drawing/2014/main" id="{AA01FFF3-EC99-4485-B32E-E2E568D47B5F}"/>
+                <a16:creationId xmlns:a16="http://schemas.microsoft.com/office/drawing/2014/main" id="{A3AF9153-8197-46E9-927C-5BA3DB22894B}"/>
               </a:ext>
             </a:extLst>
           </p:cNvPr>
@@ -9058,172 +9316,67 @@
             <p:ph type="title"/>
           </p:nvPr>
         </p:nvSpPr>
-        <p:spPr/>
+        <p:spPr>
+          <a:xfrm>
+            <a:off x="646111" y="452718"/>
+            <a:ext cx="10849203" cy="1400530"/>
+          </a:xfrm>
+        </p:spPr>
         <p:txBody>
           <a:bodyPr/>
           <a:lstStyle/>
           <a:p>
             <a:r>
+              <a:rPr lang="en-GB" dirty="0" err="1"/>
+              <a:t>Gopherlife</a:t>
+            </a:r>
+            <a:r>
               <a:rPr lang="en-GB" dirty="0"/>
-              <a:t>Progress Checklist 3 </a:t>
-            </a:r>
-          </a:p>
-        </p:txBody>
-      </p:sp>
-      <p:sp>
-        <p:nvSpPr>
-          <p:cNvPr id="3" name="Content Placeholder 2">
+              <a:t> (Beta)</a:t>
+            </a:r>
+          </a:p>
+        </p:txBody>
+      </p:sp>
+      <p:pic>
+        <p:nvPicPr>
+          <p:cNvPr id="8" name="Picture 7">
             <a:extLst>
               <a:ext uri="{FF2B5EF4-FFF2-40B4-BE49-F238E27FC236}">
-                <a16:creationId xmlns:a16="http://schemas.microsoft.com/office/drawing/2014/main" id="{A2755EB5-1D4C-4DDE-A6D0-AFBE7C6CD484}"/>
+                <a16:creationId xmlns:a16="http://schemas.microsoft.com/office/drawing/2014/main" id="{CB2E686C-2C56-4447-8856-23EDA1F67526}"/>
               </a:ext>
             </a:extLst>
           </p:cNvPr>
-          <p:cNvSpPr>
-            <a:spLocks noGrp="1"/>
-          </p:cNvSpPr>
-          <p:nvPr>
-            <p:ph idx="1"/>
-          </p:nvPr>
-        </p:nvSpPr>
+          <p:cNvPicPr>
+            <a:picLocks noChangeAspect="1"/>
+          </p:cNvPicPr>
+          <p:nvPr/>
+        </p:nvPicPr>
+        <p:blipFill>
+          <a:blip r:embed="rId2">
+            <a:extLst>
+              <a:ext uri="{28A0092B-C50C-407E-A947-70E740481C1C}">
+                <a14:useLocalDpi xmlns:a14="http://schemas.microsoft.com/office/drawing/2010/main" val="0"/>
+              </a:ext>
+            </a:extLst>
+          </a:blip>
+          <a:stretch>
+            <a:fillRect/>
+          </a:stretch>
+        </p:blipFill>
         <p:spPr>
           <a:xfrm>
-            <a:off x="1103312" y="2052918"/>
-            <a:ext cx="9299472" cy="4195481"/>
+            <a:off x="1020064" y="1434518"/>
+            <a:ext cx="9957410" cy="5096312"/>
           </a:xfrm>
+          <a:prstGeom prst="rect">
+            <a:avLst/>
+          </a:prstGeom>
         </p:spPr>
-        <p:txBody>
-          <a:bodyPr>
-            <a:normAutofit fontScale="92500" lnSpcReduction="20000"/>
-          </a:bodyPr>
-          <a:lstStyle/>
-          <a:p>
-            <a:r>
-              <a:rPr lang="en-GB" dirty="0"/>
-              <a:t>Project Structure and avoiding Circular Dependencies </a:t>
-            </a:r>
-            <a:r>
-              <a:rPr lang="en-GB" dirty="0">
-                <a:latin typeface="Segoe MDL2 Assets" panose="050A0102010101010101" pitchFamily="18" charset="0"/>
-              </a:rPr>
-              <a:t></a:t>
-            </a:r>
-          </a:p>
-          <a:p>
-            <a:pPr marL="0" indent="0">
-              <a:buNone/>
-            </a:pPr>
-            <a:endParaRPr lang="en-GB" dirty="0"/>
-          </a:p>
-          <a:p>
-            <a:r>
-              <a:rPr lang="en-GB" dirty="0"/>
-              <a:t>Implementing Basic Pathing Using Coordinates </a:t>
-            </a:r>
-            <a:r>
-              <a:rPr lang="en-GB" dirty="0">
-                <a:latin typeface="Segoe MDL2 Assets" panose="050A0102010101010101" pitchFamily="18" charset="0"/>
-              </a:rPr>
-              <a:t></a:t>
-            </a:r>
-          </a:p>
-          <a:p>
-            <a:endParaRPr lang="en-GB" dirty="0">
-              <a:latin typeface="Segoe MDL2 Assets" panose="050A0102010101010101" pitchFamily="18" charset="0"/>
-            </a:endParaRPr>
-          </a:p>
-          <a:p>
-            <a:r>
-              <a:rPr lang="en-GB" dirty="0"/>
-              <a:t>Improve understanding of how different structures interact concurrently </a:t>
-            </a:r>
-            <a:r>
-              <a:rPr lang="en-GB" dirty="0">
-                <a:latin typeface="Segoe MDL2 Assets" panose="050A0102010101010101" pitchFamily="18" charset="0"/>
-              </a:rPr>
-              <a:t></a:t>
-            </a:r>
-          </a:p>
-          <a:p>
-            <a:endParaRPr lang="en-GB" dirty="0">
-              <a:latin typeface="Segoe MDL2 Assets" panose="050A0102010101010101" pitchFamily="18" charset="0"/>
-            </a:endParaRPr>
-          </a:p>
-          <a:p>
-            <a:r>
-              <a:rPr lang="en-GB" dirty="0"/>
-              <a:t>Learnt how to use http/html packages for rendering a webpage </a:t>
-            </a:r>
-            <a:r>
-              <a:rPr lang="en-GB" dirty="0">
-                <a:latin typeface="Segoe MDL2 Assets" panose="050A0102010101010101" pitchFamily="18" charset="0"/>
-              </a:rPr>
-              <a:t></a:t>
-            </a:r>
-          </a:p>
-          <a:p>
-            <a:endParaRPr lang="en-GB" dirty="0"/>
-          </a:p>
-          <a:p>
-            <a:r>
-              <a:rPr lang="en-GB" dirty="0"/>
-              <a:t>Learnt how to use http function handlers </a:t>
-            </a:r>
-            <a:r>
-              <a:rPr lang="en-GB" dirty="0">
-                <a:latin typeface="Segoe MDL2 Assets" panose="050A0102010101010101" pitchFamily="18" charset="0"/>
-              </a:rPr>
-              <a:t></a:t>
-            </a:r>
-          </a:p>
-          <a:p>
-            <a:endParaRPr lang="en-GB" dirty="0"/>
-          </a:p>
-          <a:p>
-            <a:r>
-              <a:rPr lang="en-GB" dirty="0"/>
-              <a:t>Learnt a bit about </a:t>
-            </a:r>
-            <a:r>
-              <a:rPr lang="en-GB" dirty="0" err="1"/>
-              <a:t>css</a:t>
-            </a:r>
-            <a:r>
-              <a:rPr lang="en-GB" dirty="0"/>
-              <a:t> grid (Not go-related) </a:t>
-            </a:r>
-            <a:r>
-              <a:rPr lang="en-GB" dirty="0">
-                <a:latin typeface="Segoe MDL2 Assets" panose="050A0102010101010101" pitchFamily="18" charset="0"/>
-              </a:rPr>
-              <a:t> </a:t>
-            </a:r>
-            <a:endParaRPr lang="en-GB" dirty="0"/>
-          </a:p>
-          <a:p>
-            <a:endParaRPr lang="en-GB" dirty="0">
-              <a:latin typeface="Segoe MDL2 Assets" panose="050A0102010101010101" pitchFamily="18" charset="0"/>
-            </a:endParaRPr>
-          </a:p>
-          <a:p>
-            <a:endParaRPr lang="en-GB" dirty="0">
-              <a:latin typeface="Segoe MDL2 Assets" panose="050A0102010101010101" pitchFamily="18" charset="0"/>
-            </a:endParaRPr>
-          </a:p>
-          <a:p>
-            <a:endParaRPr lang="en-GB" dirty="0">
-              <a:latin typeface="Segoe MDL2 Assets" panose="050A0102010101010101" pitchFamily="18" charset="0"/>
-            </a:endParaRPr>
-          </a:p>
-          <a:p>
-            <a:endParaRPr lang="en-GB" dirty="0"/>
-          </a:p>
-        </p:txBody>
-      </p:sp>
+      </p:pic>
     </p:spTree>
     <p:extLst>
       <p:ext uri="{BB962C8B-B14F-4D97-AF65-F5344CB8AC3E}">
-        <p14:creationId xmlns:p14="http://schemas.microsoft.com/office/powerpoint/2010/main" val="3768594580"/>
+        <p14:creationId xmlns:p14="http://schemas.microsoft.com/office/powerpoint/2010/main" val="3767185925"/>
       </p:ext>
     </p:extLst>
   </p:cSld>
@@ -9250,10 +9403,73 @@
           <a:chExt cx="0" cy="0"/>
         </a:xfrm>
       </p:grpSpPr>
+      <p:sp>
+        <p:nvSpPr>
+          <p:cNvPr id="2" name="Title 1">
+            <a:extLst>
+              <a:ext uri="{FF2B5EF4-FFF2-40B4-BE49-F238E27FC236}">
+                <a16:creationId xmlns:a16="http://schemas.microsoft.com/office/drawing/2014/main" id="{471FCA3A-DF50-48BC-8D98-498D535FA1F1}"/>
+              </a:ext>
+            </a:extLst>
+          </p:cNvPr>
+          <p:cNvSpPr>
+            <a:spLocks noGrp="1"/>
+          </p:cNvSpPr>
+          <p:nvPr>
+            <p:ph type="title"/>
+          </p:nvPr>
+        </p:nvSpPr>
+        <p:spPr/>
+        <p:txBody>
+          <a:bodyPr/>
+          <a:lstStyle/>
+          <a:p>
+            <a:r>
+              <a:rPr lang="en-GB" dirty="0"/>
+              <a:t>Performance wasn’t great…</a:t>
+            </a:r>
+          </a:p>
+        </p:txBody>
+      </p:sp>
+      <p:pic>
+        <p:nvPicPr>
+          <p:cNvPr id="5" name="Content Placeholder 4">
+            <a:extLst>
+              <a:ext uri="{FF2B5EF4-FFF2-40B4-BE49-F238E27FC236}">
+                <a16:creationId xmlns:a16="http://schemas.microsoft.com/office/drawing/2014/main" id="{F58BDB63-E1CD-468E-891C-A1AB66D0F9B8}"/>
+              </a:ext>
+            </a:extLst>
+          </p:cNvPr>
+          <p:cNvPicPr>
+            <a:picLocks noGrp="1" noChangeAspect="1"/>
+          </p:cNvPicPr>
+          <p:nvPr>
+            <p:ph idx="1"/>
+          </p:nvPr>
+        </p:nvPicPr>
+        <p:blipFill>
+          <a:blip r:embed="rId2">
+            <a:extLst>
+              <a:ext uri="{28A0092B-C50C-407E-A947-70E740481C1C}">
+                <a14:useLocalDpi xmlns:a14="http://schemas.microsoft.com/office/drawing/2010/main" val="0"/>
+              </a:ext>
+            </a:extLst>
+          </a:blip>
+          <a:stretch>
+            <a:fillRect/>
+          </a:stretch>
+        </p:blipFill>
+        <p:spPr>
+          <a:xfrm>
+            <a:off x="1527396" y="1431853"/>
+            <a:ext cx="9137208" cy="4740874"/>
+          </a:xfrm>
+        </p:spPr>
+      </p:pic>
     </p:spTree>
     <p:extLst>
       <p:ext uri="{BB962C8B-B14F-4D97-AF65-F5344CB8AC3E}">
-        <p14:creationId xmlns:p14="http://schemas.microsoft.com/office/powerpoint/2010/main" val="673563278"/>
+        <p14:creationId xmlns:p14="http://schemas.microsoft.com/office/powerpoint/2010/main" val="3411322569"/>
       </p:ext>
     </p:extLst>
   </p:cSld>
@@ -9264,6 +9480,214 @@
 </file>
 
 <file path=ppt/slides/slide28.xml><?xml version="1.0" encoding="utf-8"?>
+<p:sld xmlns:a="http://schemas.openxmlformats.org/drawingml/2006/main" xmlns:r="http://schemas.openxmlformats.org/officeDocument/2006/relationships" xmlns:p="http://schemas.openxmlformats.org/presentationml/2006/main">
+  <p:cSld>
+    <p:spTree>
+      <p:nvGrpSpPr>
+        <p:cNvPr id="1" name=""/>
+        <p:cNvGrpSpPr/>
+        <p:nvPr/>
+      </p:nvGrpSpPr>
+      <p:grpSpPr>
+        <a:xfrm>
+          <a:off x="0" y="0"/>
+          <a:ext cx="0" cy="0"/>
+          <a:chOff x="0" y="0"/>
+          <a:chExt cx="0" cy="0"/>
+        </a:xfrm>
+      </p:grpSpPr>
+      <p:sp>
+        <p:nvSpPr>
+          <p:cNvPr id="2" name="Title 1">
+            <a:extLst>
+              <a:ext uri="{FF2B5EF4-FFF2-40B4-BE49-F238E27FC236}">
+                <a16:creationId xmlns:a16="http://schemas.microsoft.com/office/drawing/2014/main" id="{AA01FFF3-EC99-4485-B32E-E2E568D47B5F}"/>
+              </a:ext>
+            </a:extLst>
+          </p:cNvPr>
+          <p:cNvSpPr>
+            <a:spLocks noGrp="1"/>
+          </p:cNvSpPr>
+          <p:nvPr>
+            <p:ph type="title"/>
+          </p:nvPr>
+        </p:nvSpPr>
+        <p:spPr/>
+        <p:txBody>
+          <a:bodyPr/>
+          <a:lstStyle/>
+          <a:p>
+            <a:r>
+              <a:rPr lang="en-GB" dirty="0"/>
+              <a:t>Progress Checklist 3 </a:t>
+            </a:r>
+          </a:p>
+        </p:txBody>
+      </p:sp>
+      <p:sp>
+        <p:nvSpPr>
+          <p:cNvPr id="3" name="Content Placeholder 2">
+            <a:extLst>
+              <a:ext uri="{FF2B5EF4-FFF2-40B4-BE49-F238E27FC236}">
+                <a16:creationId xmlns:a16="http://schemas.microsoft.com/office/drawing/2014/main" id="{A2755EB5-1D4C-4DDE-A6D0-AFBE7C6CD484}"/>
+              </a:ext>
+            </a:extLst>
+          </p:cNvPr>
+          <p:cNvSpPr>
+            <a:spLocks noGrp="1"/>
+          </p:cNvSpPr>
+          <p:nvPr>
+            <p:ph idx="1"/>
+          </p:nvPr>
+        </p:nvSpPr>
+        <p:spPr>
+          <a:xfrm>
+            <a:off x="1103312" y="2052918"/>
+            <a:ext cx="9299472" cy="4195481"/>
+          </a:xfrm>
+        </p:spPr>
+        <p:txBody>
+          <a:bodyPr>
+            <a:normAutofit fontScale="92500" lnSpcReduction="20000"/>
+          </a:bodyPr>
+          <a:lstStyle/>
+          <a:p>
+            <a:r>
+              <a:rPr lang="en-GB" dirty="0"/>
+              <a:t>Project Structure and avoiding Circular Dependencies </a:t>
+            </a:r>
+            <a:r>
+              <a:rPr lang="en-GB" dirty="0">
+                <a:latin typeface="Segoe MDL2 Assets" panose="050A0102010101010101" pitchFamily="18" charset="0"/>
+              </a:rPr>
+              <a:t></a:t>
+            </a:r>
+          </a:p>
+          <a:p>
+            <a:pPr marL="0" indent="0">
+              <a:buNone/>
+            </a:pPr>
+            <a:endParaRPr lang="en-GB" dirty="0"/>
+          </a:p>
+          <a:p>
+            <a:r>
+              <a:rPr lang="en-GB" dirty="0"/>
+              <a:t>Implementing Basic Pathing Using Coordinates </a:t>
+            </a:r>
+            <a:r>
+              <a:rPr lang="en-GB" dirty="0">
+                <a:latin typeface="Segoe MDL2 Assets" panose="050A0102010101010101" pitchFamily="18" charset="0"/>
+              </a:rPr>
+              <a:t></a:t>
+            </a:r>
+          </a:p>
+          <a:p>
+            <a:endParaRPr lang="en-GB" dirty="0">
+              <a:latin typeface="Segoe MDL2 Assets" panose="050A0102010101010101" pitchFamily="18" charset="0"/>
+            </a:endParaRPr>
+          </a:p>
+          <a:p>
+            <a:r>
+              <a:rPr lang="en-GB" dirty="0"/>
+              <a:t>Improve understanding of how different structures interact concurrently </a:t>
+            </a:r>
+            <a:r>
+              <a:rPr lang="en-GB" dirty="0">
+                <a:latin typeface="Segoe MDL2 Assets" panose="050A0102010101010101" pitchFamily="18" charset="0"/>
+              </a:rPr>
+              <a:t></a:t>
+            </a:r>
+          </a:p>
+          <a:p>
+            <a:endParaRPr lang="en-GB" dirty="0">
+              <a:latin typeface="Segoe MDL2 Assets" panose="050A0102010101010101" pitchFamily="18" charset="0"/>
+            </a:endParaRPr>
+          </a:p>
+          <a:p>
+            <a:r>
+              <a:rPr lang="en-GB" dirty="0"/>
+              <a:t>Learnt how to use http/html packages for rendering a webpage </a:t>
+            </a:r>
+            <a:r>
+              <a:rPr lang="en-GB" dirty="0">
+                <a:latin typeface="Segoe MDL2 Assets" panose="050A0102010101010101" pitchFamily="18" charset="0"/>
+              </a:rPr>
+              <a:t></a:t>
+            </a:r>
+          </a:p>
+          <a:p>
+            <a:endParaRPr lang="en-GB" dirty="0"/>
+          </a:p>
+          <a:p>
+            <a:r>
+              <a:rPr lang="en-GB" dirty="0"/>
+              <a:t>Learnt how to use http function handlers </a:t>
+            </a:r>
+            <a:r>
+              <a:rPr lang="en-GB" dirty="0">
+                <a:latin typeface="Segoe MDL2 Assets" panose="050A0102010101010101" pitchFamily="18" charset="0"/>
+              </a:rPr>
+              <a:t></a:t>
+            </a:r>
+          </a:p>
+          <a:p>
+            <a:endParaRPr lang="en-GB" dirty="0"/>
+          </a:p>
+          <a:p>
+            <a:r>
+              <a:rPr lang="en-GB" dirty="0"/>
+              <a:t>Learnt a bit about </a:t>
+            </a:r>
+            <a:r>
+              <a:rPr lang="en-GB" dirty="0" err="1"/>
+              <a:t>css</a:t>
+            </a:r>
+            <a:r>
+              <a:rPr lang="en-GB" dirty="0"/>
+              <a:t> grid (Not go-related) </a:t>
+            </a:r>
+            <a:r>
+              <a:rPr lang="en-GB" dirty="0">
+                <a:latin typeface="Segoe MDL2 Assets" panose="050A0102010101010101" pitchFamily="18" charset="0"/>
+              </a:rPr>
+              <a:t> </a:t>
+            </a:r>
+            <a:endParaRPr lang="en-GB" dirty="0"/>
+          </a:p>
+          <a:p>
+            <a:endParaRPr lang="en-GB" dirty="0">
+              <a:latin typeface="Segoe MDL2 Assets" panose="050A0102010101010101" pitchFamily="18" charset="0"/>
+            </a:endParaRPr>
+          </a:p>
+          <a:p>
+            <a:endParaRPr lang="en-GB" dirty="0">
+              <a:latin typeface="Segoe MDL2 Assets" panose="050A0102010101010101" pitchFamily="18" charset="0"/>
+            </a:endParaRPr>
+          </a:p>
+          <a:p>
+            <a:endParaRPr lang="en-GB" dirty="0">
+              <a:latin typeface="Segoe MDL2 Assets" panose="050A0102010101010101" pitchFamily="18" charset="0"/>
+            </a:endParaRPr>
+          </a:p>
+          <a:p>
+            <a:endParaRPr lang="en-GB" dirty="0"/>
+          </a:p>
+        </p:txBody>
+      </p:sp>
+    </p:spTree>
+    <p:extLst>
+      <p:ext uri="{BB962C8B-B14F-4D97-AF65-F5344CB8AC3E}">
+        <p14:creationId xmlns:p14="http://schemas.microsoft.com/office/powerpoint/2010/main" val="3768594580"/>
+      </p:ext>
+    </p:extLst>
+  </p:cSld>
+  <p:clrMapOvr>
+    <a:masterClrMapping/>
+  </p:clrMapOvr>
+</p:sld>
+</file>
+
+<file path=ppt/slides/slide29.xml><?xml version="1.0" encoding="utf-8"?>
 <p:sld xmlns:a="http://schemas.openxmlformats.org/drawingml/2006/main" xmlns:r="http://schemas.openxmlformats.org/officeDocument/2006/relationships" xmlns:p="http://schemas.openxmlformats.org/presentationml/2006/main">
   <p:cSld>
     <p:spTree>
@@ -9512,107 +9936,6 @@
 </p:sld>
 </file>
 
-<file path=ppt/slides/slide29.xml><?xml version="1.0" encoding="utf-8"?>
-<p:sld xmlns:a="http://schemas.openxmlformats.org/drawingml/2006/main" xmlns:r="http://schemas.openxmlformats.org/officeDocument/2006/relationships" xmlns:p="http://schemas.openxmlformats.org/presentationml/2006/main">
-  <p:cSld>
-    <p:spTree>
-      <p:nvGrpSpPr>
-        <p:cNvPr id="1" name=""/>
-        <p:cNvGrpSpPr/>
-        <p:nvPr/>
-      </p:nvGrpSpPr>
-      <p:grpSpPr>
-        <a:xfrm>
-          <a:off x="0" y="0"/>
-          <a:ext cx="0" cy="0"/>
-          <a:chOff x="0" y="0"/>
-          <a:chExt cx="0" cy="0"/>
-        </a:xfrm>
-      </p:grpSpPr>
-      <p:sp>
-        <p:nvSpPr>
-          <p:cNvPr id="2" name="Title 1">
-            <a:extLst>
-              <a:ext uri="{FF2B5EF4-FFF2-40B4-BE49-F238E27FC236}">
-                <a16:creationId xmlns:a16="http://schemas.microsoft.com/office/drawing/2014/main" id="{75C50CEC-C87D-40B9-990D-303CFFD16359}"/>
-              </a:ext>
-            </a:extLst>
-          </p:cNvPr>
-          <p:cNvSpPr>
-            <a:spLocks noGrp="1"/>
-          </p:cNvSpPr>
-          <p:nvPr>
-            <p:ph type="title"/>
-          </p:nvPr>
-        </p:nvSpPr>
-        <p:spPr/>
-        <p:txBody>
-          <a:bodyPr/>
-          <a:lstStyle/>
-          <a:p>
-            <a:r>
-              <a:rPr lang="en-GB" dirty="0"/>
-              <a:t>Part 5 - Optimization</a:t>
-            </a:r>
-          </a:p>
-        </p:txBody>
-      </p:sp>
-      <p:sp>
-        <p:nvSpPr>
-          <p:cNvPr id="3" name="Content Placeholder 2">
-            <a:extLst>
-              <a:ext uri="{FF2B5EF4-FFF2-40B4-BE49-F238E27FC236}">
-                <a16:creationId xmlns:a16="http://schemas.microsoft.com/office/drawing/2014/main" id="{6CE96895-52F6-414F-B7B4-DBAF2D31353D}"/>
-              </a:ext>
-            </a:extLst>
-          </p:cNvPr>
-          <p:cNvSpPr>
-            <a:spLocks noGrp="1"/>
-          </p:cNvSpPr>
-          <p:nvPr>
-            <p:ph idx="1"/>
-          </p:nvPr>
-        </p:nvSpPr>
-        <p:spPr/>
-        <p:txBody>
-          <a:bodyPr/>
-          <a:lstStyle/>
-          <a:p>
-            <a:r>
-              <a:rPr lang="en-GB" dirty="0"/>
-              <a:t>As the number of gophers increased the time it takes to process all gophers also increases. </a:t>
-            </a:r>
-          </a:p>
-          <a:p>
-            <a:endParaRPr lang="en-GB" dirty="0"/>
-          </a:p>
-          <a:p>
-            <a:r>
-              <a:rPr lang="en-GB" dirty="0"/>
-              <a:t>In order to reach the goal of 1 million gophers was taking an incredibly long time. </a:t>
-            </a:r>
-          </a:p>
-          <a:p>
-            <a:pPr marL="0" indent="0">
-              <a:buNone/>
-            </a:pPr>
-            <a:endParaRPr lang="en-GB" dirty="0"/>
-          </a:p>
-        </p:txBody>
-      </p:sp>
-    </p:spTree>
-    <p:extLst>
-      <p:ext uri="{BB962C8B-B14F-4D97-AF65-F5344CB8AC3E}">
-        <p14:creationId xmlns:p14="http://schemas.microsoft.com/office/powerpoint/2010/main" val="1147479734"/>
-      </p:ext>
-    </p:extLst>
-  </p:cSld>
-  <p:clrMapOvr>
-    <a:masterClrMapping/>
-  </p:clrMapOvr>
-</p:sld>
-</file>
-
 <file path=ppt/slides/slide3.xml><?xml version="1.0" encoding="utf-8"?>
 <p:sld xmlns:a="http://schemas.openxmlformats.org/drawingml/2006/main" xmlns:r="http://schemas.openxmlformats.org/officeDocument/2006/relationships" xmlns:p="http://schemas.openxmlformats.org/presentationml/2006/main">
   <p:cSld>
@@ -9718,6 +10041,107 @@
 </file>
 
 <file path=ppt/slides/slide30.xml><?xml version="1.0" encoding="utf-8"?>
+<p:sld xmlns:a="http://schemas.openxmlformats.org/drawingml/2006/main" xmlns:r="http://schemas.openxmlformats.org/officeDocument/2006/relationships" xmlns:p="http://schemas.openxmlformats.org/presentationml/2006/main">
+  <p:cSld>
+    <p:spTree>
+      <p:nvGrpSpPr>
+        <p:cNvPr id="1" name=""/>
+        <p:cNvGrpSpPr/>
+        <p:nvPr/>
+      </p:nvGrpSpPr>
+      <p:grpSpPr>
+        <a:xfrm>
+          <a:off x="0" y="0"/>
+          <a:ext cx="0" cy="0"/>
+          <a:chOff x="0" y="0"/>
+          <a:chExt cx="0" cy="0"/>
+        </a:xfrm>
+      </p:grpSpPr>
+      <p:sp>
+        <p:nvSpPr>
+          <p:cNvPr id="2" name="Title 1">
+            <a:extLst>
+              <a:ext uri="{FF2B5EF4-FFF2-40B4-BE49-F238E27FC236}">
+                <a16:creationId xmlns:a16="http://schemas.microsoft.com/office/drawing/2014/main" id="{75C50CEC-C87D-40B9-990D-303CFFD16359}"/>
+              </a:ext>
+            </a:extLst>
+          </p:cNvPr>
+          <p:cNvSpPr>
+            <a:spLocks noGrp="1"/>
+          </p:cNvSpPr>
+          <p:nvPr>
+            <p:ph type="title"/>
+          </p:nvPr>
+        </p:nvSpPr>
+        <p:spPr/>
+        <p:txBody>
+          <a:bodyPr/>
+          <a:lstStyle/>
+          <a:p>
+            <a:r>
+              <a:rPr lang="en-GB" dirty="0"/>
+              <a:t>Part 5 - Optimization</a:t>
+            </a:r>
+          </a:p>
+        </p:txBody>
+      </p:sp>
+      <p:sp>
+        <p:nvSpPr>
+          <p:cNvPr id="3" name="Content Placeholder 2">
+            <a:extLst>
+              <a:ext uri="{FF2B5EF4-FFF2-40B4-BE49-F238E27FC236}">
+                <a16:creationId xmlns:a16="http://schemas.microsoft.com/office/drawing/2014/main" id="{6CE96895-52F6-414F-B7B4-DBAF2D31353D}"/>
+              </a:ext>
+            </a:extLst>
+          </p:cNvPr>
+          <p:cNvSpPr>
+            <a:spLocks noGrp="1"/>
+          </p:cNvSpPr>
+          <p:nvPr>
+            <p:ph idx="1"/>
+          </p:nvPr>
+        </p:nvSpPr>
+        <p:spPr/>
+        <p:txBody>
+          <a:bodyPr/>
+          <a:lstStyle/>
+          <a:p>
+            <a:r>
+              <a:rPr lang="en-GB" dirty="0"/>
+              <a:t>As the number of gophers increased the time it takes to process all gophers also increases. </a:t>
+            </a:r>
+          </a:p>
+          <a:p>
+            <a:endParaRPr lang="en-GB" dirty="0"/>
+          </a:p>
+          <a:p>
+            <a:r>
+              <a:rPr lang="en-GB" dirty="0"/>
+              <a:t>In order to reach the goal of 1 million gophers was taking an incredibly long time. </a:t>
+            </a:r>
+          </a:p>
+          <a:p>
+            <a:pPr marL="0" indent="0">
+              <a:buNone/>
+            </a:pPr>
+            <a:endParaRPr lang="en-GB" dirty="0"/>
+          </a:p>
+        </p:txBody>
+      </p:sp>
+    </p:spTree>
+    <p:extLst>
+      <p:ext uri="{BB962C8B-B14F-4D97-AF65-F5344CB8AC3E}">
+        <p14:creationId xmlns:p14="http://schemas.microsoft.com/office/powerpoint/2010/main" val="1147479734"/>
+      </p:ext>
+    </p:extLst>
+  </p:cSld>
+  <p:clrMapOvr>
+    <a:masterClrMapping/>
+  </p:clrMapOvr>
+</p:sld>
+</file>
+
+<file path=ppt/slides/slide31.xml><?xml version="1.0" encoding="utf-8"?>
 <p:sld xmlns:a="http://schemas.openxmlformats.org/drawingml/2006/main" xmlns:r="http://schemas.openxmlformats.org/officeDocument/2006/relationships" xmlns:p="http://schemas.openxmlformats.org/presentationml/2006/main">
   <p:cSld>
     <p:spTree>
@@ -9861,164 +10285,6 @@
 </p:sld>
 </file>
 
-<file path=ppt/slides/slide31.xml><?xml version="1.0" encoding="utf-8"?>
-<p:sld xmlns:a="http://schemas.openxmlformats.org/drawingml/2006/main" xmlns:r="http://schemas.openxmlformats.org/officeDocument/2006/relationships" xmlns:p="http://schemas.openxmlformats.org/presentationml/2006/main">
-  <p:cSld>
-    <p:spTree>
-      <p:nvGrpSpPr>
-        <p:cNvPr id="1" name=""/>
-        <p:cNvGrpSpPr/>
-        <p:nvPr/>
-      </p:nvGrpSpPr>
-      <p:grpSpPr>
-        <a:xfrm>
-          <a:off x="0" y="0"/>
-          <a:ext cx="0" cy="0"/>
-          <a:chOff x="0" y="0"/>
-          <a:chExt cx="0" cy="0"/>
-        </a:xfrm>
-      </p:grpSpPr>
-      <p:sp>
-        <p:nvSpPr>
-          <p:cNvPr id="2" name="Title 1">
-            <a:extLst>
-              <a:ext uri="{FF2B5EF4-FFF2-40B4-BE49-F238E27FC236}">
-                <a16:creationId xmlns:a16="http://schemas.microsoft.com/office/drawing/2014/main" id="{D5AD34E6-B9F5-484D-8BC0-F61BE7177945}"/>
-              </a:ext>
-            </a:extLst>
-          </p:cNvPr>
-          <p:cNvSpPr>
-            <a:spLocks noGrp="1"/>
-          </p:cNvSpPr>
-          <p:nvPr>
-            <p:ph type="title"/>
-          </p:nvPr>
-        </p:nvSpPr>
-        <p:spPr/>
-        <p:txBody>
-          <a:bodyPr/>
-          <a:lstStyle/>
-          <a:p>
-            <a:r>
-              <a:rPr lang="en-GB" dirty="0"/>
-              <a:t>Test Parameters</a:t>
-            </a:r>
-          </a:p>
-        </p:txBody>
-      </p:sp>
-      <p:sp>
-        <p:nvSpPr>
-          <p:cNvPr id="3" name="Content Placeholder 2">
-            <a:extLst>
-              <a:ext uri="{FF2B5EF4-FFF2-40B4-BE49-F238E27FC236}">
-                <a16:creationId xmlns:a16="http://schemas.microsoft.com/office/drawing/2014/main" id="{E3E7B6E3-350A-42E9-901D-4256E39894ED}"/>
-              </a:ext>
-            </a:extLst>
-          </p:cNvPr>
-          <p:cNvSpPr>
-            <a:spLocks noGrp="1"/>
-          </p:cNvSpPr>
-          <p:nvPr>
-            <p:ph idx="1"/>
-          </p:nvPr>
-        </p:nvSpPr>
-        <p:spPr>
-          <a:xfrm>
-            <a:off x="1104293" y="1331259"/>
-            <a:ext cx="8946541" cy="5186987"/>
-          </a:xfrm>
-        </p:spPr>
-        <p:txBody>
-          <a:bodyPr>
-            <a:normAutofit fontScale="92500" lnSpcReduction="20000"/>
-          </a:bodyPr>
-          <a:lstStyle/>
-          <a:p>
-            <a:r>
-              <a:rPr lang="en-GB" dirty="0"/>
-              <a:t>Time how many gophers are generated in a minute and time how long it takes to reach 1 million gophers</a:t>
-            </a:r>
-          </a:p>
-          <a:p>
-            <a:endParaRPr lang="en-GB" dirty="0"/>
-          </a:p>
-          <a:p>
-            <a:r>
-              <a:rPr lang="en-GB" dirty="0"/>
-              <a:t>Starting Number Of Gophers is 5000</a:t>
-            </a:r>
-          </a:p>
-          <a:p>
-            <a:pPr lvl="1"/>
-            <a:r>
-              <a:rPr lang="en-GB" dirty="0"/>
-              <a:t>Gopher lifespans are around 500 frames</a:t>
-            </a:r>
-          </a:p>
-          <a:p>
-            <a:pPr lvl="1"/>
-            <a:r>
-              <a:rPr lang="en-GB" dirty="0"/>
-              <a:t>Gophers can reproduce at 150 frames</a:t>
-            </a:r>
-          </a:p>
-          <a:p>
-            <a:endParaRPr lang="en-GB" dirty="0"/>
-          </a:p>
-          <a:p>
-            <a:r>
-              <a:rPr lang="en-GB" dirty="0"/>
-              <a:t>Number Of Food on the map is around 1 million </a:t>
-            </a:r>
-          </a:p>
-          <a:p>
-            <a:endParaRPr lang="en-GB" dirty="0"/>
-          </a:p>
-          <a:p>
-            <a:r>
-              <a:rPr lang="en-GB" dirty="0"/>
-              <a:t>World Size is 3000 x 3000</a:t>
-            </a:r>
-          </a:p>
-          <a:p>
-            <a:endParaRPr lang="en-GB" dirty="0"/>
-          </a:p>
-          <a:p>
-            <a:r>
-              <a:rPr lang="en-GB" dirty="0"/>
-              <a:t>Hunger per frame is 5 </a:t>
-            </a:r>
-          </a:p>
-          <a:p>
-            <a:endParaRPr lang="en-GB" dirty="0"/>
-          </a:p>
-          <a:p>
-            <a:r>
-              <a:rPr lang="en-GB" dirty="0"/>
-              <a:t>Birth-rate is 20 – because I forgot to change it to 7</a:t>
-            </a:r>
-          </a:p>
-          <a:p>
-            <a:endParaRPr lang="en-GB" dirty="0"/>
-          </a:p>
-          <a:p>
-            <a:endParaRPr lang="en-GB" dirty="0"/>
-          </a:p>
-        </p:txBody>
-      </p:sp>
-    </p:spTree>
-    <p:extLst>
-      <p:ext uri="{BB962C8B-B14F-4D97-AF65-F5344CB8AC3E}">
-        <p14:creationId xmlns:p14="http://schemas.microsoft.com/office/powerpoint/2010/main" val="3390754349"/>
-      </p:ext>
-    </p:extLst>
-  </p:cSld>
-  <p:clrMapOvr>
-    <a:masterClrMapping/>
-  </p:clrMapOvr>
-</p:sld>
-</file>
-
 <file path=ppt/slides/slide32.xml><?xml version="1.0" encoding="utf-8"?>
 <p:sld xmlns:a="http://schemas.openxmlformats.org/drawingml/2006/main" xmlns:r="http://schemas.openxmlformats.org/officeDocument/2006/relationships" xmlns:p="http://schemas.openxmlformats.org/presentationml/2006/main">
   <p:cSld>
@@ -10041,7 +10307,7 @@
           <p:cNvPr id="2" name="Title 1">
             <a:extLst>
               <a:ext uri="{FF2B5EF4-FFF2-40B4-BE49-F238E27FC236}">
-                <a16:creationId xmlns:a16="http://schemas.microsoft.com/office/drawing/2014/main" id="{BD797834-109E-4C93-9155-20AC7E966615}"/>
+                <a16:creationId xmlns:a16="http://schemas.microsoft.com/office/drawing/2014/main" id="{D5AD34E6-B9F5-484D-8BC0-F61BE7177945}"/>
               </a:ext>
             </a:extLst>
           </p:cNvPr>
@@ -10059,7 +10325,7 @@
           <a:p>
             <a:r>
               <a:rPr lang="en-GB" dirty="0"/>
-              <a:t>Initial Investigation</a:t>
+              <a:t>Test Parameters</a:t>
             </a:r>
           </a:p>
         </p:txBody>
@@ -10069,7 +10335,7 @@
           <p:cNvPr id="3" name="Content Placeholder 2">
             <a:extLst>
               <a:ext uri="{FF2B5EF4-FFF2-40B4-BE49-F238E27FC236}">
-                <a16:creationId xmlns:a16="http://schemas.microsoft.com/office/drawing/2014/main" id="{941E686B-6ADC-487D-923D-7D46F5FDADC5}"/>
+                <a16:creationId xmlns:a16="http://schemas.microsoft.com/office/drawing/2014/main" id="{E3E7B6E3-350A-42E9-901D-4256E39894ED}"/>
               </a:ext>
             </a:extLst>
           </p:cNvPr>
@@ -10080,14 +10346,21 @@
             <p:ph idx="1"/>
           </p:nvPr>
         </p:nvSpPr>
-        <p:spPr/>
-        <p:txBody>
-          <a:bodyPr/>
+        <p:spPr>
+          <a:xfrm>
+            <a:off x="1104293" y="1331259"/>
+            <a:ext cx="8946541" cy="5186987"/>
+          </a:xfrm>
+        </p:spPr>
+        <p:txBody>
+          <a:bodyPr>
+            <a:normAutofit fontScale="92500" lnSpcReduction="20000"/>
+          </a:bodyPr>
           <a:lstStyle/>
           <a:p>
             <a:r>
               <a:rPr lang="en-GB" dirty="0"/>
-              <a:t>It was clear the method I used to find food was inefficient </a:t>
+              <a:t>Time how many gophers are generated in a minute and time how long it takes to reach 1 million gophers</a:t>
             </a:r>
           </a:p>
           <a:p>
@@ -10096,15 +10369,71 @@
           <a:p>
             <a:r>
               <a:rPr lang="en-GB" dirty="0"/>
-              <a:t>I switched to using a spiral search method to find the nearest food to a gopher </a:t>
-            </a:r>
+              <a:t>Starting Number Of Gophers is 5000</a:t>
+            </a:r>
+          </a:p>
+          <a:p>
+            <a:pPr lvl="1"/>
+            <a:r>
+              <a:rPr lang="en-GB" dirty="0"/>
+              <a:t>Gopher lifespans are around 500 frames</a:t>
+            </a:r>
+          </a:p>
+          <a:p>
+            <a:pPr lvl="1"/>
+            <a:r>
+              <a:rPr lang="en-GB" dirty="0"/>
+              <a:t>Gophers can reproduce at 150 frames</a:t>
+            </a:r>
+          </a:p>
+          <a:p>
+            <a:endParaRPr lang="en-GB" dirty="0"/>
+          </a:p>
+          <a:p>
+            <a:r>
+              <a:rPr lang="en-GB" dirty="0"/>
+              <a:t>Number Of Food on the map is around 1 million </a:t>
+            </a:r>
+          </a:p>
+          <a:p>
+            <a:endParaRPr lang="en-GB" dirty="0"/>
+          </a:p>
+          <a:p>
+            <a:r>
+              <a:rPr lang="en-GB" dirty="0"/>
+              <a:t>World Size is 3000 x 3000</a:t>
+            </a:r>
+          </a:p>
+          <a:p>
+            <a:endParaRPr lang="en-GB" dirty="0"/>
+          </a:p>
+          <a:p>
+            <a:r>
+              <a:rPr lang="en-GB" dirty="0"/>
+              <a:t>Hunger per frame is 5 </a:t>
+            </a:r>
+          </a:p>
+          <a:p>
+            <a:endParaRPr lang="en-GB" dirty="0"/>
+          </a:p>
+          <a:p>
+            <a:r>
+              <a:rPr lang="en-GB" dirty="0"/>
+              <a:t>Birth-rate is 20 – because I forgot to change it to 7</a:t>
+            </a:r>
+          </a:p>
+          <a:p>
+            <a:endParaRPr lang="en-GB" dirty="0"/>
+          </a:p>
+          <a:p>
+            <a:endParaRPr lang="en-GB" dirty="0"/>
           </a:p>
         </p:txBody>
       </p:sp>
     </p:spTree>
     <p:extLst>
       <p:ext uri="{BB962C8B-B14F-4D97-AF65-F5344CB8AC3E}">
-        <p14:creationId xmlns:p14="http://schemas.microsoft.com/office/powerpoint/2010/main" val="1875626122"/>
+        <p14:creationId xmlns:p14="http://schemas.microsoft.com/office/powerpoint/2010/main" val="3390754349"/>
       </p:ext>
     </p:extLst>
   </p:cSld>
@@ -10136,7 +10465,7 @@
           <p:cNvPr id="2" name="Title 1">
             <a:extLst>
               <a:ext uri="{FF2B5EF4-FFF2-40B4-BE49-F238E27FC236}">
-                <a16:creationId xmlns:a16="http://schemas.microsoft.com/office/drawing/2014/main" id="{AA9063F6-F330-401D-A4C7-FFE2796F151C}"/>
+                <a16:creationId xmlns:a16="http://schemas.microsoft.com/office/drawing/2014/main" id="{BD797834-109E-4C93-9155-20AC7E966615}"/>
               </a:ext>
             </a:extLst>
           </p:cNvPr>
@@ -10154,7 +10483,7 @@
           <a:p>
             <a:r>
               <a:rPr lang="en-GB" dirty="0"/>
-              <a:t>The Results of Spiral Searching</a:t>
+              <a:t>Initial Investigation</a:t>
             </a:r>
           </a:p>
         </p:txBody>
@@ -10164,7 +10493,7 @@
           <p:cNvPr id="3" name="Content Placeholder 2">
             <a:extLst>
               <a:ext uri="{FF2B5EF4-FFF2-40B4-BE49-F238E27FC236}">
-                <a16:creationId xmlns:a16="http://schemas.microsoft.com/office/drawing/2014/main" id="{0BD5C38D-3E3B-4175-8049-DF396C898E25}"/>
+                <a16:creationId xmlns:a16="http://schemas.microsoft.com/office/drawing/2014/main" id="{941E686B-6ADC-487D-923D-7D46F5FDADC5}"/>
               </a:ext>
             </a:extLst>
           </p:cNvPr>
@@ -10182,7 +10511,16 @@
           <a:p>
             <a:r>
               <a:rPr lang="en-GB" dirty="0"/>
-              <a:t>(Image of Spiral Search Results)</a:t>
+              <a:t>It was clear the method I used to find food was inefficient </a:t>
+            </a:r>
+          </a:p>
+          <a:p>
+            <a:endParaRPr lang="en-GB" dirty="0"/>
+          </a:p>
+          <a:p>
+            <a:r>
+              <a:rPr lang="en-GB" dirty="0"/>
+              <a:t>I switched to using a spiral search method to find the nearest food to a gopher </a:t>
             </a:r>
           </a:p>
         </p:txBody>
@@ -10190,7 +10528,7 @@
     </p:spTree>
     <p:extLst>
       <p:ext uri="{BB962C8B-B14F-4D97-AF65-F5344CB8AC3E}">
-        <p14:creationId xmlns:p14="http://schemas.microsoft.com/office/powerpoint/2010/main" val="3865873831"/>
+        <p14:creationId xmlns:p14="http://schemas.microsoft.com/office/powerpoint/2010/main" val="1875626122"/>
       </p:ext>
     </p:extLst>
   </p:cSld>
@@ -10222,6 +10560,92 @@
           <p:cNvPr id="2" name="Title 1">
             <a:extLst>
               <a:ext uri="{FF2B5EF4-FFF2-40B4-BE49-F238E27FC236}">
+                <a16:creationId xmlns:a16="http://schemas.microsoft.com/office/drawing/2014/main" id="{AA9063F6-F330-401D-A4C7-FFE2796F151C}"/>
+              </a:ext>
+            </a:extLst>
+          </p:cNvPr>
+          <p:cNvSpPr>
+            <a:spLocks noGrp="1"/>
+          </p:cNvSpPr>
+          <p:nvPr>
+            <p:ph type="title"/>
+          </p:nvPr>
+        </p:nvSpPr>
+        <p:spPr/>
+        <p:txBody>
+          <a:bodyPr/>
+          <a:lstStyle/>
+          <a:p>
+            <a:r>
+              <a:rPr lang="en-GB" dirty="0"/>
+              <a:t>The Results of Spiral Searching</a:t>
+            </a:r>
+          </a:p>
+        </p:txBody>
+      </p:sp>
+      <p:sp>
+        <p:nvSpPr>
+          <p:cNvPr id="3" name="Content Placeholder 2">
+            <a:extLst>
+              <a:ext uri="{FF2B5EF4-FFF2-40B4-BE49-F238E27FC236}">
+                <a16:creationId xmlns:a16="http://schemas.microsoft.com/office/drawing/2014/main" id="{0BD5C38D-3E3B-4175-8049-DF396C898E25}"/>
+              </a:ext>
+            </a:extLst>
+          </p:cNvPr>
+          <p:cNvSpPr>
+            <a:spLocks noGrp="1"/>
+          </p:cNvSpPr>
+          <p:nvPr>
+            <p:ph idx="1"/>
+          </p:nvPr>
+        </p:nvSpPr>
+        <p:spPr/>
+        <p:txBody>
+          <a:bodyPr/>
+          <a:lstStyle/>
+          <a:p>
+            <a:r>
+              <a:rPr lang="en-GB" dirty="0"/>
+              <a:t>(Image of Spiral Search Results)</a:t>
+            </a:r>
+          </a:p>
+        </p:txBody>
+      </p:sp>
+    </p:spTree>
+    <p:extLst>
+      <p:ext uri="{BB962C8B-B14F-4D97-AF65-F5344CB8AC3E}">
+        <p14:creationId xmlns:p14="http://schemas.microsoft.com/office/powerpoint/2010/main" val="3865873831"/>
+      </p:ext>
+    </p:extLst>
+  </p:cSld>
+  <p:clrMapOvr>
+    <a:masterClrMapping/>
+  </p:clrMapOvr>
+</p:sld>
+</file>
+
+<file path=ppt/slides/slide35.xml><?xml version="1.0" encoding="utf-8"?>
+<p:sld xmlns:a="http://schemas.openxmlformats.org/drawingml/2006/main" xmlns:r="http://schemas.openxmlformats.org/officeDocument/2006/relationships" xmlns:p="http://schemas.openxmlformats.org/presentationml/2006/main">
+  <p:cSld>
+    <p:spTree>
+      <p:nvGrpSpPr>
+        <p:cNvPr id="1" name=""/>
+        <p:cNvGrpSpPr/>
+        <p:nvPr/>
+      </p:nvGrpSpPr>
+      <p:grpSpPr>
+        <a:xfrm>
+          <a:off x="0" y="0"/>
+          <a:ext cx="0" cy="0"/>
+          <a:chOff x="0" y="0"/>
+          <a:chExt cx="0" cy="0"/>
+        </a:xfrm>
+      </p:grpSpPr>
+      <p:sp>
+        <p:nvSpPr>
+          <p:cNvPr id="2" name="Title 1">
+            <a:extLst>
+              <a:ext uri="{FF2B5EF4-FFF2-40B4-BE49-F238E27FC236}">
                 <a16:creationId xmlns:a16="http://schemas.microsoft.com/office/drawing/2014/main" id="{450E2F24-6B36-4CDF-9981-77D7080A3EA2}"/>
               </a:ext>
             </a:extLst>
@@ -10304,7 +10728,7 @@
 </p:sld>
 </file>
 
-<file path=ppt/slides/slide35.xml><?xml version="1.0" encoding="utf-8"?>
+<file path=ppt/slides/slide36.xml><?xml version="1.0" encoding="utf-8"?>
 <p:sld xmlns:a="http://schemas.openxmlformats.org/drawingml/2006/main" xmlns:r="http://schemas.openxmlformats.org/officeDocument/2006/relationships" xmlns:p="http://schemas.openxmlformats.org/presentationml/2006/main">
   <p:cSld>
     <p:spTree>
@@ -10432,92 +10856,6 @@
 </p:sld>
 </file>
 
-<file path=ppt/slides/slide36.xml><?xml version="1.0" encoding="utf-8"?>
-<p:sld xmlns:a="http://schemas.openxmlformats.org/drawingml/2006/main" xmlns:r="http://schemas.openxmlformats.org/officeDocument/2006/relationships" xmlns:p="http://schemas.openxmlformats.org/presentationml/2006/main">
-  <p:cSld>
-    <p:spTree>
-      <p:nvGrpSpPr>
-        <p:cNvPr id="1" name=""/>
-        <p:cNvGrpSpPr/>
-        <p:nvPr/>
-      </p:nvGrpSpPr>
-      <p:grpSpPr>
-        <a:xfrm>
-          <a:off x="0" y="0"/>
-          <a:ext cx="0" cy="0"/>
-          <a:chOff x="0" y="0"/>
-          <a:chExt cx="0" cy="0"/>
-        </a:xfrm>
-      </p:grpSpPr>
-      <p:sp>
-        <p:nvSpPr>
-          <p:cNvPr id="2" name="Title 1">
-            <a:extLst>
-              <a:ext uri="{FF2B5EF4-FFF2-40B4-BE49-F238E27FC236}">
-                <a16:creationId xmlns:a16="http://schemas.microsoft.com/office/drawing/2014/main" id="{70046F51-CA29-4030-BA2A-A6BCB7791EA4}"/>
-              </a:ext>
-            </a:extLst>
-          </p:cNvPr>
-          <p:cNvSpPr>
-            <a:spLocks noGrp="1"/>
-          </p:cNvSpPr>
-          <p:nvPr>
-            <p:ph type="title"/>
-          </p:nvPr>
-        </p:nvSpPr>
-        <p:spPr/>
-        <p:txBody>
-          <a:bodyPr/>
-          <a:lstStyle/>
-          <a:p>
-            <a:r>
-              <a:rPr lang="en-GB" dirty="0"/>
-              <a:t>The Results of the investigation</a:t>
-            </a:r>
-          </a:p>
-        </p:txBody>
-      </p:sp>
-      <p:sp>
-        <p:nvSpPr>
-          <p:cNvPr id="3" name="Content Placeholder 2">
-            <a:extLst>
-              <a:ext uri="{FF2B5EF4-FFF2-40B4-BE49-F238E27FC236}">
-                <a16:creationId xmlns:a16="http://schemas.microsoft.com/office/drawing/2014/main" id="{457002CC-131B-4B63-9D34-BD111C4489E1}"/>
-              </a:ext>
-            </a:extLst>
-          </p:cNvPr>
-          <p:cNvSpPr>
-            <a:spLocks noGrp="1"/>
-          </p:cNvSpPr>
-          <p:nvPr>
-            <p:ph idx="1"/>
-          </p:nvPr>
-        </p:nvSpPr>
-        <p:spPr/>
-        <p:txBody>
-          <a:bodyPr/>
-          <a:lstStyle/>
-          <a:p>
-            <a:r>
-              <a:rPr lang="en-GB" dirty="0"/>
-              <a:t>(Display Image results for 1 minute) </a:t>
-            </a:r>
-          </a:p>
-        </p:txBody>
-      </p:sp>
-    </p:spTree>
-    <p:extLst>
-      <p:ext uri="{BB962C8B-B14F-4D97-AF65-F5344CB8AC3E}">
-        <p14:creationId xmlns:p14="http://schemas.microsoft.com/office/powerpoint/2010/main" val="1531294866"/>
-      </p:ext>
-    </p:extLst>
-  </p:cSld>
-  <p:clrMapOvr>
-    <a:masterClrMapping/>
-  </p:clrMapOvr>
-</p:sld>
-</file>
-
 <file path=ppt/slides/slide37.xml><?xml version="1.0" encoding="utf-8"?>
 <p:sld xmlns:a="http://schemas.openxmlformats.org/drawingml/2006/main" xmlns:r="http://schemas.openxmlformats.org/officeDocument/2006/relationships" xmlns:p="http://schemas.openxmlformats.org/presentationml/2006/main">
   <p:cSld>
@@ -10540,6 +10878,92 @@
           <p:cNvPr id="2" name="Title 1">
             <a:extLst>
               <a:ext uri="{FF2B5EF4-FFF2-40B4-BE49-F238E27FC236}">
+                <a16:creationId xmlns:a16="http://schemas.microsoft.com/office/drawing/2014/main" id="{70046F51-CA29-4030-BA2A-A6BCB7791EA4}"/>
+              </a:ext>
+            </a:extLst>
+          </p:cNvPr>
+          <p:cNvSpPr>
+            <a:spLocks noGrp="1"/>
+          </p:cNvSpPr>
+          <p:nvPr>
+            <p:ph type="title"/>
+          </p:nvPr>
+        </p:nvSpPr>
+        <p:spPr/>
+        <p:txBody>
+          <a:bodyPr/>
+          <a:lstStyle/>
+          <a:p>
+            <a:r>
+              <a:rPr lang="en-GB" dirty="0"/>
+              <a:t>The Results of the investigation</a:t>
+            </a:r>
+          </a:p>
+        </p:txBody>
+      </p:sp>
+      <p:sp>
+        <p:nvSpPr>
+          <p:cNvPr id="3" name="Content Placeholder 2">
+            <a:extLst>
+              <a:ext uri="{FF2B5EF4-FFF2-40B4-BE49-F238E27FC236}">
+                <a16:creationId xmlns:a16="http://schemas.microsoft.com/office/drawing/2014/main" id="{457002CC-131B-4B63-9D34-BD111C4489E1}"/>
+              </a:ext>
+            </a:extLst>
+          </p:cNvPr>
+          <p:cNvSpPr>
+            <a:spLocks noGrp="1"/>
+          </p:cNvSpPr>
+          <p:nvPr>
+            <p:ph idx="1"/>
+          </p:nvPr>
+        </p:nvSpPr>
+        <p:spPr/>
+        <p:txBody>
+          <a:bodyPr/>
+          <a:lstStyle/>
+          <a:p>
+            <a:r>
+              <a:rPr lang="en-GB" dirty="0"/>
+              <a:t>(Display Image results for 1 minute) </a:t>
+            </a:r>
+          </a:p>
+        </p:txBody>
+      </p:sp>
+    </p:spTree>
+    <p:extLst>
+      <p:ext uri="{BB962C8B-B14F-4D97-AF65-F5344CB8AC3E}">
+        <p14:creationId xmlns:p14="http://schemas.microsoft.com/office/powerpoint/2010/main" val="1531294866"/>
+      </p:ext>
+    </p:extLst>
+  </p:cSld>
+  <p:clrMapOvr>
+    <a:masterClrMapping/>
+  </p:clrMapOvr>
+</p:sld>
+</file>
+
+<file path=ppt/slides/slide38.xml><?xml version="1.0" encoding="utf-8"?>
+<p:sld xmlns:a="http://schemas.openxmlformats.org/drawingml/2006/main" xmlns:r="http://schemas.openxmlformats.org/officeDocument/2006/relationships" xmlns:p="http://schemas.openxmlformats.org/presentationml/2006/main">
+  <p:cSld>
+    <p:spTree>
+      <p:nvGrpSpPr>
+        <p:cNvPr id="1" name=""/>
+        <p:cNvGrpSpPr/>
+        <p:nvPr/>
+      </p:nvGrpSpPr>
+      <p:grpSpPr>
+        <a:xfrm>
+          <a:off x="0" y="0"/>
+          <a:ext cx="0" cy="0"/>
+          <a:chOff x="0" y="0"/>
+          <a:chExt cx="0" cy="0"/>
+        </a:xfrm>
+      </p:grpSpPr>
+      <p:sp>
+        <p:nvSpPr>
+          <p:cNvPr id="2" name="Title 1">
+            <a:extLst>
+              <a:ext uri="{FF2B5EF4-FFF2-40B4-BE49-F238E27FC236}">
                 <a16:creationId xmlns:a16="http://schemas.microsoft.com/office/drawing/2014/main" id="{DF29D87C-482C-4F54-87E0-F2334586C8F5}"/>
               </a:ext>
             </a:extLst>
@@ -10622,7 +11046,7 @@
 </p:sld>
 </file>
 
-<file path=ppt/slides/slide38.xml><?xml version="1.0" encoding="utf-8"?>
+<file path=ppt/slides/slide39.xml><?xml version="1.0" encoding="utf-8"?>
 <p:sld xmlns:a="http://schemas.openxmlformats.org/drawingml/2006/main" xmlns:r="http://schemas.openxmlformats.org/officeDocument/2006/relationships" xmlns:p="http://schemas.openxmlformats.org/presentationml/2006/main">
   <p:cSld>
     <p:spTree>
@@ -10806,148 +11230,6 @@
 </p:sld>
 </file>
 
-<file path=ppt/slides/slide39.xml><?xml version="1.0" encoding="utf-8"?>
-<p:sld xmlns:a="http://schemas.openxmlformats.org/drawingml/2006/main" xmlns:r="http://schemas.openxmlformats.org/officeDocument/2006/relationships" xmlns:p="http://schemas.openxmlformats.org/presentationml/2006/main">
-  <p:cSld>
-    <p:spTree>
-      <p:nvGrpSpPr>
-        <p:cNvPr id="1" name=""/>
-        <p:cNvGrpSpPr/>
-        <p:nvPr/>
-      </p:nvGrpSpPr>
-      <p:grpSpPr>
-        <a:xfrm>
-          <a:off x="0" y="0"/>
-          <a:ext cx="0" cy="0"/>
-          <a:chOff x="0" y="0"/>
-          <a:chExt cx="0" cy="0"/>
-        </a:xfrm>
-      </p:grpSpPr>
-      <p:sp>
-        <p:nvSpPr>
-          <p:cNvPr id="2" name="Title 1">
-            <a:extLst>
-              <a:ext uri="{FF2B5EF4-FFF2-40B4-BE49-F238E27FC236}">
-                <a16:creationId xmlns:a16="http://schemas.microsoft.com/office/drawing/2014/main" id="{DF29D87C-482C-4F54-87E0-F2334586C8F5}"/>
-              </a:ext>
-            </a:extLst>
-          </p:cNvPr>
-          <p:cNvSpPr>
-            <a:spLocks noGrp="1"/>
-          </p:cNvSpPr>
-          <p:nvPr>
-            <p:ph type="title"/>
-          </p:nvPr>
-        </p:nvSpPr>
-        <p:spPr/>
-        <p:txBody>
-          <a:bodyPr/>
-          <a:lstStyle/>
-          <a:p>
-            <a:r>
-              <a:rPr lang="en-GB" dirty="0"/>
-              <a:t>Discovering Go Benchmark</a:t>
-            </a:r>
-          </a:p>
-        </p:txBody>
-      </p:sp>
-      <p:sp>
-        <p:nvSpPr>
-          <p:cNvPr id="3" name="Content Placeholder 2">
-            <a:extLst>
-              <a:ext uri="{FF2B5EF4-FFF2-40B4-BE49-F238E27FC236}">
-                <a16:creationId xmlns:a16="http://schemas.microsoft.com/office/drawing/2014/main" id="{87D38393-4429-4AC4-86A6-E39FA86D2CC7}"/>
-              </a:ext>
-            </a:extLst>
-          </p:cNvPr>
-          <p:cNvSpPr>
-            <a:spLocks noGrp="1"/>
-          </p:cNvSpPr>
-          <p:nvPr>
-            <p:ph idx="1"/>
-          </p:nvPr>
-        </p:nvSpPr>
-        <p:spPr/>
-        <p:txBody>
-          <a:bodyPr>
-            <a:normAutofit/>
-          </a:bodyPr>
-          <a:lstStyle/>
-          <a:p>
-            <a:r>
-              <a:rPr lang="en-GB" dirty="0"/>
-              <a:t>I switched from using my method with a map to a 2-dimensional slice (As the world size never changes)</a:t>
-            </a:r>
-          </a:p>
-          <a:p>
-            <a:endParaRPr lang="en-GB" dirty="0"/>
-          </a:p>
-          <a:p>
-            <a:r>
-              <a:rPr lang="en-GB" dirty="0"/>
-              <a:t>The speed of map tile access reduced significantly. </a:t>
-            </a:r>
-          </a:p>
-          <a:p>
-            <a:endParaRPr lang="en-GB" dirty="0"/>
-          </a:p>
-          <a:p>
-            <a:endParaRPr lang="en-GB" dirty="0"/>
-          </a:p>
-          <a:p>
-            <a:endParaRPr lang="en-GB" dirty="0"/>
-          </a:p>
-          <a:p>
-            <a:endParaRPr lang="en-GB" dirty="0"/>
-          </a:p>
-          <a:p>
-            <a:endParaRPr lang="en-GB" dirty="0"/>
-          </a:p>
-        </p:txBody>
-      </p:sp>
-      <p:pic>
-        <p:nvPicPr>
-          <p:cNvPr id="5" name="Picture 4">
-            <a:extLst>
-              <a:ext uri="{FF2B5EF4-FFF2-40B4-BE49-F238E27FC236}">
-                <a16:creationId xmlns:a16="http://schemas.microsoft.com/office/drawing/2014/main" id="{5E899BEC-76C5-4902-9045-2C840E7C6F64}"/>
-              </a:ext>
-            </a:extLst>
-          </p:cNvPr>
-          <p:cNvPicPr>
-            <a:picLocks noChangeAspect="1"/>
-          </p:cNvPicPr>
-          <p:nvPr/>
-        </p:nvPicPr>
-        <p:blipFill>
-          <a:blip r:embed="rId2"/>
-          <a:stretch>
-            <a:fillRect/>
-          </a:stretch>
-        </p:blipFill>
-        <p:spPr>
-          <a:xfrm>
-            <a:off x="1103312" y="4350955"/>
-            <a:ext cx="8946541" cy="728242"/>
-          </a:xfrm>
-          <a:prstGeom prst="rect">
-            <a:avLst/>
-          </a:prstGeom>
-        </p:spPr>
-      </p:pic>
-    </p:spTree>
-    <p:extLst>
-      <p:ext uri="{BB962C8B-B14F-4D97-AF65-F5344CB8AC3E}">
-        <p14:creationId xmlns:p14="http://schemas.microsoft.com/office/powerpoint/2010/main" val="198672225"/>
-      </p:ext>
-    </p:extLst>
-  </p:cSld>
-  <p:clrMapOvr>
-    <a:masterClrMapping/>
-  </p:clrMapOvr>
-</p:sld>
-</file>
-
 <file path=ppt/slides/slide4.xml><?xml version="1.0" encoding="utf-8"?>
 <p:sld xmlns:a="http://schemas.openxmlformats.org/drawingml/2006/main" xmlns:r="http://schemas.openxmlformats.org/officeDocument/2006/relationships" xmlns:p="http://schemas.openxmlformats.org/presentationml/2006/main">
   <p:cSld>
@@ -11122,6 +11404,148 @@
           <p:cNvPr id="2" name="Title 1">
             <a:extLst>
               <a:ext uri="{FF2B5EF4-FFF2-40B4-BE49-F238E27FC236}">
+                <a16:creationId xmlns:a16="http://schemas.microsoft.com/office/drawing/2014/main" id="{DF29D87C-482C-4F54-87E0-F2334586C8F5}"/>
+              </a:ext>
+            </a:extLst>
+          </p:cNvPr>
+          <p:cNvSpPr>
+            <a:spLocks noGrp="1"/>
+          </p:cNvSpPr>
+          <p:nvPr>
+            <p:ph type="title"/>
+          </p:nvPr>
+        </p:nvSpPr>
+        <p:spPr/>
+        <p:txBody>
+          <a:bodyPr/>
+          <a:lstStyle/>
+          <a:p>
+            <a:r>
+              <a:rPr lang="en-GB" dirty="0"/>
+              <a:t>Discovering Go Benchmark</a:t>
+            </a:r>
+          </a:p>
+        </p:txBody>
+      </p:sp>
+      <p:sp>
+        <p:nvSpPr>
+          <p:cNvPr id="3" name="Content Placeholder 2">
+            <a:extLst>
+              <a:ext uri="{FF2B5EF4-FFF2-40B4-BE49-F238E27FC236}">
+                <a16:creationId xmlns:a16="http://schemas.microsoft.com/office/drawing/2014/main" id="{87D38393-4429-4AC4-86A6-E39FA86D2CC7}"/>
+              </a:ext>
+            </a:extLst>
+          </p:cNvPr>
+          <p:cNvSpPr>
+            <a:spLocks noGrp="1"/>
+          </p:cNvSpPr>
+          <p:nvPr>
+            <p:ph idx="1"/>
+          </p:nvPr>
+        </p:nvSpPr>
+        <p:spPr/>
+        <p:txBody>
+          <a:bodyPr>
+            <a:normAutofit/>
+          </a:bodyPr>
+          <a:lstStyle/>
+          <a:p>
+            <a:r>
+              <a:rPr lang="en-GB" dirty="0"/>
+              <a:t>I switched from using my method with a map to a 2-dimensional slice (As the world size never changes)</a:t>
+            </a:r>
+          </a:p>
+          <a:p>
+            <a:endParaRPr lang="en-GB" dirty="0"/>
+          </a:p>
+          <a:p>
+            <a:r>
+              <a:rPr lang="en-GB" dirty="0"/>
+              <a:t>The speed of map tile access reduced significantly. </a:t>
+            </a:r>
+          </a:p>
+          <a:p>
+            <a:endParaRPr lang="en-GB" dirty="0"/>
+          </a:p>
+          <a:p>
+            <a:endParaRPr lang="en-GB" dirty="0"/>
+          </a:p>
+          <a:p>
+            <a:endParaRPr lang="en-GB" dirty="0"/>
+          </a:p>
+          <a:p>
+            <a:endParaRPr lang="en-GB" dirty="0"/>
+          </a:p>
+          <a:p>
+            <a:endParaRPr lang="en-GB" dirty="0"/>
+          </a:p>
+        </p:txBody>
+      </p:sp>
+      <p:pic>
+        <p:nvPicPr>
+          <p:cNvPr id="5" name="Picture 4">
+            <a:extLst>
+              <a:ext uri="{FF2B5EF4-FFF2-40B4-BE49-F238E27FC236}">
+                <a16:creationId xmlns:a16="http://schemas.microsoft.com/office/drawing/2014/main" id="{5E899BEC-76C5-4902-9045-2C840E7C6F64}"/>
+              </a:ext>
+            </a:extLst>
+          </p:cNvPr>
+          <p:cNvPicPr>
+            <a:picLocks noChangeAspect="1"/>
+          </p:cNvPicPr>
+          <p:nvPr/>
+        </p:nvPicPr>
+        <p:blipFill>
+          <a:blip r:embed="rId2"/>
+          <a:stretch>
+            <a:fillRect/>
+          </a:stretch>
+        </p:blipFill>
+        <p:spPr>
+          <a:xfrm>
+            <a:off x="1103312" y="4350955"/>
+            <a:ext cx="8946541" cy="728242"/>
+          </a:xfrm>
+          <a:prstGeom prst="rect">
+            <a:avLst/>
+          </a:prstGeom>
+        </p:spPr>
+      </p:pic>
+    </p:spTree>
+    <p:extLst>
+      <p:ext uri="{BB962C8B-B14F-4D97-AF65-F5344CB8AC3E}">
+        <p14:creationId xmlns:p14="http://schemas.microsoft.com/office/powerpoint/2010/main" val="198672225"/>
+      </p:ext>
+    </p:extLst>
+  </p:cSld>
+  <p:clrMapOvr>
+    <a:masterClrMapping/>
+  </p:clrMapOvr>
+</p:sld>
+</file>
+
+<file path=ppt/slides/slide41.xml><?xml version="1.0" encoding="utf-8"?>
+<p:sld xmlns:a="http://schemas.openxmlformats.org/drawingml/2006/main" xmlns:r="http://schemas.openxmlformats.org/officeDocument/2006/relationships" xmlns:p="http://schemas.openxmlformats.org/presentationml/2006/main">
+  <p:cSld>
+    <p:spTree>
+      <p:nvGrpSpPr>
+        <p:cNvPr id="1" name=""/>
+        <p:cNvGrpSpPr/>
+        <p:nvPr/>
+      </p:nvGrpSpPr>
+      <p:grpSpPr>
+        <a:xfrm>
+          <a:off x="0" y="0"/>
+          <a:ext cx="0" cy="0"/>
+          <a:chOff x="0" y="0"/>
+          <a:chExt cx="0" cy="0"/>
+        </a:xfrm>
+      </p:grpSpPr>
+      <p:sp>
+        <p:nvSpPr>
+          <p:cNvPr id="2" name="Title 1">
+            <a:extLst>
+              <a:ext uri="{FF2B5EF4-FFF2-40B4-BE49-F238E27FC236}">
                 <a16:creationId xmlns:a16="http://schemas.microsoft.com/office/drawing/2014/main" id="{CF873E05-26F9-4905-B975-58FB87938655}"/>
               </a:ext>
             </a:extLst>
@@ -11245,119 +11669,6 @@
 </p:sld>
 </file>
 
-<file path=ppt/slides/slide41.xml><?xml version="1.0" encoding="utf-8"?>
-<p:sld xmlns:a="http://schemas.openxmlformats.org/drawingml/2006/main" xmlns:r="http://schemas.openxmlformats.org/officeDocument/2006/relationships" xmlns:p="http://schemas.openxmlformats.org/presentationml/2006/main">
-  <p:cSld>
-    <p:spTree>
-      <p:nvGrpSpPr>
-        <p:cNvPr id="1" name=""/>
-        <p:cNvGrpSpPr/>
-        <p:nvPr/>
-      </p:nvGrpSpPr>
-      <p:grpSpPr>
-        <a:xfrm>
-          <a:off x="0" y="0"/>
-          <a:ext cx="0" cy="0"/>
-          <a:chOff x="0" y="0"/>
-          <a:chExt cx="0" cy="0"/>
-        </a:xfrm>
-      </p:grpSpPr>
-      <p:sp>
-        <p:nvSpPr>
-          <p:cNvPr id="2" name="Title 1">
-            <a:extLst>
-              <a:ext uri="{FF2B5EF4-FFF2-40B4-BE49-F238E27FC236}">
-                <a16:creationId xmlns:a16="http://schemas.microsoft.com/office/drawing/2014/main" id="{CF873E05-26F9-4905-B975-58FB87938655}"/>
-              </a:ext>
-            </a:extLst>
-          </p:cNvPr>
-          <p:cNvSpPr>
-            <a:spLocks noGrp="1"/>
-          </p:cNvSpPr>
-          <p:nvPr>
-            <p:ph type="title"/>
-          </p:nvPr>
-        </p:nvSpPr>
-        <p:spPr/>
-        <p:txBody>
-          <a:bodyPr/>
-          <a:lstStyle/>
-          <a:p>
-            <a:r>
-              <a:rPr lang="en-GB" dirty="0"/>
-              <a:t>The Results of the Benchmark Investigation</a:t>
-            </a:r>
-          </a:p>
-        </p:txBody>
-      </p:sp>
-      <p:sp>
-        <p:nvSpPr>
-          <p:cNvPr id="3" name="Content Placeholder 2">
-            <a:extLst>
-              <a:ext uri="{FF2B5EF4-FFF2-40B4-BE49-F238E27FC236}">
-                <a16:creationId xmlns:a16="http://schemas.microsoft.com/office/drawing/2014/main" id="{07CAA66F-9760-4A5A-B5DD-435568CB399C}"/>
-              </a:ext>
-            </a:extLst>
-          </p:cNvPr>
-          <p:cNvSpPr>
-            <a:spLocks noGrp="1"/>
-          </p:cNvSpPr>
-          <p:nvPr>
-            <p:ph idx="1"/>
-          </p:nvPr>
-        </p:nvSpPr>
-        <p:spPr/>
-        <p:txBody>
-          <a:bodyPr/>
-          <a:lstStyle/>
-          <a:p>
-            <a:r>
-              <a:rPr lang="en-GB" dirty="0"/>
-              <a:t>However, the solution was much faster at a lower population and only slowed down as the population increased. </a:t>
-            </a:r>
-          </a:p>
-          <a:p>
-            <a:endParaRPr lang="en-GB" dirty="0"/>
-          </a:p>
-          <a:p>
-            <a:r>
-              <a:rPr lang="en-GB" dirty="0"/>
-              <a:t>(Explain why here, basically, the number of gophers and food pulled in from the grid got too large as the world size is too small) </a:t>
-            </a:r>
-          </a:p>
-          <a:p>
-            <a:r>
-              <a:rPr lang="en-GB" dirty="0"/>
-              <a:t>(Where there is a much smaller population it performs a lot faster than the spiral search method). </a:t>
-            </a:r>
-          </a:p>
-          <a:p>
-            <a:endParaRPr lang="en-GB" dirty="0"/>
-          </a:p>
-          <a:p>
-            <a:endParaRPr lang="en-GB" dirty="0"/>
-          </a:p>
-          <a:p>
-            <a:endParaRPr lang="en-GB" dirty="0"/>
-          </a:p>
-          <a:p>
-            <a:endParaRPr lang="en-GB" dirty="0"/>
-          </a:p>
-        </p:txBody>
-      </p:sp>
-    </p:spTree>
-    <p:extLst>
-      <p:ext uri="{BB962C8B-B14F-4D97-AF65-F5344CB8AC3E}">
-        <p14:creationId xmlns:p14="http://schemas.microsoft.com/office/powerpoint/2010/main" val="156669204"/>
-      </p:ext>
-    </p:extLst>
-  </p:cSld>
-  <p:clrMapOvr>
-    <a:masterClrMapping/>
-  </p:clrMapOvr>
-</p:sld>
-</file>
-
 <file path=ppt/slides/slide42.xml><?xml version="1.0" encoding="utf-8"?>
 <p:sld xmlns:a="http://schemas.openxmlformats.org/drawingml/2006/main" xmlns:r="http://schemas.openxmlformats.org/officeDocument/2006/relationships" xmlns:p="http://schemas.openxmlformats.org/presentationml/2006/main">
   <p:cSld>
@@ -11380,7 +11691,7 @@
           <p:cNvPr id="2" name="Title 1">
             <a:extLst>
               <a:ext uri="{FF2B5EF4-FFF2-40B4-BE49-F238E27FC236}">
-                <a16:creationId xmlns:a16="http://schemas.microsoft.com/office/drawing/2014/main" id="{82F31E74-FF2C-4AA6-B960-F1B140B8A059}"/>
+                <a16:creationId xmlns:a16="http://schemas.microsoft.com/office/drawing/2014/main" id="{CF873E05-26F9-4905-B975-58FB87938655}"/>
               </a:ext>
             </a:extLst>
           </p:cNvPr>
@@ -11408,7 +11719,7 @@
           <p:cNvPr id="3" name="Content Placeholder 2">
             <a:extLst>
               <a:ext uri="{FF2B5EF4-FFF2-40B4-BE49-F238E27FC236}">
-                <a16:creationId xmlns:a16="http://schemas.microsoft.com/office/drawing/2014/main" id="{0322FAC7-7AE0-4CB5-95D2-FA567FB8A478}"/>
+                <a16:creationId xmlns:a16="http://schemas.microsoft.com/office/drawing/2014/main" id="{07CAA66F-9760-4A5A-B5DD-435568CB399C}"/>
               </a:ext>
             </a:extLst>
           </p:cNvPr>
@@ -11426,15 +11737,42 @@
           <a:p>
             <a:r>
               <a:rPr lang="en-GB" dirty="0"/>
-              <a:t>(Display images of a 1 minute in and then 10 minutes in)</a:t>
-            </a:r>
+              <a:t>However, the solution was much faster at a lower population and only slowed down as the population increased. </a:t>
+            </a:r>
+          </a:p>
+          <a:p>
+            <a:endParaRPr lang="en-GB" dirty="0"/>
+          </a:p>
+          <a:p>
+            <a:r>
+              <a:rPr lang="en-GB" dirty="0"/>
+              <a:t>(Explain why here, basically, the number of gophers and food pulled in from the grid got too large as the world size is too small) </a:t>
+            </a:r>
+          </a:p>
+          <a:p>
+            <a:r>
+              <a:rPr lang="en-GB" dirty="0"/>
+              <a:t>(Where there is a much smaller population it performs a lot faster than the spiral search method). </a:t>
+            </a:r>
+          </a:p>
+          <a:p>
+            <a:endParaRPr lang="en-GB" dirty="0"/>
+          </a:p>
+          <a:p>
+            <a:endParaRPr lang="en-GB" dirty="0"/>
+          </a:p>
+          <a:p>
+            <a:endParaRPr lang="en-GB" dirty="0"/>
+          </a:p>
+          <a:p>
+            <a:endParaRPr lang="en-GB" dirty="0"/>
           </a:p>
         </p:txBody>
       </p:sp>
     </p:spTree>
     <p:extLst>
       <p:ext uri="{BB962C8B-B14F-4D97-AF65-F5344CB8AC3E}">
-        <p14:creationId xmlns:p14="http://schemas.microsoft.com/office/powerpoint/2010/main" val="2219924094"/>
+        <p14:creationId xmlns:p14="http://schemas.microsoft.com/office/powerpoint/2010/main" val="156669204"/>
       </p:ext>
     </p:extLst>
   </p:cSld>
@@ -11466,7 +11804,7 @@
           <p:cNvPr id="2" name="Title 1">
             <a:extLst>
               <a:ext uri="{FF2B5EF4-FFF2-40B4-BE49-F238E27FC236}">
-                <a16:creationId xmlns:a16="http://schemas.microsoft.com/office/drawing/2014/main" id="{4B056CFC-4192-4187-AA6D-8152567D2ECB}"/>
+                <a16:creationId xmlns:a16="http://schemas.microsoft.com/office/drawing/2014/main" id="{82F31E74-FF2C-4AA6-B960-F1B140B8A059}"/>
               </a:ext>
             </a:extLst>
           </p:cNvPr>
@@ -11484,7 +11822,7 @@
           <a:p>
             <a:r>
               <a:rPr lang="en-GB" dirty="0"/>
-              <a:t>Spiral Search with 2-Dimensional Array</a:t>
+              <a:t>The Results of the Benchmark Investigation</a:t>
             </a:r>
           </a:p>
         </p:txBody>
@@ -11494,7 +11832,7 @@
           <p:cNvPr id="3" name="Content Placeholder 2">
             <a:extLst>
               <a:ext uri="{FF2B5EF4-FFF2-40B4-BE49-F238E27FC236}">
-                <a16:creationId xmlns:a16="http://schemas.microsoft.com/office/drawing/2014/main" id="{3B700D3B-EE3F-49D2-96FD-D1FFFFE2DAF4}"/>
+                <a16:creationId xmlns:a16="http://schemas.microsoft.com/office/drawing/2014/main" id="{0322FAC7-7AE0-4CB5-95D2-FA567FB8A478}"/>
               </a:ext>
             </a:extLst>
           </p:cNvPr>
@@ -11512,32 +11850,7 @@
           <a:p>
             <a:r>
               <a:rPr lang="en-GB" dirty="0"/>
-              <a:t>I went back to an older branch and converted it to use a 2-dimensional array instead of the over-use of the map-key method and here are the results</a:t>
-            </a:r>
-          </a:p>
-          <a:p>
-            <a:endParaRPr lang="en-GB" dirty="0"/>
-          </a:p>
-          <a:p>
-            <a:pPr algn="ctr"/>
-            <a:r>
-              <a:rPr lang="en-GB" dirty="0"/>
-              <a:t>1 minute in :</a:t>
-            </a:r>
-          </a:p>
-          <a:p>
-            <a:pPr algn="ctr"/>
-            <a:endParaRPr lang="en-GB" dirty="0"/>
-          </a:p>
-          <a:p>
-            <a:pPr algn="ctr"/>
-            <a:endParaRPr lang="en-GB" dirty="0"/>
-          </a:p>
-          <a:p>
-            <a:pPr algn="ctr"/>
-            <a:r>
-              <a:rPr lang="en-GB" dirty="0"/>
-              <a:t>Time to reach 1 million: </a:t>
+              <a:t>(Display images of a 1 minute in and then 10 minutes in)</a:t>
             </a:r>
           </a:p>
         </p:txBody>
@@ -11545,7 +11858,7 @@
     </p:spTree>
     <p:extLst>
       <p:ext uri="{BB962C8B-B14F-4D97-AF65-F5344CB8AC3E}">
-        <p14:creationId xmlns:p14="http://schemas.microsoft.com/office/powerpoint/2010/main" val="62414064"/>
+        <p14:creationId xmlns:p14="http://schemas.microsoft.com/office/powerpoint/2010/main" val="2219924094"/>
       </p:ext>
     </p:extLst>
   </p:cSld>
@@ -11577,7 +11890,7 @@
           <p:cNvPr id="2" name="Title 1">
             <a:extLst>
               <a:ext uri="{FF2B5EF4-FFF2-40B4-BE49-F238E27FC236}">
-                <a16:creationId xmlns:a16="http://schemas.microsoft.com/office/drawing/2014/main" id="{772F772B-18A9-49DB-8E8C-7D464AEBD39F}"/>
+                <a16:creationId xmlns:a16="http://schemas.microsoft.com/office/drawing/2014/main" id="{4B056CFC-4192-4187-AA6D-8152567D2ECB}"/>
               </a:ext>
             </a:extLst>
           </p:cNvPr>
@@ -11595,7 +11908,7 @@
           <a:p>
             <a:r>
               <a:rPr lang="en-GB" dirty="0"/>
-              <a:t>Problem 5 Checklist</a:t>
+              <a:t>Spiral Search with 2-Dimensional Array</a:t>
             </a:r>
           </a:p>
         </p:txBody>
@@ -11605,7 +11918,7 @@
           <p:cNvPr id="3" name="Content Placeholder 2">
             <a:extLst>
               <a:ext uri="{FF2B5EF4-FFF2-40B4-BE49-F238E27FC236}">
-                <a16:creationId xmlns:a16="http://schemas.microsoft.com/office/drawing/2014/main" id="{5F3CDD0F-C6C9-4D9D-9575-AC672B20A3A1}"/>
+                <a16:creationId xmlns:a16="http://schemas.microsoft.com/office/drawing/2014/main" id="{3B700D3B-EE3F-49D2-96FD-D1FFFFE2DAF4}"/>
               </a:ext>
             </a:extLst>
           </p:cNvPr>
@@ -11618,120 +11931,45 @@
         </p:nvSpPr>
         <p:spPr/>
         <p:txBody>
-          <a:bodyPr>
-            <a:normAutofit/>
-          </a:bodyPr>
+          <a:bodyPr/>
           <a:lstStyle/>
           <a:p>
             <a:r>
               <a:rPr lang="en-GB" dirty="0"/>
-              <a:t>A lot </a:t>
-            </a:r>
-          </a:p>
-          <a:p>
+              <a:t>I went back to an older branch and converted it to use a 2-dimensional array instead of the over-use of the map-key method and here are the results</a:t>
+            </a:r>
+          </a:p>
+          <a:p>
+            <a:endParaRPr lang="en-GB" dirty="0"/>
+          </a:p>
+          <a:p>
+            <a:pPr algn="ctr"/>
             <a:r>
               <a:rPr lang="en-GB" dirty="0"/>
-              <a:t>Searching in a 2-D Space in Go </a:t>
-            </a:r>
-            <a:r>
-              <a:rPr lang="en-GB" dirty="0">
-                <a:latin typeface="Segoe MDL2 Assets" panose="050A0102010101010101" pitchFamily="18" charset="0"/>
-              </a:rPr>
-              <a:t></a:t>
-            </a:r>
+              <a:t>1 minute in :</a:t>
+            </a:r>
+          </a:p>
+          <a:p>
+            <a:pPr algn="ctr"/>
             <a:endParaRPr lang="en-GB" dirty="0"/>
           </a:p>
           <a:p>
+            <a:pPr algn="ctr"/>
+            <a:endParaRPr lang="en-GB" dirty="0"/>
+          </a:p>
+          <a:p>
+            <a:pPr algn="ctr"/>
             <a:r>
               <a:rPr lang="en-GB" dirty="0"/>
-              <a:t>Spatial Petitioning Methodologies (Grids/Quadtrees) in Go </a:t>
-            </a:r>
-            <a:r>
-              <a:rPr lang="en-GB" dirty="0">
-                <a:latin typeface="Segoe MDL2 Assets" panose="050A0102010101010101" pitchFamily="18" charset="0"/>
-              </a:rPr>
-              <a:t></a:t>
-            </a:r>
-            <a:endParaRPr lang="en-GB" dirty="0"/>
-          </a:p>
-          <a:p>
-            <a:r>
-              <a:rPr lang="en-GB" dirty="0"/>
-              <a:t>Mutexes and More Fundamentals of Concurrency </a:t>
-            </a:r>
-            <a:r>
-              <a:rPr lang="en-GB" dirty="0">
-                <a:latin typeface="Segoe MDL2 Assets" panose="050A0102010101010101" pitchFamily="18" charset="0"/>
-              </a:rPr>
-              <a:t></a:t>
-            </a:r>
-            <a:endParaRPr lang="en-GB" dirty="0"/>
-          </a:p>
-          <a:p>
-            <a:r>
-              <a:rPr lang="en-GB" dirty="0"/>
-              <a:t>Go Benchmarking  </a:t>
-            </a:r>
-            <a:r>
-              <a:rPr lang="en-GB" dirty="0">
-                <a:latin typeface="Segoe MDL2 Assets" panose="050A0102010101010101" pitchFamily="18" charset="0"/>
-              </a:rPr>
-              <a:t></a:t>
-            </a:r>
-          </a:p>
-          <a:p>
-            <a:r>
-              <a:rPr lang="en-GB" dirty="0"/>
-              <a:t>Go Race Detector </a:t>
-            </a:r>
-            <a:r>
-              <a:rPr lang="en-GB" dirty="0">
-                <a:latin typeface="Segoe MDL2 Assets" panose="050A0102010101010101" pitchFamily="18" charset="0"/>
-              </a:rPr>
-              <a:t></a:t>
-            </a:r>
-            <a:endParaRPr lang="en-GB" dirty="0"/>
-          </a:p>
-          <a:p>
-            <a:r>
-              <a:rPr lang="en-GB" dirty="0"/>
-              <a:t>Finding out slices contain pointers to arrays </a:t>
-            </a:r>
-            <a:r>
-              <a:rPr lang="en-GB" dirty="0">
-                <a:latin typeface="Segoe MDL2 Assets" panose="050A0102010101010101" pitchFamily="18" charset="0"/>
-              </a:rPr>
-              <a:t></a:t>
-            </a:r>
-            <a:endParaRPr lang="en-GB" dirty="0"/>
-          </a:p>
-          <a:p>
-            <a:r>
-              <a:rPr lang="en-GB" dirty="0"/>
-              <a:t>Denial is a powerful motivator </a:t>
-            </a:r>
-            <a:r>
-              <a:rPr lang="en-GB" dirty="0">
-                <a:latin typeface="Segoe MDL2 Assets" panose="050A0102010101010101" pitchFamily="18" charset="0"/>
-              </a:rPr>
-              <a:t></a:t>
-            </a:r>
-          </a:p>
-          <a:p>
-            <a:endParaRPr lang="en-GB" dirty="0"/>
-          </a:p>
-          <a:p>
-            <a:endParaRPr lang="en-GB" dirty="0"/>
-          </a:p>
-          <a:p>
-            <a:endParaRPr lang="en-GB" dirty="0"/>
+              <a:t>Time to reach 1 million: </a:t>
+            </a:r>
           </a:p>
         </p:txBody>
       </p:sp>
     </p:spTree>
     <p:extLst>
       <p:ext uri="{BB962C8B-B14F-4D97-AF65-F5344CB8AC3E}">
-        <p14:creationId xmlns:p14="http://schemas.microsoft.com/office/powerpoint/2010/main" val="3542417835"/>
+        <p14:creationId xmlns:p14="http://schemas.microsoft.com/office/powerpoint/2010/main" val="62414064"/>
       </p:ext>
     </p:extLst>
   </p:cSld>
@@ -11763,6 +12001,192 @@
           <p:cNvPr id="2" name="Title 1">
             <a:extLst>
               <a:ext uri="{FF2B5EF4-FFF2-40B4-BE49-F238E27FC236}">
+                <a16:creationId xmlns:a16="http://schemas.microsoft.com/office/drawing/2014/main" id="{772F772B-18A9-49DB-8E8C-7D464AEBD39F}"/>
+              </a:ext>
+            </a:extLst>
+          </p:cNvPr>
+          <p:cNvSpPr>
+            <a:spLocks noGrp="1"/>
+          </p:cNvSpPr>
+          <p:nvPr>
+            <p:ph type="title"/>
+          </p:nvPr>
+        </p:nvSpPr>
+        <p:spPr/>
+        <p:txBody>
+          <a:bodyPr/>
+          <a:lstStyle/>
+          <a:p>
+            <a:r>
+              <a:rPr lang="en-GB" dirty="0"/>
+              <a:t>Problem 5 Checklist</a:t>
+            </a:r>
+          </a:p>
+        </p:txBody>
+      </p:sp>
+      <p:sp>
+        <p:nvSpPr>
+          <p:cNvPr id="3" name="Content Placeholder 2">
+            <a:extLst>
+              <a:ext uri="{FF2B5EF4-FFF2-40B4-BE49-F238E27FC236}">
+                <a16:creationId xmlns:a16="http://schemas.microsoft.com/office/drawing/2014/main" id="{5F3CDD0F-C6C9-4D9D-9575-AC672B20A3A1}"/>
+              </a:ext>
+            </a:extLst>
+          </p:cNvPr>
+          <p:cNvSpPr>
+            <a:spLocks noGrp="1"/>
+          </p:cNvSpPr>
+          <p:nvPr>
+            <p:ph idx="1"/>
+          </p:nvPr>
+        </p:nvSpPr>
+        <p:spPr/>
+        <p:txBody>
+          <a:bodyPr>
+            <a:normAutofit/>
+          </a:bodyPr>
+          <a:lstStyle/>
+          <a:p>
+            <a:r>
+              <a:rPr lang="en-GB" dirty="0"/>
+              <a:t>A lot </a:t>
+            </a:r>
+          </a:p>
+          <a:p>
+            <a:r>
+              <a:rPr lang="en-GB" dirty="0"/>
+              <a:t>Searching in a 2-D Space in Go </a:t>
+            </a:r>
+            <a:r>
+              <a:rPr lang="en-GB" dirty="0">
+                <a:latin typeface="Segoe MDL2 Assets" panose="050A0102010101010101" pitchFamily="18" charset="0"/>
+              </a:rPr>
+              <a:t></a:t>
+            </a:r>
+            <a:endParaRPr lang="en-GB" dirty="0"/>
+          </a:p>
+          <a:p>
+            <a:r>
+              <a:rPr lang="en-GB" dirty="0"/>
+              <a:t>Spatial Petitioning Methodologies (Grids/Quadtrees) in Go </a:t>
+            </a:r>
+            <a:r>
+              <a:rPr lang="en-GB" dirty="0">
+                <a:latin typeface="Segoe MDL2 Assets" panose="050A0102010101010101" pitchFamily="18" charset="0"/>
+              </a:rPr>
+              <a:t></a:t>
+            </a:r>
+            <a:endParaRPr lang="en-GB" dirty="0"/>
+          </a:p>
+          <a:p>
+            <a:r>
+              <a:rPr lang="en-GB" dirty="0"/>
+              <a:t>Mutexes and More Fundamentals of Concurrency </a:t>
+            </a:r>
+            <a:r>
+              <a:rPr lang="en-GB" dirty="0">
+                <a:latin typeface="Segoe MDL2 Assets" panose="050A0102010101010101" pitchFamily="18" charset="0"/>
+              </a:rPr>
+              <a:t></a:t>
+            </a:r>
+            <a:endParaRPr lang="en-GB" dirty="0"/>
+          </a:p>
+          <a:p>
+            <a:r>
+              <a:rPr lang="en-GB" dirty="0"/>
+              <a:t>Go Benchmarking  </a:t>
+            </a:r>
+            <a:r>
+              <a:rPr lang="en-GB" dirty="0">
+                <a:latin typeface="Segoe MDL2 Assets" panose="050A0102010101010101" pitchFamily="18" charset="0"/>
+              </a:rPr>
+              <a:t></a:t>
+            </a:r>
+          </a:p>
+          <a:p>
+            <a:r>
+              <a:rPr lang="en-GB" dirty="0"/>
+              <a:t>Go Race Detector </a:t>
+            </a:r>
+            <a:r>
+              <a:rPr lang="en-GB" dirty="0">
+                <a:latin typeface="Segoe MDL2 Assets" panose="050A0102010101010101" pitchFamily="18" charset="0"/>
+              </a:rPr>
+              <a:t></a:t>
+            </a:r>
+            <a:endParaRPr lang="en-GB" dirty="0"/>
+          </a:p>
+          <a:p>
+            <a:r>
+              <a:rPr lang="en-GB" dirty="0"/>
+              <a:t>Finding out slices contain pointers to arrays </a:t>
+            </a:r>
+            <a:r>
+              <a:rPr lang="en-GB" dirty="0">
+                <a:latin typeface="Segoe MDL2 Assets" panose="050A0102010101010101" pitchFamily="18" charset="0"/>
+              </a:rPr>
+              <a:t></a:t>
+            </a:r>
+            <a:endParaRPr lang="en-GB" dirty="0"/>
+          </a:p>
+          <a:p>
+            <a:r>
+              <a:rPr lang="en-GB" dirty="0"/>
+              <a:t>Denial is a powerful motivator </a:t>
+            </a:r>
+            <a:r>
+              <a:rPr lang="en-GB" dirty="0">
+                <a:latin typeface="Segoe MDL2 Assets" panose="050A0102010101010101" pitchFamily="18" charset="0"/>
+              </a:rPr>
+              <a:t></a:t>
+            </a:r>
+          </a:p>
+          <a:p>
+            <a:endParaRPr lang="en-GB" dirty="0"/>
+          </a:p>
+          <a:p>
+            <a:endParaRPr lang="en-GB" dirty="0"/>
+          </a:p>
+          <a:p>
+            <a:endParaRPr lang="en-GB" dirty="0"/>
+          </a:p>
+        </p:txBody>
+      </p:sp>
+    </p:spTree>
+    <p:extLst>
+      <p:ext uri="{BB962C8B-B14F-4D97-AF65-F5344CB8AC3E}">
+        <p14:creationId xmlns:p14="http://schemas.microsoft.com/office/powerpoint/2010/main" val="3542417835"/>
+      </p:ext>
+    </p:extLst>
+  </p:cSld>
+  <p:clrMapOvr>
+    <a:masterClrMapping/>
+  </p:clrMapOvr>
+</p:sld>
+</file>
+
+<file path=ppt/slides/slide46.xml><?xml version="1.0" encoding="utf-8"?>
+<p:sld xmlns:a="http://schemas.openxmlformats.org/drawingml/2006/main" xmlns:r="http://schemas.openxmlformats.org/officeDocument/2006/relationships" xmlns:p="http://schemas.openxmlformats.org/presentationml/2006/main">
+  <p:cSld>
+    <p:spTree>
+      <p:nvGrpSpPr>
+        <p:cNvPr id="1" name=""/>
+        <p:cNvGrpSpPr/>
+        <p:nvPr/>
+      </p:nvGrpSpPr>
+      <p:grpSpPr>
+        <a:xfrm>
+          <a:off x="0" y="0"/>
+          <a:ext cx="0" cy="0"/>
+          <a:chOff x="0" y="0"/>
+          <a:chExt cx="0" cy="0"/>
+        </a:xfrm>
+      </p:grpSpPr>
+      <p:sp>
+        <p:nvSpPr>
+          <p:cNvPr id="2" name="Title 1">
+            <a:extLst>
+              <a:ext uri="{FF2B5EF4-FFF2-40B4-BE49-F238E27FC236}">
                 <a16:creationId xmlns:a16="http://schemas.microsoft.com/office/drawing/2014/main" id="{4CD641E4-A7E1-4915-9226-8DED4B01769C}"/>
               </a:ext>
             </a:extLst>
@@ -11824,7 +12248,7 @@
 </p:sld>
 </file>
 
-<file path=ppt/slides/slide46.xml><?xml version="1.0" encoding="utf-8"?>
+<file path=ppt/slides/slide47.xml><?xml version="1.0" encoding="utf-8"?>
 <p:sld xmlns:a="http://schemas.openxmlformats.org/drawingml/2006/main" xmlns:r="http://schemas.openxmlformats.org/officeDocument/2006/relationships" xmlns:p="http://schemas.openxmlformats.org/presentationml/2006/main">
   <p:cSld>
     <p:spTree>
@@ -13006,7 +13430,7 @@
 </p:sld>
 </file>
 
-<file path=ppt/slides/slide47.xml><?xml version="1.0" encoding="utf-8"?>
+<file path=ppt/slides/slide48.xml><?xml version="1.0" encoding="utf-8"?>
 <p:sld xmlns:a="http://schemas.openxmlformats.org/drawingml/2006/main" xmlns:r="http://schemas.openxmlformats.org/officeDocument/2006/relationships" xmlns:p="http://schemas.openxmlformats.org/presentationml/2006/main">
   <p:cSld>
     <p:spTree>
@@ -13166,70 +13590,6 @@
 </p:sld>
 </file>
 
-<file path=ppt/slides/slide48.xml><?xml version="1.0" encoding="utf-8"?>
-<p:sld xmlns:a="http://schemas.openxmlformats.org/drawingml/2006/main" xmlns:r="http://schemas.openxmlformats.org/officeDocument/2006/relationships" xmlns:p="http://schemas.openxmlformats.org/presentationml/2006/main">
-  <p:cSld>
-    <p:spTree>
-      <p:nvGrpSpPr>
-        <p:cNvPr id="1" name=""/>
-        <p:cNvGrpSpPr/>
-        <p:nvPr/>
-      </p:nvGrpSpPr>
-      <p:grpSpPr>
-        <a:xfrm>
-          <a:off x="0" y="0"/>
-          <a:ext cx="0" cy="0"/>
-          <a:chOff x="0" y="0"/>
-          <a:chExt cx="0" cy="0"/>
-        </a:xfrm>
-      </p:grpSpPr>
-      <p:sp>
-        <p:nvSpPr>
-          <p:cNvPr id="2" name="Title 1">
-            <a:extLst>
-              <a:ext uri="{FF2B5EF4-FFF2-40B4-BE49-F238E27FC236}">
-                <a16:creationId xmlns:a16="http://schemas.microsoft.com/office/drawing/2014/main" id="{F00E9A88-3091-4946-A15B-6EDE744EB7D9}"/>
-              </a:ext>
-            </a:extLst>
-          </p:cNvPr>
-          <p:cNvSpPr>
-            <a:spLocks noGrp="1"/>
-          </p:cNvSpPr>
-          <p:nvPr>
-            <p:ph type="title"/>
-          </p:nvPr>
-        </p:nvSpPr>
-        <p:spPr>
-          <a:xfrm>
-            <a:off x="1393638" y="2728735"/>
-            <a:ext cx="9404723" cy="1400530"/>
-          </a:xfrm>
-        </p:spPr>
-        <p:txBody>
-          <a:bodyPr anchor="ctr"/>
-          <a:lstStyle/>
-          <a:p>
-            <a:pPr algn="ctr"/>
-            <a:r>
-              <a:rPr lang="en-GB" dirty="0"/>
-              <a:t>Thank you for listening to my talk</a:t>
-            </a:r>
-          </a:p>
-        </p:txBody>
-      </p:sp>
-    </p:spTree>
-    <p:extLst>
-      <p:ext uri="{BB962C8B-B14F-4D97-AF65-F5344CB8AC3E}">
-        <p14:creationId xmlns:p14="http://schemas.microsoft.com/office/powerpoint/2010/main" val="3516712788"/>
-      </p:ext>
-    </p:extLst>
-  </p:cSld>
-  <p:clrMapOvr>
-    <a:masterClrMapping/>
-  </p:clrMapOvr>
-</p:sld>
-</file>
-
 <file path=ppt/slides/slide49.xml><?xml version="1.0" encoding="utf-8"?>
 <p:sld xmlns:a="http://schemas.openxmlformats.org/drawingml/2006/main" xmlns:r="http://schemas.openxmlformats.org/officeDocument/2006/relationships" xmlns:p="http://schemas.openxmlformats.org/presentationml/2006/main">
   <p:cSld>
@@ -13252,7 +13612,7 @@
           <p:cNvPr id="2" name="Title 1">
             <a:extLst>
               <a:ext uri="{FF2B5EF4-FFF2-40B4-BE49-F238E27FC236}">
-                <a16:creationId xmlns:a16="http://schemas.microsoft.com/office/drawing/2014/main" id="{A94847A5-3B2C-413D-93AA-293754610DF4}"/>
+                <a16:creationId xmlns:a16="http://schemas.microsoft.com/office/drawing/2014/main" id="{F00E9A88-3091-4946-A15B-6EDE744EB7D9}"/>
               </a:ext>
             </a:extLst>
           </p:cNvPr>
@@ -13263,47 +13623,28 @@
             <p:ph type="title"/>
           </p:nvPr>
         </p:nvSpPr>
-        <p:spPr/>
-        <p:txBody>
-          <a:bodyPr/>
-          <a:lstStyle/>
-          <a:p>
+        <p:spPr>
+          <a:xfrm>
+            <a:off x="1393638" y="2728735"/>
+            <a:ext cx="9404723" cy="1400530"/>
+          </a:xfrm>
+        </p:spPr>
+        <p:txBody>
+          <a:bodyPr anchor="ctr"/>
+          <a:lstStyle/>
+          <a:p>
+            <a:pPr algn="ctr"/>
             <a:r>
               <a:rPr lang="en-GB" dirty="0"/>
-              <a:t>Everything below this slide is not part of the presentation</a:t>
-            </a:r>
-          </a:p>
-        </p:txBody>
-      </p:sp>
-      <p:sp>
-        <p:nvSpPr>
-          <p:cNvPr id="3" name="Content Placeholder 2">
-            <a:extLst>
-              <a:ext uri="{FF2B5EF4-FFF2-40B4-BE49-F238E27FC236}">
-                <a16:creationId xmlns:a16="http://schemas.microsoft.com/office/drawing/2014/main" id="{018237B4-346A-47AD-90D0-130B819626C1}"/>
-              </a:ext>
-            </a:extLst>
-          </p:cNvPr>
-          <p:cNvSpPr>
-            <a:spLocks noGrp="1"/>
-          </p:cNvSpPr>
-          <p:nvPr>
-            <p:ph idx="1"/>
-          </p:nvPr>
-        </p:nvSpPr>
-        <p:spPr/>
-        <p:txBody>
-          <a:bodyPr/>
-          <a:lstStyle/>
-          <a:p>
-            <a:endParaRPr lang="en-GB"/>
+              <a:t>Thank you for listening to my talk</a:t>
+            </a:r>
           </a:p>
         </p:txBody>
       </p:sp>
     </p:spTree>
     <p:extLst>
       <p:ext uri="{BB962C8B-B14F-4D97-AF65-F5344CB8AC3E}">
-        <p14:creationId xmlns:p14="http://schemas.microsoft.com/office/powerpoint/2010/main" val="4138479630"/>
+        <p14:creationId xmlns:p14="http://schemas.microsoft.com/office/powerpoint/2010/main" val="3516712788"/>
       </p:ext>
     </p:extLst>
   </p:cSld>
@@ -13442,6 +13783,89 @@
           <p:cNvPr id="2" name="Title 1">
             <a:extLst>
               <a:ext uri="{FF2B5EF4-FFF2-40B4-BE49-F238E27FC236}">
+                <a16:creationId xmlns:a16="http://schemas.microsoft.com/office/drawing/2014/main" id="{A94847A5-3B2C-413D-93AA-293754610DF4}"/>
+              </a:ext>
+            </a:extLst>
+          </p:cNvPr>
+          <p:cNvSpPr>
+            <a:spLocks noGrp="1"/>
+          </p:cNvSpPr>
+          <p:nvPr>
+            <p:ph type="title"/>
+          </p:nvPr>
+        </p:nvSpPr>
+        <p:spPr/>
+        <p:txBody>
+          <a:bodyPr/>
+          <a:lstStyle/>
+          <a:p>
+            <a:r>
+              <a:rPr lang="en-GB" dirty="0"/>
+              <a:t>Everything below this slide is not part of the presentation</a:t>
+            </a:r>
+          </a:p>
+        </p:txBody>
+      </p:sp>
+      <p:sp>
+        <p:nvSpPr>
+          <p:cNvPr id="3" name="Content Placeholder 2">
+            <a:extLst>
+              <a:ext uri="{FF2B5EF4-FFF2-40B4-BE49-F238E27FC236}">
+                <a16:creationId xmlns:a16="http://schemas.microsoft.com/office/drawing/2014/main" id="{018237B4-346A-47AD-90D0-130B819626C1}"/>
+              </a:ext>
+            </a:extLst>
+          </p:cNvPr>
+          <p:cNvSpPr>
+            <a:spLocks noGrp="1"/>
+          </p:cNvSpPr>
+          <p:nvPr>
+            <p:ph idx="1"/>
+          </p:nvPr>
+        </p:nvSpPr>
+        <p:spPr/>
+        <p:txBody>
+          <a:bodyPr/>
+          <a:lstStyle/>
+          <a:p>
+            <a:endParaRPr lang="en-GB"/>
+          </a:p>
+        </p:txBody>
+      </p:sp>
+    </p:spTree>
+    <p:extLst>
+      <p:ext uri="{BB962C8B-B14F-4D97-AF65-F5344CB8AC3E}">
+        <p14:creationId xmlns:p14="http://schemas.microsoft.com/office/powerpoint/2010/main" val="4138479630"/>
+      </p:ext>
+    </p:extLst>
+  </p:cSld>
+  <p:clrMapOvr>
+    <a:masterClrMapping/>
+  </p:clrMapOvr>
+</p:sld>
+</file>
+
+<file path=ppt/slides/slide51.xml><?xml version="1.0" encoding="utf-8"?>
+<p:sld xmlns:a="http://schemas.openxmlformats.org/drawingml/2006/main" xmlns:r="http://schemas.openxmlformats.org/officeDocument/2006/relationships" xmlns:p="http://schemas.openxmlformats.org/presentationml/2006/main">
+  <p:cSld>
+    <p:spTree>
+      <p:nvGrpSpPr>
+        <p:cNvPr id="1" name=""/>
+        <p:cNvGrpSpPr/>
+        <p:nvPr/>
+      </p:nvGrpSpPr>
+      <p:grpSpPr>
+        <a:xfrm>
+          <a:off x="0" y="0"/>
+          <a:ext cx="0" cy="0"/>
+          <a:chOff x="0" y="0"/>
+          <a:chExt cx="0" cy="0"/>
+        </a:xfrm>
+      </p:grpSpPr>
+      <p:sp>
+        <p:nvSpPr>
+          <p:cNvPr id="2" name="Title 1">
+            <a:extLst>
+              <a:ext uri="{FF2B5EF4-FFF2-40B4-BE49-F238E27FC236}">
                 <a16:creationId xmlns:a16="http://schemas.microsoft.com/office/drawing/2014/main" id="{B88F905B-DC9A-4E15-887A-0D816B2DA849}"/>
               </a:ext>
             </a:extLst>
@@ -13546,7 +13970,7 @@
 </p:sld>
 </file>
 
-<file path=ppt/slides/slide51.xml><?xml version="1.0" encoding="utf-8"?>
+<file path=ppt/slides/slide52.xml><?xml version="1.0" encoding="utf-8"?>
 <p:sld xmlns:a="http://schemas.openxmlformats.org/drawingml/2006/main" xmlns:r="http://schemas.openxmlformats.org/officeDocument/2006/relationships" xmlns:p="http://schemas.openxmlformats.org/presentationml/2006/main">
   <p:cSld>
     <p:spTree>
@@ -13656,7 +14080,7 @@
 </p:sld>
 </file>
 
-<file path=ppt/slides/slide52.xml><?xml version="1.0" encoding="utf-8"?>
+<file path=ppt/slides/slide53.xml><?xml version="1.0" encoding="utf-8"?>
 <p:sld xmlns:a="http://schemas.openxmlformats.org/drawingml/2006/main" xmlns:r="http://schemas.openxmlformats.org/officeDocument/2006/relationships" xmlns:p="http://schemas.openxmlformats.org/presentationml/2006/main">
   <p:cSld>
     <p:spTree>
@@ -13766,7 +14190,7 @@
 </p:sld>
 </file>
 
-<file path=ppt/slides/slide53.xml><?xml version="1.0" encoding="utf-8"?>
+<file path=ppt/slides/slide54.xml><?xml version="1.0" encoding="utf-8"?>
 <p:sld xmlns:a="http://schemas.openxmlformats.org/drawingml/2006/main" xmlns:r="http://schemas.openxmlformats.org/officeDocument/2006/relationships" xmlns:p="http://schemas.openxmlformats.org/presentationml/2006/main">
   <p:cSld>
     <p:spTree>

</xml_diff>

<commit_message>
Updated Presentation, Started thinking about seperating Tile into seperate code
</commit_message>
<xml_diff>
--- a/GopherLife.pptx
+++ b/GopherLife.pptx
@@ -5,7 +5,7 @@
     <p:sldMasterId id="2147483678" r:id="rId1"/>
   </p:sldMasterIdLst>
   <p:notesMasterIdLst>
-    <p:notesMasterId r:id="rId61"/>
+    <p:notesMasterId r:id="rId55"/>
   </p:notesMasterIdLst>
   <p:sldIdLst>
     <p:sldId id="256" r:id="rId2"/>
@@ -16,57 +16,51 @@
     <p:sldId id="270" r:id="rId7"/>
     <p:sldId id="271" r:id="rId8"/>
     <p:sldId id="272" r:id="rId9"/>
-    <p:sldId id="304" r:id="rId10"/>
-    <p:sldId id="336" r:id="rId11"/>
-    <p:sldId id="340" r:id="rId12"/>
-    <p:sldId id="341" r:id="rId13"/>
-    <p:sldId id="339" r:id="rId14"/>
-    <p:sldId id="273" r:id="rId15"/>
-    <p:sldId id="276" r:id="rId16"/>
-    <p:sldId id="277" r:id="rId17"/>
-    <p:sldId id="278" r:id="rId18"/>
-    <p:sldId id="281" r:id="rId19"/>
-    <p:sldId id="280" r:id="rId20"/>
-    <p:sldId id="274" r:id="rId21"/>
-    <p:sldId id="330" r:id="rId22"/>
-    <p:sldId id="335" r:id="rId23"/>
-    <p:sldId id="331" r:id="rId24"/>
-    <p:sldId id="332" r:id="rId25"/>
-    <p:sldId id="333" r:id="rId26"/>
-    <p:sldId id="342" r:id="rId27"/>
-    <p:sldId id="334" r:id="rId28"/>
-    <p:sldId id="343" r:id="rId29"/>
-    <p:sldId id="288" r:id="rId30"/>
-    <p:sldId id="338" r:id="rId31"/>
-    <p:sldId id="308" r:id="rId32"/>
-    <p:sldId id="345" r:id="rId33"/>
-    <p:sldId id="303" r:id="rId34"/>
-    <p:sldId id="314" r:id="rId35"/>
-    <p:sldId id="311" r:id="rId36"/>
-    <p:sldId id="316" r:id="rId37"/>
-    <p:sldId id="317" r:id="rId38"/>
-    <p:sldId id="318" r:id="rId39"/>
-    <p:sldId id="320" r:id="rId40"/>
-    <p:sldId id="346" r:id="rId41"/>
-    <p:sldId id="356" r:id="rId42"/>
-    <p:sldId id="322" r:id="rId43"/>
-    <p:sldId id="319" r:id="rId44"/>
-    <p:sldId id="287" r:id="rId45"/>
-    <p:sldId id="347" r:id="rId46"/>
-    <p:sldId id="349" r:id="rId47"/>
-    <p:sldId id="348" r:id="rId48"/>
-    <p:sldId id="351" r:id="rId49"/>
-    <p:sldId id="359" r:id="rId50"/>
-    <p:sldId id="350" r:id="rId51"/>
-    <p:sldId id="358" r:id="rId52"/>
-    <p:sldId id="353" r:id="rId53"/>
-    <p:sldId id="286" r:id="rId54"/>
-    <p:sldId id="327" r:id="rId55"/>
-    <p:sldId id="325" r:id="rId56"/>
-    <p:sldId id="264" r:id="rId57"/>
-    <p:sldId id="355" r:id="rId58"/>
-    <p:sldId id="306" r:id="rId59"/>
-    <p:sldId id="344" r:id="rId60"/>
+    <p:sldId id="273" r:id="rId10"/>
+    <p:sldId id="276" r:id="rId11"/>
+    <p:sldId id="277" r:id="rId12"/>
+    <p:sldId id="278" r:id="rId13"/>
+    <p:sldId id="281" r:id="rId14"/>
+    <p:sldId id="280" r:id="rId15"/>
+    <p:sldId id="274" r:id="rId16"/>
+    <p:sldId id="330" r:id="rId17"/>
+    <p:sldId id="335" r:id="rId18"/>
+    <p:sldId id="331" r:id="rId19"/>
+    <p:sldId id="332" r:id="rId20"/>
+    <p:sldId id="333" r:id="rId21"/>
+    <p:sldId id="342" r:id="rId22"/>
+    <p:sldId id="334" r:id="rId23"/>
+    <p:sldId id="343" r:id="rId24"/>
+    <p:sldId id="288" r:id="rId25"/>
+    <p:sldId id="338" r:id="rId26"/>
+    <p:sldId id="308" r:id="rId27"/>
+    <p:sldId id="345" r:id="rId28"/>
+    <p:sldId id="303" r:id="rId29"/>
+    <p:sldId id="314" r:id="rId30"/>
+    <p:sldId id="311" r:id="rId31"/>
+    <p:sldId id="316" r:id="rId32"/>
+    <p:sldId id="317" r:id="rId33"/>
+    <p:sldId id="318" r:id="rId34"/>
+    <p:sldId id="320" r:id="rId35"/>
+    <p:sldId id="346" r:id="rId36"/>
+    <p:sldId id="356" r:id="rId37"/>
+    <p:sldId id="322" r:id="rId38"/>
+    <p:sldId id="319" r:id="rId39"/>
+    <p:sldId id="287" r:id="rId40"/>
+    <p:sldId id="347" r:id="rId41"/>
+    <p:sldId id="349" r:id="rId42"/>
+    <p:sldId id="351" r:id="rId43"/>
+    <p:sldId id="359" r:id="rId44"/>
+    <p:sldId id="350" r:id="rId45"/>
+    <p:sldId id="358" r:id="rId46"/>
+    <p:sldId id="361" r:id="rId47"/>
+    <p:sldId id="360" r:id="rId48"/>
+    <p:sldId id="353" r:id="rId49"/>
+    <p:sldId id="362" r:id="rId50"/>
+    <p:sldId id="363" r:id="rId51"/>
+    <p:sldId id="286" r:id="rId52"/>
+    <p:sldId id="327" r:id="rId53"/>
+    <p:sldId id="364" r:id="rId54"/>
   </p:sldIdLst>
   <p:sldSz cx="12192000" cy="6858000"/>
   <p:notesSz cx="6858000" cy="9144000"/>
@@ -591,7 +585,7 @@
           <a:p>
             <a:fld id="{D37E09BB-0EE2-4AA1-9043-B532D0F5CCDE}" type="slidenum">
               <a:rPr lang="en-GB" smtClean="0"/>
-              <a:t>32</a:t>
+              <a:t>27</a:t>
             </a:fld>
             <a:endParaRPr lang="en-GB"/>
           </a:p>
@@ -675,7 +669,7 @@
           <a:p>
             <a:fld id="{D37E09BB-0EE2-4AA1-9043-B532D0F5CCDE}" type="slidenum">
               <a:rPr lang="en-GB" smtClean="0"/>
-              <a:t>33</a:t>
+              <a:t>28</a:t>
             </a:fld>
             <a:endParaRPr lang="en-GB"/>
           </a:p>
@@ -780,7 +774,7 @@
           <a:p>
             <a:fld id="{D37E09BB-0EE2-4AA1-9043-B532D0F5CCDE}" type="slidenum">
               <a:rPr lang="en-GB" smtClean="0"/>
-              <a:t>40</a:t>
+              <a:t>35</a:t>
             </a:fld>
             <a:endParaRPr lang="en-GB"/>
           </a:p>
@@ -843,6 +837,90 @@
           <a:bodyPr/>
           <a:lstStyle/>
           <a:p>
+            <a:endParaRPr lang="en-GB" dirty="0"/>
+          </a:p>
+        </p:txBody>
+      </p:sp>
+      <p:sp>
+        <p:nvSpPr>
+          <p:cNvPr id="4" name="Slide Number Placeholder 3"/>
+          <p:cNvSpPr>
+            <a:spLocks noGrp="1"/>
+          </p:cNvSpPr>
+          <p:nvPr>
+            <p:ph type="sldNum" sz="quarter" idx="5"/>
+          </p:nvPr>
+        </p:nvSpPr>
+        <p:spPr/>
+        <p:txBody>
+          <a:bodyPr/>
+          <a:lstStyle/>
+          <a:p>
+            <a:fld id="{D37E09BB-0EE2-4AA1-9043-B532D0F5CCDE}" type="slidenum">
+              <a:rPr lang="en-GB" smtClean="0"/>
+              <a:t>37</a:t>
+            </a:fld>
+            <a:endParaRPr lang="en-GB"/>
+          </a:p>
+        </p:txBody>
+      </p:sp>
+    </p:spTree>
+    <p:extLst>
+      <p:ext uri="{BB962C8B-B14F-4D97-AF65-F5344CB8AC3E}">
+        <p14:creationId xmlns:p14="http://schemas.microsoft.com/office/powerpoint/2010/main" val="2181913953"/>
+      </p:ext>
+    </p:extLst>
+  </p:cSld>
+  <p:clrMapOvr>
+    <a:masterClrMapping/>
+  </p:clrMapOvr>
+</p:notes>
+</file>
+
+<file path=ppt/notesSlides/notesSlide5.xml><?xml version="1.0" encoding="utf-8"?>
+<p:notes xmlns:a="http://schemas.openxmlformats.org/drawingml/2006/main" xmlns:r="http://schemas.openxmlformats.org/officeDocument/2006/relationships" xmlns:p="http://schemas.openxmlformats.org/presentationml/2006/main">
+  <p:cSld>
+    <p:spTree>
+      <p:nvGrpSpPr>
+        <p:cNvPr id="1" name=""/>
+        <p:cNvGrpSpPr/>
+        <p:nvPr/>
+      </p:nvGrpSpPr>
+      <p:grpSpPr>
+        <a:xfrm>
+          <a:off x="0" y="0"/>
+          <a:ext cx="0" cy="0"/>
+          <a:chOff x="0" y="0"/>
+          <a:chExt cx="0" cy="0"/>
+        </a:xfrm>
+      </p:grpSpPr>
+      <p:sp>
+        <p:nvSpPr>
+          <p:cNvPr id="2" name="Slide Image Placeholder 1"/>
+          <p:cNvSpPr>
+            <a:spLocks noGrp="1" noRot="1" noChangeAspect="1"/>
+          </p:cNvSpPr>
+          <p:nvPr>
+            <p:ph type="sldImg"/>
+          </p:nvPr>
+        </p:nvSpPr>
+        <p:spPr/>
+      </p:sp>
+      <p:sp>
+        <p:nvSpPr>
+          <p:cNvPr id="3" name="Notes Placeholder 2"/>
+          <p:cNvSpPr>
+            <a:spLocks noGrp="1"/>
+          </p:cNvSpPr>
+          <p:nvPr>
+            <p:ph type="body" idx="1"/>
+          </p:nvPr>
+        </p:nvSpPr>
+        <p:spPr/>
+        <p:txBody>
+          <a:bodyPr/>
+          <a:lstStyle/>
+          <a:p>
             <a:r>
               <a:rPr lang="en-GB" dirty="0"/>
               <a:t>My First interface. </a:t>
@@ -857,6 +935,15 @@
               <a:t>It is quite large</a:t>
             </a:r>
           </a:p>
+          <a:p>
+            <a:endParaRPr lang="en-GB" dirty="0"/>
+          </a:p>
+          <a:p>
+            <a:r>
+              <a:rPr lang="en-GB" dirty="0"/>
+              <a:t>Talk about small interfaces and your discussion with Antonio</a:t>
+            </a:r>
+          </a:p>
         </p:txBody>
       </p:sp>
       <p:sp>
@@ -876,7 +963,7 @@
           <a:p>
             <a:fld id="{D37E09BB-0EE2-4AA1-9043-B532D0F5CCDE}" type="slidenum">
               <a:rPr lang="en-GB" smtClean="0"/>
-              <a:t>51</a:t>
+              <a:t>45</a:t>
             </a:fld>
             <a:endParaRPr lang="en-GB"/>
           </a:p>
@@ -6970,397 +7057,6 @@
           <a:chExt cx="0" cy="0"/>
         </a:xfrm>
       </p:grpSpPr>
-      <p:pic>
-        <p:nvPicPr>
-          <p:cNvPr id="4" name="Picture 3">
-            <a:extLst>
-              <a:ext uri="{FF2B5EF4-FFF2-40B4-BE49-F238E27FC236}">
-                <a16:creationId xmlns:a16="http://schemas.microsoft.com/office/drawing/2014/main" id="{F8A9D6BC-45C2-4232-8C72-1AD525EB63AB}"/>
-              </a:ext>
-            </a:extLst>
-          </p:cNvPr>
-          <p:cNvPicPr>
-            <a:picLocks noChangeAspect="1"/>
-          </p:cNvPicPr>
-          <p:nvPr/>
-        </p:nvPicPr>
-        <p:blipFill>
-          <a:blip r:embed="rId2"/>
-          <a:stretch>
-            <a:fillRect/>
-          </a:stretch>
-        </p:blipFill>
-        <p:spPr>
-          <a:xfrm>
-            <a:off x="2033673" y="452718"/>
-            <a:ext cx="6936053" cy="5961888"/>
-          </a:xfrm>
-          <a:prstGeom prst="rect">
-            <a:avLst/>
-          </a:prstGeom>
-        </p:spPr>
-      </p:pic>
-    </p:spTree>
-    <p:extLst>
-      <p:ext uri="{BB962C8B-B14F-4D97-AF65-F5344CB8AC3E}">
-        <p14:creationId xmlns:p14="http://schemas.microsoft.com/office/powerpoint/2010/main" val="1436115805"/>
-      </p:ext>
-    </p:extLst>
-  </p:cSld>
-  <p:clrMapOvr>
-    <a:masterClrMapping/>
-  </p:clrMapOvr>
-</p:sld>
-</file>
-
-<file path=ppt/slides/slide11.xml><?xml version="1.0" encoding="utf-8"?>
-<p:sld xmlns:a="http://schemas.openxmlformats.org/drawingml/2006/main" xmlns:r="http://schemas.openxmlformats.org/officeDocument/2006/relationships" xmlns:p="http://schemas.openxmlformats.org/presentationml/2006/main">
-  <p:cSld>
-    <p:spTree>
-      <p:nvGrpSpPr>
-        <p:cNvPr id="1" name=""/>
-        <p:cNvGrpSpPr/>
-        <p:nvPr/>
-      </p:nvGrpSpPr>
-      <p:grpSpPr>
-        <a:xfrm>
-          <a:off x="0" y="0"/>
-          <a:ext cx="0" cy="0"/>
-          <a:chOff x="0" y="0"/>
-          <a:chExt cx="0" cy="0"/>
-        </a:xfrm>
-      </p:grpSpPr>
-      <p:sp>
-        <p:nvSpPr>
-          <p:cNvPr id="2" name="Title 1">
-            <a:extLst>
-              <a:ext uri="{FF2B5EF4-FFF2-40B4-BE49-F238E27FC236}">
-                <a16:creationId xmlns:a16="http://schemas.microsoft.com/office/drawing/2014/main" id="{D96F9D9A-13C5-47AE-BCA3-DF2C9B8BB1F9}"/>
-              </a:ext>
-            </a:extLst>
-          </p:cNvPr>
-          <p:cNvSpPr>
-            <a:spLocks noGrp="1"/>
-          </p:cNvSpPr>
-          <p:nvPr>
-            <p:ph type="title"/>
-          </p:nvPr>
-        </p:nvSpPr>
-        <p:spPr/>
-        <p:txBody>
-          <a:bodyPr/>
-          <a:lstStyle/>
-          <a:p>
-            <a:endParaRPr lang="en-GB"/>
-          </a:p>
-        </p:txBody>
-      </p:sp>
-      <p:sp>
-        <p:nvSpPr>
-          <p:cNvPr id="3" name="Content Placeholder 2">
-            <a:extLst>
-              <a:ext uri="{FF2B5EF4-FFF2-40B4-BE49-F238E27FC236}">
-                <a16:creationId xmlns:a16="http://schemas.microsoft.com/office/drawing/2014/main" id="{77444049-118A-48DD-8CD6-1A290C8414EB}"/>
-              </a:ext>
-            </a:extLst>
-          </p:cNvPr>
-          <p:cNvSpPr>
-            <a:spLocks noGrp="1"/>
-          </p:cNvSpPr>
-          <p:nvPr>
-            <p:ph idx="1"/>
-          </p:nvPr>
-        </p:nvSpPr>
-        <p:spPr/>
-        <p:txBody>
-          <a:bodyPr/>
-          <a:lstStyle/>
-          <a:p>
-            <a:endParaRPr lang="en-GB"/>
-          </a:p>
-        </p:txBody>
-      </p:sp>
-      <p:pic>
-        <p:nvPicPr>
-          <p:cNvPr id="4" name="Picture 3">
-            <a:extLst>
-              <a:ext uri="{FF2B5EF4-FFF2-40B4-BE49-F238E27FC236}">
-                <a16:creationId xmlns:a16="http://schemas.microsoft.com/office/drawing/2014/main" id="{C87FAF9F-E336-476A-B133-83D004781CA0}"/>
-              </a:ext>
-            </a:extLst>
-          </p:cNvPr>
-          <p:cNvPicPr>
-            <a:picLocks noChangeAspect="1"/>
-          </p:cNvPicPr>
-          <p:nvPr/>
-        </p:nvPicPr>
-        <p:blipFill>
-          <a:blip r:embed="rId2"/>
-          <a:stretch>
-            <a:fillRect/>
-          </a:stretch>
-        </p:blipFill>
-        <p:spPr>
-          <a:xfrm>
-            <a:off x="477278" y="734196"/>
-            <a:ext cx="10680404" cy="4861932"/>
-          </a:xfrm>
-          <a:prstGeom prst="rect">
-            <a:avLst/>
-          </a:prstGeom>
-        </p:spPr>
-      </p:pic>
-    </p:spTree>
-    <p:extLst>
-      <p:ext uri="{BB962C8B-B14F-4D97-AF65-F5344CB8AC3E}">
-        <p14:creationId xmlns:p14="http://schemas.microsoft.com/office/powerpoint/2010/main" val="1641299604"/>
-      </p:ext>
-    </p:extLst>
-  </p:cSld>
-  <p:clrMapOvr>
-    <a:masterClrMapping/>
-  </p:clrMapOvr>
-</p:sld>
-</file>
-
-<file path=ppt/slides/slide12.xml><?xml version="1.0" encoding="utf-8"?>
-<p:sld xmlns:a="http://schemas.openxmlformats.org/drawingml/2006/main" xmlns:r="http://schemas.openxmlformats.org/officeDocument/2006/relationships" xmlns:p="http://schemas.openxmlformats.org/presentationml/2006/main">
-  <p:cSld>
-    <p:spTree>
-      <p:nvGrpSpPr>
-        <p:cNvPr id="1" name=""/>
-        <p:cNvGrpSpPr/>
-        <p:nvPr/>
-      </p:nvGrpSpPr>
-      <p:grpSpPr>
-        <a:xfrm>
-          <a:off x="0" y="0"/>
-          <a:ext cx="0" cy="0"/>
-          <a:chOff x="0" y="0"/>
-          <a:chExt cx="0" cy="0"/>
-        </a:xfrm>
-      </p:grpSpPr>
-      <p:pic>
-        <p:nvPicPr>
-          <p:cNvPr id="4" name="Picture 3">
-            <a:extLst>
-              <a:ext uri="{FF2B5EF4-FFF2-40B4-BE49-F238E27FC236}">
-                <a16:creationId xmlns:a16="http://schemas.microsoft.com/office/drawing/2014/main" id="{DACF5CE5-12F7-4B9F-BBCA-E027E35F3765}"/>
-              </a:ext>
-            </a:extLst>
-          </p:cNvPr>
-          <p:cNvPicPr>
-            <a:picLocks noChangeAspect="1"/>
-          </p:cNvPicPr>
-          <p:nvPr/>
-        </p:nvPicPr>
-        <p:blipFill>
-          <a:blip r:embed="rId2"/>
-          <a:stretch>
-            <a:fillRect/>
-          </a:stretch>
-        </p:blipFill>
-        <p:spPr>
-          <a:xfrm>
-            <a:off x="138683" y="1220814"/>
-            <a:ext cx="5868925" cy="4137558"/>
-          </a:xfrm>
-          <a:prstGeom prst="rect">
-            <a:avLst/>
-          </a:prstGeom>
-        </p:spPr>
-      </p:pic>
-      <p:pic>
-        <p:nvPicPr>
-          <p:cNvPr id="5" name="Picture 4">
-            <a:extLst>
-              <a:ext uri="{FF2B5EF4-FFF2-40B4-BE49-F238E27FC236}">
-                <a16:creationId xmlns:a16="http://schemas.microsoft.com/office/drawing/2014/main" id="{89DD3ACB-5B58-439B-B608-639A9F8458A7}"/>
-              </a:ext>
-            </a:extLst>
-          </p:cNvPr>
-          <p:cNvPicPr>
-            <a:picLocks noChangeAspect="1"/>
-          </p:cNvPicPr>
-          <p:nvPr/>
-        </p:nvPicPr>
-        <p:blipFill>
-          <a:blip r:embed="rId3"/>
-          <a:stretch>
-            <a:fillRect/>
-          </a:stretch>
-        </p:blipFill>
-        <p:spPr>
-          <a:xfrm>
-            <a:off x="6202265" y="1704213"/>
-            <a:ext cx="5851052" cy="3170759"/>
-          </a:xfrm>
-          <a:prstGeom prst="rect">
-            <a:avLst/>
-          </a:prstGeom>
-        </p:spPr>
-      </p:pic>
-    </p:spTree>
-    <p:extLst>
-      <p:ext uri="{BB962C8B-B14F-4D97-AF65-F5344CB8AC3E}">
-        <p14:creationId xmlns:p14="http://schemas.microsoft.com/office/powerpoint/2010/main" val="2342056207"/>
-      </p:ext>
-    </p:extLst>
-  </p:cSld>
-  <p:clrMapOvr>
-    <a:masterClrMapping/>
-  </p:clrMapOvr>
-</p:sld>
-</file>
-
-<file path=ppt/slides/slide13.xml><?xml version="1.0" encoding="utf-8"?>
-<p:sld xmlns:a="http://schemas.openxmlformats.org/drawingml/2006/main" xmlns:r="http://schemas.openxmlformats.org/officeDocument/2006/relationships" xmlns:p="http://schemas.openxmlformats.org/presentationml/2006/main">
-  <p:cSld>
-    <p:spTree>
-      <p:nvGrpSpPr>
-        <p:cNvPr id="1" name=""/>
-        <p:cNvGrpSpPr/>
-        <p:nvPr/>
-      </p:nvGrpSpPr>
-      <p:grpSpPr>
-        <a:xfrm>
-          <a:off x="0" y="0"/>
-          <a:ext cx="0" cy="0"/>
-          <a:chOff x="0" y="0"/>
-          <a:chExt cx="0" cy="0"/>
-        </a:xfrm>
-      </p:grpSpPr>
-      <p:pic>
-        <p:nvPicPr>
-          <p:cNvPr id="4" name="Picture 3">
-            <a:extLst>
-              <a:ext uri="{FF2B5EF4-FFF2-40B4-BE49-F238E27FC236}">
-                <a16:creationId xmlns:a16="http://schemas.microsoft.com/office/drawing/2014/main" id="{24975553-3A0B-4916-959B-7804563D73D8}"/>
-              </a:ext>
-            </a:extLst>
-          </p:cNvPr>
-          <p:cNvPicPr>
-            <a:picLocks noChangeAspect="1"/>
-          </p:cNvPicPr>
-          <p:nvPr/>
-        </p:nvPicPr>
-        <p:blipFill>
-          <a:blip r:embed="rId2"/>
-          <a:stretch>
-            <a:fillRect/>
-          </a:stretch>
-        </p:blipFill>
-        <p:spPr>
-          <a:xfrm>
-            <a:off x="2286099" y="534924"/>
-            <a:ext cx="6610513" cy="5788152"/>
-          </a:xfrm>
-          <a:prstGeom prst="rect">
-            <a:avLst/>
-          </a:prstGeom>
-        </p:spPr>
-      </p:pic>
-    </p:spTree>
-    <p:extLst>
-      <p:ext uri="{BB962C8B-B14F-4D97-AF65-F5344CB8AC3E}">
-        <p14:creationId xmlns:p14="http://schemas.microsoft.com/office/powerpoint/2010/main" val="3809960027"/>
-      </p:ext>
-    </p:extLst>
-  </p:cSld>
-  <p:clrMapOvr>
-    <a:masterClrMapping/>
-  </p:clrMapOvr>
-</p:sld>
-</file>
-
-<file path=ppt/slides/slide14.xml><?xml version="1.0" encoding="utf-8"?>
-<p:sld xmlns:a="http://schemas.openxmlformats.org/drawingml/2006/main" xmlns:r="http://schemas.openxmlformats.org/officeDocument/2006/relationships" xmlns:p="http://schemas.openxmlformats.org/presentationml/2006/main">
-  <p:cSld>
-    <p:spTree>
-      <p:nvGrpSpPr>
-        <p:cNvPr id="1" name=""/>
-        <p:cNvGrpSpPr/>
-        <p:nvPr/>
-      </p:nvGrpSpPr>
-      <p:grpSpPr>
-        <a:xfrm>
-          <a:off x="0" y="0"/>
-          <a:ext cx="0" cy="0"/>
-          <a:chOff x="0" y="0"/>
-          <a:chExt cx="0" cy="0"/>
-        </a:xfrm>
-      </p:grpSpPr>
-      <p:sp>
-        <p:nvSpPr>
-          <p:cNvPr id="2" name="Title 1">
-            <a:extLst>
-              <a:ext uri="{FF2B5EF4-FFF2-40B4-BE49-F238E27FC236}">
-                <a16:creationId xmlns:a16="http://schemas.microsoft.com/office/drawing/2014/main" id="{2C89FB05-C6B7-4F88-902F-3BEFF42B997F}"/>
-              </a:ext>
-            </a:extLst>
-          </p:cNvPr>
-          <p:cNvSpPr>
-            <a:spLocks noGrp="1"/>
-          </p:cNvSpPr>
-          <p:nvPr>
-            <p:ph type="title"/>
-          </p:nvPr>
-        </p:nvSpPr>
-        <p:spPr>
-          <a:xfrm>
-            <a:off x="959160" y="1420125"/>
-            <a:ext cx="10273679" cy="3708466"/>
-          </a:xfrm>
-        </p:spPr>
-        <p:txBody>
-          <a:bodyPr/>
-          <a:lstStyle/>
-          <a:p>
-            <a:pPr algn="ctr"/>
-            <a:r>
-              <a:rPr lang="en-GB" sz="7200" dirty="0"/>
-              <a:t>Part 2 </a:t>
-            </a:r>
-            <a:br>
-              <a:rPr lang="en-GB" sz="7200" dirty="0"/>
-            </a:br>
-            <a:r>
-              <a:rPr lang="en-GB" sz="7200" dirty="0"/>
-              <a:t>Modelling the life of 10 Gophers </a:t>
-            </a:r>
-          </a:p>
-        </p:txBody>
-      </p:sp>
-    </p:spTree>
-    <p:extLst>
-      <p:ext uri="{BB962C8B-B14F-4D97-AF65-F5344CB8AC3E}">
-        <p14:creationId xmlns:p14="http://schemas.microsoft.com/office/powerpoint/2010/main" val="557703418"/>
-      </p:ext>
-    </p:extLst>
-  </p:cSld>
-  <p:clrMapOvr>
-    <a:masterClrMapping/>
-  </p:clrMapOvr>
-</p:sld>
-</file>
-
-<file path=ppt/slides/slide15.xml><?xml version="1.0" encoding="utf-8"?>
-<p:sld xmlns:a="http://schemas.openxmlformats.org/drawingml/2006/main" xmlns:r="http://schemas.openxmlformats.org/officeDocument/2006/relationships" xmlns:p="http://schemas.openxmlformats.org/presentationml/2006/main">
-  <p:cSld>
-    <p:spTree>
-      <p:nvGrpSpPr>
-        <p:cNvPr id="1" name=""/>
-        <p:cNvGrpSpPr/>
-        <p:nvPr/>
-      </p:nvGrpSpPr>
-      <p:grpSpPr>
-        <a:xfrm>
-          <a:off x="0" y="0"/>
-          <a:ext cx="0" cy="0"/>
-          <a:chOff x="0" y="0"/>
-          <a:chExt cx="0" cy="0"/>
-        </a:xfrm>
-      </p:grpSpPr>
       <p:sp>
         <p:nvSpPr>
           <p:cNvPr id="2" name="Title 1">
@@ -7477,7 +7173,7 @@
 </p:sld>
 </file>
 
-<file path=ppt/slides/slide16.xml><?xml version="1.0" encoding="utf-8"?>
+<file path=ppt/slides/slide11.xml><?xml version="1.0" encoding="utf-8"?>
 <p:sld xmlns:a="http://schemas.openxmlformats.org/drawingml/2006/main" xmlns:r="http://schemas.openxmlformats.org/officeDocument/2006/relationships" xmlns:p="http://schemas.openxmlformats.org/presentationml/2006/main">
   <p:cSld>
     <p:spTree>
@@ -7607,7 +7303,7 @@
 </p:sld>
 </file>
 
-<file path=ppt/slides/slide17.xml><?xml version="1.0" encoding="utf-8"?>
+<file path=ppt/slides/slide12.xml><?xml version="1.0" encoding="utf-8"?>
 <p:sld xmlns:a="http://schemas.openxmlformats.org/drawingml/2006/main" xmlns:r="http://schemas.openxmlformats.org/officeDocument/2006/relationships" xmlns:p="http://schemas.openxmlformats.org/presentationml/2006/main">
   <p:cSld>
     <p:spTree>
@@ -7772,7 +7468,7 @@
 </p:sld>
 </file>
 
-<file path=ppt/slides/slide18.xml><?xml version="1.0" encoding="utf-8"?>
+<file path=ppt/slides/slide13.xml><?xml version="1.0" encoding="utf-8"?>
 <p:sld xmlns:a="http://schemas.openxmlformats.org/drawingml/2006/main" xmlns:r="http://schemas.openxmlformats.org/officeDocument/2006/relationships" xmlns:p="http://schemas.openxmlformats.org/presentationml/2006/main">
   <p:cSld>
     <p:spTree>
@@ -7893,7 +7589,7 @@
 </p:sld>
 </file>
 
-<file path=ppt/slides/slide19.xml><?xml version="1.0" encoding="utf-8"?>
+<file path=ppt/slides/slide14.xml><?xml version="1.0" encoding="utf-8"?>
 <p:sld xmlns:a="http://schemas.openxmlformats.org/drawingml/2006/main" xmlns:r="http://schemas.openxmlformats.org/officeDocument/2006/relationships" xmlns:p="http://schemas.openxmlformats.org/presentationml/2006/main">
   <p:cSld>
     <p:spTree>
@@ -8023,7 +7719,7 @@
 </p:sld>
 </file>
 
-<file path=ppt/slides/slide2.xml><?xml version="1.0" encoding="utf-8"?>
+<file path=ppt/slides/slide15.xml><?xml version="1.0" encoding="utf-8"?>
 <p:sld xmlns:a="http://schemas.openxmlformats.org/drawingml/2006/main" xmlns:r="http://schemas.openxmlformats.org/officeDocument/2006/relationships" xmlns:p="http://schemas.openxmlformats.org/presentationml/2006/main">
   <p:cSld>
     <p:spTree>
@@ -8045,146 +7741,6 @@
           <p:cNvPr id="2" name="Title 1">
             <a:extLst>
               <a:ext uri="{FF2B5EF4-FFF2-40B4-BE49-F238E27FC236}">
-                <a16:creationId xmlns:a16="http://schemas.microsoft.com/office/drawing/2014/main" id="{330D663D-0CCC-4FD2-BBF5-2A678F632B5A}"/>
-              </a:ext>
-            </a:extLst>
-          </p:cNvPr>
-          <p:cNvSpPr>
-            <a:spLocks noGrp="1"/>
-          </p:cNvSpPr>
-          <p:nvPr>
-            <p:ph type="title"/>
-          </p:nvPr>
-        </p:nvSpPr>
-        <p:spPr/>
-        <p:txBody>
-          <a:bodyPr/>
-          <a:lstStyle/>
-          <a:p>
-            <a:r>
-              <a:rPr lang="en-GB" dirty="0"/>
-              <a:t>Short Background</a:t>
-            </a:r>
-          </a:p>
-        </p:txBody>
-      </p:sp>
-      <p:sp>
-        <p:nvSpPr>
-          <p:cNvPr id="3" name="Content Placeholder 2">
-            <a:extLst>
-              <a:ext uri="{FF2B5EF4-FFF2-40B4-BE49-F238E27FC236}">
-                <a16:creationId xmlns:a16="http://schemas.microsoft.com/office/drawing/2014/main" id="{EC4E1DC8-B69C-4E53-96C2-E90EF0520051}"/>
-              </a:ext>
-            </a:extLst>
-          </p:cNvPr>
-          <p:cNvSpPr>
-            <a:spLocks noGrp="1"/>
-          </p:cNvSpPr>
-          <p:nvPr>
-            <p:ph idx="1"/>
-          </p:nvPr>
-        </p:nvSpPr>
-        <p:spPr/>
-        <p:txBody>
-          <a:bodyPr/>
-          <a:lstStyle/>
-          <a:p>
-            <a:r>
-              <a:rPr lang="en-GB" dirty="0"/>
-              <a:t>Recent-</a:t>
-            </a:r>
-            <a:r>
-              <a:rPr lang="en-GB" dirty="0" err="1"/>
-              <a:t>ish</a:t>
-            </a:r>
-            <a:r>
-              <a:rPr lang="en-GB" dirty="0"/>
-              <a:t> Graduate</a:t>
-            </a:r>
-          </a:p>
-          <a:p>
-            <a:endParaRPr lang="en-GB" dirty="0"/>
-          </a:p>
-          <a:p>
-            <a:r>
-              <a:rPr lang="en-GB" dirty="0"/>
-              <a:t>Discovered Go in September 2018 after being invited to the pre-drinks before </a:t>
-            </a:r>
-            <a:r>
-              <a:rPr lang="en-GB" dirty="0" err="1"/>
-              <a:t>GopherCon</a:t>
-            </a:r>
-            <a:r>
-              <a:rPr lang="en-GB" dirty="0"/>
-              <a:t> London. </a:t>
-            </a:r>
-          </a:p>
-          <a:p>
-            <a:pPr marL="0" indent="0">
-              <a:buNone/>
-            </a:pPr>
-            <a:endParaRPr lang="en-GB" dirty="0"/>
-          </a:p>
-          <a:p>
-            <a:r>
-              <a:rPr lang="en-GB" dirty="0"/>
-              <a:t>Been to most London Go </a:t>
-            </a:r>
-            <a:r>
-              <a:rPr lang="en-GB" dirty="0" err="1"/>
-              <a:t>MeetUps</a:t>
-            </a:r>
-            <a:r>
-              <a:rPr lang="en-GB" dirty="0"/>
-              <a:t> since.</a:t>
-            </a:r>
-          </a:p>
-          <a:p>
-            <a:endParaRPr lang="en-GB" dirty="0"/>
-          </a:p>
-          <a:p>
-            <a:r>
-              <a:rPr lang="en-GB" dirty="0"/>
-              <a:t>Have a Background in Java and C#.</a:t>
-            </a:r>
-          </a:p>
-        </p:txBody>
-      </p:sp>
-    </p:spTree>
-    <p:extLst>
-      <p:ext uri="{BB962C8B-B14F-4D97-AF65-F5344CB8AC3E}">
-        <p14:creationId xmlns:p14="http://schemas.microsoft.com/office/powerpoint/2010/main" val="3147919256"/>
-      </p:ext>
-    </p:extLst>
-  </p:cSld>
-  <p:clrMapOvr>
-    <a:masterClrMapping/>
-  </p:clrMapOvr>
-</p:sld>
-</file>
-
-<file path=ppt/slides/slide20.xml><?xml version="1.0" encoding="utf-8"?>
-<p:sld xmlns:a="http://schemas.openxmlformats.org/drawingml/2006/main" xmlns:r="http://schemas.openxmlformats.org/officeDocument/2006/relationships" xmlns:p="http://schemas.openxmlformats.org/presentationml/2006/main">
-  <p:cSld>
-    <p:spTree>
-      <p:nvGrpSpPr>
-        <p:cNvPr id="1" name=""/>
-        <p:cNvGrpSpPr/>
-        <p:nvPr/>
-      </p:nvGrpSpPr>
-      <p:grpSpPr>
-        <a:xfrm>
-          <a:off x="0" y="0"/>
-          <a:ext cx="0" cy="0"/>
-          <a:chOff x="0" y="0"/>
-          <a:chExt cx="0" cy="0"/>
-        </a:xfrm>
-      </p:grpSpPr>
-      <p:sp>
-        <p:nvSpPr>
-          <p:cNvPr id="2" name="Title 1">
-            <a:extLst>
-              <a:ext uri="{FF2B5EF4-FFF2-40B4-BE49-F238E27FC236}">
                 <a16:creationId xmlns:a16="http://schemas.microsoft.com/office/drawing/2014/main" id="{8EE80C47-6831-4E7C-A6B6-B5AF25EEA403}"/>
               </a:ext>
             </a:extLst>
@@ -8348,7 +7904,7 @@
 </p:sld>
 </file>
 
-<file path=ppt/slides/slide21.xml><?xml version="1.0" encoding="utf-8"?>
+<file path=ppt/slides/slide16.xml><?xml version="1.0" encoding="utf-8"?>
 <p:sld xmlns:a="http://schemas.openxmlformats.org/drawingml/2006/main" xmlns:r="http://schemas.openxmlformats.org/officeDocument/2006/relationships" xmlns:p="http://schemas.openxmlformats.org/presentationml/2006/main">
   <p:cSld>
     <p:spTree>
@@ -8493,7 +8049,7 @@
 </p:sld>
 </file>
 
-<file path=ppt/slides/slide22.xml><?xml version="1.0" encoding="utf-8"?>
+<file path=ppt/slides/slide17.xml><?xml version="1.0" encoding="utf-8"?>
 <p:sld xmlns:a="http://schemas.openxmlformats.org/drawingml/2006/main" xmlns:r="http://schemas.openxmlformats.org/officeDocument/2006/relationships" xmlns:p="http://schemas.openxmlformats.org/presentationml/2006/main">
   <p:cSld>
     <p:spTree>
@@ -8586,7 +8142,7 @@
 </p:sld>
 </file>
 
-<file path=ppt/slides/slide23.xml><?xml version="1.0" encoding="utf-8"?>
+<file path=ppt/slides/slide18.xml><?xml version="1.0" encoding="utf-8"?>
 <p:sld xmlns:a="http://schemas.openxmlformats.org/drawingml/2006/main" xmlns:r="http://schemas.openxmlformats.org/officeDocument/2006/relationships" xmlns:p="http://schemas.openxmlformats.org/presentationml/2006/main">
   <p:cSld>
     <p:spTree>
@@ -8718,7 +8274,7 @@
 </p:sld>
 </file>
 
-<file path=ppt/slides/slide24.xml><?xml version="1.0" encoding="utf-8"?>
+<file path=ppt/slides/slide19.xml><?xml version="1.0" encoding="utf-8"?>
 <p:sld xmlns:a="http://schemas.openxmlformats.org/drawingml/2006/main" xmlns:r="http://schemas.openxmlformats.org/officeDocument/2006/relationships" xmlns:p="http://schemas.openxmlformats.org/presentationml/2006/main">
   <p:cSld>
     <p:spTree>
@@ -8822,7 +8378,147 @@
 </p:sld>
 </file>
 
-<file path=ppt/slides/slide25.xml><?xml version="1.0" encoding="utf-8"?>
+<file path=ppt/slides/slide2.xml><?xml version="1.0" encoding="utf-8"?>
+<p:sld xmlns:a="http://schemas.openxmlformats.org/drawingml/2006/main" xmlns:r="http://schemas.openxmlformats.org/officeDocument/2006/relationships" xmlns:p="http://schemas.openxmlformats.org/presentationml/2006/main">
+  <p:cSld>
+    <p:spTree>
+      <p:nvGrpSpPr>
+        <p:cNvPr id="1" name=""/>
+        <p:cNvGrpSpPr/>
+        <p:nvPr/>
+      </p:nvGrpSpPr>
+      <p:grpSpPr>
+        <a:xfrm>
+          <a:off x="0" y="0"/>
+          <a:ext cx="0" cy="0"/>
+          <a:chOff x="0" y="0"/>
+          <a:chExt cx="0" cy="0"/>
+        </a:xfrm>
+      </p:grpSpPr>
+      <p:sp>
+        <p:nvSpPr>
+          <p:cNvPr id="2" name="Title 1">
+            <a:extLst>
+              <a:ext uri="{FF2B5EF4-FFF2-40B4-BE49-F238E27FC236}">
+                <a16:creationId xmlns:a16="http://schemas.microsoft.com/office/drawing/2014/main" id="{330D663D-0CCC-4FD2-BBF5-2A678F632B5A}"/>
+              </a:ext>
+            </a:extLst>
+          </p:cNvPr>
+          <p:cNvSpPr>
+            <a:spLocks noGrp="1"/>
+          </p:cNvSpPr>
+          <p:nvPr>
+            <p:ph type="title"/>
+          </p:nvPr>
+        </p:nvSpPr>
+        <p:spPr/>
+        <p:txBody>
+          <a:bodyPr/>
+          <a:lstStyle/>
+          <a:p>
+            <a:r>
+              <a:rPr lang="en-GB" dirty="0"/>
+              <a:t>Short Background</a:t>
+            </a:r>
+          </a:p>
+        </p:txBody>
+      </p:sp>
+      <p:sp>
+        <p:nvSpPr>
+          <p:cNvPr id="3" name="Content Placeholder 2">
+            <a:extLst>
+              <a:ext uri="{FF2B5EF4-FFF2-40B4-BE49-F238E27FC236}">
+                <a16:creationId xmlns:a16="http://schemas.microsoft.com/office/drawing/2014/main" id="{EC4E1DC8-B69C-4E53-96C2-E90EF0520051}"/>
+              </a:ext>
+            </a:extLst>
+          </p:cNvPr>
+          <p:cNvSpPr>
+            <a:spLocks noGrp="1"/>
+          </p:cNvSpPr>
+          <p:nvPr>
+            <p:ph idx="1"/>
+          </p:nvPr>
+        </p:nvSpPr>
+        <p:spPr/>
+        <p:txBody>
+          <a:bodyPr/>
+          <a:lstStyle/>
+          <a:p>
+            <a:r>
+              <a:rPr lang="en-GB" dirty="0"/>
+              <a:t>Recent-</a:t>
+            </a:r>
+            <a:r>
+              <a:rPr lang="en-GB" dirty="0" err="1"/>
+              <a:t>ish</a:t>
+            </a:r>
+            <a:r>
+              <a:rPr lang="en-GB" dirty="0"/>
+              <a:t> Graduate</a:t>
+            </a:r>
+          </a:p>
+          <a:p>
+            <a:endParaRPr lang="en-GB" dirty="0"/>
+          </a:p>
+          <a:p>
+            <a:r>
+              <a:rPr lang="en-GB" dirty="0"/>
+              <a:t>Discovered Go in September 2018 after being invited to the pre-drinks before </a:t>
+            </a:r>
+            <a:r>
+              <a:rPr lang="en-GB" dirty="0" err="1"/>
+              <a:t>GopherCon</a:t>
+            </a:r>
+            <a:r>
+              <a:rPr lang="en-GB" dirty="0"/>
+              <a:t> London. </a:t>
+            </a:r>
+          </a:p>
+          <a:p>
+            <a:pPr marL="0" indent="0">
+              <a:buNone/>
+            </a:pPr>
+            <a:endParaRPr lang="en-GB" dirty="0"/>
+          </a:p>
+          <a:p>
+            <a:r>
+              <a:rPr lang="en-GB" dirty="0"/>
+              <a:t>Been to most London Go </a:t>
+            </a:r>
+            <a:r>
+              <a:rPr lang="en-GB" dirty="0" err="1"/>
+              <a:t>MeetUps</a:t>
+            </a:r>
+            <a:r>
+              <a:rPr lang="en-GB" dirty="0"/>
+              <a:t> since.</a:t>
+            </a:r>
+          </a:p>
+          <a:p>
+            <a:endParaRPr lang="en-GB" dirty="0"/>
+          </a:p>
+          <a:p>
+            <a:r>
+              <a:rPr lang="en-GB" dirty="0"/>
+              <a:t>Have a Background in Java and C#.</a:t>
+            </a:r>
+          </a:p>
+        </p:txBody>
+      </p:sp>
+    </p:spTree>
+    <p:extLst>
+      <p:ext uri="{BB962C8B-B14F-4D97-AF65-F5344CB8AC3E}">
+        <p14:creationId xmlns:p14="http://schemas.microsoft.com/office/powerpoint/2010/main" val="3147919256"/>
+      </p:ext>
+    </p:extLst>
+  </p:cSld>
+  <p:clrMapOvr>
+    <a:masterClrMapping/>
+  </p:clrMapOvr>
+</p:sld>
+</file>
+
+<file path=ppt/slides/slide20.xml><?xml version="1.0" encoding="utf-8"?>
 <p:sld xmlns:a="http://schemas.openxmlformats.org/drawingml/2006/main" xmlns:r="http://schemas.openxmlformats.org/officeDocument/2006/relationships" xmlns:p="http://schemas.openxmlformats.org/presentationml/2006/main">
   <p:cSld>
     <p:spTree>
@@ -9240,7 +8936,7 @@
 </p:sld>
 </file>
 
-<file path=ppt/slides/slide26.xml><?xml version="1.0" encoding="utf-8"?>
+<file path=ppt/slides/slide21.xml><?xml version="1.0" encoding="utf-8"?>
 <p:sld xmlns:a="http://schemas.openxmlformats.org/drawingml/2006/main" xmlns:r="http://schemas.openxmlformats.org/officeDocument/2006/relationships" xmlns:p="http://schemas.openxmlformats.org/presentationml/2006/main">
   <p:cSld>
     <p:spTree>
@@ -9636,7 +9332,7 @@
 </p:sld>
 </file>
 
-<file path=ppt/slides/slide27.xml><?xml version="1.0" encoding="utf-8"?>
+<file path=ppt/slides/slide22.xml><?xml version="1.0" encoding="utf-8"?>
 <p:sld xmlns:a="http://schemas.openxmlformats.org/drawingml/2006/main" xmlns:r="http://schemas.openxmlformats.org/officeDocument/2006/relationships" xmlns:p="http://schemas.openxmlformats.org/presentationml/2006/main">
   <p:cSld>
     <p:spTree>
@@ -9739,7 +9435,7 @@
 </p:sld>
 </file>
 
-<file path=ppt/slides/slide28.xml><?xml version="1.0" encoding="utf-8"?>
+<file path=ppt/slides/slide23.xml><?xml version="1.0" encoding="utf-8"?>
 <p:sld xmlns:a="http://schemas.openxmlformats.org/drawingml/2006/main" xmlns:r="http://schemas.openxmlformats.org/officeDocument/2006/relationships" xmlns:p="http://schemas.openxmlformats.org/presentationml/2006/main">
   <p:cSld>
     <p:spTree>
@@ -9832,7 +9528,7 @@
 </p:sld>
 </file>
 
-<file path=ppt/slides/slide29.xml><?xml version="1.0" encoding="utf-8"?>
+<file path=ppt/slides/slide24.xml><?xml version="1.0" encoding="utf-8"?>
 <p:sld xmlns:a="http://schemas.openxmlformats.org/drawingml/2006/main" xmlns:r="http://schemas.openxmlformats.org/officeDocument/2006/relationships" xmlns:p="http://schemas.openxmlformats.org/presentationml/2006/main">
   <p:cSld>
     <p:spTree>
@@ -10040,111 +9736,7 @@
 </p:sld>
 </file>
 
-<file path=ppt/slides/slide3.xml><?xml version="1.0" encoding="utf-8"?>
-<p:sld xmlns:a="http://schemas.openxmlformats.org/drawingml/2006/main" xmlns:r="http://schemas.openxmlformats.org/officeDocument/2006/relationships" xmlns:p="http://schemas.openxmlformats.org/presentationml/2006/main">
-  <p:cSld>
-    <p:spTree>
-      <p:nvGrpSpPr>
-        <p:cNvPr id="1" name=""/>
-        <p:cNvGrpSpPr/>
-        <p:nvPr/>
-      </p:nvGrpSpPr>
-      <p:grpSpPr>
-        <a:xfrm>
-          <a:off x="0" y="0"/>
-          <a:ext cx="0" cy="0"/>
-          <a:chOff x="0" y="0"/>
-          <a:chExt cx="0" cy="0"/>
-        </a:xfrm>
-      </p:grpSpPr>
-      <p:sp>
-        <p:nvSpPr>
-          <p:cNvPr id="2" name="Title 1">
-            <a:extLst>
-              <a:ext uri="{FF2B5EF4-FFF2-40B4-BE49-F238E27FC236}">
-                <a16:creationId xmlns:a16="http://schemas.microsoft.com/office/drawing/2014/main" id="{B28B1B21-C9ED-4BEB-9BF9-FCC6429558A2}"/>
-              </a:ext>
-            </a:extLst>
-          </p:cNvPr>
-          <p:cNvSpPr>
-            <a:spLocks noGrp="1"/>
-          </p:cNvSpPr>
-          <p:nvPr>
-            <p:ph type="title"/>
-          </p:nvPr>
-        </p:nvSpPr>
-        <p:spPr/>
-        <p:txBody>
-          <a:bodyPr/>
-          <a:lstStyle/>
-          <a:p>
-            <a:r>
-              <a:rPr lang="en-GB" dirty="0"/>
-              <a:t>Plan for the next ‘x’ minutes</a:t>
-            </a:r>
-          </a:p>
-        </p:txBody>
-      </p:sp>
-      <p:sp>
-        <p:nvSpPr>
-          <p:cNvPr id="3" name="Content Placeholder 2">
-            <a:extLst>
-              <a:ext uri="{FF2B5EF4-FFF2-40B4-BE49-F238E27FC236}">
-                <a16:creationId xmlns:a16="http://schemas.microsoft.com/office/drawing/2014/main" id="{BFEEA1E6-BC10-414E-A147-7431DFDA4A06}"/>
-              </a:ext>
-            </a:extLst>
-          </p:cNvPr>
-          <p:cNvSpPr>
-            <a:spLocks noGrp="1"/>
-          </p:cNvSpPr>
-          <p:nvPr>
-            <p:ph idx="1"/>
-          </p:nvPr>
-        </p:nvSpPr>
-        <p:spPr/>
-        <p:txBody>
-          <a:bodyPr/>
-          <a:lstStyle/>
-          <a:p>
-            <a:r>
-              <a:rPr lang="en-GB" dirty="0"/>
-              <a:t>Talk about my experience with my first small Go project. </a:t>
-            </a:r>
-          </a:p>
-          <a:p>
-            <a:endParaRPr lang="en-GB" dirty="0"/>
-          </a:p>
-          <a:p>
-            <a:r>
-              <a:rPr lang="en-GB" dirty="0"/>
-              <a:t>Create a list of things I’ve learnt and mistakes I encountered. </a:t>
-            </a:r>
-          </a:p>
-          <a:p>
-            <a:endParaRPr lang="en-GB" dirty="0"/>
-          </a:p>
-          <a:p>
-            <a:r>
-              <a:rPr lang="en-GB" dirty="0"/>
-              <a:t>Showcase the thoughts of a developer when starting to learn a new language. </a:t>
-            </a:r>
-          </a:p>
-        </p:txBody>
-      </p:sp>
-    </p:spTree>
-    <p:extLst>
-      <p:ext uri="{BB962C8B-B14F-4D97-AF65-F5344CB8AC3E}">
-        <p14:creationId xmlns:p14="http://schemas.microsoft.com/office/powerpoint/2010/main" val="340441809"/>
-      </p:ext>
-    </p:extLst>
-  </p:cSld>
-  <p:clrMapOvr>
-    <a:masterClrMapping/>
-  </p:clrMapOvr>
-</p:sld>
-</file>
-
-<file path=ppt/slides/slide30.xml><?xml version="1.0" encoding="utf-8"?>
+<file path=ppt/slides/slide25.xml><?xml version="1.0" encoding="utf-8"?>
 <p:sld xmlns:a="http://schemas.openxmlformats.org/drawingml/2006/main" xmlns:r="http://schemas.openxmlformats.org/officeDocument/2006/relationships" xmlns:p="http://schemas.openxmlformats.org/presentationml/2006/main">
   <p:cSld>
     <p:spTree>
@@ -10393,7 +9985,7 @@
 </p:sld>
 </file>
 
-<file path=ppt/slides/slide31.xml><?xml version="1.0" encoding="utf-8"?>
+<file path=ppt/slides/slide26.xml><?xml version="1.0" encoding="utf-8"?>
 <p:sld xmlns:a="http://schemas.openxmlformats.org/drawingml/2006/main" xmlns:r="http://schemas.openxmlformats.org/officeDocument/2006/relationships" xmlns:p="http://schemas.openxmlformats.org/presentationml/2006/main">
   <p:cSld>
     <p:spTree>
@@ -10536,7 +10128,7 @@
 </p:sld>
 </file>
 
-<file path=ppt/slides/slide32.xml><?xml version="1.0" encoding="utf-8"?>
+<file path=ppt/slides/slide27.xml><?xml version="1.0" encoding="utf-8"?>
 <p:sld xmlns:a="http://schemas.openxmlformats.org/drawingml/2006/main" xmlns:r="http://schemas.openxmlformats.org/officeDocument/2006/relationships" xmlns:p="http://schemas.openxmlformats.org/presentationml/2006/main">
   <p:cSld>
     <p:spTree>
@@ -10596,7 +10188,7 @@
 </p:sld>
 </file>
 
-<file path=ppt/slides/slide33.xml><?xml version="1.0" encoding="utf-8"?>
+<file path=ppt/slides/slide28.xml><?xml version="1.0" encoding="utf-8"?>
 <p:sld xmlns:a="http://schemas.openxmlformats.org/drawingml/2006/main" xmlns:r="http://schemas.openxmlformats.org/officeDocument/2006/relationships" xmlns:p="http://schemas.openxmlformats.org/presentationml/2006/main">
   <p:cSld>
     <p:spTree>
@@ -10754,7 +10346,7 @@
 </p:sld>
 </file>
 
-<file path=ppt/slides/slide34.xml><?xml version="1.0" encoding="utf-8"?>
+<file path=ppt/slides/slide29.xml><?xml version="1.0" encoding="utf-8"?>
 <p:sld xmlns:a="http://schemas.openxmlformats.org/drawingml/2006/main" xmlns:r="http://schemas.openxmlformats.org/officeDocument/2006/relationships" xmlns:p="http://schemas.openxmlformats.org/presentationml/2006/main">
   <p:cSld>
     <p:spTree>
@@ -10973,7 +10565,111 @@
 </p:sld>
 </file>
 
-<file path=ppt/slides/slide35.xml><?xml version="1.0" encoding="utf-8"?>
+<file path=ppt/slides/slide3.xml><?xml version="1.0" encoding="utf-8"?>
+<p:sld xmlns:a="http://schemas.openxmlformats.org/drawingml/2006/main" xmlns:r="http://schemas.openxmlformats.org/officeDocument/2006/relationships" xmlns:p="http://schemas.openxmlformats.org/presentationml/2006/main">
+  <p:cSld>
+    <p:spTree>
+      <p:nvGrpSpPr>
+        <p:cNvPr id="1" name=""/>
+        <p:cNvGrpSpPr/>
+        <p:nvPr/>
+      </p:nvGrpSpPr>
+      <p:grpSpPr>
+        <a:xfrm>
+          <a:off x="0" y="0"/>
+          <a:ext cx="0" cy="0"/>
+          <a:chOff x="0" y="0"/>
+          <a:chExt cx="0" cy="0"/>
+        </a:xfrm>
+      </p:grpSpPr>
+      <p:sp>
+        <p:nvSpPr>
+          <p:cNvPr id="2" name="Title 1">
+            <a:extLst>
+              <a:ext uri="{FF2B5EF4-FFF2-40B4-BE49-F238E27FC236}">
+                <a16:creationId xmlns:a16="http://schemas.microsoft.com/office/drawing/2014/main" id="{B28B1B21-C9ED-4BEB-9BF9-FCC6429558A2}"/>
+              </a:ext>
+            </a:extLst>
+          </p:cNvPr>
+          <p:cNvSpPr>
+            <a:spLocks noGrp="1"/>
+          </p:cNvSpPr>
+          <p:nvPr>
+            <p:ph type="title"/>
+          </p:nvPr>
+        </p:nvSpPr>
+        <p:spPr/>
+        <p:txBody>
+          <a:bodyPr/>
+          <a:lstStyle/>
+          <a:p>
+            <a:r>
+              <a:rPr lang="en-GB" dirty="0"/>
+              <a:t>Plan for the next ‘x’ minutes</a:t>
+            </a:r>
+          </a:p>
+        </p:txBody>
+      </p:sp>
+      <p:sp>
+        <p:nvSpPr>
+          <p:cNvPr id="3" name="Content Placeholder 2">
+            <a:extLst>
+              <a:ext uri="{FF2B5EF4-FFF2-40B4-BE49-F238E27FC236}">
+                <a16:creationId xmlns:a16="http://schemas.microsoft.com/office/drawing/2014/main" id="{BFEEA1E6-BC10-414E-A147-7431DFDA4A06}"/>
+              </a:ext>
+            </a:extLst>
+          </p:cNvPr>
+          <p:cNvSpPr>
+            <a:spLocks noGrp="1"/>
+          </p:cNvSpPr>
+          <p:nvPr>
+            <p:ph idx="1"/>
+          </p:nvPr>
+        </p:nvSpPr>
+        <p:spPr/>
+        <p:txBody>
+          <a:bodyPr/>
+          <a:lstStyle/>
+          <a:p>
+            <a:r>
+              <a:rPr lang="en-GB" dirty="0"/>
+              <a:t>Talk about my experience with my first small Go project. </a:t>
+            </a:r>
+          </a:p>
+          <a:p>
+            <a:endParaRPr lang="en-GB" dirty="0"/>
+          </a:p>
+          <a:p>
+            <a:r>
+              <a:rPr lang="en-GB" dirty="0"/>
+              <a:t>Create a list of things I’ve learnt and mistakes I encountered. </a:t>
+            </a:r>
+          </a:p>
+          <a:p>
+            <a:endParaRPr lang="en-GB" dirty="0"/>
+          </a:p>
+          <a:p>
+            <a:r>
+              <a:rPr lang="en-GB" dirty="0"/>
+              <a:t>Showcase the thoughts of a developer when starting to learn a new language. </a:t>
+            </a:r>
+          </a:p>
+        </p:txBody>
+      </p:sp>
+    </p:spTree>
+    <p:extLst>
+      <p:ext uri="{BB962C8B-B14F-4D97-AF65-F5344CB8AC3E}">
+        <p14:creationId xmlns:p14="http://schemas.microsoft.com/office/powerpoint/2010/main" val="340441809"/>
+      </p:ext>
+    </p:extLst>
+  </p:cSld>
+  <p:clrMapOvr>
+    <a:masterClrMapping/>
+  </p:clrMapOvr>
+</p:sld>
+</file>
+
+<file path=ppt/slides/slide30.xml><?xml version="1.0" encoding="utf-8"?>
 <p:sld xmlns:a="http://schemas.openxmlformats.org/drawingml/2006/main" xmlns:r="http://schemas.openxmlformats.org/officeDocument/2006/relationships" xmlns:p="http://schemas.openxmlformats.org/presentationml/2006/main">
   <p:cSld>
     <p:spTree>
@@ -11101,7 +10797,7 @@
 </p:sld>
 </file>
 
-<file path=ppt/slides/slide36.xml><?xml version="1.0" encoding="utf-8"?>
+<file path=ppt/slides/slide31.xml><?xml version="1.0" encoding="utf-8"?>
 <p:sld xmlns:a="http://schemas.openxmlformats.org/drawingml/2006/main" xmlns:r="http://schemas.openxmlformats.org/officeDocument/2006/relationships" xmlns:p="http://schemas.openxmlformats.org/presentationml/2006/main">
   <p:cSld>
     <p:spTree>
@@ -11205,7 +10901,7 @@
 </p:sld>
 </file>
 
-<file path=ppt/slides/slide37.xml><?xml version="1.0" encoding="utf-8"?>
+<file path=ppt/slides/slide32.xml><?xml version="1.0" encoding="utf-8"?>
 <p:sld xmlns:a="http://schemas.openxmlformats.org/drawingml/2006/main" xmlns:r="http://schemas.openxmlformats.org/officeDocument/2006/relationships" xmlns:p="http://schemas.openxmlformats.org/presentationml/2006/main">
   <p:cSld>
     <p:spTree>
@@ -11389,7 +11085,7 @@
 </p:sld>
 </file>
 
-<file path=ppt/slides/slide38.xml><?xml version="1.0" encoding="utf-8"?>
+<file path=ppt/slides/slide33.xml><?xml version="1.0" encoding="utf-8"?>
 <p:sld xmlns:a="http://schemas.openxmlformats.org/drawingml/2006/main" xmlns:r="http://schemas.openxmlformats.org/officeDocument/2006/relationships" xmlns:p="http://schemas.openxmlformats.org/presentationml/2006/main">
   <p:cSld>
     <p:spTree>
@@ -11531,7 +11227,7 @@
 </p:sld>
 </file>
 
-<file path=ppt/slides/slide39.xml><?xml version="1.0" encoding="utf-8"?>
+<file path=ppt/slides/slide34.xml><?xml version="1.0" encoding="utf-8"?>
 <p:sld xmlns:a="http://schemas.openxmlformats.org/drawingml/2006/main" xmlns:r="http://schemas.openxmlformats.org/officeDocument/2006/relationships" xmlns:p="http://schemas.openxmlformats.org/presentationml/2006/main">
   <p:cSld>
     <p:spTree>
@@ -11680,78 +11376,7 @@
 </p:sld>
 </file>
 
-<file path=ppt/slides/slide4.xml><?xml version="1.0" encoding="utf-8"?>
-<p:sld xmlns:a="http://schemas.openxmlformats.org/drawingml/2006/main" xmlns:r="http://schemas.openxmlformats.org/officeDocument/2006/relationships" xmlns:p="http://schemas.openxmlformats.org/presentationml/2006/main">
-  <p:cSld>
-    <p:spTree>
-      <p:nvGrpSpPr>
-        <p:cNvPr id="1" name=""/>
-        <p:cNvGrpSpPr/>
-        <p:nvPr/>
-      </p:nvGrpSpPr>
-      <p:grpSpPr>
-        <a:xfrm>
-          <a:off x="0" y="0"/>
-          <a:ext cx="0" cy="0"/>
-          <a:chOff x="0" y="0"/>
-          <a:chExt cx="0" cy="0"/>
-        </a:xfrm>
-      </p:grpSpPr>
-      <p:sp>
-        <p:nvSpPr>
-          <p:cNvPr id="2" name="Title 1">
-            <a:extLst>
-              <a:ext uri="{FF2B5EF4-FFF2-40B4-BE49-F238E27FC236}">
-                <a16:creationId xmlns:a16="http://schemas.microsoft.com/office/drawing/2014/main" id="{2C89FB05-C6B7-4F88-902F-3BEFF42B997F}"/>
-              </a:ext>
-            </a:extLst>
-          </p:cNvPr>
-          <p:cNvSpPr>
-            <a:spLocks noGrp="1"/>
-          </p:cNvSpPr>
-          <p:nvPr>
-            <p:ph type="title"/>
-          </p:nvPr>
-        </p:nvSpPr>
-        <p:spPr>
-          <a:xfrm>
-            <a:off x="959160" y="1420125"/>
-            <a:ext cx="10273679" cy="3708466"/>
-          </a:xfrm>
-        </p:spPr>
-        <p:txBody>
-          <a:bodyPr/>
-          <a:lstStyle/>
-          <a:p>
-            <a:pPr algn="ctr"/>
-            <a:r>
-              <a:rPr lang="en-GB" sz="7200" dirty="0"/>
-              <a:t>Part 1 </a:t>
-            </a:r>
-            <a:br>
-              <a:rPr lang="en-GB" sz="7200" dirty="0"/>
-            </a:br>
-            <a:r>
-              <a:rPr lang="en-GB" sz="7200" dirty="0"/>
-              <a:t>The Idea</a:t>
-            </a:r>
-          </a:p>
-        </p:txBody>
-      </p:sp>
-    </p:spTree>
-    <p:extLst>
-      <p:ext uri="{BB962C8B-B14F-4D97-AF65-F5344CB8AC3E}">
-        <p14:creationId xmlns:p14="http://schemas.microsoft.com/office/powerpoint/2010/main" val="1808995500"/>
-      </p:ext>
-    </p:extLst>
-  </p:cSld>
-  <p:clrMapOvr>
-    <a:masterClrMapping/>
-  </p:clrMapOvr>
-</p:sld>
-</file>
-
-<file path=ppt/slides/slide40.xml><?xml version="1.0" encoding="utf-8"?>
+<file path=ppt/slides/slide35.xml><?xml version="1.0" encoding="utf-8"?>
 <p:sld xmlns:a="http://schemas.openxmlformats.org/drawingml/2006/main" xmlns:r="http://schemas.openxmlformats.org/officeDocument/2006/relationships" xmlns:p="http://schemas.openxmlformats.org/presentationml/2006/main">
   <p:cSld>
     <p:spTree>
@@ -11816,7 +11441,7 @@
 </p:sld>
 </file>
 
-<file path=ppt/slides/slide41.xml><?xml version="1.0" encoding="utf-8"?>
+<file path=ppt/slides/slide36.xml><?xml version="1.0" encoding="utf-8"?>
 <p:sld xmlns:a="http://schemas.openxmlformats.org/drawingml/2006/main" xmlns:r="http://schemas.openxmlformats.org/officeDocument/2006/relationships" xmlns:p="http://schemas.openxmlformats.org/presentationml/2006/main">
   <p:cSld>
     <p:spTree>
@@ -11972,7 +11597,7 @@
 </p:sld>
 </file>
 
-<file path=ppt/slides/slide42.xml><?xml version="1.0" encoding="utf-8"?>
+<file path=ppt/slides/slide37.xml><?xml version="1.0" encoding="utf-8"?>
 <p:sld xmlns:a="http://schemas.openxmlformats.org/drawingml/2006/main" xmlns:r="http://schemas.openxmlformats.org/officeDocument/2006/relationships" xmlns:p="http://schemas.openxmlformats.org/presentationml/2006/main">
   <p:cSld>
     <p:spTree>
@@ -12032,7 +11657,7 @@
           <p:nvPr/>
         </p:nvPicPr>
         <p:blipFill>
-          <a:blip r:embed="rId2">
+          <a:blip r:embed="rId3">
             <a:extLst>
               <a:ext uri="{28A0092B-C50C-407E-A947-70E740481C1C}">
                 <a14:useLocalDpi xmlns:a14="http://schemas.microsoft.com/office/drawing/2010/main" val="0"/>
@@ -12066,7 +11691,7 @@
 </p:sld>
 </file>
 
-<file path=ppt/slides/slide43.xml><?xml version="1.0" encoding="utf-8"?>
+<file path=ppt/slides/slide38.xml><?xml version="1.0" encoding="utf-8"?>
 <p:sld xmlns:a="http://schemas.openxmlformats.org/drawingml/2006/main" xmlns:r="http://schemas.openxmlformats.org/officeDocument/2006/relationships" xmlns:p="http://schemas.openxmlformats.org/presentationml/2006/main">
   <p:cSld>
     <p:spTree>
@@ -12241,7 +11866,7 @@
 </p:sld>
 </file>
 
-<file path=ppt/slides/slide44.xml><?xml version="1.0" encoding="utf-8"?>
+<file path=ppt/slides/slide39.xml><?xml version="1.0" encoding="utf-8"?>
 <p:sld xmlns:a="http://schemas.openxmlformats.org/drawingml/2006/main" xmlns:r="http://schemas.openxmlformats.org/officeDocument/2006/relationships" xmlns:p="http://schemas.openxmlformats.org/presentationml/2006/main">
   <p:cSld>
     <p:spTree>
@@ -13423,7 +13048,78 @@
 </p:sld>
 </file>
 
-<file path=ppt/slides/slide45.xml><?xml version="1.0" encoding="utf-8"?>
+<file path=ppt/slides/slide4.xml><?xml version="1.0" encoding="utf-8"?>
+<p:sld xmlns:a="http://schemas.openxmlformats.org/drawingml/2006/main" xmlns:r="http://schemas.openxmlformats.org/officeDocument/2006/relationships" xmlns:p="http://schemas.openxmlformats.org/presentationml/2006/main">
+  <p:cSld>
+    <p:spTree>
+      <p:nvGrpSpPr>
+        <p:cNvPr id="1" name=""/>
+        <p:cNvGrpSpPr/>
+        <p:nvPr/>
+      </p:nvGrpSpPr>
+      <p:grpSpPr>
+        <a:xfrm>
+          <a:off x="0" y="0"/>
+          <a:ext cx="0" cy="0"/>
+          <a:chOff x="0" y="0"/>
+          <a:chExt cx="0" cy="0"/>
+        </a:xfrm>
+      </p:grpSpPr>
+      <p:sp>
+        <p:nvSpPr>
+          <p:cNvPr id="2" name="Title 1">
+            <a:extLst>
+              <a:ext uri="{FF2B5EF4-FFF2-40B4-BE49-F238E27FC236}">
+                <a16:creationId xmlns:a16="http://schemas.microsoft.com/office/drawing/2014/main" id="{2C89FB05-C6B7-4F88-902F-3BEFF42B997F}"/>
+              </a:ext>
+            </a:extLst>
+          </p:cNvPr>
+          <p:cNvSpPr>
+            <a:spLocks noGrp="1"/>
+          </p:cNvSpPr>
+          <p:nvPr>
+            <p:ph type="title"/>
+          </p:nvPr>
+        </p:nvSpPr>
+        <p:spPr>
+          <a:xfrm>
+            <a:off x="959160" y="1420125"/>
+            <a:ext cx="10273679" cy="3708466"/>
+          </a:xfrm>
+        </p:spPr>
+        <p:txBody>
+          <a:bodyPr/>
+          <a:lstStyle/>
+          <a:p>
+            <a:pPr algn="ctr"/>
+            <a:r>
+              <a:rPr lang="en-GB" sz="7200" dirty="0"/>
+              <a:t>Part 1 </a:t>
+            </a:r>
+            <a:br>
+              <a:rPr lang="en-GB" sz="7200" dirty="0"/>
+            </a:br>
+            <a:r>
+              <a:rPr lang="en-GB" sz="7200" dirty="0"/>
+              <a:t>The Idea</a:t>
+            </a:r>
+          </a:p>
+        </p:txBody>
+      </p:sp>
+    </p:spTree>
+    <p:extLst>
+      <p:ext uri="{BB962C8B-B14F-4D97-AF65-F5344CB8AC3E}">
+        <p14:creationId xmlns:p14="http://schemas.microsoft.com/office/powerpoint/2010/main" val="1808995500"/>
+      </p:ext>
+    </p:extLst>
+  </p:cSld>
+  <p:clrMapOvr>
+    <a:masterClrMapping/>
+  </p:clrMapOvr>
+</p:sld>
+</file>
+
+<file path=ppt/slides/slide40.xml><?xml version="1.0" encoding="utf-8"?>
 <p:sld xmlns:a="http://schemas.openxmlformats.org/drawingml/2006/main" xmlns:r="http://schemas.openxmlformats.org/officeDocument/2006/relationships" xmlns:p="http://schemas.openxmlformats.org/presentationml/2006/main">
   <p:cSld>
     <p:spTree>
@@ -13533,7 +13229,7 @@
 </p:sld>
 </file>
 
-<file path=ppt/slides/slide46.xml><?xml version="1.0" encoding="utf-8"?>
+<file path=ppt/slides/slide41.xml><?xml version="1.0" encoding="utf-8"?>
 <p:sld xmlns:a="http://schemas.openxmlformats.org/drawingml/2006/main" xmlns:r="http://schemas.openxmlformats.org/officeDocument/2006/relationships" xmlns:p="http://schemas.openxmlformats.org/presentationml/2006/main">
   <p:cSld>
     <p:spTree>
@@ -13629,7 +13325,7 @@
 </p:sld>
 </file>
 
-<file path=ppt/slides/slide47.xml><?xml version="1.0" encoding="utf-8"?>
+<file path=ppt/slides/slide42.xml><?xml version="1.0" encoding="utf-8"?>
 <p:sld xmlns:a="http://schemas.openxmlformats.org/drawingml/2006/main" xmlns:r="http://schemas.openxmlformats.org/officeDocument/2006/relationships" xmlns:p="http://schemas.openxmlformats.org/presentationml/2006/main">
   <p:cSld>
     <p:spTree>
@@ -13651,7 +13347,7 @@
           <p:cNvPr id="2" name="Title 1">
             <a:extLst>
               <a:ext uri="{FF2B5EF4-FFF2-40B4-BE49-F238E27FC236}">
-                <a16:creationId xmlns:a16="http://schemas.microsoft.com/office/drawing/2014/main" id="{E825DFDB-3510-49FE-B3DD-EFFBF62DAAC8}"/>
+                <a16:creationId xmlns:a16="http://schemas.microsoft.com/office/drawing/2014/main" id="{2C89FB05-C6B7-4F88-902F-3BEFF42B997F}"/>
               </a:ext>
             </a:extLst>
           </p:cNvPr>
@@ -13662,44 +13358,35 @@
             <p:ph type="title"/>
           </p:nvPr>
         </p:nvSpPr>
-        <p:spPr/>
+        <p:spPr>
+          <a:xfrm>
+            <a:off x="959160" y="1420125"/>
+            <a:ext cx="10273679" cy="3708466"/>
+          </a:xfrm>
+        </p:spPr>
         <p:txBody>
           <a:bodyPr/>
           <a:lstStyle/>
           <a:p>
-            <a:endParaRPr lang="en-GB"/>
-          </a:p>
-        </p:txBody>
-      </p:sp>
-      <p:sp>
-        <p:nvSpPr>
-          <p:cNvPr id="3" name="Content Placeholder 2">
-            <a:extLst>
-              <a:ext uri="{FF2B5EF4-FFF2-40B4-BE49-F238E27FC236}">
-                <a16:creationId xmlns:a16="http://schemas.microsoft.com/office/drawing/2014/main" id="{E999CD9E-0361-4CBB-BC49-DD11C44D47D7}"/>
-              </a:ext>
-            </a:extLst>
-          </p:cNvPr>
-          <p:cNvSpPr>
-            <a:spLocks noGrp="1"/>
-          </p:cNvSpPr>
-          <p:nvPr>
-            <p:ph idx="1"/>
-          </p:nvPr>
-        </p:nvSpPr>
-        <p:spPr/>
-        <p:txBody>
-          <a:bodyPr/>
-          <a:lstStyle/>
-          <a:p>
-            <a:endParaRPr lang="en-GB"/>
+            <a:pPr algn="ctr"/>
+            <a:r>
+              <a:rPr lang="en-GB" sz="7200" dirty="0"/>
+              <a:t>Part 1 </a:t>
+            </a:r>
+            <a:br>
+              <a:rPr lang="en-GB" sz="7200" dirty="0"/>
+            </a:br>
+            <a:r>
+              <a:rPr lang="en-GB" sz="7200" dirty="0"/>
+              <a:t>The Idea</a:t>
+            </a:r>
           </a:p>
         </p:txBody>
       </p:sp>
     </p:spTree>
     <p:extLst>
       <p:ext uri="{BB962C8B-B14F-4D97-AF65-F5344CB8AC3E}">
-        <p14:creationId xmlns:p14="http://schemas.microsoft.com/office/powerpoint/2010/main" val="2930972724"/>
+        <p14:creationId xmlns:p14="http://schemas.microsoft.com/office/powerpoint/2010/main" val="911588053"/>
       </p:ext>
     </p:extLst>
   </p:cSld>
@@ -13709,7 +13396,7 @@
 </p:sld>
 </file>
 
-<file path=ppt/slides/slide48.xml><?xml version="1.0" encoding="utf-8"?>
+<file path=ppt/slides/slide43.xml><?xml version="1.0" encoding="utf-8"?>
 <p:sld xmlns:a="http://schemas.openxmlformats.org/drawingml/2006/main" xmlns:r="http://schemas.openxmlformats.org/officeDocument/2006/relationships" xmlns:p="http://schemas.openxmlformats.org/presentationml/2006/main">
   <p:cSld>
     <p:spTree>
@@ -13731,7 +13418,7 @@
           <p:cNvPr id="2" name="Title 1">
             <a:extLst>
               <a:ext uri="{FF2B5EF4-FFF2-40B4-BE49-F238E27FC236}">
-                <a16:creationId xmlns:a16="http://schemas.microsoft.com/office/drawing/2014/main" id="{2C89FB05-C6B7-4F88-902F-3BEFF42B997F}"/>
+                <a16:creationId xmlns:a16="http://schemas.microsoft.com/office/drawing/2014/main" id="{B1D2B085-B6B4-4DB3-904C-97AA8E1FE7DD}"/>
               </a:ext>
             </a:extLst>
           </p:cNvPr>
@@ -13742,27 +13429,62 @@
             <p:ph type="title"/>
           </p:nvPr>
         </p:nvSpPr>
-        <p:spPr>
-          <a:xfrm>
-            <a:off x="959160" y="1420125"/>
-            <a:ext cx="10273679" cy="3708466"/>
-          </a:xfrm>
-        </p:spPr>
+        <p:spPr/>
         <p:txBody>
           <a:bodyPr/>
           <a:lstStyle/>
           <a:p>
-            <a:pPr algn="ctr"/>
-            <a:r>
-              <a:rPr lang="en-GB" sz="7200" dirty="0"/>
-              <a:t>Part 1 </a:t>
-            </a:r>
-            <a:br>
-              <a:rPr lang="en-GB" sz="7200" dirty="0"/>
-            </a:br>
-            <a:r>
-              <a:rPr lang="en-GB" sz="7200" dirty="0"/>
-              <a:t>The Idea</a:t>
+            <a:endParaRPr lang="en-GB"/>
+          </a:p>
+        </p:txBody>
+      </p:sp>
+      <p:sp>
+        <p:nvSpPr>
+          <p:cNvPr id="3" name="Content Placeholder 2">
+            <a:extLst>
+              <a:ext uri="{FF2B5EF4-FFF2-40B4-BE49-F238E27FC236}">
+                <a16:creationId xmlns:a16="http://schemas.microsoft.com/office/drawing/2014/main" id="{1491485F-FB5E-4D0A-AB74-76CD653AEB86}"/>
+              </a:ext>
+            </a:extLst>
+          </p:cNvPr>
+          <p:cNvSpPr>
+            <a:spLocks noGrp="1"/>
+          </p:cNvSpPr>
+          <p:nvPr>
+            <p:ph idx="1"/>
+          </p:nvPr>
+        </p:nvSpPr>
+        <p:spPr/>
+        <p:txBody>
+          <a:bodyPr/>
+          <a:lstStyle/>
+          <a:p>
+            <a:r>
+              <a:rPr lang="en-GB" dirty="0"/>
+              <a:t>I was still interested in investigating the performance of spatial partition, but using different parameters</a:t>
+            </a:r>
+          </a:p>
+          <a:p>
+            <a:endParaRPr lang="en-GB" dirty="0"/>
+          </a:p>
+          <a:p>
+            <a:r>
+              <a:rPr lang="en-GB" dirty="0"/>
+              <a:t>I needed to find a way to easily hop between different versions of </a:t>
+            </a:r>
+            <a:r>
+              <a:rPr lang="en-GB" dirty="0" err="1"/>
+              <a:t>Gopherlife</a:t>
+            </a:r>
+            <a:endParaRPr lang="en-GB" dirty="0"/>
+          </a:p>
+          <a:p>
+            <a:endParaRPr lang="en-GB" dirty="0"/>
+          </a:p>
+          <a:p>
+            <a:r>
+              <a:rPr lang="en-GB" dirty="0"/>
+              <a:t>That’s it.</a:t>
             </a:r>
           </a:p>
         </p:txBody>
@@ -13770,7 +13492,7 @@
     </p:spTree>
     <p:extLst>
       <p:ext uri="{BB962C8B-B14F-4D97-AF65-F5344CB8AC3E}">
-        <p14:creationId xmlns:p14="http://schemas.microsoft.com/office/powerpoint/2010/main" val="911588053"/>
+        <p14:creationId xmlns:p14="http://schemas.microsoft.com/office/powerpoint/2010/main" val="2491883747"/>
       </p:ext>
     </p:extLst>
   </p:cSld>
@@ -13780,7 +13502,7 @@
 </p:sld>
 </file>
 
-<file path=ppt/slides/slide49.xml><?xml version="1.0" encoding="utf-8"?>
+<file path=ppt/slides/slide44.xml><?xml version="1.0" encoding="utf-8"?>
 <p:sld xmlns:a="http://schemas.openxmlformats.org/drawingml/2006/main" xmlns:r="http://schemas.openxmlformats.org/officeDocument/2006/relationships" xmlns:p="http://schemas.openxmlformats.org/presentationml/2006/main">
   <p:cSld>
     <p:spTree>
@@ -13802,7 +13524,7 @@
           <p:cNvPr id="2" name="Title 1">
             <a:extLst>
               <a:ext uri="{FF2B5EF4-FFF2-40B4-BE49-F238E27FC236}">
-                <a16:creationId xmlns:a16="http://schemas.microsoft.com/office/drawing/2014/main" id="{B1D2B085-B6B4-4DB3-904C-97AA8E1FE7DD}"/>
+                <a16:creationId xmlns:a16="http://schemas.microsoft.com/office/drawing/2014/main" id="{2C89FB05-C6B7-4F88-902F-3BEFF42B997F}"/>
               </a:ext>
             </a:extLst>
           </p:cNvPr>
@@ -13813,62 +13535,27 @@
             <p:ph type="title"/>
           </p:nvPr>
         </p:nvSpPr>
-        <p:spPr/>
+        <p:spPr>
+          <a:xfrm>
+            <a:off x="959160" y="1420125"/>
+            <a:ext cx="10273679" cy="3708466"/>
+          </a:xfrm>
+        </p:spPr>
         <p:txBody>
           <a:bodyPr/>
           <a:lstStyle/>
           <a:p>
-            <a:endParaRPr lang="en-GB"/>
-          </a:p>
-        </p:txBody>
-      </p:sp>
-      <p:sp>
-        <p:nvSpPr>
-          <p:cNvPr id="3" name="Content Placeholder 2">
-            <a:extLst>
-              <a:ext uri="{FF2B5EF4-FFF2-40B4-BE49-F238E27FC236}">
-                <a16:creationId xmlns:a16="http://schemas.microsoft.com/office/drawing/2014/main" id="{1491485F-FB5E-4D0A-AB74-76CD653AEB86}"/>
-              </a:ext>
-            </a:extLst>
-          </p:cNvPr>
-          <p:cNvSpPr>
-            <a:spLocks noGrp="1"/>
-          </p:cNvSpPr>
-          <p:nvPr>
-            <p:ph idx="1"/>
-          </p:nvPr>
-        </p:nvSpPr>
-        <p:spPr/>
-        <p:txBody>
-          <a:bodyPr/>
-          <a:lstStyle/>
-          <a:p>
-            <a:r>
-              <a:rPr lang="en-GB" dirty="0"/>
-              <a:t>I was still interested in investigating the performance of spatial partition, but using different parameters</a:t>
-            </a:r>
-          </a:p>
-          <a:p>
-            <a:endParaRPr lang="en-GB" dirty="0"/>
-          </a:p>
-          <a:p>
-            <a:r>
-              <a:rPr lang="en-GB" dirty="0"/>
-              <a:t>I needed to find a way to easily hop between different versions of </a:t>
-            </a:r>
-            <a:r>
-              <a:rPr lang="en-GB" dirty="0" err="1"/>
-              <a:t>Gopherlife</a:t>
-            </a:r>
-            <a:endParaRPr lang="en-GB" dirty="0"/>
-          </a:p>
-          <a:p>
-            <a:endParaRPr lang="en-GB" dirty="0"/>
-          </a:p>
-          <a:p>
-            <a:r>
-              <a:rPr lang="en-GB" dirty="0"/>
-              <a:t>That’s it.</a:t>
+            <a:pPr algn="ctr"/>
+            <a:r>
+              <a:rPr lang="en-GB" sz="7200" dirty="0"/>
+              <a:t>Part 2 </a:t>
+            </a:r>
+            <a:br>
+              <a:rPr lang="en-GB" sz="7200" dirty="0"/>
+            </a:br>
+            <a:r>
+              <a:rPr lang="en-GB" sz="7200" dirty="0"/>
+              <a:t>Modelling the design of 10 Worlds </a:t>
             </a:r>
           </a:p>
         </p:txBody>
@@ -13876,7 +13563,7 @@
     </p:spTree>
     <p:extLst>
       <p:ext uri="{BB962C8B-B14F-4D97-AF65-F5344CB8AC3E}">
-        <p14:creationId xmlns:p14="http://schemas.microsoft.com/office/powerpoint/2010/main" val="2491883747"/>
+        <p14:creationId xmlns:p14="http://schemas.microsoft.com/office/powerpoint/2010/main" val="1329552963"/>
       </p:ext>
     </p:extLst>
   </p:cSld>
@@ -13886,7 +13573,7 @@
 </p:sld>
 </file>
 
-<file path=ppt/slides/slide5.xml><?xml version="1.0" encoding="utf-8"?>
+<file path=ppt/slides/slide45.xml><?xml version="1.0" encoding="utf-8"?>
 <p:sld xmlns:a="http://schemas.openxmlformats.org/drawingml/2006/main" xmlns:r="http://schemas.openxmlformats.org/officeDocument/2006/relationships" xmlns:p="http://schemas.openxmlformats.org/presentationml/2006/main">
   <p:cSld>
     <p:spTree>
@@ -13905,226 +13592,6 @@
       </p:grpSpPr>
       <p:sp>
         <p:nvSpPr>
-          <p:cNvPr id="3" name="Content Placeholder 2">
-            <a:extLst>
-              <a:ext uri="{FF2B5EF4-FFF2-40B4-BE49-F238E27FC236}">
-                <a16:creationId xmlns:a16="http://schemas.microsoft.com/office/drawing/2014/main" id="{0BA4CED0-14AF-4666-B0F9-8CD738326E3F}"/>
-              </a:ext>
-            </a:extLst>
-          </p:cNvPr>
-          <p:cNvSpPr>
-            <a:spLocks noGrp="1"/>
-          </p:cNvSpPr>
-          <p:nvPr>
-            <p:ph idx="1"/>
-          </p:nvPr>
-        </p:nvSpPr>
-        <p:spPr>
-          <a:xfrm>
-            <a:off x="1103312" y="2052918"/>
-            <a:ext cx="6194955" cy="4195481"/>
-          </a:xfrm>
-        </p:spPr>
-        <p:txBody>
-          <a:bodyPr/>
-          <a:lstStyle/>
-          <a:p>
-            <a:r>
-              <a:rPr lang="en-GB" dirty="0"/>
-              <a:t>Build a program that would model the life of 1 million gophers (the animal) using Go (obviously)</a:t>
-            </a:r>
-          </a:p>
-          <a:p>
-            <a:endParaRPr lang="en-GB" dirty="0"/>
-          </a:p>
-          <a:p>
-            <a:r>
-              <a:rPr lang="en-GB" dirty="0"/>
-              <a:t>Before beginning the program I looked online for some facts about gophers. </a:t>
-            </a:r>
-            <a:r>
-              <a:rPr lang="en-GB" dirty="0">
-                <a:hlinkClick r:id="rId2"/>
-              </a:rPr>
-              <a:t>https://www.livescience.com/57623-gopher-facts.html</a:t>
-            </a:r>
-            <a:endParaRPr lang="en-GB" dirty="0"/>
-          </a:p>
-          <a:p>
-            <a:pPr marL="457200" lvl="1" indent="0">
-              <a:buNone/>
-            </a:pPr>
-            <a:endParaRPr lang="en-GB" dirty="0"/>
-          </a:p>
-          <a:p>
-            <a:endParaRPr lang="en-GB" dirty="0"/>
-          </a:p>
-        </p:txBody>
-      </p:sp>
-      <p:pic>
-        <p:nvPicPr>
-          <p:cNvPr id="6" name="Picture 5">
-            <a:extLst>
-              <a:ext uri="{FF2B5EF4-FFF2-40B4-BE49-F238E27FC236}">
-                <a16:creationId xmlns:a16="http://schemas.microsoft.com/office/drawing/2014/main" id="{9378717A-1D2F-4DA1-A508-A543F6288D06}"/>
-              </a:ext>
-            </a:extLst>
-          </p:cNvPr>
-          <p:cNvPicPr>
-            <a:picLocks noChangeAspect="1"/>
-          </p:cNvPicPr>
-          <p:nvPr/>
-        </p:nvPicPr>
-        <p:blipFill>
-          <a:blip r:embed="rId3">
-            <a:extLst>
-              <a:ext uri="{28A0092B-C50C-407E-A947-70E740481C1C}">
-                <a14:useLocalDpi xmlns:a14="http://schemas.microsoft.com/office/drawing/2010/main" val="0"/>
-              </a:ext>
-            </a:extLst>
-          </a:blip>
-          <a:stretch>
-            <a:fillRect/>
-          </a:stretch>
-        </p:blipFill>
-        <p:spPr>
-          <a:xfrm>
-            <a:off x="7829531" y="2347258"/>
-            <a:ext cx="3259157" cy="3606800"/>
-          </a:xfrm>
-          <a:prstGeom prst="rect">
-            <a:avLst/>
-          </a:prstGeom>
-        </p:spPr>
-      </p:pic>
-      <p:sp>
-        <p:nvSpPr>
-          <p:cNvPr id="5" name="Title 4">
-            <a:extLst>
-              <a:ext uri="{FF2B5EF4-FFF2-40B4-BE49-F238E27FC236}">
-                <a16:creationId xmlns:a16="http://schemas.microsoft.com/office/drawing/2014/main" id="{57F2587A-CD57-454C-8277-7FAC5EE3EEBB}"/>
-              </a:ext>
-            </a:extLst>
-          </p:cNvPr>
-          <p:cNvSpPr>
-            <a:spLocks noGrp="1"/>
-          </p:cNvSpPr>
-          <p:nvPr>
-            <p:ph type="title"/>
-          </p:nvPr>
-        </p:nvSpPr>
-        <p:spPr/>
-        <p:txBody>
-          <a:bodyPr/>
-          <a:lstStyle/>
-          <a:p>
-            <a:endParaRPr lang="en-GB" dirty="0"/>
-          </a:p>
-        </p:txBody>
-      </p:sp>
-    </p:spTree>
-    <p:extLst>
-      <p:ext uri="{BB962C8B-B14F-4D97-AF65-F5344CB8AC3E}">
-        <p14:creationId xmlns:p14="http://schemas.microsoft.com/office/powerpoint/2010/main" val="1992650848"/>
-      </p:ext>
-    </p:extLst>
-  </p:cSld>
-  <p:clrMapOvr>
-    <a:masterClrMapping/>
-  </p:clrMapOvr>
-</p:sld>
-</file>
-
-<file path=ppt/slides/slide50.xml><?xml version="1.0" encoding="utf-8"?>
-<p:sld xmlns:a="http://schemas.openxmlformats.org/drawingml/2006/main" xmlns:r="http://schemas.openxmlformats.org/officeDocument/2006/relationships" xmlns:p="http://schemas.openxmlformats.org/presentationml/2006/main">
-  <p:cSld>
-    <p:spTree>
-      <p:nvGrpSpPr>
-        <p:cNvPr id="1" name=""/>
-        <p:cNvGrpSpPr/>
-        <p:nvPr/>
-      </p:nvGrpSpPr>
-      <p:grpSpPr>
-        <a:xfrm>
-          <a:off x="0" y="0"/>
-          <a:ext cx="0" cy="0"/>
-          <a:chOff x="0" y="0"/>
-          <a:chExt cx="0" cy="0"/>
-        </a:xfrm>
-      </p:grpSpPr>
-      <p:sp>
-        <p:nvSpPr>
-          <p:cNvPr id="2" name="Title 1">
-            <a:extLst>
-              <a:ext uri="{FF2B5EF4-FFF2-40B4-BE49-F238E27FC236}">
-                <a16:creationId xmlns:a16="http://schemas.microsoft.com/office/drawing/2014/main" id="{2C89FB05-C6B7-4F88-902F-3BEFF42B997F}"/>
-              </a:ext>
-            </a:extLst>
-          </p:cNvPr>
-          <p:cNvSpPr>
-            <a:spLocks noGrp="1"/>
-          </p:cNvSpPr>
-          <p:nvPr>
-            <p:ph type="title"/>
-          </p:nvPr>
-        </p:nvSpPr>
-        <p:spPr>
-          <a:xfrm>
-            <a:off x="959160" y="1420125"/>
-            <a:ext cx="10273679" cy="3708466"/>
-          </a:xfrm>
-        </p:spPr>
-        <p:txBody>
-          <a:bodyPr/>
-          <a:lstStyle/>
-          <a:p>
-            <a:pPr algn="ctr"/>
-            <a:r>
-              <a:rPr lang="en-GB" sz="7200" dirty="0"/>
-              <a:t>Part 2 </a:t>
-            </a:r>
-            <a:br>
-              <a:rPr lang="en-GB" sz="7200" dirty="0"/>
-            </a:br>
-            <a:r>
-              <a:rPr lang="en-GB" sz="7200" dirty="0"/>
-              <a:t>Modelling the design of 10 Worlds </a:t>
-            </a:r>
-          </a:p>
-        </p:txBody>
-      </p:sp>
-    </p:spTree>
-    <p:extLst>
-      <p:ext uri="{BB962C8B-B14F-4D97-AF65-F5344CB8AC3E}">
-        <p14:creationId xmlns:p14="http://schemas.microsoft.com/office/powerpoint/2010/main" val="1329552963"/>
-      </p:ext>
-    </p:extLst>
-  </p:cSld>
-  <p:clrMapOvr>
-    <a:masterClrMapping/>
-  </p:clrMapOvr>
-</p:sld>
-</file>
-
-<file path=ppt/slides/slide51.xml><?xml version="1.0" encoding="utf-8"?>
-<p:sld xmlns:a="http://schemas.openxmlformats.org/drawingml/2006/main" xmlns:r="http://schemas.openxmlformats.org/officeDocument/2006/relationships" xmlns:p="http://schemas.openxmlformats.org/presentationml/2006/main">
-  <p:cSld>
-    <p:spTree>
-      <p:nvGrpSpPr>
-        <p:cNvPr id="1" name=""/>
-        <p:cNvGrpSpPr/>
-        <p:nvPr/>
-      </p:nvGrpSpPr>
-      <p:grpSpPr>
-        <a:xfrm>
-          <a:off x="0" y="0"/>
-          <a:ext cx="0" cy="0"/>
-          <a:chOff x="0" y="0"/>
-          <a:chExt cx="0" cy="0"/>
-        </a:xfrm>
-      </p:grpSpPr>
-      <p:sp>
-        <p:nvSpPr>
           <p:cNvPr id="2" name="Title 1">
             <a:extLst>
               <a:ext uri="{FF2B5EF4-FFF2-40B4-BE49-F238E27FC236}">
@@ -14145,10 +13612,9 @@
           <a:lstStyle/>
           <a:p>
             <a:r>
-              <a:rPr lang="en-GB"/>
+              <a:rPr lang="en-GB" dirty="0"/>
               <a:t>Introduction to Interfaces</a:t>
             </a:r>
-            <a:endParaRPr lang="en-GB" dirty="0"/>
           </a:p>
         </p:txBody>
       </p:sp>
@@ -14195,7 +13661,375 @@
 </p:sld>
 </file>
 
-<file path=ppt/slides/slide52.xml><?xml version="1.0" encoding="utf-8"?>
+<file path=ppt/slides/slide46.xml><?xml version="1.0" encoding="utf-8"?>
+<p:sld xmlns:a="http://schemas.openxmlformats.org/drawingml/2006/main" xmlns:r="http://schemas.openxmlformats.org/officeDocument/2006/relationships" xmlns:p="http://schemas.openxmlformats.org/presentationml/2006/main">
+  <p:cSld>
+    <p:spTree>
+      <p:nvGrpSpPr>
+        <p:cNvPr id="1" name=""/>
+        <p:cNvGrpSpPr/>
+        <p:nvPr/>
+      </p:nvGrpSpPr>
+      <p:grpSpPr>
+        <a:xfrm>
+          <a:off x="0" y="0"/>
+          <a:ext cx="0" cy="0"/>
+          <a:chOff x="0" y="0"/>
+          <a:chExt cx="0" cy="0"/>
+        </a:xfrm>
+      </p:grpSpPr>
+      <p:pic>
+        <p:nvPicPr>
+          <p:cNvPr id="4" name="Picture 3">
+            <a:extLst>
+              <a:ext uri="{FF2B5EF4-FFF2-40B4-BE49-F238E27FC236}">
+                <a16:creationId xmlns:a16="http://schemas.microsoft.com/office/drawing/2014/main" id="{C958BFE0-B20B-4B33-B17E-4A864CE6A4A1}"/>
+              </a:ext>
+            </a:extLst>
+          </p:cNvPr>
+          <p:cNvPicPr>
+            <a:picLocks noChangeAspect="1"/>
+          </p:cNvPicPr>
+          <p:nvPr/>
+        </p:nvPicPr>
+        <p:blipFill>
+          <a:blip r:embed="rId2"/>
+          <a:stretch>
+            <a:fillRect/>
+          </a:stretch>
+        </p:blipFill>
+        <p:spPr>
+          <a:xfrm>
+            <a:off x="7444740" y="2757592"/>
+            <a:ext cx="4277322" cy="1095528"/>
+          </a:xfrm>
+          <a:prstGeom prst="rect">
+            <a:avLst/>
+          </a:prstGeom>
+        </p:spPr>
+      </p:pic>
+      <p:pic>
+        <p:nvPicPr>
+          <p:cNvPr id="5" name="Picture 4">
+            <a:extLst>
+              <a:ext uri="{FF2B5EF4-FFF2-40B4-BE49-F238E27FC236}">
+                <a16:creationId xmlns:a16="http://schemas.microsoft.com/office/drawing/2014/main" id="{2C017602-18BC-4E18-9FAF-E19C8D2A650E}"/>
+              </a:ext>
+            </a:extLst>
+          </p:cNvPr>
+          <p:cNvPicPr>
+            <a:picLocks noChangeAspect="1"/>
+          </p:cNvPicPr>
+          <p:nvPr/>
+        </p:nvPicPr>
+        <p:blipFill>
+          <a:blip r:embed="rId3"/>
+          <a:stretch>
+            <a:fillRect/>
+          </a:stretch>
+        </p:blipFill>
+        <p:spPr>
+          <a:xfrm>
+            <a:off x="618528" y="2862382"/>
+            <a:ext cx="5649113" cy="885949"/>
+          </a:xfrm>
+          <a:prstGeom prst="rect">
+            <a:avLst/>
+          </a:prstGeom>
+        </p:spPr>
+      </p:pic>
+      <p:pic>
+        <p:nvPicPr>
+          <p:cNvPr id="9" name="Picture 8">
+            <a:extLst>
+              <a:ext uri="{FF2B5EF4-FFF2-40B4-BE49-F238E27FC236}">
+                <a16:creationId xmlns:a16="http://schemas.microsoft.com/office/drawing/2014/main" id="{BD7DAFB1-F368-4413-9B99-8C1D4FC71247}"/>
+              </a:ext>
+            </a:extLst>
+          </p:cNvPr>
+          <p:cNvPicPr>
+            <a:picLocks noChangeAspect="1"/>
+          </p:cNvPicPr>
+          <p:nvPr/>
+        </p:nvPicPr>
+        <p:blipFill>
+          <a:blip r:embed="rId4"/>
+          <a:stretch>
+            <a:fillRect/>
+          </a:stretch>
+        </p:blipFill>
+        <p:spPr>
+          <a:xfrm>
+            <a:off x="7835320" y="5128608"/>
+            <a:ext cx="3886742" cy="1448002"/>
+          </a:xfrm>
+          <a:prstGeom prst="rect">
+            <a:avLst/>
+          </a:prstGeom>
+        </p:spPr>
+      </p:pic>
+      <p:sp>
+        <p:nvSpPr>
+          <p:cNvPr id="10" name="Title 1">
+            <a:extLst>
+              <a:ext uri="{FF2B5EF4-FFF2-40B4-BE49-F238E27FC236}">
+                <a16:creationId xmlns:a16="http://schemas.microsoft.com/office/drawing/2014/main" id="{C6585E59-DC4D-4710-B2A4-EFA0BEA17624}"/>
+              </a:ext>
+            </a:extLst>
+          </p:cNvPr>
+          <p:cNvSpPr>
+            <a:spLocks noGrp="1"/>
+          </p:cNvSpPr>
+          <p:nvPr>
+            <p:ph type="title"/>
+          </p:nvPr>
+        </p:nvSpPr>
+        <p:spPr>
+          <a:xfrm>
+            <a:off x="646111" y="452718"/>
+            <a:ext cx="9404723" cy="1400530"/>
+          </a:xfrm>
+        </p:spPr>
+        <p:txBody>
+          <a:bodyPr/>
+          <a:lstStyle/>
+          <a:p>
+            <a:r>
+              <a:rPr lang="en-GB" dirty="0"/>
+              <a:t>Smaller Interfaces!</a:t>
+            </a:r>
+          </a:p>
+        </p:txBody>
+      </p:sp>
+      <p:pic>
+        <p:nvPicPr>
+          <p:cNvPr id="11" name="Picture 10">
+            <a:extLst>
+              <a:ext uri="{FF2B5EF4-FFF2-40B4-BE49-F238E27FC236}">
+                <a16:creationId xmlns:a16="http://schemas.microsoft.com/office/drawing/2014/main" id="{F66279FC-D370-40D2-96D9-4FAD26C5E1DE}"/>
+              </a:ext>
+            </a:extLst>
+          </p:cNvPr>
+          <p:cNvPicPr>
+            <a:picLocks noChangeAspect="1"/>
+          </p:cNvPicPr>
+          <p:nvPr/>
+        </p:nvPicPr>
+        <p:blipFill>
+          <a:blip r:embed="rId5"/>
+          <a:stretch>
+            <a:fillRect/>
+          </a:stretch>
+        </p:blipFill>
+        <p:spPr>
+          <a:xfrm>
+            <a:off x="164930" y="4063874"/>
+            <a:ext cx="8259328" cy="866896"/>
+          </a:xfrm>
+          <a:prstGeom prst="rect">
+            <a:avLst/>
+          </a:prstGeom>
+        </p:spPr>
+      </p:pic>
+      <p:pic>
+        <p:nvPicPr>
+          <p:cNvPr id="12" name="Picture 11">
+            <a:extLst>
+              <a:ext uri="{FF2B5EF4-FFF2-40B4-BE49-F238E27FC236}">
+                <a16:creationId xmlns:a16="http://schemas.microsoft.com/office/drawing/2014/main" id="{E12F18D5-A8A6-4E73-AEC8-187D8CBCB098}"/>
+              </a:ext>
+            </a:extLst>
+          </p:cNvPr>
+          <p:cNvPicPr>
+            <a:picLocks noChangeAspect="1"/>
+          </p:cNvPicPr>
+          <p:nvPr/>
+        </p:nvPicPr>
+        <p:blipFill>
+          <a:blip r:embed="rId6"/>
+          <a:stretch>
+            <a:fillRect/>
+          </a:stretch>
+        </p:blipFill>
+        <p:spPr>
+          <a:xfrm>
+            <a:off x="3919233" y="1327709"/>
+            <a:ext cx="4353533" cy="1066949"/>
+          </a:xfrm>
+          <a:prstGeom prst="rect">
+            <a:avLst/>
+          </a:prstGeom>
+        </p:spPr>
+      </p:pic>
+      <p:pic>
+        <p:nvPicPr>
+          <p:cNvPr id="13" name="Picture 12">
+            <a:extLst>
+              <a:ext uri="{FF2B5EF4-FFF2-40B4-BE49-F238E27FC236}">
+                <a16:creationId xmlns:a16="http://schemas.microsoft.com/office/drawing/2014/main" id="{7CB5D2E4-766A-44A0-825A-2C27F4A9D58C}"/>
+              </a:ext>
+            </a:extLst>
+          </p:cNvPr>
+          <p:cNvPicPr>
+            <a:picLocks noChangeAspect="1"/>
+          </p:cNvPicPr>
+          <p:nvPr/>
+        </p:nvPicPr>
+        <p:blipFill>
+          <a:blip r:embed="rId7"/>
+          <a:stretch>
+            <a:fillRect/>
+          </a:stretch>
+        </p:blipFill>
+        <p:spPr>
+          <a:xfrm>
+            <a:off x="287185" y="5223871"/>
+            <a:ext cx="6725589" cy="1257475"/>
+          </a:xfrm>
+          <a:prstGeom prst="rect">
+            <a:avLst/>
+          </a:prstGeom>
+        </p:spPr>
+      </p:pic>
+    </p:spTree>
+    <p:extLst>
+      <p:ext uri="{BB962C8B-B14F-4D97-AF65-F5344CB8AC3E}">
+        <p14:creationId xmlns:p14="http://schemas.microsoft.com/office/powerpoint/2010/main" val="447673996"/>
+      </p:ext>
+    </p:extLst>
+  </p:cSld>
+  <p:clrMapOvr>
+    <a:masterClrMapping/>
+  </p:clrMapOvr>
+</p:sld>
+</file>
+
+<file path=ppt/slides/slide47.xml><?xml version="1.0" encoding="utf-8"?>
+<p:sld xmlns:a="http://schemas.openxmlformats.org/drawingml/2006/main" xmlns:r="http://schemas.openxmlformats.org/officeDocument/2006/relationships" xmlns:p="http://schemas.openxmlformats.org/presentationml/2006/main">
+  <p:cSld>
+    <p:spTree>
+      <p:nvGrpSpPr>
+        <p:cNvPr id="1" name=""/>
+        <p:cNvGrpSpPr/>
+        <p:nvPr/>
+      </p:nvGrpSpPr>
+      <p:grpSpPr>
+        <a:xfrm>
+          <a:off x="0" y="0"/>
+          <a:ext cx="0" cy="0"/>
+          <a:chOff x="0" y="0"/>
+          <a:chExt cx="0" cy="0"/>
+        </a:xfrm>
+      </p:grpSpPr>
+      <p:pic>
+        <p:nvPicPr>
+          <p:cNvPr id="5" name="Content Placeholder 4">
+            <a:extLst>
+              <a:ext uri="{FF2B5EF4-FFF2-40B4-BE49-F238E27FC236}">
+                <a16:creationId xmlns:a16="http://schemas.microsoft.com/office/drawing/2014/main" id="{13ACE9D4-268C-4068-9404-75711B6BDF15}"/>
+              </a:ext>
+            </a:extLst>
+          </p:cNvPr>
+          <p:cNvPicPr>
+            <a:picLocks noGrp="1" noChangeAspect="1"/>
+          </p:cNvPicPr>
+          <p:nvPr>
+            <p:ph idx="1"/>
+          </p:nvPr>
+        </p:nvPicPr>
+        <p:blipFill>
+          <a:blip r:embed="rId2"/>
+          <a:stretch>
+            <a:fillRect/>
+          </a:stretch>
+        </p:blipFill>
+        <p:spPr>
+          <a:xfrm>
+            <a:off x="6492976" y="2090550"/>
+            <a:ext cx="3105583" cy="2676899"/>
+          </a:xfrm>
+          <a:prstGeom prst="rect">
+            <a:avLst/>
+          </a:prstGeom>
+        </p:spPr>
+      </p:pic>
+      <p:pic>
+        <p:nvPicPr>
+          <p:cNvPr id="4" name="Picture 3">
+            <a:extLst>
+              <a:ext uri="{FF2B5EF4-FFF2-40B4-BE49-F238E27FC236}">
+                <a16:creationId xmlns:a16="http://schemas.microsoft.com/office/drawing/2014/main" id="{3573CC04-94DA-460A-8491-1C7198225D77}"/>
+              </a:ext>
+            </a:extLst>
+          </p:cNvPr>
+          <p:cNvPicPr>
+            <a:picLocks noChangeAspect="1"/>
+          </p:cNvPicPr>
+          <p:nvPr/>
+        </p:nvPicPr>
+        <p:blipFill>
+          <a:blip r:embed="rId3"/>
+          <a:stretch>
+            <a:fillRect/>
+          </a:stretch>
+        </p:blipFill>
+        <p:spPr>
+          <a:xfrm>
+            <a:off x="2466779" y="1604707"/>
+            <a:ext cx="2800741" cy="3648584"/>
+          </a:xfrm>
+          <a:prstGeom prst="rect">
+            <a:avLst/>
+          </a:prstGeom>
+        </p:spPr>
+      </p:pic>
+      <p:sp>
+        <p:nvSpPr>
+          <p:cNvPr id="6" name="Title 1">
+            <a:extLst>
+              <a:ext uri="{FF2B5EF4-FFF2-40B4-BE49-F238E27FC236}">
+                <a16:creationId xmlns:a16="http://schemas.microsoft.com/office/drawing/2014/main" id="{AAF5D9AD-6854-4B2E-8295-7D4A58620E2A}"/>
+              </a:ext>
+            </a:extLst>
+          </p:cNvPr>
+          <p:cNvSpPr>
+            <a:spLocks noGrp="1"/>
+          </p:cNvSpPr>
+          <p:nvPr>
+            <p:ph type="title"/>
+          </p:nvPr>
+        </p:nvSpPr>
+        <p:spPr>
+          <a:xfrm>
+            <a:off x="360361" y="475578"/>
+            <a:ext cx="10452419" cy="1400530"/>
+          </a:xfrm>
+        </p:spPr>
+        <p:txBody>
+          <a:bodyPr/>
+          <a:lstStyle/>
+          <a:p>
+            <a:r>
+              <a:rPr lang="en-GB" dirty="0"/>
+              <a:t>Different worlds using similar code!</a:t>
+            </a:r>
+          </a:p>
+        </p:txBody>
+      </p:sp>
+    </p:spTree>
+    <p:extLst>
+      <p:ext uri="{BB962C8B-B14F-4D97-AF65-F5344CB8AC3E}">
+        <p14:creationId xmlns:p14="http://schemas.microsoft.com/office/powerpoint/2010/main" val="4022481363"/>
+      </p:ext>
+    </p:extLst>
+  </p:cSld>
+  <p:clrMapOvr>
+    <a:masterClrMapping/>
+  </p:clrMapOvr>
+</p:sld>
+</file>
+
+<file path=ppt/slides/slide48.xml><?xml version="1.0" encoding="utf-8"?>
 <p:sld xmlns:a="http://schemas.openxmlformats.org/drawingml/2006/main" xmlns:r="http://schemas.openxmlformats.org/officeDocument/2006/relationships" xmlns:p="http://schemas.openxmlformats.org/presentationml/2006/main">
   <p:cSld>
     <p:spTree>
@@ -14348,7 +14182,356 @@
 </p:sld>
 </file>
 
-<file path=ppt/slides/slide53.xml><?xml version="1.0" encoding="utf-8"?>
+<file path=ppt/slides/slide49.xml><?xml version="1.0" encoding="utf-8"?>
+<p:sld xmlns:a="http://schemas.openxmlformats.org/drawingml/2006/main" xmlns:r="http://schemas.openxmlformats.org/officeDocument/2006/relationships" xmlns:p="http://schemas.openxmlformats.org/presentationml/2006/main">
+  <p:cSld>
+    <p:spTree>
+      <p:nvGrpSpPr>
+        <p:cNvPr id="1" name=""/>
+        <p:cNvGrpSpPr/>
+        <p:nvPr/>
+      </p:nvGrpSpPr>
+      <p:grpSpPr>
+        <a:xfrm>
+          <a:off x="0" y="0"/>
+          <a:ext cx="0" cy="0"/>
+          <a:chOff x="0" y="0"/>
+          <a:chExt cx="0" cy="0"/>
+        </a:xfrm>
+      </p:grpSpPr>
+      <p:sp>
+        <p:nvSpPr>
+          <p:cNvPr id="2" name="Title 1">
+            <a:extLst>
+              <a:ext uri="{FF2B5EF4-FFF2-40B4-BE49-F238E27FC236}">
+                <a16:creationId xmlns:a16="http://schemas.microsoft.com/office/drawing/2014/main" id="{56A2432D-311B-4A1D-BC4E-A3B34D666E2B}"/>
+              </a:ext>
+            </a:extLst>
+          </p:cNvPr>
+          <p:cNvSpPr>
+            <a:spLocks noGrp="1"/>
+          </p:cNvSpPr>
+          <p:nvPr>
+            <p:ph type="title"/>
+          </p:nvPr>
+        </p:nvSpPr>
+        <p:spPr/>
+        <p:txBody>
+          <a:bodyPr/>
+          <a:lstStyle/>
+          <a:p>
+            <a:r>
+              <a:rPr lang="en-GB" dirty="0" err="1"/>
+              <a:t>Gopherlife</a:t>
+            </a:r>
+            <a:r>
+              <a:rPr lang="en-GB" dirty="0"/>
+              <a:t> 2.0!</a:t>
+            </a:r>
+          </a:p>
+        </p:txBody>
+      </p:sp>
+      <p:sp>
+        <p:nvSpPr>
+          <p:cNvPr id="3" name="Content Placeholder 2">
+            <a:extLst>
+              <a:ext uri="{FF2B5EF4-FFF2-40B4-BE49-F238E27FC236}">
+                <a16:creationId xmlns:a16="http://schemas.microsoft.com/office/drawing/2014/main" id="{5B5115B4-817F-4AC9-BFB6-1D85324ED3BF}"/>
+              </a:ext>
+            </a:extLst>
+          </p:cNvPr>
+          <p:cNvSpPr>
+            <a:spLocks noGrp="1"/>
+          </p:cNvSpPr>
+          <p:nvPr>
+            <p:ph idx="1"/>
+          </p:nvPr>
+        </p:nvSpPr>
+        <p:spPr/>
+        <p:txBody>
+          <a:bodyPr/>
+          <a:lstStyle/>
+          <a:p>
+            <a:r>
+              <a:rPr lang="en-GB" dirty="0"/>
+              <a:t>Showcase!</a:t>
+            </a:r>
+          </a:p>
+        </p:txBody>
+      </p:sp>
+    </p:spTree>
+    <p:extLst>
+      <p:ext uri="{BB962C8B-B14F-4D97-AF65-F5344CB8AC3E}">
+        <p14:creationId xmlns:p14="http://schemas.microsoft.com/office/powerpoint/2010/main" val="1347803694"/>
+      </p:ext>
+    </p:extLst>
+  </p:cSld>
+  <p:clrMapOvr>
+    <a:masterClrMapping/>
+  </p:clrMapOvr>
+</p:sld>
+</file>
+
+<file path=ppt/slides/slide5.xml><?xml version="1.0" encoding="utf-8"?>
+<p:sld xmlns:a="http://schemas.openxmlformats.org/drawingml/2006/main" xmlns:r="http://schemas.openxmlformats.org/officeDocument/2006/relationships" xmlns:p="http://schemas.openxmlformats.org/presentationml/2006/main">
+  <p:cSld>
+    <p:spTree>
+      <p:nvGrpSpPr>
+        <p:cNvPr id="1" name=""/>
+        <p:cNvGrpSpPr/>
+        <p:nvPr/>
+      </p:nvGrpSpPr>
+      <p:grpSpPr>
+        <a:xfrm>
+          <a:off x="0" y="0"/>
+          <a:ext cx="0" cy="0"/>
+          <a:chOff x="0" y="0"/>
+          <a:chExt cx="0" cy="0"/>
+        </a:xfrm>
+      </p:grpSpPr>
+      <p:sp>
+        <p:nvSpPr>
+          <p:cNvPr id="3" name="Content Placeholder 2">
+            <a:extLst>
+              <a:ext uri="{FF2B5EF4-FFF2-40B4-BE49-F238E27FC236}">
+                <a16:creationId xmlns:a16="http://schemas.microsoft.com/office/drawing/2014/main" id="{0BA4CED0-14AF-4666-B0F9-8CD738326E3F}"/>
+              </a:ext>
+            </a:extLst>
+          </p:cNvPr>
+          <p:cNvSpPr>
+            <a:spLocks noGrp="1"/>
+          </p:cNvSpPr>
+          <p:nvPr>
+            <p:ph idx="1"/>
+          </p:nvPr>
+        </p:nvSpPr>
+        <p:spPr>
+          <a:xfrm>
+            <a:off x="1103312" y="2052918"/>
+            <a:ext cx="6194955" cy="4195481"/>
+          </a:xfrm>
+        </p:spPr>
+        <p:txBody>
+          <a:bodyPr/>
+          <a:lstStyle/>
+          <a:p>
+            <a:r>
+              <a:rPr lang="en-GB" dirty="0"/>
+              <a:t>Build a program that would model the life of 1 million gophers (the animal) using Go (obviously)</a:t>
+            </a:r>
+          </a:p>
+          <a:p>
+            <a:endParaRPr lang="en-GB" dirty="0"/>
+          </a:p>
+          <a:p>
+            <a:r>
+              <a:rPr lang="en-GB" dirty="0"/>
+              <a:t>Before beginning the program I looked online for some facts about gophers. </a:t>
+            </a:r>
+            <a:r>
+              <a:rPr lang="en-GB" dirty="0">
+                <a:hlinkClick r:id="rId2"/>
+              </a:rPr>
+              <a:t>https://www.livescience.com/57623-gopher-facts.html</a:t>
+            </a:r>
+            <a:endParaRPr lang="en-GB" dirty="0"/>
+          </a:p>
+          <a:p>
+            <a:pPr marL="457200" lvl="1" indent="0">
+              <a:buNone/>
+            </a:pPr>
+            <a:endParaRPr lang="en-GB" dirty="0"/>
+          </a:p>
+          <a:p>
+            <a:endParaRPr lang="en-GB" dirty="0"/>
+          </a:p>
+        </p:txBody>
+      </p:sp>
+      <p:pic>
+        <p:nvPicPr>
+          <p:cNvPr id="6" name="Picture 5">
+            <a:extLst>
+              <a:ext uri="{FF2B5EF4-FFF2-40B4-BE49-F238E27FC236}">
+                <a16:creationId xmlns:a16="http://schemas.microsoft.com/office/drawing/2014/main" id="{9378717A-1D2F-4DA1-A508-A543F6288D06}"/>
+              </a:ext>
+            </a:extLst>
+          </p:cNvPr>
+          <p:cNvPicPr>
+            <a:picLocks noChangeAspect="1"/>
+          </p:cNvPicPr>
+          <p:nvPr/>
+        </p:nvPicPr>
+        <p:blipFill>
+          <a:blip r:embed="rId3">
+            <a:extLst>
+              <a:ext uri="{28A0092B-C50C-407E-A947-70E740481C1C}">
+                <a14:useLocalDpi xmlns:a14="http://schemas.microsoft.com/office/drawing/2010/main" val="0"/>
+              </a:ext>
+            </a:extLst>
+          </a:blip>
+          <a:stretch>
+            <a:fillRect/>
+          </a:stretch>
+        </p:blipFill>
+        <p:spPr>
+          <a:xfrm>
+            <a:off x="7829531" y="2347258"/>
+            <a:ext cx="3259157" cy="3606800"/>
+          </a:xfrm>
+          <a:prstGeom prst="rect">
+            <a:avLst/>
+          </a:prstGeom>
+        </p:spPr>
+      </p:pic>
+      <p:sp>
+        <p:nvSpPr>
+          <p:cNvPr id="5" name="Title 4">
+            <a:extLst>
+              <a:ext uri="{FF2B5EF4-FFF2-40B4-BE49-F238E27FC236}">
+                <a16:creationId xmlns:a16="http://schemas.microsoft.com/office/drawing/2014/main" id="{57F2587A-CD57-454C-8277-7FAC5EE3EEBB}"/>
+              </a:ext>
+            </a:extLst>
+          </p:cNvPr>
+          <p:cNvSpPr>
+            <a:spLocks noGrp="1"/>
+          </p:cNvSpPr>
+          <p:nvPr>
+            <p:ph type="title"/>
+          </p:nvPr>
+        </p:nvSpPr>
+        <p:spPr/>
+        <p:txBody>
+          <a:bodyPr/>
+          <a:lstStyle/>
+          <a:p>
+            <a:endParaRPr lang="en-GB" dirty="0"/>
+          </a:p>
+        </p:txBody>
+      </p:sp>
+    </p:spTree>
+    <p:extLst>
+      <p:ext uri="{BB962C8B-B14F-4D97-AF65-F5344CB8AC3E}">
+        <p14:creationId xmlns:p14="http://schemas.microsoft.com/office/powerpoint/2010/main" val="1992650848"/>
+      </p:ext>
+    </p:extLst>
+  </p:cSld>
+  <p:clrMapOvr>
+    <a:masterClrMapping/>
+  </p:clrMapOvr>
+</p:sld>
+</file>
+
+<file path=ppt/slides/slide50.xml><?xml version="1.0" encoding="utf-8"?>
+<p:sld xmlns:a="http://schemas.openxmlformats.org/drawingml/2006/main" xmlns:r="http://schemas.openxmlformats.org/officeDocument/2006/relationships" xmlns:p="http://schemas.openxmlformats.org/presentationml/2006/main">
+  <p:cSld>
+    <p:spTree>
+      <p:nvGrpSpPr>
+        <p:cNvPr id="1" name=""/>
+        <p:cNvGrpSpPr/>
+        <p:nvPr/>
+      </p:nvGrpSpPr>
+      <p:grpSpPr>
+        <a:xfrm>
+          <a:off x="0" y="0"/>
+          <a:ext cx="0" cy="0"/>
+          <a:chOff x="0" y="0"/>
+          <a:chExt cx="0" cy="0"/>
+        </a:xfrm>
+      </p:grpSpPr>
+      <p:sp>
+        <p:nvSpPr>
+          <p:cNvPr id="2" name="Title 1">
+            <a:extLst>
+              <a:ext uri="{FF2B5EF4-FFF2-40B4-BE49-F238E27FC236}">
+                <a16:creationId xmlns:a16="http://schemas.microsoft.com/office/drawing/2014/main" id="{8903D6D4-E672-488E-A964-7A71F8E56AB5}"/>
+              </a:ext>
+            </a:extLst>
+          </p:cNvPr>
+          <p:cNvSpPr>
+            <a:spLocks noGrp="1"/>
+          </p:cNvSpPr>
+          <p:nvPr>
+            <p:ph type="title"/>
+          </p:nvPr>
+        </p:nvSpPr>
+        <p:spPr/>
+        <p:txBody>
+          <a:bodyPr/>
+          <a:lstStyle/>
+          <a:p>
+            <a:endParaRPr lang="en-GB"/>
+          </a:p>
+        </p:txBody>
+      </p:sp>
+      <p:sp>
+        <p:nvSpPr>
+          <p:cNvPr id="3" name="Content Placeholder 2">
+            <a:extLst>
+              <a:ext uri="{FF2B5EF4-FFF2-40B4-BE49-F238E27FC236}">
+                <a16:creationId xmlns:a16="http://schemas.microsoft.com/office/drawing/2014/main" id="{070BEDA6-9D6B-4AEA-9F84-5D187D49CD33}"/>
+              </a:ext>
+            </a:extLst>
+          </p:cNvPr>
+          <p:cNvSpPr>
+            <a:spLocks noGrp="1"/>
+          </p:cNvSpPr>
+          <p:nvPr>
+            <p:ph idx="1"/>
+          </p:nvPr>
+        </p:nvSpPr>
+        <p:spPr/>
+        <p:txBody>
+          <a:bodyPr/>
+          <a:lstStyle/>
+          <a:p>
+            <a:endParaRPr lang="en-GB"/>
+          </a:p>
+        </p:txBody>
+      </p:sp>
+      <p:pic>
+        <p:nvPicPr>
+          <p:cNvPr id="4" name="Picture 3">
+            <a:extLst>
+              <a:ext uri="{FF2B5EF4-FFF2-40B4-BE49-F238E27FC236}">
+                <a16:creationId xmlns:a16="http://schemas.microsoft.com/office/drawing/2014/main" id="{A69FAC6D-4168-4C59-BFF4-18F957FEEBF5}"/>
+              </a:ext>
+            </a:extLst>
+          </p:cNvPr>
+          <p:cNvPicPr>
+            <a:picLocks noChangeAspect="1"/>
+          </p:cNvPicPr>
+          <p:nvPr/>
+        </p:nvPicPr>
+        <p:blipFill>
+          <a:blip r:embed="rId2"/>
+          <a:stretch>
+            <a:fillRect/>
+          </a:stretch>
+        </p:blipFill>
+        <p:spPr>
+          <a:xfrm>
+            <a:off x="2199731" y="766391"/>
+            <a:ext cx="7792537" cy="5325218"/>
+          </a:xfrm>
+          <a:prstGeom prst="rect">
+            <a:avLst/>
+          </a:prstGeom>
+        </p:spPr>
+      </p:pic>
+    </p:spTree>
+    <p:extLst>
+      <p:ext uri="{BB962C8B-B14F-4D97-AF65-F5344CB8AC3E}">
+        <p14:creationId xmlns:p14="http://schemas.microsoft.com/office/powerpoint/2010/main" val="1753813936"/>
+      </p:ext>
+    </p:extLst>
+  </p:cSld>
+  <p:clrMapOvr>
+    <a:masterClrMapping/>
+  </p:clrMapOvr>
+</p:sld>
+</file>
+
+<file path=ppt/slides/slide51.xml><?xml version="1.0" encoding="utf-8"?>
 <p:sld xmlns:a="http://schemas.openxmlformats.org/drawingml/2006/main" xmlns:r="http://schemas.openxmlformats.org/officeDocument/2006/relationships" xmlns:p="http://schemas.openxmlformats.org/presentationml/2006/main">
   <p:cSld>
     <p:spTree>
@@ -14508,7 +14691,7 @@
 </p:sld>
 </file>
 
-<file path=ppt/slides/slide54.xml><?xml version="1.0" encoding="utf-8"?>
+<file path=ppt/slides/slide52.xml><?xml version="1.0" encoding="utf-8"?>
 <p:sld xmlns:a="http://schemas.openxmlformats.org/drawingml/2006/main" xmlns:r="http://schemas.openxmlformats.org/officeDocument/2006/relationships" xmlns:p="http://schemas.openxmlformats.org/presentationml/2006/main">
   <p:cSld>
     <p:spTree>
@@ -14554,8 +14737,13 @@
             <a:pPr algn="ctr"/>
             <a:r>
               <a:rPr lang="en-GB" dirty="0"/>
-              <a:t>Thank you for listening to my talk</a:t>
-            </a:r>
+              <a:t>Thank you for listening to </a:t>
+            </a:r>
+            <a:r>
+              <a:rPr lang="en-GB"/>
+              <a:t>my talks</a:t>
+            </a:r>
+            <a:endParaRPr lang="en-GB" dirty="0"/>
           </a:p>
         </p:txBody>
       </p:sp>
@@ -14572,7 +14760,7 @@
 </p:sld>
 </file>
 
-<file path=ppt/slides/slide55.xml><?xml version="1.0" encoding="utf-8"?>
+<file path=ppt/slides/slide53.xml><?xml version="1.0" encoding="utf-8"?>
 <p:sld xmlns:a="http://schemas.openxmlformats.org/drawingml/2006/main" xmlns:r="http://schemas.openxmlformats.org/officeDocument/2006/relationships" xmlns:p="http://schemas.openxmlformats.org/presentationml/2006/main">
   <p:cSld>
     <p:spTree>
@@ -14594,7 +14782,7 @@
           <p:cNvPr id="2" name="Title 1">
             <a:extLst>
               <a:ext uri="{FF2B5EF4-FFF2-40B4-BE49-F238E27FC236}">
-                <a16:creationId xmlns:a16="http://schemas.microsoft.com/office/drawing/2014/main" id="{A94847A5-3B2C-413D-93AA-293754610DF4}"/>
+                <a16:creationId xmlns:a16="http://schemas.microsoft.com/office/drawing/2014/main" id="{01A84025-E20E-49CE-8896-F2003BBCE6F4}"/>
               </a:ext>
             </a:extLst>
           </p:cNvPr>
@@ -14610,10 +14798,7 @@
           <a:bodyPr/>
           <a:lstStyle/>
           <a:p>
-            <a:r>
-              <a:rPr lang="en-GB" dirty="0"/>
-              <a:t>Everything below this slide is not part of the presentation</a:t>
-            </a:r>
+            <a:endParaRPr lang="en-GB"/>
           </a:p>
         </p:txBody>
       </p:sp>
@@ -14622,213 +14807,7 @@
           <p:cNvPr id="3" name="Content Placeholder 2">
             <a:extLst>
               <a:ext uri="{FF2B5EF4-FFF2-40B4-BE49-F238E27FC236}">
-                <a16:creationId xmlns:a16="http://schemas.microsoft.com/office/drawing/2014/main" id="{018237B4-346A-47AD-90D0-130B819626C1}"/>
-              </a:ext>
-            </a:extLst>
-          </p:cNvPr>
-          <p:cNvSpPr>
-            <a:spLocks noGrp="1"/>
-          </p:cNvSpPr>
-          <p:nvPr>
-            <p:ph idx="1"/>
-          </p:nvPr>
-        </p:nvSpPr>
-        <p:spPr/>
-        <p:txBody>
-          <a:bodyPr/>
-          <a:lstStyle/>
-          <a:p>
-            <a:endParaRPr lang="en-GB"/>
-          </a:p>
-        </p:txBody>
-      </p:sp>
-    </p:spTree>
-    <p:extLst>
-      <p:ext uri="{BB962C8B-B14F-4D97-AF65-F5344CB8AC3E}">
-        <p14:creationId xmlns:p14="http://schemas.microsoft.com/office/powerpoint/2010/main" val="4138479630"/>
-      </p:ext>
-    </p:extLst>
-  </p:cSld>
-  <p:clrMapOvr>
-    <a:masterClrMapping/>
-  </p:clrMapOvr>
-</p:sld>
-</file>
-
-<file path=ppt/slides/slide56.xml><?xml version="1.0" encoding="utf-8"?>
-<p:sld xmlns:a="http://schemas.openxmlformats.org/drawingml/2006/main" xmlns:r="http://schemas.openxmlformats.org/officeDocument/2006/relationships" xmlns:p="http://schemas.openxmlformats.org/presentationml/2006/main">
-  <p:cSld>
-    <p:spTree>
-      <p:nvGrpSpPr>
-        <p:cNvPr id="1" name=""/>
-        <p:cNvGrpSpPr/>
-        <p:nvPr/>
-      </p:nvGrpSpPr>
-      <p:grpSpPr>
-        <a:xfrm>
-          <a:off x="0" y="0"/>
-          <a:ext cx="0" cy="0"/>
-          <a:chOff x="0" y="0"/>
-          <a:chExt cx="0" cy="0"/>
-        </a:xfrm>
-      </p:grpSpPr>
-      <p:sp>
-        <p:nvSpPr>
-          <p:cNvPr id="2" name="Title 1">
-            <a:extLst>
-              <a:ext uri="{FF2B5EF4-FFF2-40B4-BE49-F238E27FC236}">
-                <a16:creationId xmlns:a16="http://schemas.microsoft.com/office/drawing/2014/main" id="{B88F905B-DC9A-4E15-887A-0D816B2DA849}"/>
-              </a:ext>
-            </a:extLst>
-          </p:cNvPr>
-          <p:cNvSpPr>
-            <a:spLocks noGrp="1"/>
-          </p:cNvSpPr>
-          <p:nvPr>
-            <p:ph type="title"/>
-          </p:nvPr>
-        </p:nvSpPr>
-        <p:spPr/>
-        <p:txBody>
-          <a:bodyPr/>
-          <a:lstStyle/>
-          <a:p>
-            <a:r>
-              <a:rPr lang="en-GB" dirty="0"/>
-              <a:t>Checklist of Mistakes</a:t>
-            </a:r>
-          </a:p>
-        </p:txBody>
-      </p:sp>
-      <p:sp>
-        <p:nvSpPr>
-          <p:cNvPr id="3" name="Content Placeholder 2">
-            <a:extLst>
-              <a:ext uri="{FF2B5EF4-FFF2-40B4-BE49-F238E27FC236}">
-                <a16:creationId xmlns:a16="http://schemas.microsoft.com/office/drawing/2014/main" id="{14229407-2ED8-43A8-819B-30DDEB3D38EC}"/>
-              </a:ext>
-            </a:extLst>
-          </p:cNvPr>
-          <p:cNvSpPr>
-            <a:spLocks noGrp="1"/>
-          </p:cNvSpPr>
-          <p:nvPr>
-            <p:ph idx="1"/>
-          </p:nvPr>
-        </p:nvSpPr>
-        <p:spPr/>
-        <p:txBody>
-          <a:bodyPr/>
-          <a:lstStyle/>
-          <a:p>
-            <a:r>
-              <a:rPr lang="en-GB" dirty="0"/>
-              <a:t>Concurrency is not parallelism </a:t>
-            </a:r>
-            <a:r>
-              <a:rPr lang="en-GB" dirty="0">
-                <a:latin typeface="Segoe MDL2 Assets" panose="050A0102010101010101" pitchFamily="18" charset="0"/>
-              </a:rPr>
-              <a:t> </a:t>
-            </a:r>
-          </a:p>
-          <a:p>
-            <a:r>
-              <a:rPr lang="en-GB" dirty="0"/>
-              <a:t>You can read from maps concurrently, but you can not write to maps.</a:t>
-            </a:r>
-          </a:p>
-          <a:p>
-            <a:r>
-              <a:rPr lang="en-GB"/>
-              <a:t>Importance </a:t>
-            </a:r>
-            <a:r>
-              <a:rPr lang="en-GB" dirty="0"/>
-              <a:t>of structure to avoid circular dependencies and for ease of readability </a:t>
-            </a:r>
-            <a:r>
-              <a:rPr lang="en-GB" dirty="0">
-                <a:latin typeface="Segoe MDL2 Assets" panose="050A0102010101010101" pitchFamily="18" charset="0"/>
-              </a:rPr>
-              <a:t></a:t>
-            </a:r>
-          </a:p>
-          <a:p>
-            <a:r>
-              <a:rPr lang="en-GB" dirty="0"/>
-              <a:t>By saving your files where the GOPATH is you can access local packages without using relative paths. </a:t>
-            </a:r>
-            <a:endParaRPr lang="en-GB" dirty="0">
-              <a:latin typeface="Segoe MDL2 Assets" panose="050A0102010101010101" pitchFamily="18" charset="0"/>
-            </a:endParaRPr>
-          </a:p>
-          <a:p>
-            <a:endParaRPr lang="en-GB" dirty="0"/>
-          </a:p>
-        </p:txBody>
-      </p:sp>
-    </p:spTree>
-    <p:extLst>
-      <p:ext uri="{BB962C8B-B14F-4D97-AF65-F5344CB8AC3E}">
-        <p14:creationId xmlns:p14="http://schemas.microsoft.com/office/powerpoint/2010/main" val="1348224757"/>
-      </p:ext>
-    </p:extLst>
-  </p:cSld>
-  <p:clrMapOvr>
-    <a:masterClrMapping/>
-  </p:clrMapOvr>
-</p:sld>
-</file>
-
-<file path=ppt/slides/slide57.xml><?xml version="1.0" encoding="utf-8"?>
-<p:sld xmlns:a="http://schemas.openxmlformats.org/drawingml/2006/main" xmlns:r="http://schemas.openxmlformats.org/officeDocument/2006/relationships" xmlns:p="http://schemas.openxmlformats.org/presentationml/2006/main">
-  <p:cSld>
-    <p:spTree>
-      <p:nvGrpSpPr>
-        <p:cNvPr id="1" name=""/>
-        <p:cNvGrpSpPr/>
-        <p:nvPr/>
-      </p:nvGrpSpPr>
-      <p:grpSpPr>
-        <a:xfrm>
-          <a:off x="0" y="0"/>
-          <a:ext cx="0" cy="0"/>
-          <a:chOff x="0" y="0"/>
-          <a:chExt cx="0" cy="0"/>
-        </a:xfrm>
-      </p:grpSpPr>
-      <p:sp>
-        <p:nvSpPr>
-          <p:cNvPr id="2" name="Title 1">
-            <a:extLst>
-              <a:ext uri="{FF2B5EF4-FFF2-40B4-BE49-F238E27FC236}">
-                <a16:creationId xmlns:a16="http://schemas.microsoft.com/office/drawing/2014/main" id="{71AE6861-824A-41FE-A0E2-266440322B9B}"/>
-              </a:ext>
-            </a:extLst>
-          </p:cNvPr>
-          <p:cNvSpPr>
-            <a:spLocks noGrp="1"/>
-          </p:cNvSpPr>
-          <p:nvPr>
-            <p:ph type="title"/>
-          </p:nvPr>
-        </p:nvSpPr>
-        <p:spPr/>
-        <p:txBody>
-          <a:bodyPr/>
-          <a:lstStyle/>
-          <a:p>
-            <a:endParaRPr lang="en-GB"/>
-          </a:p>
-        </p:txBody>
-      </p:sp>
-      <p:sp>
-        <p:nvSpPr>
-          <p:cNvPr id="3" name="Content Placeholder 2">
-            <a:extLst>
-              <a:ext uri="{FF2B5EF4-FFF2-40B4-BE49-F238E27FC236}">
-                <a16:creationId xmlns:a16="http://schemas.microsoft.com/office/drawing/2014/main" id="{8017DECA-EC7E-4247-AC92-ABCF8ED9A316}"/>
+                <a16:creationId xmlns:a16="http://schemas.microsoft.com/office/drawing/2014/main" id="{A19E9461-7DE1-476F-8514-B55324F3D699}"/>
               </a:ext>
             </a:extLst>
           </p:cNvPr>
@@ -14853,7 +14832,7 @@
           <p:cNvPr id="4" name="Picture 3">
             <a:extLst>
               <a:ext uri="{FF2B5EF4-FFF2-40B4-BE49-F238E27FC236}">
-                <a16:creationId xmlns:a16="http://schemas.microsoft.com/office/drawing/2014/main" id="{C6DFD9D6-2F88-469B-A777-13C477D026DD}"/>
+                <a16:creationId xmlns:a16="http://schemas.microsoft.com/office/drawing/2014/main" id="{50026090-A618-4AC3-AB9C-0C900BE16487}"/>
               </a:ext>
             </a:extLst>
           </p:cNvPr>
@@ -14870,8 +14849,8 @@
         </p:blipFill>
         <p:spPr>
           <a:xfrm>
-            <a:off x="2199731" y="766391"/>
-            <a:ext cx="7792537" cy="5325218"/>
+            <a:off x="0" y="0"/>
+            <a:ext cx="12192000" cy="6858000"/>
           </a:xfrm>
           <a:prstGeom prst="rect">
             <a:avLst/>
@@ -14881,234 +14860,7 @@
     </p:spTree>
     <p:extLst>
       <p:ext uri="{BB962C8B-B14F-4D97-AF65-F5344CB8AC3E}">
-        <p14:creationId xmlns:p14="http://schemas.microsoft.com/office/powerpoint/2010/main" val="4019310302"/>
-      </p:ext>
-    </p:extLst>
-  </p:cSld>
-  <p:clrMapOvr>
-    <a:masterClrMapping/>
-  </p:clrMapOvr>
-</p:sld>
-</file>
-
-<file path=ppt/slides/slide58.xml><?xml version="1.0" encoding="utf-8"?>
-<p:sld xmlns:a="http://schemas.openxmlformats.org/drawingml/2006/main" xmlns:r="http://schemas.openxmlformats.org/officeDocument/2006/relationships" xmlns:p="http://schemas.openxmlformats.org/presentationml/2006/main">
-  <p:cSld>
-    <p:spTree>
-      <p:nvGrpSpPr>
-        <p:cNvPr id="1" name=""/>
-        <p:cNvGrpSpPr/>
-        <p:nvPr/>
-      </p:nvGrpSpPr>
-      <p:grpSpPr>
-        <a:xfrm>
-          <a:off x="0" y="0"/>
-          <a:ext cx="0" cy="0"/>
-          <a:chOff x="0" y="0"/>
-          <a:chExt cx="0" cy="0"/>
-        </a:xfrm>
-      </p:grpSpPr>
-      <p:sp>
-        <p:nvSpPr>
-          <p:cNvPr id="2" name="Title 1">
-            <a:extLst>
-              <a:ext uri="{FF2B5EF4-FFF2-40B4-BE49-F238E27FC236}">
-                <a16:creationId xmlns:a16="http://schemas.microsoft.com/office/drawing/2014/main" id="{E860577F-CE5A-4C36-9B88-C0A36F3002B3}"/>
-              </a:ext>
-            </a:extLst>
-          </p:cNvPr>
-          <p:cNvSpPr>
-            <a:spLocks noGrp="1"/>
-          </p:cNvSpPr>
-          <p:nvPr>
-            <p:ph type="title"/>
-          </p:nvPr>
-        </p:nvSpPr>
-        <p:spPr/>
-        <p:txBody>
-          <a:bodyPr/>
-          <a:lstStyle/>
-          <a:p>
-            <a:r>
-              <a:rPr lang="en-GB" dirty="0"/>
-              <a:t>After </a:t>
-            </a:r>
-            <a:r>
-              <a:rPr lang="en-GB"/>
-              <a:t>The Spiral Change</a:t>
-            </a:r>
-          </a:p>
-        </p:txBody>
-      </p:sp>
-      <p:sp>
-        <p:nvSpPr>
-          <p:cNvPr id="3" name="Content Placeholder 2">
-            <a:extLst>
-              <a:ext uri="{FF2B5EF4-FFF2-40B4-BE49-F238E27FC236}">
-                <a16:creationId xmlns:a16="http://schemas.microsoft.com/office/drawing/2014/main" id="{8B8DE919-1F1F-4856-AED7-D0129CB20F6A}"/>
-              </a:ext>
-            </a:extLst>
-          </p:cNvPr>
-          <p:cNvSpPr>
-            <a:spLocks noGrp="1"/>
-          </p:cNvSpPr>
-          <p:nvPr>
-            <p:ph idx="1"/>
-          </p:nvPr>
-        </p:nvSpPr>
-        <p:spPr/>
-        <p:txBody>
-          <a:bodyPr/>
-          <a:lstStyle/>
-          <a:p>
-            <a:endParaRPr lang="en-GB"/>
-          </a:p>
-        </p:txBody>
-      </p:sp>
-      <p:pic>
-        <p:nvPicPr>
-          <p:cNvPr id="4" name="Picture 3">
-            <a:extLst>
-              <a:ext uri="{FF2B5EF4-FFF2-40B4-BE49-F238E27FC236}">
-                <a16:creationId xmlns:a16="http://schemas.microsoft.com/office/drawing/2014/main" id="{777F68AB-4738-482A-88C4-4C23BED7816E}"/>
-              </a:ext>
-            </a:extLst>
-          </p:cNvPr>
-          <p:cNvPicPr>
-            <a:picLocks noChangeAspect="1"/>
-          </p:cNvPicPr>
-          <p:nvPr/>
-        </p:nvPicPr>
-        <p:blipFill>
-          <a:blip r:embed="rId2"/>
-          <a:stretch>
-            <a:fillRect/>
-          </a:stretch>
-        </p:blipFill>
-        <p:spPr>
-          <a:xfrm>
-            <a:off x="3335628" y="1816770"/>
-            <a:ext cx="5937691" cy="4755918"/>
-          </a:xfrm>
-          <a:prstGeom prst="rect">
-            <a:avLst/>
-          </a:prstGeom>
-        </p:spPr>
-      </p:pic>
-    </p:spTree>
-    <p:extLst>
-      <p:ext uri="{BB962C8B-B14F-4D97-AF65-F5344CB8AC3E}">
-        <p14:creationId xmlns:p14="http://schemas.microsoft.com/office/powerpoint/2010/main" val="153626428"/>
-      </p:ext>
-    </p:extLst>
-  </p:cSld>
-  <p:clrMapOvr>
-    <a:masterClrMapping/>
-  </p:clrMapOvr>
-</p:sld>
-</file>
-
-<file path=ppt/slides/slide59.xml><?xml version="1.0" encoding="utf-8"?>
-<p:sld xmlns:a="http://schemas.openxmlformats.org/drawingml/2006/main" xmlns:r="http://schemas.openxmlformats.org/officeDocument/2006/relationships" xmlns:p="http://schemas.openxmlformats.org/presentationml/2006/main">
-  <p:cSld>
-    <p:spTree>
-      <p:nvGrpSpPr>
-        <p:cNvPr id="1" name=""/>
-        <p:cNvGrpSpPr/>
-        <p:nvPr/>
-      </p:nvGrpSpPr>
-      <p:grpSpPr>
-        <a:xfrm>
-          <a:off x="0" y="0"/>
-          <a:ext cx="0" cy="0"/>
-          <a:chOff x="0" y="0"/>
-          <a:chExt cx="0" cy="0"/>
-        </a:xfrm>
-      </p:grpSpPr>
-      <p:sp>
-        <p:nvSpPr>
-          <p:cNvPr id="2" name="Title 1">
-            <a:extLst>
-              <a:ext uri="{FF2B5EF4-FFF2-40B4-BE49-F238E27FC236}">
-                <a16:creationId xmlns:a16="http://schemas.microsoft.com/office/drawing/2014/main" id="{44251867-B637-4884-8572-A1411CA949D8}"/>
-              </a:ext>
-            </a:extLst>
-          </p:cNvPr>
-          <p:cNvSpPr>
-            <a:spLocks noGrp="1"/>
-          </p:cNvSpPr>
-          <p:nvPr>
-            <p:ph type="title"/>
-          </p:nvPr>
-        </p:nvSpPr>
-        <p:spPr/>
-        <p:txBody>
-          <a:bodyPr/>
-          <a:lstStyle/>
-          <a:p>
-            <a:endParaRPr lang="en-GB"/>
-          </a:p>
-        </p:txBody>
-      </p:sp>
-      <p:sp>
-        <p:nvSpPr>
-          <p:cNvPr id="3" name="Content Placeholder 2">
-            <a:extLst>
-              <a:ext uri="{FF2B5EF4-FFF2-40B4-BE49-F238E27FC236}">
-                <a16:creationId xmlns:a16="http://schemas.microsoft.com/office/drawing/2014/main" id="{FB3BA041-75F9-4C9F-9134-D1107C423041}"/>
-              </a:ext>
-            </a:extLst>
-          </p:cNvPr>
-          <p:cNvSpPr>
-            <a:spLocks noGrp="1"/>
-          </p:cNvSpPr>
-          <p:nvPr>
-            <p:ph idx="1"/>
-          </p:nvPr>
-        </p:nvSpPr>
-        <p:spPr/>
-        <p:txBody>
-          <a:bodyPr/>
-          <a:lstStyle/>
-          <a:p>
-            <a:endParaRPr lang="en-GB"/>
-          </a:p>
-        </p:txBody>
-      </p:sp>
-      <p:pic>
-        <p:nvPicPr>
-          <p:cNvPr id="4" name="Picture 3">
-            <a:extLst>
-              <a:ext uri="{FF2B5EF4-FFF2-40B4-BE49-F238E27FC236}">
-                <a16:creationId xmlns:a16="http://schemas.microsoft.com/office/drawing/2014/main" id="{2850381F-9E8F-440E-9294-A0F6F7745074}"/>
-              </a:ext>
-            </a:extLst>
-          </p:cNvPr>
-          <p:cNvPicPr>
-            <a:picLocks noChangeAspect="1"/>
-          </p:cNvPicPr>
-          <p:nvPr/>
-        </p:nvPicPr>
-        <p:blipFill>
-          <a:blip r:embed="rId2"/>
-          <a:stretch>
-            <a:fillRect/>
-          </a:stretch>
-        </p:blipFill>
-        <p:spPr>
-          <a:xfrm>
-            <a:off x="3294137" y="2279157"/>
-            <a:ext cx="6105460" cy="3743002"/>
-          </a:xfrm>
-          <a:prstGeom prst="rect">
-            <a:avLst/>
-          </a:prstGeom>
-        </p:spPr>
-      </p:pic>
-    </p:spTree>
-    <p:extLst>
-      <p:ext uri="{BB962C8B-B14F-4D97-AF65-F5344CB8AC3E}">
-        <p14:creationId xmlns:p14="http://schemas.microsoft.com/office/powerpoint/2010/main" val="3087158183"/>
+        <p14:creationId xmlns:p14="http://schemas.microsoft.com/office/powerpoint/2010/main" val="1869922142"/>
       </p:ext>
     </p:extLst>
   </p:cSld>
@@ -15571,7 +15323,7 @@
           <p:cNvPr id="2" name="Title 1">
             <a:extLst>
               <a:ext uri="{FF2B5EF4-FFF2-40B4-BE49-F238E27FC236}">
-                <a16:creationId xmlns:a16="http://schemas.microsoft.com/office/drawing/2014/main" id="{E1675649-165F-45CD-BCBD-187B22AD8FDA}"/>
+                <a16:creationId xmlns:a16="http://schemas.microsoft.com/office/drawing/2014/main" id="{2C89FB05-C6B7-4F88-902F-3BEFF42B997F}"/>
               </a:ext>
             </a:extLst>
           </p:cNvPr>
@@ -15582,70 +15334,35 @@
             <p:ph type="title"/>
           </p:nvPr>
         </p:nvSpPr>
-        <p:spPr/>
+        <p:spPr>
+          <a:xfrm>
+            <a:off x="959160" y="1420125"/>
+            <a:ext cx="10273679" cy="3708466"/>
+          </a:xfrm>
+        </p:spPr>
         <p:txBody>
           <a:bodyPr/>
           <a:lstStyle/>
           <a:p>
-            <a:r>
-              <a:rPr lang="en-GB" dirty="0"/>
-              <a:t>Confessions – Part 1 </a:t>
-            </a:r>
-          </a:p>
-        </p:txBody>
-      </p:sp>
-      <p:sp>
-        <p:nvSpPr>
-          <p:cNvPr id="3" name="Content Placeholder 2">
-            <a:extLst>
-              <a:ext uri="{FF2B5EF4-FFF2-40B4-BE49-F238E27FC236}">
-                <a16:creationId xmlns:a16="http://schemas.microsoft.com/office/drawing/2014/main" id="{70EF9D5D-3128-464B-8CA9-EE761595681E}"/>
-              </a:ext>
-            </a:extLst>
-          </p:cNvPr>
-          <p:cNvSpPr>
-            <a:spLocks noGrp="1"/>
-          </p:cNvSpPr>
-          <p:nvPr>
-            <p:ph idx="1"/>
-          </p:nvPr>
-        </p:nvSpPr>
-        <p:spPr>
-          <a:xfrm>
-            <a:off x="1104293" y="1853248"/>
-            <a:ext cx="8946541" cy="4195481"/>
-          </a:xfrm>
-        </p:spPr>
-        <p:txBody>
-          <a:bodyPr/>
-          <a:lstStyle/>
-          <a:p>
-            <a:pPr marL="0" indent="0">
-              <a:buNone/>
-            </a:pPr>
-            <a:endParaRPr lang="en-GB" dirty="0"/>
-          </a:p>
-          <a:p>
-            <a:r>
-              <a:rPr lang="en-GB" dirty="0"/>
-              <a:t>I missed the Go Tour</a:t>
-            </a:r>
-          </a:p>
-          <a:p>
-            <a:endParaRPr lang="en-GB" dirty="0"/>
-          </a:p>
-          <a:p>
-            <a:endParaRPr lang="en-GB" dirty="0"/>
-          </a:p>
-          <a:p>
-            <a:endParaRPr lang="en-GB" dirty="0"/>
+            <a:pPr algn="ctr"/>
+            <a:r>
+              <a:rPr lang="en-GB" sz="7200" dirty="0"/>
+              <a:t>Part 2 </a:t>
+            </a:r>
+            <a:br>
+              <a:rPr lang="en-GB" sz="7200" dirty="0"/>
+            </a:br>
+            <a:r>
+              <a:rPr lang="en-GB" sz="7200" dirty="0"/>
+              <a:t>Modelling the life of 10 Gophers </a:t>
+            </a:r>
           </a:p>
         </p:txBody>
       </p:sp>
     </p:spTree>
     <p:extLst>
       <p:ext uri="{BB962C8B-B14F-4D97-AF65-F5344CB8AC3E}">
-        <p14:creationId xmlns:p14="http://schemas.microsoft.com/office/powerpoint/2010/main" val="2770599664"/>
+        <p14:creationId xmlns:p14="http://schemas.microsoft.com/office/powerpoint/2010/main" val="557703418"/>
       </p:ext>
     </p:extLst>
   </p:cSld>

</xml_diff>

<commit_message>
Completed first pass of creating a 'collider' map
</commit_message>
<xml_diff>
--- a/GopherLife.pptx
+++ b/GopherLife.pptx
@@ -5,14 +5,14 @@
     <p:sldMasterId id="2147483678" r:id="rId1"/>
   </p:sldMasterIdLst>
   <p:notesMasterIdLst>
-    <p:notesMasterId r:id="rId55"/>
+    <p:notesMasterId r:id="rId53"/>
   </p:notesMasterIdLst>
   <p:sldIdLst>
     <p:sldId id="256" r:id="rId2"/>
     <p:sldId id="260" r:id="rId3"/>
     <p:sldId id="268" r:id="rId4"/>
-    <p:sldId id="357" r:id="rId5"/>
-    <p:sldId id="269" r:id="rId6"/>
+    <p:sldId id="269" r:id="rId5"/>
+    <p:sldId id="365" r:id="rId6"/>
     <p:sldId id="270" r:id="rId7"/>
     <p:sldId id="271" r:id="rId8"/>
     <p:sldId id="272" r:id="rId9"/>
@@ -27,40 +27,38 @@
     <p:sldId id="335" r:id="rId18"/>
     <p:sldId id="331" r:id="rId19"/>
     <p:sldId id="332" r:id="rId20"/>
-    <p:sldId id="333" r:id="rId21"/>
-    <p:sldId id="342" r:id="rId22"/>
-    <p:sldId id="334" r:id="rId23"/>
-    <p:sldId id="343" r:id="rId24"/>
-    <p:sldId id="288" r:id="rId25"/>
-    <p:sldId id="338" r:id="rId26"/>
-    <p:sldId id="308" r:id="rId27"/>
-    <p:sldId id="345" r:id="rId28"/>
-    <p:sldId id="303" r:id="rId29"/>
-    <p:sldId id="314" r:id="rId30"/>
-    <p:sldId id="311" r:id="rId31"/>
-    <p:sldId id="316" r:id="rId32"/>
-    <p:sldId id="317" r:id="rId33"/>
-    <p:sldId id="318" r:id="rId34"/>
-    <p:sldId id="320" r:id="rId35"/>
-    <p:sldId id="346" r:id="rId36"/>
-    <p:sldId id="356" r:id="rId37"/>
-    <p:sldId id="322" r:id="rId38"/>
-    <p:sldId id="319" r:id="rId39"/>
-    <p:sldId id="287" r:id="rId40"/>
-    <p:sldId id="347" r:id="rId41"/>
-    <p:sldId id="349" r:id="rId42"/>
-    <p:sldId id="351" r:id="rId43"/>
-    <p:sldId id="359" r:id="rId44"/>
-    <p:sldId id="350" r:id="rId45"/>
-    <p:sldId id="358" r:id="rId46"/>
-    <p:sldId id="361" r:id="rId47"/>
-    <p:sldId id="360" r:id="rId48"/>
-    <p:sldId id="353" r:id="rId49"/>
-    <p:sldId id="362" r:id="rId50"/>
-    <p:sldId id="363" r:id="rId51"/>
-    <p:sldId id="286" r:id="rId52"/>
-    <p:sldId id="327" r:id="rId53"/>
-    <p:sldId id="364" r:id="rId54"/>
+    <p:sldId id="342" r:id="rId21"/>
+    <p:sldId id="334" r:id="rId22"/>
+    <p:sldId id="343" r:id="rId23"/>
+    <p:sldId id="288" r:id="rId24"/>
+    <p:sldId id="338" r:id="rId25"/>
+    <p:sldId id="308" r:id="rId26"/>
+    <p:sldId id="345" r:id="rId27"/>
+    <p:sldId id="303" r:id="rId28"/>
+    <p:sldId id="314" r:id="rId29"/>
+    <p:sldId id="311" r:id="rId30"/>
+    <p:sldId id="316" r:id="rId31"/>
+    <p:sldId id="317" r:id="rId32"/>
+    <p:sldId id="318" r:id="rId33"/>
+    <p:sldId id="320" r:id="rId34"/>
+    <p:sldId id="346" r:id="rId35"/>
+    <p:sldId id="356" r:id="rId36"/>
+    <p:sldId id="322" r:id="rId37"/>
+    <p:sldId id="319" r:id="rId38"/>
+    <p:sldId id="287" r:id="rId39"/>
+    <p:sldId id="349" r:id="rId40"/>
+    <p:sldId id="351" r:id="rId41"/>
+    <p:sldId id="359" r:id="rId42"/>
+    <p:sldId id="350" r:id="rId43"/>
+    <p:sldId id="358" r:id="rId44"/>
+    <p:sldId id="361" r:id="rId45"/>
+    <p:sldId id="360" r:id="rId46"/>
+    <p:sldId id="353" r:id="rId47"/>
+    <p:sldId id="362" r:id="rId48"/>
+    <p:sldId id="363" r:id="rId49"/>
+    <p:sldId id="286" r:id="rId50"/>
+    <p:sldId id="327" r:id="rId51"/>
+    <p:sldId id="364" r:id="rId52"/>
   </p:sldIdLst>
   <p:sldSz cx="12192000" cy="6858000"/>
   <p:notesSz cx="6858000" cy="9144000"/>
@@ -249,7 +247,7 @@
           <a:p>
             <a:fld id="{4F997A0C-E4B2-467D-ABDF-C6BB0AD1437F}" type="datetimeFigureOut">
               <a:rPr lang="en-GB" smtClean="0"/>
-              <a:t>01/03/2019</a:t>
+              <a:t>04/03/2019</a:t>
             </a:fld>
             <a:endParaRPr lang="en-GB"/>
           </a:p>
@@ -585,7 +583,7 @@
           <a:p>
             <a:fld id="{D37E09BB-0EE2-4AA1-9043-B532D0F5CCDE}" type="slidenum">
               <a:rPr lang="en-GB" smtClean="0"/>
-              <a:t>27</a:t>
+              <a:t>26</a:t>
             </a:fld>
             <a:endParaRPr lang="en-GB"/>
           </a:p>
@@ -669,7 +667,7 @@
           <a:p>
             <a:fld id="{D37E09BB-0EE2-4AA1-9043-B532D0F5CCDE}" type="slidenum">
               <a:rPr lang="en-GB" smtClean="0"/>
-              <a:t>28</a:t>
+              <a:t>27</a:t>
             </a:fld>
             <a:endParaRPr lang="en-GB"/>
           </a:p>
@@ -774,7 +772,7 @@
           <a:p>
             <a:fld id="{D37E09BB-0EE2-4AA1-9043-B532D0F5CCDE}" type="slidenum">
               <a:rPr lang="en-GB" smtClean="0"/>
-              <a:t>35</a:t>
+              <a:t>34</a:t>
             </a:fld>
             <a:endParaRPr lang="en-GB"/>
           </a:p>
@@ -858,7 +856,7 @@
           <a:p>
             <a:fld id="{D37E09BB-0EE2-4AA1-9043-B532D0F5CCDE}" type="slidenum">
               <a:rPr lang="en-GB" smtClean="0"/>
-              <a:t>37</a:t>
+              <a:t>36</a:t>
             </a:fld>
             <a:endParaRPr lang="en-GB"/>
           </a:p>
@@ -963,7 +961,7 @@
           <a:p>
             <a:fld id="{D37E09BB-0EE2-4AA1-9043-B532D0F5CCDE}" type="slidenum">
               <a:rPr lang="en-GB" smtClean="0"/>
-              <a:t>45</a:t>
+              <a:t>43</a:t>
             </a:fld>
             <a:endParaRPr lang="en-GB"/>
           </a:p>
@@ -1168,7 +1166,7 @@
           <a:p>
             <a:fld id="{55E4148D-2AA3-4A29-8641-0082B7E18494}" type="datetimeFigureOut">
               <a:rPr lang="en-GB" smtClean="0"/>
-              <a:t>01/03/2019</a:t>
+              <a:t>04/03/2019</a:t>
             </a:fld>
             <a:endParaRPr lang="en-GB"/>
           </a:p>
@@ -1443,7 +1441,7 @@
           <a:p>
             <a:fld id="{55E4148D-2AA3-4A29-8641-0082B7E18494}" type="datetimeFigureOut">
               <a:rPr lang="en-GB" smtClean="0"/>
-              <a:t>01/03/2019</a:t>
+              <a:t>04/03/2019</a:t>
             </a:fld>
             <a:endParaRPr lang="en-GB"/>
           </a:p>
@@ -1637,7 +1635,7 @@
           <a:p>
             <a:fld id="{55E4148D-2AA3-4A29-8641-0082B7E18494}" type="datetimeFigureOut">
               <a:rPr lang="en-GB" smtClean="0"/>
-              <a:t>01/03/2019</a:t>
+              <a:t>04/03/2019</a:t>
             </a:fld>
             <a:endParaRPr lang="en-GB"/>
           </a:p>
@@ -1910,7 +1908,7 @@
           <a:p>
             <a:fld id="{55E4148D-2AA3-4A29-8641-0082B7E18494}" type="datetimeFigureOut">
               <a:rPr lang="en-GB" smtClean="0"/>
-              <a:t>01/03/2019</a:t>
+              <a:t>04/03/2019</a:t>
             </a:fld>
             <a:endParaRPr lang="en-GB"/>
           </a:p>
@@ -2251,7 +2249,7 @@
           <a:p>
             <a:fld id="{55E4148D-2AA3-4A29-8641-0082B7E18494}" type="datetimeFigureOut">
               <a:rPr lang="en-GB" smtClean="0"/>
-              <a:t>01/03/2019</a:t>
+              <a:t>04/03/2019</a:t>
             </a:fld>
             <a:endParaRPr lang="en-GB"/>
           </a:p>
@@ -2874,7 +2872,7 @@
           <a:p>
             <a:fld id="{55E4148D-2AA3-4A29-8641-0082B7E18494}" type="datetimeFigureOut">
               <a:rPr lang="en-GB" smtClean="0"/>
-              <a:t>01/03/2019</a:t>
+              <a:t>04/03/2019</a:t>
             </a:fld>
             <a:endParaRPr lang="en-GB"/>
           </a:p>
@@ -3734,7 +3732,7 @@
           <a:p>
             <a:fld id="{55E4148D-2AA3-4A29-8641-0082B7E18494}" type="datetimeFigureOut">
               <a:rPr lang="en-GB" smtClean="0"/>
-              <a:t>01/03/2019</a:t>
+              <a:t>04/03/2019</a:t>
             </a:fld>
             <a:endParaRPr lang="en-GB"/>
           </a:p>
@@ -3904,7 +3902,7 @@
           <a:p>
             <a:fld id="{55E4148D-2AA3-4A29-8641-0082B7E18494}" type="datetimeFigureOut">
               <a:rPr lang="en-GB" smtClean="0"/>
-              <a:t>01/03/2019</a:t>
+              <a:t>04/03/2019</a:t>
             </a:fld>
             <a:endParaRPr lang="en-GB"/>
           </a:p>
@@ -4084,7 +4082,7 @@
           <a:p>
             <a:fld id="{55E4148D-2AA3-4A29-8641-0082B7E18494}" type="datetimeFigureOut">
               <a:rPr lang="en-GB" smtClean="0"/>
-              <a:t>01/03/2019</a:t>
+              <a:t>04/03/2019</a:t>
             </a:fld>
             <a:endParaRPr lang="en-GB"/>
           </a:p>
@@ -4254,7 +4252,7 @@
           <a:p>
             <a:fld id="{55E4148D-2AA3-4A29-8641-0082B7E18494}" type="datetimeFigureOut">
               <a:rPr lang="en-GB" smtClean="0"/>
-              <a:t>01/03/2019</a:t>
+              <a:t>04/03/2019</a:t>
             </a:fld>
             <a:endParaRPr lang="en-GB"/>
           </a:p>
@@ -4501,7 +4499,7 @@
           <a:p>
             <a:fld id="{55E4148D-2AA3-4A29-8641-0082B7E18494}" type="datetimeFigureOut">
               <a:rPr lang="en-GB" smtClean="0"/>
-              <a:t>01/03/2019</a:t>
+              <a:t>04/03/2019</a:t>
             </a:fld>
             <a:endParaRPr lang="en-GB"/>
           </a:p>
@@ -4793,7 +4791,7 @@
           <a:p>
             <a:fld id="{55E4148D-2AA3-4A29-8641-0082B7E18494}" type="datetimeFigureOut">
               <a:rPr lang="en-GB" smtClean="0"/>
-              <a:t>01/03/2019</a:t>
+              <a:t>04/03/2019</a:t>
             </a:fld>
             <a:endParaRPr lang="en-GB"/>
           </a:p>
@@ -5237,7 +5235,7 @@
           <a:p>
             <a:fld id="{55E4148D-2AA3-4A29-8641-0082B7E18494}" type="datetimeFigureOut">
               <a:rPr lang="en-GB" smtClean="0"/>
-              <a:t>01/03/2019</a:t>
+              <a:t>04/03/2019</a:t>
             </a:fld>
             <a:endParaRPr lang="en-GB"/>
           </a:p>
@@ -5355,7 +5353,7 @@
           <a:p>
             <a:fld id="{55E4148D-2AA3-4A29-8641-0082B7E18494}" type="datetimeFigureOut">
               <a:rPr lang="en-GB" smtClean="0"/>
-              <a:t>01/03/2019</a:t>
+              <a:t>04/03/2019</a:t>
             </a:fld>
             <a:endParaRPr lang="en-GB"/>
           </a:p>
@@ -5450,7 +5448,7 @@
           <a:p>
             <a:fld id="{55E4148D-2AA3-4A29-8641-0082B7E18494}" type="datetimeFigureOut">
               <a:rPr lang="en-GB" smtClean="0"/>
-              <a:t>01/03/2019</a:t>
+              <a:t>04/03/2019</a:t>
             </a:fld>
             <a:endParaRPr lang="en-GB"/>
           </a:p>
@@ -5729,7 +5727,7 @@
           <a:p>
             <a:fld id="{55E4148D-2AA3-4A29-8641-0082B7E18494}" type="datetimeFigureOut">
               <a:rPr lang="en-GB" smtClean="0"/>
-              <a:t>01/03/2019</a:t>
+              <a:t>04/03/2019</a:t>
             </a:fld>
             <a:endParaRPr lang="en-GB"/>
           </a:p>
@@ -6004,7 +6002,7 @@
           <a:p>
             <a:fld id="{55E4148D-2AA3-4A29-8641-0082B7E18494}" type="datetimeFigureOut">
               <a:rPr lang="en-GB" smtClean="0"/>
-              <a:t>01/03/2019</a:t>
+              <a:t>04/03/2019</a:t>
             </a:fld>
             <a:endParaRPr lang="en-GB"/>
           </a:p>
@@ -6433,7 +6431,7 @@
           <a:p>
             <a:fld id="{55E4148D-2AA3-4A29-8641-0082B7E18494}" type="datetimeFigureOut">
               <a:rPr lang="en-GB" smtClean="0"/>
-              <a:t>01/03/2019</a:t>
+              <a:t>04/03/2019</a:t>
             </a:fld>
             <a:endParaRPr lang="en-GB"/>
           </a:p>
@@ -8094,7 +8092,7 @@
           <a:p>
             <a:r>
               <a:rPr lang="en-GB" dirty="0"/>
-              <a:t>I expanded on what a gopher could do with it’s life</a:t>
+              <a:t>I expanded on what a gopher could do with its life</a:t>
             </a:r>
           </a:p>
         </p:txBody>
@@ -8363,6 +8361,18 @@
               <a:t>This was pretty difficult to see using text so I needed to find a way to visualize what I was doing</a:t>
             </a:r>
           </a:p>
+          <a:p>
+            <a:endParaRPr lang="en-GB" dirty="0"/>
+          </a:p>
+          <a:p>
+            <a:r>
+              <a:rPr lang="en-GB" dirty="0"/>
+              <a:t>Go fortunately had packages for rendering to html </a:t>
+            </a:r>
+          </a:p>
+          <a:p>
+            <a:endParaRPr lang="en-GB" dirty="0"/>
+          </a:p>
         </p:txBody>
       </p:sp>
     </p:spTree>
@@ -8540,7 +8550,7 @@
           <p:cNvPr id="2" name="Title 1">
             <a:extLst>
               <a:ext uri="{FF2B5EF4-FFF2-40B4-BE49-F238E27FC236}">
-                <a16:creationId xmlns:a16="http://schemas.microsoft.com/office/drawing/2014/main" id="{9B72C8D0-0707-4EB6-AA65-ACC6851307E0}"/>
+                <a16:creationId xmlns:a16="http://schemas.microsoft.com/office/drawing/2014/main" id="{F7845130-86DF-473D-8EE9-5D5B066B769B}"/>
               </a:ext>
             </a:extLst>
           </p:cNvPr>
@@ -8557,83 +8567,57 @@
           <a:lstStyle/>
           <a:p>
             <a:r>
+              <a:rPr lang="en-GB" dirty="0" err="1"/>
+              <a:t>Gopherlife</a:t>
+            </a:r>
+            <a:r>
               <a:rPr lang="en-GB" dirty="0"/>
-              <a:t>Part 3 - Continued</a:t>
-            </a:r>
-          </a:p>
-        </p:txBody>
-      </p:sp>
-      <p:sp>
-        <p:nvSpPr>
-          <p:cNvPr id="3" name="Content Placeholder 2">
+              <a:t> (Alpha)</a:t>
+            </a:r>
+          </a:p>
+        </p:txBody>
+      </p:sp>
+      <p:pic>
+        <p:nvPicPr>
+          <p:cNvPr id="5" name="Content Placeholder 4">
             <a:extLst>
               <a:ext uri="{FF2B5EF4-FFF2-40B4-BE49-F238E27FC236}">
-                <a16:creationId xmlns:a16="http://schemas.microsoft.com/office/drawing/2014/main" id="{551353EF-3932-435E-A540-DB3508247885}"/>
+                <a16:creationId xmlns:a16="http://schemas.microsoft.com/office/drawing/2014/main" id="{6FB4E8A9-E8F6-4901-992E-B81482D05939}"/>
               </a:ext>
             </a:extLst>
           </p:cNvPr>
-          <p:cNvSpPr>
-            <a:spLocks noGrp="1"/>
-          </p:cNvSpPr>
+          <p:cNvPicPr>
+            <a:picLocks noGrp="1" noChangeAspect="1"/>
+          </p:cNvPicPr>
           <p:nvPr>
             <p:ph idx="1"/>
           </p:nvPr>
-        </p:nvSpPr>
+        </p:nvPicPr>
+        <p:blipFill>
+          <a:blip r:embed="rId2">
+            <a:extLst>
+              <a:ext uri="{28A0092B-C50C-407E-A947-70E740481C1C}">
+                <a14:useLocalDpi xmlns:a14="http://schemas.microsoft.com/office/drawing/2010/main" val="0"/>
+              </a:ext>
+            </a:extLst>
+          </a:blip>
+          <a:stretch>
+            <a:fillRect/>
+          </a:stretch>
+        </p:blipFill>
         <p:spPr>
           <a:xfrm>
-            <a:off x="1103312" y="2052919"/>
-            <a:ext cx="8946541" cy="2020318"/>
+            <a:off x="1533588" y="2052638"/>
+            <a:ext cx="8086599" cy="4195762"/>
           </a:xfrm>
         </p:spPr>
-        <p:txBody>
-          <a:bodyPr>
-            <a:normAutofit lnSpcReduction="10000"/>
-          </a:bodyPr>
-          <a:lstStyle/>
-          <a:p>
-            <a:r>
-              <a:rPr lang="en-GB" dirty="0"/>
-              <a:t>Go fortunately had packages for rendering to html </a:t>
-            </a:r>
-          </a:p>
-          <a:p>
-            <a:endParaRPr lang="en-GB" dirty="0"/>
-          </a:p>
-          <a:p>
-            <a:r>
-              <a:rPr lang="en-GB" dirty="0"/>
-              <a:t>Here is an example of what the project first looked like:</a:t>
-            </a:r>
-          </a:p>
-          <a:p>
-            <a:endParaRPr lang="en-GB" dirty="0"/>
-          </a:p>
-          <a:p>
-            <a:pPr marL="0" indent="0">
-              <a:buNone/>
-            </a:pPr>
-            <a:r>
-              <a:rPr lang="en-GB" dirty="0"/>
-              <a:t>(This is where you show something on your laptop!)</a:t>
-            </a:r>
-          </a:p>
-          <a:p>
-            <a:endParaRPr lang="en-GB" dirty="0"/>
-          </a:p>
-          <a:p>
-            <a:endParaRPr lang="en-GB" dirty="0"/>
-          </a:p>
-          <a:p>
-            <a:endParaRPr lang="en-GB" dirty="0"/>
-          </a:p>
-        </p:txBody>
-      </p:sp>
-      <p:sp>
-        <p:nvSpPr>
-          <p:cNvPr id="5" name="Content Placeholder 2">
+      </p:pic>
+      <p:sp>
+        <p:nvSpPr>
+          <p:cNvPr id="6" name="Content Placeholder 2">
             <a:extLst>
               <a:ext uri="{FF2B5EF4-FFF2-40B4-BE49-F238E27FC236}">
-                <a16:creationId xmlns:a16="http://schemas.microsoft.com/office/drawing/2014/main" id="{AD77FDDF-E933-4F8C-9C77-D897794B8A16}"/>
+                <a16:creationId xmlns:a16="http://schemas.microsoft.com/office/drawing/2014/main" id="{BE2DE85D-B172-465F-AFBF-2AC01847FCEC}"/>
               </a:ext>
             </a:extLst>
           </p:cNvPr>
@@ -8644,8 +8628,8 @@
         </p:nvSpPr>
         <p:spPr>
           <a:xfrm>
-            <a:off x="3859480" y="5127380"/>
-            <a:ext cx="5498276" cy="457896"/>
+            <a:off x="147297" y="1395352"/>
+            <a:ext cx="10402349" cy="457896"/>
           </a:xfrm>
           <a:prstGeom prst="rect">
             <a:avLst/>
@@ -8887,398 +8871,6 @@
               <a:buNone/>
             </a:pPr>
             <a:r>
-              <a:rPr lang="en-GB" sz="3400" dirty="0">
-                <a:solidFill>
-                  <a:schemeClr val="accent1">
-                    <a:lumMod val="60000"/>
-                    <a:lumOff val="40000"/>
-                  </a:schemeClr>
-                </a:solidFill>
-              </a:rPr>
-              <a:t>!</a:t>
-            </a:r>
-            <a:r>
-              <a:rPr lang="en-GB" sz="3400" dirty="0"/>
-              <a:t> – Carrot 		</a:t>
-            </a:r>
-            <a:r>
-              <a:rPr lang="en-GB" sz="3400" dirty="0">
-                <a:solidFill>
-                  <a:srgbClr val="00B050"/>
-                </a:solidFill>
-              </a:rPr>
-              <a:t>G </a:t>
-            </a:r>
-            <a:r>
-              <a:rPr lang="en-GB" sz="3400" dirty="0"/>
-              <a:t>- Gopher</a:t>
-            </a:r>
-          </a:p>
-          <a:p>
-            <a:pPr algn="ctr"/>
-            <a:endParaRPr lang="en-GB" dirty="0"/>
-          </a:p>
-          <a:p>
-            <a:endParaRPr lang="en-GB" dirty="0"/>
-          </a:p>
-        </p:txBody>
-      </p:sp>
-    </p:spTree>
-    <p:extLst>
-      <p:ext uri="{BB962C8B-B14F-4D97-AF65-F5344CB8AC3E}">
-        <p14:creationId xmlns:p14="http://schemas.microsoft.com/office/powerpoint/2010/main" val="2517849022"/>
-      </p:ext>
-    </p:extLst>
-  </p:cSld>
-  <p:clrMapOvr>
-    <a:masterClrMapping/>
-  </p:clrMapOvr>
-</p:sld>
-</file>
-
-<file path=ppt/slides/slide21.xml><?xml version="1.0" encoding="utf-8"?>
-<p:sld xmlns:a="http://schemas.openxmlformats.org/drawingml/2006/main" xmlns:r="http://schemas.openxmlformats.org/officeDocument/2006/relationships" xmlns:p="http://schemas.openxmlformats.org/presentationml/2006/main">
-  <p:cSld>
-    <p:spTree>
-      <p:nvGrpSpPr>
-        <p:cNvPr id="1" name=""/>
-        <p:cNvGrpSpPr/>
-        <p:nvPr/>
-      </p:nvGrpSpPr>
-      <p:grpSpPr>
-        <a:xfrm>
-          <a:off x="0" y="0"/>
-          <a:ext cx="0" cy="0"/>
-          <a:chOff x="0" y="0"/>
-          <a:chExt cx="0" cy="0"/>
-        </a:xfrm>
-      </p:grpSpPr>
-      <p:sp>
-        <p:nvSpPr>
-          <p:cNvPr id="2" name="Title 1">
-            <a:extLst>
-              <a:ext uri="{FF2B5EF4-FFF2-40B4-BE49-F238E27FC236}">
-                <a16:creationId xmlns:a16="http://schemas.microsoft.com/office/drawing/2014/main" id="{F7845130-86DF-473D-8EE9-5D5B066B769B}"/>
-              </a:ext>
-            </a:extLst>
-          </p:cNvPr>
-          <p:cNvSpPr>
-            <a:spLocks noGrp="1"/>
-          </p:cNvSpPr>
-          <p:nvPr>
-            <p:ph type="title"/>
-          </p:nvPr>
-        </p:nvSpPr>
-        <p:spPr/>
-        <p:txBody>
-          <a:bodyPr/>
-          <a:lstStyle/>
-          <a:p>
-            <a:r>
-              <a:rPr lang="en-GB" dirty="0" err="1"/>
-              <a:t>Gopherlife</a:t>
-            </a:r>
-            <a:r>
-              <a:rPr lang="en-GB" dirty="0"/>
-              <a:t> (Alpha)</a:t>
-            </a:r>
-          </a:p>
-        </p:txBody>
-      </p:sp>
-      <p:pic>
-        <p:nvPicPr>
-          <p:cNvPr id="5" name="Content Placeholder 4">
-            <a:extLst>
-              <a:ext uri="{FF2B5EF4-FFF2-40B4-BE49-F238E27FC236}">
-                <a16:creationId xmlns:a16="http://schemas.microsoft.com/office/drawing/2014/main" id="{6FB4E8A9-E8F6-4901-992E-B81482D05939}"/>
-              </a:ext>
-            </a:extLst>
-          </p:cNvPr>
-          <p:cNvPicPr>
-            <a:picLocks noGrp="1" noChangeAspect="1"/>
-          </p:cNvPicPr>
-          <p:nvPr>
-            <p:ph idx="1"/>
-          </p:nvPr>
-        </p:nvPicPr>
-        <p:blipFill>
-          <a:blip r:embed="rId2">
-            <a:extLst>
-              <a:ext uri="{28A0092B-C50C-407E-A947-70E740481C1C}">
-                <a14:useLocalDpi xmlns:a14="http://schemas.microsoft.com/office/drawing/2010/main" val="0"/>
-              </a:ext>
-            </a:extLst>
-          </a:blip>
-          <a:stretch>
-            <a:fillRect/>
-          </a:stretch>
-        </p:blipFill>
-        <p:spPr>
-          <a:xfrm>
-            <a:off x="1533588" y="2052638"/>
-            <a:ext cx="8086599" cy="4195762"/>
-          </a:xfrm>
-        </p:spPr>
-      </p:pic>
-      <p:sp>
-        <p:nvSpPr>
-          <p:cNvPr id="6" name="Content Placeholder 2">
-            <a:extLst>
-              <a:ext uri="{FF2B5EF4-FFF2-40B4-BE49-F238E27FC236}">
-                <a16:creationId xmlns:a16="http://schemas.microsoft.com/office/drawing/2014/main" id="{BE2DE85D-B172-465F-AFBF-2AC01847FCEC}"/>
-              </a:ext>
-            </a:extLst>
-          </p:cNvPr>
-          <p:cNvSpPr txBox="1">
-            <a:spLocks/>
-          </p:cNvSpPr>
-          <p:nvPr/>
-        </p:nvSpPr>
-        <p:spPr>
-          <a:xfrm>
-            <a:off x="147297" y="1395352"/>
-            <a:ext cx="10402349" cy="457896"/>
-          </a:xfrm>
-          <a:prstGeom prst="rect">
-            <a:avLst/>
-          </a:prstGeom>
-        </p:spPr>
-        <p:txBody>
-          <a:bodyPr vert="horz" lIns="91440" tIns="45720" rIns="91440" bIns="45720" rtlCol="0">
-            <a:normAutofit fontScale="85000" lnSpcReduction="20000"/>
-          </a:bodyPr>
-          <a:lstStyle>
-            <a:lvl1pPr marL="342900" indent="-342900" algn="l" defTabSz="457200" rtl="0" eaLnBrk="1" latinLnBrk="0" hangingPunct="1">
-              <a:spcBef>
-                <a:spcPts val="1000"/>
-              </a:spcBef>
-              <a:spcAft>
-                <a:spcPts val="0"/>
-              </a:spcAft>
-              <a:buClr>
-                <a:schemeClr val="bg2">
-                  <a:lumMod val="40000"/>
-                  <a:lumOff val="60000"/>
-                </a:schemeClr>
-              </a:buClr>
-              <a:buSzPct val="80000"/>
-              <a:buFont typeface="Wingdings 3" charset="2"/>
-              <a:buChar char=""/>
-              <a:defRPr sz="2000" b="0" i="0" kern="1200">
-                <a:solidFill>
-                  <a:schemeClr val="tx1"/>
-                </a:solidFill>
-                <a:latin typeface="+mj-lt"/>
-                <a:ea typeface="+mj-ea"/>
-                <a:cs typeface="+mj-cs"/>
-              </a:defRPr>
-            </a:lvl1pPr>
-            <a:lvl2pPr marL="742950" indent="-285750" algn="l" defTabSz="457200" rtl="0" eaLnBrk="1" latinLnBrk="0" hangingPunct="1">
-              <a:spcBef>
-                <a:spcPts val="1000"/>
-              </a:spcBef>
-              <a:spcAft>
-                <a:spcPts val="0"/>
-              </a:spcAft>
-              <a:buClr>
-                <a:schemeClr val="bg2">
-                  <a:lumMod val="40000"/>
-                  <a:lumOff val="60000"/>
-                </a:schemeClr>
-              </a:buClr>
-              <a:buSzPct val="80000"/>
-              <a:buFont typeface="Wingdings 3" charset="2"/>
-              <a:buChar char=""/>
-              <a:defRPr sz="1800" b="0" i="0" kern="1200">
-                <a:solidFill>
-                  <a:schemeClr val="tx1"/>
-                </a:solidFill>
-                <a:latin typeface="+mj-lt"/>
-                <a:ea typeface="+mj-ea"/>
-                <a:cs typeface="+mj-cs"/>
-              </a:defRPr>
-            </a:lvl2pPr>
-            <a:lvl3pPr marL="1143000" indent="-228600" algn="l" defTabSz="457200" rtl="0" eaLnBrk="1" latinLnBrk="0" hangingPunct="1">
-              <a:spcBef>
-                <a:spcPts val="1000"/>
-              </a:spcBef>
-              <a:spcAft>
-                <a:spcPts val="0"/>
-              </a:spcAft>
-              <a:buClr>
-                <a:schemeClr val="bg2">
-                  <a:lumMod val="40000"/>
-                  <a:lumOff val="60000"/>
-                </a:schemeClr>
-              </a:buClr>
-              <a:buSzPct val="80000"/>
-              <a:buFont typeface="Wingdings 3" charset="2"/>
-              <a:buChar char=""/>
-              <a:defRPr sz="1600" b="0" i="0" kern="1200">
-                <a:solidFill>
-                  <a:schemeClr val="tx1"/>
-                </a:solidFill>
-                <a:latin typeface="+mj-lt"/>
-                <a:ea typeface="+mj-ea"/>
-                <a:cs typeface="+mj-cs"/>
-              </a:defRPr>
-            </a:lvl3pPr>
-            <a:lvl4pPr marL="1600200" indent="-228600" algn="l" defTabSz="457200" rtl="0" eaLnBrk="1" latinLnBrk="0" hangingPunct="1">
-              <a:spcBef>
-                <a:spcPts val="1000"/>
-              </a:spcBef>
-              <a:spcAft>
-                <a:spcPts val="0"/>
-              </a:spcAft>
-              <a:buClr>
-                <a:schemeClr val="bg2">
-                  <a:lumMod val="40000"/>
-                  <a:lumOff val="60000"/>
-                </a:schemeClr>
-              </a:buClr>
-              <a:buSzPct val="80000"/>
-              <a:buFont typeface="Wingdings 3" charset="2"/>
-              <a:buChar char=""/>
-              <a:defRPr sz="1400" b="0" i="0" kern="1200">
-                <a:solidFill>
-                  <a:schemeClr val="tx1"/>
-                </a:solidFill>
-                <a:latin typeface="+mj-lt"/>
-                <a:ea typeface="+mj-ea"/>
-                <a:cs typeface="+mj-cs"/>
-              </a:defRPr>
-            </a:lvl4pPr>
-            <a:lvl5pPr marL="2057400" indent="-228600" algn="l" defTabSz="457200" rtl="0" eaLnBrk="1" latinLnBrk="0" hangingPunct="1">
-              <a:spcBef>
-                <a:spcPts val="1000"/>
-              </a:spcBef>
-              <a:spcAft>
-                <a:spcPts val="0"/>
-              </a:spcAft>
-              <a:buClr>
-                <a:schemeClr val="bg2">
-                  <a:lumMod val="40000"/>
-                  <a:lumOff val="60000"/>
-                </a:schemeClr>
-              </a:buClr>
-              <a:buSzPct val="80000"/>
-              <a:buFont typeface="Wingdings 3" charset="2"/>
-              <a:buChar char=""/>
-              <a:defRPr sz="1400" b="0" i="0" kern="1200">
-                <a:solidFill>
-                  <a:schemeClr val="tx1"/>
-                </a:solidFill>
-                <a:latin typeface="+mj-lt"/>
-                <a:ea typeface="+mj-ea"/>
-                <a:cs typeface="+mj-cs"/>
-              </a:defRPr>
-            </a:lvl5pPr>
-            <a:lvl6pPr marL="2506000" indent="-228600" algn="l" defTabSz="457200" rtl="0" eaLnBrk="1" latinLnBrk="0" hangingPunct="1">
-              <a:spcBef>
-                <a:spcPts val="1000"/>
-              </a:spcBef>
-              <a:spcAft>
-                <a:spcPts val="0"/>
-              </a:spcAft>
-              <a:buClr>
-                <a:schemeClr val="bg2">
-                  <a:lumMod val="40000"/>
-                  <a:lumOff val="60000"/>
-                </a:schemeClr>
-              </a:buClr>
-              <a:buSzPct val="80000"/>
-              <a:buFont typeface="Wingdings 3" charset="2"/>
-              <a:buChar char=""/>
-              <a:defRPr sz="1400" b="0" i="0" kern="1200">
-                <a:solidFill>
-                  <a:schemeClr val="tx1"/>
-                </a:solidFill>
-                <a:latin typeface="+mj-lt"/>
-                <a:ea typeface="+mj-ea"/>
-                <a:cs typeface="+mj-cs"/>
-              </a:defRPr>
-            </a:lvl6pPr>
-            <a:lvl7pPr marL="2971800" indent="-228600" algn="l" defTabSz="457200" rtl="0" eaLnBrk="1" latinLnBrk="0" hangingPunct="1">
-              <a:spcBef>
-                <a:spcPts val="1000"/>
-              </a:spcBef>
-              <a:spcAft>
-                <a:spcPts val="0"/>
-              </a:spcAft>
-              <a:buClr>
-                <a:schemeClr val="bg2">
-                  <a:lumMod val="40000"/>
-                  <a:lumOff val="60000"/>
-                </a:schemeClr>
-              </a:buClr>
-              <a:buSzPct val="80000"/>
-              <a:buFont typeface="Wingdings 3" charset="2"/>
-              <a:buChar char=""/>
-              <a:defRPr sz="1400" b="0" i="0" kern="1200">
-                <a:solidFill>
-                  <a:schemeClr val="tx1"/>
-                </a:solidFill>
-                <a:latin typeface="+mj-lt"/>
-                <a:ea typeface="+mj-ea"/>
-                <a:cs typeface="+mj-cs"/>
-              </a:defRPr>
-            </a:lvl7pPr>
-            <a:lvl8pPr marL="3429000" indent="-228600" algn="l" defTabSz="457200" rtl="0" eaLnBrk="1" latinLnBrk="0" hangingPunct="1">
-              <a:spcBef>
-                <a:spcPts val="1000"/>
-              </a:spcBef>
-              <a:spcAft>
-                <a:spcPts val="0"/>
-              </a:spcAft>
-              <a:buClr>
-                <a:schemeClr val="bg2">
-                  <a:lumMod val="40000"/>
-                  <a:lumOff val="60000"/>
-                </a:schemeClr>
-              </a:buClr>
-              <a:buSzPct val="80000"/>
-              <a:buFont typeface="Wingdings 3" charset="2"/>
-              <a:buChar char=""/>
-              <a:defRPr sz="1400" b="0" i="0" kern="1200">
-                <a:solidFill>
-                  <a:schemeClr val="tx1"/>
-                </a:solidFill>
-                <a:latin typeface="+mj-lt"/>
-                <a:ea typeface="+mj-ea"/>
-                <a:cs typeface="+mj-cs"/>
-              </a:defRPr>
-            </a:lvl8pPr>
-            <a:lvl9pPr marL="3886200" indent="-228600" algn="l" defTabSz="457200" rtl="0" eaLnBrk="1" latinLnBrk="0" hangingPunct="1">
-              <a:spcBef>
-                <a:spcPts val="1000"/>
-              </a:spcBef>
-              <a:spcAft>
-                <a:spcPts val="0"/>
-              </a:spcAft>
-              <a:buClr>
-                <a:schemeClr val="bg2">
-                  <a:lumMod val="40000"/>
-                  <a:lumOff val="60000"/>
-                </a:schemeClr>
-              </a:buClr>
-              <a:buSzPct val="80000"/>
-              <a:buFont typeface="Wingdings 3" charset="2"/>
-              <a:buChar char=""/>
-              <a:defRPr sz="1400" b="0" i="0" kern="1200">
-                <a:solidFill>
-                  <a:schemeClr val="tx1"/>
-                </a:solidFill>
-                <a:latin typeface="+mj-lt"/>
-                <a:ea typeface="+mj-ea"/>
-                <a:cs typeface="+mj-cs"/>
-              </a:defRPr>
-            </a:lvl9pPr>
-          </a:lstStyle>
-          <a:p>
-            <a:pPr marL="0" indent="0" algn="ctr">
-              <a:buNone/>
-            </a:pPr>
-            <a:r>
               <a:rPr lang="en-GB" sz="3400" dirty="0"/>
               <a:t>Key: (</a:t>
             </a:r>
@@ -9332,7 +8924,7 @@
 </p:sld>
 </file>
 
-<file path=ppt/slides/slide22.xml><?xml version="1.0" encoding="utf-8"?>
+<file path=ppt/slides/slide21.xml><?xml version="1.0" encoding="utf-8"?>
 <p:sld xmlns:a="http://schemas.openxmlformats.org/drawingml/2006/main" xmlns:r="http://schemas.openxmlformats.org/officeDocument/2006/relationships" xmlns:p="http://schemas.openxmlformats.org/presentationml/2006/main">
   <p:cSld>
     <p:spTree>
@@ -9435,7 +9027,7 @@
 </p:sld>
 </file>
 
-<file path=ppt/slides/slide23.xml><?xml version="1.0" encoding="utf-8"?>
+<file path=ppt/slides/slide22.xml><?xml version="1.0" encoding="utf-8"?>
 <p:sld xmlns:a="http://schemas.openxmlformats.org/drawingml/2006/main" xmlns:r="http://schemas.openxmlformats.org/officeDocument/2006/relationships" xmlns:p="http://schemas.openxmlformats.org/presentationml/2006/main">
   <p:cSld>
     <p:spTree>
@@ -9528,7 +9120,7 @@
 </p:sld>
 </file>
 
-<file path=ppt/slides/slide24.xml><?xml version="1.0" encoding="utf-8"?>
+<file path=ppt/slides/slide23.xml><?xml version="1.0" encoding="utf-8"?>
 <p:sld xmlns:a="http://schemas.openxmlformats.org/drawingml/2006/main" xmlns:r="http://schemas.openxmlformats.org/officeDocument/2006/relationships" xmlns:p="http://schemas.openxmlformats.org/presentationml/2006/main">
   <p:cSld>
     <p:spTree>
@@ -9736,7 +9328,7 @@
 </p:sld>
 </file>
 
-<file path=ppt/slides/slide25.xml><?xml version="1.0" encoding="utf-8"?>
+<file path=ppt/slides/slide24.xml><?xml version="1.0" encoding="utf-8"?>
 <p:sld xmlns:a="http://schemas.openxmlformats.org/drawingml/2006/main" xmlns:r="http://schemas.openxmlformats.org/officeDocument/2006/relationships" xmlns:p="http://schemas.openxmlformats.org/presentationml/2006/main">
   <p:cSld>
     <p:spTree>
@@ -9985,7 +9577,7 @@
 </p:sld>
 </file>
 
-<file path=ppt/slides/slide26.xml><?xml version="1.0" encoding="utf-8"?>
+<file path=ppt/slides/slide25.xml><?xml version="1.0" encoding="utf-8"?>
 <p:sld xmlns:a="http://schemas.openxmlformats.org/drawingml/2006/main" xmlns:r="http://schemas.openxmlformats.org/officeDocument/2006/relationships" xmlns:p="http://schemas.openxmlformats.org/presentationml/2006/main">
   <p:cSld>
     <p:spTree>
@@ -10128,7 +9720,7 @@
 </p:sld>
 </file>
 
-<file path=ppt/slides/slide27.xml><?xml version="1.0" encoding="utf-8"?>
+<file path=ppt/slides/slide26.xml><?xml version="1.0" encoding="utf-8"?>
 <p:sld xmlns:a="http://schemas.openxmlformats.org/drawingml/2006/main" xmlns:r="http://schemas.openxmlformats.org/officeDocument/2006/relationships" xmlns:p="http://schemas.openxmlformats.org/presentationml/2006/main">
   <p:cSld>
     <p:spTree>
@@ -10188,7 +9780,7 @@
 </p:sld>
 </file>
 
-<file path=ppt/slides/slide28.xml><?xml version="1.0" encoding="utf-8"?>
+<file path=ppt/slides/slide27.xml><?xml version="1.0" encoding="utf-8"?>
 <p:sld xmlns:a="http://schemas.openxmlformats.org/drawingml/2006/main" xmlns:r="http://schemas.openxmlformats.org/officeDocument/2006/relationships" xmlns:p="http://schemas.openxmlformats.org/presentationml/2006/main">
   <p:cSld>
     <p:spTree>
@@ -10346,7 +9938,7 @@
 </p:sld>
 </file>
 
-<file path=ppt/slides/slide29.xml><?xml version="1.0" encoding="utf-8"?>
+<file path=ppt/slides/slide28.xml><?xml version="1.0" encoding="utf-8"?>
 <p:sld xmlns:a="http://schemas.openxmlformats.org/drawingml/2006/main" xmlns:r="http://schemas.openxmlformats.org/officeDocument/2006/relationships" xmlns:p="http://schemas.openxmlformats.org/presentationml/2006/main">
   <p:cSld>
     <p:spTree>
@@ -10565,111 +10157,7 @@
 </p:sld>
 </file>
 
-<file path=ppt/slides/slide3.xml><?xml version="1.0" encoding="utf-8"?>
-<p:sld xmlns:a="http://schemas.openxmlformats.org/drawingml/2006/main" xmlns:r="http://schemas.openxmlformats.org/officeDocument/2006/relationships" xmlns:p="http://schemas.openxmlformats.org/presentationml/2006/main">
-  <p:cSld>
-    <p:spTree>
-      <p:nvGrpSpPr>
-        <p:cNvPr id="1" name=""/>
-        <p:cNvGrpSpPr/>
-        <p:nvPr/>
-      </p:nvGrpSpPr>
-      <p:grpSpPr>
-        <a:xfrm>
-          <a:off x="0" y="0"/>
-          <a:ext cx="0" cy="0"/>
-          <a:chOff x="0" y="0"/>
-          <a:chExt cx="0" cy="0"/>
-        </a:xfrm>
-      </p:grpSpPr>
-      <p:sp>
-        <p:nvSpPr>
-          <p:cNvPr id="2" name="Title 1">
-            <a:extLst>
-              <a:ext uri="{FF2B5EF4-FFF2-40B4-BE49-F238E27FC236}">
-                <a16:creationId xmlns:a16="http://schemas.microsoft.com/office/drawing/2014/main" id="{B28B1B21-C9ED-4BEB-9BF9-FCC6429558A2}"/>
-              </a:ext>
-            </a:extLst>
-          </p:cNvPr>
-          <p:cNvSpPr>
-            <a:spLocks noGrp="1"/>
-          </p:cNvSpPr>
-          <p:nvPr>
-            <p:ph type="title"/>
-          </p:nvPr>
-        </p:nvSpPr>
-        <p:spPr/>
-        <p:txBody>
-          <a:bodyPr/>
-          <a:lstStyle/>
-          <a:p>
-            <a:r>
-              <a:rPr lang="en-GB" dirty="0"/>
-              <a:t>Plan for the next ‘x’ minutes</a:t>
-            </a:r>
-          </a:p>
-        </p:txBody>
-      </p:sp>
-      <p:sp>
-        <p:nvSpPr>
-          <p:cNvPr id="3" name="Content Placeholder 2">
-            <a:extLst>
-              <a:ext uri="{FF2B5EF4-FFF2-40B4-BE49-F238E27FC236}">
-                <a16:creationId xmlns:a16="http://schemas.microsoft.com/office/drawing/2014/main" id="{BFEEA1E6-BC10-414E-A147-7431DFDA4A06}"/>
-              </a:ext>
-            </a:extLst>
-          </p:cNvPr>
-          <p:cNvSpPr>
-            <a:spLocks noGrp="1"/>
-          </p:cNvSpPr>
-          <p:nvPr>
-            <p:ph idx="1"/>
-          </p:nvPr>
-        </p:nvSpPr>
-        <p:spPr/>
-        <p:txBody>
-          <a:bodyPr/>
-          <a:lstStyle/>
-          <a:p>
-            <a:r>
-              <a:rPr lang="en-GB" dirty="0"/>
-              <a:t>Talk about my experience with my first small Go project. </a:t>
-            </a:r>
-          </a:p>
-          <a:p>
-            <a:endParaRPr lang="en-GB" dirty="0"/>
-          </a:p>
-          <a:p>
-            <a:r>
-              <a:rPr lang="en-GB" dirty="0"/>
-              <a:t>Create a list of things I’ve learnt and mistakes I encountered. </a:t>
-            </a:r>
-          </a:p>
-          <a:p>
-            <a:endParaRPr lang="en-GB" dirty="0"/>
-          </a:p>
-          <a:p>
-            <a:r>
-              <a:rPr lang="en-GB" dirty="0"/>
-              <a:t>Showcase the thoughts of a developer when starting to learn a new language. </a:t>
-            </a:r>
-          </a:p>
-        </p:txBody>
-      </p:sp>
-    </p:spTree>
-    <p:extLst>
-      <p:ext uri="{BB962C8B-B14F-4D97-AF65-F5344CB8AC3E}">
-        <p14:creationId xmlns:p14="http://schemas.microsoft.com/office/powerpoint/2010/main" val="340441809"/>
-      </p:ext>
-    </p:extLst>
-  </p:cSld>
-  <p:clrMapOvr>
-    <a:masterClrMapping/>
-  </p:clrMapOvr>
-</p:sld>
-</file>
-
-<file path=ppt/slides/slide30.xml><?xml version="1.0" encoding="utf-8"?>
+<file path=ppt/slides/slide29.xml><?xml version="1.0" encoding="utf-8"?>
 <p:sld xmlns:a="http://schemas.openxmlformats.org/drawingml/2006/main" xmlns:r="http://schemas.openxmlformats.org/officeDocument/2006/relationships" xmlns:p="http://schemas.openxmlformats.org/presentationml/2006/main">
   <p:cSld>
     <p:spTree>
@@ -10797,7 +10285,7 @@
 </p:sld>
 </file>
 
-<file path=ppt/slides/slide31.xml><?xml version="1.0" encoding="utf-8"?>
+<file path=ppt/slides/slide3.xml><?xml version="1.0" encoding="utf-8"?>
 <p:sld xmlns:a="http://schemas.openxmlformats.org/drawingml/2006/main" xmlns:r="http://schemas.openxmlformats.org/officeDocument/2006/relationships" xmlns:p="http://schemas.openxmlformats.org/presentationml/2006/main">
   <p:cSld>
     <p:spTree>
@@ -10819,6 +10307,110 @@
           <p:cNvPr id="2" name="Title 1">
             <a:extLst>
               <a:ext uri="{FF2B5EF4-FFF2-40B4-BE49-F238E27FC236}">
+                <a16:creationId xmlns:a16="http://schemas.microsoft.com/office/drawing/2014/main" id="{B28B1B21-C9ED-4BEB-9BF9-FCC6429558A2}"/>
+              </a:ext>
+            </a:extLst>
+          </p:cNvPr>
+          <p:cNvSpPr>
+            <a:spLocks noGrp="1"/>
+          </p:cNvSpPr>
+          <p:nvPr>
+            <p:ph type="title"/>
+          </p:nvPr>
+        </p:nvSpPr>
+        <p:spPr/>
+        <p:txBody>
+          <a:bodyPr/>
+          <a:lstStyle/>
+          <a:p>
+            <a:r>
+              <a:rPr lang="en-GB" dirty="0"/>
+              <a:t>Plan for the next ‘x’ minutes</a:t>
+            </a:r>
+          </a:p>
+        </p:txBody>
+      </p:sp>
+      <p:sp>
+        <p:nvSpPr>
+          <p:cNvPr id="3" name="Content Placeholder 2">
+            <a:extLst>
+              <a:ext uri="{FF2B5EF4-FFF2-40B4-BE49-F238E27FC236}">
+                <a16:creationId xmlns:a16="http://schemas.microsoft.com/office/drawing/2014/main" id="{BFEEA1E6-BC10-414E-A147-7431DFDA4A06}"/>
+              </a:ext>
+            </a:extLst>
+          </p:cNvPr>
+          <p:cNvSpPr>
+            <a:spLocks noGrp="1"/>
+          </p:cNvSpPr>
+          <p:nvPr>
+            <p:ph idx="1"/>
+          </p:nvPr>
+        </p:nvSpPr>
+        <p:spPr/>
+        <p:txBody>
+          <a:bodyPr/>
+          <a:lstStyle/>
+          <a:p>
+            <a:r>
+              <a:rPr lang="en-GB" dirty="0"/>
+              <a:t>Talk about my experience with my first small Go project. </a:t>
+            </a:r>
+          </a:p>
+          <a:p>
+            <a:endParaRPr lang="en-GB" dirty="0"/>
+          </a:p>
+          <a:p>
+            <a:r>
+              <a:rPr lang="en-GB" dirty="0"/>
+              <a:t>Create a list of things I’ve learnt and mistakes I encountered. </a:t>
+            </a:r>
+          </a:p>
+          <a:p>
+            <a:endParaRPr lang="en-GB" dirty="0"/>
+          </a:p>
+          <a:p>
+            <a:r>
+              <a:rPr lang="en-GB" dirty="0"/>
+              <a:t>Showcase the thoughts of a developer when starting to learn a new language. </a:t>
+            </a:r>
+          </a:p>
+        </p:txBody>
+      </p:sp>
+    </p:spTree>
+    <p:extLst>
+      <p:ext uri="{BB962C8B-B14F-4D97-AF65-F5344CB8AC3E}">
+        <p14:creationId xmlns:p14="http://schemas.microsoft.com/office/powerpoint/2010/main" val="340441809"/>
+      </p:ext>
+    </p:extLst>
+  </p:cSld>
+  <p:clrMapOvr>
+    <a:masterClrMapping/>
+  </p:clrMapOvr>
+</p:sld>
+</file>
+
+<file path=ppt/slides/slide30.xml><?xml version="1.0" encoding="utf-8"?>
+<p:sld xmlns:a="http://schemas.openxmlformats.org/drawingml/2006/main" xmlns:r="http://schemas.openxmlformats.org/officeDocument/2006/relationships" xmlns:p="http://schemas.openxmlformats.org/presentationml/2006/main">
+  <p:cSld>
+    <p:spTree>
+      <p:nvGrpSpPr>
+        <p:cNvPr id="1" name=""/>
+        <p:cNvGrpSpPr/>
+        <p:nvPr/>
+      </p:nvGrpSpPr>
+      <p:grpSpPr>
+        <a:xfrm>
+          <a:off x="0" y="0"/>
+          <a:ext cx="0" cy="0"/>
+          <a:chOff x="0" y="0"/>
+          <a:chExt cx="0" cy="0"/>
+        </a:xfrm>
+      </p:grpSpPr>
+      <p:sp>
+        <p:nvSpPr>
+          <p:cNvPr id="2" name="Title 1">
+            <a:extLst>
+              <a:ext uri="{FF2B5EF4-FFF2-40B4-BE49-F238E27FC236}">
                 <a16:creationId xmlns:a16="http://schemas.microsoft.com/office/drawing/2014/main" id="{DF29D87C-482C-4F54-87E0-F2334586C8F5}"/>
               </a:ext>
             </a:extLst>
@@ -10901,7 +10493,7 @@
 </p:sld>
 </file>
 
-<file path=ppt/slides/slide32.xml><?xml version="1.0" encoding="utf-8"?>
+<file path=ppt/slides/slide31.xml><?xml version="1.0" encoding="utf-8"?>
 <p:sld xmlns:a="http://schemas.openxmlformats.org/drawingml/2006/main" xmlns:r="http://schemas.openxmlformats.org/officeDocument/2006/relationships" xmlns:p="http://schemas.openxmlformats.org/presentationml/2006/main">
   <p:cSld>
     <p:spTree>
@@ -11085,7 +10677,7 @@
 </p:sld>
 </file>
 
-<file path=ppt/slides/slide33.xml><?xml version="1.0" encoding="utf-8"?>
+<file path=ppt/slides/slide32.xml><?xml version="1.0" encoding="utf-8"?>
 <p:sld xmlns:a="http://schemas.openxmlformats.org/drawingml/2006/main" xmlns:r="http://schemas.openxmlformats.org/officeDocument/2006/relationships" xmlns:p="http://schemas.openxmlformats.org/presentationml/2006/main">
   <p:cSld>
     <p:spTree>
@@ -11227,7 +10819,7 @@
 </p:sld>
 </file>
 
-<file path=ppt/slides/slide34.xml><?xml version="1.0" encoding="utf-8"?>
+<file path=ppt/slides/slide33.xml><?xml version="1.0" encoding="utf-8"?>
 <p:sld xmlns:a="http://schemas.openxmlformats.org/drawingml/2006/main" xmlns:r="http://schemas.openxmlformats.org/officeDocument/2006/relationships" xmlns:p="http://schemas.openxmlformats.org/presentationml/2006/main">
   <p:cSld>
     <p:spTree>
@@ -11376,7 +10968,7 @@
 </p:sld>
 </file>
 
-<file path=ppt/slides/slide35.xml><?xml version="1.0" encoding="utf-8"?>
+<file path=ppt/slides/slide34.xml><?xml version="1.0" encoding="utf-8"?>
 <p:sld xmlns:a="http://schemas.openxmlformats.org/drawingml/2006/main" xmlns:r="http://schemas.openxmlformats.org/officeDocument/2006/relationships" xmlns:p="http://schemas.openxmlformats.org/presentationml/2006/main">
   <p:cSld>
     <p:spTree>
@@ -11441,7 +11033,7 @@
 </p:sld>
 </file>
 
-<file path=ppt/slides/slide36.xml><?xml version="1.0" encoding="utf-8"?>
+<file path=ppt/slides/slide35.xml><?xml version="1.0" encoding="utf-8"?>
 <p:sld xmlns:a="http://schemas.openxmlformats.org/drawingml/2006/main" xmlns:r="http://schemas.openxmlformats.org/officeDocument/2006/relationships" xmlns:p="http://schemas.openxmlformats.org/presentationml/2006/main">
   <p:cSld>
     <p:spTree>
@@ -11597,7 +11189,7 @@
 </p:sld>
 </file>
 
-<file path=ppt/slides/slide37.xml><?xml version="1.0" encoding="utf-8"?>
+<file path=ppt/slides/slide36.xml><?xml version="1.0" encoding="utf-8"?>
 <p:sld xmlns:a="http://schemas.openxmlformats.org/drawingml/2006/main" xmlns:r="http://schemas.openxmlformats.org/officeDocument/2006/relationships" xmlns:p="http://schemas.openxmlformats.org/presentationml/2006/main">
   <p:cSld>
     <p:spTree>
@@ -11691,7 +11283,7 @@
 </p:sld>
 </file>
 
-<file path=ppt/slides/slide38.xml><?xml version="1.0" encoding="utf-8"?>
+<file path=ppt/slides/slide37.xml><?xml version="1.0" encoding="utf-8"?>
 <p:sld xmlns:a="http://schemas.openxmlformats.org/drawingml/2006/main" xmlns:r="http://schemas.openxmlformats.org/officeDocument/2006/relationships" xmlns:p="http://schemas.openxmlformats.org/presentationml/2006/main">
   <p:cSld>
     <p:spTree>
@@ -11866,7 +11458,7 @@
 </p:sld>
 </file>
 
-<file path=ppt/slides/slide39.xml><?xml version="1.0" encoding="utf-8"?>
+<file path=ppt/slides/slide38.xml><?xml version="1.0" encoding="utf-8"?>
 <p:sld xmlns:a="http://schemas.openxmlformats.org/drawingml/2006/main" xmlns:r="http://schemas.openxmlformats.org/officeDocument/2006/relationships" xmlns:p="http://schemas.openxmlformats.org/presentationml/2006/main">
   <p:cSld>
     <p:spTree>
@@ -13048,6 +12640,102 @@
 </p:sld>
 </file>
 
+<file path=ppt/slides/slide39.xml><?xml version="1.0" encoding="utf-8"?>
+<p:sld xmlns:a="http://schemas.openxmlformats.org/drawingml/2006/main" xmlns:r="http://schemas.openxmlformats.org/officeDocument/2006/relationships" xmlns:p="http://schemas.openxmlformats.org/presentationml/2006/main">
+  <p:cSld>
+    <p:spTree>
+      <p:nvGrpSpPr>
+        <p:cNvPr id="1" name=""/>
+        <p:cNvGrpSpPr/>
+        <p:nvPr/>
+      </p:nvGrpSpPr>
+      <p:grpSpPr>
+        <a:xfrm>
+          <a:off x="0" y="0"/>
+          <a:ext cx="0" cy="0"/>
+          <a:chOff x="0" y="0"/>
+          <a:chExt cx="0" cy="0"/>
+        </a:xfrm>
+      </p:grpSpPr>
+      <p:sp>
+        <p:nvSpPr>
+          <p:cNvPr id="2" name="Title 1">
+            <a:extLst>
+              <a:ext uri="{FF2B5EF4-FFF2-40B4-BE49-F238E27FC236}">
+                <a16:creationId xmlns:a16="http://schemas.microsoft.com/office/drawing/2014/main" id="{C6411702-7A73-47CA-9032-D2980C91F1D4}"/>
+              </a:ext>
+            </a:extLst>
+          </p:cNvPr>
+          <p:cNvSpPr>
+            <a:spLocks noGrp="1"/>
+          </p:cNvSpPr>
+          <p:nvPr>
+            <p:ph type="ctrTitle"/>
+          </p:nvPr>
+        </p:nvSpPr>
+        <p:spPr/>
+        <p:txBody>
+          <a:bodyPr>
+            <a:normAutofit/>
+          </a:bodyPr>
+          <a:lstStyle/>
+          <a:p>
+            <a:r>
+              <a:rPr lang="en-GB" dirty="0"/>
+              <a:t>Go  </a:t>
+            </a:r>
+            <a:br>
+              <a:rPr lang="en-GB" dirty="0"/>
+            </a:br>
+            <a:r>
+              <a:rPr lang="en-GB" dirty="0"/>
+              <a:t>3 More Months In</a:t>
+            </a:r>
+            <a:endParaRPr lang="en-GB" sz="5300" dirty="0"/>
+          </a:p>
+        </p:txBody>
+      </p:sp>
+      <p:sp>
+        <p:nvSpPr>
+          <p:cNvPr id="3" name="Subtitle 2">
+            <a:extLst>
+              <a:ext uri="{FF2B5EF4-FFF2-40B4-BE49-F238E27FC236}">
+                <a16:creationId xmlns:a16="http://schemas.microsoft.com/office/drawing/2014/main" id="{1425F9F3-0794-4DC3-8C6C-B4C5823FCDE1}"/>
+              </a:ext>
+            </a:extLst>
+          </p:cNvPr>
+          <p:cNvSpPr>
+            <a:spLocks noGrp="1"/>
+          </p:cNvSpPr>
+          <p:nvPr>
+            <p:ph type="subTitle" idx="1"/>
+          </p:nvPr>
+        </p:nvSpPr>
+        <p:spPr/>
+        <p:txBody>
+          <a:bodyPr/>
+          <a:lstStyle/>
+          <a:p>
+            <a:r>
+              <a:rPr lang="en-GB" dirty="0"/>
+              <a:t>Benjamin Bryant</a:t>
+            </a:r>
+          </a:p>
+        </p:txBody>
+      </p:sp>
+    </p:spTree>
+    <p:extLst>
+      <p:ext uri="{BB962C8B-B14F-4D97-AF65-F5344CB8AC3E}">
+        <p14:creationId xmlns:p14="http://schemas.microsoft.com/office/powerpoint/2010/main" val="3751900240"/>
+      </p:ext>
+    </p:extLst>
+  </p:cSld>
+  <p:clrMapOvr>
+    <a:masterClrMapping/>
+  </p:clrMapOvr>
+</p:sld>
+</file>
+
 <file path=ppt/slides/slide4.xml><?xml version="1.0" encoding="utf-8"?>
 <p:sld xmlns:a="http://schemas.openxmlformats.org/drawingml/2006/main" xmlns:r="http://schemas.openxmlformats.org/officeDocument/2006/relationships" xmlns:p="http://schemas.openxmlformats.org/presentationml/2006/main">
   <p:cSld>
@@ -13067,10 +12755,10 @@
       </p:grpSpPr>
       <p:sp>
         <p:nvSpPr>
-          <p:cNvPr id="2" name="Title 1">
+          <p:cNvPr id="3" name="Content Placeholder 2">
             <a:extLst>
               <a:ext uri="{FF2B5EF4-FFF2-40B4-BE49-F238E27FC236}">
-                <a16:creationId xmlns:a16="http://schemas.microsoft.com/office/drawing/2014/main" id="{2C89FB05-C6B7-4F88-902F-3BEFF42B997F}"/>
+                <a16:creationId xmlns:a16="http://schemas.microsoft.com/office/drawing/2014/main" id="{0BA4CED0-14AF-4666-B0F9-8CD738326E3F}"/>
               </a:ext>
             </a:extLst>
           </p:cNvPr>
@@ -13078,38 +12766,116 @@
             <a:spLocks noGrp="1"/>
           </p:cNvSpPr>
           <p:nvPr>
-            <p:ph type="title"/>
+            <p:ph idx="1"/>
           </p:nvPr>
         </p:nvSpPr>
         <p:spPr>
           <a:xfrm>
-            <a:off x="959160" y="1420125"/>
-            <a:ext cx="10273679" cy="3708466"/>
+            <a:off x="1103312" y="2052918"/>
+            <a:ext cx="6194955" cy="4195481"/>
           </a:xfrm>
         </p:spPr>
         <p:txBody>
           <a:bodyPr/>
           <a:lstStyle/>
           <a:p>
-            <a:pPr algn="ctr"/>
-            <a:r>
-              <a:rPr lang="en-GB" sz="7200" dirty="0"/>
-              <a:t>Part 1 </a:t>
-            </a:r>
-            <a:br>
-              <a:rPr lang="en-GB" sz="7200" dirty="0"/>
-            </a:br>
-            <a:r>
-              <a:rPr lang="en-GB" sz="7200" dirty="0"/>
-              <a:t>The Idea</a:t>
-            </a:r>
+            <a:r>
+              <a:rPr lang="en-GB" dirty="0"/>
+              <a:t>Build a program that would model the life of 1 million gophers (the animal) using Go (obviously)</a:t>
+            </a:r>
+          </a:p>
+          <a:p>
+            <a:endParaRPr lang="en-GB" dirty="0"/>
+          </a:p>
+          <a:p>
+            <a:r>
+              <a:rPr lang="en-GB" dirty="0"/>
+              <a:t>Before beginning the program I looked online for some facts about gophers. </a:t>
+            </a:r>
+            <a:r>
+              <a:rPr lang="en-GB" dirty="0">
+                <a:hlinkClick r:id="rId2"/>
+              </a:rPr>
+              <a:t>https://www.livescience.com/57623-gopher-facts.html</a:t>
+            </a:r>
+            <a:endParaRPr lang="en-GB" dirty="0"/>
+          </a:p>
+          <a:p>
+            <a:pPr marL="457200" lvl="1" indent="0">
+              <a:buNone/>
+            </a:pPr>
+            <a:endParaRPr lang="en-GB" dirty="0"/>
+          </a:p>
+          <a:p>
+            <a:endParaRPr lang="en-GB" dirty="0"/>
+          </a:p>
+        </p:txBody>
+      </p:sp>
+      <p:pic>
+        <p:nvPicPr>
+          <p:cNvPr id="6" name="Picture 5">
+            <a:extLst>
+              <a:ext uri="{FF2B5EF4-FFF2-40B4-BE49-F238E27FC236}">
+                <a16:creationId xmlns:a16="http://schemas.microsoft.com/office/drawing/2014/main" id="{9378717A-1D2F-4DA1-A508-A543F6288D06}"/>
+              </a:ext>
+            </a:extLst>
+          </p:cNvPr>
+          <p:cNvPicPr>
+            <a:picLocks noChangeAspect="1"/>
+          </p:cNvPicPr>
+          <p:nvPr/>
+        </p:nvPicPr>
+        <p:blipFill>
+          <a:blip r:embed="rId3">
+            <a:extLst>
+              <a:ext uri="{28A0092B-C50C-407E-A947-70E740481C1C}">
+                <a14:useLocalDpi xmlns:a14="http://schemas.microsoft.com/office/drawing/2010/main" val="0"/>
+              </a:ext>
+            </a:extLst>
+          </a:blip>
+          <a:stretch>
+            <a:fillRect/>
+          </a:stretch>
+        </p:blipFill>
+        <p:spPr>
+          <a:xfrm>
+            <a:off x="7829531" y="2347258"/>
+            <a:ext cx="3259157" cy="3606800"/>
+          </a:xfrm>
+          <a:prstGeom prst="rect">
+            <a:avLst/>
+          </a:prstGeom>
+        </p:spPr>
+      </p:pic>
+      <p:sp>
+        <p:nvSpPr>
+          <p:cNvPr id="5" name="Title 4">
+            <a:extLst>
+              <a:ext uri="{FF2B5EF4-FFF2-40B4-BE49-F238E27FC236}">
+                <a16:creationId xmlns:a16="http://schemas.microsoft.com/office/drawing/2014/main" id="{57F2587A-CD57-454C-8277-7FAC5EE3EEBB}"/>
+              </a:ext>
+            </a:extLst>
+          </p:cNvPr>
+          <p:cNvSpPr>
+            <a:spLocks noGrp="1"/>
+          </p:cNvSpPr>
+          <p:nvPr>
+            <p:ph type="title"/>
+          </p:nvPr>
+        </p:nvSpPr>
+        <p:spPr/>
+        <p:txBody>
+          <a:bodyPr/>
+          <a:lstStyle/>
+          <a:p>
+            <a:endParaRPr lang="en-GB" dirty="0"/>
           </a:p>
         </p:txBody>
       </p:sp>
     </p:spTree>
     <p:extLst>
       <p:ext uri="{BB962C8B-B14F-4D97-AF65-F5344CB8AC3E}">
-        <p14:creationId xmlns:p14="http://schemas.microsoft.com/office/powerpoint/2010/main" val="1808995500"/>
+        <p14:creationId xmlns:p14="http://schemas.microsoft.com/office/powerpoint/2010/main" val="1992650848"/>
       </p:ext>
     </p:extLst>
   </p:cSld>
@@ -13141,7 +12907,7 @@
           <p:cNvPr id="2" name="Title 1">
             <a:extLst>
               <a:ext uri="{FF2B5EF4-FFF2-40B4-BE49-F238E27FC236}">
-                <a16:creationId xmlns:a16="http://schemas.microsoft.com/office/drawing/2014/main" id="{01A84025-E20E-49CE-8896-F2003BBCE6F4}"/>
+                <a16:creationId xmlns:a16="http://schemas.microsoft.com/office/drawing/2014/main" id="{2C89FB05-C6B7-4F88-902F-3BEFF42B997F}"/>
               </a:ext>
             </a:extLst>
           </p:cNvPr>
@@ -13152,74 +12918,35 @@
             <p:ph type="title"/>
           </p:nvPr>
         </p:nvSpPr>
-        <p:spPr/>
+        <p:spPr>
+          <a:xfrm>
+            <a:off x="959160" y="2310262"/>
+            <a:ext cx="10273679" cy="2237475"/>
+          </a:xfrm>
+        </p:spPr>
         <p:txBody>
           <a:bodyPr/>
           <a:lstStyle/>
           <a:p>
-            <a:endParaRPr lang="en-GB"/>
-          </a:p>
-        </p:txBody>
-      </p:sp>
-      <p:sp>
-        <p:nvSpPr>
-          <p:cNvPr id="3" name="Content Placeholder 2">
-            <a:extLst>
-              <a:ext uri="{FF2B5EF4-FFF2-40B4-BE49-F238E27FC236}">
-                <a16:creationId xmlns:a16="http://schemas.microsoft.com/office/drawing/2014/main" id="{A19E9461-7DE1-476F-8514-B55324F3D699}"/>
-              </a:ext>
-            </a:extLst>
-          </p:cNvPr>
-          <p:cNvSpPr>
-            <a:spLocks noGrp="1"/>
-          </p:cNvSpPr>
-          <p:nvPr>
-            <p:ph idx="1"/>
-          </p:nvPr>
-        </p:nvSpPr>
-        <p:spPr/>
-        <p:txBody>
-          <a:bodyPr/>
-          <a:lstStyle/>
-          <a:p>
-            <a:endParaRPr lang="en-GB"/>
-          </a:p>
-        </p:txBody>
-      </p:sp>
-      <p:pic>
-        <p:nvPicPr>
-          <p:cNvPr id="4" name="Picture 3">
-            <a:extLst>
-              <a:ext uri="{FF2B5EF4-FFF2-40B4-BE49-F238E27FC236}">
-                <a16:creationId xmlns:a16="http://schemas.microsoft.com/office/drawing/2014/main" id="{50026090-A618-4AC3-AB9C-0C900BE16487}"/>
-              </a:ext>
-            </a:extLst>
-          </p:cNvPr>
-          <p:cNvPicPr>
-            <a:picLocks noChangeAspect="1"/>
-          </p:cNvPicPr>
-          <p:nvPr/>
-        </p:nvPicPr>
-        <p:blipFill>
-          <a:blip r:embed="rId2"/>
-          <a:stretch>
-            <a:fillRect/>
-          </a:stretch>
-        </p:blipFill>
-        <p:spPr>
-          <a:xfrm>
-            <a:off x="0" y="0"/>
-            <a:ext cx="12192000" cy="6858000"/>
-          </a:xfrm>
-          <a:prstGeom prst="rect">
-            <a:avLst/>
-          </a:prstGeom>
-        </p:spPr>
-      </p:pic>
+            <a:pPr algn="ctr"/>
+            <a:r>
+              <a:rPr lang="en-GB" sz="7200" dirty="0"/>
+              <a:t>Part 1 </a:t>
+            </a:r>
+            <a:br>
+              <a:rPr lang="en-GB" sz="7200" dirty="0"/>
+            </a:br>
+            <a:r>
+              <a:rPr lang="en-GB" sz="7200" dirty="0"/>
+              <a:t>The Idea</a:t>
+            </a:r>
+          </a:p>
+        </p:txBody>
+      </p:sp>
     </p:spTree>
     <p:extLst>
       <p:ext uri="{BB962C8B-B14F-4D97-AF65-F5344CB8AC3E}">
-        <p14:creationId xmlns:p14="http://schemas.microsoft.com/office/powerpoint/2010/main" val="1489239463"/>
+        <p14:creationId xmlns:p14="http://schemas.microsoft.com/office/powerpoint/2010/main" val="911588053"/>
       </p:ext>
     </p:extLst>
   </p:cSld>
@@ -13251,7 +12978,7 @@
           <p:cNvPr id="2" name="Title 1">
             <a:extLst>
               <a:ext uri="{FF2B5EF4-FFF2-40B4-BE49-F238E27FC236}">
-                <a16:creationId xmlns:a16="http://schemas.microsoft.com/office/drawing/2014/main" id="{C6411702-7A73-47CA-9032-D2980C91F1D4}"/>
+                <a16:creationId xmlns:a16="http://schemas.microsoft.com/office/drawing/2014/main" id="{B1D2B085-B6B4-4DB3-904C-97AA8E1FE7DD}"/>
               </a:ext>
             </a:extLst>
           </p:cNvPr>
@@ -13259,37 +12986,24 @@
             <a:spLocks noGrp="1"/>
           </p:cNvSpPr>
           <p:nvPr>
-            <p:ph type="ctrTitle"/>
+            <p:ph type="title"/>
           </p:nvPr>
         </p:nvSpPr>
         <p:spPr/>
         <p:txBody>
-          <a:bodyPr>
-            <a:normAutofit/>
-          </a:bodyPr>
+          <a:bodyPr/>
           <a:lstStyle/>
           <a:p>
-            <a:r>
-              <a:rPr lang="en-GB" dirty="0"/>
-              <a:t>Go  </a:t>
-            </a:r>
-            <a:br>
-              <a:rPr lang="en-GB" dirty="0"/>
-            </a:br>
-            <a:r>
-              <a:rPr lang="en-GB" dirty="0"/>
-              <a:t>3 More Months In</a:t>
-            </a:r>
-            <a:endParaRPr lang="en-GB" sz="5300" dirty="0"/>
-          </a:p>
-        </p:txBody>
-      </p:sp>
-      <p:sp>
-        <p:nvSpPr>
-          <p:cNvPr id="3" name="Subtitle 2">
+            <a:endParaRPr lang="en-GB"/>
+          </a:p>
+        </p:txBody>
+      </p:sp>
+      <p:sp>
+        <p:nvSpPr>
+          <p:cNvPr id="3" name="Content Placeholder 2">
             <a:extLst>
               <a:ext uri="{FF2B5EF4-FFF2-40B4-BE49-F238E27FC236}">
-                <a16:creationId xmlns:a16="http://schemas.microsoft.com/office/drawing/2014/main" id="{1425F9F3-0794-4DC3-8C6C-B4C5823FCDE1}"/>
+                <a16:creationId xmlns:a16="http://schemas.microsoft.com/office/drawing/2014/main" id="{1491485F-FB5E-4D0A-AB74-76CD653AEB86}"/>
               </a:ext>
             </a:extLst>
           </p:cNvPr>
@@ -13297,7 +13011,7 @@
             <a:spLocks noGrp="1"/>
           </p:cNvSpPr>
           <p:nvPr>
-            <p:ph type="subTitle" idx="1"/>
+            <p:ph idx="1"/>
           </p:nvPr>
         </p:nvSpPr>
         <p:spPr/>
@@ -13307,7 +13021,30 @@
           <a:p>
             <a:r>
               <a:rPr lang="en-GB" dirty="0"/>
-              <a:t>Benjamin Bryant</a:t>
+              <a:t>I was still interested in investigating the performance of spatial partition, but using different parameters</a:t>
+            </a:r>
+          </a:p>
+          <a:p>
+            <a:endParaRPr lang="en-GB" dirty="0"/>
+          </a:p>
+          <a:p>
+            <a:r>
+              <a:rPr lang="en-GB" dirty="0"/>
+              <a:t>I needed to find a way to easily hop between different versions of </a:t>
+            </a:r>
+            <a:r>
+              <a:rPr lang="en-GB" dirty="0" err="1"/>
+              <a:t>Gopherlife</a:t>
+            </a:r>
+            <a:endParaRPr lang="en-GB" dirty="0"/>
+          </a:p>
+          <a:p>
+            <a:endParaRPr lang="en-GB" dirty="0"/>
+          </a:p>
+          <a:p>
+            <a:r>
+              <a:rPr lang="en-GB" dirty="0"/>
+              <a:t>That’s it.</a:t>
             </a:r>
           </a:p>
         </p:txBody>
@@ -13315,7 +13052,7 @@
     </p:spTree>
     <p:extLst>
       <p:ext uri="{BB962C8B-B14F-4D97-AF65-F5344CB8AC3E}">
-        <p14:creationId xmlns:p14="http://schemas.microsoft.com/office/powerpoint/2010/main" val="3751900240"/>
+        <p14:creationId xmlns:p14="http://schemas.microsoft.com/office/powerpoint/2010/main" val="2491883747"/>
       </p:ext>
     </p:extLst>
   </p:cSld>
@@ -13371,183 +13108,6 @@
             <a:pPr algn="ctr"/>
             <a:r>
               <a:rPr lang="en-GB" sz="7200" dirty="0"/>
-              <a:t>Part 1 </a:t>
-            </a:r>
-            <a:br>
-              <a:rPr lang="en-GB" sz="7200" dirty="0"/>
-            </a:br>
-            <a:r>
-              <a:rPr lang="en-GB" sz="7200" dirty="0"/>
-              <a:t>The Idea</a:t>
-            </a:r>
-          </a:p>
-        </p:txBody>
-      </p:sp>
-    </p:spTree>
-    <p:extLst>
-      <p:ext uri="{BB962C8B-B14F-4D97-AF65-F5344CB8AC3E}">
-        <p14:creationId xmlns:p14="http://schemas.microsoft.com/office/powerpoint/2010/main" val="911588053"/>
-      </p:ext>
-    </p:extLst>
-  </p:cSld>
-  <p:clrMapOvr>
-    <a:masterClrMapping/>
-  </p:clrMapOvr>
-</p:sld>
-</file>
-
-<file path=ppt/slides/slide43.xml><?xml version="1.0" encoding="utf-8"?>
-<p:sld xmlns:a="http://schemas.openxmlformats.org/drawingml/2006/main" xmlns:r="http://schemas.openxmlformats.org/officeDocument/2006/relationships" xmlns:p="http://schemas.openxmlformats.org/presentationml/2006/main">
-  <p:cSld>
-    <p:spTree>
-      <p:nvGrpSpPr>
-        <p:cNvPr id="1" name=""/>
-        <p:cNvGrpSpPr/>
-        <p:nvPr/>
-      </p:nvGrpSpPr>
-      <p:grpSpPr>
-        <a:xfrm>
-          <a:off x="0" y="0"/>
-          <a:ext cx="0" cy="0"/>
-          <a:chOff x="0" y="0"/>
-          <a:chExt cx="0" cy="0"/>
-        </a:xfrm>
-      </p:grpSpPr>
-      <p:sp>
-        <p:nvSpPr>
-          <p:cNvPr id="2" name="Title 1">
-            <a:extLst>
-              <a:ext uri="{FF2B5EF4-FFF2-40B4-BE49-F238E27FC236}">
-                <a16:creationId xmlns:a16="http://schemas.microsoft.com/office/drawing/2014/main" id="{B1D2B085-B6B4-4DB3-904C-97AA8E1FE7DD}"/>
-              </a:ext>
-            </a:extLst>
-          </p:cNvPr>
-          <p:cNvSpPr>
-            <a:spLocks noGrp="1"/>
-          </p:cNvSpPr>
-          <p:nvPr>
-            <p:ph type="title"/>
-          </p:nvPr>
-        </p:nvSpPr>
-        <p:spPr/>
-        <p:txBody>
-          <a:bodyPr/>
-          <a:lstStyle/>
-          <a:p>
-            <a:endParaRPr lang="en-GB"/>
-          </a:p>
-        </p:txBody>
-      </p:sp>
-      <p:sp>
-        <p:nvSpPr>
-          <p:cNvPr id="3" name="Content Placeholder 2">
-            <a:extLst>
-              <a:ext uri="{FF2B5EF4-FFF2-40B4-BE49-F238E27FC236}">
-                <a16:creationId xmlns:a16="http://schemas.microsoft.com/office/drawing/2014/main" id="{1491485F-FB5E-4D0A-AB74-76CD653AEB86}"/>
-              </a:ext>
-            </a:extLst>
-          </p:cNvPr>
-          <p:cNvSpPr>
-            <a:spLocks noGrp="1"/>
-          </p:cNvSpPr>
-          <p:nvPr>
-            <p:ph idx="1"/>
-          </p:nvPr>
-        </p:nvSpPr>
-        <p:spPr/>
-        <p:txBody>
-          <a:bodyPr/>
-          <a:lstStyle/>
-          <a:p>
-            <a:r>
-              <a:rPr lang="en-GB" dirty="0"/>
-              <a:t>I was still interested in investigating the performance of spatial partition, but using different parameters</a:t>
-            </a:r>
-          </a:p>
-          <a:p>
-            <a:endParaRPr lang="en-GB" dirty="0"/>
-          </a:p>
-          <a:p>
-            <a:r>
-              <a:rPr lang="en-GB" dirty="0"/>
-              <a:t>I needed to find a way to easily hop between different versions of </a:t>
-            </a:r>
-            <a:r>
-              <a:rPr lang="en-GB" dirty="0" err="1"/>
-              <a:t>Gopherlife</a:t>
-            </a:r>
-            <a:endParaRPr lang="en-GB" dirty="0"/>
-          </a:p>
-          <a:p>
-            <a:endParaRPr lang="en-GB" dirty="0"/>
-          </a:p>
-          <a:p>
-            <a:r>
-              <a:rPr lang="en-GB" dirty="0"/>
-              <a:t>That’s it.</a:t>
-            </a:r>
-          </a:p>
-        </p:txBody>
-      </p:sp>
-    </p:spTree>
-    <p:extLst>
-      <p:ext uri="{BB962C8B-B14F-4D97-AF65-F5344CB8AC3E}">
-        <p14:creationId xmlns:p14="http://schemas.microsoft.com/office/powerpoint/2010/main" val="2491883747"/>
-      </p:ext>
-    </p:extLst>
-  </p:cSld>
-  <p:clrMapOvr>
-    <a:masterClrMapping/>
-  </p:clrMapOvr>
-</p:sld>
-</file>
-
-<file path=ppt/slides/slide44.xml><?xml version="1.0" encoding="utf-8"?>
-<p:sld xmlns:a="http://schemas.openxmlformats.org/drawingml/2006/main" xmlns:r="http://schemas.openxmlformats.org/officeDocument/2006/relationships" xmlns:p="http://schemas.openxmlformats.org/presentationml/2006/main">
-  <p:cSld>
-    <p:spTree>
-      <p:nvGrpSpPr>
-        <p:cNvPr id="1" name=""/>
-        <p:cNvGrpSpPr/>
-        <p:nvPr/>
-      </p:nvGrpSpPr>
-      <p:grpSpPr>
-        <a:xfrm>
-          <a:off x="0" y="0"/>
-          <a:ext cx="0" cy="0"/>
-          <a:chOff x="0" y="0"/>
-          <a:chExt cx="0" cy="0"/>
-        </a:xfrm>
-      </p:grpSpPr>
-      <p:sp>
-        <p:nvSpPr>
-          <p:cNvPr id="2" name="Title 1">
-            <a:extLst>
-              <a:ext uri="{FF2B5EF4-FFF2-40B4-BE49-F238E27FC236}">
-                <a16:creationId xmlns:a16="http://schemas.microsoft.com/office/drawing/2014/main" id="{2C89FB05-C6B7-4F88-902F-3BEFF42B997F}"/>
-              </a:ext>
-            </a:extLst>
-          </p:cNvPr>
-          <p:cNvSpPr>
-            <a:spLocks noGrp="1"/>
-          </p:cNvSpPr>
-          <p:nvPr>
-            <p:ph type="title"/>
-          </p:nvPr>
-        </p:nvSpPr>
-        <p:spPr>
-          <a:xfrm>
-            <a:off x="959160" y="1420125"/>
-            <a:ext cx="10273679" cy="3708466"/>
-          </a:xfrm>
-        </p:spPr>
-        <p:txBody>
-          <a:bodyPr/>
-          <a:lstStyle/>
-          <a:p>
-            <a:pPr algn="ctr"/>
-            <a:r>
-              <a:rPr lang="en-GB" sz="7200" dirty="0"/>
               <a:t>Part 2 </a:t>
             </a:r>
             <a:br>
@@ -13573,7 +13133,7 @@
 </p:sld>
 </file>
 
-<file path=ppt/slides/slide45.xml><?xml version="1.0" encoding="utf-8"?>
+<file path=ppt/slides/slide43.xml><?xml version="1.0" encoding="utf-8"?>
 <p:sld xmlns:a="http://schemas.openxmlformats.org/drawingml/2006/main" xmlns:r="http://schemas.openxmlformats.org/officeDocument/2006/relationships" xmlns:p="http://schemas.openxmlformats.org/presentationml/2006/main">
   <p:cSld>
     <p:spTree>
@@ -13661,7 +13221,7 @@
 </p:sld>
 </file>
 
-<file path=ppt/slides/slide46.xml><?xml version="1.0" encoding="utf-8"?>
+<file path=ppt/slides/slide44.xml><?xml version="1.0" encoding="utf-8"?>
 <p:sld xmlns:a="http://schemas.openxmlformats.org/drawingml/2006/main" xmlns:r="http://schemas.openxmlformats.org/officeDocument/2006/relationships" xmlns:p="http://schemas.openxmlformats.org/presentationml/2006/main">
   <p:cSld>
     <p:spTree>
@@ -13904,7 +13464,7 @@
 </p:sld>
 </file>
 
-<file path=ppt/slides/slide47.xml><?xml version="1.0" encoding="utf-8"?>
+<file path=ppt/slides/slide45.xml><?xml version="1.0" encoding="utf-8"?>
 <p:sld xmlns:a="http://schemas.openxmlformats.org/drawingml/2006/main" xmlns:r="http://schemas.openxmlformats.org/officeDocument/2006/relationships" xmlns:p="http://schemas.openxmlformats.org/presentationml/2006/main">
   <p:cSld>
     <p:spTree>
@@ -14029,7 +13589,7 @@
 </p:sld>
 </file>
 
-<file path=ppt/slides/slide48.xml><?xml version="1.0" encoding="utf-8"?>
+<file path=ppt/slides/slide46.xml><?xml version="1.0" encoding="utf-8"?>
 <p:sld xmlns:a="http://schemas.openxmlformats.org/drawingml/2006/main" xmlns:r="http://schemas.openxmlformats.org/officeDocument/2006/relationships" xmlns:p="http://schemas.openxmlformats.org/presentationml/2006/main">
   <p:cSld>
     <p:spTree>
@@ -14182,7 +13742,7 @@
 </p:sld>
 </file>
 
-<file path=ppt/slides/slide49.xml><?xml version="1.0" encoding="utf-8"?>
+<file path=ppt/slides/slide47.xml><?xml version="1.0" encoding="utf-8"?>
 <p:sld xmlns:a="http://schemas.openxmlformats.org/drawingml/2006/main" xmlns:r="http://schemas.openxmlformats.org/officeDocument/2006/relationships" xmlns:p="http://schemas.openxmlformats.org/presentationml/2006/main">
   <p:cSld>
     <p:spTree>
@@ -14272,156 +13832,7 @@
 </p:sld>
 </file>
 
-<file path=ppt/slides/slide5.xml><?xml version="1.0" encoding="utf-8"?>
-<p:sld xmlns:a="http://schemas.openxmlformats.org/drawingml/2006/main" xmlns:r="http://schemas.openxmlformats.org/officeDocument/2006/relationships" xmlns:p="http://schemas.openxmlformats.org/presentationml/2006/main">
-  <p:cSld>
-    <p:spTree>
-      <p:nvGrpSpPr>
-        <p:cNvPr id="1" name=""/>
-        <p:cNvGrpSpPr/>
-        <p:nvPr/>
-      </p:nvGrpSpPr>
-      <p:grpSpPr>
-        <a:xfrm>
-          <a:off x="0" y="0"/>
-          <a:ext cx="0" cy="0"/>
-          <a:chOff x="0" y="0"/>
-          <a:chExt cx="0" cy="0"/>
-        </a:xfrm>
-      </p:grpSpPr>
-      <p:sp>
-        <p:nvSpPr>
-          <p:cNvPr id="3" name="Content Placeholder 2">
-            <a:extLst>
-              <a:ext uri="{FF2B5EF4-FFF2-40B4-BE49-F238E27FC236}">
-                <a16:creationId xmlns:a16="http://schemas.microsoft.com/office/drawing/2014/main" id="{0BA4CED0-14AF-4666-B0F9-8CD738326E3F}"/>
-              </a:ext>
-            </a:extLst>
-          </p:cNvPr>
-          <p:cNvSpPr>
-            <a:spLocks noGrp="1"/>
-          </p:cNvSpPr>
-          <p:nvPr>
-            <p:ph idx="1"/>
-          </p:nvPr>
-        </p:nvSpPr>
-        <p:spPr>
-          <a:xfrm>
-            <a:off x="1103312" y="2052918"/>
-            <a:ext cx="6194955" cy="4195481"/>
-          </a:xfrm>
-        </p:spPr>
-        <p:txBody>
-          <a:bodyPr/>
-          <a:lstStyle/>
-          <a:p>
-            <a:r>
-              <a:rPr lang="en-GB" dirty="0"/>
-              <a:t>Build a program that would model the life of 1 million gophers (the animal) using Go (obviously)</a:t>
-            </a:r>
-          </a:p>
-          <a:p>
-            <a:endParaRPr lang="en-GB" dirty="0"/>
-          </a:p>
-          <a:p>
-            <a:r>
-              <a:rPr lang="en-GB" dirty="0"/>
-              <a:t>Before beginning the program I looked online for some facts about gophers. </a:t>
-            </a:r>
-            <a:r>
-              <a:rPr lang="en-GB" dirty="0">
-                <a:hlinkClick r:id="rId2"/>
-              </a:rPr>
-              <a:t>https://www.livescience.com/57623-gopher-facts.html</a:t>
-            </a:r>
-            <a:endParaRPr lang="en-GB" dirty="0"/>
-          </a:p>
-          <a:p>
-            <a:pPr marL="457200" lvl="1" indent="0">
-              <a:buNone/>
-            </a:pPr>
-            <a:endParaRPr lang="en-GB" dirty="0"/>
-          </a:p>
-          <a:p>
-            <a:endParaRPr lang="en-GB" dirty="0"/>
-          </a:p>
-        </p:txBody>
-      </p:sp>
-      <p:pic>
-        <p:nvPicPr>
-          <p:cNvPr id="6" name="Picture 5">
-            <a:extLst>
-              <a:ext uri="{FF2B5EF4-FFF2-40B4-BE49-F238E27FC236}">
-                <a16:creationId xmlns:a16="http://schemas.microsoft.com/office/drawing/2014/main" id="{9378717A-1D2F-4DA1-A508-A543F6288D06}"/>
-              </a:ext>
-            </a:extLst>
-          </p:cNvPr>
-          <p:cNvPicPr>
-            <a:picLocks noChangeAspect="1"/>
-          </p:cNvPicPr>
-          <p:nvPr/>
-        </p:nvPicPr>
-        <p:blipFill>
-          <a:blip r:embed="rId3">
-            <a:extLst>
-              <a:ext uri="{28A0092B-C50C-407E-A947-70E740481C1C}">
-                <a14:useLocalDpi xmlns:a14="http://schemas.microsoft.com/office/drawing/2010/main" val="0"/>
-              </a:ext>
-            </a:extLst>
-          </a:blip>
-          <a:stretch>
-            <a:fillRect/>
-          </a:stretch>
-        </p:blipFill>
-        <p:spPr>
-          <a:xfrm>
-            <a:off x="7829531" y="2347258"/>
-            <a:ext cx="3259157" cy="3606800"/>
-          </a:xfrm>
-          <a:prstGeom prst="rect">
-            <a:avLst/>
-          </a:prstGeom>
-        </p:spPr>
-      </p:pic>
-      <p:sp>
-        <p:nvSpPr>
-          <p:cNvPr id="5" name="Title 4">
-            <a:extLst>
-              <a:ext uri="{FF2B5EF4-FFF2-40B4-BE49-F238E27FC236}">
-                <a16:creationId xmlns:a16="http://schemas.microsoft.com/office/drawing/2014/main" id="{57F2587A-CD57-454C-8277-7FAC5EE3EEBB}"/>
-              </a:ext>
-            </a:extLst>
-          </p:cNvPr>
-          <p:cNvSpPr>
-            <a:spLocks noGrp="1"/>
-          </p:cNvSpPr>
-          <p:nvPr>
-            <p:ph type="title"/>
-          </p:nvPr>
-        </p:nvSpPr>
-        <p:spPr/>
-        <p:txBody>
-          <a:bodyPr/>
-          <a:lstStyle/>
-          <a:p>
-            <a:endParaRPr lang="en-GB" dirty="0"/>
-          </a:p>
-        </p:txBody>
-      </p:sp>
-    </p:spTree>
-    <p:extLst>
-      <p:ext uri="{BB962C8B-B14F-4D97-AF65-F5344CB8AC3E}">
-        <p14:creationId xmlns:p14="http://schemas.microsoft.com/office/powerpoint/2010/main" val="1992650848"/>
-      </p:ext>
-    </p:extLst>
-  </p:cSld>
-  <p:clrMapOvr>
-    <a:masterClrMapping/>
-  </p:clrMapOvr>
-</p:sld>
-</file>
-
-<file path=ppt/slides/slide50.xml><?xml version="1.0" encoding="utf-8"?>
+<file path=ppt/slides/slide48.xml><?xml version="1.0" encoding="utf-8"?>
 <p:sld xmlns:a="http://schemas.openxmlformats.org/drawingml/2006/main" xmlns:r="http://schemas.openxmlformats.org/officeDocument/2006/relationships" xmlns:p="http://schemas.openxmlformats.org/presentationml/2006/main">
   <p:cSld>
     <p:spTree>
@@ -14531,7 +13942,7 @@
 </p:sld>
 </file>
 
-<file path=ppt/slides/slide51.xml><?xml version="1.0" encoding="utf-8"?>
+<file path=ppt/slides/slide49.xml><?xml version="1.0" encoding="utf-8"?>
 <p:sld xmlns:a="http://schemas.openxmlformats.org/drawingml/2006/main" xmlns:r="http://schemas.openxmlformats.org/officeDocument/2006/relationships" xmlns:p="http://schemas.openxmlformats.org/presentationml/2006/main">
   <p:cSld>
     <p:spTree>
@@ -14691,7 +14102,7 @@
 </p:sld>
 </file>
 
-<file path=ppt/slides/slide52.xml><?xml version="1.0" encoding="utf-8"?>
+<file path=ppt/slides/slide5.xml><?xml version="1.0" encoding="utf-8"?>
 <p:sld xmlns:a="http://schemas.openxmlformats.org/drawingml/2006/main" xmlns:r="http://schemas.openxmlformats.org/officeDocument/2006/relationships" xmlns:p="http://schemas.openxmlformats.org/presentationml/2006/main">
   <p:cSld>
     <p:spTree>
@@ -14713,6 +14124,77 @@
           <p:cNvPr id="2" name="Title 1">
             <a:extLst>
               <a:ext uri="{FF2B5EF4-FFF2-40B4-BE49-F238E27FC236}">
+                <a16:creationId xmlns:a16="http://schemas.microsoft.com/office/drawing/2014/main" id="{2C89FB05-C6B7-4F88-902F-3BEFF42B997F}"/>
+              </a:ext>
+            </a:extLst>
+          </p:cNvPr>
+          <p:cNvSpPr>
+            <a:spLocks noGrp="1"/>
+          </p:cNvSpPr>
+          <p:nvPr>
+            <p:ph type="title"/>
+          </p:nvPr>
+        </p:nvSpPr>
+        <p:spPr>
+          <a:xfrm>
+            <a:off x="959160" y="2310262"/>
+            <a:ext cx="10273679" cy="2237475"/>
+          </a:xfrm>
+        </p:spPr>
+        <p:txBody>
+          <a:bodyPr/>
+          <a:lstStyle/>
+          <a:p>
+            <a:pPr algn="ctr"/>
+            <a:r>
+              <a:rPr lang="en-GB" sz="7200" dirty="0"/>
+              <a:t>Part 1 </a:t>
+            </a:r>
+            <a:br>
+              <a:rPr lang="en-GB" sz="7200" dirty="0"/>
+            </a:br>
+            <a:r>
+              <a:rPr lang="en-GB" sz="7200" dirty="0"/>
+              <a:t>The Idea</a:t>
+            </a:r>
+          </a:p>
+        </p:txBody>
+      </p:sp>
+    </p:spTree>
+    <p:extLst>
+      <p:ext uri="{BB962C8B-B14F-4D97-AF65-F5344CB8AC3E}">
+        <p14:creationId xmlns:p14="http://schemas.microsoft.com/office/powerpoint/2010/main" val="1902102242"/>
+      </p:ext>
+    </p:extLst>
+  </p:cSld>
+  <p:clrMapOvr>
+    <a:masterClrMapping/>
+  </p:clrMapOvr>
+</p:sld>
+</file>
+
+<file path=ppt/slides/slide50.xml><?xml version="1.0" encoding="utf-8"?>
+<p:sld xmlns:a="http://schemas.openxmlformats.org/drawingml/2006/main" xmlns:r="http://schemas.openxmlformats.org/officeDocument/2006/relationships" xmlns:p="http://schemas.openxmlformats.org/presentationml/2006/main">
+  <p:cSld>
+    <p:spTree>
+      <p:nvGrpSpPr>
+        <p:cNvPr id="1" name=""/>
+        <p:cNvGrpSpPr/>
+        <p:nvPr/>
+      </p:nvGrpSpPr>
+      <p:grpSpPr>
+        <a:xfrm>
+          <a:off x="0" y="0"/>
+          <a:ext cx="0" cy="0"/>
+          <a:chOff x="0" y="0"/>
+          <a:chExt cx="0" cy="0"/>
+        </a:xfrm>
+      </p:grpSpPr>
+      <p:sp>
+        <p:nvSpPr>
+          <p:cNvPr id="2" name="Title 1">
+            <a:extLst>
+              <a:ext uri="{FF2B5EF4-FFF2-40B4-BE49-F238E27FC236}">
                 <a16:creationId xmlns:a16="http://schemas.microsoft.com/office/drawing/2014/main" id="{F00E9A88-3091-4946-A15B-6EDE744EB7D9}"/>
               </a:ext>
             </a:extLst>
@@ -14760,7 +14242,7 @@
 </p:sld>
 </file>
 
-<file path=ppt/slides/slide53.xml><?xml version="1.0" encoding="utf-8"?>
+<file path=ppt/slides/slide51.xml><?xml version="1.0" encoding="utf-8"?>
 <p:sld xmlns:a="http://schemas.openxmlformats.org/drawingml/2006/main" xmlns:r="http://schemas.openxmlformats.org/officeDocument/2006/relationships" xmlns:p="http://schemas.openxmlformats.org/presentationml/2006/main">
   <p:cSld>
     <p:spTree>
@@ -14938,7 +14420,7 @@
           <a:p>
             <a:r>
               <a:rPr lang="en-GB" dirty="0"/>
-              <a:t>How do I even create a program in Golang?</a:t>
+              <a:t>How do I even create a program in Go?</a:t>
             </a:r>
           </a:p>
           <a:p>
@@ -14950,7 +14432,7 @@
           <a:p>
             <a:r>
               <a:rPr lang="en-GB" dirty="0"/>
-              <a:t>What are the syntactical differences between Golang and languages I already know? </a:t>
+              <a:t>What are the syntactical differences between Go and languages I already know? </a:t>
             </a:r>
           </a:p>
           <a:p>
@@ -15068,21 +14550,25 @@
             </a:r>
           </a:p>
           <a:p>
+            <a:pPr marL="0" indent="0">
+              <a:buNone/>
+            </a:pPr>
             <a:endParaRPr lang="en-GB" dirty="0"/>
           </a:p>
           <a:p>
             <a:r>
               <a:rPr lang="en-GB" dirty="0"/>
-              <a:t>Learning syntax from basic tutorials.</a:t>
-            </a:r>
-          </a:p>
-          <a:p>
-            <a:endParaRPr lang="en-GB" dirty="0"/>
-          </a:p>
-          <a:p>
+              <a:t>Completing the Go tour  (</a:t>
+            </a:r>
+            <a:r>
+              <a:rPr lang="en-GB" dirty="0">
+                <a:hlinkClick r:id="rId3"/>
+              </a:rPr>
+              <a:t>https://tour.golang.org/</a:t>
+            </a:r>
             <a:r>
               <a:rPr lang="en-GB" dirty="0"/>
-              <a:t>Completing the Go tour </a:t>
+              <a:t>)</a:t>
             </a:r>
           </a:p>
         </p:txBody>
@@ -15250,7 +14736,7 @@
         </p:blipFill>
         <p:spPr>
           <a:xfrm>
-            <a:off x="2360169" y="3682094"/>
+            <a:off x="2930921" y="3682094"/>
             <a:ext cx="1856231" cy="468564"/>
           </a:xfrm>
           <a:prstGeom prst="rect">
@@ -15280,7 +14766,7 @@
         </p:blipFill>
         <p:spPr>
           <a:xfrm>
-            <a:off x="4809712" y="3678218"/>
+            <a:off x="5896072" y="3682094"/>
             <a:ext cx="3017555" cy="468564"/>
           </a:xfrm>
           <a:prstGeom prst="rect">

</xml_diff>